<commit_message>
Added link to SS2016Express download.
</commit_message>
<xml_diff>
--- a/AwesomeFreeSQLServerFeatures.pptx
+++ b/AwesomeFreeSQLServerFeatures.pptx
@@ -7,6 +7,7 @@
   <p:sldIdLst>
     <p:sldId id="256" r:id="rId2"/>
     <p:sldId id="257" r:id="rId3"/>
+    <p:sldId id="258" r:id="rId4"/>
   </p:sldIdLst>
   <p:sldSz cx="12192000" cy="6858000"/>
   <p:notesSz cx="6858000" cy="9144000"/>
@@ -105,6 +106,11 @@
       </a:defRPr>
     </a:lvl9pPr>
   </p:defaultTextStyle>
+  <p:extLst>
+    <p:ext uri="{EFAFB233-063F-42B5-8137-9DF3F51BA10A}">
+      <p15:sldGuideLst xmlns:p15="http://schemas.microsoft.com/office/powerpoint/2012/main"/>
+    </p:ext>
+  </p:extLst>
 </p:presentation>
 </file>
 
@@ -3946,6 +3952,104 @@
 </p:sld>
 </file>
 
+<file path=ppt/slides/slide3.xml><?xml version="1.0" encoding="utf-8"?>
+<p:sld xmlns:a="http://schemas.openxmlformats.org/drawingml/2006/main" xmlns:r="http://schemas.openxmlformats.org/officeDocument/2006/relationships" xmlns:p="http://schemas.openxmlformats.org/presentationml/2006/main">
+  <p:cSld>
+    <p:spTree>
+      <p:nvGrpSpPr>
+        <p:cNvPr id="1" name=""/>
+        <p:cNvGrpSpPr/>
+        <p:nvPr/>
+      </p:nvGrpSpPr>
+      <p:grpSpPr>
+        <a:xfrm>
+          <a:off x="0" y="0"/>
+          <a:ext cx="0" cy="0"/>
+          <a:chOff x="0" y="0"/>
+          <a:chExt cx="0" cy="0"/>
+        </a:xfrm>
+      </p:grpSpPr>
+      <p:sp>
+        <p:nvSpPr>
+          <p:cNvPr id="2" name="Title 1"/>
+          <p:cNvSpPr>
+            <a:spLocks noGrp="1"/>
+          </p:cNvSpPr>
+          <p:nvPr>
+            <p:ph type="title"/>
+          </p:nvPr>
+        </p:nvSpPr>
+        <p:spPr/>
+        <p:txBody>
+          <a:bodyPr/>
+          <a:lstStyle/>
+          <a:p>
+            <a:r>
+              <a:rPr lang="en-US" dirty="0"/>
+              <a:t>Resources</a:t>
+            </a:r>
+          </a:p>
+        </p:txBody>
+      </p:sp>
+      <p:sp>
+        <p:nvSpPr>
+          <p:cNvPr id="3" name="Content Placeholder 2"/>
+          <p:cNvSpPr>
+            <a:spLocks noGrp="1"/>
+          </p:cNvSpPr>
+          <p:nvPr>
+            <p:ph idx="1"/>
+          </p:nvPr>
+        </p:nvSpPr>
+        <p:spPr/>
+        <p:txBody>
+          <a:bodyPr/>
+          <a:lstStyle/>
+          <a:p>
+            <a:r>
+              <a:rPr lang="en-US" dirty="0"/>
+              <a:t>SQL Server 2016 Express Edition download</a:t>
+            </a:r>
+          </a:p>
+          <a:p>
+            <a:pPr marL="324000" lvl="1" indent="0">
+              <a:buNone/>
+            </a:pPr>
+            <a:r>
+              <a:rPr lang="en-US">
+                <a:hlinkClick r:id="rId2"/>
+              </a:rPr>
+              <a:t>https://www.microsoft.com/en-us/download/details.aspx?id</a:t>
+            </a:r>
+            <a:r>
+              <a:rPr lang="en-US">
+                <a:hlinkClick r:id="rId2"/>
+              </a:rPr>
+              <a:t>=52679</a:t>
+            </a:r>
+            <a:endParaRPr lang="en-US"/>
+          </a:p>
+          <a:p>
+            <a:pPr marL="324000" lvl="1" indent="0">
+              <a:buNone/>
+            </a:pPr>
+            <a:endParaRPr lang="en-US"/>
+          </a:p>
+        </p:txBody>
+      </p:sp>
+    </p:spTree>
+    <p:extLst>
+      <p:ext uri="{BB962C8B-B14F-4D97-AF65-F5344CB8AC3E}">
+        <p14:creationId xmlns:p14="http://schemas.microsoft.com/office/powerpoint/2010/main" val="3472261720"/>
+      </p:ext>
+    </p:extLst>
+  </p:cSld>
+  <p:clrMapOvr>
+    <a:masterClrMapping/>
+  </p:clrMapOvr>
+</p:sld>
+</file>
+
 <file path=ppt/theme/theme1.xml><?xml version="1.0" encoding="utf-8"?>
 <a:theme xmlns:a="http://schemas.openxmlformats.org/drawingml/2006/main" name="Dividend">
   <a:themeElements>

</xml_diff>

<commit_message>
Add editions by version matrix.
</commit_message>
<xml_diff>
--- a/AwesomeFreeSQLServerFeatures.pptx
+++ b/AwesomeFreeSQLServerFeatures.pptx
@@ -360,7 +360,7 @@
             <a:fld id="{B61BEF0D-F0BB-DE4B-95CE-6DB70DBA9567}" type="datetimeFigureOut">
               <a:rPr lang="en-US" dirty="0"/>
               <a:pPr/>
-              <a:t>11/30/2016</a:t>
+              <a:t>12/5/2016</a:t>
             </a:fld>
             <a:endParaRPr lang="en-US" dirty="0"/>
           </a:p>
@@ -619,7 +619,7 @@
             <a:fld id="{B61BEF0D-F0BB-DE4B-95CE-6DB70DBA9567}" type="datetimeFigureOut">
               <a:rPr lang="en-US" dirty="0"/>
               <a:pPr/>
-              <a:t>11/30/2016</a:t>
+              <a:t>12/5/2016</a:t>
             </a:fld>
             <a:endParaRPr lang="en-US" dirty="0"/>
           </a:p>
@@ -851,7 +851,7 @@
             <a:fld id="{B61BEF0D-F0BB-DE4B-95CE-6DB70DBA9567}" type="datetimeFigureOut">
               <a:rPr lang="en-US" dirty="0"/>
               <a:pPr/>
-              <a:t>11/30/2016</a:t>
+              <a:t>12/5/2016</a:t>
             </a:fld>
             <a:endParaRPr lang="en-US" dirty="0"/>
           </a:p>
@@ -1088,7 +1088,7 @@
             <a:fld id="{B61BEF0D-F0BB-DE4B-95CE-6DB70DBA9567}" type="datetimeFigureOut">
               <a:rPr lang="en-US" dirty="0"/>
               <a:pPr/>
-              <a:t>11/30/2016</a:t>
+              <a:t>12/5/2016</a:t>
             </a:fld>
             <a:endParaRPr lang="en-US" dirty="0"/>
           </a:p>
@@ -1392,7 +1392,7 @@
             <a:fld id="{B61BEF0D-F0BB-DE4B-95CE-6DB70DBA9567}" type="datetimeFigureOut">
               <a:rPr lang="en-US" dirty="0"/>
               <a:pPr/>
-              <a:t>11/30/2016</a:t>
+              <a:t>12/5/2016</a:t>
             </a:fld>
             <a:endParaRPr lang="en-US" dirty="0"/>
           </a:p>
@@ -1691,7 +1691,7 @@
             <a:fld id="{B61BEF0D-F0BB-DE4B-95CE-6DB70DBA9567}" type="datetimeFigureOut">
               <a:rPr lang="en-US" dirty="0"/>
               <a:pPr/>
-              <a:t>11/30/2016</a:t>
+              <a:t>12/5/2016</a:t>
             </a:fld>
             <a:endParaRPr lang="en-US" dirty="0"/>
           </a:p>
@@ -2110,7 +2110,7 @@
             <a:fld id="{B61BEF0D-F0BB-DE4B-95CE-6DB70DBA9567}" type="datetimeFigureOut">
               <a:rPr lang="en-US" dirty="0"/>
               <a:pPr/>
-              <a:t>11/30/2016</a:t>
+              <a:t>12/5/2016</a:t>
             </a:fld>
             <a:endParaRPr lang="en-US" dirty="0"/>
           </a:p>
@@ -2269,7 +2269,7 @@
             <a:fld id="{B61BEF0D-F0BB-DE4B-95CE-6DB70DBA9567}" type="datetimeFigureOut">
               <a:rPr lang="en-US" dirty="0"/>
               <a:pPr/>
-              <a:t>11/30/2016</a:t>
+              <a:t>12/5/2016</a:t>
             </a:fld>
             <a:endParaRPr lang="en-US" dirty="0"/>
           </a:p>
@@ -2361,7 +2361,7 @@
             <a:fld id="{B61BEF0D-F0BB-DE4B-95CE-6DB70DBA9567}" type="datetimeFigureOut">
               <a:rPr lang="en-US" dirty="0"/>
               <a:pPr/>
-              <a:t>11/30/2016</a:t>
+              <a:t>12/5/2016</a:t>
             </a:fld>
             <a:endParaRPr lang="en-US" dirty="0"/>
           </a:p>
@@ -2736,7 +2736,7 @@
             <a:fld id="{B61BEF0D-F0BB-DE4B-95CE-6DB70DBA9567}" type="datetimeFigureOut">
               <a:rPr lang="en-US" dirty="0"/>
               <a:pPr/>
-              <a:t>11/30/2016</a:t>
+              <a:t>12/5/2016</a:t>
             </a:fld>
             <a:endParaRPr lang="en-US" dirty="0"/>
           </a:p>
@@ -3022,7 +3022,7 @@
             <a:fld id="{B61BEF0D-F0BB-DE4B-95CE-6DB70DBA9567}" type="datetimeFigureOut">
               <a:rPr lang="en-US" dirty="0"/>
               <a:pPr/>
-              <a:t>11/30/2016</a:t>
+              <a:t>12/5/2016</a:t>
             </a:fld>
             <a:endParaRPr lang="en-US" dirty="0"/>
           </a:p>
@@ -3230,7 +3230,7 @@
             <a:fld id="{B61BEF0D-F0BB-DE4B-95CE-6DB70DBA9567}" type="datetimeFigureOut">
               <a:rPr lang="en-US" dirty="0"/>
               <a:pPr/>
-              <a:t>11/30/2016</a:t>
+              <a:t>12/5/2016</a:t>
             </a:fld>
             <a:endParaRPr lang="en-US" dirty="0"/>
           </a:p>
@@ -3916,29 +3916,1153 @@
           <a:bodyPr/>
           <a:lstStyle/>
           <a:p>
-            <a:endParaRPr lang="en-US"/>
-          </a:p>
-        </p:txBody>
-      </p:sp>
-      <p:sp>
-        <p:nvSpPr>
-          <p:cNvPr id="3" name="Content Placeholder 2"/>
-          <p:cNvSpPr>
-            <a:spLocks noGrp="1"/>
-          </p:cNvSpPr>
+            <a:r>
+              <a:rPr lang="en-US" dirty="0"/>
+              <a:t>SQL Server Editions</a:t>
+            </a:r>
+          </a:p>
+        </p:txBody>
+      </p:sp>
+      <p:graphicFrame>
+        <p:nvGraphicFramePr>
+          <p:cNvPr id="4" name="Content Placeholder 3"/>
+          <p:cNvGraphicFramePr>
+            <a:graphicFrameLocks noGrp="1"/>
+          </p:cNvGraphicFramePr>
           <p:nvPr>
             <p:ph idx="1"/>
-          </p:nvPr>
-        </p:nvSpPr>
-        <p:spPr/>
-        <p:txBody>
-          <a:bodyPr/>
-          <a:lstStyle/>
-          <a:p>
-            <a:endParaRPr lang="en-US"/>
-          </a:p>
-        </p:txBody>
-      </p:sp>
+            <p:extLst>
+              <p:ext uri="{D42A27DB-BD31-4B8C-83A1-F6EECF244321}">
+                <p14:modId xmlns:p14="http://schemas.microsoft.com/office/powerpoint/2010/main" val="606953468"/>
+              </p:ext>
+            </p:extLst>
+          </p:nvPr>
+        </p:nvGraphicFramePr>
+        <p:xfrm>
+          <a:off x="581025" y="2091798"/>
+          <a:ext cx="11029950" cy="4053840"/>
+        </p:xfrm>
+        <a:graphic>
+          <a:graphicData uri="http://schemas.openxmlformats.org/drawingml/2006/table">
+            <a:tbl>
+              <a:tblPr firstRow="1" bandRow="1">
+                <a:tableStyleId>{5C22544A-7EE6-4342-B048-85BDC9FD1C3A}</a:tableStyleId>
+              </a:tblPr>
+              <a:tblGrid>
+                <a:gridCol w="1838325">
+                  <a:extLst>
+                    <a:ext uri="{9D8B030D-6E8A-4147-A177-3AD203B41FA5}">
+                      <a16:colId xmlns:a16="http://schemas.microsoft.com/office/drawing/2014/main" val="362256521"/>
+                    </a:ext>
+                  </a:extLst>
+                </a:gridCol>
+                <a:gridCol w="1838325">
+                  <a:extLst>
+                    <a:ext uri="{9D8B030D-6E8A-4147-A177-3AD203B41FA5}">
+                      <a16:colId xmlns:a16="http://schemas.microsoft.com/office/drawing/2014/main" val="2173825471"/>
+                    </a:ext>
+                  </a:extLst>
+                </a:gridCol>
+                <a:gridCol w="1838325">
+                  <a:extLst>
+                    <a:ext uri="{9D8B030D-6E8A-4147-A177-3AD203B41FA5}">
+                      <a16:colId xmlns:a16="http://schemas.microsoft.com/office/drawing/2014/main" val="2530102799"/>
+                    </a:ext>
+                  </a:extLst>
+                </a:gridCol>
+                <a:gridCol w="1838325">
+                  <a:extLst>
+                    <a:ext uri="{9D8B030D-6E8A-4147-A177-3AD203B41FA5}">
+                      <a16:colId xmlns:a16="http://schemas.microsoft.com/office/drawing/2014/main" val="1054052598"/>
+                    </a:ext>
+                  </a:extLst>
+                </a:gridCol>
+                <a:gridCol w="1838325">
+                  <a:extLst>
+                    <a:ext uri="{9D8B030D-6E8A-4147-A177-3AD203B41FA5}">
+                      <a16:colId xmlns:a16="http://schemas.microsoft.com/office/drawing/2014/main" val="1226492368"/>
+                    </a:ext>
+                  </a:extLst>
+                </a:gridCol>
+                <a:gridCol w="1838325">
+                  <a:extLst>
+                    <a:ext uri="{9D8B030D-6E8A-4147-A177-3AD203B41FA5}">
+                      <a16:colId xmlns:a16="http://schemas.microsoft.com/office/drawing/2014/main" val="1027077560"/>
+                    </a:ext>
+                  </a:extLst>
+                </a:gridCol>
+              </a:tblGrid>
+              <a:tr h="370840">
+                <a:tc>
+                  <a:txBody>
+                    <a:bodyPr/>
+                    <a:lstStyle/>
+                    <a:p>
+                      <a:r>
+                        <a:rPr lang="en-US" dirty="0"/>
+                        <a:t>SQL2005</a:t>
+                      </a:r>
+                    </a:p>
+                  </a:txBody>
+                  <a:tcPr/>
+                </a:tc>
+                <a:tc>
+                  <a:txBody>
+                    <a:bodyPr/>
+                    <a:lstStyle/>
+                    <a:p>
+                      <a:r>
+                        <a:rPr lang="en-US" dirty="0"/>
+                        <a:t>SQL2008</a:t>
+                      </a:r>
+                    </a:p>
+                  </a:txBody>
+                  <a:tcPr/>
+                </a:tc>
+                <a:tc>
+                  <a:txBody>
+                    <a:bodyPr/>
+                    <a:lstStyle/>
+                    <a:p>
+                      <a:r>
+                        <a:rPr lang="en-US" dirty="0"/>
+                        <a:t>SQL2008R2</a:t>
+                      </a:r>
+                    </a:p>
+                  </a:txBody>
+                  <a:tcPr/>
+                </a:tc>
+                <a:tc>
+                  <a:txBody>
+                    <a:bodyPr/>
+                    <a:lstStyle/>
+                    <a:p>
+                      <a:r>
+                        <a:rPr lang="en-US" dirty="0"/>
+                        <a:t>SQL2012</a:t>
+                      </a:r>
+                    </a:p>
+                  </a:txBody>
+                  <a:tcPr/>
+                </a:tc>
+                <a:tc>
+                  <a:txBody>
+                    <a:bodyPr/>
+                    <a:lstStyle/>
+                    <a:p>
+                      <a:r>
+                        <a:rPr lang="en-US" dirty="0"/>
+                        <a:t>SQL2014</a:t>
+                      </a:r>
+                    </a:p>
+                  </a:txBody>
+                  <a:tcPr/>
+                </a:tc>
+                <a:tc>
+                  <a:txBody>
+                    <a:bodyPr/>
+                    <a:lstStyle/>
+                    <a:p>
+                      <a:r>
+                        <a:rPr lang="en-US" dirty="0"/>
+                        <a:t>SQL2016</a:t>
+                      </a:r>
+                    </a:p>
+                  </a:txBody>
+                  <a:tcPr/>
+                </a:tc>
+                <a:extLst>
+                  <a:ext uri="{0D108BD9-81ED-4DB2-BD59-A6C34878D82A}">
+                    <a16:rowId xmlns:a16="http://schemas.microsoft.com/office/drawing/2014/main" val="2719274123"/>
+                  </a:ext>
+                </a:extLst>
+              </a:tr>
+              <a:tr h="370840">
+                <a:tc gridSpan="6">
+                  <a:txBody>
+                    <a:bodyPr/>
+                    <a:lstStyle/>
+                    <a:p>
+                      <a:pPr algn="ctr"/>
+                      <a:r>
+                        <a:rPr lang="en-US" dirty="0"/>
+                        <a:t>Enterprise</a:t>
+                      </a:r>
+                    </a:p>
+                  </a:txBody>
+                  <a:tcPr>
+                    <a:solidFill>
+                      <a:schemeClr val="accent5"/>
+                    </a:solidFill>
+                  </a:tcPr>
+                </a:tc>
+                <a:tc hMerge="1">
+                  <a:txBody>
+                    <a:bodyPr/>
+                    <a:lstStyle/>
+                    <a:p>
+                      <a:endParaRPr lang="en-US" dirty="0"/>
+                    </a:p>
+                  </a:txBody>
+                  <a:tcPr/>
+                </a:tc>
+                <a:tc hMerge="1">
+                  <a:txBody>
+                    <a:bodyPr/>
+                    <a:lstStyle/>
+                    <a:p>
+                      <a:endParaRPr lang="en-US" dirty="0"/>
+                    </a:p>
+                  </a:txBody>
+                  <a:tcPr/>
+                </a:tc>
+                <a:tc hMerge="1">
+                  <a:txBody>
+                    <a:bodyPr/>
+                    <a:lstStyle/>
+                    <a:p>
+                      <a:endParaRPr lang="en-US" dirty="0"/>
+                    </a:p>
+                  </a:txBody>
+                  <a:tcPr/>
+                </a:tc>
+                <a:tc hMerge="1">
+                  <a:txBody>
+                    <a:bodyPr/>
+                    <a:lstStyle/>
+                    <a:p>
+                      <a:endParaRPr lang="en-US" dirty="0"/>
+                    </a:p>
+                  </a:txBody>
+                  <a:tcPr/>
+                </a:tc>
+                <a:tc hMerge="1">
+                  <a:txBody>
+                    <a:bodyPr/>
+                    <a:lstStyle/>
+                    <a:p>
+                      <a:endParaRPr lang="en-US" dirty="0"/>
+                    </a:p>
+                  </a:txBody>
+                  <a:tcPr/>
+                </a:tc>
+                <a:extLst>
+                  <a:ext uri="{0D108BD9-81ED-4DB2-BD59-A6C34878D82A}">
+                    <a16:rowId xmlns:a16="http://schemas.microsoft.com/office/drawing/2014/main" val="3966806900"/>
+                  </a:ext>
+                </a:extLst>
+              </a:tr>
+              <a:tr h="365760">
+                <a:tc gridSpan="6">
+                  <a:txBody>
+                    <a:bodyPr/>
+                    <a:lstStyle/>
+                    <a:p>
+                      <a:pPr marL="0" marR="0" lvl="0" indent="0" algn="ctr" defTabSz="457200" rtl="0" eaLnBrk="1" fontAlgn="auto" latinLnBrk="0" hangingPunct="1">
+                        <a:lnSpc>
+                          <a:spcPct val="100000"/>
+                        </a:lnSpc>
+                        <a:spcBef>
+                          <a:spcPts val="0"/>
+                        </a:spcBef>
+                        <a:spcAft>
+                          <a:spcPts val="0"/>
+                        </a:spcAft>
+                        <a:buClrTx/>
+                        <a:buSzTx/>
+                        <a:buFontTx/>
+                        <a:buNone/>
+                        <a:tabLst/>
+                        <a:defRPr/>
+                      </a:pPr>
+                      <a:r>
+                        <a:rPr kumimoji="0" lang="en-US" sz="1800" b="0" i="0" u="none" strike="noStrike" kern="1200" cap="none" spc="0" normalizeH="0" baseline="0" noProof="0" dirty="0">
+                          <a:ln>
+                            <a:noFill/>
+                          </a:ln>
+                          <a:solidFill>
+                            <a:prstClr val="black"/>
+                          </a:solidFill>
+                          <a:effectLst/>
+                          <a:uLnTx/>
+                          <a:uFillTx/>
+                          <a:latin typeface="Gill Sans MT" panose="020B0502020104020203"/>
+                          <a:ea typeface="+mn-ea"/>
+                          <a:cs typeface="+mn-cs"/>
+                        </a:rPr>
+                        <a:t>Developer</a:t>
+                      </a:r>
+                    </a:p>
+                  </a:txBody>
+                  <a:tcPr>
+                    <a:solidFill>
+                      <a:schemeClr val="accent5"/>
+                    </a:solidFill>
+                  </a:tcPr>
+                </a:tc>
+                <a:tc hMerge="1">
+                  <a:txBody>
+                    <a:bodyPr/>
+                    <a:lstStyle/>
+                    <a:p>
+                      <a:pPr marL="0" marR="0" lvl="0" indent="0" algn="ctr" defTabSz="457200" rtl="0" eaLnBrk="1" fontAlgn="auto" latinLnBrk="0" hangingPunct="1">
+                        <a:lnSpc>
+                          <a:spcPct val="100000"/>
+                        </a:lnSpc>
+                        <a:spcBef>
+                          <a:spcPts val="0"/>
+                        </a:spcBef>
+                        <a:spcAft>
+                          <a:spcPts val="0"/>
+                        </a:spcAft>
+                        <a:buClrTx/>
+                        <a:buSzTx/>
+                        <a:buFontTx/>
+                        <a:buNone/>
+                        <a:tabLst/>
+                        <a:defRPr/>
+                      </a:pPr>
+                      <a:endParaRPr kumimoji="0" lang="en-US" sz="1800" b="0" i="0" u="none" strike="noStrike" kern="1200" cap="none" spc="0" normalizeH="0" baseline="0" noProof="0" dirty="0">
+                        <a:ln>
+                          <a:noFill/>
+                        </a:ln>
+                        <a:solidFill>
+                          <a:prstClr val="black"/>
+                        </a:solidFill>
+                        <a:effectLst/>
+                        <a:uLnTx/>
+                        <a:uFillTx/>
+                        <a:latin typeface="Gill Sans MT" panose="020B0502020104020203"/>
+                        <a:ea typeface="+mn-ea"/>
+                        <a:cs typeface="+mn-cs"/>
+                      </a:endParaRPr>
+                    </a:p>
+                  </a:txBody>
+                  <a:tcPr/>
+                </a:tc>
+                <a:tc hMerge="1">
+                  <a:txBody>
+                    <a:bodyPr/>
+                    <a:lstStyle/>
+                    <a:p>
+                      <a:pPr marL="0" marR="0" lvl="0" indent="0" algn="ctr" defTabSz="457200" rtl="0" eaLnBrk="1" fontAlgn="auto" latinLnBrk="0" hangingPunct="1">
+                        <a:lnSpc>
+                          <a:spcPct val="100000"/>
+                        </a:lnSpc>
+                        <a:spcBef>
+                          <a:spcPts val="0"/>
+                        </a:spcBef>
+                        <a:spcAft>
+                          <a:spcPts val="0"/>
+                        </a:spcAft>
+                        <a:buClrTx/>
+                        <a:buSzTx/>
+                        <a:buFontTx/>
+                        <a:buNone/>
+                        <a:tabLst/>
+                        <a:defRPr/>
+                      </a:pPr>
+                      <a:endParaRPr kumimoji="0" lang="en-US" sz="1800" b="0" i="0" u="none" strike="noStrike" kern="1200" cap="none" spc="0" normalizeH="0" baseline="0" noProof="0" dirty="0">
+                        <a:ln>
+                          <a:noFill/>
+                        </a:ln>
+                        <a:solidFill>
+                          <a:prstClr val="black"/>
+                        </a:solidFill>
+                        <a:effectLst/>
+                        <a:uLnTx/>
+                        <a:uFillTx/>
+                        <a:latin typeface="Gill Sans MT" panose="020B0502020104020203"/>
+                        <a:ea typeface="+mn-ea"/>
+                        <a:cs typeface="+mn-cs"/>
+                      </a:endParaRPr>
+                    </a:p>
+                  </a:txBody>
+                  <a:tcPr>
+                    <a:solidFill>
+                      <a:schemeClr val="accent5"/>
+                    </a:solidFill>
+                  </a:tcPr>
+                </a:tc>
+                <a:tc hMerge="1">
+                  <a:txBody>
+                    <a:bodyPr/>
+                    <a:lstStyle/>
+                    <a:p>
+                      <a:pPr marL="0" marR="0" lvl="0" indent="0" algn="ctr" defTabSz="457200" rtl="0" eaLnBrk="1" fontAlgn="auto" latinLnBrk="0" hangingPunct="1">
+                        <a:lnSpc>
+                          <a:spcPct val="100000"/>
+                        </a:lnSpc>
+                        <a:spcBef>
+                          <a:spcPts val="0"/>
+                        </a:spcBef>
+                        <a:spcAft>
+                          <a:spcPts val="0"/>
+                        </a:spcAft>
+                        <a:buClrTx/>
+                        <a:buSzTx/>
+                        <a:buFontTx/>
+                        <a:buNone/>
+                        <a:tabLst/>
+                        <a:defRPr/>
+                      </a:pPr>
+                      <a:endParaRPr kumimoji="0" lang="en-US" sz="1800" b="0" i="0" u="none" strike="noStrike" kern="1200" cap="none" spc="0" normalizeH="0" baseline="0" noProof="0" dirty="0">
+                        <a:ln>
+                          <a:noFill/>
+                        </a:ln>
+                        <a:solidFill>
+                          <a:prstClr val="black"/>
+                        </a:solidFill>
+                        <a:effectLst/>
+                        <a:uLnTx/>
+                        <a:uFillTx/>
+                        <a:latin typeface="Gill Sans MT" panose="020B0502020104020203"/>
+                        <a:ea typeface="+mn-ea"/>
+                        <a:cs typeface="+mn-cs"/>
+                      </a:endParaRPr>
+                    </a:p>
+                  </a:txBody>
+                  <a:tcPr/>
+                </a:tc>
+                <a:tc hMerge="1">
+                  <a:txBody>
+                    <a:bodyPr/>
+                    <a:lstStyle/>
+                    <a:p>
+                      <a:pPr marL="0" marR="0" lvl="0" indent="0" algn="ctr" defTabSz="457200" rtl="0" eaLnBrk="1" fontAlgn="auto" latinLnBrk="0" hangingPunct="1">
+                        <a:lnSpc>
+                          <a:spcPct val="100000"/>
+                        </a:lnSpc>
+                        <a:spcBef>
+                          <a:spcPts val="0"/>
+                        </a:spcBef>
+                        <a:spcAft>
+                          <a:spcPts val="0"/>
+                        </a:spcAft>
+                        <a:buClrTx/>
+                        <a:buSzTx/>
+                        <a:buFontTx/>
+                        <a:buNone/>
+                        <a:tabLst/>
+                        <a:defRPr/>
+                      </a:pPr>
+                      <a:endParaRPr kumimoji="0" lang="en-US" sz="1800" b="0" i="0" u="none" strike="noStrike" kern="1200" cap="none" spc="0" normalizeH="0" baseline="0" noProof="0" dirty="0">
+                        <a:ln>
+                          <a:noFill/>
+                        </a:ln>
+                        <a:solidFill>
+                          <a:prstClr val="black"/>
+                        </a:solidFill>
+                        <a:effectLst/>
+                        <a:uLnTx/>
+                        <a:uFillTx/>
+                        <a:latin typeface="Gill Sans MT" panose="020B0502020104020203"/>
+                        <a:ea typeface="+mn-ea"/>
+                        <a:cs typeface="+mn-cs"/>
+                      </a:endParaRPr>
+                    </a:p>
+                  </a:txBody>
+                  <a:tcPr/>
+                </a:tc>
+                <a:tc hMerge="1">
+                  <a:txBody>
+                    <a:bodyPr/>
+                    <a:lstStyle/>
+                    <a:p>
+                      <a:pPr marL="0" marR="0" lvl="0" indent="0" algn="ctr" defTabSz="457200" rtl="0" eaLnBrk="1" fontAlgn="auto" latinLnBrk="0" hangingPunct="1">
+                        <a:lnSpc>
+                          <a:spcPct val="100000"/>
+                        </a:lnSpc>
+                        <a:spcBef>
+                          <a:spcPts val="0"/>
+                        </a:spcBef>
+                        <a:spcAft>
+                          <a:spcPts val="0"/>
+                        </a:spcAft>
+                        <a:buClrTx/>
+                        <a:buSzTx/>
+                        <a:buFontTx/>
+                        <a:buNone/>
+                        <a:tabLst/>
+                        <a:defRPr/>
+                      </a:pPr>
+                      <a:endParaRPr kumimoji="0" lang="en-US" sz="1800" b="0" i="0" u="none" strike="noStrike" kern="1200" cap="none" spc="0" normalizeH="0" baseline="0" noProof="0" dirty="0">
+                        <a:ln>
+                          <a:noFill/>
+                        </a:ln>
+                        <a:solidFill>
+                          <a:prstClr val="black"/>
+                        </a:solidFill>
+                        <a:effectLst/>
+                        <a:uLnTx/>
+                        <a:uFillTx/>
+                        <a:latin typeface="Gill Sans MT" panose="020B0502020104020203"/>
+                        <a:ea typeface="+mn-ea"/>
+                        <a:cs typeface="+mn-cs"/>
+                      </a:endParaRPr>
+                    </a:p>
+                  </a:txBody>
+                  <a:tcPr/>
+                </a:tc>
+                <a:extLst>
+                  <a:ext uri="{0D108BD9-81ED-4DB2-BD59-A6C34878D82A}">
+                    <a16:rowId xmlns:a16="http://schemas.microsoft.com/office/drawing/2014/main" val="3891357565"/>
+                  </a:ext>
+                </a:extLst>
+              </a:tr>
+              <a:tr h="365760">
+                <a:tc>
+                  <a:txBody>
+                    <a:bodyPr/>
+                    <a:lstStyle/>
+                    <a:p>
+                      <a:endParaRPr lang="en-US" dirty="0"/>
+                    </a:p>
+                  </a:txBody>
+                  <a:tcPr/>
+                </a:tc>
+                <a:tc>
+                  <a:txBody>
+                    <a:bodyPr/>
+                    <a:lstStyle/>
+                    <a:p>
+                      <a:endParaRPr lang="en-US" dirty="0"/>
+                    </a:p>
+                  </a:txBody>
+                  <a:tcPr/>
+                </a:tc>
+                <a:tc>
+                  <a:txBody>
+                    <a:bodyPr/>
+                    <a:lstStyle/>
+                    <a:p>
+                      <a:pPr algn="ctr"/>
+                      <a:r>
+                        <a:rPr lang="en-US" dirty="0"/>
+                        <a:t>Datacenter</a:t>
+                      </a:r>
+                    </a:p>
+                  </a:txBody>
+                  <a:tcPr>
+                    <a:solidFill>
+                      <a:schemeClr val="accent5"/>
+                    </a:solidFill>
+                  </a:tcPr>
+                </a:tc>
+                <a:tc>
+                  <a:txBody>
+                    <a:bodyPr/>
+                    <a:lstStyle/>
+                    <a:p>
+                      <a:endParaRPr lang="en-US" dirty="0"/>
+                    </a:p>
+                  </a:txBody>
+                  <a:tcPr/>
+                </a:tc>
+                <a:tc>
+                  <a:txBody>
+                    <a:bodyPr/>
+                    <a:lstStyle/>
+                    <a:p>
+                      <a:endParaRPr lang="en-US" dirty="0"/>
+                    </a:p>
+                  </a:txBody>
+                  <a:tcPr/>
+                </a:tc>
+                <a:tc>
+                  <a:txBody>
+                    <a:bodyPr/>
+                    <a:lstStyle/>
+                    <a:p>
+                      <a:endParaRPr lang="en-US" dirty="0"/>
+                    </a:p>
+                  </a:txBody>
+                  <a:tcPr/>
+                </a:tc>
+                <a:extLst>
+                  <a:ext uri="{0D108BD9-81ED-4DB2-BD59-A6C34878D82A}">
+                    <a16:rowId xmlns:a16="http://schemas.microsoft.com/office/drawing/2014/main" val="3667614759"/>
+                  </a:ext>
+                </a:extLst>
+              </a:tr>
+              <a:tr h="365760">
+                <a:tc>
+                  <a:txBody>
+                    <a:bodyPr/>
+                    <a:lstStyle/>
+                    <a:p>
+                      <a:pPr algn="ctr"/>
+                      <a:endParaRPr lang="en-US" dirty="0"/>
+                    </a:p>
+                  </a:txBody>
+                  <a:tcPr/>
+                </a:tc>
+                <a:tc>
+                  <a:txBody>
+                    <a:bodyPr/>
+                    <a:lstStyle/>
+                    <a:p>
+                      <a:pPr algn="ctr"/>
+                      <a:endParaRPr lang="en-US" dirty="0"/>
+                    </a:p>
+                  </a:txBody>
+                  <a:tcPr/>
+                </a:tc>
+                <a:tc>
+                  <a:txBody>
+                    <a:bodyPr/>
+                    <a:lstStyle/>
+                    <a:p>
+                      <a:pPr algn="ctr"/>
+                      <a:endParaRPr lang="en-US" dirty="0"/>
+                    </a:p>
+                  </a:txBody>
+                  <a:tcPr/>
+                </a:tc>
+                <a:tc gridSpan="2">
+                  <a:txBody>
+                    <a:bodyPr/>
+                    <a:lstStyle/>
+                    <a:p>
+                      <a:pPr algn="ctr"/>
+                      <a:r>
+                        <a:rPr lang="en-US" dirty="0"/>
+                        <a:t>Business</a:t>
+                      </a:r>
+                      <a:r>
+                        <a:rPr lang="en-US" baseline="0" dirty="0"/>
+                        <a:t> Intelligence</a:t>
+                      </a:r>
+                      <a:endParaRPr lang="en-US" dirty="0"/>
+                    </a:p>
+                  </a:txBody>
+                  <a:tcPr>
+                    <a:solidFill>
+                      <a:schemeClr val="accent5"/>
+                    </a:solidFill>
+                  </a:tcPr>
+                </a:tc>
+                <a:tc hMerge="1">
+                  <a:txBody>
+                    <a:bodyPr/>
+                    <a:lstStyle/>
+                    <a:p>
+                      <a:pPr algn="ctr"/>
+                      <a:endParaRPr lang="en-US" dirty="0"/>
+                    </a:p>
+                  </a:txBody>
+                  <a:tcPr/>
+                </a:tc>
+                <a:tc>
+                  <a:txBody>
+                    <a:bodyPr/>
+                    <a:lstStyle/>
+                    <a:p>
+                      <a:pPr algn="ctr"/>
+                      <a:endParaRPr lang="en-US" dirty="0"/>
+                    </a:p>
+                  </a:txBody>
+                  <a:tcPr/>
+                </a:tc>
+                <a:extLst>
+                  <a:ext uri="{0D108BD9-81ED-4DB2-BD59-A6C34878D82A}">
+                    <a16:rowId xmlns:a16="http://schemas.microsoft.com/office/drawing/2014/main" val="3893362135"/>
+                  </a:ext>
+                </a:extLst>
+              </a:tr>
+              <a:tr h="370840">
+                <a:tc gridSpan="6">
+                  <a:txBody>
+                    <a:bodyPr/>
+                    <a:lstStyle/>
+                    <a:p>
+                      <a:pPr algn="ctr"/>
+                      <a:r>
+                        <a:rPr lang="en-US" dirty="0"/>
+                        <a:t>Standard</a:t>
+                      </a:r>
+                    </a:p>
+                  </a:txBody>
+                  <a:tcPr>
+                    <a:solidFill>
+                      <a:schemeClr val="accent5"/>
+                    </a:solidFill>
+                  </a:tcPr>
+                </a:tc>
+                <a:tc hMerge="1">
+                  <a:txBody>
+                    <a:bodyPr/>
+                    <a:lstStyle/>
+                    <a:p>
+                      <a:pPr algn="ctr"/>
+                      <a:endParaRPr lang="en-US" dirty="0"/>
+                    </a:p>
+                  </a:txBody>
+                  <a:tcPr/>
+                </a:tc>
+                <a:tc hMerge="1">
+                  <a:txBody>
+                    <a:bodyPr/>
+                    <a:lstStyle/>
+                    <a:p>
+                      <a:pPr algn="ctr"/>
+                      <a:endParaRPr lang="en-US" dirty="0"/>
+                    </a:p>
+                  </a:txBody>
+                  <a:tcPr/>
+                </a:tc>
+                <a:tc hMerge="1">
+                  <a:txBody>
+                    <a:bodyPr/>
+                    <a:lstStyle/>
+                    <a:p>
+                      <a:pPr algn="ctr"/>
+                      <a:endParaRPr lang="en-US" dirty="0"/>
+                    </a:p>
+                  </a:txBody>
+                  <a:tcPr/>
+                </a:tc>
+                <a:tc hMerge="1">
+                  <a:txBody>
+                    <a:bodyPr/>
+                    <a:lstStyle/>
+                    <a:p>
+                      <a:pPr algn="ctr"/>
+                      <a:endParaRPr lang="en-US" dirty="0"/>
+                    </a:p>
+                  </a:txBody>
+                  <a:tcPr/>
+                </a:tc>
+                <a:tc hMerge="1">
+                  <a:txBody>
+                    <a:bodyPr/>
+                    <a:lstStyle/>
+                    <a:p>
+                      <a:pPr algn="ctr"/>
+                      <a:endParaRPr lang="en-US" dirty="0"/>
+                    </a:p>
+                  </a:txBody>
+                  <a:tcPr/>
+                </a:tc>
+                <a:extLst>
+                  <a:ext uri="{0D108BD9-81ED-4DB2-BD59-A6C34878D82A}">
+                    <a16:rowId xmlns:a16="http://schemas.microsoft.com/office/drawing/2014/main" val="2477240990"/>
+                  </a:ext>
+                </a:extLst>
+              </a:tr>
+              <a:tr h="370840">
+                <a:tc gridSpan="3">
+                  <a:txBody>
+                    <a:bodyPr/>
+                    <a:lstStyle/>
+                    <a:p>
+                      <a:pPr algn="ctr"/>
+                      <a:r>
+                        <a:rPr lang="en-US" dirty="0"/>
+                        <a:t>Workgroup</a:t>
+                      </a:r>
+                    </a:p>
+                  </a:txBody>
+                  <a:tcPr>
+                    <a:solidFill>
+                      <a:schemeClr val="accent5"/>
+                    </a:solidFill>
+                  </a:tcPr>
+                </a:tc>
+                <a:tc hMerge="1">
+                  <a:txBody>
+                    <a:bodyPr/>
+                    <a:lstStyle/>
+                    <a:p>
+                      <a:pPr algn="ctr"/>
+                      <a:endParaRPr lang="en-US" dirty="0"/>
+                    </a:p>
+                  </a:txBody>
+                  <a:tcPr/>
+                </a:tc>
+                <a:tc hMerge="1">
+                  <a:txBody>
+                    <a:bodyPr/>
+                    <a:lstStyle/>
+                    <a:p>
+                      <a:pPr algn="ctr"/>
+                      <a:endParaRPr lang="en-US" dirty="0"/>
+                    </a:p>
+                  </a:txBody>
+                  <a:tcPr/>
+                </a:tc>
+                <a:tc>
+                  <a:txBody>
+                    <a:bodyPr/>
+                    <a:lstStyle/>
+                    <a:p>
+                      <a:pPr algn="ctr"/>
+                      <a:endParaRPr lang="en-US" dirty="0"/>
+                    </a:p>
+                  </a:txBody>
+                  <a:tcPr/>
+                </a:tc>
+                <a:tc>
+                  <a:txBody>
+                    <a:bodyPr/>
+                    <a:lstStyle/>
+                    <a:p>
+                      <a:pPr algn="ctr"/>
+                      <a:endParaRPr lang="en-US" dirty="0"/>
+                    </a:p>
+                  </a:txBody>
+                  <a:tcPr/>
+                </a:tc>
+                <a:tc>
+                  <a:txBody>
+                    <a:bodyPr/>
+                    <a:lstStyle/>
+                    <a:p>
+                      <a:pPr algn="ctr"/>
+                      <a:endParaRPr lang="en-US" dirty="0"/>
+                    </a:p>
+                  </a:txBody>
+                  <a:tcPr/>
+                </a:tc>
+                <a:extLst>
+                  <a:ext uri="{0D108BD9-81ED-4DB2-BD59-A6C34878D82A}">
+                    <a16:rowId xmlns:a16="http://schemas.microsoft.com/office/drawing/2014/main" val="393257439"/>
+                  </a:ext>
+                </a:extLst>
+              </a:tr>
+              <a:tr h="370840">
+                <a:tc>
+                  <a:txBody>
+                    <a:bodyPr/>
+                    <a:lstStyle/>
+                    <a:p>
+                      <a:pPr algn="ctr"/>
+                      <a:endParaRPr lang="en-US" dirty="0"/>
+                    </a:p>
+                  </a:txBody>
+                  <a:tcPr/>
+                </a:tc>
+                <a:tc gridSpan="5">
+                  <a:txBody>
+                    <a:bodyPr/>
+                    <a:lstStyle/>
+                    <a:p>
+                      <a:pPr algn="ctr"/>
+                      <a:r>
+                        <a:rPr lang="en-US" dirty="0"/>
+                        <a:t>Web</a:t>
+                      </a:r>
+                    </a:p>
+                  </a:txBody>
+                  <a:tcPr>
+                    <a:solidFill>
+                      <a:schemeClr val="accent5"/>
+                    </a:solidFill>
+                  </a:tcPr>
+                </a:tc>
+                <a:tc hMerge="1">
+                  <a:txBody>
+                    <a:bodyPr/>
+                    <a:lstStyle/>
+                    <a:p>
+                      <a:pPr algn="ctr"/>
+                      <a:endParaRPr lang="en-US" dirty="0"/>
+                    </a:p>
+                  </a:txBody>
+                  <a:tcPr/>
+                </a:tc>
+                <a:tc hMerge="1">
+                  <a:txBody>
+                    <a:bodyPr/>
+                    <a:lstStyle/>
+                    <a:p>
+                      <a:pPr algn="ctr"/>
+                      <a:endParaRPr lang="en-US" dirty="0"/>
+                    </a:p>
+                  </a:txBody>
+                  <a:tcPr/>
+                </a:tc>
+                <a:tc hMerge="1">
+                  <a:txBody>
+                    <a:bodyPr/>
+                    <a:lstStyle/>
+                    <a:p>
+                      <a:pPr algn="ctr"/>
+                      <a:endParaRPr lang="en-US" dirty="0"/>
+                    </a:p>
+                  </a:txBody>
+                  <a:tcPr/>
+                </a:tc>
+                <a:tc hMerge="1">
+                  <a:txBody>
+                    <a:bodyPr/>
+                    <a:lstStyle/>
+                    <a:p>
+                      <a:pPr algn="ctr"/>
+                      <a:endParaRPr lang="en-US" dirty="0"/>
+                    </a:p>
+                  </a:txBody>
+                  <a:tcPr/>
+                </a:tc>
+                <a:extLst>
+                  <a:ext uri="{0D108BD9-81ED-4DB2-BD59-A6C34878D82A}">
+                    <a16:rowId xmlns:a16="http://schemas.microsoft.com/office/drawing/2014/main" val="2084324802"/>
+                  </a:ext>
+                </a:extLst>
+              </a:tr>
+              <a:tr h="370840">
+                <a:tc gridSpan="6">
+                  <a:txBody>
+                    <a:bodyPr/>
+                    <a:lstStyle/>
+                    <a:p>
+                      <a:pPr algn="ctr"/>
+                      <a:r>
+                        <a:rPr lang="en-US" dirty="0"/>
+                        <a:t>Express with Advanced Services</a:t>
+                      </a:r>
+                    </a:p>
+                  </a:txBody>
+                  <a:tcPr>
+                    <a:solidFill>
+                      <a:schemeClr val="accent5"/>
+                    </a:solidFill>
+                  </a:tcPr>
+                </a:tc>
+                <a:tc hMerge="1">
+                  <a:txBody>
+                    <a:bodyPr/>
+                    <a:lstStyle/>
+                    <a:p>
+                      <a:pPr algn="ctr"/>
+                      <a:endParaRPr lang="en-US" dirty="0"/>
+                    </a:p>
+                  </a:txBody>
+                  <a:tcPr/>
+                </a:tc>
+                <a:tc hMerge="1">
+                  <a:txBody>
+                    <a:bodyPr/>
+                    <a:lstStyle/>
+                    <a:p>
+                      <a:pPr algn="ctr"/>
+                      <a:endParaRPr lang="en-US" dirty="0"/>
+                    </a:p>
+                  </a:txBody>
+                  <a:tcPr/>
+                </a:tc>
+                <a:tc hMerge="1">
+                  <a:txBody>
+                    <a:bodyPr/>
+                    <a:lstStyle/>
+                    <a:p>
+                      <a:pPr algn="ctr"/>
+                      <a:endParaRPr lang="en-US" dirty="0"/>
+                    </a:p>
+                  </a:txBody>
+                  <a:tcPr/>
+                </a:tc>
+                <a:tc hMerge="1">
+                  <a:txBody>
+                    <a:bodyPr/>
+                    <a:lstStyle/>
+                    <a:p>
+                      <a:pPr algn="ctr"/>
+                      <a:endParaRPr lang="en-US" dirty="0"/>
+                    </a:p>
+                  </a:txBody>
+                  <a:tcPr/>
+                </a:tc>
+                <a:tc hMerge="1">
+                  <a:txBody>
+                    <a:bodyPr/>
+                    <a:lstStyle/>
+                    <a:p>
+                      <a:pPr algn="ctr"/>
+                      <a:endParaRPr lang="en-US" dirty="0"/>
+                    </a:p>
+                  </a:txBody>
+                  <a:tcPr/>
+                </a:tc>
+                <a:extLst>
+                  <a:ext uri="{0D108BD9-81ED-4DB2-BD59-A6C34878D82A}">
+                    <a16:rowId xmlns:a16="http://schemas.microsoft.com/office/drawing/2014/main" val="1989487144"/>
+                  </a:ext>
+                </a:extLst>
+              </a:tr>
+              <a:tr h="365760">
+                <a:tc gridSpan="6">
+                  <a:txBody>
+                    <a:bodyPr/>
+                    <a:lstStyle/>
+                    <a:p>
+                      <a:pPr algn="ctr"/>
+                      <a:r>
+                        <a:rPr lang="en-US" dirty="0"/>
+                        <a:t>Express</a:t>
+                      </a:r>
+                    </a:p>
+                  </a:txBody>
+                  <a:tcPr>
+                    <a:solidFill>
+                      <a:schemeClr val="accent5"/>
+                    </a:solidFill>
+                  </a:tcPr>
+                </a:tc>
+                <a:tc hMerge="1">
+                  <a:txBody>
+                    <a:bodyPr/>
+                    <a:lstStyle/>
+                    <a:p>
+                      <a:pPr algn="ctr"/>
+                      <a:endParaRPr lang="en-US" dirty="0"/>
+                    </a:p>
+                  </a:txBody>
+                  <a:tcPr>
+                    <a:solidFill>
+                      <a:srgbClr val="D0CCCD"/>
+                    </a:solidFill>
+                  </a:tcPr>
+                </a:tc>
+                <a:tc hMerge="1">
+                  <a:txBody>
+                    <a:bodyPr/>
+                    <a:lstStyle/>
+                    <a:p>
+                      <a:pPr algn="ctr"/>
+                      <a:endParaRPr lang="en-US" dirty="0"/>
+                    </a:p>
+                  </a:txBody>
+                  <a:tcPr/>
+                </a:tc>
+                <a:tc hMerge="1">
+                  <a:txBody>
+                    <a:bodyPr/>
+                    <a:lstStyle/>
+                    <a:p>
+                      <a:pPr algn="ctr"/>
+                      <a:endParaRPr lang="en-US" dirty="0"/>
+                    </a:p>
+                  </a:txBody>
+                  <a:tcPr/>
+                </a:tc>
+                <a:tc hMerge="1">
+                  <a:txBody>
+                    <a:bodyPr/>
+                    <a:lstStyle/>
+                    <a:p>
+                      <a:pPr algn="ctr"/>
+                      <a:endParaRPr lang="en-US" dirty="0"/>
+                    </a:p>
+                  </a:txBody>
+                  <a:tcPr/>
+                </a:tc>
+                <a:tc hMerge="1">
+                  <a:txBody>
+                    <a:bodyPr/>
+                    <a:lstStyle/>
+                    <a:p>
+                      <a:pPr algn="ctr"/>
+                      <a:endParaRPr lang="en-US" dirty="0"/>
+                    </a:p>
+                  </a:txBody>
+                  <a:tcPr/>
+                </a:tc>
+                <a:extLst>
+                  <a:ext uri="{0D108BD9-81ED-4DB2-BD59-A6C34878D82A}">
+                    <a16:rowId xmlns:a16="http://schemas.microsoft.com/office/drawing/2014/main" val="2438885682"/>
+                  </a:ext>
+                </a:extLst>
+              </a:tr>
+              <a:tr h="365760">
+                <a:tc>
+                  <a:txBody>
+                    <a:bodyPr/>
+                    <a:lstStyle/>
+                    <a:p>
+                      <a:pPr algn="ctr"/>
+                      <a:endParaRPr lang="en-US" dirty="0"/>
+                    </a:p>
+                  </a:txBody>
+                  <a:tcPr>
+                    <a:solidFill>
+                      <a:srgbClr val="E9E7E8"/>
+                    </a:solidFill>
+                  </a:tcPr>
+                </a:tc>
+                <a:tc>
+                  <a:txBody>
+                    <a:bodyPr/>
+                    <a:lstStyle/>
+                    <a:p>
+                      <a:pPr algn="ctr"/>
+                      <a:endParaRPr lang="en-US" dirty="0"/>
+                    </a:p>
+                  </a:txBody>
+                  <a:tcPr/>
+                </a:tc>
+                <a:tc>
+                  <a:txBody>
+                    <a:bodyPr/>
+                    <a:lstStyle/>
+                    <a:p>
+                      <a:pPr algn="ctr"/>
+                      <a:endParaRPr lang="en-US" dirty="0"/>
+                    </a:p>
+                  </a:txBody>
+                  <a:tcPr/>
+                </a:tc>
+                <a:tc>
+                  <a:txBody>
+                    <a:bodyPr/>
+                    <a:lstStyle/>
+                    <a:p>
+                      <a:pPr algn="ctr"/>
+                      <a:endParaRPr lang="en-US" dirty="0"/>
+                    </a:p>
+                  </a:txBody>
+                  <a:tcPr/>
+                </a:tc>
+                <a:tc gridSpan="2">
+                  <a:txBody>
+                    <a:bodyPr/>
+                    <a:lstStyle/>
+                    <a:p>
+                      <a:pPr algn="ctr"/>
+                      <a:r>
+                        <a:rPr lang="en-US" dirty="0" err="1"/>
+                        <a:t>LocalDB</a:t>
+                      </a:r>
+                      <a:endParaRPr lang="en-US" dirty="0"/>
+                    </a:p>
+                  </a:txBody>
+                  <a:tcPr>
+                    <a:solidFill>
+                      <a:schemeClr val="accent5"/>
+                    </a:solidFill>
+                  </a:tcPr>
+                </a:tc>
+                <a:tc hMerge="1">
+                  <a:txBody>
+                    <a:bodyPr/>
+                    <a:lstStyle/>
+                    <a:p>
+                      <a:pPr algn="ctr"/>
+                      <a:endParaRPr lang="en-US" dirty="0"/>
+                    </a:p>
+                  </a:txBody>
+                  <a:tcPr/>
+                </a:tc>
+                <a:extLst>
+                  <a:ext uri="{0D108BD9-81ED-4DB2-BD59-A6C34878D82A}">
+                    <a16:rowId xmlns:a16="http://schemas.microsoft.com/office/drawing/2014/main" val="1281163452"/>
+                  </a:ext>
+                </a:extLst>
+              </a:tr>
+            </a:tbl>
+          </a:graphicData>
+        </a:graphic>
+      </p:graphicFrame>
     </p:spTree>
     <p:extLst>
       <p:ext uri="{BB962C8B-B14F-4D97-AF65-F5344CB8AC3E}">
@@ -4019,13 +5143,7 @@
               <a:rPr lang="en-US">
                 <a:hlinkClick r:id="rId2"/>
               </a:rPr>
-              <a:t>https://www.microsoft.com/en-us/download/details.aspx?id</a:t>
-            </a:r>
-            <a:r>
-              <a:rPr lang="en-US">
-                <a:hlinkClick r:id="rId2"/>
-              </a:rPr>
-              <a:t>=52679</a:t>
+              <a:t>https://www.microsoft.com/en-us/download/details.aspx?id=52679</a:t>
             </a:r>
             <a:endParaRPr lang="en-US"/>
           </a:p>

</xml_diff>

<commit_message>
Add slides for new features and limitations.
</commit_message>
<xml_diff>
--- a/AwesomeFreeSQLServerFeatures.pptx
+++ b/AwesomeFreeSQLServerFeatures.pptx
@@ -8,7 +8,9 @@
     <p:sldId id="256" r:id="rId2"/>
     <p:sldId id="257" r:id="rId3"/>
     <p:sldId id="259" r:id="rId4"/>
-    <p:sldId id="258" r:id="rId5"/>
+    <p:sldId id="260" r:id="rId5"/>
+    <p:sldId id="261" r:id="rId6"/>
+    <p:sldId id="258" r:id="rId7"/>
   </p:sldIdLst>
   <p:sldSz cx="12192000" cy="6858000"/>
   <p:notesSz cx="6858000" cy="9144000"/>
@@ -3872,6 +3874,261 @@
           </a:p>
         </p:txBody>
       </p:sp>
+      <p:sp>
+        <p:nvSpPr>
+          <p:cNvPr id="4" name="Subtitle 2"/>
+          <p:cNvSpPr txBox="1">
+            <a:spLocks/>
+          </p:cNvSpPr>
+          <p:nvPr/>
+        </p:nvSpPr>
+        <p:spPr>
+          <a:xfrm>
+            <a:off x="581191" y="5811669"/>
+            <a:ext cx="10993546" cy="590321"/>
+          </a:xfrm>
+          <a:prstGeom prst="rect">
+            <a:avLst/>
+          </a:prstGeom>
+        </p:spPr>
+        <p:txBody>
+          <a:bodyPr vert="horz" lIns="91440" tIns="45720" rIns="91440" bIns="45720" rtlCol="0" anchor="t">
+            <a:normAutofit/>
+          </a:bodyPr>
+          <a:lstStyle>
+            <a:lvl1pPr marL="0" indent="0" algn="l" defTabSz="457200" rtl="0" eaLnBrk="1" latinLnBrk="0" hangingPunct="1">
+              <a:spcBef>
+                <a:spcPct val="20000"/>
+              </a:spcBef>
+              <a:spcAft>
+                <a:spcPts val="600"/>
+              </a:spcAft>
+              <a:buClr>
+                <a:schemeClr val="accent2"/>
+              </a:buClr>
+              <a:buSzPct val="92000"/>
+              <a:buFont typeface="Wingdings 2" panose="05020102010507070707" pitchFamily="18" charset="2"/>
+              <a:buNone/>
+              <a:defRPr sz="1600" kern="1200" cap="all">
+                <a:solidFill>
+                  <a:schemeClr val="accent2"/>
+                </a:solidFill>
+                <a:latin typeface="+mn-lt"/>
+                <a:ea typeface="+mn-ea"/>
+                <a:cs typeface="+mn-cs"/>
+              </a:defRPr>
+            </a:lvl1pPr>
+            <a:lvl2pPr marL="457200" indent="0" algn="ctr" defTabSz="457200" rtl="0" eaLnBrk="1" latinLnBrk="0" hangingPunct="1">
+              <a:spcBef>
+                <a:spcPct val="20000"/>
+              </a:spcBef>
+              <a:spcAft>
+                <a:spcPts val="600"/>
+              </a:spcAft>
+              <a:buClr>
+                <a:schemeClr val="accent2"/>
+              </a:buClr>
+              <a:buSzPct val="92000"/>
+              <a:buFont typeface="Wingdings 2" panose="05020102010507070707" pitchFamily="18" charset="2"/>
+              <a:buNone/>
+              <a:defRPr sz="1600" kern="1200">
+                <a:solidFill>
+                  <a:schemeClr val="tx1">
+                    <a:tint val="75000"/>
+                  </a:schemeClr>
+                </a:solidFill>
+                <a:latin typeface="+mn-lt"/>
+                <a:ea typeface="+mn-ea"/>
+                <a:cs typeface="+mn-cs"/>
+              </a:defRPr>
+            </a:lvl2pPr>
+            <a:lvl3pPr marL="914400" indent="0" algn="ctr" defTabSz="457200" rtl="0" eaLnBrk="1" latinLnBrk="0" hangingPunct="1">
+              <a:spcBef>
+                <a:spcPct val="20000"/>
+              </a:spcBef>
+              <a:spcAft>
+                <a:spcPts val="600"/>
+              </a:spcAft>
+              <a:buClr>
+                <a:schemeClr val="accent2"/>
+              </a:buClr>
+              <a:buSzPct val="92000"/>
+              <a:buFont typeface="Wingdings 2" panose="05020102010507070707" pitchFamily="18" charset="2"/>
+              <a:buNone/>
+              <a:defRPr sz="1400" kern="1200">
+                <a:solidFill>
+                  <a:schemeClr val="tx1">
+                    <a:tint val="75000"/>
+                  </a:schemeClr>
+                </a:solidFill>
+                <a:latin typeface="+mn-lt"/>
+                <a:ea typeface="+mn-ea"/>
+                <a:cs typeface="+mn-cs"/>
+              </a:defRPr>
+            </a:lvl3pPr>
+            <a:lvl4pPr marL="1371600" indent="0" algn="ctr" defTabSz="457200" rtl="0" eaLnBrk="1" latinLnBrk="0" hangingPunct="1">
+              <a:spcBef>
+                <a:spcPct val="20000"/>
+              </a:spcBef>
+              <a:spcAft>
+                <a:spcPts val="600"/>
+              </a:spcAft>
+              <a:buClr>
+                <a:schemeClr val="accent2"/>
+              </a:buClr>
+              <a:buSzPct val="92000"/>
+              <a:buFont typeface="Wingdings 2" panose="05020102010507070707" pitchFamily="18" charset="2"/>
+              <a:buNone/>
+              <a:defRPr sz="1200" kern="1200">
+                <a:solidFill>
+                  <a:schemeClr val="tx1">
+                    <a:tint val="75000"/>
+                  </a:schemeClr>
+                </a:solidFill>
+                <a:latin typeface="+mn-lt"/>
+                <a:ea typeface="+mn-ea"/>
+                <a:cs typeface="+mn-cs"/>
+              </a:defRPr>
+            </a:lvl4pPr>
+            <a:lvl5pPr marL="1828800" indent="0" algn="ctr" defTabSz="457200" rtl="0" eaLnBrk="1" latinLnBrk="0" hangingPunct="1">
+              <a:spcBef>
+                <a:spcPct val="20000"/>
+              </a:spcBef>
+              <a:spcAft>
+                <a:spcPts val="600"/>
+              </a:spcAft>
+              <a:buClr>
+                <a:schemeClr val="accent2"/>
+              </a:buClr>
+              <a:buSzPct val="92000"/>
+              <a:buFont typeface="Wingdings 2" panose="05020102010507070707" pitchFamily="18" charset="2"/>
+              <a:buNone/>
+              <a:defRPr sz="1200" kern="1200">
+                <a:solidFill>
+                  <a:schemeClr val="tx1">
+                    <a:tint val="75000"/>
+                  </a:schemeClr>
+                </a:solidFill>
+                <a:latin typeface="+mn-lt"/>
+                <a:ea typeface="+mn-ea"/>
+                <a:cs typeface="+mn-cs"/>
+              </a:defRPr>
+            </a:lvl5pPr>
+            <a:lvl6pPr marL="2286000" indent="0" algn="ctr" defTabSz="457200" rtl="0" eaLnBrk="1" latinLnBrk="0" hangingPunct="1">
+              <a:spcBef>
+                <a:spcPct val="20000"/>
+              </a:spcBef>
+              <a:spcAft>
+                <a:spcPts val="600"/>
+              </a:spcAft>
+              <a:buClr>
+                <a:schemeClr val="accent2"/>
+              </a:buClr>
+              <a:buSzPct val="92000"/>
+              <a:buFont typeface="Wingdings 2" panose="05020102010507070707" pitchFamily="18" charset="2"/>
+              <a:buNone/>
+              <a:defRPr sz="1200" kern="1200">
+                <a:solidFill>
+                  <a:schemeClr val="tx1">
+                    <a:tint val="75000"/>
+                  </a:schemeClr>
+                </a:solidFill>
+                <a:latin typeface="+mn-lt"/>
+                <a:ea typeface="+mn-ea"/>
+                <a:cs typeface="+mn-cs"/>
+              </a:defRPr>
+            </a:lvl6pPr>
+            <a:lvl7pPr marL="2743200" indent="0" algn="ctr" defTabSz="457200" rtl="0" eaLnBrk="1" latinLnBrk="0" hangingPunct="1">
+              <a:spcBef>
+                <a:spcPct val="20000"/>
+              </a:spcBef>
+              <a:spcAft>
+                <a:spcPts val="600"/>
+              </a:spcAft>
+              <a:buClr>
+                <a:schemeClr val="accent2"/>
+              </a:buClr>
+              <a:buSzPct val="92000"/>
+              <a:buFont typeface="Wingdings 2" panose="05020102010507070707" pitchFamily="18" charset="2"/>
+              <a:buNone/>
+              <a:defRPr sz="1200" kern="1200">
+                <a:solidFill>
+                  <a:schemeClr val="tx1">
+                    <a:tint val="75000"/>
+                  </a:schemeClr>
+                </a:solidFill>
+                <a:latin typeface="+mn-lt"/>
+                <a:ea typeface="+mn-ea"/>
+                <a:cs typeface="+mn-cs"/>
+              </a:defRPr>
+            </a:lvl7pPr>
+            <a:lvl8pPr marL="3200400" indent="0" algn="ctr" defTabSz="457200" rtl="0" eaLnBrk="1" latinLnBrk="0" hangingPunct="1">
+              <a:spcBef>
+                <a:spcPct val="20000"/>
+              </a:spcBef>
+              <a:spcAft>
+                <a:spcPts val="600"/>
+              </a:spcAft>
+              <a:buClr>
+                <a:schemeClr val="accent2"/>
+              </a:buClr>
+              <a:buSzPct val="92000"/>
+              <a:buFont typeface="Wingdings 2" panose="05020102010507070707" pitchFamily="18" charset="2"/>
+              <a:buNone/>
+              <a:defRPr sz="1200" kern="1200">
+                <a:solidFill>
+                  <a:schemeClr val="tx1">
+                    <a:tint val="75000"/>
+                  </a:schemeClr>
+                </a:solidFill>
+                <a:latin typeface="+mn-lt"/>
+                <a:ea typeface="+mn-ea"/>
+                <a:cs typeface="+mn-cs"/>
+              </a:defRPr>
+            </a:lvl8pPr>
+            <a:lvl9pPr marL="3657600" indent="0" algn="ctr" defTabSz="457200" rtl="0" eaLnBrk="1" latinLnBrk="0" hangingPunct="1">
+              <a:spcBef>
+                <a:spcPct val="20000"/>
+              </a:spcBef>
+              <a:spcAft>
+                <a:spcPts val="600"/>
+              </a:spcAft>
+              <a:buClr>
+                <a:schemeClr val="accent2"/>
+              </a:buClr>
+              <a:buSzPct val="92000"/>
+              <a:buFont typeface="Wingdings 2" panose="05020102010507070707" pitchFamily="18" charset="2"/>
+              <a:buNone/>
+              <a:defRPr sz="1200" kern="1200">
+                <a:solidFill>
+                  <a:schemeClr val="tx1">
+                    <a:tint val="75000"/>
+                  </a:schemeClr>
+                </a:solidFill>
+                <a:latin typeface="+mn-lt"/>
+                <a:ea typeface="+mn-ea"/>
+                <a:cs typeface="+mn-cs"/>
+              </a:defRPr>
+            </a:lvl9pPr>
+          </a:lstStyle>
+          <a:p>
+            <a:pPr defTabSz="771525">
+              <a:tabLst>
+                <a:tab pos="4916488" algn="ctr"/>
+                <a:tab pos="10804525" algn="r"/>
+              </a:tabLst>
+            </a:pPr>
+            <a:r>
+              <a:rPr lang="en-US" dirty="0">
+                <a:solidFill>
+                  <a:schemeClr val="bg1"/>
+                </a:solidFill>
+              </a:rPr>
+              <a:t>Allison Benneth	Allison@sqltran.org	sqltran.org</a:t>
+            </a:r>
+          </a:p>
+        </p:txBody>
+      </p:sp>
     </p:spTree>
     <p:extLst>
       <p:ext uri="{BB962C8B-B14F-4D97-AF65-F5344CB8AC3E}">
@@ -5198,16 +5455,16 @@
             </a:r>
           </a:p>
           <a:p>
-            <a:pPr marL="630000" lvl="2" indent="0">
+            <a:pPr marL="972000" lvl="3" indent="0">
               <a:buNone/>
             </a:pPr>
             <a:r>
-              <a:rPr lang="en-US" dirty="0">
+              <a:rPr lang="en-US" sz="1400" dirty="0">
                 <a:hlinkClick r:id="rId3"/>
               </a:rPr>
               <a:t>https://blogs.msdn.microsoft.com/sqlreleaseservices/sql-server-2016-service-pack-1-sp1-released/</a:t>
             </a:r>
-            <a:endParaRPr lang="en-US" dirty="0"/>
+            <a:endParaRPr lang="en-US" sz="1400" dirty="0"/>
           </a:p>
           <a:p>
             <a:pPr marL="630000" lvl="2" indent="0">
@@ -5231,6 +5488,311 @@
 </file>
 
 <file path=ppt/slides/slide4.xml><?xml version="1.0" encoding="utf-8"?>
+<p:sld xmlns:a="http://schemas.openxmlformats.org/drawingml/2006/main" xmlns:r="http://schemas.openxmlformats.org/officeDocument/2006/relationships" xmlns:p="http://schemas.openxmlformats.org/presentationml/2006/main">
+  <p:cSld>
+    <p:spTree>
+      <p:nvGrpSpPr>
+        <p:cNvPr id="1" name=""/>
+        <p:cNvGrpSpPr/>
+        <p:nvPr/>
+      </p:nvGrpSpPr>
+      <p:grpSpPr>
+        <a:xfrm>
+          <a:off x="0" y="0"/>
+          <a:ext cx="0" cy="0"/>
+          <a:chOff x="0" y="0"/>
+          <a:chExt cx="0" cy="0"/>
+        </a:xfrm>
+      </p:grpSpPr>
+      <p:sp>
+        <p:nvSpPr>
+          <p:cNvPr id="2" name="Title 1"/>
+          <p:cNvSpPr>
+            <a:spLocks noGrp="1"/>
+          </p:cNvSpPr>
+          <p:nvPr>
+            <p:ph type="title"/>
+          </p:nvPr>
+        </p:nvSpPr>
+        <p:spPr/>
+        <p:txBody>
+          <a:bodyPr/>
+          <a:lstStyle/>
+          <a:p>
+            <a:r>
+              <a:rPr lang="en-US" dirty="0"/>
+              <a:t>New Features in Express Edition</a:t>
+            </a:r>
+          </a:p>
+        </p:txBody>
+      </p:sp>
+      <p:sp>
+        <p:nvSpPr>
+          <p:cNvPr id="3" name="Content Placeholder 2"/>
+          <p:cNvSpPr>
+            <a:spLocks noGrp="1"/>
+          </p:cNvSpPr>
+          <p:nvPr>
+            <p:ph idx="1"/>
+          </p:nvPr>
+        </p:nvSpPr>
+        <p:spPr/>
+        <p:txBody>
+          <a:bodyPr numCol="3"/>
+          <a:lstStyle/>
+          <a:p>
+            <a:r>
+              <a:rPr lang="en-US" dirty="0"/>
+              <a:t>SQL 2016 RTM</a:t>
+            </a:r>
+          </a:p>
+          <a:p>
+            <a:pPr lvl="1"/>
+            <a:r>
+              <a:rPr lang="en-US" dirty="0"/>
+              <a:t>Stretch DB</a:t>
+            </a:r>
+          </a:p>
+          <a:p>
+            <a:pPr lvl="1"/>
+            <a:r>
+              <a:rPr lang="en-US" dirty="0"/>
+              <a:t>Query Store</a:t>
+            </a:r>
+          </a:p>
+          <a:p>
+            <a:pPr lvl="1"/>
+            <a:r>
+              <a:rPr lang="en-US" dirty="0"/>
+              <a:t>JSON support</a:t>
+            </a:r>
+          </a:p>
+          <a:p>
+            <a:pPr lvl="1"/>
+            <a:r>
+              <a:rPr lang="en-US" dirty="0"/>
+              <a:t>Temporal tables</a:t>
+            </a:r>
+          </a:p>
+          <a:p>
+            <a:r>
+              <a:rPr lang="en-US" dirty="0"/>
+              <a:t>SQL 2016 Service Pack 1</a:t>
+            </a:r>
+          </a:p>
+          <a:p>
+            <a:pPr lvl="1"/>
+            <a:r>
+              <a:rPr lang="en-US" dirty="0"/>
+              <a:t>In-Memory Tables</a:t>
+            </a:r>
+          </a:p>
+          <a:p>
+            <a:pPr lvl="1"/>
+            <a:r>
+              <a:rPr lang="en-US" dirty="0" err="1"/>
+              <a:t>Columnstore</a:t>
+            </a:r>
+            <a:endParaRPr lang="en-US" dirty="0"/>
+          </a:p>
+          <a:p>
+            <a:pPr lvl="1"/>
+            <a:r>
+              <a:rPr lang="en-US" dirty="0"/>
+              <a:t>Snapshots</a:t>
+            </a:r>
+          </a:p>
+          <a:p>
+            <a:pPr lvl="1"/>
+            <a:r>
+              <a:rPr lang="en-US" dirty="0"/>
+              <a:t>Partitioning</a:t>
+            </a:r>
+          </a:p>
+          <a:p>
+            <a:pPr lvl="1"/>
+            <a:r>
+              <a:rPr lang="en-US" dirty="0"/>
+              <a:t>Data compression</a:t>
+            </a:r>
+          </a:p>
+          <a:p>
+            <a:pPr lvl="1"/>
+            <a:r>
+              <a:rPr lang="en-US" dirty="0"/>
+              <a:t>Row-level security</a:t>
+            </a:r>
+          </a:p>
+          <a:p>
+            <a:pPr lvl="1"/>
+            <a:r>
+              <a:rPr lang="en-US" dirty="0"/>
+              <a:t>Always Encrypted</a:t>
+            </a:r>
+          </a:p>
+          <a:p>
+            <a:pPr lvl="1"/>
+            <a:r>
+              <a:rPr lang="en-US" dirty="0"/>
+              <a:t>Dynamic data masking</a:t>
+            </a:r>
+          </a:p>
+          <a:p>
+            <a:pPr lvl="1"/>
+            <a:r>
+              <a:rPr lang="en-US" dirty="0"/>
+              <a:t>Auditing</a:t>
+            </a:r>
+          </a:p>
+          <a:p>
+            <a:pPr lvl="1"/>
+            <a:r>
+              <a:rPr lang="en-US" dirty="0" err="1"/>
+              <a:t>Polybase</a:t>
+            </a:r>
+            <a:r>
+              <a:rPr lang="en-US" dirty="0"/>
+              <a:t> (compute node)</a:t>
+            </a:r>
+          </a:p>
+          <a:p>
+            <a:pPr lvl="1"/>
+            <a:r>
+              <a:rPr lang="en-US" dirty="0"/>
+              <a:t>Additional FILESTREAM support</a:t>
+            </a:r>
+          </a:p>
+        </p:txBody>
+      </p:sp>
+    </p:spTree>
+    <p:extLst>
+      <p:ext uri="{BB962C8B-B14F-4D97-AF65-F5344CB8AC3E}">
+        <p14:creationId xmlns:p14="http://schemas.microsoft.com/office/powerpoint/2010/main" val="1521074343"/>
+      </p:ext>
+    </p:extLst>
+  </p:cSld>
+  <p:clrMapOvr>
+    <a:masterClrMapping/>
+  </p:clrMapOvr>
+</p:sld>
+</file>
+
+<file path=ppt/slides/slide5.xml><?xml version="1.0" encoding="utf-8"?>
+<p:sld xmlns:a="http://schemas.openxmlformats.org/drawingml/2006/main" xmlns:r="http://schemas.openxmlformats.org/officeDocument/2006/relationships" xmlns:p="http://schemas.openxmlformats.org/presentationml/2006/main">
+  <p:cSld>
+    <p:spTree>
+      <p:nvGrpSpPr>
+        <p:cNvPr id="1" name=""/>
+        <p:cNvGrpSpPr/>
+        <p:nvPr/>
+      </p:nvGrpSpPr>
+      <p:grpSpPr>
+        <a:xfrm>
+          <a:off x="0" y="0"/>
+          <a:ext cx="0" cy="0"/>
+          <a:chOff x="0" y="0"/>
+          <a:chExt cx="0" cy="0"/>
+        </a:xfrm>
+      </p:grpSpPr>
+      <p:sp>
+        <p:nvSpPr>
+          <p:cNvPr id="2" name="Title 1"/>
+          <p:cNvSpPr>
+            <a:spLocks noGrp="1"/>
+          </p:cNvSpPr>
+          <p:nvPr>
+            <p:ph type="title"/>
+          </p:nvPr>
+        </p:nvSpPr>
+        <p:spPr/>
+        <p:txBody>
+          <a:bodyPr/>
+          <a:lstStyle/>
+          <a:p>
+            <a:r>
+              <a:rPr lang="en-US" dirty="0"/>
+              <a:t>Limitations on Express Edition</a:t>
+            </a:r>
+          </a:p>
+        </p:txBody>
+      </p:sp>
+      <p:sp>
+        <p:nvSpPr>
+          <p:cNvPr id="3" name="Content Placeholder 2"/>
+          <p:cNvSpPr>
+            <a:spLocks noGrp="1"/>
+          </p:cNvSpPr>
+          <p:nvPr>
+            <p:ph idx="1"/>
+          </p:nvPr>
+        </p:nvSpPr>
+        <p:spPr/>
+        <p:txBody>
+          <a:bodyPr/>
+          <a:lstStyle/>
+          <a:p>
+            <a:r>
+              <a:rPr lang="en-US" dirty="0"/>
+              <a:t>One CPU / four cores</a:t>
+            </a:r>
+          </a:p>
+          <a:p>
+            <a:r>
+              <a:rPr lang="en-US" dirty="0"/>
+              <a:t>1.4 GB RAM (buffer pool)</a:t>
+            </a:r>
+          </a:p>
+          <a:p>
+            <a:r>
+              <a:rPr lang="en-US" dirty="0"/>
+              <a:t>350 MB for in-memory tables</a:t>
+            </a:r>
+          </a:p>
+          <a:p>
+            <a:r>
+              <a:rPr lang="en-US" dirty="0"/>
+              <a:t>350 MB for </a:t>
+            </a:r>
+            <a:r>
+              <a:rPr lang="en-US" dirty="0" err="1"/>
+              <a:t>columnstore</a:t>
+            </a:r>
+            <a:r>
+              <a:rPr lang="en-US" dirty="0"/>
+              <a:t> data</a:t>
+            </a:r>
+          </a:p>
+          <a:p>
+            <a:r>
+              <a:rPr lang="en-US" dirty="0"/>
+              <a:t>10 GB per database</a:t>
+            </a:r>
+          </a:p>
+          <a:p>
+            <a:r>
+              <a:rPr lang="en-US" dirty="0"/>
+              <a:t>No SQL Agent (service installed, but cannot be started)</a:t>
+            </a:r>
+          </a:p>
+          <a:p>
+            <a:endParaRPr lang="en-US" dirty="0"/>
+          </a:p>
+        </p:txBody>
+      </p:sp>
+    </p:spTree>
+    <p:extLst>
+      <p:ext uri="{BB962C8B-B14F-4D97-AF65-F5344CB8AC3E}">
+        <p14:creationId xmlns:p14="http://schemas.microsoft.com/office/powerpoint/2010/main" val="2182955955"/>
+      </p:ext>
+    </p:extLst>
+  </p:cSld>
+  <p:clrMapOvr>
+    <a:masterClrMapping/>
+  </p:clrMapOvr>
+</p:sld>
+</file>
+
+<file path=ppt/slides/slide6.xml><?xml version="1.0" encoding="utf-8"?>
 <p:sld xmlns:a="http://schemas.openxmlformats.org/drawingml/2006/main" xmlns:r="http://schemas.openxmlformats.org/officeDocument/2006/relationships" xmlns:p="http://schemas.openxmlformats.org/presentationml/2006/main">
   <p:cSld>
     <p:spTree>

</xml_diff>

<commit_message>
More details on limitations slide.
</commit_message>
<xml_diff>
--- a/AwesomeFreeSQLServerFeatures.pptx
+++ b/AwesomeFreeSQLServerFeatures.pptx
@@ -363,7 +363,7 @@
             <a:fld id="{B61BEF0D-F0BB-DE4B-95CE-6DB70DBA9567}" type="datetimeFigureOut">
               <a:rPr lang="en-US" dirty="0"/>
               <a:pPr/>
-              <a:t>12/6/2016</a:t>
+              <a:t>12/7/2016</a:t>
             </a:fld>
             <a:endParaRPr lang="en-US" dirty="0"/>
           </a:p>
@@ -622,7 +622,7 @@
             <a:fld id="{B61BEF0D-F0BB-DE4B-95CE-6DB70DBA9567}" type="datetimeFigureOut">
               <a:rPr lang="en-US" dirty="0"/>
               <a:pPr/>
-              <a:t>12/6/2016</a:t>
+              <a:t>12/7/2016</a:t>
             </a:fld>
             <a:endParaRPr lang="en-US" dirty="0"/>
           </a:p>
@@ -854,7 +854,7 @@
             <a:fld id="{B61BEF0D-F0BB-DE4B-95CE-6DB70DBA9567}" type="datetimeFigureOut">
               <a:rPr lang="en-US" dirty="0"/>
               <a:pPr/>
-              <a:t>12/6/2016</a:t>
+              <a:t>12/7/2016</a:t>
             </a:fld>
             <a:endParaRPr lang="en-US" dirty="0"/>
           </a:p>
@@ -1091,7 +1091,7 @@
             <a:fld id="{B61BEF0D-F0BB-DE4B-95CE-6DB70DBA9567}" type="datetimeFigureOut">
               <a:rPr lang="en-US" dirty="0"/>
               <a:pPr/>
-              <a:t>12/6/2016</a:t>
+              <a:t>12/7/2016</a:t>
             </a:fld>
             <a:endParaRPr lang="en-US" dirty="0"/>
           </a:p>
@@ -1395,7 +1395,7 @@
             <a:fld id="{B61BEF0D-F0BB-DE4B-95CE-6DB70DBA9567}" type="datetimeFigureOut">
               <a:rPr lang="en-US" dirty="0"/>
               <a:pPr/>
-              <a:t>12/6/2016</a:t>
+              <a:t>12/7/2016</a:t>
             </a:fld>
             <a:endParaRPr lang="en-US" dirty="0"/>
           </a:p>
@@ -1694,7 +1694,7 @@
             <a:fld id="{B61BEF0D-F0BB-DE4B-95CE-6DB70DBA9567}" type="datetimeFigureOut">
               <a:rPr lang="en-US" dirty="0"/>
               <a:pPr/>
-              <a:t>12/6/2016</a:t>
+              <a:t>12/7/2016</a:t>
             </a:fld>
             <a:endParaRPr lang="en-US" dirty="0"/>
           </a:p>
@@ -2113,7 +2113,7 @@
             <a:fld id="{B61BEF0D-F0BB-DE4B-95CE-6DB70DBA9567}" type="datetimeFigureOut">
               <a:rPr lang="en-US" dirty="0"/>
               <a:pPr/>
-              <a:t>12/6/2016</a:t>
+              <a:t>12/7/2016</a:t>
             </a:fld>
             <a:endParaRPr lang="en-US" dirty="0"/>
           </a:p>
@@ -2272,7 +2272,7 @@
             <a:fld id="{B61BEF0D-F0BB-DE4B-95CE-6DB70DBA9567}" type="datetimeFigureOut">
               <a:rPr lang="en-US" dirty="0"/>
               <a:pPr/>
-              <a:t>12/6/2016</a:t>
+              <a:t>12/7/2016</a:t>
             </a:fld>
             <a:endParaRPr lang="en-US" dirty="0"/>
           </a:p>
@@ -2364,7 +2364,7 @@
             <a:fld id="{B61BEF0D-F0BB-DE4B-95CE-6DB70DBA9567}" type="datetimeFigureOut">
               <a:rPr lang="en-US" dirty="0"/>
               <a:pPr/>
-              <a:t>12/6/2016</a:t>
+              <a:t>12/7/2016</a:t>
             </a:fld>
             <a:endParaRPr lang="en-US" dirty="0"/>
           </a:p>
@@ -2739,7 +2739,7 @@
             <a:fld id="{B61BEF0D-F0BB-DE4B-95CE-6DB70DBA9567}" type="datetimeFigureOut">
               <a:rPr lang="en-US" dirty="0"/>
               <a:pPr/>
-              <a:t>12/6/2016</a:t>
+              <a:t>12/7/2016</a:t>
             </a:fld>
             <a:endParaRPr lang="en-US" dirty="0"/>
           </a:p>
@@ -3025,7 +3025,7 @@
             <a:fld id="{B61BEF0D-F0BB-DE4B-95CE-6DB70DBA9567}" type="datetimeFigureOut">
               <a:rPr lang="en-US" dirty="0"/>
               <a:pPr/>
-              <a:t>12/6/2016</a:t>
+              <a:t>12/7/2016</a:t>
             </a:fld>
             <a:endParaRPr lang="en-US" dirty="0"/>
           </a:p>
@@ -3233,7 +3233,7 @@
             <a:fld id="{B61BEF0D-F0BB-DE4B-95CE-6DB70DBA9567}" type="datetimeFigureOut">
               <a:rPr lang="en-US" dirty="0"/>
               <a:pPr/>
-              <a:t>12/6/2016</a:t>
+              <a:t>12/7/2016</a:t>
             </a:fld>
             <a:endParaRPr lang="en-US" dirty="0"/>
           </a:p>
@@ -5775,6 +5775,32 @@
             </a:r>
           </a:p>
           <a:p>
+            <a:pPr lvl="1"/>
+            <a:r>
+              <a:rPr lang="en-US" dirty="0"/>
+              <a:t>Schedule backups and other jobs via another SQL Agent or OS scheduler (</a:t>
+            </a:r>
+            <a:r>
+              <a:rPr lang="en-US" dirty="0" err="1"/>
+              <a:t>sqlcmd</a:t>
+            </a:r>
+            <a:r>
+              <a:rPr lang="en-US" dirty="0"/>
+              <a:t> or PowerShell)</a:t>
+            </a:r>
+          </a:p>
+          <a:p>
+            <a:r>
+              <a:rPr lang="en-US" dirty="0"/>
+              <a:t>No TCP/IP by default; be sure to </a:t>
+            </a:r>
+            <a:r>
+              <a:rPr lang="en-US"/>
+              <a:t>enable it</a:t>
+            </a:r>
+            <a:endParaRPr lang="en-US" dirty="0"/>
+          </a:p>
+          <a:p>
             <a:endParaRPr lang="en-US" dirty="0"/>
           </a:p>
         </p:txBody>

</xml_diff>

<commit_message>
Minor organization of limitations slide.
</commit_message>
<xml_diff>
--- a/AwesomeFreeSQLServerFeatures.pptx
+++ b/AwesomeFreeSQLServerFeatures.pptx
@@ -363,7 +363,7 @@
             <a:fld id="{B61BEF0D-F0BB-DE4B-95CE-6DB70DBA9567}" type="datetimeFigureOut">
               <a:rPr lang="en-US" dirty="0"/>
               <a:pPr/>
-              <a:t>12/7/2016</a:t>
+              <a:t>12/9/2016</a:t>
             </a:fld>
             <a:endParaRPr lang="en-US" dirty="0"/>
           </a:p>
@@ -622,7 +622,7 @@
             <a:fld id="{B61BEF0D-F0BB-DE4B-95CE-6DB70DBA9567}" type="datetimeFigureOut">
               <a:rPr lang="en-US" dirty="0"/>
               <a:pPr/>
-              <a:t>12/7/2016</a:t>
+              <a:t>12/9/2016</a:t>
             </a:fld>
             <a:endParaRPr lang="en-US" dirty="0"/>
           </a:p>
@@ -854,7 +854,7 @@
             <a:fld id="{B61BEF0D-F0BB-DE4B-95CE-6DB70DBA9567}" type="datetimeFigureOut">
               <a:rPr lang="en-US" dirty="0"/>
               <a:pPr/>
-              <a:t>12/7/2016</a:t>
+              <a:t>12/9/2016</a:t>
             </a:fld>
             <a:endParaRPr lang="en-US" dirty="0"/>
           </a:p>
@@ -1091,7 +1091,7 @@
             <a:fld id="{B61BEF0D-F0BB-DE4B-95CE-6DB70DBA9567}" type="datetimeFigureOut">
               <a:rPr lang="en-US" dirty="0"/>
               <a:pPr/>
-              <a:t>12/7/2016</a:t>
+              <a:t>12/9/2016</a:t>
             </a:fld>
             <a:endParaRPr lang="en-US" dirty="0"/>
           </a:p>
@@ -1395,7 +1395,7 @@
             <a:fld id="{B61BEF0D-F0BB-DE4B-95CE-6DB70DBA9567}" type="datetimeFigureOut">
               <a:rPr lang="en-US" dirty="0"/>
               <a:pPr/>
-              <a:t>12/7/2016</a:t>
+              <a:t>12/9/2016</a:t>
             </a:fld>
             <a:endParaRPr lang="en-US" dirty="0"/>
           </a:p>
@@ -1694,7 +1694,7 @@
             <a:fld id="{B61BEF0D-F0BB-DE4B-95CE-6DB70DBA9567}" type="datetimeFigureOut">
               <a:rPr lang="en-US" dirty="0"/>
               <a:pPr/>
-              <a:t>12/7/2016</a:t>
+              <a:t>12/9/2016</a:t>
             </a:fld>
             <a:endParaRPr lang="en-US" dirty="0"/>
           </a:p>
@@ -2113,7 +2113,7 @@
             <a:fld id="{B61BEF0D-F0BB-DE4B-95CE-6DB70DBA9567}" type="datetimeFigureOut">
               <a:rPr lang="en-US" dirty="0"/>
               <a:pPr/>
-              <a:t>12/7/2016</a:t>
+              <a:t>12/9/2016</a:t>
             </a:fld>
             <a:endParaRPr lang="en-US" dirty="0"/>
           </a:p>
@@ -2272,7 +2272,7 @@
             <a:fld id="{B61BEF0D-F0BB-DE4B-95CE-6DB70DBA9567}" type="datetimeFigureOut">
               <a:rPr lang="en-US" dirty="0"/>
               <a:pPr/>
-              <a:t>12/7/2016</a:t>
+              <a:t>12/9/2016</a:t>
             </a:fld>
             <a:endParaRPr lang="en-US" dirty="0"/>
           </a:p>
@@ -2364,7 +2364,7 @@
             <a:fld id="{B61BEF0D-F0BB-DE4B-95CE-6DB70DBA9567}" type="datetimeFigureOut">
               <a:rPr lang="en-US" dirty="0"/>
               <a:pPr/>
-              <a:t>12/7/2016</a:t>
+              <a:t>12/9/2016</a:t>
             </a:fld>
             <a:endParaRPr lang="en-US" dirty="0"/>
           </a:p>
@@ -2739,7 +2739,7 @@
             <a:fld id="{B61BEF0D-F0BB-DE4B-95CE-6DB70DBA9567}" type="datetimeFigureOut">
               <a:rPr lang="en-US" dirty="0"/>
               <a:pPr/>
-              <a:t>12/7/2016</a:t>
+              <a:t>12/9/2016</a:t>
             </a:fld>
             <a:endParaRPr lang="en-US" dirty="0"/>
           </a:p>
@@ -3025,7 +3025,7 @@
             <a:fld id="{B61BEF0D-F0BB-DE4B-95CE-6DB70DBA9567}" type="datetimeFigureOut">
               <a:rPr lang="en-US" dirty="0"/>
               <a:pPr/>
-              <a:t>12/7/2016</a:t>
+              <a:t>12/9/2016</a:t>
             </a:fld>
             <a:endParaRPr lang="en-US" dirty="0"/>
           </a:p>
@@ -3233,7 +3233,7 @@
             <a:fld id="{B61BEF0D-F0BB-DE4B-95CE-6DB70DBA9567}" type="datetimeFigureOut">
               <a:rPr lang="en-US" dirty="0"/>
               <a:pPr/>
-              <a:t>12/7/2016</a:t>
+              <a:t>12/9/2016</a:t>
             </a:fld>
             <a:endParaRPr lang="en-US" dirty="0"/>
           </a:p>
@@ -5728,27 +5728,39 @@
         </p:nvSpPr>
         <p:spPr/>
         <p:txBody>
-          <a:bodyPr/>
+          <a:bodyPr>
+            <a:normAutofit fontScale="92500" lnSpcReduction="20000"/>
+          </a:bodyPr>
           <a:lstStyle/>
           <a:p>
             <a:r>
               <a:rPr lang="en-US" dirty="0"/>
+              <a:t>Performance</a:t>
+            </a:r>
+          </a:p>
+          <a:p>
+            <a:pPr lvl="1"/>
+            <a:r>
+              <a:rPr lang="en-US" dirty="0"/>
               <a:t>One CPU / four cores</a:t>
             </a:r>
           </a:p>
           <a:p>
+            <a:pPr lvl="1"/>
             <a:r>
               <a:rPr lang="en-US" dirty="0"/>
               <a:t>1.4 GB RAM (buffer pool)</a:t>
             </a:r>
           </a:p>
           <a:p>
+            <a:pPr lvl="1"/>
             <a:r>
               <a:rPr lang="en-US" dirty="0"/>
               <a:t>350 MB for in-memory tables</a:t>
             </a:r>
           </a:p>
           <a:p>
+            <a:pPr lvl="1"/>
             <a:r>
               <a:rPr lang="en-US" dirty="0"/>
               <a:t>350 MB for </a:t>
@@ -5765,17 +5777,25 @@
           <a:p>
             <a:r>
               <a:rPr lang="en-US" dirty="0"/>
+              <a:t>Functionality</a:t>
+            </a:r>
+          </a:p>
+          <a:p>
+            <a:pPr lvl="1"/>
+            <a:r>
+              <a:rPr lang="en-US" dirty="0"/>
               <a:t>10 GB per database</a:t>
             </a:r>
           </a:p>
           <a:p>
+            <a:pPr lvl="1"/>
             <a:r>
               <a:rPr lang="en-US" dirty="0"/>
               <a:t>No SQL Agent (service installed, but cannot be started)</a:t>
             </a:r>
           </a:p>
           <a:p>
-            <a:pPr lvl="1"/>
+            <a:pPr lvl="2"/>
             <a:r>
               <a:rPr lang="en-US" dirty="0"/>
               <a:t>Schedule backups and other jobs via another SQL Agent or OS scheduler (</a:t>
@@ -5791,14 +5811,20 @@
           </a:p>
           <a:p>
             <a:r>
-              <a:rPr lang="en-US" dirty="0"/>
-              <a:t>No TCP/IP by default; be sure to </a:t>
-            </a:r>
-            <a:r>
-              <a:rPr lang="en-US"/>
-              <a:t>enable it</a:t>
-            </a:r>
-            <a:endParaRPr lang="en-US" dirty="0"/>
+              <a:rPr lang="en-US" dirty="0" err="1"/>
+              <a:t>Overcomeable</a:t>
+            </a:r>
+            <a:r>
+              <a:rPr lang="en-US" dirty="0"/>
+              <a:t> Limitations</a:t>
+            </a:r>
+          </a:p>
+          <a:p>
+            <a:pPr lvl="1"/>
+            <a:r>
+              <a:rPr lang="en-US" dirty="0"/>
+              <a:t>No TCP/IP by default; be sure to enable it</a:t>
+            </a:r>
           </a:p>
           <a:p>
             <a:endParaRPr lang="en-US" dirty="0"/>

</xml_diff>

<commit_message>
Clarify on limitations slide what applies per instance vs per database.
</commit_message>
<xml_diff>
--- a/AwesomeFreeSQLServerFeatures.pptx
+++ b/AwesomeFreeSQLServerFeatures.pptx
@@ -363,7 +363,7 @@
             <a:fld id="{B61BEF0D-F0BB-DE4B-95CE-6DB70DBA9567}" type="datetimeFigureOut">
               <a:rPr lang="en-US" dirty="0"/>
               <a:pPr/>
-              <a:t>12/9/2016</a:t>
+              <a:t>12/12/2016</a:t>
             </a:fld>
             <a:endParaRPr lang="en-US" dirty="0"/>
           </a:p>
@@ -622,7 +622,7 @@
             <a:fld id="{B61BEF0D-F0BB-DE4B-95CE-6DB70DBA9567}" type="datetimeFigureOut">
               <a:rPr lang="en-US" dirty="0"/>
               <a:pPr/>
-              <a:t>12/9/2016</a:t>
+              <a:t>12/12/2016</a:t>
             </a:fld>
             <a:endParaRPr lang="en-US" dirty="0"/>
           </a:p>
@@ -854,7 +854,7 @@
             <a:fld id="{B61BEF0D-F0BB-DE4B-95CE-6DB70DBA9567}" type="datetimeFigureOut">
               <a:rPr lang="en-US" dirty="0"/>
               <a:pPr/>
-              <a:t>12/9/2016</a:t>
+              <a:t>12/12/2016</a:t>
             </a:fld>
             <a:endParaRPr lang="en-US" dirty="0"/>
           </a:p>
@@ -1091,7 +1091,7 @@
             <a:fld id="{B61BEF0D-F0BB-DE4B-95CE-6DB70DBA9567}" type="datetimeFigureOut">
               <a:rPr lang="en-US" dirty="0"/>
               <a:pPr/>
-              <a:t>12/9/2016</a:t>
+              <a:t>12/12/2016</a:t>
             </a:fld>
             <a:endParaRPr lang="en-US" dirty="0"/>
           </a:p>
@@ -1395,7 +1395,7 @@
             <a:fld id="{B61BEF0D-F0BB-DE4B-95CE-6DB70DBA9567}" type="datetimeFigureOut">
               <a:rPr lang="en-US" dirty="0"/>
               <a:pPr/>
-              <a:t>12/9/2016</a:t>
+              <a:t>12/12/2016</a:t>
             </a:fld>
             <a:endParaRPr lang="en-US" dirty="0"/>
           </a:p>
@@ -1694,7 +1694,7 @@
             <a:fld id="{B61BEF0D-F0BB-DE4B-95CE-6DB70DBA9567}" type="datetimeFigureOut">
               <a:rPr lang="en-US" dirty="0"/>
               <a:pPr/>
-              <a:t>12/9/2016</a:t>
+              <a:t>12/12/2016</a:t>
             </a:fld>
             <a:endParaRPr lang="en-US" dirty="0"/>
           </a:p>
@@ -2113,7 +2113,7 @@
             <a:fld id="{B61BEF0D-F0BB-DE4B-95CE-6DB70DBA9567}" type="datetimeFigureOut">
               <a:rPr lang="en-US" dirty="0"/>
               <a:pPr/>
-              <a:t>12/9/2016</a:t>
+              <a:t>12/12/2016</a:t>
             </a:fld>
             <a:endParaRPr lang="en-US" dirty="0"/>
           </a:p>
@@ -2272,7 +2272,7 @@
             <a:fld id="{B61BEF0D-F0BB-DE4B-95CE-6DB70DBA9567}" type="datetimeFigureOut">
               <a:rPr lang="en-US" dirty="0"/>
               <a:pPr/>
-              <a:t>12/9/2016</a:t>
+              <a:t>12/12/2016</a:t>
             </a:fld>
             <a:endParaRPr lang="en-US" dirty="0"/>
           </a:p>
@@ -2364,7 +2364,7 @@
             <a:fld id="{B61BEF0D-F0BB-DE4B-95CE-6DB70DBA9567}" type="datetimeFigureOut">
               <a:rPr lang="en-US" dirty="0"/>
               <a:pPr/>
-              <a:t>12/9/2016</a:t>
+              <a:t>12/12/2016</a:t>
             </a:fld>
             <a:endParaRPr lang="en-US" dirty="0"/>
           </a:p>
@@ -2739,7 +2739,7 @@
             <a:fld id="{B61BEF0D-F0BB-DE4B-95CE-6DB70DBA9567}" type="datetimeFigureOut">
               <a:rPr lang="en-US" dirty="0"/>
               <a:pPr/>
-              <a:t>12/9/2016</a:t>
+              <a:t>12/12/2016</a:t>
             </a:fld>
             <a:endParaRPr lang="en-US" dirty="0"/>
           </a:p>
@@ -3025,7 +3025,7 @@
             <a:fld id="{B61BEF0D-F0BB-DE4B-95CE-6DB70DBA9567}" type="datetimeFigureOut">
               <a:rPr lang="en-US" dirty="0"/>
               <a:pPr/>
-              <a:t>12/9/2016</a:t>
+              <a:t>12/12/2016</a:t>
             </a:fld>
             <a:endParaRPr lang="en-US" dirty="0"/>
           </a:p>
@@ -3233,7 +3233,7 @@
             <a:fld id="{B61BEF0D-F0BB-DE4B-95CE-6DB70DBA9567}" type="datetimeFigureOut">
               <a:rPr lang="en-US" dirty="0"/>
               <a:pPr/>
-              <a:t>12/9/2016</a:t>
+              <a:t>12/12/2016</a:t>
             </a:fld>
             <a:endParaRPr lang="en-US" dirty="0"/>
           </a:p>
@@ -5742,21 +5742,21 @@
             <a:pPr lvl="1"/>
             <a:r>
               <a:rPr lang="en-US" dirty="0"/>
-              <a:t>One CPU / four cores</a:t>
+              <a:t>One CPU / four cores – per instance</a:t>
             </a:r>
           </a:p>
           <a:p>
             <a:pPr lvl="1"/>
             <a:r>
               <a:rPr lang="en-US" dirty="0"/>
-              <a:t>1.4 GB RAM (buffer pool)</a:t>
+              <a:t>1.4 GB RAM (buffer pool) – per instance</a:t>
             </a:r>
           </a:p>
           <a:p>
             <a:pPr lvl="1"/>
             <a:r>
               <a:rPr lang="en-US" dirty="0"/>
-              <a:t>350 MB for in-memory tables</a:t>
+              <a:t>350 MB for in-memory tables – per instance</a:t>
             </a:r>
           </a:p>
           <a:p>
@@ -5771,7 +5771,7 @@
             </a:r>
             <a:r>
               <a:rPr lang="en-US" dirty="0"/>
-              <a:t> data</a:t>
+              <a:t> data – per database</a:t>
             </a:r>
           </a:p>
           <a:p>

</xml_diff>

<commit_message>
Clarify limits that don't apply to buffer pool.
See https://blogs.msdn.microsoft.com/sql_server_team/sql-server-2016-sp1-know-your-limits/
</commit_message>
<xml_diff>
--- a/AwesomeFreeSQLServerFeatures.pptx
+++ b/AwesomeFreeSQLServerFeatures.pptx
@@ -5756,7 +5756,7 @@
             <a:pPr lvl="1"/>
             <a:r>
               <a:rPr lang="en-US" dirty="0"/>
-              <a:t>350 MB for in-memory tables – per instance</a:t>
+              <a:t>350 MB for in-memory tables – per instance, not counted toward buffer pool limit</a:t>
             </a:r>
           </a:p>
           <a:p>
@@ -5771,8 +5771,21 @@
             </a:r>
             <a:r>
               <a:rPr lang="en-US" dirty="0"/>
-              <a:t> data – per database</a:t>
-            </a:r>
+              <a:t> data – </a:t>
+            </a:r>
+            <a:r>
+              <a:rPr lang="en-US"/>
+              <a:t>per database</a:t>
+            </a:r>
+            <a:r>
+              <a:rPr lang="en-US"/>
+              <a:t>, </a:t>
+            </a:r>
+            <a:r>
+              <a:rPr lang="en-US"/>
+              <a:t>not counted toward buffer pool limit</a:t>
+            </a:r>
+            <a:endParaRPr lang="en-US" dirty="0"/>
           </a:p>
           <a:p>
             <a:r>

</xml_diff>

<commit_message>
Add feature index slide and initial RLS slide.
</commit_message>
<xml_diff>
--- a/AwesomeFreeSQLServerFeatures.pptx
+++ b/AwesomeFreeSQLServerFeatures.pptx
@@ -10,7 +10,9 @@
     <p:sldId id="259" r:id="rId4"/>
     <p:sldId id="260" r:id="rId5"/>
     <p:sldId id="261" r:id="rId6"/>
-    <p:sldId id="258" r:id="rId7"/>
+    <p:sldId id="262" r:id="rId7"/>
+    <p:sldId id="263" r:id="rId8"/>
+    <p:sldId id="258" r:id="rId9"/>
   </p:sldIdLst>
   <p:sldSz cx="12192000" cy="6858000"/>
   <p:notesSz cx="6858000" cy="9144000"/>
@@ -5775,15 +5777,7 @@
             </a:r>
             <a:r>
               <a:rPr lang="en-US"/>
-              <a:t>per database</a:t>
-            </a:r>
-            <a:r>
-              <a:rPr lang="en-US"/>
-              <a:t>, </a:t>
-            </a:r>
-            <a:r>
-              <a:rPr lang="en-US"/>
-              <a:t>not counted toward buffer pool limit</a:t>
+              <a:t>per database, not counted toward buffer pool limit</a:t>
             </a:r>
             <a:endParaRPr lang="en-US" dirty="0"/>
           </a:p>
@@ -5858,6 +5852,238 @@
 </file>
 
 <file path=ppt/slides/slide6.xml><?xml version="1.0" encoding="utf-8"?>
+<p:sld xmlns:a="http://schemas.openxmlformats.org/drawingml/2006/main" xmlns:r="http://schemas.openxmlformats.org/officeDocument/2006/relationships" xmlns:p="http://schemas.openxmlformats.org/presentationml/2006/main">
+  <p:cSld>
+    <p:spTree>
+      <p:nvGrpSpPr>
+        <p:cNvPr id="1" name=""/>
+        <p:cNvGrpSpPr/>
+        <p:nvPr/>
+      </p:nvGrpSpPr>
+      <p:grpSpPr>
+        <a:xfrm>
+          <a:off x="0" y="0"/>
+          <a:ext cx="0" cy="0"/>
+          <a:chOff x="0" y="0"/>
+          <a:chExt cx="0" cy="0"/>
+        </a:xfrm>
+      </p:grpSpPr>
+      <p:sp>
+        <p:nvSpPr>
+          <p:cNvPr id="2" name="Title 1"/>
+          <p:cNvSpPr>
+            <a:spLocks noGrp="1"/>
+          </p:cNvSpPr>
+          <p:nvPr>
+            <p:ph type="title"/>
+          </p:nvPr>
+        </p:nvSpPr>
+        <p:spPr/>
+        <p:txBody>
+          <a:bodyPr/>
+          <a:lstStyle/>
+          <a:p>
+            <a:r>
+              <a:rPr lang="en-US" dirty="0"/>
+              <a:t>SQL Server Features</a:t>
+            </a:r>
+          </a:p>
+        </p:txBody>
+      </p:sp>
+      <p:sp>
+        <p:nvSpPr>
+          <p:cNvPr id="3" name="Content Placeholder 2"/>
+          <p:cNvSpPr>
+            <a:spLocks noGrp="1"/>
+          </p:cNvSpPr>
+          <p:nvPr>
+            <p:ph idx="1"/>
+          </p:nvPr>
+        </p:nvSpPr>
+        <p:spPr/>
+        <p:txBody>
+          <a:bodyPr>
+            <a:normAutofit fontScale="92500" lnSpcReduction="10000"/>
+          </a:bodyPr>
+          <a:lstStyle/>
+          <a:p>
+            <a:r>
+              <a:rPr lang="en-US" dirty="0"/>
+              <a:t>Security</a:t>
+            </a:r>
+          </a:p>
+          <a:p>
+            <a:pPr lvl="1"/>
+            <a:r>
+              <a:rPr lang="en-US" dirty="0">
+                <a:solidFill>
+                  <a:srgbClr val="FF0000"/>
+                </a:solidFill>
+              </a:rPr>
+              <a:t>Row-Level Security</a:t>
+            </a:r>
+          </a:p>
+          <a:p>
+            <a:pPr lvl="1"/>
+            <a:r>
+              <a:rPr lang="en-US" dirty="0"/>
+              <a:t>Always Encrypted</a:t>
+            </a:r>
+          </a:p>
+          <a:p>
+            <a:r>
+              <a:rPr lang="en-US" dirty="0"/>
+              <a:t>Utility</a:t>
+            </a:r>
+          </a:p>
+          <a:p>
+            <a:pPr lvl="1"/>
+            <a:r>
+              <a:rPr lang="en-US" dirty="0"/>
+              <a:t>Snapshots</a:t>
+            </a:r>
+          </a:p>
+          <a:p>
+            <a:pPr lvl="1"/>
+            <a:r>
+              <a:rPr lang="en-US" dirty="0" err="1"/>
+              <a:t>Filestream</a:t>
+            </a:r>
+            <a:endParaRPr lang="en-US" dirty="0"/>
+          </a:p>
+          <a:p>
+            <a:r>
+              <a:rPr lang="en-US" dirty="0"/>
+              <a:t>Performance</a:t>
+            </a:r>
+          </a:p>
+          <a:p>
+            <a:pPr lvl="1"/>
+            <a:r>
+              <a:rPr lang="en-US" dirty="0" err="1"/>
+              <a:t>Columnstore</a:t>
+            </a:r>
+            <a:r>
+              <a:rPr lang="en-US" dirty="0"/>
+              <a:t> Indexes</a:t>
+            </a:r>
+          </a:p>
+          <a:p>
+            <a:pPr lvl="1"/>
+            <a:r>
+              <a:rPr lang="en-US" dirty="0"/>
+              <a:t>Partitioning</a:t>
+            </a:r>
+          </a:p>
+          <a:p>
+            <a:pPr lvl="1"/>
+            <a:r>
+              <a:rPr lang="en-US" dirty="0"/>
+              <a:t>Compression</a:t>
+            </a:r>
+          </a:p>
+          <a:p>
+            <a:pPr lvl="1"/>
+            <a:r>
+              <a:rPr lang="en-US" dirty="0"/>
+              <a:t>In-Memory OLTP (</a:t>
+            </a:r>
+            <a:r>
+              <a:rPr lang="en-US" dirty="0" err="1"/>
+              <a:t>Hekaton</a:t>
+            </a:r>
+            <a:r>
+              <a:rPr lang="en-US" dirty="0"/>
+              <a:t>)</a:t>
+            </a:r>
+          </a:p>
+        </p:txBody>
+      </p:sp>
+    </p:spTree>
+    <p:extLst>
+      <p:ext uri="{BB962C8B-B14F-4D97-AF65-F5344CB8AC3E}">
+        <p14:creationId xmlns:p14="http://schemas.microsoft.com/office/powerpoint/2010/main" val="1218328260"/>
+      </p:ext>
+    </p:extLst>
+  </p:cSld>
+  <p:clrMapOvr>
+    <a:masterClrMapping/>
+  </p:clrMapOvr>
+</p:sld>
+</file>
+
+<file path=ppt/slides/slide7.xml><?xml version="1.0" encoding="utf-8"?>
+<p:sld xmlns:a="http://schemas.openxmlformats.org/drawingml/2006/main" xmlns:r="http://schemas.openxmlformats.org/officeDocument/2006/relationships" xmlns:p="http://schemas.openxmlformats.org/presentationml/2006/main">
+  <p:cSld>
+    <p:spTree>
+      <p:nvGrpSpPr>
+        <p:cNvPr id="1" name=""/>
+        <p:cNvGrpSpPr/>
+        <p:nvPr/>
+      </p:nvGrpSpPr>
+      <p:grpSpPr>
+        <a:xfrm>
+          <a:off x="0" y="0"/>
+          <a:ext cx="0" cy="0"/>
+          <a:chOff x="0" y="0"/>
+          <a:chExt cx="0" cy="0"/>
+        </a:xfrm>
+      </p:grpSpPr>
+      <p:sp>
+        <p:nvSpPr>
+          <p:cNvPr id="2" name="Title 1"/>
+          <p:cNvSpPr>
+            <a:spLocks noGrp="1"/>
+          </p:cNvSpPr>
+          <p:nvPr>
+            <p:ph type="title"/>
+          </p:nvPr>
+        </p:nvSpPr>
+        <p:spPr/>
+        <p:txBody>
+          <a:bodyPr/>
+          <a:lstStyle/>
+          <a:p>
+            <a:r>
+              <a:rPr lang="en-US" dirty="0"/>
+              <a:t>Row-Level Security</a:t>
+            </a:r>
+          </a:p>
+        </p:txBody>
+      </p:sp>
+      <p:sp>
+        <p:nvSpPr>
+          <p:cNvPr id="3" name="Content Placeholder 2"/>
+          <p:cNvSpPr>
+            <a:spLocks noGrp="1"/>
+          </p:cNvSpPr>
+          <p:nvPr>
+            <p:ph idx="1"/>
+          </p:nvPr>
+        </p:nvSpPr>
+        <p:spPr/>
+        <p:txBody>
+          <a:bodyPr/>
+          <a:lstStyle/>
+          <a:p>
+            <a:endParaRPr lang="en-US"/>
+          </a:p>
+        </p:txBody>
+      </p:sp>
+    </p:spTree>
+    <p:extLst>
+      <p:ext uri="{BB962C8B-B14F-4D97-AF65-F5344CB8AC3E}">
+        <p14:creationId xmlns:p14="http://schemas.microsoft.com/office/powerpoint/2010/main" val="2443207938"/>
+      </p:ext>
+    </p:extLst>
+  </p:cSld>
+  <p:clrMapOvr>
+    <a:masterClrMapping/>
+  </p:clrMapOvr>
+</p:sld>
+</file>
+
+<file path=ppt/slides/slide8.xml><?xml version="1.0" encoding="utf-8"?>
 <p:sld xmlns:a="http://schemas.openxmlformats.org/drawingml/2006/main" xmlns:r="http://schemas.openxmlformats.org/officeDocument/2006/relationships" xmlns:p="http://schemas.openxmlformats.org/presentationml/2006/main">
   <p:cSld>
     <p:spTree>

</xml_diff>

<commit_message>
Note limit of MAXDOP 1 on columnstore and in-memory tables.
</commit_message>
<xml_diff>
--- a/AwesomeFreeSQLServerFeatures.pptx
+++ b/AwesomeFreeSQLServerFeatures.pptx
@@ -365,7 +365,7 @@
             <a:fld id="{B61BEF0D-F0BB-DE4B-95CE-6DB70DBA9567}" type="datetimeFigureOut">
               <a:rPr lang="en-US" dirty="0"/>
               <a:pPr/>
-              <a:t>12/12/2016</a:t>
+              <a:t>12/13/2016</a:t>
             </a:fld>
             <a:endParaRPr lang="en-US" dirty="0"/>
           </a:p>
@@ -624,7 +624,7 @@
             <a:fld id="{B61BEF0D-F0BB-DE4B-95CE-6DB70DBA9567}" type="datetimeFigureOut">
               <a:rPr lang="en-US" dirty="0"/>
               <a:pPr/>
-              <a:t>12/12/2016</a:t>
+              <a:t>12/13/2016</a:t>
             </a:fld>
             <a:endParaRPr lang="en-US" dirty="0"/>
           </a:p>
@@ -856,7 +856,7 @@
             <a:fld id="{B61BEF0D-F0BB-DE4B-95CE-6DB70DBA9567}" type="datetimeFigureOut">
               <a:rPr lang="en-US" dirty="0"/>
               <a:pPr/>
-              <a:t>12/12/2016</a:t>
+              <a:t>12/13/2016</a:t>
             </a:fld>
             <a:endParaRPr lang="en-US" dirty="0"/>
           </a:p>
@@ -1093,7 +1093,7 @@
             <a:fld id="{B61BEF0D-F0BB-DE4B-95CE-6DB70DBA9567}" type="datetimeFigureOut">
               <a:rPr lang="en-US" dirty="0"/>
               <a:pPr/>
-              <a:t>12/12/2016</a:t>
+              <a:t>12/13/2016</a:t>
             </a:fld>
             <a:endParaRPr lang="en-US" dirty="0"/>
           </a:p>
@@ -1397,7 +1397,7 @@
             <a:fld id="{B61BEF0D-F0BB-DE4B-95CE-6DB70DBA9567}" type="datetimeFigureOut">
               <a:rPr lang="en-US" dirty="0"/>
               <a:pPr/>
-              <a:t>12/12/2016</a:t>
+              <a:t>12/13/2016</a:t>
             </a:fld>
             <a:endParaRPr lang="en-US" dirty="0"/>
           </a:p>
@@ -1696,7 +1696,7 @@
             <a:fld id="{B61BEF0D-F0BB-DE4B-95CE-6DB70DBA9567}" type="datetimeFigureOut">
               <a:rPr lang="en-US" dirty="0"/>
               <a:pPr/>
-              <a:t>12/12/2016</a:t>
+              <a:t>12/13/2016</a:t>
             </a:fld>
             <a:endParaRPr lang="en-US" dirty="0"/>
           </a:p>
@@ -2115,7 +2115,7 @@
             <a:fld id="{B61BEF0D-F0BB-DE4B-95CE-6DB70DBA9567}" type="datetimeFigureOut">
               <a:rPr lang="en-US" dirty="0"/>
               <a:pPr/>
-              <a:t>12/12/2016</a:t>
+              <a:t>12/13/2016</a:t>
             </a:fld>
             <a:endParaRPr lang="en-US" dirty="0"/>
           </a:p>
@@ -2274,7 +2274,7 @@
             <a:fld id="{B61BEF0D-F0BB-DE4B-95CE-6DB70DBA9567}" type="datetimeFigureOut">
               <a:rPr lang="en-US" dirty="0"/>
               <a:pPr/>
-              <a:t>12/12/2016</a:t>
+              <a:t>12/13/2016</a:t>
             </a:fld>
             <a:endParaRPr lang="en-US" dirty="0"/>
           </a:p>
@@ -2366,7 +2366,7 @@
             <a:fld id="{B61BEF0D-F0BB-DE4B-95CE-6DB70DBA9567}" type="datetimeFigureOut">
               <a:rPr lang="en-US" dirty="0"/>
               <a:pPr/>
-              <a:t>12/12/2016</a:t>
+              <a:t>12/13/2016</a:t>
             </a:fld>
             <a:endParaRPr lang="en-US" dirty="0"/>
           </a:p>
@@ -2741,7 +2741,7 @@
             <a:fld id="{B61BEF0D-F0BB-DE4B-95CE-6DB70DBA9567}" type="datetimeFigureOut">
               <a:rPr lang="en-US" dirty="0"/>
               <a:pPr/>
-              <a:t>12/12/2016</a:t>
+              <a:t>12/13/2016</a:t>
             </a:fld>
             <a:endParaRPr lang="en-US" dirty="0"/>
           </a:p>
@@ -3027,7 +3027,7 @@
             <a:fld id="{B61BEF0D-F0BB-DE4B-95CE-6DB70DBA9567}" type="datetimeFigureOut">
               <a:rPr lang="en-US" dirty="0"/>
               <a:pPr/>
-              <a:t>12/12/2016</a:t>
+              <a:t>12/13/2016</a:t>
             </a:fld>
             <a:endParaRPr lang="en-US" dirty="0"/>
           </a:p>
@@ -3235,7 +3235,7 @@
             <a:fld id="{B61BEF0D-F0BB-DE4B-95CE-6DB70DBA9567}" type="datetimeFigureOut">
               <a:rPr lang="en-US" dirty="0"/>
               <a:pPr/>
-              <a:t>12/12/2016</a:t>
+              <a:t>12/13/2016</a:t>
             </a:fld>
             <a:endParaRPr lang="en-US" dirty="0"/>
           </a:p>
@@ -5758,7 +5758,7 @@
             <a:pPr lvl="1"/>
             <a:r>
               <a:rPr lang="en-US" dirty="0"/>
-              <a:t>350 MB for in-memory tables – per instance, not counted toward buffer pool limit</a:t>
+              <a:t>350 MB for in-memory tables – per instance, not counted toward buffer pool limit – single-threaded only</a:t>
             </a:r>
           </a:p>
           <a:p>
@@ -5773,11 +5773,19 @@
             </a:r>
             <a:r>
               <a:rPr lang="en-US" dirty="0"/>
-              <a:t> data – </a:t>
-            </a:r>
-            <a:r>
-              <a:rPr lang="en-US"/>
-              <a:t>per database, not counted toward buffer pool limit</a:t>
+              <a:t> data – per database, not counted toward buffer </a:t>
+            </a:r>
+            <a:r>
+              <a:rPr lang="en-US"/>
+              <a:t>pool </a:t>
+            </a:r>
+            <a:r>
+              <a:rPr lang="en-US"/>
+              <a:t>limit</a:t>
+            </a:r>
+            <a:r>
+              <a:rPr lang="en-US"/>
+              <a:t> – single-threaded only</a:t>
             </a:r>
             <a:endParaRPr lang="en-US" dirty="0"/>
           </a:p>

</xml_diff>

<commit_message>
Added a small bit of licensing information.
</commit_message>
<xml_diff>
--- a/AwesomeFreeSQLServerFeatures.pptx
+++ b/AwesomeFreeSQLServerFeatures.pptx
@@ -4,6 +4,9 @@
   <p:sldMasterIdLst>
     <p:sldMasterId id="2147483648" r:id="rId1"/>
   </p:sldMasterIdLst>
+  <p:notesMasterIdLst>
+    <p:notesMasterId r:id="rId10"/>
+  </p:notesMasterIdLst>
   <p:sldIdLst>
     <p:sldId id="256" r:id="rId2"/>
     <p:sldId id="257" r:id="rId3"/>
@@ -119,6 +122,448 @@
 </p:presentation>
 </file>
 
+<file path=ppt/notesMasters/notesMaster1.xml><?xml version="1.0" encoding="utf-8"?>
+<p:notesMaster xmlns:a="http://schemas.openxmlformats.org/drawingml/2006/main" xmlns:r="http://schemas.openxmlformats.org/officeDocument/2006/relationships" xmlns:p="http://schemas.openxmlformats.org/presentationml/2006/main">
+  <p:cSld>
+    <p:bg>
+      <p:bgRef idx="1001">
+        <a:schemeClr val="bg1"/>
+      </p:bgRef>
+    </p:bg>
+    <p:spTree>
+      <p:nvGrpSpPr>
+        <p:cNvPr id="1" name=""/>
+        <p:cNvGrpSpPr/>
+        <p:nvPr/>
+      </p:nvGrpSpPr>
+      <p:grpSpPr>
+        <a:xfrm>
+          <a:off x="0" y="0"/>
+          <a:ext cx="0" cy="0"/>
+          <a:chOff x="0" y="0"/>
+          <a:chExt cx="0" cy="0"/>
+        </a:xfrm>
+      </p:grpSpPr>
+      <p:sp>
+        <p:nvSpPr>
+          <p:cNvPr id="2" name="Header Placeholder 1"/>
+          <p:cNvSpPr>
+            <a:spLocks noGrp="1"/>
+          </p:cNvSpPr>
+          <p:nvPr>
+            <p:ph type="hdr" sz="quarter"/>
+          </p:nvPr>
+        </p:nvSpPr>
+        <p:spPr>
+          <a:xfrm>
+            <a:off x="0" y="0"/>
+            <a:ext cx="2971800" cy="458788"/>
+          </a:xfrm>
+          <a:prstGeom prst="rect">
+            <a:avLst/>
+          </a:prstGeom>
+        </p:spPr>
+        <p:txBody>
+          <a:bodyPr vert="horz" lIns="91440" tIns="45720" rIns="91440" bIns="45720" rtlCol="0"/>
+          <a:lstStyle>
+            <a:lvl1pPr algn="l">
+              <a:defRPr sz="1200"/>
+            </a:lvl1pPr>
+          </a:lstStyle>
+          <a:p>
+            <a:endParaRPr lang="en-US"/>
+          </a:p>
+        </p:txBody>
+      </p:sp>
+      <p:sp>
+        <p:nvSpPr>
+          <p:cNvPr id="3" name="Date Placeholder 2"/>
+          <p:cNvSpPr>
+            <a:spLocks noGrp="1"/>
+          </p:cNvSpPr>
+          <p:nvPr>
+            <p:ph type="dt" idx="1"/>
+          </p:nvPr>
+        </p:nvSpPr>
+        <p:spPr>
+          <a:xfrm>
+            <a:off x="3884613" y="0"/>
+            <a:ext cx="2971800" cy="458788"/>
+          </a:xfrm>
+          <a:prstGeom prst="rect">
+            <a:avLst/>
+          </a:prstGeom>
+        </p:spPr>
+        <p:txBody>
+          <a:bodyPr vert="horz" lIns="91440" tIns="45720" rIns="91440" bIns="45720" rtlCol="0"/>
+          <a:lstStyle>
+            <a:lvl1pPr algn="r">
+              <a:defRPr sz="1200"/>
+            </a:lvl1pPr>
+          </a:lstStyle>
+          <a:p>
+            <a:fld id="{64F240C7-B8B6-4D73-9667-9F7409B58D21}" type="datetimeFigureOut">
+              <a:rPr lang="en-US" smtClean="0"/>
+              <a:t>2/14/2017</a:t>
+            </a:fld>
+            <a:endParaRPr lang="en-US"/>
+          </a:p>
+        </p:txBody>
+      </p:sp>
+      <p:sp>
+        <p:nvSpPr>
+          <p:cNvPr id="4" name="Slide Image Placeholder 3"/>
+          <p:cNvSpPr>
+            <a:spLocks noGrp="1" noRot="1" noChangeAspect="1"/>
+          </p:cNvSpPr>
+          <p:nvPr>
+            <p:ph type="sldImg" idx="2"/>
+          </p:nvPr>
+        </p:nvSpPr>
+        <p:spPr>
+          <a:xfrm>
+            <a:off x="685800" y="1143000"/>
+            <a:ext cx="5486400" cy="3086100"/>
+          </a:xfrm>
+          <a:prstGeom prst="rect">
+            <a:avLst/>
+          </a:prstGeom>
+          <a:noFill/>
+          <a:ln w="12700">
+            <a:solidFill>
+              <a:prstClr val="black"/>
+            </a:solidFill>
+          </a:ln>
+        </p:spPr>
+        <p:txBody>
+          <a:bodyPr vert="horz" lIns="91440" tIns="45720" rIns="91440" bIns="45720" rtlCol="0" anchor="ctr"/>
+          <a:lstStyle/>
+          <a:p>
+            <a:endParaRPr lang="en-US"/>
+          </a:p>
+        </p:txBody>
+      </p:sp>
+      <p:sp>
+        <p:nvSpPr>
+          <p:cNvPr id="5" name="Notes Placeholder 4"/>
+          <p:cNvSpPr>
+            <a:spLocks noGrp="1"/>
+          </p:cNvSpPr>
+          <p:nvPr>
+            <p:ph type="body" sz="quarter" idx="3"/>
+          </p:nvPr>
+        </p:nvSpPr>
+        <p:spPr>
+          <a:xfrm>
+            <a:off x="685800" y="4400550"/>
+            <a:ext cx="5486400" cy="3600450"/>
+          </a:xfrm>
+          <a:prstGeom prst="rect">
+            <a:avLst/>
+          </a:prstGeom>
+        </p:spPr>
+        <p:txBody>
+          <a:bodyPr vert="horz" lIns="91440" tIns="45720" rIns="91440" bIns="45720" rtlCol="0"/>
+          <a:lstStyle/>
+          <a:p>
+            <a:pPr lvl="0"/>
+            <a:r>
+              <a:rPr lang="en-US"/>
+              <a:t>Edit Master text styles</a:t>
+            </a:r>
+          </a:p>
+          <a:p>
+            <a:pPr lvl="1"/>
+            <a:r>
+              <a:rPr lang="en-US"/>
+              <a:t>Second level</a:t>
+            </a:r>
+          </a:p>
+          <a:p>
+            <a:pPr lvl="2"/>
+            <a:r>
+              <a:rPr lang="en-US"/>
+              <a:t>Third level</a:t>
+            </a:r>
+          </a:p>
+          <a:p>
+            <a:pPr lvl="3"/>
+            <a:r>
+              <a:rPr lang="en-US"/>
+              <a:t>Fourth level</a:t>
+            </a:r>
+          </a:p>
+          <a:p>
+            <a:pPr lvl="4"/>
+            <a:r>
+              <a:rPr lang="en-US"/>
+              <a:t>Fifth level</a:t>
+            </a:r>
+            <a:endParaRPr lang="en-US"/>
+          </a:p>
+        </p:txBody>
+      </p:sp>
+      <p:sp>
+        <p:nvSpPr>
+          <p:cNvPr id="6" name="Footer Placeholder 5"/>
+          <p:cNvSpPr>
+            <a:spLocks noGrp="1"/>
+          </p:cNvSpPr>
+          <p:nvPr>
+            <p:ph type="ftr" sz="quarter" idx="4"/>
+          </p:nvPr>
+        </p:nvSpPr>
+        <p:spPr>
+          <a:xfrm>
+            <a:off x="0" y="8685213"/>
+            <a:ext cx="2971800" cy="458787"/>
+          </a:xfrm>
+          <a:prstGeom prst="rect">
+            <a:avLst/>
+          </a:prstGeom>
+        </p:spPr>
+        <p:txBody>
+          <a:bodyPr vert="horz" lIns="91440" tIns="45720" rIns="91440" bIns="45720" rtlCol="0" anchor="b"/>
+          <a:lstStyle>
+            <a:lvl1pPr algn="l">
+              <a:defRPr sz="1200"/>
+            </a:lvl1pPr>
+          </a:lstStyle>
+          <a:p>
+            <a:endParaRPr lang="en-US"/>
+          </a:p>
+        </p:txBody>
+      </p:sp>
+      <p:sp>
+        <p:nvSpPr>
+          <p:cNvPr id="7" name="Slide Number Placeholder 6"/>
+          <p:cNvSpPr>
+            <a:spLocks noGrp="1"/>
+          </p:cNvSpPr>
+          <p:nvPr>
+            <p:ph type="sldNum" sz="quarter" idx="5"/>
+          </p:nvPr>
+        </p:nvSpPr>
+        <p:spPr>
+          <a:xfrm>
+            <a:off x="3884613" y="8685213"/>
+            <a:ext cx="2971800" cy="458787"/>
+          </a:xfrm>
+          <a:prstGeom prst="rect">
+            <a:avLst/>
+          </a:prstGeom>
+        </p:spPr>
+        <p:txBody>
+          <a:bodyPr vert="horz" lIns="91440" tIns="45720" rIns="91440" bIns="45720" rtlCol="0" anchor="b"/>
+          <a:lstStyle>
+            <a:lvl1pPr algn="r">
+              <a:defRPr sz="1200"/>
+            </a:lvl1pPr>
+          </a:lstStyle>
+          <a:p>
+            <a:fld id="{8B5705F6-219D-4122-80FA-D82FBBCA0869}" type="slidenum">
+              <a:rPr lang="en-US" smtClean="0"/>
+              <a:t>‹#›</a:t>
+            </a:fld>
+            <a:endParaRPr lang="en-US"/>
+          </a:p>
+        </p:txBody>
+      </p:sp>
+    </p:spTree>
+    <p:extLst>
+      <p:ext uri="{BB962C8B-B14F-4D97-AF65-F5344CB8AC3E}">
+        <p14:creationId xmlns:p14="http://schemas.microsoft.com/office/powerpoint/2010/main" val="1135514079"/>
+      </p:ext>
+    </p:extLst>
+  </p:cSld>
+  <p:clrMap bg1="lt1" tx1="dk1" bg2="lt2" tx2="dk2" accent1="accent1" accent2="accent2" accent3="accent3" accent4="accent4" accent5="accent5" accent6="accent6" hlink="hlink" folHlink="folHlink"/>
+  <p:notesStyle>
+    <a:lvl1pPr marL="0" algn="l" defTabSz="914400" rtl="0" eaLnBrk="1" latinLnBrk="0" hangingPunct="1">
+      <a:defRPr sz="1200" kern="1200">
+        <a:solidFill>
+          <a:schemeClr val="tx1"/>
+        </a:solidFill>
+        <a:latin typeface="+mn-lt"/>
+        <a:ea typeface="+mn-ea"/>
+        <a:cs typeface="+mn-cs"/>
+      </a:defRPr>
+    </a:lvl1pPr>
+    <a:lvl2pPr marL="457200" algn="l" defTabSz="914400" rtl="0" eaLnBrk="1" latinLnBrk="0" hangingPunct="1">
+      <a:defRPr sz="1200" kern="1200">
+        <a:solidFill>
+          <a:schemeClr val="tx1"/>
+        </a:solidFill>
+        <a:latin typeface="+mn-lt"/>
+        <a:ea typeface="+mn-ea"/>
+        <a:cs typeface="+mn-cs"/>
+      </a:defRPr>
+    </a:lvl2pPr>
+    <a:lvl3pPr marL="914400" algn="l" defTabSz="914400" rtl="0" eaLnBrk="1" latinLnBrk="0" hangingPunct="1">
+      <a:defRPr sz="1200" kern="1200">
+        <a:solidFill>
+          <a:schemeClr val="tx1"/>
+        </a:solidFill>
+        <a:latin typeface="+mn-lt"/>
+        <a:ea typeface="+mn-ea"/>
+        <a:cs typeface="+mn-cs"/>
+      </a:defRPr>
+    </a:lvl3pPr>
+    <a:lvl4pPr marL="1371600" algn="l" defTabSz="914400" rtl="0" eaLnBrk="1" latinLnBrk="0" hangingPunct="1">
+      <a:defRPr sz="1200" kern="1200">
+        <a:solidFill>
+          <a:schemeClr val="tx1"/>
+        </a:solidFill>
+        <a:latin typeface="+mn-lt"/>
+        <a:ea typeface="+mn-ea"/>
+        <a:cs typeface="+mn-cs"/>
+      </a:defRPr>
+    </a:lvl4pPr>
+    <a:lvl5pPr marL="1828800" algn="l" defTabSz="914400" rtl="0" eaLnBrk="1" latinLnBrk="0" hangingPunct="1">
+      <a:defRPr sz="1200" kern="1200">
+        <a:solidFill>
+          <a:schemeClr val="tx1"/>
+        </a:solidFill>
+        <a:latin typeface="+mn-lt"/>
+        <a:ea typeface="+mn-ea"/>
+        <a:cs typeface="+mn-cs"/>
+      </a:defRPr>
+    </a:lvl5pPr>
+    <a:lvl6pPr marL="2286000" algn="l" defTabSz="914400" rtl="0" eaLnBrk="1" latinLnBrk="0" hangingPunct="1">
+      <a:defRPr sz="1200" kern="1200">
+        <a:solidFill>
+          <a:schemeClr val="tx1"/>
+        </a:solidFill>
+        <a:latin typeface="+mn-lt"/>
+        <a:ea typeface="+mn-ea"/>
+        <a:cs typeface="+mn-cs"/>
+      </a:defRPr>
+    </a:lvl6pPr>
+    <a:lvl7pPr marL="2743200" algn="l" defTabSz="914400" rtl="0" eaLnBrk="1" latinLnBrk="0" hangingPunct="1">
+      <a:defRPr sz="1200" kern="1200">
+        <a:solidFill>
+          <a:schemeClr val="tx1"/>
+        </a:solidFill>
+        <a:latin typeface="+mn-lt"/>
+        <a:ea typeface="+mn-ea"/>
+        <a:cs typeface="+mn-cs"/>
+      </a:defRPr>
+    </a:lvl7pPr>
+    <a:lvl8pPr marL="3200400" algn="l" defTabSz="914400" rtl="0" eaLnBrk="1" latinLnBrk="0" hangingPunct="1">
+      <a:defRPr sz="1200" kern="1200">
+        <a:solidFill>
+          <a:schemeClr val="tx1"/>
+        </a:solidFill>
+        <a:latin typeface="+mn-lt"/>
+        <a:ea typeface="+mn-ea"/>
+        <a:cs typeface="+mn-cs"/>
+      </a:defRPr>
+    </a:lvl8pPr>
+    <a:lvl9pPr marL="3657600" algn="l" defTabSz="914400" rtl="0" eaLnBrk="1" latinLnBrk="0" hangingPunct="1">
+      <a:defRPr sz="1200" kern="1200">
+        <a:solidFill>
+          <a:schemeClr val="tx1"/>
+        </a:solidFill>
+        <a:latin typeface="+mn-lt"/>
+        <a:ea typeface="+mn-ea"/>
+        <a:cs typeface="+mn-cs"/>
+      </a:defRPr>
+    </a:lvl9pPr>
+  </p:notesStyle>
+</p:notesMaster>
+</file>
+
+<file path=ppt/notesSlides/notesSlide1.xml><?xml version="1.0" encoding="utf-8"?>
+<p:notes xmlns:a="http://schemas.openxmlformats.org/drawingml/2006/main" xmlns:r="http://schemas.openxmlformats.org/officeDocument/2006/relationships" xmlns:p="http://schemas.openxmlformats.org/presentationml/2006/main">
+  <p:cSld>
+    <p:spTree>
+      <p:nvGrpSpPr>
+        <p:cNvPr id="1" name=""/>
+        <p:cNvGrpSpPr/>
+        <p:nvPr/>
+      </p:nvGrpSpPr>
+      <p:grpSpPr>
+        <a:xfrm>
+          <a:off x="0" y="0"/>
+          <a:ext cx="0" cy="0"/>
+          <a:chOff x="0" y="0"/>
+          <a:chExt cx="0" cy="0"/>
+        </a:xfrm>
+      </p:grpSpPr>
+      <p:sp>
+        <p:nvSpPr>
+          <p:cNvPr id="2" name="Slide Image Placeholder 1"/>
+          <p:cNvSpPr>
+            <a:spLocks noGrp="1" noRot="1" noChangeAspect="1"/>
+          </p:cNvSpPr>
+          <p:nvPr>
+            <p:ph type="sldImg"/>
+          </p:nvPr>
+        </p:nvSpPr>
+        <p:spPr/>
+      </p:sp>
+      <p:sp>
+        <p:nvSpPr>
+          <p:cNvPr id="3" name="Notes Placeholder 2"/>
+          <p:cNvSpPr>
+            <a:spLocks noGrp="1"/>
+          </p:cNvSpPr>
+          <p:nvPr>
+            <p:ph type="body" idx="1"/>
+          </p:nvPr>
+        </p:nvSpPr>
+        <p:spPr/>
+        <p:txBody>
+          <a:bodyPr/>
+          <a:lstStyle/>
+          <a:p>
+            <a:r>
+              <a:rPr lang="en-US" dirty="0"/>
+              <a:t>Licensing is complicated, particularly when factoring in virtualization and high availability.  For simplicity’s sake, consider a stand-alone physical system with 4 cores.  Based on MSRP, Enterprise Edition for SQL Server 2016 will cost about $28,500 and Standard Edition will be about $7,500 (but can be less if a small number of clients use the server).  Prices for Web edition are not published.  See </a:t>
+            </a:r>
+            <a:r>
+              <a:rPr lang="en-US" dirty="0"/>
+              <a:t>https://www.microsoft.com/en-us/sql-server/sql-server-2016-pricing.</a:t>
+            </a:r>
+            <a:endParaRPr lang="en-US" dirty="0"/>
+          </a:p>
+        </p:txBody>
+      </p:sp>
+      <p:sp>
+        <p:nvSpPr>
+          <p:cNvPr id="4" name="Slide Number Placeholder 3"/>
+          <p:cNvSpPr>
+            <a:spLocks noGrp="1"/>
+          </p:cNvSpPr>
+          <p:nvPr>
+            <p:ph type="sldNum" sz="quarter" idx="10"/>
+          </p:nvPr>
+        </p:nvSpPr>
+        <p:spPr/>
+        <p:txBody>
+          <a:bodyPr/>
+          <a:lstStyle/>
+          <a:p>
+            <a:fld id="{8B5705F6-219D-4122-80FA-D82FBBCA0869}" type="slidenum">
+              <a:rPr lang="en-US" smtClean="0"/>
+              <a:t>2</a:t>
+            </a:fld>
+            <a:endParaRPr lang="en-US"/>
+          </a:p>
+        </p:txBody>
+      </p:sp>
+    </p:spTree>
+    <p:extLst>
+      <p:ext uri="{BB962C8B-B14F-4D97-AF65-F5344CB8AC3E}">
+        <p14:creationId xmlns:p14="http://schemas.microsoft.com/office/powerpoint/2010/main" val="3254602347"/>
+      </p:ext>
+    </p:extLst>
+  </p:cSld>
+  <p:clrMapOvr>
+    <a:masterClrMapping/>
+  </p:clrMapOvr>
+</p:notes>
+</file>
+
 <file path=ppt/slideLayouts/slideLayout1.xml><?xml version="1.0" encoding="utf-8"?>
 <p:sldLayout xmlns:a="http://schemas.openxmlformats.org/drawingml/2006/main" xmlns:r="http://schemas.openxmlformats.org/officeDocument/2006/relationships" xmlns:p="http://schemas.openxmlformats.org/presentationml/2006/main" type="title" preserve="1">
   <p:cSld name="Title Slide">
@@ -365,7 +810,7 @@
             <a:fld id="{B61BEF0D-F0BB-DE4B-95CE-6DB70DBA9567}" type="datetimeFigureOut">
               <a:rPr lang="en-US" dirty="0"/>
               <a:pPr/>
-              <a:t>12/21/2016</a:t>
+              <a:t>2/8/2017</a:t>
             </a:fld>
             <a:endParaRPr lang="en-US" dirty="0"/>
           </a:p>
@@ -624,7 +1069,7 @@
             <a:fld id="{B61BEF0D-F0BB-DE4B-95CE-6DB70DBA9567}" type="datetimeFigureOut">
               <a:rPr lang="en-US" dirty="0"/>
               <a:pPr/>
-              <a:t>12/21/2016</a:t>
+              <a:t>2/8/2017</a:t>
             </a:fld>
             <a:endParaRPr lang="en-US" dirty="0"/>
           </a:p>
@@ -856,7 +1301,7 @@
             <a:fld id="{B61BEF0D-F0BB-DE4B-95CE-6DB70DBA9567}" type="datetimeFigureOut">
               <a:rPr lang="en-US" dirty="0"/>
               <a:pPr/>
-              <a:t>12/21/2016</a:t>
+              <a:t>2/8/2017</a:t>
             </a:fld>
             <a:endParaRPr lang="en-US" dirty="0"/>
           </a:p>
@@ -1093,7 +1538,7 @@
             <a:fld id="{B61BEF0D-F0BB-DE4B-95CE-6DB70DBA9567}" type="datetimeFigureOut">
               <a:rPr lang="en-US" dirty="0"/>
               <a:pPr/>
-              <a:t>12/21/2016</a:t>
+              <a:t>2/8/2017</a:t>
             </a:fld>
             <a:endParaRPr lang="en-US" dirty="0"/>
           </a:p>
@@ -1397,7 +1842,7 @@
             <a:fld id="{B61BEF0D-F0BB-DE4B-95CE-6DB70DBA9567}" type="datetimeFigureOut">
               <a:rPr lang="en-US" dirty="0"/>
               <a:pPr/>
-              <a:t>12/21/2016</a:t>
+              <a:t>2/8/2017</a:t>
             </a:fld>
             <a:endParaRPr lang="en-US" dirty="0"/>
           </a:p>
@@ -1696,7 +2141,7 @@
             <a:fld id="{B61BEF0D-F0BB-DE4B-95CE-6DB70DBA9567}" type="datetimeFigureOut">
               <a:rPr lang="en-US" dirty="0"/>
               <a:pPr/>
-              <a:t>12/21/2016</a:t>
+              <a:t>2/8/2017</a:t>
             </a:fld>
             <a:endParaRPr lang="en-US" dirty="0"/>
           </a:p>
@@ -2115,7 +2560,7 @@
             <a:fld id="{B61BEF0D-F0BB-DE4B-95CE-6DB70DBA9567}" type="datetimeFigureOut">
               <a:rPr lang="en-US" dirty="0"/>
               <a:pPr/>
-              <a:t>12/21/2016</a:t>
+              <a:t>2/8/2017</a:t>
             </a:fld>
             <a:endParaRPr lang="en-US" dirty="0"/>
           </a:p>
@@ -2274,7 +2719,7 @@
             <a:fld id="{B61BEF0D-F0BB-DE4B-95CE-6DB70DBA9567}" type="datetimeFigureOut">
               <a:rPr lang="en-US" dirty="0"/>
               <a:pPr/>
-              <a:t>12/21/2016</a:t>
+              <a:t>2/8/2017</a:t>
             </a:fld>
             <a:endParaRPr lang="en-US" dirty="0"/>
           </a:p>
@@ -2366,7 +2811,7 @@
             <a:fld id="{B61BEF0D-F0BB-DE4B-95CE-6DB70DBA9567}" type="datetimeFigureOut">
               <a:rPr lang="en-US" dirty="0"/>
               <a:pPr/>
-              <a:t>12/21/2016</a:t>
+              <a:t>2/8/2017</a:t>
             </a:fld>
             <a:endParaRPr lang="en-US" dirty="0"/>
           </a:p>
@@ -2741,7 +3186,7 @@
             <a:fld id="{B61BEF0D-F0BB-DE4B-95CE-6DB70DBA9567}" type="datetimeFigureOut">
               <a:rPr lang="en-US" dirty="0"/>
               <a:pPr/>
-              <a:t>12/21/2016</a:t>
+              <a:t>2/8/2017</a:t>
             </a:fld>
             <a:endParaRPr lang="en-US" dirty="0"/>
           </a:p>
@@ -3027,7 +3472,7 @@
             <a:fld id="{B61BEF0D-F0BB-DE4B-95CE-6DB70DBA9567}" type="datetimeFigureOut">
               <a:rPr lang="en-US" dirty="0"/>
               <a:pPr/>
-              <a:t>12/21/2016</a:t>
+              <a:t>2/8/2017</a:t>
             </a:fld>
             <a:endParaRPr lang="en-US" dirty="0"/>
           </a:p>
@@ -3235,7 +3680,7 @@
             <a:fld id="{B61BEF0D-F0BB-DE4B-95CE-6DB70DBA9567}" type="datetimeFigureOut">
               <a:rPr lang="en-US" dirty="0"/>
               <a:pPr/>
-              <a:t>12/21/2016</a:t>
+              <a:t>2/8/2017</a:t>
             </a:fld>
             <a:endParaRPr lang="en-US" dirty="0"/>
           </a:p>
@@ -6693,4 +7138,299 @@
     </a:ext>
   </a:extLst>
 </a:theme>
+</file>
+
+<file path=ppt/theme/theme2.xml><?xml version="1.0" encoding="utf-8"?>
+<a:theme xmlns:a="http://schemas.openxmlformats.org/drawingml/2006/main" name="Office Theme">
+  <a:themeElements>
+    <a:clrScheme name="Office">
+      <a:dk1>
+        <a:sysClr val="windowText" lastClr="000000"/>
+      </a:dk1>
+      <a:lt1>
+        <a:sysClr val="window" lastClr="FFFFFF"/>
+      </a:lt1>
+      <a:dk2>
+        <a:srgbClr val="44546A"/>
+      </a:dk2>
+      <a:lt2>
+        <a:srgbClr val="E7E6E6"/>
+      </a:lt2>
+      <a:accent1>
+        <a:srgbClr val="4472C4"/>
+      </a:accent1>
+      <a:accent2>
+        <a:srgbClr val="ED7D31"/>
+      </a:accent2>
+      <a:accent3>
+        <a:srgbClr val="A5A5A5"/>
+      </a:accent3>
+      <a:accent4>
+        <a:srgbClr val="FFC000"/>
+      </a:accent4>
+      <a:accent5>
+        <a:srgbClr val="5B9BD5"/>
+      </a:accent5>
+      <a:accent6>
+        <a:srgbClr val="70AD47"/>
+      </a:accent6>
+      <a:hlink>
+        <a:srgbClr val="0563C1"/>
+      </a:hlink>
+      <a:folHlink>
+        <a:srgbClr val="954F72"/>
+      </a:folHlink>
+    </a:clrScheme>
+    <a:fontScheme name="Office">
+      <a:majorFont>
+        <a:latin typeface="Calibri Light" panose="020F0302020204030204"/>
+        <a:ea typeface=""/>
+        <a:cs typeface=""/>
+        <a:font script="Jpan" typeface="游ゴシック Light"/>
+        <a:font script="Hang" typeface="맑은 고딕"/>
+        <a:font script="Hans" typeface="等线 Light"/>
+        <a:font script="Hant" typeface="新細明體"/>
+        <a:font script="Arab" typeface="Times New Roman"/>
+        <a:font script="Hebr" typeface="Times New Roman"/>
+        <a:font script="Thai" typeface="Angsana New"/>
+        <a:font script="Ethi" typeface="Nyala"/>
+        <a:font script="Beng" typeface="Vrinda"/>
+        <a:font script="Gujr" typeface="Shruti"/>
+        <a:font script="Khmr" typeface="MoolBoran"/>
+        <a:font script="Knda" typeface="Tunga"/>
+        <a:font script="Guru" typeface="Raavi"/>
+        <a:font script="Cans" typeface="Euphemia"/>
+        <a:font script="Cher" typeface="Plantagenet Cherokee"/>
+        <a:font script="Yiii" typeface="Microsoft Yi Baiti"/>
+        <a:font script="Tibt" typeface="Microsoft Himalaya"/>
+        <a:font script="Thaa" typeface="MV Boli"/>
+        <a:font script="Deva" typeface="Mangal"/>
+        <a:font script="Telu" typeface="Gautami"/>
+        <a:font script="Taml" typeface="Latha"/>
+        <a:font script="Syrc" typeface="Estrangelo Edessa"/>
+        <a:font script="Orya" typeface="Kalinga"/>
+        <a:font script="Mlym" typeface="Kartika"/>
+        <a:font script="Laoo" typeface="DokChampa"/>
+        <a:font script="Sinh" typeface="Iskoola Pota"/>
+        <a:font script="Mong" typeface="Mongolian Baiti"/>
+        <a:font script="Viet" typeface="Times New Roman"/>
+        <a:font script="Uigh" typeface="Microsoft Uighur"/>
+        <a:font script="Geor" typeface="Sylfaen"/>
+        <a:font script="Armn" typeface="Arial"/>
+        <a:font script="Bugi" typeface="Leelawadee UI"/>
+        <a:font script="Bopo" typeface="Microsoft JhengHei"/>
+        <a:font script="Java" typeface="Javanese Text"/>
+        <a:font script="Lisu" typeface="Segoe UI"/>
+        <a:font script="Mymr" typeface="Myanmar Text"/>
+        <a:font script="Nkoo" typeface="Ebrima"/>
+        <a:font script="Olck" typeface="Nirmala UI"/>
+        <a:font script="Osma" typeface="Ebrima"/>
+        <a:font script="Phag" typeface="Phagspa"/>
+        <a:font script="Syrn" typeface="Estrangelo Edessa"/>
+        <a:font script="Syrj" typeface="Estrangelo Edessa"/>
+        <a:font script="Syre" typeface="Estrangelo Edessa"/>
+        <a:font script="Sora" typeface="Nirmala UI"/>
+        <a:font script="Tale" typeface="Microsoft Tai Le"/>
+        <a:font script="Talu" typeface="Microsoft New Tai Lue"/>
+        <a:font script="Tfng" typeface="Ebrima"/>
+      </a:majorFont>
+      <a:minorFont>
+        <a:latin typeface="Calibri" panose="020F0502020204030204"/>
+        <a:ea typeface=""/>
+        <a:cs typeface=""/>
+        <a:font script="Jpan" typeface="游ゴシック"/>
+        <a:font script="Hang" typeface="맑은 고딕"/>
+        <a:font script="Hans" typeface="等线"/>
+        <a:font script="Hant" typeface="新細明體"/>
+        <a:font script="Arab" typeface="Arial"/>
+        <a:font script="Hebr" typeface="Arial"/>
+        <a:font script="Thai" typeface="Cordia New"/>
+        <a:font script="Ethi" typeface="Nyala"/>
+        <a:font script="Beng" typeface="Vrinda"/>
+        <a:font script="Gujr" typeface="Shruti"/>
+        <a:font script="Khmr" typeface="DaunPenh"/>
+        <a:font script="Knda" typeface="Tunga"/>
+        <a:font script="Guru" typeface="Raavi"/>
+        <a:font script="Cans" typeface="Euphemia"/>
+        <a:font script="Cher" typeface="Plantagenet Cherokee"/>
+        <a:font script="Yiii" typeface="Microsoft Yi Baiti"/>
+        <a:font script="Tibt" typeface="Microsoft Himalaya"/>
+        <a:font script="Thaa" typeface="MV Boli"/>
+        <a:font script="Deva" typeface="Mangal"/>
+        <a:font script="Telu" typeface="Gautami"/>
+        <a:font script="Taml" typeface="Latha"/>
+        <a:font script="Syrc" typeface="Estrangelo Edessa"/>
+        <a:font script="Orya" typeface="Kalinga"/>
+        <a:font script="Mlym" typeface="Kartika"/>
+        <a:font script="Laoo" typeface="DokChampa"/>
+        <a:font script="Sinh" typeface="Iskoola Pota"/>
+        <a:font script="Mong" typeface="Mongolian Baiti"/>
+        <a:font script="Viet" typeface="Arial"/>
+        <a:font script="Uigh" typeface="Microsoft Uighur"/>
+        <a:font script="Geor" typeface="Sylfaen"/>
+        <a:font script="Armn" typeface="Arial"/>
+        <a:font script="Bugi" typeface="Leelawadee UI"/>
+        <a:font script="Bopo" typeface="Microsoft JhengHei"/>
+        <a:font script="Java" typeface="Javanese Text"/>
+        <a:font script="Lisu" typeface="Segoe UI"/>
+        <a:font script="Mymr" typeface="Myanmar Text"/>
+        <a:font script="Nkoo" typeface="Ebrima"/>
+        <a:font script="Olck" typeface="Nirmala UI"/>
+        <a:font script="Osma" typeface="Ebrima"/>
+        <a:font script="Phag" typeface="Phagspa"/>
+        <a:font script="Syrn" typeface="Estrangelo Edessa"/>
+        <a:font script="Syrj" typeface="Estrangelo Edessa"/>
+        <a:font script="Syre" typeface="Estrangelo Edessa"/>
+        <a:font script="Sora" typeface="Nirmala UI"/>
+        <a:font script="Tale" typeface="Microsoft Tai Le"/>
+        <a:font script="Talu" typeface="Microsoft New Tai Lue"/>
+        <a:font script="Tfng" typeface="Ebrima"/>
+      </a:minorFont>
+    </a:fontScheme>
+    <a:fmtScheme name="Office">
+      <a:fillStyleLst>
+        <a:solidFill>
+          <a:schemeClr val="phClr"/>
+        </a:solidFill>
+        <a:gradFill rotWithShape="1">
+          <a:gsLst>
+            <a:gs pos="0">
+              <a:schemeClr val="phClr">
+                <a:lumMod val="110000"/>
+                <a:satMod val="105000"/>
+                <a:tint val="67000"/>
+              </a:schemeClr>
+            </a:gs>
+            <a:gs pos="50000">
+              <a:schemeClr val="phClr">
+                <a:lumMod val="105000"/>
+                <a:satMod val="103000"/>
+                <a:tint val="73000"/>
+              </a:schemeClr>
+            </a:gs>
+            <a:gs pos="100000">
+              <a:schemeClr val="phClr">
+                <a:lumMod val="105000"/>
+                <a:satMod val="109000"/>
+                <a:tint val="81000"/>
+              </a:schemeClr>
+            </a:gs>
+          </a:gsLst>
+          <a:lin ang="5400000" scaled="0"/>
+        </a:gradFill>
+        <a:gradFill rotWithShape="1">
+          <a:gsLst>
+            <a:gs pos="0">
+              <a:schemeClr val="phClr">
+                <a:satMod val="103000"/>
+                <a:lumMod val="102000"/>
+                <a:tint val="94000"/>
+              </a:schemeClr>
+            </a:gs>
+            <a:gs pos="50000">
+              <a:schemeClr val="phClr">
+                <a:satMod val="110000"/>
+                <a:lumMod val="100000"/>
+                <a:shade val="100000"/>
+              </a:schemeClr>
+            </a:gs>
+            <a:gs pos="100000">
+              <a:schemeClr val="phClr">
+                <a:lumMod val="99000"/>
+                <a:satMod val="120000"/>
+                <a:shade val="78000"/>
+              </a:schemeClr>
+            </a:gs>
+          </a:gsLst>
+          <a:lin ang="5400000" scaled="0"/>
+        </a:gradFill>
+      </a:fillStyleLst>
+      <a:lnStyleLst>
+        <a:ln w="6350" cap="flat" cmpd="sng" algn="ctr">
+          <a:solidFill>
+            <a:schemeClr val="phClr"/>
+          </a:solidFill>
+          <a:prstDash val="solid"/>
+          <a:miter lim="800000"/>
+        </a:ln>
+        <a:ln w="12700" cap="flat" cmpd="sng" algn="ctr">
+          <a:solidFill>
+            <a:schemeClr val="phClr"/>
+          </a:solidFill>
+          <a:prstDash val="solid"/>
+          <a:miter lim="800000"/>
+        </a:ln>
+        <a:ln w="19050" cap="flat" cmpd="sng" algn="ctr">
+          <a:solidFill>
+            <a:schemeClr val="phClr"/>
+          </a:solidFill>
+          <a:prstDash val="solid"/>
+          <a:miter lim="800000"/>
+        </a:ln>
+      </a:lnStyleLst>
+      <a:effectStyleLst>
+        <a:effectStyle>
+          <a:effectLst/>
+        </a:effectStyle>
+        <a:effectStyle>
+          <a:effectLst/>
+        </a:effectStyle>
+        <a:effectStyle>
+          <a:effectLst>
+            <a:outerShdw blurRad="57150" dist="19050" dir="5400000" algn="ctr" rotWithShape="0">
+              <a:srgbClr val="000000">
+                <a:alpha val="63000"/>
+              </a:srgbClr>
+            </a:outerShdw>
+          </a:effectLst>
+        </a:effectStyle>
+      </a:effectStyleLst>
+      <a:bgFillStyleLst>
+        <a:solidFill>
+          <a:schemeClr val="phClr"/>
+        </a:solidFill>
+        <a:solidFill>
+          <a:schemeClr val="phClr">
+            <a:tint val="95000"/>
+            <a:satMod val="170000"/>
+          </a:schemeClr>
+        </a:solidFill>
+        <a:gradFill rotWithShape="1">
+          <a:gsLst>
+            <a:gs pos="0">
+              <a:schemeClr val="phClr">
+                <a:tint val="93000"/>
+                <a:satMod val="150000"/>
+                <a:shade val="98000"/>
+                <a:lumMod val="102000"/>
+              </a:schemeClr>
+            </a:gs>
+            <a:gs pos="50000">
+              <a:schemeClr val="phClr">
+                <a:tint val="98000"/>
+                <a:satMod val="130000"/>
+                <a:shade val="90000"/>
+                <a:lumMod val="103000"/>
+              </a:schemeClr>
+            </a:gs>
+            <a:gs pos="100000">
+              <a:schemeClr val="phClr">
+                <a:shade val="63000"/>
+                <a:satMod val="120000"/>
+              </a:schemeClr>
+            </a:gs>
+          </a:gsLst>
+          <a:lin ang="5400000" scaled="0"/>
+        </a:gradFill>
+      </a:bgFillStyleLst>
+    </a:fmtScheme>
+  </a:themeElements>
+  <a:objectDefaults/>
+  <a:extraClrSchemeLst/>
+  <a:extLst>
+    <a:ext uri="{05A4C25C-085E-4340-85A3-A5531E510DB2}">
+      <thm15:themeFamily xmlns:thm15="http://schemas.microsoft.com/office/thememl/2012/main" name="Office Theme" id="{62F939B6-93AF-4DB8-9C6B-D6C7DFDC589F}" vid="{4A3C46E8-61CC-4603-A589-7422A47A8E4A}"/>
+    </a:ext>
+  </a:extLst>
+</a:theme>
 </file>
</xml_diff>

<commit_message>
Clarification on feature limitations.
</commit_message>
<xml_diff>
--- a/AwesomeFreeSQLServerFeatures.pptx
+++ b/AwesomeFreeSQLServerFeatures.pptx
@@ -299,7 +299,6 @@
               <a:rPr lang="en-US"/>
               <a:t>Fifth level</a:t>
             </a:r>
-            <a:endParaRPr lang="en-US"/>
           </a:p>
         </p:txBody>
       </p:sp>
@@ -518,13 +517,8 @@
           <a:p>
             <a:r>
               <a:rPr lang="en-US" dirty="0"/>
-              <a:t>Licensing is complicated, particularly when factoring in virtualization and high availability.  For simplicity’s sake, consider a stand-alone physical system with 4 cores.  Based on MSRP, Enterprise Edition for SQL Server 2016 will cost about $28,500 and Standard Edition will be about $7,500 (but can be less if a small number of clients use the server).  Prices for Web edition are not published.  See </a:t>
-            </a:r>
-            <a:r>
-              <a:rPr lang="en-US" dirty="0"/>
-              <a:t>https://www.microsoft.com/en-us/sql-server/sql-server-2016-pricing.</a:t>
-            </a:r>
-            <a:endParaRPr lang="en-US" dirty="0"/>
+              <a:t>Licensing is complicated, particularly when factoring in virtualization and high availability.  For simplicity’s sake, consider a stand-alone physical system with 4 cores.  Based on MSRP, Enterprise Edition for SQL Server 2016 will cost about $28,500 and Standard Edition will be about $7,500 (but can be less if a small number of clients use the server).  Prices for Web edition are not published.  See https://www.microsoft.com/en-us/sql-server/sql-server-2016-pricing.</a:t>
+            </a:r>
           </a:p>
         </p:txBody>
       </p:sp>
@@ -810,7 +804,7 @@
             <a:fld id="{B61BEF0D-F0BB-DE4B-95CE-6DB70DBA9567}" type="datetimeFigureOut">
               <a:rPr lang="en-US" dirty="0"/>
               <a:pPr/>
-              <a:t>2/8/2017</a:t>
+              <a:t>2/14/2017</a:t>
             </a:fld>
             <a:endParaRPr lang="en-US" dirty="0"/>
           </a:p>
@@ -1069,7 +1063,7 @@
             <a:fld id="{B61BEF0D-F0BB-DE4B-95CE-6DB70DBA9567}" type="datetimeFigureOut">
               <a:rPr lang="en-US" dirty="0"/>
               <a:pPr/>
-              <a:t>2/8/2017</a:t>
+              <a:t>2/14/2017</a:t>
             </a:fld>
             <a:endParaRPr lang="en-US" dirty="0"/>
           </a:p>
@@ -1301,7 +1295,7 @@
             <a:fld id="{B61BEF0D-F0BB-DE4B-95CE-6DB70DBA9567}" type="datetimeFigureOut">
               <a:rPr lang="en-US" dirty="0"/>
               <a:pPr/>
-              <a:t>2/8/2017</a:t>
+              <a:t>2/14/2017</a:t>
             </a:fld>
             <a:endParaRPr lang="en-US" dirty="0"/>
           </a:p>
@@ -1538,7 +1532,7 @@
             <a:fld id="{B61BEF0D-F0BB-DE4B-95CE-6DB70DBA9567}" type="datetimeFigureOut">
               <a:rPr lang="en-US" dirty="0"/>
               <a:pPr/>
-              <a:t>2/8/2017</a:t>
+              <a:t>2/14/2017</a:t>
             </a:fld>
             <a:endParaRPr lang="en-US" dirty="0"/>
           </a:p>
@@ -1842,7 +1836,7 @@
             <a:fld id="{B61BEF0D-F0BB-DE4B-95CE-6DB70DBA9567}" type="datetimeFigureOut">
               <a:rPr lang="en-US" dirty="0"/>
               <a:pPr/>
-              <a:t>2/8/2017</a:t>
+              <a:t>2/14/2017</a:t>
             </a:fld>
             <a:endParaRPr lang="en-US" dirty="0"/>
           </a:p>
@@ -2141,7 +2135,7 @@
             <a:fld id="{B61BEF0D-F0BB-DE4B-95CE-6DB70DBA9567}" type="datetimeFigureOut">
               <a:rPr lang="en-US" dirty="0"/>
               <a:pPr/>
-              <a:t>2/8/2017</a:t>
+              <a:t>2/14/2017</a:t>
             </a:fld>
             <a:endParaRPr lang="en-US" dirty="0"/>
           </a:p>
@@ -2560,7 +2554,7 @@
             <a:fld id="{B61BEF0D-F0BB-DE4B-95CE-6DB70DBA9567}" type="datetimeFigureOut">
               <a:rPr lang="en-US" dirty="0"/>
               <a:pPr/>
-              <a:t>2/8/2017</a:t>
+              <a:t>2/14/2017</a:t>
             </a:fld>
             <a:endParaRPr lang="en-US" dirty="0"/>
           </a:p>
@@ -2719,7 +2713,7 @@
             <a:fld id="{B61BEF0D-F0BB-DE4B-95CE-6DB70DBA9567}" type="datetimeFigureOut">
               <a:rPr lang="en-US" dirty="0"/>
               <a:pPr/>
-              <a:t>2/8/2017</a:t>
+              <a:t>2/14/2017</a:t>
             </a:fld>
             <a:endParaRPr lang="en-US" dirty="0"/>
           </a:p>
@@ -2811,7 +2805,7 @@
             <a:fld id="{B61BEF0D-F0BB-DE4B-95CE-6DB70DBA9567}" type="datetimeFigureOut">
               <a:rPr lang="en-US" dirty="0"/>
               <a:pPr/>
-              <a:t>2/8/2017</a:t>
+              <a:t>2/14/2017</a:t>
             </a:fld>
             <a:endParaRPr lang="en-US" dirty="0"/>
           </a:p>
@@ -3186,7 +3180,7 @@
             <a:fld id="{B61BEF0D-F0BB-DE4B-95CE-6DB70DBA9567}" type="datetimeFigureOut">
               <a:rPr lang="en-US" dirty="0"/>
               <a:pPr/>
-              <a:t>2/8/2017</a:t>
+              <a:t>2/14/2017</a:t>
             </a:fld>
             <a:endParaRPr lang="en-US" dirty="0"/>
           </a:p>
@@ -3472,7 +3466,7 @@
             <a:fld id="{B61BEF0D-F0BB-DE4B-95CE-6DB70DBA9567}" type="datetimeFigureOut">
               <a:rPr lang="en-US" dirty="0"/>
               <a:pPr/>
-              <a:t>2/8/2017</a:t>
+              <a:t>2/14/2017</a:t>
             </a:fld>
             <a:endParaRPr lang="en-US" dirty="0"/>
           </a:p>
@@ -3680,7 +3674,7 @@
             <a:fld id="{B61BEF0D-F0BB-DE4B-95CE-6DB70DBA9567}" type="datetimeFigureOut">
               <a:rPr lang="en-US" dirty="0"/>
               <a:pPr/>
-              <a:t>2/8/2017</a:t>
+              <a:t>2/14/2017</a:t>
             </a:fld>
             <a:endParaRPr lang="en-US" dirty="0"/>
           </a:p>
@@ -6530,7 +6524,10 @@
               <a:rPr lang="en-US" dirty="0" err="1"/>
               <a:t>Polybase</a:t>
             </a:r>
-            <a:endParaRPr lang="en-US" dirty="0"/>
+            <a:r>
+              <a:rPr lang="en-US" dirty="0"/>
+              <a:t> (head node)</a:t>
+            </a:r>
           </a:p>
         </p:txBody>
       </p:sp>

</xml_diff>

<commit_message>
Create all section header slides.
</commit_message>
<xml_diff>
--- a/AwesomeFreeSQLServerFeatures.pptx
+++ b/AwesomeFreeSQLServerFeatures.pptx
@@ -5,7 +5,7 @@
     <p:sldMasterId id="2147483648" r:id="rId1"/>
   </p:sldMasterIdLst>
   <p:notesMasterIdLst>
-    <p:notesMasterId r:id="rId10"/>
+    <p:notesMasterId r:id="rId17"/>
   </p:notesMasterIdLst>
   <p:sldIdLst>
     <p:sldId id="256" r:id="rId2"/>
@@ -15,7 +15,14 @@
     <p:sldId id="261" r:id="rId6"/>
     <p:sldId id="262" r:id="rId7"/>
     <p:sldId id="263" r:id="rId8"/>
-    <p:sldId id="258" r:id="rId9"/>
+    <p:sldId id="264" r:id="rId9"/>
+    <p:sldId id="265" r:id="rId10"/>
+    <p:sldId id="266" r:id="rId11"/>
+    <p:sldId id="267" r:id="rId12"/>
+    <p:sldId id="268" r:id="rId13"/>
+    <p:sldId id="269" r:id="rId14"/>
+    <p:sldId id="270" r:id="rId15"/>
+    <p:sldId id="258" r:id="rId16"/>
   </p:sldIdLst>
   <p:sldSz cx="12192000" cy="6858000"/>
   <p:notesSz cx="6858000" cy="9144000"/>
@@ -4574,6 +4581,919 @@
     <p:extLst>
       <p:ext uri="{BB962C8B-B14F-4D97-AF65-F5344CB8AC3E}">
         <p14:creationId xmlns:p14="http://schemas.microsoft.com/office/powerpoint/2010/main" val="2095732679"/>
+      </p:ext>
+    </p:extLst>
+  </p:cSld>
+  <p:clrMapOvr>
+    <a:masterClrMapping/>
+  </p:clrMapOvr>
+</p:sld>
+</file>
+
+<file path=ppt/slides/slide10.xml><?xml version="1.0" encoding="utf-8"?>
+<p:sld xmlns:a="http://schemas.openxmlformats.org/drawingml/2006/main" xmlns:r="http://schemas.openxmlformats.org/officeDocument/2006/relationships" xmlns:p="http://schemas.openxmlformats.org/presentationml/2006/main">
+  <p:cSld>
+    <p:spTree>
+      <p:nvGrpSpPr>
+        <p:cNvPr id="1" name=""/>
+        <p:cNvGrpSpPr/>
+        <p:nvPr/>
+      </p:nvGrpSpPr>
+      <p:grpSpPr>
+        <a:xfrm>
+          <a:off x="0" y="0"/>
+          <a:ext cx="0" cy="0"/>
+          <a:chOff x="0" y="0"/>
+          <a:chExt cx="0" cy="0"/>
+        </a:xfrm>
+      </p:grpSpPr>
+      <p:sp>
+        <p:nvSpPr>
+          <p:cNvPr id="2" name="Title 1"/>
+          <p:cNvSpPr>
+            <a:spLocks noGrp="1"/>
+          </p:cNvSpPr>
+          <p:nvPr>
+            <p:ph type="title"/>
+          </p:nvPr>
+        </p:nvSpPr>
+        <p:spPr/>
+        <p:txBody>
+          <a:bodyPr/>
+          <a:lstStyle/>
+          <a:p>
+            <a:r>
+              <a:rPr lang="en-US" dirty="0"/>
+              <a:t>SQL Server Features</a:t>
+            </a:r>
+          </a:p>
+        </p:txBody>
+      </p:sp>
+      <p:sp>
+        <p:nvSpPr>
+          <p:cNvPr id="3" name="Content Placeholder 2"/>
+          <p:cNvSpPr>
+            <a:spLocks noGrp="1"/>
+          </p:cNvSpPr>
+          <p:nvPr>
+            <p:ph idx="1"/>
+          </p:nvPr>
+        </p:nvSpPr>
+        <p:spPr/>
+        <p:txBody>
+          <a:bodyPr>
+            <a:normAutofit fontScale="92500" lnSpcReduction="10000"/>
+          </a:bodyPr>
+          <a:lstStyle/>
+          <a:p>
+            <a:r>
+              <a:rPr lang="en-US" dirty="0"/>
+              <a:t>Security</a:t>
+            </a:r>
+          </a:p>
+          <a:p>
+            <a:pPr lvl="1"/>
+            <a:r>
+              <a:rPr lang="en-US" dirty="0"/>
+              <a:t>Row-Level Security</a:t>
+            </a:r>
+          </a:p>
+          <a:p>
+            <a:pPr lvl="1"/>
+            <a:r>
+              <a:rPr lang="en-US" dirty="0"/>
+              <a:t>Always Encrypted</a:t>
+            </a:r>
+          </a:p>
+          <a:p>
+            <a:r>
+              <a:rPr lang="en-US" dirty="0"/>
+              <a:t>Utility</a:t>
+            </a:r>
+          </a:p>
+          <a:p>
+            <a:pPr lvl="1"/>
+            <a:r>
+              <a:rPr lang="en-US" dirty="0"/>
+              <a:t>Snapshots</a:t>
+            </a:r>
+          </a:p>
+          <a:p>
+            <a:pPr lvl="1"/>
+            <a:r>
+              <a:rPr lang="en-US" dirty="0" err="1">
+                <a:solidFill>
+                  <a:srgbClr val="FF0000"/>
+                </a:solidFill>
+              </a:rPr>
+              <a:t>Filestream</a:t>
+            </a:r>
+            <a:endParaRPr lang="en-US" dirty="0">
+              <a:solidFill>
+                <a:srgbClr val="FF0000"/>
+              </a:solidFill>
+            </a:endParaRPr>
+          </a:p>
+          <a:p>
+            <a:r>
+              <a:rPr lang="en-US" dirty="0"/>
+              <a:t>Performance</a:t>
+            </a:r>
+          </a:p>
+          <a:p>
+            <a:pPr lvl="1"/>
+            <a:r>
+              <a:rPr lang="en-US" dirty="0" err="1"/>
+              <a:t>Columnstore</a:t>
+            </a:r>
+            <a:r>
+              <a:rPr lang="en-US" dirty="0"/>
+              <a:t> Indexes</a:t>
+            </a:r>
+          </a:p>
+          <a:p>
+            <a:pPr lvl="1"/>
+            <a:r>
+              <a:rPr lang="en-US" dirty="0"/>
+              <a:t>Partitioning</a:t>
+            </a:r>
+          </a:p>
+          <a:p>
+            <a:pPr lvl="1"/>
+            <a:r>
+              <a:rPr lang="en-US" dirty="0"/>
+              <a:t>Compression</a:t>
+            </a:r>
+          </a:p>
+          <a:p>
+            <a:pPr lvl="1"/>
+            <a:r>
+              <a:rPr lang="en-US" dirty="0"/>
+              <a:t>In-Memory OLTP (</a:t>
+            </a:r>
+            <a:r>
+              <a:rPr lang="en-US" dirty="0" err="1"/>
+              <a:t>Hekaton</a:t>
+            </a:r>
+            <a:r>
+              <a:rPr lang="en-US" dirty="0"/>
+              <a:t>)</a:t>
+            </a:r>
+          </a:p>
+        </p:txBody>
+      </p:sp>
+    </p:spTree>
+    <p:extLst>
+      <p:ext uri="{BB962C8B-B14F-4D97-AF65-F5344CB8AC3E}">
+        <p14:creationId xmlns:p14="http://schemas.microsoft.com/office/powerpoint/2010/main" val="85911061"/>
+      </p:ext>
+    </p:extLst>
+  </p:cSld>
+  <p:clrMapOvr>
+    <a:masterClrMapping/>
+  </p:clrMapOvr>
+</p:sld>
+</file>
+
+<file path=ppt/slides/slide11.xml><?xml version="1.0" encoding="utf-8"?>
+<p:sld xmlns:a="http://schemas.openxmlformats.org/drawingml/2006/main" xmlns:r="http://schemas.openxmlformats.org/officeDocument/2006/relationships" xmlns:p="http://schemas.openxmlformats.org/presentationml/2006/main">
+  <p:cSld>
+    <p:spTree>
+      <p:nvGrpSpPr>
+        <p:cNvPr id="1" name=""/>
+        <p:cNvGrpSpPr/>
+        <p:nvPr/>
+      </p:nvGrpSpPr>
+      <p:grpSpPr>
+        <a:xfrm>
+          <a:off x="0" y="0"/>
+          <a:ext cx="0" cy="0"/>
+          <a:chOff x="0" y="0"/>
+          <a:chExt cx="0" cy="0"/>
+        </a:xfrm>
+      </p:grpSpPr>
+      <p:sp>
+        <p:nvSpPr>
+          <p:cNvPr id="2" name="Title 1"/>
+          <p:cNvSpPr>
+            <a:spLocks noGrp="1"/>
+          </p:cNvSpPr>
+          <p:nvPr>
+            <p:ph type="title"/>
+          </p:nvPr>
+        </p:nvSpPr>
+        <p:spPr/>
+        <p:txBody>
+          <a:bodyPr/>
+          <a:lstStyle/>
+          <a:p>
+            <a:r>
+              <a:rPr lang="en-US" dirty="0"/>
+              <a:t>SQL Server Features</a:t>
+            </a:r>
+          </a:p>
+        </p:txBody>
+      </p:sp>
+      <p:sp>
+        <p:nvSpPr>
+          <p:cNvPr id="3" name="Content Placeholder 2"/>
+          <p:cNvSpPr>
+            <a:spLocks noGrp="1"/>
+          </p:cNvSpPr>
+          <p:nvPr>
+            <p:ph idx="1"/>
+          </p:nvPr>
+        </p:nvSpPr>
+        <p:spPr/>
+        <p:txBody>
+          <a:bodyPr>
+            <a:normAutofit fontScale="92500" lnSpcReduction="10000"/>
+          </a:bodyPr>
+          <a:lstStyle/>
+          <a:p>
+            <a:r>
+              <a:rPr lang="en-US" dirty="0"/>
+              <a:t>Security</a:t>
+            </a:r>
+          </a:p>
+          <a:p>
+            <a:pPr lvl="1"/>
+            <a:r>
+              <a:rPr lang="en-US" dirty="0"/>
+              <a:t>Row-Level Security</a:t>
+            </a:r>
+          </a:p>
+          <a:p>
+            <a:pPr lvl="1"/>
+            <a:r>
+              <a:rPr lang="en-US" dirty="0"/>
+              <a:t>Always Encrypted</a:t>
+            </a:r>
+          </a:p>
+          <a:p>
+            <a:r>
+              <a:rPr lang="en-US" dirty="0"/>
+              <a:t>Utility</a:t>
+            </a:r>
+          </a:p>
+          <a:p>
+            <a:pPr lvl="1"/>
+            <a:r>
+              <a:rPr lang="en-US" dirty="0"/>
+              <a:t>Snapshots</a:t>
+            </a:r>
+          </a:p>
+          <a:p>
+            <a:pPr lvl="1"/>
+            <a:r>
+              <a:rPr lang="en-US" dirty="0" err="1"/>
+              <a:t>Filestream</a:t>
+            </a:r>
+            <a:endParaRPr lang="en-US" dirty="0"/>
+          </a:p>
+          <a:p>
+            <a:r>
+              <a:rPr lang="en-US" dirty="0"/>
+              <a:t>Performance</a:t>
+            </a:r>
+          </a:p>
+          <a:p>
+            <a:pPr lvl="1"/>
+            <a:r>
+              <a:rPr lang="en-US" dirty="0" err="1">
+                <a:solidFill>
+                  <a:srgbClr val="FF0000"/>
+                </a:solidFill>
+              </a:rPr>
+              <a:t>Columnstore</a:t>
+            </a:r>
+            <a:r>
+              <a:rPr lang="en-US" dirty="0">
+                <a:solidFill>
+                  <a:srgbClr val="FF0000"/>
+                </a:solidFill>
+              </a:rPr>
+              <a:t> Indexes</a:t>
+            </a:r>
+          </a:p>
+          <a:p>
+            <a:pPr lvl="1"/>
+            <a:r>
+              <a:rPr lang="en-US" dirty="0"/>
+              <a:t>Partitioning</a:t>
+            </a:r>
+          </a:p>
+          <a:p>
+            <a:pPr lvl="1"/>
+            <a:r>
+              <a:rPr lang="en-US" dirty="0"/>
+              <a:t>Compression</a:t>
+            </a:r>
+          </a:p>
+          <a:p>
+            <a:pPr lvl="1"/>
+            <a:r>
+              <a:rPr lang="en-US" dirty="0"/>
+              <a:t>In-Memory OLTP (</a:t>
+            </a:r>
+            <a:r>
+              <a:rPr lang="en-US" dirty="0" err="1"/>
+              <a:t>Hekaton</a:t>
+            </a:r>
+            <a:r>
+              <a:rPr lang="en-US" dirty="0"/>
+              <a:t>)</a:t>
+            </a:r>
+          </a:p>
+        </p:txBody>
+      </p:sp>
+    </p:spTree>
+    <p:extLst>
+      <p:ext uri="{BB962C8B-B14F-4D97-AF65-F5344CB8AC3E}">
+        <p14:creationId xmlns:p14="http://schemas.microsoft.com/office/powerpoint/2010/main" val="2331663206"/>
+      </p:ext>
+    </p:extLst>
+  </p:cSld>
+  <p:clrMapOvr>
+    <a:masterClrMapping/>
+  </p:clrMapOvr>
+</p:sld>
+</file>
+
+<file path=ppt/slides/slide12.xml><?xml version="1.0" encoding="utf-8"?>
+<p:sld xmlns:a="http://schemas.openxmlformats.org/drawingml/2006/main" xmlns:r="http://schemas.openxmlformats.org/officeDocument/2006/relationships" xmlns:p="http://schemas.openxmlformats.org/presentationml/2006/main">
+  <p:cSld>
+    <p:spTree>
+      <p:nvGrpSpPr>
+        <p:cNvPr id="1" name=""/>
+        <p:cNvGrpSpPr/>
+        <p:nvPr/>
+      </p:nvGrpSpPr>
+      <p:grpSpPr>
+        <a:xfrm>
+          <a:off x="0" y="0"/>
+          <a:ext cx="0" cy="0"/>
+          <a:chOff x="0" y="0"/>
+          <a:chExt cx="0" cy="0"/>
+        </a:xfrm>
+      </p:grpSpPr>
+      <p:sp>
+        <p:nvSpPr>
+          <p:cNvPr id="2" name="Title 1"/>
+          <p:cNvSpPr>
+            <a:spLocks noGrp="1"/>
+          </p:cNvSpPr>
+          <p:nvPr>
+            <p:ph type="title"/>
+          </p:nvPr>
+        </p:nvSpPr>
+        <p:spPr/>
+        <p:txBody>
+          <a:bodyPr/>
+          <a:lstStyle/>
+          <a:p>
+            <a:r>
+              <a:rPr lang="en-US" dirty="0"/>
+              <a:t>SQL Server Features</a:t>
+            </a:r>
+          </a:p>
+        </p:txBody>
+      </p:sp>
+      <p:sp>
+        <p:nvSpPr>
+          <p:cNvPr id="3" name="Content Placeholder 2"/>
+          <p:cNvSpPr>
+            <a:spLocks noGrp="1"/>
+          </p:cNvSpPr>
+          <p:nvPr>
+            <p:ph idx="1"/>
+          </p:nvPr>
+        </p:nvSpPr>
+        <p:spPr/>
+        <p:txBody>
+          <a:bodyPr>
+            <a:normAutofit fontScale="92500" lnSpcReduction="10000"/>
+          </a:bodyPr>
+          <a:lstStyle/>
+          <a:p>
+            <a:r>
+              <a:rPr lang="en-US" dirty="0"/>
+              <a:t>Security</a:t>
+            </a:r>
+          </a:p>
+          <a:p>
+            <a:pPr lvl="1"/>
+            <a:r>
+              <a:rPr lang="en-US" dirty="0"/>
+              <a:t>Row-Level Security</a:t>
+            </a:r>
+          </a:p>
+          <a:p>
+            <a:pPr lvl="1"/>
+            <a:r>
+              <a:rPr lang="en-US" dirty="0"/>
+              <a:t>Always Encrypted</a:t>
+            </a:r>
+          </a:p>
+          <a:p>
+            <a:r>
+              <a:rPr lang="en-US" dirty="0"/>
+              <a:t>Utility</a:t>
+            </a:r>
+          </a:p>
+          <a:p>
+            <a:pPr lvl="1"/>
+            <a:r>
+              <a:rPr lang="en-US" dirty="0"/>
+              <a:t>Snapshots</a:t>
+            </a:r>
+          </a:p>
+          <a:p>
+            <a:pPr lvl="1"/>
+            <a:r>
+              <a:rPr lang="en-US" dirty="0" err="1"/>
+              <a:t>Filestream</a:t>
+            </a:r>
+            <a:endParaRPr lang="en-US" dirty="0"/>
+          </a:p>
+          <a:p>
+            <a:r>
+              <a:rPr lang="en-US" dirty="0"/>
+              <a:t>Performance</a:t>
+            </a:r>
+          </a:p>
+          <a:p>
+            <a:pPr lvl="1"/>
+            <a:r>
+              <a:rPr lang="en-US" dirty="0" err="1"/>
+              <a:t>Columnstore</a:t>
+            </a:r>
+            <a:r>
+              <a:rPr lang="en-US" dirty="0"/>
+              <a:t> Indexes</a:t>
+            </a:r>
+          </a:p>
+          <a:p>
+            <a:pPr lvl="1"/>
+            <a:r>
+              <a:rPr lang="en-US" dirty="0">
+                <a:solidFill>
+                  <a:srgbClr val="FF0000"/>
+                </a:solidFill>
+              </a:rPr>
+              <a:t>Partitioning</a:t>
+            </a:r>
+          </a:p>
+          <a:p>
+            <a:pPr lvl="1"/>
+            <a:r>
+              <a:rPr lang="en-US" dirty="0"/>
+              <a:t>Compression</a:t>
+            </a:r>
+          </a:p>
+          <a:p>
+            <a:pPr lvl="1"/>
+            <a:r>
+              <a:rPr lang="en-US" dirty="0"/>
+              <a:t>In-Memory OLTP (</a:t>
+            </a:r>
+            <a:r>
+              <a:rPr lang="en-US" dirty="0" err="1"/>
+              <a:t>Hekaton</a:t>
+            </a:r>
+            <a:r>
+              <a:rPr lang="en-US" dirty="0"/>
+              <a:t>)</a:t>
+            </a:r>
+          </a:p>
+        </p:txBody>
+      </p:sp>
+    </p:spTree>
+    <p:extLst>
+      <p:ext uri="{BB962C8B-B14F-4D97-AF65-F5344CB8AC3E}">
+        <p14:creationId xmlns:p14="http://schemas.microsoft.com/office/powerpoint/2010/main" val="3961792109"/>
+      </p:ext>
+    </p:extLst>
+  </p:cSld>
+  <p:clrMapOvr>
+    <a:masterClrMapping/>
+  </p:clrMapOvr>
+</p:sld>
+</file>
+
+<file path=ppt/slides/slide13.xml><?xml version="1.0" encoding="utf-8"?>
+<p:sld xmlns:a="http://schemas.openxmlformats.org/drawingml/2006/main" xmlns:r="http://schemas.openxmlformats.org/officeDocument/2006/relationships" xmlns:p="http://schemas.openxmlformats.org/presentationml/2006/main">
+  <p:cSld>
+    <p:spTree>
+      <p:nvGrpSpPr>
+        <p:cNvPr id="1" name=""/>
+        <p:cNvGrpSpPr/>
+        <p:nvPr/>
+      </p:nvGrpSpPr>
+      <p:grpSpPr>
+        <a:xfrm>
+          <a:off x="0" y="0"/>
+          <a:ext cx="0" cy="0"/>
+          <a:chOff x="0" y="0"/>
+          <a:chExt cx="0" cy="0"/>
+        </a:xfrm>
+      </p:grpSpPr>
+      <p:sp>
+        <p:nvSpPr>
+          <p:cNvPr id="2" name="Title 1"/>
+          <p:cNvSpPr>
+            <a:spLocks noGrp="1"/>
+          </p:cNvSpPr>
+          <p:nvPr>
+            <p:ph type="title"/>
+          </p:nvPr>
+        </p:nvSpPr>
+        <p:spPr/>
+        <p:txBody>
+          <a:bodyPr/>
+          <a:lstStyle/>
+          <a:p>
+            <a:r>
+              <a:rPr lang="en-US" dirty="0"/>
+              <a:t>SQL Server Features</a:t>
+            </a:r>
+          </a:p>
+        </p:txBody>
+      </p:sp>
+      <p:sp>
+        <p:nvSpPr>
+          <p:cNvPr id="3" name="Content Placeholder 2"/>
+          <p:cNvSpPr>
+            <a:spLocks noGrp="1"/>
+          </p:cNvSpPr>
+          <p:nvPr>
+            <p:ph idx="1"/>
+          </p:nvPr>
+        </p:nvSpPr>
+        <p:spPr/>
+        <p:txBody>
+          <a:bodyPr>
+            <a:normAutofit fontScale="92500" lnSpcReduction="10000"/>
+          </a:bodyPr>
+          <a:lstStyle/>
+          <a:p>
+            <a:r>
+              <a:rPr lang="en-US" dirty="0"/>
+              <a:t>Security</a:t>
+            </a:r>
+          </a:p>
+          <a:p>
+            <a:pPr lvl="1"/>
+            <a:r>
+              <a:rPr lang="en-US" dirty="0"/>
+              <a:t>Row-Level Security</a:t>
+            </a:r>
+          </a:p>
+          <a:p>
+            <a:pPr lvl="1"/>
+            <a:r>
+              <a:rPr lang="en-US" dirty="0"/>
+              <a:t>Always Encrypted</a:t>
+            </a:r>
+          </a:p>
+          <a:p>
+            <a:r>
+              <a:rPr lang="en-US" dirty="0"/>
+              <a:t>Utility</a:t>
+            </a:r>
+          </a:p>
+          <a:p>
+            <a:pPr lvl="1"/>
+            <a:r>
+              <a:rPr lang="en-US" dirty="0"/>
+              <a:t>Snapshots</a:t>
+            </a:r>
+          </a:p>
+          <a:p>
+            <a:pPr lvl="1"/>
+            <a:r>
+              <a:rPr lang="en-US" dirty="0" err="1"/>
+              <a:t>Filestream</a:t>
+            </a:r>
+            <a:endParaRPr lang="en-US" dirty="0"/>
+          </a:p>
+          <a:p>
+            <a:r>
+              <a:rPr lang="en-US" dirty="0"/>
+              <a:t>Performance</a:t>
+            </a:r>
+          </a:p>
+          <a:p>
+            <a:pPr lvl="1"/>
+            <a:r>
+              <a:rPr lang="en-US" dirty="0" err="1"/>
+              <a:t>Columnstore</a:t>
+            </a:r>
+            <a:r>
+              <a:rPr lang="en-US" dirty="0"/>
+              <a:t> Indexes</a:t>
+            </a:r>
+          </a:p>
+          <a:p>
+            <a:pPr lvl="1"/>
+            <a:r>
+              <a:rPr lang="en-US" dirty="0"/>
+              <a:t>Partitioning</a:t>
+            </a:r>
+          </a:p>
+          <a:p>
+            <a:pPr lvl="1"/>
+            <a:r>
+              <a:rPr lang="en-US" dirty="0">
+                <a:solidFill>
+                  <a:srgbClr val="FF0000"/>
+                </a:solidFill>
+              </a:rPr>
+              <a:t>Compression</a:t>
+            </a:r>
+          </a:p>
+          <a:p>
+            <a:pPr lvl="1"/>
+            <a:r>
+              <a:rPr lang="en-US" dirty="0"/>
+              <a:t>In-Memory OLTP (</a:t>
+            </a:r>
+            <a:r>
+              <a:rPr lang="en-US" dirty="0" err="1"/>
+              <a:t>Hekaton</a:t>
+            </a:r>
+            <a:r>
+              <a:rPr lang="en-US" dirty="0"/>
+              <a:t>)</a:t>
+            </a:r>
+          </a:p>
+        </p:txBody>
+      </p:sp>
+    </p:spTree>
+    <p:extLst>
+      <p:ext uri="{BB962C8B-B14F-4D97-AF65-F5344CB8AC3E}">
+        <p14:creationId xmlns:p14="http://schemas.microsoft.com/office/powerpoint/2010/main" val="3323072879"/>
+      </p:ext>
+    </p:extLst>
+  </p:cSld>
+  <p:clrMapOvr>
+    <a:masterClrMapping/>
+  </p:clrMapOvr>
+</p:sld>
+</file>
+
+<file path=ppt/slides/slide14.xml><?xml version="1.0" encoding="utf-8"?>
+<p:sld xmlns:a="http://schemas.openxmlformats.org/drawingml/2006/main" xmlns:r="http://schemas.openxmlformats.org/officeDocument/2006/relationships" xmlns:p="http://schemas.openxmlformats.org/presentationml/2006/main">
+  <p:cSld>
+    <p:spTree>
+      <p:nvGrpSpPr>
+        <p:cNvPr id="1" name=""/>
+        <p:cNvGrpSpPr/>
+        <p:nvPr/>
+      </p:nvGrpSpPr>
+      <p:grpSpPr>
+        <a:xfrm>
+          <a:off x="0" y="0"/>
+          <a:ext cx="0" cy="0"/>
+          <a:chOff x="0" y="0"/>
+          <a:chExt cx="0" cy="0"/>
+        </a:xfrm>
+      </p:grpSpPr>
+      <p:sp>
+        <p:nvSpPr>
+          <p:cNvPr id="2" name="Title 1"/>
+          <p:cNvSpPr>
+            <a:spLocks noGrp="1"/>
+          </p:cNvSpPr>
+          <p:nvPr>
+            <p:ph type="title"/>
+          </p:nvPr>
+        </p:nvSpPr>
+        <p:spPr/>
+        <p:txBody>
+          <a:bodyPr/>
+          <a:lstStyle/>
+          <a:p>
+            <a:r>
+              <a:rPr lang="en-US" dirty="0"/>
+              <a:t>SQL Server Features</a:t>
+            </a:r>
+          </a:p>
+        </p:txBody>
+      </p:sp>
+      <p:sp>
+        <p:nvSpPr>
+          <p:cNvPr id="3" name="Content Placeholder 2"/>
+          <p:cNvSpPr>
+            <a:spLocks noGrp="1"/>
+          </p:cNvSpPr>
+          <p:nvPr>
+            <p:ph idx="1"/>
+          </p:nvPr>
+        </p:nvSpPr>
+        <p:spPr/>
+        <p:txBody>
+          <a:bodyPr>
+            <a:normAutofit fontScale="92500" lnSpcReduction="10000"/>
+          </a:bodyPr>
+          <a:lstStyle/>
+          <a:p>
+            <a:r>
+              <a:rPr lang="en-US" dirty="0"/>
+              <a:t>Security</a:t>
+            </a:r>
+          </a:p>
+          <a:p>
+            <a:pPr lvl="1"/>
+            <a:r>
+              <a:rPr lang="en-US" dirty="0"/>
+              <a:t>Row-Level Security</a:t>
+            </a:r>
+          </a:p>
+          <a:p>
+            <a:pPr lvl="1"/>
+            <a:r>
+              <a:rPr lang="en-US" dirty="0"/>
+              <a:t>Always Encrypted</a:t>
+            </a:r>
+          </a:p>
+          <a:p>
+            <a:r>
+              <a:rPr lang="en-US" dirty="0"/>
+              <a:t>Utility</a:t>
+            </a:r>
+          </a:p>
+          <a:p>
+            <a:pPr lvl="1"/>
+            <a:r>
+              <a:rPr lang="en-US" dirty="0"/>
+              <a:t>Snapshots</a:t>
+            </a:r>
+          </a:p>
+          <a:p>
+            <a:pPr lvl="1"/>
+            <a:r>
+              <a:rPr lang="en-US" dirty="0" err="1"/>
+              <a:t>Filestream</a:t>
+            </a:r>
+            <a:endParaRPr lang="en-US" dirty="0"/>
+          </a:p>
+          <a:p>
+            <a:r>
+              <a:rPr lang="en-US" dirty="0"/>
+              <a:t>Performance</a:t>
+            </a:r>
+          </a:p>
+          <a:p>
+            <a:pPr lvl="1"/>
+            <a:r>
+              <a:rPr lang="en-US" dirty="0" err="1"/>
+              <a:t>Columnstore</a:t>
+            </a:r>
+            <a:r>
+              <a:rPr lang="en-US" dirty="0"/>
+              <a:t> Indexes</a:t>
+            </a:r>
+          </a:p>
+          <a:p>
+            <a:pPr lvl="1"/>
+            <a:r>
+              <a:rPr lang="en-US" dirty="0"/>
+              <a:t>Partitioning</a:t>
+            </a:r>
+          </a:p>
+          <a:p>
+            <a:pPr lvl="1"/>
+            <a:r>
+              <a:rPr lang="en-US" dirty="0"/>
+              <a:t>Compression</a:t>
+            </a:r>
+          </a:p>
+          <a:p>
+            <a:pPr lvl="1"/>
+            <a:r>
+              <a:rPr lang="en-US" dirty="0">
+                <a:solidFill>
+                  <a:srgbClr val="FF0000"/>
+                </a:solidFill>
+              </a:rPr>
+              <a:t>In-Memory OLTP (</a:t>
+            </a:r>
+            <a:r>
+              <a:rPr lang="en-US" dirty="0" err="1">
+                <a:solidFill>
+                  <a:srgbClr val="FF0000"/>
+                </a:solidFill>
+              </a:rPr>
+              <a:t>Hekaton</a:t>
+            </a:r>
+            <a:r>
+              <a:rPr lang="en-US" dirty="0">
+                <a:solidFill>
+                  <a:srgbClr val="FF0000"/>
+                </a:solidFill>
+              </a:rPr>
+              <a:t>)</a:t>
+            </a:r>
+          </a:p>
+        </p:txBody>
+      </p:sp>
+    </p:spTree>
+    <p:extLst>
+      <p:ext uri="{BB962C8B-B14F-4D97-AF65-F5344CB8AC3E}">
+        <p14:creationId xmlns:p14="http://schemas.microsoft.com/office/powerpoint/2010/main" val="4052465235"/>
+      </p:ext>
+    </p:extLst>
+  </p:cSld>
+  <p:clrMapOvr>
+    <a:masterClrMapping/>
+  </p:clrMapOvr>
+</p:sld>
+</file>
+
+<file path=ppt/slides/slide15.xml><?xml version="1.0" encoding="utf-8"?>
+<p:sld xmlns:a="http://schemas.openxmlformats.org/drawingml/2006/main" xmlns:r="http://schemas.openxmlformats.org/officeDocument/2006/relationships" xmlns:p="http://schemas.openxmlformats.org/presentationml/2006/main">
+  <p:cSld>
+    <p:spTree>
+      <p:nvGrpSpPr>
+        <p:cNvPr id="1" name=""/>
+        <p:cNvGrpSpPr/>
+        <p:nvPr/>
+      </p:nvGrpSpPr>
+      <p:grpSpPr>
+        <a:xfrm>
+          <a:off x="0" y="0"/>
+          <a:ext cx="0" cy="0"/>
+          <a:chOff x="0" y="0"/>
+          <a:chExt cx="0" cy="0"/>
+        </a:xfrm>
+      </p:grpSpPr>
+      <p:sp>
+        <p:nvSpPr>
+          <p:cNvPr id="2" name="Title 1"/>
+          <p:cNvSpPr>
+            <a:spLocks noGrp="1"/>
+          </p:cNvSpPr>
+          <p:nvPr>
+            <p:ph type="title"/>
+          </p:nvPr>
+        </p:nvSpPr>
+        <p:spPr/>
+        <p:txBody>
+          <a:bodyPr/>
+          <a:lstStyle/>
+          <a:p>
+            <a:r>
+              <a:rPr lang="en-US" dirty="0"/>
+              <a:t>Resources</a:t>
+            </a:r>
+          </a:p>
+        </p:txBody>
+      </p:sp>
+      <p:sp>
+        <p:nvSpPr>
+          <p:cNvPr id="3" name="Content Placeholder 2"/>
+          <p:cNvSpPr>
+            <a:spLocks noGrp="1"/>
+          </p:cNvSpPr>
+          <p:nvPr>
+            <p:ph idx="1"/>
+          </p:nvPr>
+        </p:nvSpPr>
+        <p:spPr/>
+        <p:txBody>
+          <a:bodyPr/>
+          <a:lstStyle/>
+          <a:p>
+            <a:r>
+              <a:rPr lang="en-US" dirty="0"/>
+              <a:t>SQL Server 2016 Express Edition download</a:t>
+            </a:r>
+          </a:p>
+          <a:p>
+            <a:pPr marL="324000" lvl="1" indent="0">
+              <a:buNone/>
+            </a:pPr>
+            <a:r>
+              <a:rPr lang="en-US">
+                <a:hlinkClick r:id="rId2"/>
+              </a:rPr>
+              <a:t>https://www.microsoft.com/en-us/download/details.aspx?id=52679</a:t>
+            </a:r>
+            <a:endParaRPr lang="en-US"/>
+          </a:p>
+          <a:p>
+            <a:pPr marL="324000" lvl="1" indent="0">
+              <a:buNone/>
+            </a:pPr>
+            <a:endParaRPr lang="en-US"/>
+          </a:p>
+        </p:txBody>
+      </p:sp>
+    </p:spTree>
+    <p:extLst>
+      <p:ext uri="{BB962C8B-B14F-4D97-AF65-F5344CB8AC3E}">
+        <p14:creationId xmlns:p14="http://schemas.microsoft.com/office/powerpoint/2010/main" val="3472261720"/>
       </p:ext>
     </p:extLst>
   </p:cSld>
@@ -6810,7 +7730,7 @@
           <a:p>
             <a:r>
               <a:rPr lang="en-US" dirty="0"/>
-              <a:t>Resources</a:t>
+              <a:t>SQL Server Features</a:t>
             </a:r>
           </a:p>
         </p:txBody>
@@ -6827,38 +7747,268 @@
         </p:nvSpPr>
         <p:spPr/>
         <p:txBody>
-          <a:bodyPr/>
+          <a:bodyPr>
+            <a:normAutofit fontScale="92500" lnSpcReduction="10000"/>
+          </a:bodyPr>
           <a:lstStyle/>
           <a:p>
             <a:r>
               <a:rPr lang="en-US" dirty="0"/>
-              <a:t>SQL Server 2016 Express Edition download</a:t>
-            </a:r>
-          </a:p>
-          <a:p>
-            <a:pPr marL="324000" lvl="1" indent="0">
-              <a:buNone/>
-            </a:pPr>
-            <a:r>
-              <a:rPr lang="en-US">
-                <a:hlinkClick r:id="rId2"/>
+              <a:t>Security</a:t>
+            </a:r>
+          </a:p>
+          <a:p>
+            <a:pPr lvl="1"/>
+            <a:r>
+              <a:rPr lang="en-US" dirty="0"/>
+              <a:t>Row-Level Security</a:t>
+            </a:r>
+          </a:p>
+          <a:p>
+            <a:pPr lvl="1"/>
+            <a:r>
+              <a:rPr lang="en-US" dirty="0">
+                <a:solidFill>
+                  <a:srgbClr val="FF0000"/>
+                </a:solidFill>
               </a:rPr>
-              <a:t>https://www.microsoft.com/en-us/download/details.aspx?id=52679</a:t>
-            </a:r>
-            <a:endParaRPr lang="en-US"/>
-          </a:p>
-          <a:p>
-            <a:pPr marL="324000" lvl="1" indent="0">
-              <a:buNone/>
-            </a:pPr>
-            <a:endParaRPr lang="en-US"/>
+              <a:t>Always Encrypted</a:t>
+            </a:r>
+          </a:p>
+          <a:p>
+            <a:r>
+              <a:rPr lang="en-US" dirty="0"/>
+              <a:t>Utility</a:t>
+            </a:r>
+          </a:p>
+          <a:p>
+            <a:pPr lvl="1"/>
+            <a:r>
+              <a:rPr lang="en-US" dirty="0"/>
+              <a:t>Snapshots</a:t>
+            </a:r>
+          </a:p>
+          <a:p>
+            <a:pPr lvl="1"/>
+            <a:r>
+              <a:rPr lang="en-US" dirty="0" err="1"/>
+              <a:t>Filestream</a:t>
+            </a:r>
+            <a:endParaRPr lang="en-US" dirty="0"/>
+          </a:p>
+          <a:p>
+            <a:r>
+              <a:rPr lang="en-US" dirty="0"/>
+              <a:t>Performance</a:t>
+            </a:r>
+          </a:p>
+          <a:p>
+            <a:pPr lvl="1"/>
+            <a:r>
+              <a:rPr lang="en-US" dirty="0" err="1"/>
+              <a:t>Columnstore</a:t>
+            </a:r>
+            <a:r>
+              <a:rPr lang="en-US" dirty="0"/>
+              <a:t> Indexes</a:t>
+            </a:r>
+          </a:p>
+          <a:p>
+            <a:pPr lvl="1"/>
+            <a:r>
+              <a:rPr lang="en-US" dirty="0"/>
+              <a:t>Partitioning</a:t>
+            </a:r>
+          </a:p>
+          <a:p>
+            <a:pPr lvl="1"/>
+            <a:r>
+              <a:rPr lang="en-US" dirty="0"/>
+              <a:t>Compression</a:t>
+            </a:r>
+          </a:p>
+          <a:p>
+            <a:pPr lvl="1"/>
+            <a:r>
+              <a:rPr lang="en-US" dirty="0"/>
+              <a:t>In-Memory OLTP (</a:t>
+            </a:r>
+            <a:r>
+              <a:rPr lang="en-US" dirty="0" err="1"/>
+              <a:t>Hekaton</a:t>
+            </a:r>
+            <a:r>
+              <a:rPr lang="en-US" dirty="0"/>
+              <a:t>)</a:t>
+            </a:r>
           </a:p>
         </p:txBody>
       </p:sp>
     </p:spTree>
     <p:extLst>
       <p:ext uri="{BB962C8B-B14F-4D97-AF65-F5344CB8AC3E}">
-        <p14:creationId xmlns:p14="http://schemas.microsoft.com/office/powerpoint/2010/main" val="3472261720"/>
+        <p14:creationId xmlns:p14="http://schemas.microsoft.com/office/powerpoint/2010/main" val="1882898498"/>
+      </p:ext>
+    </p:extLst>
+  </p:cSld>
+  <p:clrMapOvr>
+    <a:masterClrMapping/>
+  </p:clrMapOvr>
+</p:sld>
+</file>
+
+<file path=ppt/slides/slide9.xml><?xml version="1.0" encoding="utf-8"?>
+<p:sld xmlns:a="http://schemas.openxmlformats.org/drawingml/2006/main" xmlns:r="http://schemas.openxmlformats.org/officeDocument/2006/relationships" xmlns:p="http://schemas.openxmlformats.org/presentationml/2006/main">
+  <p:cSld>
+    <p:spTree>
+      <p:nvGrpSpPr>
+        <p:cNvPr id="1" name=""/>
+        <p:cNvGrpSpPr/>
+        <p:nvPr/>
+      </p:nvGrpSpPr>
+      <p:grpSpPr>
+        <a:xfrm>
+          <a:off x="0" y="0"/>
+          <a:ext cx="0" cy="0"/>
+          <a:chOff x="0" y="0"/>
+          <a:chExt cx="0" cy="0"/>
+        </a:xfrm>
+      </p:grpSpPr>
+      <p:sp>
+        <p:nvSpPr>
+          <p:cNvPr id="2" name="Title 1"/>
+          <p:cNvSpPr>
+            <a:spLocks noGrp="1"/>
+          </p:cNvSpPr>
+          <p:nvPr>
+            <p:ph type="title"/>
+          </p:nvPr>
+        </p:nvSpPr>
+        <p:spPr/>
+        <p:txBody>
+          <a:bodyPr/>
+          <a:lstStyle/>
+          <a:p>
+            <a:r>
+              <a:rPr lang="en-US" dirty="0"/>
+              <a:t>SQL Server Features</a:t>
+            </a:r>
+          </a:p>
+        </p:txBody>
+      </p:sp>
+      <p:sp>
+        <p:nvSpPr>
+          <p:cNvPr id="3" name="Content Placeholder 2"/>
+          <p:cNvSpPr>
+            <a:spLocks noGrp="1"/>
+          </p:cNvSpPr>
+          <p:nvPr>
+            <p:ph idx="1"/>
+          </p:nvPr>
+        </p:nvSpPr>
+        <p:spPr/>
+        <p:txBody>
+          <a:bodyPr>
+            <a:normAutofit fontScale="92500" lnSpcReduction="10000"/>
+          </a:bodyPr>
+          <a:lstStyle/>
+          <a:p>
+            <a:r>
+              <a:rPr lang="en-US" dirty="0"/>
+              <a:t>Security</a:t>
+            </a:r>
+          </a:p>
+          <a:p>
+            <a:pPr lvl="1"/>
+            <a:r>
+              <a:rPr lang="en-US" dirty="0"/>
+              <a:t>Row-Level Security</a:t>
+            </a:r>
+          </a:p>
+          <a:p>
+            <a:pPr lvl="1"/>
+            <a:r>
+              <a:rPr lang="en-US" dirty="0"/>
+              <a:t>Always Encrypted</a:t>
+            </a:r>
+          </a:p>
+          <a:p>
+            <a:r>
+              <a:rPr lang="en-US" dirty="0"/>
+              <a:t>Utility</a:t>
+            </a:r>
+          </a:p>
+          <a:p>
+            <a:pPr lvl="1"/>
+            <a:r>
+              <a:rPr lang="en-US" dirty="0">
+                <a:solidFill>
+                  <a:srgbClr val="FF0000"/>
+                </a:solidFill>
+              </a:rPr>
+              <a:t>Snapshots</a:t>
+            </a:r>
+          </a:p>
+          <a:p>
+            <a:pPr lvl="1"/>
+            <a:r>
+              <a:rPr lang="en-US" dirty="0" err="1"/>
+              <a:t>Filestream</a:t>
+            </a:r>
+            <a:endParaRPr lang="en-US" dirty="0"/>
+          </a:p>
+          <a:p>
+            <a:r>
+              <a:rPr lang="en-US" dirty="0"/>
+              <a:t>Performance</a:t>
+            </a:r>
+          </a:p>
+          <a:p>
+            <a:pPr lvl="1"/>
+            <a:r>
+              <a:rPr lang="en-US" dirty="0" err="1"/>
+              <a:t>Columnstore</a:t>
+            </a:r>
+            <a:r>
+              <a:rPr lang="en-US" dirty="0"/>
+              <a:t> Indexes</a:t>
+            </a:r>
+          </a:p>
+          <a:p>
+            <a:pPr lvl="1"/>
+            <a:r>
+              <a:rPr lang="en-US" dirty="0"/>
+              <a:t>Partitioning</a:t>
+            </a:r>
+          </a:p>
+          <a:p>
+            <a:pPr lvl="1"/>
+            <a:r>
+              <a:rPr lang="en-US" dirty="0"/>
+              <a:t>Compression</a:t>
+            </a:r>
+          </a:p>
+          <a:p>
+            <a:pPr lvl="1"/>
+            <a:r>
+              <a:rPr lang="en-US" dirty="0"/>
+              <a:t>In-Memory OLTP (</a:t>
+            </a:r>
+            <a:r>
+              <a:rPr lang="en-US" dirty="0" err="1"/>
+              <a:t>Hekaton</a:t>
+            </a:r>
+            <a:r>
+              <a:rPr lang="en-US" dirty="0"/>
+              <a:t>)</a:t>
+            </a:r>
+          </a:p>
+        </p:txBody>
+      </p:sp>
+    </p:spTree>
+    <p:extLst>
+      <p:ext uri="{BB962C8B-B14F-4D97-AF65-F5344CB8AC3E}">
+        <p14:creationId xmlns:p14="http://schemas.microsoft.com/office/powerpoint/2010/main" val="329879923"/>
       </p:ext>
     </p:extLst>
   </p:cSld>

</xml_diff>

<commit_message>
Add 'Speed dating' meme.
</commit_message>
<xml_diff>
--- a/AwesomeFreeSQLServerFeatures.pptx
+++ b/AwesomeFreeSQLServerFeatures.pptx
@@ -7589,6 +7589,18 @@
               <a:rPr lang="en-US" dirty="0"/>
               <a:t>SQL Server Features</a:t>
             </a:r>
+            <a:br>
+              <a:rPr lang="en-US" dirty="0"/>
+            </a:br>
+            <a:r>
+              <a:rPr lang="en-US" dirty="0"/>
+              <a:t>(</a:t>
+            </a:r>
+            <a:r>
+              <a:rPr lang="en-US"/>
+              <a:t>Speed Dating)</a:t>
+            </a:r>
+            <a:endParaRPr lang="en-US" dirty="0"/>
           </a:p>
         </p:txBody>
       </p:sp>
@@ -7768,7 +7780,16 @@
           <a:bodyPr/>
           <a:lstStyle/>
           <a:p>
-            <a:endParaRPr lang="en-US"/>
+            <a:r>
+              <a:rPr lang="en-US" dirty="0"/>
+              <a:t>Powerful and flexible way to control who can view or modify data at the row-level grain</a:t>
+            </a:r>
+          </a:p>
+          <a:p>
+            <a:r>
+              <a:rPr lang="en-US" dirty="0"/>
+              <a:t>Access is controlled by a user-defined function that is applied to the table’s security</a:t>
+            </a:r>
           </a:p>
         </p:txBody>
       </p:sp>

</xml_diff>

<commit_message>
More details on RLS.
</commit_message>
<xml_diff>
--- a/AwesomeFreeSQLServerFeatures.pptx
+++ b/AwesomeFreeSQLServerFeatures.pptx
@@ -212,7 +212,7 @@
           <a:p>
             <a:fld id="{64F240C7-B8B6-4D73-9667-9F7409B58D21}" type="datetimeFigureOut">
               <a:rPr lang="en-US" smtClean="0"/>
-              <a:t>2/14/2017</a:t>
+              <a:t>2/20/2017</a:t>
             </a:fld>
             <a:endParaRPr lang="en-US"/>
           </a:p>
@@ -812,7 +812,7 @@
             <a:fld id="{B61BEF0D-F0BB-DE4B-95CE-6DB70DBA9567}" type="datetimeFigureOut">
               <a:rPr lang="en-US" dirty="0"/>
               <a:pPr/>
-              <a:t>2/14/2017</a:t>
+              <a:t>2/20/2017</a:t>
             </a:fld>
             <a:endParaRPr lang="en-US" dirty="0"/>
           </a:p>
@@ -1071,7 +1071,7 @@
             <a:fld id="{B61BEF0D-F0BB-DE4B-95CE-6DB70DBA9567}" type="datetimeFigureOut">
               <a:rPr lang="en-US" dirty="0"/>
               <a:pPr/>
-              <a:t>2/14/2017</a:t>
+              <a:t>2/20/2017</a:t>
             </a:fld>
             <a:endParaRPr lang="en-US" dirty="0"/>
           </a:p>
@@ -1303,7 +1303,7 @@
             <a:fld id="{B61BEF0D-F0BB-DE4B-95CE-6DB70DBA9567}" type="datetimeFigureOut">
               <a:rPr lang="en-US" dirty="0"/>
               <a:pPr/>
-              <a:t>2/14/2017</a:t>
+              <a:t>2/20/2017</a:t>
             </a:fld>
             <a:endParaRPr lang="en-US" dirty="0"/>
           </a:p>
@@ -1540,7 +1540,7 @@
             <a:fld id="{B61BEF0D-F0BB-DE4B-95CE-6DB70DBA9567}" type="datetimeFigureOut">
               <a:rPr lang="en-US" dirty="0"/>
               <a:pPr/>
-              <a:t>2/14/2017</a:t>
+              <a:t>2/20/2017</a:t>
             </a:fld>
             <a:endParaRPr lang="en-US" dirty="0"/>
           </a:p>
@@ -1844,7 +1844,7 @@
             <a:fld id="{B61BEF0D-F0BB-DE4B-95CE-6DB70DBA9567}" type="datetimeFigureOut">
               <a:rPr lang="en-US" dirty="0"/>
               <a:pPr/>
-              <a:t>2/14/2017</a:t>
+              <a:t>2/20/2017</a:t>
             </a:fld>
             <a:endParaRPr lang="en-US" dirty="0"/>
           </a:p>
@@ -2143,7 +2143,7 @@
             <a:fld id="{B61BEF0D-F0BB-DE4B-95CE-6DB70DBA9567}" type="datetimeFigureOut">
               <a:rPr lang="en-US" dirty="0"/>
               <a:pPr/>
-              <a:t>2/14/2017</a:t>
+              <a:t>2/20/2017</a:t>
             </a:fld>
             <a:endParaRPr lang="en-US" dirty="0"/>
           </a:p>
@@ -2562,7 +2562,7 @@
             <a:fld id="{B61BEF0D-F0BB-DE4B-95CE-6DB70DBA9567}" type="datetimeFigureOut">
               <a:rPr lang="en-US" dirty="0"/>
               <a:pPr/>
-              <a:t>2/14/2017</a:t>
+              <a:t>2/20/2017</a:t>
             </a:fld>
             <a:endParaRPr lang="en-US" dirty="0"/>
           </a:p>
@@ -2721,7 +2721,7 @@
             <a:fld id="{B61BEF0D-F0BB-DE4B-95CE-6DB70DBA9567}" type="datetimeFigureOut">
               <a:rPr lang="en-US" dirty="0"/>
               <a:pPr/>
-              <a:t>2/14/2017</a:t>
+              <a:t>2/20/2017</a:t>
             </a:fld>
             <a:endParaRPr lang="en-US" dirty="0"/>
           </a:p>
@@ -2813,7 +2813,7 @@
             <a:fld id="{B61BEF0D-F0BB-DE4B-95CE-6DB70DBA9567}" type="datetimeFigureOut">
               <a:rPr lang="en-US" dirty="0"/>
               <a:pPr/>
-              <a:t>2/14/2017</a:t>
+              <a:t>2/20/2017</a:t>
             </a:fld>
             <a:endParaRPr lang="en-US" dirty="0"/>
           </a:p>
@@ -3188,7 +3188,7 @@
             <a:fld id="{B61BEF0D-F0BB-DE4B-95CE-6DB70DBA9567}" type="datetimeFigureOut">
               <a:rPr lang="en-US" dirty="0"/>
               <a:pPr/>
-              <a:t>2/14/2017</a:t>
+              <a:t>2/20/2017</a:t>
             </a:fld>
             <a:endParaRPr lang="en-US" dirty="0"/>
           </a:p>
@@ -3474,7 +3474,7 @@
             <a:fld id="{B61BEF0D-F0BB-DE4B-95CE-6DB70DBA9567}" type="datetimeFigureOut">
               <a:rPr lang="en-US" dirty="0"/>
               <a:pPr/>
-              <a:t>2/14/2017</a:t>
+              <a:t>2/20/2017</a:t>
             </a:fld>
             <a:endParaRPr lang="en-US" dirty="0"/>
           </a:p>
@@ -3682,7 +3682,7 @@
             <a:fld id="{B61BEF0D-F0BB-DE4B-95CE-6DB70DBA9567}" type="datetimeFigureOut">
               <a:rPr lang="en-US" dirty="0"/>
               <a:pPr/>
-              <a:t>2/14/2017</a:t>
+              <a:t>2/20/2017</a:t>
             </a:fld>
             <a:endParaRPr lang="en-US" dirty="0"/>
           </a:p>
@@ -7098,6 +7098,12 @@
               <a:t>Additional FILESTREAM support</a:t>
             </a:r>
           </a:p>
+          <a:p>
+            <a:r>
+              <a:rPr lang="en-US" dirty="0"/>
+              <a:t>Management Studio – now a separate install … and free</a:t>
+            </a:r>
+          </a:p>
         </p:txBody>
       </p:sp>
     </p:spTree>
@@ -7790,6 +7796,34 @@
               <a:rPr lang="en-US" dirty="0"/>
               <a:t>Access is controlled by a user-defined function that is applied to the table’s security</a:t>
             </a:r>
+          </a:p>
+          <a:p>
+            <a:r>
+              <a:rPr lang="en-US" dirty="0"/>
+              <a:t>Non-qualifying rows are silently blocked</a:t>
+            </a:r>
+          </a:p>
+          <a:p>
+            <a:pPr lvl="1"/>
+            <a:r>
+              <a:rPr lang="en-US" dirty="0"/>
+              <a:t>Select predicate – controls read access to the row</a:t>
+            </a:r>
+          </a:p>
+          <a:p>
+            <a:pPr lvl="1"/>
+            <a:r>
+              <a:rPr lang="en-US" dirty="0"/>
+              <a:t>Block predicate – controls modification to the row (either before or after </a:t>
+            </a:r>
+            <a:r>
+              <a:rPr lang="en-US"/>
+              <a:t>the modification)</a:t>
+            </a:r>
+            <a:endParaRPr lang="en-US" dirty="0"/>
+          </a:p>
+          <a:p>
+            <a:endParaRPr lang="en-US" dirty="0"/>
           </a:p>
         </p:txBody>
       </p:sp>

</xml_diff>

<commit_message>
Note about higher editions.
</commit_message>
<xml_diff>
--- a/AwesomeFreeSQLServerFeatures.pptx
+++ b/AwesomeFreeSQLServerFeatures.pptx
@@ -212,7 +212,7 @@
           <a:p>
             <a:fld id="{64F240C7-B8B6-4D73-9667-9F7409B58D21}" type="datetimeFigureOut">
               <a:rPr lang="en-US" smtClean="0"/>
-              <a:t>2/20/2017</a:t>
+              <a:t>2/21/2017</a:t>
             </a:fld>
             <a:endParaRPr lang="en-US"/>
           </a:p>
@@ -812,7 +812,7 @@
             <a:fld id="{B61BEF0D-F0BB-DE4B-95CE-6DB70DBA9567}" type="datetimeFigureOut">
               <a:rPr lang="en-US" dirty="0"/>
               <a:pPr/>
-              <a:t>2/20/2017</a:t>
+              <a:t>2/21/2017</a:t>
             </a:fld>
             <a:endParaRPr lang="en-US" dirty="0"/>
           </a:p>
@@ -1071,7 +1071,7 @@
             <a:fld id="{B61BEF0D-F0BB-DE4B-95CE-6DB70DBA9567}" type="datetimeFigureOut">
               <a:rPr lang="en-US" dirty="0"/>
               <a:pPr/>
-              <a:t>2/20/2017</a:t>
+              <a:t>2/21/2017</a:t>
             </a:fld>
             <a:endParaRPr lang="en-US" dirty="0"/>
           </a:p>
@@ -1303,7 +1303,7 @@
             <a:fld id="{B61BEF0D-F0BB-DE4B-95CE-6DB70DBA9567}" type="datetimeFigureOut">
               <a:rPr lang="en-US" dirty="0"/>
               <a:pPr/>
-              <a:t>2/20/2017</a:t>
+              <a:t>2/21/2017</a:t>
             </a:fld>
             <a:endParaRPr lang="en-US" dirty="0"/>
           </a:p>
@@ -1540,7 +1540,7 @@
             <a:fld id="{B61BEF0D-F0BB-DE4B-95CE-6DB70DBA9567}" type="datetimeFigureOut">
               <a:rPr lang="en-US" dirty="0"/>
               <a:pPr/>
-              <a:t>2/20/2017</a:t>
+              <a:t>2/21/2017</a:t>
             </a:fld>
             <a:endParaRPr lang="en-US" dirty="0"/>
           </a:p>
@@ -1844,7 +1844,7 @@
             <a:fld id="{B61BEF0D-F0BB-DE4B-95CE-6DB70DBA9567}" type="datetimeFigureOut">
               <a:rPr lang="en-US" dirty="0"/>
               <a:pPr/>
-              <a:t>2/20/2017</a:t>
+              <a:t>2/21/2017</a:t>
             </a:fld>
             <a:endParaRPr lang="en-US" dirty="0"/>
           </a:p>
@@ -2143,7 +2143,7 @@
             <a:fld id="{B61BEF0D-F0BB-DE4B-95CE-6DB70DBA9567}" type="datetimeFigureOut">
               <a:rPr lang="en-US" dirty="0"/>
               <a:pPr/>
-              <a:t>2/20/2017</a:t>
+              <a:t>2/21/2017</a:t>
             </a:fld>
             <a:endParaRPr lang="en-US" dirty="0"/>
           </a:p>
@@ -2562,7 +2562,7 @@
             <a:fld id="{B61BEF0D-F0BB-DE4B-95CE-6DB70DBA9567}" type="datetimeFigureOut">
               <a:rPr lang="en-US" dirty="0"/>
               <a:pPr/>
-              <a:t>2/20/2017</a:t>
+              <a:t>2/21/2017</a:t>
             </a:fld>
             <a:endParaRPr lang="en-US" dirty="0"/>
           </a:p>
@@ -2721,7 +2721,7 @@
             <a:fld id="{B61BEF0D-F0BB-DE4B-95CE-6DB70DBA9567}" type="datetimeFigureOut">
               <a:rPr lang="en-US" dirty="0"/>
               <a:pPr/>
-              <a:t>2/20/2017</a:t>
+              <a:t>2/21/2017</a:t>
             </a:fld>
             <a:endParaRPr lang="en-US" dirty="0"/>
           </a:p>
@@ -2813,7 +2813,7 @@
             <a:fld id="{B61BEF0D-F0BB-DE4B-95CE-6DB70DBA9567}" type="datetimeFigureOut">
               <a:rPr lang="en-US" dirty="0"/>
               <a:pPr/>
-              <a:t>2/20/2017</a:t>
+              <a:t>2/21/2017</a:t>
             </a:fld>
             <a:endParaRPr lang="en-US" dirty="0"/>
           </a:p>
@@ -3188,7 +3188,7 @@
             <a:fld id="{B61BEF0D-F0BB-DE4B-95CE-6DB70DBA9567}" type="datetimeFigureOut">
               <a:rPr lang="en-US" dirty="0"/>
               <a:pPr/>
-              <a:t>2/20/2017</a:t>
+              <a:t>2/21/2017</a:t>
             </a:fld>
             <a:endParaRPr lang="en-US" dirty="0"/>
           </a:p>
@@ -3474,7 +3474,7 @@
             <a:fld id="{B61BEF0D-F0BB-DE4B-95CE-6DB70DBA9567}" type="datetimeFigureOut">
               <a:rPr lang="en-US" dirty="0"/>
               <a:pPr/>
-              <a:t>2/20/2017</a:t>
+              <a:t>2/21/2017</a:t>
             </a:fld>
             <a:endParaRPr lang="en-US" dirty="0"/>
           </a:p>
@@ -3682,7 +3682,7 @@
             <a:fld id="{B61BEF0D-F0BB-DE4B-95CE-6DB70DBA9567}" type="datetimeFigureOut">
               <a:rPr lang="en-US" dirty="0"/>
               <a:pPr/>
-              <a:t>2/20/2017</a:t>
+              <a:t>2/21/2017</a:t>
             </a:fld>
             <a:endParaRPr lang="en-US" dirty="0"/>
           </a:p>
@@ -4634,7 +4634,6 @@
               <a:rPr lang="en-US" dirty="0"/>
               <a:t>(Speed Dating)</a:t>
             </a:r>
-            <a:endParaRPr lang="en-US" dirty="0"/>
           </a:p>
         </p:txBody>
       </p:sp>
@@ -4807,7 +4806,6 @@
               <a:rPr lang="en-US" dirty="0"/>
               <a:t>(Speed Dating)</a:t>
             </a:r>
-            <a:endParaRPr lang="en-US" dirty="0"/>
           </a:p>
         </p:txBody>
       </p:sp>
@@ -4980,7 +4978,6 @@
               <a:rPr lang="en-US" dirty="0"/>
               <a:t>(Speed Dating)</a:t>
             </a:r>
-            <a:endParaRPr lang="en-US" dirty="0"/>
           </a:p>
         </p:txBody>
       </p:sp>
@@ -5223,7 +5220,6 @@
               <a:rPr lang="en-US" dirty="0"/>
               <a:t>(Speed Dating)</a:t>
             </a:r>
-            <a:endParaRPr lang="en-US" dirty="0"/>
           </a:p>
         </p:txBody>
       </p:sp>
@@ -5392,7 +5388,6 @@
               <a:rPr lang="en-US" dirty="0"/>
               <a:t>(Speed Dating)</a:t>
             </a:r>
-            <a:endParaRPr lang="en-US" dirty="0"/>
           </a:p>
         </p:txBody>
       </p:sp>
@@ -7012,9 +7007,16 @@
             <p:ph idx="1"/>
           </p:nvPr>
         </p:nvSpPr>
-        <p:spPr/>
-        <p:txBody>
-          <a:bodyPr numCol="3"/>
+        <p:spPr>
+          <a:xfrm>
+            <a:off x="581192" y="2180496"/>
+            <a:ext cx="11029615" cy="3107121"/>
+          </a:xfrm>
+        </p:spPr>
+        <p:txBody>
+          <a:bodyPr numCol="3">
+            <a:normAutofit/>
+          </a:bodyPr>
           <a:lstStyle/>
           <a:p>
             <a:r>
@@ -7143,6 +7145,40 @@
               <a:rPr lang="en-US" dirty="0"/>
               <a:t>Management Studio – now a separate install … and free to use</a:t>
             </a:r>
+          </a:p>
+        </p:txBody>
+      </p:sp>
+      <p:sp>
+        <p:nvSpPr>
+          <p:cNvPr id="4" name="TextBox 3"/>
+          <p:cNvSpPr txBox="1"/>
+          <p:nvPr/>
+        </p:nvSpPr>
+        <p:spPr>
+          <a:xfrm>
+            <a:off x="702365" y="5565913"/>
+            <a:ext cx="10402957" cy="646331"/>
+          </a:xfrm>
+          <a:prstGeom prst="rect">
+            <a:avLst/>
+          </a:prstGeom>
+          <a:noFill/>
+        </p:spPr>
+        <p:txBody>
+          <a:bodyPr wrap="square" rtlCol="0">
+            <a:spAutoFit/>
+          </a:bodyPr>
+          <a:lstStyle/>
+          <a:p>
+            <a:r>
+              <a:rPr lang="en-US" dirty="0"/>
+              <a:t>All of these features, of course, in more advanced editions for those who need to overcome Express limitations and are able </a:t>
+            </a:r>
+            <a:r>
+              <a:rPr lang="en-US"/>
+              <a:t>to pay!</a:t>
+            </a:r>
+            <a:endParaRPr lang="en-US" dirty="0"/>
           </a:p>
         </p:txBody>
       </p:sp>
@@ -7913,7 +7949,6 @@
               <a:rPr lang="en-US" dirty="0"/>
               <a:t>(Speed Dating)</a:t>
             </a:r>
-            <a:endParaRPr lang="en-US" dirty="0"/>
           </a:p>
         </p:txBody>
       </p:sp>
@@ -8082,7 +8117,6 @@
               <a:rPr lang="en-US" dirty="0"/>
               <a:t>(Speed Dating)</a:t>
             </a:r>
-            <a:endParaRPr lang="en-US" dirty="0"/>
           </a:p>
         </p:txBody>
       </p:sp>

</xml_diff>

<commit_message>
Add notes to New Features page.
</commit_message>
<xml_diff>
--- a/AwesomeFreeSQLServerFeatures.pptx
+++ b/AwesomeFreeSQLServerFeatures.pptx
@@ -11,7 +11,7 @@
     <p:sldId id="256" r:id="rId2"/>
     <p:sldId id="257" r:id="rId3"/>
     <p:sldId id="259" r:id="rId4"/>
-    <p:sldId id="260" r:id="rId5"/>
+    <p:sldId id="272" r:id="rId5"/>
     <p:sldId id="261" r:id="rId6"/>
     <p:sldId id="262" r:id="rId7"/>
     <p:sldId id="263" r:id="rId8"/>
@@ -212,7 +212,7 @@
           <a:p>
             <a:fld id="{64F240C7-B8B6-4D73-9667-9F7409B58D21}" type="datetimeFigureOut">
               <a:rPr lang="en-US" smtClean="0"/>
-              <a:t>2/21/2017</a:t>
+              <a:t>2/22/2017</a:t>
             </a:fld>
             <a:endParaRPr lang="en-US"/>
           </a:p>
@@ -566,6 +566,186 @@
 </p:notes>
 </file>
 
+<file path=ppt/notesSlides/notesSlide2.xml><?xml version="1.0" encoding="utf-8"?>
+<p:notes xmlns:a="http://schemas.openxmlformats.org/drawingml/2006/main" xmlns:r="http://schemas.openxmlformats.org/officeDocument/2006/relationships" xmlns:p="http://schemas.openxmlformats.org/presentationml/2006/main">
+  <p:cSld>
+    <p:spTree>
+      <p:nvGrpSpPr>
+        <p:cNvPr id="1" name=""/>
+        <p:cNvGrpSpPr/>
+        <p:nvPr/>
+      </p:nvGrpSpPr>
+      <p:grpSpPr>
+        <a:xfrm>
+          <a:off x="0" y="0"/>
+          <a:ext cx="0" cy="0"/>
+          <a:chOff x="0" y="0"/>
+          <a:chExt cx="0" cy="0"/>
+        </a:xfrm>
+      </p:grpSpPr>
+      <p:sp>
+        <p:nvSpPr>
+          <p:cNvPr id="2" name="Slide Image Placeholder 1"/>
+          <p:cNvSpPr>
+            <a:spLocks noGrp="1" noRot="1" noChangeAspect="1"/>
+          </p:cNvSpPr>
+          <p:nvPr>
+            <p:ph type="sldImg"/>
+          </p:nvPr>
+        </p:nvSpPr>
+        <p:spPr/>
+      </p:sp>
+      <p:sp>
+        <p:nvSpPr>
+          <p:cNvPr id="3" name="Notes Placeholder 2"/>
+          <p:cNvSpPr>
+            <a:spLocks noGrp="1"/>
+          </p:cNvSpPr>
+          <p:nvPr>
+            <p:ph type="body" idx="1"/>
+          </p:nvPr>
+        </p:nvSpPr>
+        <p:spPr/>
+        <p:txBody>
+          <a:bodyPr/>
+          <a:lstStyle/>
+          <a:p>
+            <a:r>
+              <a:rPr lang="en-US" dirty="0"/>
+              <a:t>Features that won’t be discussed in this session:</a:t>
+            </a:r>
+          </a:p>
+          <a:p>
+            <a:pPr marL="171450" indent="-171450">
+              <a:buFont typeface="Arial" panose="020B0604020202020204" pitchFamily="34" charset="0"/>
+              <a:buChar char="•"/>
+            </a:pPr>
+            <a:r>
+              <a:rPr lang="en-US" dirty="0" err="1"/>
+              <a:t>StretchDB</a:t>
+            </a:r>
+            <a:r>
+              <a:rPr lang="en-US" dirty="0"/>
+              <a:t> – Selectively split a table between on premise and Azure</a:t>
+            </a:r>
+          </a:p>
+          <a:p>
+            <a:pPr marL="171450" indent="-171450">
+              <a:buFont typeface="Arial" panose="020B0604020202020204" pitchFamily="34" charset="0"/>
+              <a:buChar char="•"/>
+            </a:pPr>
+            <a:r>
+              <a:rPr lang="en-US" dirty="0"/>
+              <a:t>Query Store – (More of a DBA feature) – Maintains performance-related info about individual queries for later analysis</a:t>
+            </a:r>
+          </a:p>
+          <a:p>
+            <a:pPr marL="171450" indent="-171450">
+              <a:buFont typeface="Arial" panose="020B0604020202020204" pitchFamily="34" charset="0"/>
+              <a:buChar char="•"/>
+            </a:pPr>
+            <a:r>
+              <a:rPr lang="en-US" dirty="0"/>
+              <a:t>JSON support – Version 1 product, not very full featured.  Not a native datatype, unlike XML.  Mostly functions to support JSON.</a:t>
+            </a:r>
+          </a:p>
+          <a:p>
+            <a:pPr marL="171450" indent="-171450">
+              <a:buFont typeface="Arial" panose="020B0604020202020204" pitchFamily="34" charset="0"/>
+              <a:buChar char="•"/>
+            </a:pPr>
+            <a:r>
+              <a:rPr lang="en-US" dirty="0"/>
+              <a:t>Temporal tables – Perhaps most compelling feature of SQL 2016, but a rather involved topic.  Keep historical versions of data at the row level.</a:t>
+            </a:r>
+          </a:p>
+          <a:p>
+            <a:pPr marL="171450" indent="-171450">
+              <a:buFont typeface="Arial" panose="020B0604020202020204" pitchFamily="34" charset="0"/>
+              <a:buChar char="•"/>
+            </a:pPr>
+            <a:r>
+              <a:rPr lang="en-US" dirty="0"/>
+              <a:t>Dynamic data masking – Applying a masking function to a column to render the data partially unreadable</a:t>
+            </a:r>
+          </a:p>
+          <a:p>
+            <a:pPr marL="171450" indent="-171450">
+              <a:buFont typeface="Arial" panose="020B0604020202020204" pitchFamily="34" charset="0"/>
+              <a:buChar char="•"/>
+            </a:pPr>
+            <a:r>
+              <a:rPr lang="en-US" dirty="0"/>
+              <a:t>Auditing – Tracking when and who accesses or modifies data</a:t>
+            </a:r>
+          </a:p>
+          <a:p>
+            <a:pPr marL="171450" indent="-171450">
+              <a:buFont typeface="Arial" panose="020B0604020202020204" pitchFamily="34" charset="0"/>
+              <a:buChar char="•"/>
+            </a:pPr>
+            <a:r>
+              <a:rPr lang="en-US" dirty="0" err="1"/>
+              <a:t>Polybase</a:t>
+            </a:r>
+            <a:r>
+              <a:rPr lang="en-US" dirty="0"/>
+              <a:t> – Like Hadoop.  Requires Enterprise Edition for the head node, but any other edition can be used as a compute node.</a:t>
+            </a:r>
+          </a:p>
+          <a:p>
+            <a:pPr marL="171450" indent="-171450">
+              <a:buFont typeface="Arial" panose="020B0604020202020204" pitchFamily="34" charset="0"/>
+              <a:buChar char="•"/>
+            </a:pPr>
+            <a:r>
+              <a:rPr lang="en-US" dirty="0"/>
+              <a:t>DBCC CLONEDATABASE – Make a copy of a database without data, but with all other objects, including statistics, intact.  Useful for performance testing </a:t>
+            </a:r>
+            <a:r>
+              <a:rPr lang="en-US"/>
+              <a:t>query changes.</a:t>
+            </a:r>
+            <a:endParaRPr lang="en-US" dirty="0"/>
+          </a:p>
+        </p:txBody>
+      </p:sp>
+      <p:sp>
+        <p:nvSpPr>
+          <p:cNvPr id="4" name="Slide Number Placeholder 3"/>
+          <p:cNvSpPr>
+            <a:spLocks noGrp="1"/>
+          </p:cNvSpPr>
+          <p:nvPr>
+            <p:ph type="sldNum" sz="quarter" idx="10"/>
+          </p:nvPr>
+        </p:nvSpPr>
+        <p:spPr/>
+        <p:txBody>
+          <a:bodyPr/>
+          <a:lstStyle/>
+          <a:p>
+            <a:fld id="{8B5705F6-219D-4122-80FA-D82FBBCA0869}" type="slidenum">
+              <a:rPr lang="en-US" smtClean="0"/>
+              <a:t>4</a:t>
+            </a:fld>
+            <a:endParaRPr lang="en-US"/>
+          </a:p>
+        </p:txBody>
+      </p:sp>
+    </p:spTree>
+    <p:extLst>
+      <p:ext uri="{BB962C8B-B14F-4D97-AF65-F5344CB8AC3E}">
+        <p14:creationId xmlns:p14="http://schemas.microsoft.com/office/powerpoint/2010/main" val="638654221"/>
+      </p:ext>
+    </p:extLst>
+  </p:cSld>
+  <p:clrMapOvr>
+    <a:masterClrMapping/>
+  </p:clrMapOvr>
+</p:notes>
+</file>
+
 <file path=ppt/slideLayouts/slideLayout1.xml><?xml version="1.0" encoding="utf-8"?>
 <p:sldLayout xmlns:a="http://schemas.openxmlformats.org/drawingml/2006/main" xmlns:r="http://schemas.openxmlformats.org/officeDocument/2006/relationships" xmlns:p="http://schemas.openxmlformats.org/presentationml/2006/main" type="title" preserve="1">
   <p:cSld name="Title Slide">
@@ -812,7 +992,7 @@
             <a:fld id="{B61BEF0D-F0BB-DE4B-95CE-6DB70DBA9567}" type="datetimeFigureOut">
               <a:rPr lang="en-US" dirty="0"/>
               <a:pPr/>
-              <a:t>2/21/2017</a:t>
+              <a:t>2/22/2017</a:t>
             </a:fld>
             <a:endParaRPr lang="en-US" dirty="0"/>
           </a:p>
@@ -1071,7 +1251,7 @@
             <a:fld id="{B61BEF0D-F0BB-DE4B-95CE-6DB70DBA9567}" type="datetimeFigureOut">
               <a:rPr lang="en-US" dirty="0"/>
               <a:pPr/>
-              <a:t>2/21/2017</a:t>
+              <a:t>2/22/2017</a:t>
             </a:fld>
             <a:endParaRPr lang="en-US" dirty="0"/>
           </a:p>
@@ -1303,7 +1483,7 @@
             <a:fld id="{B61BEF0D-F0BB-DE4B-95CE-6DB70DBA9567}" type="datetimeFigureOut">
               <a:rPr lang="en-US" dirty="0"/>
               <a:pPr/>
-              <a:t>2/21/2017</a:t>
+              <a:t>2/22/2017</a:t>
             </a:fld>
             <a:endParaRPr lang="en-US" dirty="0"/>
           </a:p>
@@ -1540,7 +1720,7 @@
             <a:fld id="{B61BEF0D-F0BB-DE4B-95CE-6DB70DBA9567}" type="datetimeFigureOut">
               <a:rPr lang="en-US" dirty="0"/>
               <a:pPr/>
-              <a:t>2/21/2017</a:t>
+              <a:t>2/22/2017</a:t>
             </a:fld>
             <a:endParaRPr lang="en-US" dirty="0"/>
           </a:p>
@@ -1844,7 +2024,7 @@
             <a:fld id="{B61BEF0D-F0BB-DE4B-95CE-6DB70DBA9567}" type="datetimeFigureOut">
               <a:rPr lang="en-US" dirty="0"/>
               <a:pPr/>
-              <a:t>2/21/2017</a:t>
+              <a:t>2/22/2017</a:t>
             </a:fld>
             <a:endParaRPr lang="en-US" dirty="0"/>
           </a:p>
@@ -2143,7 +2323,7 @@
             <a:fld id="{B61BEF0D-F0BB-DE4B-95CE-6DB70DBA9567}" type="datetimeFigureOut">
               <a:rPr lang="en-US" dirty="0"/>
               <a:pPr/>
-              <a:t>2/21/2017</a:t>
+              <a:t>2/22/2017</a:t>
             </a:fld>
             <a:endParaRPr lang="en-US" dirty="0"/>
           </a:p>
@@ -2562,7 +2742,7 @@
             <a:fld id="{B61BEF0D-F0BB-DE4B-95CE-6DB70DBA9567}" type="datetimeFigureOut">
               <a:rPr lang="en-US" dirty="0"/>
               <a:pPr/>
-              <a:t>2/21/2017</a:t>
+              <a:t>2/22/2017</a:t>
             </a:fld>
             <a:endParaRPr lang="en-US" dirty="0"/>
           </a:p>
@@ -2721,7 +2901,7 @@
             <a:fld id="{B61BEF0D-F0BB-DE4B-95CE-6DB70DBA9567}" type="datetimeFigureOut">
               <a:rPr lang="en-US" dirty="0"/>
               <a:pPr/>
-              <a:t>2/21/2017</a:t>
+              <a:t>2/22/2017</a:t>
             </a:fld>
             <a:endParaRPr lang="en-US" dirty="0"/>
           </a:p>
@@ -2813,7 +2993,7 @@
             <a:fld id="{B61BEF0D-F0BB-DE4B-95CE-6DB70DBA9567}" type="datetimeFigureOut">
               <a:rPr lang="en-US" dirty="0"/>
               <a:pPr/>
-              <a:t>2/21/2017</a:t>
+              <a:t>2/22/2017</a:t>
             </a:fld>
             <a:endParaRPr lang="en-US" dirty="0"/>
           </a:p>
@@ -3188,7 +3368,7 @@
             <a:fld id="{B61BEF0D-F0BB-DE4B-95CE-6DB70DBA9567}" type="datetimeFigureOut">
               <a:rPr lang="en-US" dirty="0"/>
               <a:pPr/>
-              <a:t>2/21/2017</a:t>
+              <a:t>2/22/2017</a:t>
             </a:fld>
             <a:endParaRPr lang="en-US" dirty="0"/>
           </a:p>
@@ -3474,7 +3654,7 @@
             <a:fld id="{B61BEF0D-F0BB-DE4B-95CE-6DB70DBA9567}" type="datetimeFigureOut">
               <a:rPr lang="en-US" dirty="0"/>
               <a:pPr/>
-              <a:t>2/21/2017</a:t>
+              <a:t>2/22/2017</a:t>
             </a:fld>
             <a:endParaRPr lang="en-US" dirty="0"/>
           </a:p>
@@ -3682,7 +3862,7 @@
             <a:fld id="{B61BEF0D-F0BB-DE4B-95CE-6DB70DBA9567}" type="datetimeFigureOut">
               <a:rPr lang="en-US" dirty="0"/>
               <a:pPr/>
-              <a:t>2/21/2017</a:t>
+              <a:t>2/22/2017</a:t>
             </a:fld>
             <a:endParaRPr lang="en-US" dirty="0"/>
           </a:p>
@@ -7009,14 +7189,12 @@
         </p:nvSpPr>
         <p:spPr>
           <a:xfrm>
-            <a:off x="581192" y="2180496"/>
-            <a:ext cx="11029615" cy="3107121"/>
+            <a:off x="581192" y="2180497"/>
+            <a:ext cx="11029615" cy="3196176"/>
           </a:xfrm>
         </p:spPr>
         <p:txBody>
-          <a:bodyPr numCol="3">
-            <a:normAutofit/>
-          </a:bodyPr>
+          <a:bodyPr numCol="3"/>
           <a:lstStyle/>
           <a:p>
             <a:r>
@@ -7061,50 +7239,50 @@
           <a:p>
             <a:pPr lvl="1"/>
             <a:r>
-              <a:rPr lang="en-US" dirty="0"/>
+              <a:rPr lang="en-US" b="1" dirty="0"/>
               <a:t>In-Memory Tables</a:t>
             </a:r>
           </a:p>
           <a:p>
             <a:pPr lvl="1"/>
             <a:r>
-              <a:rPr lang="en-US" dirty="0" err="1"/>
+              <a:rPr lang="en-US" b="1" dirty="0" err="1"/>
               <a:t>Columnstore</a:t>
             </a:r>
-            <a:endParaRPr lang="en-US" dirty="0"/>
-          </a:p>
-          <a:p>
-            <a:pPr lvl="1"/>
-            <a:r>
-              <a:rPr lang="en-US" dirty="0"/>
+            <a:endParaRPr lang="en-US" b="1" dirty="0"/>
+          </a:p>
+          <a:p>
+            <a:pPr lvl="1"/>
+            <a:r>
+              <a:rPr lang="en-US" b="1" dirty="0"/>
               <a:t>Snapshots</a:t>
             </a:r>
           </a:p>
           <a:p>
             <a:pPr lvl="1"/>
             <a:r>
-              <a:rPr lang="en-US" dirty="0"/>
+              <a:rPr lang="en-US" b="1" dirty="0"/>
               <a:t>Partitioning</a:t>
             </a:r>
           </a:p>
           <a:p>
             <a:pPr lvl="1"/>
             <a:r>
-              <a:rPr lang="en-US" dirty="0"/>
+              <a:rPr lang="en-US" b="1" dirty="0"/>
               <a:t>Data compression</a:t>
             </a:r>
           </a:p>
           <a:p>
             <a:pPr lvl="1"/>
             <a:r>
-              <a:rPr lang="en-US" dirty="0"/>
+              <a:rPr lang="en-US" b="1" dirty="0"/>
               <a:t>Row-level security</a:t>
             </a:r>
           </a:p>
           <a:p>
             <a:pPr lvl="1"/>
             <a:r>
-              <a:rPr lang="en-US" dirty="0"/>
+              <a:rPr lang="en-US" b="1" dirty="0"/>
               <a:t>Always Encrypted</a:t>
             </a:r>
           </a:p>
@@ -7136,8 +7314,15 @@
           <a:p>
             <a:pPr lvl="1"/>
             <a:r>
-              <a:rPr lang="en-US" dirty="0"/>
+              <a:rPr lang="en-US" b="1" dirty="0"/>
               <a:t>Additional FILESTREAM support</a:t>
+            </a:r>
+          </a:p>
+          <a:p>
+            <a:pPr lvl="1"/>
+            <a:r>
+              <a:rPr lang="en-US" dirty="0"/>
+              <a:t>DBCC CLONEDATABASE</a:t>
             </a:r>
           </a:p>
           <a:p>
@@ -7172,20 +7357,15 @@
           <a:p>
             <a:r>
               <a:rPr lang="en-US" dirty="0"/>
-              <a:t>All of these features, of course, in more advanced editions for those who need to overcome Express limitations and are able </a:t>
-            </a:r>
-            <a:r>
-              <a:rPr lang="en-US"/>
-              <a:t>to pay!</a:t>
-            </a:r>
-            <a:endParaRPr lang="en-US" dirty="0"/>
+              <a:t>All of these features, of course, are in more advanced editions for those who need to overcome Express limitations and are able to pay!</a:t>
+            </a:r>
           </a:p>
         </p:txBody>
       </p:sp>
     </p:spTree>
     <p:extLst>
       <p:ext uri="{BB962C8B-B14F-4D97-AF65-F5344CB8AC3E}">
-        <p14:creationId xmlns:p14="http://schemas.microsoft.com/office/powerpoint/2010/main" val="1521074343"/>
+        <p14:creationId xmlns:p14="http://schemas.microsoft.com/office/powerpoint/2010/main" val="1095421474"/>
       </p:ext>
     </p:extLst>
   </p:cSld>

</xml_diff>

<commit_message>
Developer Edition is free; differentiation by scale, not by feature.
</commit_message>
<xml_diff>
--- a/AwesomeFreeSQLServerFeatures.pptx
+++ b/AwesomeFreeSQLServerFeatures.pptx
@@ -212,7 +212,7 @@
           <a:p>
             <a:fld id="{64F240C7-B8B6-4D73-9667-9F7409B58D21}" type="datetimeFigureOut">
               <a:rPr lang="en-US" smtClean="0"/>
-              <a:t>2/22/2017</a:t>
+              <a:t>3/14/2017</a:t>
             </a:fld>
             <a:endParaRPr lang="en-US"/>
           </a:p>
@@ -626,8 +626,13 @@
             </a:r>
             <a:r>
               <a:rPr lang="en-US" dirty="0"/>
-              <a:t> – Selectively split a table between on premise and Azure</a:t>
-            </a:r>
+              <a:t> – Selectively split a table between on premise </a:t>
+            </a:r>
+            <a:r>
+              <a:rPr lang="en-US"/>
+              <a:t>and Azure.</a:t>
+            </a:r>
+            <a:endParaRPr lang="en-US" dirty="0"/>
           </a:p>
           <a:p>
             <a:pPr marL="171450" indent="-171450">
@@ -636,7 +641,7 @@
             </a:pPr>
             <a:r>
               <a:rPr lang="en-US" dirty="0"/>
-              <a:t>Query Store – (More of a DBA feature) – Maintains performance-related info about individual queries for later analysis</a:t>
+              <a:t>Query Store – (More of a DBA feature) – Maintains performance-related info about individual queries for later analysis.</a:t>
             </a:r>
           </a:p>
           <a:p>
@@ -666,7 +671,7 @@
             </a:pPr>
             <a:r>
               <a:rPr lang="en-US" dirty="0"/>
-              <a:t>Dynamic data masking – Applying a masking function to a column to render the data partially unreadable</a:t>
+              <a:t>Dynamic data masking – Applying a masking function to a column to render the data partially unreadable.</a:t>
             </a:r>
           </a:p>
           <a:p>
@@ -676,7 +681,7 @@
             </a:pPr>
             <a:r>
               <a:rPr lang="en-US" dirty="0"/>
-              <a:t>Auditing – Tracking when and who accesses or modifies data</a:t>
+              <a:t>Auditing – Tracking when and who accesses or modifies data.  Not full-featured, by “fine-grained.”</a:t>
             </a:r>
           </a:p>
           <a:p>
@@ -700,13 +705,8 @@
             </a:pPr>
             <a:r>
               <a:rPr lang="en-US" dirty="0"/>
-              <a:t>DBCC CLONEDATABASE – Make a copy of a database without data, but with all other objects, including statistics, intact.  Useful for performance testing </a:t>
-            </a:r>
-            <a:r>
-              <a:rPr lang="en-US"/>
-              <a:t>query changes.</a:t>
-            </a:r>
-            <a:endParaRPr lang="en-US" dirty="0"/>
+              <a:t>DBCC CLONEDATABASE – Make a copy of a database without data, but with all other objects, including statistics, intact.  Useful for performance testing query changes.</a:t>
+            </a:r>
           </a:p>
         </p:txBody>
       </p:sp>
@@ -992,7 +992,7 @@
             <a:fld id="{B61BEF0D-F0BB-DE4B-95CE-6DB70DBA9567}" type="datetimeFigureOut">
               <a:rPr lang="en-US" dirty="0"/>
               <a:pPr/>
-              <a:t>2/22/2017</a:t>
+              <a:t>3/14/2017</a:t>
             </a:fld>
             <a:endParaRPr lang="en-US" dirty="0"/>
           </a:p>
@@ -1251,7 +1251,7 @@
             <a:fld id="{B61BEF0D-F0BB-DE4B-95CE-6DB70DBA9567}" type="datetimeFigureOut">
               <a:rPr lang="en-US" dirty="0"/>
               <a:pPr/>
-              <a:t>2/22/2017</a:t>
+              <a:t>3/14/2017</a:t>
             </a:fld>
             <a:endParaRPr lang="en-US" dirty="0"/>
           </a:p>
@@ -1483,7 +1483,7 @@
             <a:fld id="{B61BEF0D-F0BB-DE4B-95CE-6DB70DBA9567}" type="datetimeFigureOut">
               <a:rPr lang="en-US" dirty="0"/>
               <a:pPr/>
-              <a:t>2/22/2017</a:t>
+              <a:t>3/14/2017</a:t>
             </a:fld>
             <a:endParaRPr lang="en-US" dirty="0"/>
           </a:p>
@@ -1720,7 +1720,7 @@
             <a:fld id="{B61BEF0D-F0BB-DE4B-95CE-6DB70DBA9567}" type="datetimeFigureOut">
               <a:rPr lang="en-US" dirty="0"/>
               <a:pPr/>
-              <a:t>2/22/2017</a:t>
+              <a:t>3/14/2017</a:t>
             </a:fld>
             <a:endParaRPr lang="en-US" dirty="0"/>
           </a:p>
@@ -2024,7 +2024,7 @@
             <a:fld id="{B61BEF0D-F0BB-DE4B-95CE-6DB70DBA9567}" type="datetimeFigureOut">
               <a:rPr lang="en-US" dirty="0"/>
               <a:pPr/>
-              <a:t>2/22/2017</a:t>
+              <a:t>3/14/2017</a:t>
             </a:fld>
             <a:endParaRPr lang="en-US" dirty="0"/>
           </a:p>
@@ -2323,7 +2323,7 @@
             <a:fld id="{B61BEF0D-F0BB-DE4B-95CE-6DB70DBA9567}" type="datetimeFigureOut">
               <a:rPr lang="en-US" dirty="0"/>
               <a:pPr/>
-              <a:t>2/22/2017</a:t>
+              <a:t>3/14/2017</a:t>
             </a:fld>
             <a:endParaRPr lang="en-US" dirty="0"/>
           </a:p>
@@ -2742,7 +2742,7 @@
             <a:fld id="{B61BEF0D-F0BB-DE4B-95CE-6DB70DBA9567}" type="datetimeFigureOut">
               <a:rPr lang="en-US" dirty="0"/>
               <a:pPr/>
-              <a:t>2/22/2017</a:t>
+              <a:t>3/14/2017</a:t>
             </a:fld>
             <a:endParaRPr lang="en-US" dirty="0"/>
           </a:p>
@@ -2901,7 +2901,7 @@
             <a:fld id="{B61BEF0D-F0BB-DE4B-95CE-6DB70DBA9567}" type="datetimeFigureOut">
               <a:rPr lang="en-US" dirty="0"/>
               <a:pPr/>
-              <a:t>2/22/2017</a:t>
+              <a:t>3/14/2017</a:t>
             </a:fld>
             <a:endParaRPr lang="en-US" dirty="0"/>
           </a:p>
@@ -2993,7 +2993,7 @@
             <a:fld id="{B61BEF0D-F0BB-DE4B-95CE-6DB70DBA9567}" type="datetimeFigureOut">
               <a:rPr lang="en-US" dirty="0"/>
               <a:pPr/>
-              <a:t>2/22/2017</a:t>
+              <a:t>3/14/2017</a:t>
             </a:fld>
             <a:endParaRPr lang="en-US" dirty="0"/>
           </a:p>
@@ -3368,7 +3368,7 @@
             <a:fld id="{B61BEF0D-F0BB-DE4B-95CE-6DB70DBA9567}" type="datetimeFigureOut">
               <a:rPr lang="en-US" dirty="0"/>
               <a:pPr/>
-              <a:t>2/22/2017</a:t>
+              <a:t>3/14/2017</a:t>
             </a:fld>
             <a:endParaRPr lang="en-US" dirty="0"/>
           </a:p>
@@ -3654,7 +3654,7 @@
             <a:fld id="{B61BEF0D-F0BB-DE4B-95CE-6DB70DBA9567}" type="datetimeFigureOut">
               <a:rPr lang="en-US" dirty="0"/>
               <a:pPr/>
-              <a:t>2/22/2017</a:t>
+              <a:t>3/14/2017</a:t>
             </a:fld>
             <a:endParaRPr lang="en-US" dirty="0"/>
           </a:p>
@@ -3862,7 +3862,7 @@
             <a:fld id="{B61BEF0D-F0BB-DE4B-95CE-6DB70DBA9567}" type="datetimeFigureOut">
               <a:rPr lang="en-US" dirty="0"/>
               <a:pPr/>
-              <a:t>2/22/2017</a:t>
+              <a:t>3/14/2017</a:t>
             </a:fld>
             <a:endParaRPr lang="en-US" dirty="0"/>
           </a:p>
@@ -5842,7 +5842,7 @@
             <p:ph idx="1"/>
             <p:extLst>
               <p:ext uri="{D42A27DB-BD31-4B8C-83A1-F6EECF244321}">
-                <p14:modId xmlns:p14="http://schemas.microsoft.com/office/powerpoint/2010/main" val="2286273136"/>
+                <p14:modId xmlns:p14="http://schemas.microsoft.com/office/powerpoint/2010/main" val="3680033681"/>
               </p:ext>
             </p:extLst>
           </p:nvPr>
@@ -6105,7 +6105,7 @@
                           <a:ea typeface="+mn-ea"/>
                           <a:cs typeface="+mn-cs"/>
                         </a:rPr>
-                        <a:t>Developer</a:t>
+                        <a:t>Developer*</a:t>
                       </a:r>
                     </a:p>
                   </a:txBody>
@@ -6978,6 +6978,35 @@
           </a:graphicData>
         </a:graphic>
       </p:graphicFrame>
+      <p:sp>
+        <p:nvSpPr>
+          <p:cNvPr id="3" name="TextBox 2"/>
+          <p:cNvSpPr txBox="1"/>
+          <p:nvPr/>
+        </p:nvSpPr>
+        <p:spPr>
+          <a:xfrm>
+            <a:off x="581025" y="6145638"/>
+            <a:ext cx="3678251" cy="369332"/>
+          </a:xfrm>
+          <a:prstGeom prst="rect">
+            <a:avLst/>
+          </a:prstGeom>
+          <a:noFill/>
+        </p:spPr>
+        <p:txBody>
+          <a:bodyPr wrap="none" rtlCol="0">
+            <a:spAutoFit/>
+          </a:bodyPr>
+          <a:lstStyle/>
+          <a:p>
+            <a:r>
+              <a:rPr lang="en-US" dirty="0"/>
+              <a:t>* Free starting with SQL Server 2016</a:t>
+            </a:r>
+          </a:p>
+        </p:txBody>
+      </p:sp>
     </p:spTree>
     <p:extLst>
       <p:ext uri="{BB962C8B-B14F-4D97-AF65-F5344CB8AC3E}">
@@ -7118,6 +7147,13 @@
             <a:endParaRPr lang="en-US" sz="1400" dirty="0"/>
           </a:p>
           <a:p>
+            <a:pPr marL="915750" lvl="2" indent="-285750"/>
+            <a:r>
+              <a:rPr lang="en-US" dirty="0"/>
+              <a:t>Differentiation by scale, not by feature</a:t>
+            </a:r>
+          </a:p>
+          <a:p>
             <a:pPr marL="630000" lvl="2" indent="0">
               <a:buNone/>
             </a:pPr>
@@ -7172,7 +7208,7 @@
           <a:p>
             <a:r>
               <a:rPr lang="en-US" dirty="0"/>
-              <a:t>New Features in Express Edition</a:t>
+              <a:t>New Features in Express Edition (2016)</a:t>
             </a:r>
           </a:p>
         </p:txBody>

</xml_diff>

<commit_message>
New feature: Time zone support.
</commit_message>
<xml_diff>
--- a/AwesomeFreeSQLServerFeatures.pptx
+++ b/AwesomeFreeSQLServerFeatures.pptx
@@ -7267,6 +7267,22 @@
             </a:r>
           </a:p>
           <a:p>
+            <a:pPr lvl="1"/>
+            <a:r>
+              <a:rPr lang="en-US" dirty="0"/>
+              <a:t>Time </a:t>
+            </a:r>
+            <a:r>
+              <a:rPr lang="en-US"/>
+              <a:t>zone suppor</a:t>
+            </a:r>
+            <a:r>
+              <a:rPr lang="en-US"/>
+              <a:t>t</a:t>
+            </a:r>
+            <a:endParaRPr lang="en-US" dirty="0"/>
+          </a:p>
+          <a:p>
             <a:r>
               <a:rPr lang="en-US" dirty="0"/>
               <a:t>SQL 2016 Service Pack 1</a:t>

</xml_diff>

<commit_message>
Minor reformatting of title slide.
</commit_message>
<xml_diff>
--- a/AwesomeFreeSQLServerFeatures.pptx
+++ b/AwesomeFreeSQLServerFeatures.pptx
@@ -212,7 +212,7 @@
           <a:p>
             <a:fld id="{64F240C7-B8B6-4D73-9667-9F7409B58D21}" type="datetimeFigureOut">
               <a:rPr lang="en-US" smtClean="0"/>
-              <a:t>3/14/2017</a:t>
+              <a:t>3/17/2017</a:t>
             </a:fld>
             <a:endParaRPr lang="en-US"/>
           </a:p>
@@ -995,7 +995,7 @@
             <a:fld id="{B61BEF0D-F0BB-DE4B-95CE-6DB70DBA9567}" type="datetimeFigureOut">
               <a:rPr lang="en-US" dirty="0"/>
               <a:pPr/>
-              <a:t>3/14/2017</a:t>
+              <a:t>3/17/2017</a:t>
             </a:fld>
             <a:endParaRPr lang="en-US" dirty="0"/>
           </a:p>
@@ -1254,7 +1254,7 @@
             <a:fld id="{B61BEF0D-F0BB-DE4B-95CE-6DB70DBA9567}" type="datetimeFigureOut">
               <a:rPr lang="en-US" dirty="0"/>
               <a:pPr/>
-              <a:t>3/14/2017</a:t>
+              <a:t>3/17/2017</a:t>
             </a:fld>
             <a:endParaRPr lang="en-US" dirty="0"/>
           </a:p>
@@ -1486,7 +1486,7 @@
             <a:fld id="{B61BEF0D-F0BB-DE4B-95CE-6DB70DBA9567}" type="datetimeFigureOut">
               <a:rPr lang="en-US" dirty="0"/>
               <a:pPr/>
-              <a:t>3/14/2017</a:t>
+              <a:t>3/17/2017</a:t>
             </a:fld>
             <a:endParaRPr lang="en-US" dirty="0"/>
           </a:p>
@@ -1723,7 +1723,7 @@
             <a:fld id="{B61BEF0D-F0BB-DE4B-95CE-6DB70DBA9567}" type="datetimeFigureOut">
               <a:rPr lang="en-US" dirty="0"/>
               <a:pPr/>
-              <a:t>3/14/2017</a:t>
+              <a:t>3/17/2017</a:t>
             </a:fld>
             <a:endParaRPr lang="en-US" dirty="0"/>
           </a:p>
@@ -2027,7 +2027,7 @@
             <a:fld id="{B61BEF0D-F0BB-DE4B-95CE-6DB70DBA9567}" type="datetimeFigureOut">
               <a:rPr lang="en-US" dirty="0"/>
               <a:pPr/>
-              <a:t>3/14/2017</a:t>
+              <a:t>3/17/2017</a:t>
             </a:fld>
             <a:endParaRPr lang="en-US" dirty="0"/>
           </a:p>
@@ -2326,7 +2326,7 @@
             <a:fld id="{B61BEF0D-F0BB-DE4B-95CE-6DB70DBA9567}" type="datetimeFigureOut">
               <a:rPr lang="en-US" dirty="0"/>
               <a:pPr/>
-              <a:t>3/14/2017</a:t>
+              <a:t>3/17/2017</a:t>
             </a:fld>
             <a:endParaRPr lang="en-US" dirty="0"/>
           </a:p>
@@ -2745,7 +2745,7 @@
             <a:fld id="{B61BEF0D-F0BB-DE4B-95CE-6DB70DBA9567}" type="datetimeFigureOut">
               <a:rPr lang="en-US" dirty="0"/>
               <a:pPr/>
-              <a:t>3/14/2017</a:t>
+              <a:t>3/17/2017</a:t>
             </a:fld>
             <a:endParaRPr lang="en-US" dirty="0"/>
           </a:p>
@@ -2904,7 +2904,7 @@
             <a:fld id="{B61BEF0D-F0BB-DE4B-95CE-6DB70DBA9567}" type="datetimeFigureOut">
               <a:rPr lang="en-US" dirty="0"/>
               <a:pPr/>
-              <a:t>3/14/2017</a:t>
+              <a:t>3/17/2017</a:t>
             </a:fld>
             <a:endParaRPr lang="en-US" dirty="0"/>
           </a:p>
@@ -2996,7 +2996,7 @@
             <a:fld id="{B61BEF0D-F0BB-DE4B-95CE-6DB70DBA9567}" type="datetimeFigureOut">
               <a:rPr lang="en-US" dirty="0"/>
               <a:pPr/>
-              <a:t>3/14/2017</a:t>
+              <a:t>3/17/2017</a:t>
             </a:fld>
             <a:endParaRPr lang="en-US" dirty="0"/>
           </a:p>
@@ -3371,7 +3371,7 @@
             <a:fld id="{B61BEF0D-F0BB-DE4B-95CE-6DB70DBA9567}" type="datetimeFigureOut">
               <a:rPr lang="en-US" dirty="0"/>
               <a:pPr/>
-              <a:t>3/14/2017</a:t>
+              <a:t>3/17/2017</a:t>
             </a:fld>
             <a:endParaRPr lang="en-US" dirty="0"/>
           </a:p>
@@ -3657,7 +3657,7 @@
             <a:fld id="{B61BEF0D-F0BB-DE4B-95CE-6DB70DBA9567}" type="datetimeFigureOut">
               <a:rPr lang="en-US" dirty="0"/>
               <a:pPr/>
-              <a:t>3/14/2017</a:t>
+              <a:t>3/17/2017</a:t>
             </a:fld>
             <a:endParaRPr lang="en-US" dirty="0"/>
           </a:p>
@@ -3865,7 +3865,7 @@
             <a:fld id="{B61BEF0D-F0BB-DE4B-95CE-6DB70DBA9567}" type="datetimeFigureOut">
               <a:rPr lang="en-US" dirty="0"/>
               <a:pPr/>
-              <a:t>3/14/2017</a:t>
+              <a:t>3/17/2017</a:t>
             </a:fld>
             <a:endParaRPr lang="en-US" dirty="0"/>
           </a:p>
@@ -4516,15 +4516,15 @@
         </p:nvSpPr>
         <p:spPr>
           <a:xfrm>
-            <a:off x="581191" y="5811669"/>
-            <a:ext cx="10993546" cy="590321"/>
+            <a:off x="581191" y="5073041"/>
+            <a:ext cx="10993546" cy="1328949"/>
           </a:xfrm>
           <a:prstGeom prst="rect">
             <a:avLst/>
           </a:prstGeom>
         </p:spPr>
         <p:txBody>
-          <a:bodyPr vert="horz" lIns="91440" tIns="45720" rIns="91440" bIns="45720" rtlCol="0" anchor="t">
+          <a:bodyPr vert="horz" lIns="91440" tIns="45720" rIns="91440" bIns="45720" rtlCol="0" anchor="b" anchorCtr="0">
             <a:normAutofit/>
           </a:bodyPr>
           <a:lstStyle>
@@ -4756,7 +4756,39 @@
                   <a:schemeClr val="bg1"/>
                 </a:solidFill>
               </a:rPr>
-              <a:t>Allison Benneth	Allison@sqltran.org	sqltran.org</a:t>
+              <a:t>Allison Benneth</a:t>
+            </a:r>
+          </a:p>
+          <a:p>
+            <a:pPr defTabSz="771525">
+              <a:tabLst>
+                <a:tab pos="5424488" algn="ctr"/>
+                <a:tab pos="10804525" algn="r"/>
+              </a:tabLst>
+            </a:pPr>
+            <a:r>
+              <a:rPr lang="en-US" dirty="0">
+                <a:solidFill>
+                  <a:schemeClr val="bg1"/>
+                </a:solidFill>
+              </a:rPr>
+              <a:t>Allison@sqltran.org	@</a:t>
+            </a:r>
+            <a:r>
+              <a:rPr lang="en-US" dirty="0" err="1">
+                <a:solidFill>
+                  <a:schemeClr val="bg1"/>
+                </a:solidFill>
+              </a:rPr>
+              <a:t>SQLTran</a:t>
+            </a:r>
+            <a:r>
+              <a:rPr lang="en-US" dirty="0">
+                <a:solidFill>
+                  <a:schemeClr val="bg1"/>
+                </a:solidFill>
+              </a:rPr>
+              <a:t>	sqltran.org</a:t>
             </a:r>
           </a:p>
         </p:txBody>

</xml_diff>

<commit_message>
Note on mandatory telemetry.
</commit_message>
<xml_diff>
--- a/AwesomeFreeSQLServerFeatures.pptx
+++ b/AwesomeFreeSQLServerFeatures.pptx
@@ -212,7 +212,7 @@
           <a:p>
             <a:fld id="{64F240C7-B8B6-4D73-9667-9F7409B58D21}" type="datetimeFigureOut">
               <a:rPr lang="en-US" smtClean="0"/>
-              <a:t>3/17/2017</a:t>
+              <a:t>3/21/2017</a:t>
             </a:fld>
             <a:endParaRPr lang="en-US"/>
           </a:p>
@@ -995,7 +995,7 @@
             <a:fld id="{B61BEF0D-F0BB-DE4B-95CE-6DB70DBA9567}" type="datetimeFigureOut">
               <a:rPr lang="en-US" dirty="0"/>
               <a:pPr/>
-              <a:t>3/17/2017</a:t>
+              <a:t>3/21/2017</a:t>
             </a:fld>
             <a:endParaRPr lang="en-US" dirty="0"/>
           </a:p>
@@ -1254,7 +1254,7 @@
             <a:fld id="{B61BEF0D-F0BB-DE4B-95CE-6DB70DBA9567}" type="datetimeFigureOut">
               <a:rPr lang="en-US" dirty="0"/>
               <a:pPr/>
-              <a:t>3/17/2017</a:t>
+              <a:t>3/21/2017</a:t>
             </a:fld>
             <a:endParaRPr lang="en-US" dirty="0"/>
           </a:p>
@@ -1486,7 +1486,7 @@
             <a:fld id="{B61BEF0D-F0BB-DE4B-95CE-6DB70DBA9567}" type="datetimeFigureOut">
               <a:rPr lang="en-US" dirty="0"/>
               <a:pPr/>
-              <a:t>3/17/2017</a:t>
+              <a:t>3/21/2017</a:t>
             </a:fld>
             <a:endParaRPr lang="en-US" dirty="0"/>
           </a:p>
@@ -1723,7 +1723,7 @@
             <a:fld id="{B61BEF0D-F0BB-DE4B-95CE-6DB70DBA9567}" type="datetimeFigureOut">
               <a:rPr lang="en-US" dirty="0"/>
               <a:pPr/>
-              <a:t>3/17/2017</a:t>
+              <a:t>3/21/2017</a:t>
             </a:fld>
             <a:endParaRPr lang="en-US" dirty="0"/>
           </a:p>
@@ -2027,7 +2027,7 @@
             <a:fld id="{B61BEF0D-F0BB-DE4B-95CE-6DB70DBA9567}" type="datetimeFigureOut">
               <a:rPr lang="en-US" dirty="0"/>
               <a:pPr/>
-              <a:t>3/17/2017</a:t>
+              <a:t>3/21/2017</a:t>
             </a:fld>
             <a:endParaRPr lang="en-US" dirty="0"/>
           </a:p>
@@ -2326,7 +2326,7 @@
             <a:fld id="{B61BEF0D-F0BB-DE4B-95CE-6DB70DBA9567}" type="datetimeFigureOut">
               <a:rPr lang="en-US" dirty="0"/>
               <a:pPr/>
-              <a:t>3/17/2017</a:t>
+              <a:t>3/21/2017</a:t>
             </a:fld>
             <a:endParaRPr lang="en-US" dirty="0"/>
           </a:p>
@@ -2745,7 +2745,7 @@
             <a:fld id="{B61BEF0D-F0BB-DE4B-95CE-6DB70DBA9567}" type="datetimeFigureOut">
               <a:rPr lang="en-US" dirty="0"/>
               <a:pPr/>
-              <a:t>3/17/2017</a:t>
+              <a:t>3/21/2017</a:t>
             </a:fld>
             <a:endParaRPr lang="en-US" dirty="0"/>
           </a:p>
@@ -2904,7 +2904,7 @@
             <a:fld id="{B61BEF0D-F0BB-DE4B-95CE-6DB70DBA9567}" type="datetimeFigureOut">
               <a:rPr lang="en-US" dirty="0"/>
               <a:pPr/>
-              <a:t>3/17/2017</a:t>
+              <a:t>3/21/2017</a:t>
             </a:fld>
             <a:endParaRPr lang="en-US" dirty="0"/>
           </a:p>
@@ -2996,7 +2996,7 @@
             <a:fld id="{B61BEF0D-F0BB-DE4B-95CE-6DB70DBA9567}" type="datetimeFigureOut">
               <a:rPr lang="en-US" dirty="0"/>
               <a:pPr/>
-              <a:t>3/17/2017</a:t>
+              <a:t>3/21/2017</a:t>
             </a:fld>
             <a:endParaRPr lang="en-US" dirty="0"/>
           </a:p>
@@ -3371,7 +3371,7 @@
             <a:fld id="{B61BEF0D-F0BB-DE4B-95CE-6DB70DBA9567}" type="datetimeFigureOut">
               <a:rPr lang="en-US" dirty="0"/>
               <a:pPr/>
-              <a:t>3/17/2017</a:t>
+              <a:t>3/21/2017</a:t>
             </a:fld>
             <a:endParaRPr lang="en-US" dirty="0"/>
           </a:p>
@@ -3657,7 +3657,7 @@
             <a:fld id="{B61BEF0D-F0BB-DE4B-95CE-6DB70DBA9567}" type="datetimeFigureOut">
               <a:rPr lang="en-US" dirty="0"/>
               <a:pPr/>
-              <a:t>3/17/2017</a:t>
+              <a:t>3/21/2017</a:t>
             </a:fld>
             <a:endParaRPr lang="en-US" dirty="0"/>
           </a:p>
@@ -3865,7 +3865,7 @@
             <a:fld id="{B61BEF0D-F0BB-DE4B-95CE-6DB70DBA9567}" type="datetimeFigureOut">
               <a:rPr lang="en-US" dirty="0"/>
               <a:pPr/>
-              <a:t>3/17/2017</a:t>
+              <a:t>3/21/2017</a:t>
             </a:fld>
             <a:endParaRPr lang="en-US" dirty="0"/>
           </a:p>
@@ -7883,6 +7883,20 @@
               <a:t>SSRS with Express with Advanced Services</a:t>
             </a:r>
           </a:p>
+          <a:p>
+            <a:r>
+              <a:rPr lang="en-US" dirty="0"/>
+              <a:t>Beware!</a:t>
+            </a:r>
+          </a:p>
+          <a:p>
+            <a:pPr lvl="1"/>
+            <a:r>
+              <a:rPr lang="en-US"/>
+              <a:t>Mandatory telemetry</a:t>
+            </a:r>
+            <a:endParaRPr lang="en-US" dirty="0"/>
+          </a:p>
         </p:txBody>
       </p:sp>
     </p:spTree>

</xml_diff>

<commit_message>
No R Server in Express.
</commit_message>
<xml_diff>
--- a/AwesomeFreeSQLServerFeatures.pptx
+++ b/AwesomeFreeSQLServerFeatures.pptx
@@ -212,7 +212,7 @@
           <a:p>
             <a:fld id="{64F240C7-B8B6-4D73-9667-9F7409B58D21}" type="datetimeFigureOut">
               <a:rPr lang="en-US" smtClean="0"/>
-              <a:t>3/21/2017</a:t>
+              <a:t>4/10/2017</a:t>
             </a:fld>
             <a:endParaRPr lang="en-US"/>
           </a:p>
@@ -995,7 +995,7 @@
             <a:fld id="{B61BEF0D-F0BB-DE4B-95CE-6DB70DBA9567}" type="datetimeFigureOut">
               <a:rPr lang="en-US" dirty="0"/>
               <a:pPr/>
-              <a:t>3/21/2017</a:t>
+              <a:t>4/10/2017</a:t>
             </a:fld>
             <a:endParaRPr lang="en-US" dirty="0"/>
           </a:p>
@@ -1254,7 +1254,7 @@
             <a:fld id="{B61BEF0D-F0BB-DE4B-95CE-6DB70DBA9567}" type="datetimeFigureOut">
               <a:rPr lang="en-US" dirty="0"/>
               <a:pPr/>
-              <a:t>3/21/2017</a:t>
+              <a:t>4/10/2017</a:t>
             </a:fld>
             <a:endParaRPr lang="en-US" dirty="0"/>
           </a:p>
@@ -1486,7 +1486,7 @@
             <a:fld id="{B61BEF0D-F0BB-DE4B-95CE-6DB70DBA9567}" type="datetimeFigureOut">
               <a:rPr lang="en-US" dirty="0"/>
               <a:pPr/>
-              <a:t>3/21/2017</a:t>
+              <a:t>4/10/2017</a:t>
             </a:fld>
             <a:endParaRPr lang="en-US" dirty="0"/>
           </a:p>
@@ -1723,7 +1723,7 @@
             <a:fld id="{B61BEF0D-F0BB-DE4B-95CE-6DB70DBA9567}" type="datetimeFigureOut">
               <a:rPr lang="en-US" dirty="0"/>
               <a:pPr/>
-              <a:t>3/21/2017</a:t>
+              <a:t>4/10/2017</a:t>
             </a:fld>
             <a:endParaRPr lang="en-US" dirty="0"/>
           </a:p>
@@ -2027,7 +2027,7 @@
             <a:fld id="{B61BEF0D-F0BB-DE4B-95CE-6DB70DBA9567}" type="datetimeFigureOut">
               <a:rPr lang="en-US" dirty="0"/>
               <a:pPr/>
-              <a:t>3/21/2017</a:t>
+              <a:t>4/10/2017</a:t>
             </a:fld>
             <a:endParaRPr lang="en-US" dirty="0"/>
           </a:p>
@@ -2326,7 +2326,7 @@
             <a:fld id="{B61BEF0D-F0BB-DE4B-95CE-6DB70DBA9567}" type="datetimeFigureOut">
               <a:rPr lang="en-US" dirty="0"/>
               <a:pPr/>
-              <a:t>3/21/2017</a:t>
+              <a:t>4/10/2017</a:t>
             </a:fld>
             <a:endParaRPr lang="en-US" dirty="0"/>
           </a:p>
@@ -2745,7 +2745,7 @@
             <a:fld id="{B61BEF0D-F0BB-DE4B-95CE-6DB70DBA9567}" type="datetimeFigureOut">
               <a:rPr lang="en-US" dirty="0"/>
               <a:pPr/>
-              <a:t>3/21/2017</a:t>
+              <a:t>4/10/2017</a:t>
             </a:fld>
             <a:endParaRPr lang="en-US" dirty="0"/>
           </a:p>
@@ -2904,7 +2904,7 @@
             <a:fld id="{B61BEF0D-F0BB-DE4B-95CE-6DB70DBA9567}" type="datetimeFigureOut">
               <a:rPr lang="en-US" dirty="0"/>
               <a:pPr/>
-              <a:t>3/21/2017</a:t>
+              <a:t>4/10/2017</a:t>
             </a:fld>
             <a:endParaRPr lang="en-US" dirty="0"/>
           </a:p>
@@ -2996,7 +2996,7 @@
             <a:fld id="{B61BEF0D-F0BB-DE4B-95CE-6DB70DBA9567}" type="datetimeFigureOut">
               <a:rPr lang="en-US" dirty="0"/>
               <a:pPr/>
-              <a:t>3/21/2017</a:t>
+              <a:t>4/10/2017</a:t>
             </a:fld>
             <a:endParaRPr lang="en-US" dirty="0"/>
           </a:p>
@@ -3371,7 +3371,7 @@
             <a:fld id="{B61BEF0D-F0BB-DE4B-95CE-6DB70DBA9567}" type="datetimeFigureOut">
               <a:rPr lang="en-US" dirty="0"/>
               <a:pPr/>
-              <a:t>3/21/2017</a:t>
+              <a:t>4/10/2017</a:t>
             </a:fld>
             <a:endParaRPr lang="en-US" dirty="0"/>
           </a:p>
@@ -3657,7 +3657,7 @@
             <a:fld id="{B61BEF0D-F0BB-DE4B-95CE-6DB70DBA9567}" type="datetimeFigureOut">
               <a:rPr lang="en-US" dirty="0"/>
               <a:pPr/>
-              <a:t>3/21/2017</a:t>
+              <a:t>4/10/2017</a:t>
             </a:fld>
             <a:endParaRPr lang="en-US" dirty="0"/>
           </a:p>
@@ -3865,7 +3865,7 @@
             <a:fld id="{B61BEF0D-F0BB-DE4B-95CE-6DB70DBA9567}" type="datetimeFigureOut">
               <a:rPr lang="en-US" dirty="0"/>
               <a:pPr/>
-              <a:t>3/21/2017</a:t>
+              <a:t>4/10/2017</a:t>
             </a:fld>
             <a:endParaRPr lang="en-US" dirty="0"/>
           </a:p>
@@ -7873,7 +7873,15 @@
             <a:pPr lvl="1"/>
             <a:r>
               <a:rPr lang="en-US" dirty="0"/>
-              <a:t>No SSIS, SSAS, etc.</a:t>
+              <a:t>No SSIS</a:t>
+            </a:r>
+            <a:r>
+              <a:rPr lang="en-US"/>
+              <a:t>, SSAS, R Server, </a:t>
+            </a:r>
+            <a:r>
+              <a:rPr lang="en-US" dirty="0"/>
+              <a:t>etc.</a:t>
             </a:r>
           </a:p>
           <a:p>
@@ -7892,10 +7900,9 @@
           <a:p>
             <a:pPr lvl="1"/>
             <a:r>
-              <a:rPr lang="en-US"/>
+              <a:rPr lang="en-US" dirty="0"/>
               <a:t>Mandatory telemetry</a:t>
             </a:r>
-            <a:endParaRPr lang="en-US" dirty="0"/>
           </a:p>
         </p:txBody>
       </p:sp>

</xml_diff>

<commit_message>
Rewording on features slide.
</commit_message>
<xml_diff>
--- a/AwesomeFreeSQLServerFeatures.pptx
+++ b/AwesomeFreeSQLServerFeatures.pptx
@@ -7305,13 +7305,8 @@
             <a:pPr lvl="1"/>
             <a:r>
               <a:rPr lang="en-US" dirty="0"/>
-              <a:t>Time </a:t>
-            </a:r>
-            <a:r>
-              <a:rPr lang="en-US"/>
-              <a:t>zone support</a:t>
-            </a:r>
-            <a:endParaRPr lang="en-US" dirty="0"/>
+              <a:t>Time zone support</a:t>
+            </a:r>
           </a:p>
           <a:p>
             <a:r>
@@ -7425,7 +7420,7 @@
         <p:spPr>
           <a:xfrm>
             <a:off x="702365" y="5565913"/>
-            <a:ext cx="10402957" cy="646331"/>
+            <a:ext cx="10402957" cy="369332"/>
           </a:xfrm>
           <a:prstGeom prst="rect">
             <a:avLst/>
@@ -7440,7 +7435,7 @@
           <a:p>
             <a:r>
               <a:rPr lang="en-US" dirty="0"/>
-              <a:t>All of these features, of course, are in more advanced editions for those who need to overcome Express limitations and are able to pay!</a:t>
+              <a:t>All of these features, of course, are in more advanced editions as your application grows!</a:t>
             </a:r>
           </a:p>
         </p:txBody>

</xml_diff>

<commit_message>
Call out new T-SQL features.
</commit_message>
<xml_diff>
--- a/AwesomeFreeSQLServerFeatures.pptx
+++ b/AwesomeFreeSQLServerFeatures.pptx
@@ -666,7 +666,7 @@
             </a:pPr>
             <a:r>
               <a:rPr lang="en-US" dirty="0"/>
-              <a:t>Dynamic data masking – Applying a masking function to a column to render the data partially unreadable.</a:t>
+              <a:t>DROP IF EXISTS</a:t>
             </a:r>
           </a:p>
           <a:p>
@@ -676,15 +676,37 @@
             </a:pPr>
             <a:r>
               <a:rPr lang="en-US" dirty="0"/>
-              <a:t>Auditing – Tracking when and who accesses or modifies data.  Not full-featured</a:t>
-            </a:r>
-            <a:r>
-              <a:rPr lang="en-US"/>
-              <a:t>, but </a:t>
-            </a:r>
-            <a:r>
-              <a:rPr lang="en-US" dirty="0"/>
-              <a:t>“fine-grained.”</a:t>
+              <a:t>AT TIME ZONE</a:t>
+            </a:r>
+          </a:p>
+          <a:p>
+            <a:pPr marL="171450" indent="-171450">
+              <a:buFont typeface="Arial" panose="020B0604020202020204" pitchFamily="34" charset="0"/>
+              <a:buChar char="•"/>
+            </a:pPr>
+            <a:r>
+              <a:rPr lang="en-US" dirty="0"/>
+              <a:t>SESSION_CONTEXT</a:t>
+            </a:r>
+          </a:p>
+          <a:p>
+            <a:pPr marL="171450" indent="-171450">
+              <a:buFont typeface="Arial" panose="020B0604020202020204" pitchFamily="34" charset="0"/>
+              <a:buChar char="•"/>
+            </a:pPr>
+            <a:r>
+              <a:rPr lang="en-US" dirty="0"/>
+              <a:t>Dynamic data masking – Applying a masking function to a column to render the data partially unreadable.</a:t>
+            </a:r>
+          </a:p>
+          <a:p>
+            <a:pPr marL="171450" indent="-171450">
+              <a:buFont typeface="Arial" panose="020B0604020202020204" pitchFamily="34" charset="0"/>
+              <a:buChar char="•"/>
+            </a:pPr>
+            <a:r>
+              <a:rPr lang="en-US" dirty="0"/>
+              <a:t>Auditing – Tracking when and who accesses or modifies data.  Not full-featured, but “fine-grained.”</a:t>
             </a:r>
           </a:p>
           <a:p>
@@ -7260,12 +7282,14 @@
         </p:nvSpPr>
         <p:spPr>
           <a:xfrm>
-            <a:off x="581192" y="2180497"/>
-            <a:ext cx="11029615" cy="3196176"/>
+            <a:off x="581192" y="2180496"/>
+            <a:ext cx="11029615" cy="3558567"/>
           </a:xfrm>
         </p:spPr>
         <p:txBody>
-          <a:bodyPr numCol="3"/>
+          <a:bodyPr numCol="3">
+            <a:normAutofit/>
+          </a:bodyPr>
           <a:lstStyle/>
           <a:p>
             <a:r>
@@ -7305,7 +7329,28 @@
             <a:pPr lvl="1"/>
             <a:r>
               <a:rPr lang="en-US" dirty="0"/>
-              <a:t>Time zone support</a:t>
+              <a:t>T-SQL additions</a:t>
+            </a:r>
+          </a:p>
+          <a:p>
+            <a:pPr lvl="2"/>
+            <a:r>
+              <a:rPr lang="en-US" dirty="0"/>
+              <a:t>DROP IF EXISTS</a:t>
+            </a:r>
+          </a:p>
+          <a:p>
+            <a:pPr lvl="2"/>
+            <a:r>
+              <a:rPr lang="en-US" dirty="0"/>
+              <a:t>AT TIME ZONE</a:t>
+            </a:r>
+          </a:p>
+          <a:p>
+            <a:pPr lvl="2"/>
+            <a:r>
+              <a:rPr lang="en-US" dirty="0"/>
+              <a:t>SESSION_CONTEXT</a:t>
             </a:r>
           </a:p>
           <a:p>
@@ -7419,7 +7464,7 @@
         </p:nvSpPr>
         <p:spPr>
           <a:xfrm>
-            <a:off x="702365" y="5565913"/>
+            <a:off x="581192" y="6047177"/>
             <a:ext cx="10402957" cy="369332"/>
           </a:xfrm>
           <a:prstGeom prst="rect">

</xml_diff>

<commit_message>
Selected features changed.  Remove compression and FILESTREAM; add temporal.
</commit_message>
<xml_diff>
--- a/AwesomeFreeSQLServerFeatures.pptx
+++ b/AwesomeFreeSQLServerFeatures.pptx
@@ -5,7 +5,7 @@
     <p:sldMasterId id="2147483648" r:id="rId1"/>
   </p:sldMasterIdLst>
   <p:notesMasterIdLst>
-    <p:notesMasterId r:id="rId18"/>
+    <p:notesMasterId r:id="rId17"/>
   </p:notesMasterIdLst>
   <p:sldIdLst>
     <p:sldId id="256" r:id="rId2"/>
@@ -21,9 +21,8 @@
     <p:sldId id="267" r:id="rId12"/>
     <p:sldId id="268" r:id="rId13"/>
     <p:sldId id="271" r:id="rId14"/>
-    <p:sldId id="269" r:id="rId15"/>
-    <p:sldId id="270" r:id="rId16"/>
-    <p:sldId id="258" r:id="rId17"/>
+    <p:sldId id="270" r:id="rId15"/>
+    <p:sldId id="258" r:id="rId16"/>
   </p:sldIdLst>
   <p:sldSz cx="12192000" cy="6858000"/>
   <p:notesSz cx="6858000" cy="9144000"/>
@@ -656,7 +655,7 @@
             </a:pPr>
             <a:r>
               <a:rPr lang="en-US" dirty="0"/>
-              <a:t>Temporal tables – Perhaps most compelling feature of SQL 2016, but a rather involved topic.  Keep historical versions of data at the row level.</a:t>
+              <a:t>DROP IF EXISTS</a:t>
             </a:r>
           </a:p>
           <a:p>
@@ -666,7 +665,7 @@
             </a:pPr>
             <a:r>
               <a:rPr lang="en-US" dirty="0"/>
-              <a:t>DROP IF EXISTS</a:t>
+              <a:t>AT TIME ZONE</a:t>
             </a:r>
           </a:p>
           <a:p>
@@ -676,7 +675,7 @@
             </a:pPr>
             <a:r>
               <a:rPr lang="en-US" dirty="0"/>
-              <a:t>AT TIME ZONE</a:t>
+              <a:t>SESSION_CONTEXT</a:t>
             </a:r>
           </a:p>
           <a:p>
@@ -686,7 +685,7 @@
             </a:pPr>
             <a:r>
               <a:rPr lang="en-US" dirty="0"/>
-              <a:t>SESSION_CONTEXT</a:t>
+              <a:t>Data Compression – At the page level or at the row level.  Very useful given the 10GB limit.</a:t>
             </a:r>
           </a:p>
           <a:p>
@@ -721,6 +720,16 @@
             <a:r>
               <a:rPr lang="en-US" dirty="0"/>
               <a:t> – Like Hadoop.  Requires Enterprise Edition for the head node, but any other edition can be used as a compute node.</a:t>
+            </a:r>
+          </a:p>
+          <a:p>
+            <a:pPr marL="171450" indent="-171450">
+              <a:buFont typeface="Arial" panose="020B0604020202020204" pitchFamily="34" charset="0"/>
+              <a:buChar char="•"/>
+            </a:pPr>
+            <a:r>
+              <a:rPr lang="en-US" dirty="0"/>
+              <a:t>FILESTREAM – Store BLOBs in a virtual file system managed by the RDBMS.</a:t>
             </a:r>
           </a:p>
           <a:p>
@@ -4887,7 +4896,7 @@
         <p:spPr/>
         <p:txBody>
           <a:bodyPr>
-            <a:normAutofit fontScale="92500" lnSpcReduction="10000"/>
+            <a:normAutofit lnSpcReduction="10000"/>
           </a:bodyPr>
           <a:lstStyle/>
           <a:p>
@@ -4926,18 +4935,13 @@
           <a:p>
             <a:pPr lvl="1"/>
             <a:r>
-              <a:rPr lang="en-US" dirty="0" err="1">
+              <a:rPr lang="en-US" dirty="0">
                 <a:solidFill>
                   <a:srgbClr val="FF0000"/>
                 </a:solidFill>
               </a:rPr>
-              <a:t>Filestream</a:t>
-            </a:r>
-            <a:endParaRPr lang="en-US" dirty="0">
-              <a:solidFill>
-                <a:srgbClr val="FF0000"/>
-              </a:solidFill>
-            </a:endParaRPr>
+              <a:t>Temporal Tables</a:t>
+            </a:r>
           </a:p>
           <a:p>
             <a:r>
@@ -4961,13 +4965,6 @@
             <a:r>
               <a:rPr lang="en-US" dirty="0"/>
               <a:t>Partitioning</a:t>
-            </a:r>
-          </a:p>
-          <a:p>
-            <a:pPr lvl="1"/>
-            <a:r>
-              <a:rPr lang="en-US" dirty="0"/>
-              <a:t>Compression</a:t>
             </a:r>
           </a:p>
           <a:p>
@@ -5059,7 +5056,7 @@
         <p:spPr/>
         <p:txBody>
           <a:bodyPr>
-            <a:normAutofit fontScale="92500" lnSpcReduction="10000"/>
+            <a:normAutofit lnSpcReduction="10000"/>
           </a:bodyPr>
           <a:lstStyle/>
           <a:p>
@@ -5098,10 +5095,9 @@
           <a:p>
             <a:pPr lvl="1"/>
             <a:r>
-              <a:rPr lang="en-US" dirty="0" err="1"/>
-              <a:t>Filestream</a:t>
-            </a:r>
-            <a:endParaRPr lang="en-US" dirty="0"/>
+              <a:rPr lang="en-US" dirty="0"/>
+              <a:t>Temporal Tables</a:t>
+            </a:r>
           </a:p>
           <a:p>
             <a:r>
@@ -5133,13 +5129,6 @@
             <a:r>
               <a:rPr lang="en-US" dirty="0"/>
               <a:t>Partitioning</a:t>
-            </a:r>
-          </a:p>
-          <a:p>
-            <a:pPr lvl="1"/>
-            <a:r>
-              <a:rPr lang="en-US" dirty="0"/>
-              <a:t>Compression</a:t>
             </a:r>
           </a:p>
           <a:p>
@@ -5231,7 +5220,7 @@
         <p:spPr/>
         <p:txBody>
           <a:bodyPr>
-            <a:normAutofit fontScale="92500" lnSpcReduction="10000"/>
+            <a:normAutofit lnSpcReduction="10000"/>
           </a:bodyPr>
           <a:lstStyle/>
           <a:p>
@@ -5270,10 +5259,9 @@
           <a:p>
             <a:pPr lvl="1"/>
             <a:r>
-              <a:rPr lang="en-US" dirty="0" err="1"/>
-              <a:t>Filestream</a:t>
-            </a:r>
-            <a:endParaRPr lang="en-US" dirty="0"/>
+              <a:rPr lang="en-US" dirty="0"/>
+              <a:t>Temporal Tables</a:t>
+            </a:r>
           </a:p>
           <a:p>
             <a:r>
@@ -5301,13 +5289,6 @@
                 </a:solidFill>
               </a:rPr>
               <a:t>Partitioning</a:t>
-            </a:r>
-          </a:p>
-          <a:p>
-            <a:pPr lvl="1"/>
-            <a:r>
-              <a:rPr lang="en-US" dirty="0"/>
-              <a:t>Compression</a:t>
             </a:r>
           </a:p>
           <a:p>
@@ -5473,7 +5454,7 @@
         <p:spPr/>
         <p:txBody>
           <a:bodyPr>
-            <a:normAutofit fontScale="92500" lnSpcReduction="10000"/>
+            <a:normAutofit lnSpcReduction="10000"/>
           </a:bodyPr>
           <a:lstStyle/>
           <a:p>
@@ -5512,10 +5493,9 @@
           <a:p>
             <a:pPr lvl="1"/>
             <a:r>
-              <a:rPr lang="en-US" dirty="0" err="1"/>
-              <a:t>Filestream</a:t>
-            </a:r>
-            <a:endParaRPr lang="en-US" dirty="0"/>
+              <a:rPr lang="en-US" dirty="0"/>
+              <a:t>Temporal Tables</a:t>
+            </a:r>
           </a:p>
           <a:p>
             <a:r>
@@ -5539,181 +5519,6 @@
             <a:r>
               <a:rPr lang="en-US" dirty="0"/>
               <a:t>Partitioning</a:t>
-            </a:r>
-          </a:p>
-          <a:p>
-            <a:pPr lvl="1"/>
-            <a:r>
-              <a:rPr lang="en-US" dirty="0">
-                <a:solidFill>
-                  <a:srgbClr val="FF0000"/>
-                </a:solidFill>
-              </a:rPr>
-              <a:t>Compression</a:t>
-            </a:r>
-          </a:p>
-          <a:p>
-            <a:pPr lvl="1"/>
-            <a:r>
-              <a:rPr lang="en-US" dirty="0"/>
-              <a:t>In-Memory OLTP (</a:t>
-            </a:r>
-            <a:r>
-              <a:rPr lang="en-US" dirty="0" err="1"/>
-              <a:t>Hekaton</a:t>
-            </a:r>
-            <a:r>
-              <a:rPr lang="en-US" dirty="0"/>
-              <a:t>)</a:t>
-            </a:r>
-          </a:p>
-        </p:txBody>
-      </p:sp>
-    </p:spTree>
-    <p:extLst>
-      <p:ext uri="{BB962C8B-B14F-4D97-AF65-F5344CB8AC3E}">
-        <p14:creationId xmlns:p14="http://schemas.microsoft.com/office/powerpoint/2010/main" val="3323072879"/>
-      </p:ext>
-    </p:extLst>
-  </p:cSld>
-  <p:clrMapOvr>
-    <a:masterClrMapping/>
-  </p:clrMapOvr>
-</p:sld>
-</file>
-
-<file path=ppt/slides/slide15.xml><?xml version="1.0" encoding="utf-8"?>
-<p:sld xmlns:a="http://schemas.openxmlformats.org/drawingml/2006/main" xmlns:r="http://schemas.openxmlformats.org/officeDocument/2006/relationships" xmlns:p="http://schemas.openxmlformats.org/presentationml/2006/main">
-  <p:cSld>
-    <p:spTree>
-      <p:nvGrpSpPr>
-        <p:cNvPr id="1" name=""/>
-        <p:cNvGrpSpPr/>
-        <p:nvPr/>
-      </p:nvGrpSpPr>
-      <p:grpSpPr>
-        <a:xfrm>
-          <a:off x="0" y="0"/>
-          <a:ext cx="0" cy="0"/>
-          <a:chOff x="0" y="0"/>
-          <a:chExt cx="0" cy="0"/>
-        </a:xfrm>
-      </p:grpSpPr>
-      <p:sp>
-        <p:nvSpPr>
-          <p:cNvPr id="2" name="Title 1"/>
-          <p:cNvSpPr>
-            <a:spLocks noGrp="1"/>
-          </p:cNvSpPr>
-          <p:nvPr>
-            <p:ph type="title"/>
-          </p:nvPr>
-        </p:nvSpPr>
-        <p:spPr/>
-        <p:txBody>
-          <a:bodyPr/>
-          <a:lstStyle/>
-          <a:p>
-            <a:r>
-              <a:rPr lang="en-US" dirty="0"/>
-              <a:t>SQL Server Features</a:t>
-            </a:r>
-            <a:br>
-              <a:rPr lang="en-US" dirty="0"/>
-            </a:br>
-            <a:r>
-              <a:rPr lang="en-US" dirty="0"/>
-              <a:t>(Speed Dating)</a:t>
-            </a:r>
-          </a:p>
-        </p:txBody>
-      </p:sp>
-      <p:sp>
-        <p:nvSpPr>
-          <p:cNvPr id="3" name="Content Placeholder 2"/>
-          <p:cNvSpPr>
-            <a:spLocks noGrp="1"/>
-          </p:cNvSpPr>
-          <p:nvPr>
-            <p:ph idx="1"/>
-          </p:nvPr>
-        </p:nvSpPr>
-        <p:spPr/>
-        <p:txBody>
-          <a:bodyPr>
-            <a:normAutofit fontScale="92500" lnSpcReduction="10000"/>
-          </a:bodyPr>
-          <a:lstStyle/>
-          <a:p>
-            <a:r>
-              <a:rPr lang="en-US" dirty="0"/>
-              <a:t>Security</a:t>
-            </a:r>
-          </a:p>
-          <a:p>
-            <a:pPr lvl="1"/>
-            <a:r>
-              <a:rPr lang="en-US" dirty="0"/>
-              <a:t>Row-Level Security</a:t>
-            </a:r>
-          </a:p>
-          <a:p>
-            <a:pPr lvl="1"/>
-            <a:r>
-              <a:rPr lang="en-US" dirty="0"/>
-              <a:t>Always Encrypted</a:t>
-            </a:r>
-          </a:p>
-          <a:p>
-            <a:r>
-              <a:rPr lang="en-US" dirty="0"/>
-              <a:t>Utility</a:t>
-            </a:r>
-          </a:p>
-          <a:p>
-            <a:pPr lvl="1"/>
-            <a:r>
-              <a:rPr lang="en-US" dirty="0"/>
-              <a:t>Snapshots</a:t>
-            </a:r>
-          </a:p>
-          <a:p>
-            <a:pPr lvl="1"/>
-            <a:r>
-              <a:rPr lang="en-US" dirty="0" err="1"/>
-              <a:t>Filestream</a:t>
-            </a:r>
-            <a:endParaRPr lang="en-US" dirty="0"/>
-          </a:p>
-          <a:p>
-            <a:r>
-              <a:rPr lang="en-US" dirty="0"/>
-              <a:t>Performance</a:t>
-            </a:r>
-          </a:p>
-          <a:p>
-            <a:pPr lvl="1"/>
-            <a:r>
-              <a:rPr lang="en-US" dirty="0" err="1"/>
-              <a:t>Columnstore</a:t>
-            </a:r>
-            <a:r>
-              <a:rPr lang="en-US" dirty="0"/>
-              <a:t> Indexes</a:t>
-            </a:r>
-          </a:p>
-          <a:p>
-            <a:pPr lvl="1"/>
-            <a:r>
-              <a:rPr lang="en-US" dirty="0"/>
-              <a:t>Partitioning</a:t>
-            </a:r>
-          </a:p>
-          <a:p>
-            <a:pPr lvl="1"/>
-            <a:r>
-              <a:rPr lang="en-US" dirty="0"/>
-              <a:t>Compression</a:t>
             </a:r>
           </a:p>
           <a:p>
@@ -5758,7 +5563,7 @@
 </p:sld>
 </file>
 
-<file path=ppt/slides/slide16.xml><?xml version="1.0" encoding="utf-8"?>
+<file path=ppt/slides/slide15.xml><?xml version="1.0" encoding="utf-8"?>
 <p:sld xmlns:a="http://schemas.openxmlformats.org/drawingml/2006/main" xmlns:r="http://schemas.openxmlformats.org/officeDocument/2006/relationships" xmlns:p="http://schemas.openxmlformats.org/presentationml/2006/main">
   <p:cSld>
     <p:spTree>
@@ -7321,7 +7126,7 @@
           <a:p>
             <a:pPr lvl="1"/>
             <a:r>
-              <a:rPr lang="en-US" dirty="0"/>
+              <a:rPr lang="en-US" b="1" dirty="0"/>
               <a:t>Temporal tables</a:t>
             </a:r>
           </a:p>
@@ -7391,7 +7196,7 @@
           <a:p>
             <a:pPr lvl="1"/>
             <a:r>
-              <a:rPr lang="en-US" b="1" dirty="0"/>
+              <a:rPr lang="en-US" dirty="0"/>
               <a:t>Data compression</a:t>
             </a:r>
           </a:p>
@@ -7437,7 +7242,7 @@
           <a:p>
             <a:pPr lvl="1"/>
             <a:r>
-              <a:rPr lang="en-US" b="1" dirty="0"/>
+              <a:rPr lang="en-US" dirty="0"/>
               <a:t>Additional FILESTREAM support</a:t>
             </a:r>
           </a:p>
@@ -8018,7 +7823,7 @@
         <p:spPr/>
         <p:txBody>
           <a:bodyPr>
-            <a:normAutofit fontScale="92500" lnSpcReduction="10000"/>
+            <a:normAutofit lnSpcReduction="10000"/>
           </a:bodyPr>
           <a:lstStyle/>
           <a:p>
@@ -8061,10 +7866,9 @@
           <a:p>
             <a:pPr lvl="1"/>
             <a:r>
-              <a:rPr lang="en-US" dirty="0" err="1"/>
-              <a:t>Filestream</a:t>
-            </a:r>
-            <a:endParaRPr lang="en-US" dirty="0"/>
+              <a:rPr lang="en-US" dirty="0"/>
+              <a:t>Temporal Tables</a:t>
+            </a:r>
           </a:p>
           <a:p>
             <a:r>
@@ -8088,13 +7892,6 @@
             <a:r>
               <a:rPr lang="en-US" dirty="0"/>
               <a:t>Partitioning</a:t>
-            </a:r>
-          </a:p>
-          <a:p>
-            <a:pPr lvl="1"/>
-            <a:r>
-              <a:rPr lang="en-US" dirty="0"/>
-              <a:t>Compression</a:t>
             </a:r>
           </a:p>
           <a:p>
@@ -8289,7 +8086,7 @@
         <p:spPr/>
         <p:txBody>
           <a:bodyPr>
-            <a:normAutofit fontScale="92500" lnSpcReduction="10000"/>
+            <a:normAutofit lnSpcReduction="10000"/>
           </a:bodyPr>
           <a:lstStyle/>
           <a:p>
@@ -8332,10 +8129,9 @@
           <a:p>
             <a:pPr lvl="1"/>
             <a:r>
-              <a:rPr lang="en-US" dirty="0" err="1"/>
-              <a:t>Filestream</a:t>
-            </a:r>
-            <a:endParaRPr lang="en-US" dirty="0"/>
+              <a:rPr lang="en-US" dirty="0"/>
+              <a:t>Temporal Tables</a:t>
+            </a:r>
           </a:p>
           <a:p>
             <a:r>
@@ -8359,13 +8155,6 @@
             <a:r>
               <a:rPr lang="en-US" dirty="0"/>
               <a:t>Partitioning</a:t>
-            </a:r>
-          </a:p>
-          <a:p>
-            <a:pPr lvl="1"/>
-            <a:r>
-              <a:rPr lang="en-US" dirty="0"/>
-              <a:t>Compression</a:t>
             </a:r>
           </a:p>
           <a:p>
@@ -8457,7 +8246,7 @@
         <p:spPr/>
         <p:txBody>
           <a:bodyPr>
-            <a:normAutofit fontScale="92500" lnSpcReduction="10000"/>
+            <a:normAutofit lnSpcReduction="10000"/>
           </a:bodyPr>
           <a:lstStyle/>
           <a:p>
@@ -8500,10 +8289,9 @@
           <a:p>
             <a:pPr lvl="1"/>
             <a:r>
-              <a:rPr lang="en-US" dirty="0" err="1"/>
-              <a:t>Filestream</a:t>
-            </a:r>
-            <a:endParaRPr lang="en-US" dirty="0"/>
+              <a:rPr lang="en-US" dirty="0"/>
+              <a:t>Temporal Tables</a:t>
+            </a:r>
           </a:p>
           <a:p>
             <a:r>
@@ -8527,13 +8315,6 @@
             <a:r>
               <a:rPr lang="en-US" dirty="0"/>
               <a:t>Partitioning</a:t>
-            </a:r>
-          </a:p>
-          <a:p>
-            <a:pPr lvl="1"/>
-            <a:r>
-              <a:rPr lang="en-US" dirty="0"/>
-              <a:t>Compression</a:t>
             </a:r>
           </a:p>
           <a:p>

</xml_diff>

<commit_message>
Add slides for Always Encrypted.
</commit_message>
<xml_diff>
--- a/AwesomeFreeSQLServerFeatures.pptx
+++ b/AwesomeFreeSQLServerFeatures.pptx
@@ -5,7 +5,7 @@
     <p:sldMasterId id="2147483648" r:id="rId1"/>
   </p:sldMasterIdLst>
   <p:notesMasterIdLst>
-    <p:notesMasterId r:id="rId17"/>
+    <p:notesMasterId r:id="rId19"/>
   </p:notesMasterIdLst>
   <p:sldIdLst>
     <p:sldId id="256" r:id="rId2"/>
@@ -16,13 +16,15 @@
     <p:sldId id="262" r:id="rId7"/>
     <p:sldId id="263" r:id="rId8"/>
     <p:sldId id="264" r:id="rId9"/>
-    <p:sldId id="265" r:id="rId10"/>
-    <p:sldId id="266" r:id="rId11"/>
-    <p:sldId id="267" r:id="rId12"/>
-    <p:sldId id="268" r:id="rId13"/>
-    <p:sldId id="271" r:id="rId14"/>
-    <p:sldId id="270" r:id="rId15"/>
-    <p:sldId id="258" r:id="rId16"/>
+    <p:sldId id="273" r:id="rId10"/>
+    <p:sldId id="274" r:id="rId11"/>
+    <p:sldId id="265" r:id="rId12"/>
+    <p:sldId id="266" r:id="rId13"/>
+    <p:sldId id="267" r:id="rId14"/>
+    <p:sldId id="268" r:id="rId15"/>
+    <p:sldId id="271" r:id="rId16"/>
+    <p:sldId id="270" r:id="rId17"/>
+    <p:sldId id="258" r:id="rId18"/>
   </p:sldIdLst>
   <p:sldSz cx="12192000" cy="6858000"/>
   <p:notesSz cx="6858000" cy="9144000"/>
@@ -211,7 +213,7 @@
           <a:p>
             <a:fld id="{64F240C7-B8B6-4D73-9667-9F7409B58D21}" type="datetimeFigureOut">
               <a:rPr lang="en-US" smtClean="0"/>
-              <a:t>4/10/2017</a:t>
+              <a:t>4/19/2017</a:t>
             </a:fld>
             <a:endParaRPr lang="en-US"/>
           </a:p>
@@ -780,6 +782,281 @@
 </p:notes>
 </file>
 
+<file path=ppt/notesSlides/notesSlide3.xml><?xml version="1.0" encoding="utf-8"?>
+<p:notes xmlns:a="http://schemas.openxmlformats.org/drawingml/2006/main" xmlns:r="http://schemas.openxmlformats.org/officeDocument/2006/relationships" xmlns:p="http://schemas.openxmlformats.org/presentationml/2006/main">
+  <p:cSld>
+    <p:spTree>
+      <p:nvGrpSpPr>
+        <p:cNvPr id="1" name=""/>
+        <p:cNvGrpSpPr/>
+        <p:nvPr/>
+      </p:nvGrpSpPr>
+      <p:grpSpPr>
+        <a:xfrm>
+          <a:off x="0" y="0"/>
+          <a:ext cx="0" cy="0"/>
+          <a:chOff x="0" y="0"/>
+          <a:chExt cx="0" cy="0"/>
+        </a:xfrm>
+      </p:grpSpPr>
+      <p:sp>
+        <p:nvSpPr>
+          <p:cNvPr id="2" name="Slide Image Placeholder 1"/>
+          <p:cNvSpPr>
+            <a:spLocks noGrp="1" noRot="1" noChangeAspect="1"/>
+          </p:cNvSpPr>
+          <p:nvPr>
+            <p:ph type="sldImg"/>
+          </p:nvPr>
+        </p:nvSpPr>
+        <p:spPr/>
+      </p:sp>
+      <p:sp>
+        <p:nvSpPr>
+          <p:cNvPr id="3" name="Notes Placeholder 2"/>
+          <p:cNvSpPr>
+            <a:spLocks noGrp="1"/>
+          </p:cNvSpPr>
+          <p:nvPr>
+            <p:ph type="body" idx="1"/>
+          </p:nvPr>
+        </p:nvSpPr>
+        <p:spPr/>
+        <p:txBody>
+          <a:bodyPr/>
+          <a:lstStyle/>
+          <a:p>
+            <a:endParaRPr lang="en-US" dirty="0"/>
+          </a:p>
+        </p:txBody>
+      </p:sp>
+      <p:sp>
+        <p:nvSpPr>
+          <p:cNvPr id="4" name="Slide Number Placeholder 3"/>
+          <p:cNvSpPr>
+            <a:spLocks noGrp="1"/>
+          </p:cNvSpPr>
+          <p:nvPr>
+            <p:ph type="sldNum" sz="quarter" idx="10"/>
+          </p:nvPr>
+        </p:nvSpPr>
+        <p:spPr/>
+        <p:txBody>
+          <a:bodyPr/>
+          <a:lstStyle/>
+          <a:p>
+            <a:fld id="{8B5705F6-219D-4122-80FA-D82FBBCA0869}" type="slidenum">
+              <a:rPr lang="en-US" smtClean="0"/>
+              <a:t>7</a:t>
+            </a:fld>
+            <a:endParaRPr lang="en-US"/>
+          </a:p>
+        </p:txBody>
+      </p:sp>
+    </p:spTree>
+    <p:extLst>
+      <p:ext uri="{BB962C8B-B14F-4D97-AF65-F5344CB8AC3E}">
+        <p14:creationId xmlns:p14="http://schemas.microsoft.com/office/powerpoint/2010/main" val="2657200256"/>
+      </p:ext>
+    </p:extLst>
+  </p:cSld>
+  <p:clrMapOvr>
+    <a:masterClrMapping/>
+  </p:clrMapOvr>
+</p:notes>
+</file>
+
+<file path=ppt/notesSlides/notesSlide4.xml><?xml version="1.0" encoding="utf-8"?>
+<p:notes xmlns:a="http://schemas.openxmlformats.org/drawingml/2006/main" xmlns:r="http://schemas.openxmlformats.org/officeDocument/2006/relationships" xmlns:p="http://schemas.openxmlformats.org/presentationml/2006/main">
+  <p:cSld>
+    <p:spTree>
+      <p:nvGrpSpPr>
+        <p:cNvPr id="1" name=""/>
+        <p:cNvGrpSpPr/>
+        <p:nvPr/>
+      </p:nvGrpSpPr>
+      <p:grpSpPr>
+        <a:xfrm>
+          <a:off x="0" y="0"/>
+          <a:ext cx="0" cy="0"/>
+          <a:chOff x="0" y="0"/>
+          <a:chExt cx="0" cy="0"/>
+        </a:xfrm>
+      </p:grpSpPr>
+      <p:sp>
+        <p:nvSpPr>
+          <p:cNvPr id="2" name="Slide Image Placeholder 1"/>
+          <p:cNvSpPr>
+            <a:spLocks noGrp="1" noRot="1" noChangeAspect="1"/>
+          </p:cNvSpPr>
+          <p:nvPr>
+            <p:ph type="sldImg"/>
+          </p:nvPr>
+        </p:nvSpPr>
+        <p:spPr/>
+      </p:sp>
+      <p:sp>
+        <p:nvSpPr>
+          <p:cNvPr id="3" name="Notes Placeholder 2"/>
+          <p:cNvSpPr>
+            <a:spLocks noGrp="1"/>
+          </p:cNvSpPr>
+          <p:nvPr>
+            <p:ph type="body" idx="1"/>
+          </p:nvPr>
+        </p:nvSpPr>
+        <p:spPr/>
+        <p:txBody>
+          <a:bodyPr/>
+          <a:lstStyle/>
+          <a:p>
+            <a:r>
+              <a:rPr lang="en-US" dirty="0" smtClean="0"/>
+              <a:t>Most DBAs</a:t>
+            </a:r>
+            <a:r>
+              <a:rPr lang="en-US" baseline="0" dirty="0" smtClean="0"/>
+              <a:t> – myself included – don’t seem to like this feature.  It appears to be designed for hosted SQL environments where the people managing the databases aren’t fully trusted.</a:t>
+            </a:r>
+            <a:endParaRPr lang="en-US" dirty="0"/>
+          </a:p>
+        </p:txBody>
+      </p:sp>
+      <p:sp>
+        <p:nvSpPr>
+          <p:cNvPr id="4" name="Slide Number Placeholder 3"/>
+          <p:cNvSpPr>
+            <a:spLocks noGrp="1"/>
+          </p:cNvSpPr>
+          <p:nvPr>
+            <p:ph type="sldNum" sz="quarter" idx="10"/>
+          </p:nvPr>
+        </p:nvSpPr>
+        <p:spPr/>
+        <p:txBody>
+          <a:bodyPr/>
+          <a:lstStyle/>
+          <a:p>
+            <a:fld id="{8B5705F6-219D-4122-80FA-D82FBBCA0869}" type="slidenum">
+              <a:rPr lang="en-US" smtClean="0"/>
+              <a:t>9</a:t>
+            </a:fld>
+            <a:endParaRPr lang="en-US"/>
+          </a:p>
+        </p:txBody>
+      </p:sp>
+    </p:spTree>
+    <p:extLst>
+      <p:ext uri="{BB962C8B-B14F-4D97-AF65-F5344CB8AC3E}">
+        <p14:creationId xmlns:p14="http://schemas.microsoft.com/office/powerpoint/2010/main" val="1468421285"/>
+      </p:ext>
+    </p:extLst>
+  </p:cSld>
+  <p:clrMapOvr>
+    <a:masterClrMapping/>
+  </p:clrMapOvr>
+</p:notes>
+</file>
+
+<file path=ppt/notesSlides/notesSlide5.xml><?xml version="1.0" encoding="utf-8"?>
+<p:notes xmlns:a="http://schemas.openxmlformats.org/drawingml/2006/main" xmlns:r="http://schemas.openxmlformats.org/officeDocument/2006/relationships" xmlns:p="http://schemas.openxmlformats.org/presentationml/2006/main">
+  <p:cSld>
+    <p:spTree>
+      <p:nvGrpSpPr>
+        <p:cNvPr id="1" name=""/>
+        <p:cNvGrpSpPr/>
+        <p:nvPr/>
+      </p:nvGrpSpPr>
+      <p:grpSpPr>
+        <a:xfrm>
+          <a:off x="0" y="0"/>
+          <a:ext cx="0" cy="0"/>
+          <a:chOff x="0" y="0"/>
+          <a:chExt cx="0" cy="0"/>
+        </a:xfrm>
+      </p:grpSpPr>
+      <p:sp>
+        <p:nvSpPr>
+          <p:cNvPr id="2" name="Slide Image Placeholder 1"/>
+          <p:cNvSpPr>
+            <a:spLocks noGrp="1" noRot="1" noChangeAspect="1"/>
+          </p:cNvSpPr>
+          <p:nvPr>
+            <p:ph type="sldImg"/>
+          </p:nvPr>
+        </p:nvSpPr>
+        <p:spPr/>
+      </p:sp>
+      <p:sp>
+        <p:nvSpPr>
+          <p:cNvPr id="3" name="Notes Placeholder 2"/>
+          <p:cNvSpPr>
+            <a:spLocks noGrp="1"/>
+          </p:cNvSpPr>
+          <p:nvPr>
+            <p:ph type="body" idx="1"/>
+          </p:nvPr>
+        </p:nvSpPr>
+        <p:spPr/>
+        <p:txBody>
+          <a:bodyPr/>
+          <a:lstStyle/>
+          <a:p>
+            <a:r>
+              <a:rPr lang="en-US" dirty="0" smtClean="0"/>
+              <a:t>Storage</a:t>
+            </a:r>
+            <a:r>
+              <a:rPr lang="en-US" baseline="0" dirty="0" smtClean="0"/>
+              <a:t> bloat: </a:t>
+            </a:r>
+            <a:r>
+              <a:rPr lang="en-US" dirty="0" smtClean="0"/>
+              <a:t>Any input data type that is less than 16 bytes get stored as 65 bytes, so (for instance) an</a:t>
+            </a:r>
+            <a:r>
+              <a:rPr lang="en-US" baseline="0" dirty="0" smtClean="0"/>
+              <a:t> integer value (4 bytes) is stored as 65 bytes, an overhead of 16+ fold!</a:t>
+            </a:r>
+          </a:p>
+        </p:txBody>
+      </p:sp>
+      <p:sp>
+        <p:nvSpPr>
+          <p:cNvPr id="4" name="Slide Number Placeholder 3"/>
+          <p:cNvSpPr>
+            <a:spLocks noGrp="1"/>
+          </p:cNvSpPr>
+          <p:nvPr>
+            <p:ph type="sldNum" sz="quarter" idx="10"/>
+          </p:nvPr>
+        </p:nvSpPr>
+        <p:spPr/>
+        <p:txBody>
+          <a:bodyPr/>
+          <a:lstStyle/>
+          <a:p>
+            <a:fld id="{8B5705F6-219D-4122-80FA-D82FBBCA0869}" type="slidenum">
+              <a:rPr lang="en-US" smtClean="0"/>
+              <a:t>10</a:t>
+            </a:fld>
+            <a:endParaRPr lang="en-US"/>
+          </a:p>
+        </p:txBody>
+      </p:sp>
+    </p:spTree>
+    <p:extLst>
+      <p:ext uri="{BB962C8B-B14F-4D97-AF65-F5344CB8AC3E}">
+        <p14:creationId xmlns:p14="http://schemas.microsoft.com/office/powerpoint/2010/main" val="2302691919"/>
+      </p:ext>
+    </p:extLst>
+  </p:cSld>
+  <p:clrMapOvr>
+    <a:masterClrMapping/>
+  </p:clrMapOvr>
+</p:notes>
+</file>
+
 <file path=ppt/slideLayouts/slideLayout1.xml><?xml version="1.0" encoding="utf-8"?>
 <p:sldLayout xmlns:a="http://schemas.openxmlformats.org/drawingml/2006/main" xmlns:r="http://schemas.openxmlformats.org/officeDocument/2006/relationships" xmlns:p="http://schemas.openxmlformats.org/presentationml/2006/main" type="title" preserve="1">
   <p:cSld name="Title Slide">
@@ -1026,7 +1303,7 @@
             <a:fld id="{B61BEF0D-F0BB-DE4B-95CE-6DB70DBA9567}" type="datetimeFigureOut">
               <a:rPr lang="en-US" dirty="0"/>
               <a:pPr/>
-              <a:t>4/10/2017</a:t>
+              <a:t>4/19/2017</a:t>
             </a:fld>
             <a:endParaRPr lang="en-US" dirty="0"/>
           </a:p>
@@ -1285,7 +1562,7 @@
             <a:fld id="{B61BEF0D-F0BB-DE4B-95CE-6DB70DBA9567}" type="datetimeFigureOut">
               <a:rPr lang="en-US" dirty="0"/>
               <a:pPr/>
-              <a:t>4/10/2017</a:t>
+              <a:t>4/19/2017</a:t>
             </a:fld>
             <a:endParaRPr lang="en-US" dirty="0"/>
           </a:p>
@@ -1517,7 +1794,7 @@
             <a:fld id="{B61BEF0D-F0BB-DE4B-95CE-6DB70DBA9567}" type="datetimeFigureOut">
               <a:rPr lang="en-US" dirty="0"/>
               <a:pPr/>
-              <a:t>4/10/2017</a:t>
+              <a:t>4/19/2017</a:t>
             </a:fld>
             <a:endParaRPr lang="en-US" dirty="0"/>
           </a:p>
@@ -1754,7 +2031,7 @@
             <a:fld id="{B61BEF0D-F0BB-DE4B-95CE-6DB70DBA9567}" type="datetimeFigureOut">
               <a:rPr lang="en-US" dirty="0"/>
               <a:pPr/>
-              <a:t>4/10/2017</a:t>
+              <a:t>4/19/2017</a:t>
             </a:fld>
             <a:endParaRPr lang="en-US" dirty="0"/>
           </a:p>
@@ -2058,7 +2335,7 @@
             <a:fld id="{B61BEF0D-F0BB-DE4B-95CE-6DB70DBA9567}" type="datetimeFigureOut">
               <a:rPr lang="en-US" dirty="0"/>
               <a:pPr/>
-              <a:t>4/10/2017</a:t>
+              <a:t>4/19/2017</a:t>
             </a:fld>
             <a:endParaRPr lang="en-US" dirty="0"/>
           </a:p>
@@ -2357,7 +2634,7 @@
             <a:fld id="{B61BEF0D-F0BB-DE4B-95CE-6DB70DBA9567}" type="datetimeFigureOut">
               <a:rPr lang="en-US" dirty="0"/>
               <a:pPr/>
-              <a:t>4/10/2017</a:t>
+              <a:t>4/19/2017</a:t>
             </a:fld>
             <a:endParaRPr lang="en-US" dirty="0"/>
           </a:p>
@@ -2776,7 +3053,7 @@
             <a:fld id="{B61BEF0D-F0BB-DE4B-95CE-6DB70DBA9567}" type="datetimeFigureOut">
               <a:rPr lang="en-US" dirty="0"/>
               <a:pPr/>
-              <a:t>4/10/2017</a:t>
+              <a:t>4/19/2017</a:t>
             </a:fld>
             <a:endParaRPr lang="en-US" dirty="0"/>
           </a:p>
@@ -2935,7 +3212,7 @@
             <a:fld id="{B61BEF0D-F0BB-DE4B-95CE-6DB70DBA9567}" type="datetimeFigureOut">
               <a:rPr lang="en-US" dirty="0"/>
               <a:pPr/>
-              <a:t>4/10/2017</a:t>
+              <a:t>4/19/2017</a:t>
             </a:fld>
             <a:endParaRPr lang="en-US" dirty="0"/>
           </a:p>
@@ -3027,7 +3304,7 @@
             <a:fld id="{B61BEF0D-F0BB-DE4B-95CE-6DB70DBA9567}" type="datetimeFigureOut">
               <a:rPr lang="en-US" dirty="0"/>
               <a:pPr/>
-              <a:t>4/10/2017</a:t>
+              <a:t>4/19/2017</a:t>
             </a:fld>
             <a:endParaRPr lang="en-US" dirty="0"/>
           </a:p>
@@ -3402,7 +3679,7 @@
             <a:fld id="{B61BEF0D-F0BB-DE4B-95CE-6DB70DBA9567}" type="datetimeFigureOut">
               <a:rPr lang="en-US" dirty="0"/>
               <a:pPr/>
-              <a:t>4/10/2017</a:t>
+              <a:t>4/19/2017</a:t>
             </a:fld>
             <a:endParaRPr lang="en-US" dirty="0"/>
           </a:p>
@@ -3688,7 +3965,7 @@
             <a:fld id="{B61BEF0D-F0BB-DE4B-95CE-6DB70DBA9567}" type="datetimeFigureOut">
               <a:rPr lang="en-US" dirty="0"/>
               <a:pPr/>
-              <a:t>4/10/2017</a:t>
+              <a:t>4/19/2017</a:t>
             </a:fld>
             <a:endParaRPr lang="en-US" dirty="0"/>
           </a:p>
@@ -3896,7 +4173,7 @@
             <a:fld id="{B61BEF0D-F0BB-DE4B-95CE-6DB70DBA9567}" type="datetimeFigureOut">
               <a:rPr lang="en-US" dirty="0"/>
               <a:pPr/>
-              <a:t>4/10/2017</a:t>
+              <a:t>4/19/2017</a:t>
             </a:fld>
             <a:endParaRPr lang="en-US" dirty="0"/>
           </a:p>
@@ -4870,16 +5147,10 @@
           <a:lstStyle/>
           <a:p>
             <a:r>
-              <a:rPr lang="en-US" dirty="0"/>
-              <a:t>SQL Server Features</a:t>
-            </a:r>
-            <a:br>
-              <a:rPr lang="en-US" dirty="0"/>
-            </a:br>
-            <a:r>
-              <a:rPr lang="en-US" dirty="0"/>
-              <a:t>(Speed Dating)</a:t>
-            </a:r>
+              <a:rPr lang="en-US" dirty="0" smtClean="0"/>
+              <a:t>Always Encrypted - Cons</a:t>
+            </a:r>
+            <a:endParaRPr lang="en-US" dirty="0"/>
           </a:p>
         </p:txBody>
       </p:sp>
@@ -4895,99 +5166,33 @@
         </p:nvSpPr>
         <p:spPr/>
         <p:txBody>
-          <a:bodyPr>
-            <a:normAutofit lnSpcReduction="10000"/>
-          </a:bodyPr>
+          <a:bodyPr/>
           <a:lstStyle/>
           <a:p>
             <a:r>
-              <a:rPr lang="en-US" dirty="0"/>
-              <a:t>Security</a:t>
-            </a:r>
-          </a:p>
-          <a:p>
-            <a:pPr lvl="1"/>
-            <a:r>
-              <a:rPr lang="en-US" dirty="0"/>
-              <a:t>Row-Level Security</a:t>
-            </a:r>
-          </a:p>
-          <a:p>
-            <a:pPr lvl="1"/>
-            <a:r>
-              <a:rPr lang="en-US" dirty="0"/>
-              <a:t>Always Encrypted</a:t>
-            </a:r>
-          </a:p>
-          <a:p>
-            <a:r>
-              <a:rPr lang="en-US" dirty="0"/>
-              <a:t>Utility</a:t>
-            </a:r>
-          </a:p>
-          <a:p>
-            <a:pPr lvl="1"/>
-            <a:r>
-              <a:rPr lang="en-US" dirty="0"/>
-              <a:t>Snapshots</a:t>
-            </a:r>
-          </a:p>
-          <a:p>
-            <a:pPr lvl="1"/>
-            <a:r>
-              <a:rPr lang="en-US" dirty="0">
-                <a:solidFill>
-                  <a:srgbClr val="FF0000"/>
-                </a:solidFill>
-              </a:rPr>
-              <a:t>Temporal Tables</a:t>
-            </a:r>
-          </a:p>
-          <a:p>
-            <a:r>
-              <a:rPr lang="en-US" dirty="0"/>
-              <a:t>Performance</a:t>
-            </a:r>
-          </a:p>
-          <a:p>
-            <a:pPr lvl="1"/>
-            <a:r>
-              <a:rPr lang="en-US" dirty="0" err="1"/>
-              <a:t>Columnstore</a:t>
-            </a:r>
-            <a:r>
-              <a:rPr lang="en-US" dirty="0"/>
-              <a:t> Indexes</a:t>
-            </a:r>
-          </a:p>
-          <a:p>
-            <a:pPr lvl="1"/>
-            <a:r>
-              <a:rPr lang="en-US" dirty="0"/>
-              <a:t>Partitioning</a:t>
-            </a:r>
-          </a:p>
-          <a:p>
-            <a:pPr lvl="1"/>
-            <a:r>
-              <a:rPr lang="en-US" dirty="0"/>
-              <a:t>In-Memory OLTP (</a:t>
-            </a:r>
-            <a:r>
-              <a:rPr lang="en-US" dirty="0" err="1"/>
-              <a:t>Hekaton</a:t>
-            </a:r>
-            <a:r>
-              <a:rPr lang="en-US" dirty="0"/>
-              <a:t>)</a:t>
-            </a:r>
+              <a:rPr lang="en-US" dirty="0" smtClean="0"/>
+              <a:t>Data size bloat, especially for smaller data types</a:t>
+            </a:r>
+          </a:p>
+          <a:p>
+            <a:r>
+              <a:rPr lang="en-US" dirty="0" smtClean="0"/>
+              <a:t>Adds considerable difficulty troubleshooting in tools like SSMS</a:t>
+            </a:r>
+          </a:p>
+          <a:p>
+            <a:r>
+              <a:rPr lang="en-US" dirty="0" smtClean="0"/>
+              <a:t>String columns must have a BIN collation – they won’t sort by traditional SQL rules</a:t>
+            </a:r>
+            <a:endParaRPr lang="en-US" dirty="0"/>
           </a:p>
         </p:txBody>
       </p:sp>
     </p:spTree>
     <p:extLst>
       <p:ext uri="{BB962C8B-B14F-4D97-AF65-F5344CB8AC3E}">
-        <p14:creationId xmlns:p14="http://schemas.microsoft.com/office/powerpoint/2010/main" val="85911061"/>
+        <p14:creationId xmlns:p14="http://schemas.microsoft.com/office/powerpoint/2010/main" val="3969599080"/>
       </p:ext>
     </p:extLst>
   </p:cSld>
@@ -5088,39 +5293,35 @@
           <a:p>
             <a:pPr lvl="1"/>
             <a:r>
-              <a:rPr lang="en-US" dirty="0"/>
-              <a:t>Snapshots</a:t>
-            </a:r>
-          </a:p>
-          <a:p>
-            <a:pPr lvl="1"/>
-            <a:r>
-              <a:rPr lang="en-US" dirty="0"/>
-              <a:t>Temporal Tables</a:t>
-            </a:r>
-          </a:p>
-          <a:p>
-            <a:r>
-              <a:rPr lang="en-US" dirty="0"/>
-              <a:t>Performance</a:t>
-            </a:r>
-          </a:p>
-          <a:p>
-            <a:pPr lvl="1"/>
-            <a:r>
-              <a:rPr lang="en-US" dirty="0" err="1">
-                <a:solidFill>
-                  <a:srgbClr val="FF0000"/>
-                </a:solidFill>
-              </a:rPr>
-              <a:t>Columnstore</a:t>
-            </a:r>
-            <a:r>
               <a:rPr lang="en-US" dirty="0">
                 <a:solidFill>
                   <a:srgbClr val="FF0000"/>
                 </a:solidFill>
               </a:rPr>
+              <a:t>Snapshots</a:t>
+            </a:r>
+          </a:p>
+          <a:p>
+            <a:pPr lvl="1"/>
+            <a:r>
+              <a:rPr lang="en-US" dirty="0"/>
+              <a:t>Temporal Tables</a:t>
+            </a:r>
+          </a:p>
+          <a:p>
+            <a:r>
+              <a:rPr lang="en-US" dirty="0"/>
+              <a:t>Performance</a:t>
+            </a:r>
+          </a:p>
+          <a:p>
+            <a:pPr lvl="1"/>
+            <a:r>
+              <a:rPr lang="en-US" dirty="0" err="1"/>
+              <a:t>Columnstore</a:t>
+            </a:r>
+            <a:r>
+              <a:rPr lang="en-US" dirty="0"/>
               <a:t> Indexes</a:t>
             </a:r>
           </a:p>
@@ -5151,7 +5352,7 @@
     </p:spTree>
     <p:extLst>
       <p:ext uri="{BB962C8B-B14F-4D97-AF65-F5344CB8AC3E}">
-        <p14:creationId xmlns:p14="http://schemas.microsoft.com/office/powerpoint/2010/main" val="2331663206"/>
+        <p14:creationId xmlns:p14="http://schemas.microsoft.com/office/powerpoint/2010/main" val="329879923"/>
       </p:ext>
     </p:extLst>
   </p:cSld>
@@ -5259,35 +5460,35 @@
           <a:p>
             <a:pPr lvl="1"/>
             <a:r>
-              <a:rPr lang="en-US" dirty="0"/>
-              <a:t>Temporal Tables</a:t>
-            </a:r>
-          </a:p>
-          <a:p>
-            <a:r>
-              <a:rPr lang="en-US" dirty="0"/>
-              <a:t>Performance</a:t>
-            </a:r>
-          </a:p>
-          <a:p>
-            <a:pPr lvl="1"/>
-            <a:r>
-              <a:rPr lang="en-US" dirty="0" err="1"/>
-              <a:t>Columnstore</a:t>
-            </a:r>
-            <a:r>
-              <a:rPr lang="en-US" dirty="0"/>
-              <a:t> Indexes</a:t>
-            </a:r>
-          </a:p>
-          <a:p>
-            <a:pPr lvl="1"/>
-            <a:r>
               <a:rPr lang="en-US" dirty="0">
                 <a:solidFill>
                   <a:srgbClr val="FF0000"/>
                 </a:solidFill>
               </a:rPr>
+              <a:t>Temporal Tables</a:t>
+            </a:r>
+          </a:p>
+          <a:p>
+            <a:r>
+              <a:rPr lang="en-US" dirty="0"/>
+              <a:t>Performance</a:t>
+            </a:r>
+          </a:p>
+          <a:p>
+            <a:pPr lvl="1"/>
+            <a:r>
+              <a:rPr lang="en-US" dirty="0" err="1"/>
+              <a:t>Columnstore</a:t>
+            </a:r>
+            <a:r>
+              <a:rPr lang="en-US" dirty="0"/>
+              <a:t> Indexes</a:t>
+            </a:r>
+          </a:p>
+          <a:p>
+            <a:pPr lvl="1"/>
+            <a:r>
+              <a:rPr lang="en-US" dirty="0"/>
               <a:t>Partitioning</a:t>
             </a:r>
           </a:p>
@@ -5311,7 +5512,7 @@
     </p:spTree>
     <p:extLst>
       <p:ext uri="{BB962C8B-B14F-4D97-AF65-F5344CB8AC3E}">
-        <p14:creationId xmlns:p14="http://schemas.microsoft.com/office/powerpoint/2010/main" val="3961792109"/>
+        <p14:creationId xmlns:p14="http://schemas.microsoft.com/office/powerpoint/2010/main" val="85911061"/>
       </p:ext>
     </p:extLst>
   </p:cSld>
@@ -5355,29 +5556,119 @@
           <a:p>
             <a:r>
               <a:rPr lang="en-US" dirty="0"/>
+              <a:t>SQL Server Features</a:t>
+            </a:r>
+            <a:br>
+              <a:rPr lang="en-US" dirty="0"/>
+            </a:br>
+            <a:r>
+              <a:rPr lang="en-US" dirty="0"/>
+              <a:t>(Speed Dating)</a:t>
+            </a:r>
+          </a:p>
+        </p:txBody>
+      </p:sp>
+      <p:sp>
+        <p:nvSpPr>
+          <p:cNvPr id="3" name="Content Placeholder 2"/>
+          <p:cNvSpPr>
+            <a:spLocks noGrp="1"/>
+          </p:cNvSpPr>
+          <p:nvPr>
+            <p:ph idx="1"/>
+          </p:nvPr>
+        </p:nvSpPr>
+        <p:spPr/>
+        <p:txBody>
+          <a:bodyPr>
+            <a:normAutofit lnSpcReduction="10000"/>
+          </a:bodyPr>
+          <a:lstStyle/>
+          <a:p>
+            <a:r>
+              <a:rPr lang="en-US" dirty="0"/>
+              <a:t>Security</a:t>
+            </a:r>
+          </a:p>
+          <a:p>
+            <a:pPr lvl="1"/>
+            <a:r>
+              <a:rPr lang="en-US" dirty="0"/>
+              <a:t>Row-Level Security</a:t>
+            </a:r>
+          </a:p>
+          <a:p>
+            <a:pPr lvl="1"/>
+            <a:r>
+              <a:rPr lang="en-US" dirty="0"/>
+              <a:t>Always Encrypted</a:t>
+            </a:r>
+          </a:p>
+          <a:p>
+            <a:r>
+              <a:rPr lang="en-US" dirty="0"/>
+              <a:t>Utility</a:t>
+            </a:r>
+          </a:p>
+          <a:p>
+            <a:pPr lvl="1"/>
+            <a:r>
+              <a:rPr lang="en-US" dirty="0"/>
+              <a:t>Snapshots</a:t>
+            </a:r>
+          </a:p>
+          <a:p>
+            <a:pPr lvl="1"/>
+            <a:r>
+              <a:rPr lang="en-US" dirty="0"/>
+              <a:t>Temporal Tables</a:t>
+            </a:r>
+          </a:p>
+          <a:p>
+            <a:r>
+              <a:rPr lang="en-US" dirty="0"/>
+              <a:t>Performance</a:t>
+            </a:r>
+          </a:p>
+          <a:p>
+            <a:pPr lvl="1"/>
+            <a:r>
+              <a:rPr lang="en-US" dirty="0" err="1">
+                <a:solidFill>
+                  <a:srgbClr val="FF0000"/>
+                </a:solidFill>
+              </a:rPr>
+              <a:t>Columnstore</a:t>
+            </a:r>
+            <a:r>
+              <a:rPr lang="en-US" dirty="0">
+                <a:solidFill>
+                  <a:srgbClr val="FF0000"/>
+                </a:solidFill>
+              </a:rPr>
+              <a:t> Indexes</a:t>
+            </a:r>
+          </a:p>
+          <a:p>
+            <a:pPr lvl="1"/>
+            <a:r>
+              <a:rPr lang="en-US" dirty="0"/>
               <a:t>Partitioning</a:t>
             </a:r>
           </a:p>
-        </p:txBody>
-      </p:sp>
-      <p:sp>
-        <p:nvSpPr>
-          <p:cNvPr id="3" name="Content Placeholder 2"/>
-          <p:cNvSpPr>
-            <a:spLocks noGrp="1"/>
-          </p:cNvSpPr>
-          <p:nvPr>
-            <p:ph idx="1"/>
-          </p:nvPr>
-        </p:nvSpPr>
-        <p:spPr/>
-        <p:txBody>
-          <a:bodyPr/>
-          <a:lstStyle/>
-          <a:p>
-            <a:r>
-              <a:rPr lang="en-US" dirty="0"/>
-              <a:t>Combine with temporal tables to enable quick archival capability</a:t>
+          <a:p>
+            <a:pPr lvl="1"/>
+            <a:r>
+              <a:rPr lang="en-US" dirty="0"/>
+              <a:t>In-Memory OLTP (</a:t>
+            </a:r>
+            <a:r>
+              <a:rPr lang="en-US" dirty="0" err="1"/>
+              <a:t>Hekaton</a:t>
+            </a:r>
+            <a:r>
+              <a:rPr lang="en-US" dirty="0"/>
+              <a:t>)</a:t>
             </a:r>
           </a:p>
         </p:txBody>
@@ -5385,7 +5676,7 @@
     </p:spTree>
     <p:extLst>
       <p:ext uri="{BB962C8B-B14F-4D97-AF65-F5344CB8AC3E}">
-        <p14:creationId xmlns:p14="http://schemas.microsoft.com/office/powerpoint/2010/main" val="1885707255"/>
+        <p14:creationId xmlns:p14="http://schemas.microsoft.com/office/powerpoint/2010/main" val="2331663206"/>
       </p:ext>
     </p:extLst>
   </p:cSld>
@@ -5517,6 +5808,240 @@
           <a:p>
             <a:pPr lvl="1"/>
             <a:r>
+              <a:rPr lang="en-US" dirty="0">
+                <a:solidFill>
+                  <a:srgbClr val="FF0000"/>
+                </a:solidFill>
+              </a:rPr>
+              <a:t>Partitioning</a:t>
+            </a:r>
+          </a:p>
+          <a:p>
+            <a:pPr lvl="1"/>
+            <a:r>
+              <a:rPr lang="en-US" dirty="0"/>
+              <a:t>In-Memory OLTP (</a:t>
+            </a:r>
+            <a:r>
+              <a:rPr lang="en-US" dirty="0" err="1"/>
+              <a:t>Hekaton</a:t>
+            </a:r>
+            <a:r>
+              <a:rPr lang="en-US" dirty="0"/>
+              <a:t>)</a:t>
+            </a:r>
+          </a:p>
+        </p:txBody>
+      </p:sp>
+    </p:spTree>
+    <p:extLst>
+      <p:ext uri="{BB962C8B-B14F-4D97-AF65-F5344CB8AC3E}">
+        <p14:creationId xmlns:p14="http://schemas.microsoft.com/office/powerpoint/2010/main" val="3961792109"/>
+      </p:ext>
+    </p:extLst>
+  </p:cSld>
+  <p:clrMapOvr>
+    <a:masterClrMapping/>
+  </p:clrMapOvr>
+</p:sld>
+</file>
+
+<file path=ppt/slides/slide15.xml><?xml version="1.0" encoding="utf-8"?>
+<p:sld xmlns:a="http://schemas.openxmlformats.org/drawingml/2006/main" xmlns:r="http://schemas.openxmlformats.org/officeDocument/2006/relationships" xmlns:p="http://schemas.openxmlformats.org/presentationml/2006/main">
+  <p:cSld>
+    <p:spTree>
+      <p:nvGrpSpPr>
+        <p:cNvPr id="1" name=""/>
+        <p:cNvGrpSpPr/>
+        <p:nvPr/>
+      </p:nvGrpSpPr>
+      <p:grpSpPr>
+        <a:xfrm>
+          <a:off x="0" y="0"/>
+          <a:ext cx="0" cy="0"/>
+          <a:chOff x="0" y="0"/>
+          <a:chExt cx="0" cy="0"/>
+        </a:xfrm>
+      </p:grpSpPr>
+      <p:sp>
+        <p:nvSpPr>
+          <p:cNvPr id="2" name="Title 1"/>
+          <p:cNvSpPr>
+            <a:spLocks noGrp="1"/>
+          </p:cNvSpPr>
+          <p:nvPr>
+            <p:ph type="title"/>
+          </p:nvPr>
+        </p:nvSpPr>
+        <p:spPr/>
+        <p:txBody>
+          <a:bodyPr/>
+          <a:lstStyle/>
+          <a:p>
+            <a:r>
+              <a:rPr lang="en-US" dirty="0"/>
+              <a:t>Partitioning</a:t>
+            </a:r>
+          </a:p>
+        </p:txBody>
+      </p:sp>
+      <p:sp>
+        <p:nvSpPr>
+          <p:cNvPr id="3" name="Content Placeholder 2"/>
+          <p:cNvSpPr>
+            <a:spLocks noGrp="1"/>
+          </p:cNvSpPr>
+          <p:nvPr>
+            <p:ph idx="1"/>
+          </p:nvPr>
+        </p:nvSpPr>
+        <p:spPr/>
+        <p:txBody>
+          <a:bodyPr/>
+          <a:lstStyle/>
+          <a:p>
+            <a:r>
+              <a:rPr lang="en-US" dirty="0"/>
+              <a:t>Combine with temporal tables to enable quick archival capability</a:t>
+            </a:r>
+          </a:p>
+        </p:txBody>
+      </p:sp>
+    </p:spTree>
+    <p:extLst>
+      <p:ext uri="{BB962C8B-B14F-4D97-AF65-F5344CB8AC3E}">
+        <p14:creationId xmlns:p14="http://schemas.microsoft.com/office/powerpoint/2010/main" val="1885707255"/>
+      </p:ext>
+    </p:extLst>
+  </p:cSld>
+  <p:clrMapOvr>
+    <a:masterClrMapping/>
+  </p:clrMapOvr>
+</p:sld>
+</file>
+
+<file path=ppt/slides/slide16.xml><?xml version="1.0" encoding="utf-8"?>
+<p:sld xmlns:a="http://schemas.openxmlformats.org/drawingml/2006/main" xmlns:r="http://schemas.openxmlformats.org/officeDocument/2006/relationships" xmlns:p="http://schemas.openxmlformats.org/presentationml/2006/main">
+  <p:cSld>
+    <p:spTree>
+      <p:nvGrpSpPr>
+        <p:cNvPr id="1" name=""/>
+        <p:cNvGrpSpPr/>
+        <p:nvPr/>
+      </p:nvGrpSpPr>
+      <p:grpSpPr>
+        <a:xfrm>
+          <a:off x="0" y="0"/>
+          <a:ext cx="0" cy="0"/>
+          <a:chOff x="0" y="0"/>
+          <a:chExt cx="0" cy="0"/>
+        </a:xfrm>
+      </p:grpSpPr>
+      <p:sp>
+        <p:nvSpPr>
+          <p:cNvPr id="2" name="Title 1"/>
+          <p:cNvSpPr>
+            <a:spLocks noGrp="1"/>
+          </p:cNvSpPr>
+          <p:nvPr>
+            <p:ph type="title"/>
+          </p:nvPr>
+        </p:nvSpPr>
+        <p:spPr/>
+        <p:txBody>
+          <a:bodyPr/>
+          <a:lstStyle/>
+          <a:p>
+            <a:r>
+              <a:rPr lang="en-US" dirty="0"/>
+              <a:t>SQL Server Features</a:t>
+            </a:r>
+            <a:br>
+              <a:rPr lang="en-US" dirty="0"/>
+            </a:br>
+            <a:r>
+              <a:rPr lang="en-US" dirty="0"/>
+              <a:t>(Speed Dating)</a:t>
+            </a:r>
+          </a:p>
+        </p:txBody>
+      </p:sp>
+      <p:sp>
+        <p:nvSpPr>
+          <p:cNvPr id="3" name="Content Placeholder 2"/>
+          <p:cNvSpPr>
+            <a:spLocks noGrp="1"/>
+          </p:cNvSpPr>
+          <p:nvPr>
+            <p:ph idx="1"/>
+          </p:nvPr>
+        </p:nvSpPr>
+        <p:spPr/>
+        <p:txBody>
+          <a:bodyPr>
+            <a:normAutofit lnSpcReduction="10000"/>
+          </a:bodyPr>
+          <a:lstStyle/>
+          <a:p>
+            <a:r>
+              <a:rPr lang="en-US" dirty="0"/>
+              <a:t>Security</a:t>
+            </a:r>
+          </a:p>
+          <a:p>
+            <a:pPr lvl="1"/>
+            <a:r>
+              <a:rPr lang="en-US" dirty="0"/>
+              <a:t>Row-Level Security</a:t>
+            </a:r>
+          </a:p>
+          <a:p>
+            <a:pPr lvl="1"/>
+            <a:r>
+              <a:rPr lang="en-US" dirty="0"/>
+              <a:t>Always Encrypted</a:t>
+            </a:r>
+          </a:p>
+          <a:p>
+            <a:r>
+              <a:rPr lang="en-US" dirty="0"/>
+              <a:t>Utility</a:t>
+            </a:r>
+          </a:p>
+          <a:p>
+            <a:pPr lvl="1"/>
+            <a:r>
+              <a:rPr lang="en-US" dirty="0"/>
+              <a:t>Snapshots</a:t>
+            </a:r>
+          </a:p>
+          <a:p>
+            <a:pPr lvl="1"/>
+            <a:r>
+              <a:rPr lang="en-US" dirty="0"/>
+              <a:t>Temporal Tables</a:t>
+            </a:r>
+          </a:p>
+          <a:p>
+            <a:r>
+              <a:rPr lang="en-US" dirty="0"/>
+              <a:t>Performance</a:t>
+            </a:r>
+          </a:p>
+          <a:p>
+            <a:pPr lvl="1"/>
+            <a:r>
+              <a:rPr lang="en-US" dirty="0" err="1"/>
+              <a:t>Columnstore</a:t>
+            </a:r>
+            <a:r>
+              <a:rPr lang="en-US" dirty="0"/>
+              <a:t> Indexes</a:t>
+            </a:r>
+          </a:p>
+          <a:p>
+            <a:pPr lvl="1"/>
+            <a:r>
               <a:rPr lang="en-US" dirty="0"/>
               <a:t>Partitioning</a:t>
             </a:r>
@@ -5563,7 +6088,7 @@
 </p:sld>
 </file>
 
-<file path=ppt/slides/slide15.xml><?xml version="1.0" encoding="utf-8"?>
+<file path=ppt/slides/slide17.xml><?xml version="1.0" encoding="utf-8"?>
 <p:sld xmlns:a="http://schemas.openxmlformats.org/drawingml/2006/main" xmlns:r="http://schemas.openxmlformats.org/officeDocument/2006/relationships" xmlns:p="http://schemas.openxmlformats.org/presentationml/2006/main">
   <p:cSld>
     <p:spTree>
@@ -8220,16 +8745,10 @@
           <a:lstStyle/>
           <a:p>
             <a:r>
-              <a:rPr lang="en-US" dirty="0"/>
-              <a:t>SQL Server Features</a:t>
-            </a:r>
-            <a:br>
-              <a:rPr lang="en-US" dirty="0"/>
-            </a:br>
-            <a:r>
-              <a:rPr lang="en-US" dirty="0"/>
-              <a:t>(Speed Dating)</a:t>
-            </a:r>
+              <a:rPr lang="en-US" dirty="0" smtClean="0"/>
+              <a:t>Always Encrypted</a:t>
+            </a:r>
+            <a:endParaRPr lang="en-US" dirty="0"/>
           </a:p>
         </p:txBody>
       </p:sp>
@@ -8245,91 +8764,83 @@
         </p:nvSpPr>
         <p:spPr/>
         <p:txBody>
-          <a:bodyPr>
-            <a:normAutofit lnSpcReduction="10000"/>
-          </a:bodyPr>
+          <a:bodyPr/>
           <a:lstStyle/>
           <a:p>
             <a:r>
-              <a:rPr lang="en-US" dirty="0"/>
-              <a:t>Security</a:t>
-            </a:r>
-          </a:p>
-          <a:p>
-            <a:pPr lvl="1"/>
-            <a:r>
-              <a:rPr lang="en-US" dirty="0"/>
-              <a:t>Row-Level Security</a:t>
-            </a:r>
-          </a:p>
-          <a:p>
-            <a:pPr lvl="1"/>
-            <a:r>
-              <a:rPr lang="en-US" dirty="0"/>
-              <a:t>Always Encrypted</a:t>
-            </a:r>
-          </a:p>
-          <a:p>
-            <a:r>
-              <a:rPr lang="en-US" dirty="0"/>
-              <a:t>Utility</a:t>
-            </a:r>
-          </a:p>
-          <a:p>
-            <a:pPr lvl="1"/>
-            <a:r>
-              <a:rPr lang="en-US" dirty="0">
-                <a:solidFill>
-                  <a:srgbClr val="FF0000"/>
-                </a:solidFill>
+              <a:rPr lang="en-US" dirty="0" smtClean="0"/>
+              <a:t>Applies at the column level</a:t>
+            </a:r>
+          </a:p>
+          <a:p>
+            <a:r>
+              <a:rPr lang="en-US" dirty="0" smtClean="0"/>
+              <a:t>SQL Server box never sees data in unencrypted form (both at-rest and in-transit)</a:t>
+            </a:r>
+          </a:p>
+          <a:p>
+            <a:pPr lvl="1"/>
+            <a:r>
+              <a:rPr lang="en-US" dirty="0" smtClean="0"/>
+              <a:t>Encrypted columns are stored (and transmitted) as </a:t>
+            </a:r>
+            <a:r>
+              <a:rPr lang="en-US" dirty="0" err="1" smtClean="0"/>
+              <a:t>varbinary</a:t>
+            </a:r>
+            <a:r>
+              <a:rPr lang="en-US" dirty="0" smtClean="0"/>
+              <a:t> behind the scenes</a:t>
+            </a:r>
+          </a:p>
+          <a:p>
+            <a:r>
+              <a:rPr lang="en-US" dirty="0" smtClean="0"/>
+              <a:t>Certificate is generated on client machine and shared with other clients</a:t>
+            </a:r>
+          </a:p>
+          <a:p>
+            <a:r>
+              <a:rPr lang="en-US" dirty="0" smtClean="0"/>
+              <a:t>Encryption can be random or deterministic (required if column is indexed or used in a join)</a:t>
+            </a:r>
+          </a:p>
+          <a:p>
+            <a:r>
+              <a:rPr lang="en-US" dirty="0" smtClean="0"/>
+              <a:t>Requires a change to the connection string in </a:t>
+            </a:r>
+            <a:r>
+              <a:rPr lang="en-US" dirty="0"/>
+              <a:t>the </a:t>
+            </a:r>
+            <a:r>
+              <a:rPr lang="en-US" dirty="0" smtClean="0"/>
+              <a:t>application</a:t>
+            </a:r>
+          </a:p>
+          <a:p>
+            <a:pPr lvl="1"/>
+            <a:r>
+              <a:rPr lang="en-US" b="1" dirty="0" smtClean="0">
+                <a:latin typeface="Courier New" panose="02070309020205020404" pitchFamily="49" charset="0"/>
+                <a:cs typeface="Courier New" panose="02070309020205020404" pitchFamily="49" charset="0"/>
               </a:rPr>
-              <a:t>Snapshots</a:t>
-            </a:r>
-          </a:p>
-          <a:p>
-            <a:pPr lvl="1"/>
-            <a:r>
-              <a:rPr lang="en-US" dirty="0"/>
-              <a:t>Temporal Tables</a:t>
-            </a:r>
-          </a:p>
-          <a:p>
-            <a:r>
-              <a:rPr lang="en-US" dirty="0"/>
-              <a:t>Performance</a:t>
-            </a:r>
-          </a:p>
-          <a:p>
-            <a:pPr lvl="1"/>
-            <a:r>
-              <a:rPr lang="en-US" dirty="0" err="1"/>
-              <a:t>Columnstore</a:t>
-            </a:r>
-            <a:r>
-              <a:rPr lang="en-US" dirty="0"/>
-              <a:t> Indexes</a:t>
-            </a:r>
-          </a:p>
-          <a:p>
-            <a:pPr lvl="1"/>
-            <a:r>
-              <a:rPr lang="en-US" dirty="0"/>
-              <a:t>Partitioning</a:t>
-            </a:r>
-          </a:p>
-          <a:p>
-            <a:pPr lvl="1"/>
-            <a:r>
-              <a:rPr lang="en-US" dirty="0"/>
-              <a:t>In-Memory OLTP (</a:t>
-            </a:r>
-            <a:r>
-              <a:rPr lang="en-US" dirty="0" err="1"/>
-              <a:t>Hekaton</a:t>
-            </a:r>
-            <a:r>
-              <a:rPr lang="en-US" dirty="0"/>
-              <a:t>)</a:t>
+              <a:t>Column </a:t>
+            </a:r>
+            <a:r>
+              <a:rPr lang="en-US" b="1" dirty="0">
+                <a:latin typeface="Courier New" panose="02070309020205020404" pitchFamily="49" charset="0"/>
+                <a:cs typeface="Courier New" panose="02070309020205020404" pitchFamily="49" charset="0"/>
+              </a:rPr>
+              <a:t>Encryption </a:t>
+            </a:r>
+            <a:r>
+              <a:rPr lang="en-US" b="1" dirty="0" smtClean="0">
+                <a:latin typeface="Courier New" panose="02070309020205020404" pitchFamily="49" charset="0"/>
+                <a:cs typeface="Courier New" panose="02070309020205020404" pitchFamily="49" charset="0"/>
+              </a:rPr>
+              <a:t>Setting=enabled</a:t>
             </a:r>
           </a:p>
         </p:txBody>
@@ -8337,7 +8848,7 @@
     </p:spTree>
     <p:extLst>
       <p:ext uri="{BB962C8B-B14F-4D97-AF65-F5344CB8AC3E}">
-        <p14:creationId xmlns:p14="http://schemas.microsoft.com/office/powerpoint/2010/main" val="329879923"/>
+        <p14:creationId xmlns:p14="http://schemas.microsoft.com/office/powerpoint/2010/main" val="1859561863"/>
       </p:ext>
     </p:extLst>
   </p:cSld>

</xml_diff>

<commit_message>
Add Always Encrypted diagram.
</commit_message>
<xml_diff>
--- a/AwesomeFreeSQLServerFeatures.pptx
+++ b/AwesomeFreeSQLServerFeatures.pptx
@@ -5,7 +5,7 @@
     <p:sldMasterId id="2147483648" r:id="rId1"/>
   </p:sldMasterIdLst>
   <p:notesMasterIdLst>
-    <p:notesMasterId r:id="rId19"/>
+    <p:notesMasterId r:id="rId20"/>
   </p:notesMasterIdLst>
   <p:sldIdLst>
     <p:sldId id="256" r:id="rId2"/>
@@ -17,14 +17,15 @@
     <p:sldId id="263" r:id="rId8"/>
     <p:sldId id="264" r:id="rId9"/>
     <p:sldId id="273" r:id="rId10"/>
-    <p:sldId id="274" r:id="rId11"/>
-    <p:sldId id="265" r:id="rId12"/>
-    <p:sldId id="266" r:id="rId13"/>
-    <p:sldId id="267" r:id="rId14"/>
-    <p:sldId id="268" r:id="rId15"/>
-    <p:sldId id="271" r:id="rId16"/>
-    <p:sldId id="270" r:id="rId17"/>
-    <p:sldId id="258" r:id="rId18"/>
+    <p:sldId id="275" r:id="rId11"/>
+    <p:sldId id="274" r:id="rId12"/>
+    <p:sldId id="265" r:id="rId13"/>
+    <p:sldId id="266" r:id="rId14"/>
+    <p:sldId id="267" r:id="rId15"/>
+    <p:sldId id="268" r:id="rId16"/>
+    <p:sldId id="271" r:id="rId17"/>
+    <p:sldId id="270" r:id="rId18"/>
+    <p:sldId id="258" r:id="rId19"/>
   </p:sldIdLst>
   <p:sldSz cx="12192000" cy="6858000"/>
   <p:notesSz cx="6858000" cy="9144000"/>
@@ -1038,7 +1039,7 @@
           <a:p>
             <a:fld id="{8B5705F6-219D-4122-80FA-D82FBBCA0869}" type="slidenum">
               <a:rPr lang="en-US" smtClean="0"/>
-              <a:t>10</a:t>
+              <a:t>11</a:t>
             </a:fld>
             <a:endParaRPr lang="en-US"/>
           </a:p>
@@ -5147,52 +5148,41 @@
           <a:lstStyle/>
           <a:p>
             <a:r>
-              <a:rPr lang="en-US" dirty="0" smtClean="0"/>
-              <a:t>Always Encrypted - Cons</a:t>
-            </a:r>
-            <a:endParaRPr lang="en-US" dirty="0"/>
-          </a:p>
-        </p:txBody>
-      </p:sp>
-      <p:sp>
-        <p:nvSpPr>
-          <p:cNvPr id="3" name="Content Placeholder 2"/>
-          <p:cNvSpPr>
-            <a:spLocks noGrp="1"/>
-          </p:cNvSpPr>
-          <p:nvPr>
-            <p:ph idx="1"/>
-          </p:nvPr>
-        </p:nvSpPr>
-        <p:spPr/>
-        <p:txBody>
-          <a:bodyPr/>
-          <a:lstStyle/>
-          <a:p>
-            <a:r>
-              <a:rPr lang="en-US" dirty="0" smtClean="0"/>
-              <a:t>Data size bloat, especially for smaller data types</a:t>
-            </a:r>
-          </a:p>
-          <a:p>
-            <a:r>
-              <a:rPr lang="en-US" dirty="0" smtClean="0"/>
-              <a:t>Adds considerable difficulty troubleshooting in tools like SSMS</a:t>
-            </a:r>
-          </a:p>
-          <a:p>
-            <a:r>
-              <a:rPr lang="en-US" dirty="0" smtClean="0"/>
-              <a:t>String columns must have a BIN collation – they won’t sort by traditional SQL rules</a:t>
-            </a:r>
-            <a:endParaRPr lang="en-US" dirty="0"/>
-          </a:p>
-        </p:txBody>
-      </p:sp>
+              <a:rPr lang="en-US" smtClean="0"/>
+              <a:t>Always Encrypted in Action</a:t>
+            </a:r>
+            <a:endParaRPr lang="en-US"/>
+          </a:p>
+        </p:txBody>
+      </p:sp>
+      <p:pic>
+        <p:nvPicPr>
+          <p:cNvPr id="5" name="Picture 4"/>
+          <p:cNvPicPr>
+            <a:picLocks noChangeAspect="1"/>
+          </p:cNvPicPr>
+          <p:nvPr/>
+        </p:nvPicPr>
+        <p:blipFill>
+          <a:blip r:embed="rId2"/>
+          <a:stretch>
+            <a:fillRect/>
+          </a:stretch>
+        </p:blipFill>
+        <p:spPr>
+          <a:xfrm>
+            <a:off x="890976" y="1863090"/>
+            <a:ext cx="10410048" cy="4674870"/>
+          </a:xfrm>
+          <a:prstGeom prst="rect">
+            <a:avLst/>
+          </a:prstGeom>
+        </p:spPr>
+      </p:pic>
     </p:spTree>
     <p:extLst>
       <p:ext uri="{BB962C8B-B14F-4D97-AF65-F5344CB8AC3E}">
-        <p14:creationId xmlns:p14="http://schemas.microsoft.com/office/powerpoint/2010/main" val="3969599080"/>
+        <p14:creationId xmlns:p14="http://schemas.microsoft.com/office/powerpoint/2010/main" val="2086316663"/>
       </p:ext>
     </p:extLst>
   </p:cSld>
@@ -5235,16 +5225,10 @@
           <a:lstStyle/>
           <a:p>
             <a:r>
-              <a:rPr lang="en-US" dirty="0"/>
-              <a:t>SQL Server Features</a:t>
-            </a:r>
-            <a:br>
-              <a:rPr lang="en-US" dirty="0"/>
-            </a:br>
-            <a:r>
-              <a:rPr lang="en-US" dirty="0"/>
-              <a:t>(Speed Dating)</a:t>
-            </a:r>
+              <a:rPr lang="en-US" dirty="0" smtClean="0"/>
+              <a:t>Always Encrypted - Cons</a:t>
+            </a:r>
+            <a:endParaRPr lang="en-US" dirty="0"/>
           </a:p>
         </p:txBody>
       </p:sp>
@@ -5260,99 +5244,39 @@
         </p:nvSpPr>
         <p:spPr/>
         <p:txBody>
-          <a:bodyPr>
-            <a:normAutofit lnSpcReduction="10000"/>
-          </a:bodyPr>
+          <a:bodyPr/>
           <a:lstStyle/>
           <a:p>
             <a:r>
-              <a:rPr lang="en-US" dirty="0"/>
-              <a:t>Security</a:t>
-            </a:r>
-          </a:p>
-          <a:p>
-            <a:pPr lvl="1"/>
-            <a:r>
-              <a:rPr lang="en-US" dirty="0"/>
-              <a:t>Row-Level Security</a:t>
-            </a:r>
-          </a:p>
-          <a:p>
-            <a:pPr lvl="1"/>
-            <a:r>
-              <a:rPr lang="en-US" dirty="0"/>
-              <a:t>Always Encrypted</a:t>
-            </a:r>
-          </a:p>
-          <a:p>
-            <a:r>
-              <a:rPr lang="en-US" dirty="0"/>
-              <a:t>Utility</a:t>
-            </a:r>
-          </a:p>
-          <a:p>
-            <a:pPr lvl="1"/>
-            <a:r>
-              <a:rPr lang="en-US" dirty="0">
-                <a:solidFill>
-                  <a:srgbClr val="FF0000"/>
-                </a:solidFill>
-              </a:rPr>
-              <a:t>Snapshots</a:t>
-            </a:r>
-          </a:p>
-          <a:p>
-            <a:pPr lvl="1"/>
-            <a:r>
-              <a:rPr lang="en-US" dirty="0"/>
-              <a:t>Temporal Tables</a:t>
-            </a:r>
-          </a:p>
-          <a:p>
-            <a:r>
-              <a:rPr lang="en-US" dirty="0"/>
-              <a:t>Performance</a:t>
-            </a:r>
-          </a:p>
-          <a:p>
-            <a:pPr lvl="1"/>
-            <a:r>
-              <a:rPr lang="en-US" dirty="0" err="1"/>
-              <a:t>Columnstore</a:t>
-            </a:r>
-            <a:r>
-              <a:rPr lang="en-US" dirty="0"/>
-              <a:t> Indexes</a:t>
-            </a:r>
-          </a:p>
-          <a:p>
-            <a:pPr lvl="1"/>
-            <a:r>
-              <a:rPr lang="en-US" dirty="0"/>
-              <a:t>Partitioning</a:t>
-            </a:r>
-          </a:p>
-          <a:p>
-            <a:pPr lvl="1"/>
-            <a:r>
-              <a:rPr lang="en-US" dirty="0"/>
-              <a:t>In-Memory OLTP (</a:t>
-            </a:r>
-            <a:r>
-              <a:rPr lang="en-US" dirty="0" err="1"/>
-              <a:t>Hekaton</a:t>
-            </a:r>
-            <a:r>
-              <a:rPr lang="en-US" dirty="0"/>
-              <a:t>)</a:t>
-            </a:r>
+              <a:rPr lang="en-US" dirty="0" smtClean="0"/>
+              <a:t>Data size bloat, especially for smaller data types</a:t>
+            </a:r>
+          </a:p>
+          <a:p>
+            <a:r>
+              <a:rPr lang="en-US" dirty="0" smtClean="0"/>
+              <a:t>Adds considerable difficulty troubleshooting in tools like SSMS</a:t>
+            </a:r>
+          </a:p>
+          <a:p>
+            <a:r>
+              <a:rPr lang="en-US" dirty="0" smtClean="0"/>
+              <a:t>String columns must have a BIN collation – they won’t sort by traditional SQL rules</a:t>
+            </a:r>
+          </a:p>
+          <a:p>
+            <a:r>
+              <a:rPr lang="en-US" dirty="0" smtClean="0"/>
+              <a:t>Extra round trips to determine metadata, retrieve keys</a:t>
+            </a:r>
+            <a:endParaRPr lang="en-US" dirty="0"/>
           </a:p>
         </p:txBody>
       </p:sp>
     </p:spTree>
     <p:extLst>
       <p:ext uri="{BB962C8B-B14F-4D97-AF65-F5344CB8AC3E}">
-        <p14:creationId xmlns:p14="http://schemas.microsoft.com/office/powerpoint/2010/main" val="329879923"/>
+        <p14:creationId xmlns:p14="http://schemas.microsoft.com/office/powerpoint/2010/main" val="3969599080"/>
       </p:ext>
     </p:extLst>
   </p:cSld>
@@ -5453,18 +5377,18 @@
           <a:p>
             <a:pPr lvl="1"/>
             <a:r>
-              <a:rPr lang="en-US" dirty="0"/>
-              <a:t>Snapshots</a:t>
-            </a:r>
-          </a:p>
-          <a:p>
-            <a:pPr lvl="1"/>
-            <a:r>
               <a:rPr lang="en-US" dirty="0">
                 <a:solidFill>
                   <a:srgbClr val="FF0000"/>
                 </a:solidFill>
               </a:rPr>
+              <a:t>Snapshots</a:t>
+            </a:r>
+          </a:p>
+          <a:p>
+            <a:pPr lvl="1"/>
+            <a:r>
+              <a:rPr lang="en-US" dirty="0"/>
               <a:t>Temporal Tables</a:t>
             </a:r>
           </a:p>
@@ -5512,7 +5436,7 @@
     </p:spTree>
     <p:extLst>
       <p:ext uri="{BB962C8B-B14F-4D97-AF65-F5344CB8AC3E}">
-        <p14:creationId xmlns:p14="http://schemas.microsoft.com/office/powerpoint/2010/main" val="85911061"/>
+        <p14:creationId xmlns:p14="http://schemas.microsoft.com/office/powerpoint/2010/main" val="329879923"/>
       </p:ext>
     </p:extLst>
   </p:cSld>
@@ -5620,32 +5544,28 @@
           <a:p>
             <a:pPr lvl="1"/>
             <a:r>
-              <a:rPr lang="en-US" dirty="0"/>
-              <a:t>Temporal Tables</a:t>
-            </a:r>
-          </a:p>
-          <a:p>
-            <a:r>
-              <a:rPr lang="en-US" dirty="0"/>
-              <a:t>Performance</a:t>
-            </a:r>
-          </a:p>
-          <a:p>
-            <a:pPr lvl="1"/>
-            <a:r>
-              <a:rPr lang="en-US" dirty="0" err="1">
-                <a:solidFill>
-                  <a:srgbClr val="FF0000"/>
-                </a:solidFill>
-              </a:rPr>
-              <a:t>Columnstore</a:t>
-            </a:r>
-            <a:r>
               <a:rPr lang="en-US" dirty="0">
                 <a:solidFill>
                   <a:srgbClr val="FF0000"/>
                 </a:solidFill>
               </a:rPr>
+              <a:t>Temporal Tables</a:t>
+            </a:r>
+          </a:p>
+          <a:p>
+            <a:r>
+              <a:rPr lang="en-US" dirty="0"/>
+              <a:t>Performance</a:t>
+            </a:r>
+          </a:p>
+          <a:p>
+            <a:pPr lvl="1"/>
+            <a:r>
+              <a:rPr lang="en-US" dirty="0" err="1"/>
+              <a:t>Columnstore</a:t>
+            </a:r>
+            <a:r>
+              <a:rPr lang="en-US" dirty="0"/>
               <a:t> Indexes</a:t>
             </a:r>
           </a:p>
@@ -5676,7 +5596,7 @@
     </p:spTree>
     <p:extLst>
       <p:ext uri="{BB962C8B-B14F-4D97-AF65-F5344CB8AC3E}">
-        <p14:creationId xmlns:p14="http://schemas.microsoft.com/office/powerpoint/2010/main" val="2331663206"/>
+        <p14:creationId xmlns:p14="http://schemas.microsoft.com/office/powerpoint/2010/main" val="85911061"/>
       </p:ext>
     </p:extLst>
   </p:cSld>
@@ -5797,22 +5717,26 @@
           <a:p>
             <a:pPr lvl="1"/>
             <a:r>
-              <a:rPr lang="en-US" dirty="0" err="1"/>
+              <a:rPr lang="en-US" dirty="0" err="1">
+                <a:solidFill>
+                  <a:srgbClr val="FF0000"/>
+                </a:solidFill>
+              </a:rPr>
               <a:t>Columnstore</a:t>
             </a:r>
-            <a:r>
-              <a:rPr lang="en-US" dirty="0"/>
-              <a:t> Indexes</a:t>
-            </a:r>
-          </a:p>
-          <a:p>
-            <a:pPr lvl="1"/>
             <a:r>
               <a:rPr lang="en-US" dirty="0">
                 <a:solidFill>
                   <a:srgbClr val="FF0000"/>
                 </a:solidFill>
               </a:rPr>
+              <a:t> Indexes</a:t>
+            </a:r>
+          </a:p>
+          <a:p>
+            <a:pPr lvl="1"/>
+            <a:r>
+              <a:rPr lang="en-US" dirty="0"/>
               <a:t>Partitioning</a:t>
             </a:r>
           </a:p>
@@ -5836,7 +5760,7 @@
     </p:spTree>
     <p:extLst>
       <p:ext uri="{BB962C8B-B14F-4D97-AF65-F5344CB8AC3E}">
-        <p14:creationId xmlns:p14="http://schemas.microsoft.com/office/powerpoint/2010/main" val="3961792109"/>
+        <p14:creationId xmlns:p14="http://schemas.microsoft.com/office/powerpoint/2010/main" val="2331663206"/>
       </p:ext>
     </p:extLst>
   </p:cSld>
@@ -5880,29 +5804,115 @@
           <a:p>
             <a:r>
               <a:rPr lang="en-US" dirty="0"/>
+              <a:t>SQL Server Features</a:t>
+            </a:r>
+            <a:br>
+              <a:rPr lang="en-US" dirty="0"/>
+            </a:br>
+            <a:r>
+              <a:rPr lang="en-US" dirty="0"/>
+              <a:t>(Speed Dating)</a:t>
+            </a:r>
+          </a:p>
+        </p:txBody>
+      </p:sp>
+      <p:sp>
+        <p:nvSpPr>
+          <p:cNvPr id="3" name="Content Placeholder 2"/>
+          <p:cNvSpPr>
+            <a:spLocks noGrp="1"/>
+          </p:cNvSpPr>
+          <p:nvPr>
+            <p:ph idx="1"/>
+          </p:nvPr>
+        </p:nvSpPr>
+        <p:spPr/>
+        <p:txBody>
+          <a:bodyPr>
+            <a:normAutofit lnSpcReduction="10000"/>
+          </a:bodyPr>
+          <a:lstStyle/>
+          <a:p>
+            <a:r>
+              <a:rPr lang="en-US" dirty="0"/>
+              <a:t>Security</a:t>
+            </a:r>
+          </a:p>
+          <a:p>
+            <a:pPr lvl="1"/>
+            <a:r>
+              <a:rPr lang="en-US" dirty="0"/>
+              <a:t>Row-Level Security</a:t>
+            </a:r>
+          </a:p>
+          <a:p>
+            <a:pPr lvl="1"/>
+            <a:r>
+              <a:rPr lang="en-US" dirty="0"/>
+              <a:t>Always Encrypted</a:t>
+            </a:r>
+          </a:p>
+          <a:p>
+            <a:r>
+              <a:rPr lang="en-US" dirty="0"/>
+              <a:t>Utility</a:t>
+            </a:r>
+          </a:p>
+          <a:p>
+            <a:pPr lvl="1"/>
+            <a:r>
+              <a:rPr lang="en-US" dirty="0"/>
+              <a:t>Snapshots</a:t>
+            </a:r>
+          </a:p>
+          <a:p>
+            <a:pPr lvl="1"/>
+            <a:r>
+              <a:rPr lang="en-US" dirty="0"/>
+              <a:t>Temporal Tables</a:t>
+            </a:r>
+          </a:p>
+          <a:p>
+            <a:r>
+              <a:rPr lang="en-US" dirty="0"/>
+              <a:t>Performance</a:t>
+            </a:r>
+          </a:p>
+          <a:p>
+            <a:pPr lvl="1"/>
+            <a:r>
+              <a:rPr lang="en-US" dirty="0" err="1"/>
+              <a:t>Columnstore</a:t>
+            </a:r>
+            <a:r>
+              <a:rPr lang="en-US" dirty="0"/>
+              <a:t> Indexes</a:t>
+            </a:r>
+          </a:p>
+          <a:p>
+            <a:pPr lvl="1"/>
+            <a:r>
+              <a:rPr lang="en-US" dirty="0">
+                <a:solidFill>
+                  <a:srgbClr val="FF0000"/>
+                </a:solidFill>
+              </a:rPr>
               <a:t>Partitioning</a:t>
             </a:r>
           </a:p>
-        </p:txBody>
-      </p:sp>
-      <p:sp>
-        <p:nvSpPr>
-          <p:cNvPr id="3" name="Content Placeholder 2"/>
-          <p:cNvSpPr>
-            <a:spLocks noGrp="1"/>
-          </p:cNvSpPr>
-          <p:nvPr>
-            <p:ph idx="1"/>
-          </p:nvPr>
-        </p:nvSpPr>
-        <p:spPr/>
-        <p:txBody>
-          <a:bodyPr/>
-          <a:lstStyle/>
-          <a:p>
-            <a:r>
-              <a:rPr lang="en-US" dirty="0"/>
-              <a:t>Combine with temporal tables to enable quick archival capability</a:t>
+          <a:p>
+            <a:pPr lvl="1"/>
+            <a:r>
+              <a:rPr lang="en-US" dirty="0"/>
+              <a:t>In-Memory OLTP (</a:t>
+            </a:r>
+            <a:r>
+              <a:rPr lang="en-US" dirty="0" err="1"/>
+              <a:t>Hekaton</a:t>
+            </a:r>
+            <a:r>
+              <a:rPr lang="en-US" dirty="0"/>
+              <a:t>)</a:t>
             </a:r>
           </a:p>
         </p:txBody>
@@ -5910,7 +5920,7 @@
     </p:spTree>
     <p:extLst>
       <p:ext uri="{BB962C8B-B14F-4D97-AF65-F5344CB8AC3E}">
-        <p14:creationId xmlns:p14="http://schemas.microsoft.com/office/powerpoint/2010/main" val="1885707255"/>
+        <p14:creationId xmlns:p14="http://schemas.microsoft.com/office/powerpoint/2010/main" val="3961792109"/>
       </p:ext>
     </p:extLst>
   </p:cSld>
@@ -5954,6 +5964,80 @@
           <a:p>
             <a:r>
               <a:rPr lang="en-US" dirty="0"/>
+              <a:t>Partitioning</a:t>
+            </a:r>
+          </a:p>
+        </p:txBody>
+      </p:sp>
+      <p:sp>
+        <p:nvSpPr>
+          <p:cNvPr id="3" name="Content Placeholder 2"/>
+          <p:cNvSpPr>
+            <a:spLocks noGrp="1"/>
+          </p:cNvSpPr>
+          <p:nvPr>
+            <p:ph idx="1"/>
+          </p:nvPr>
+        </p:nvSpPr>
+        <p:spPr/>
+        <p:txBody>
+          <a:bodyPr/>
+          <a:lstStyle/>
+          <a:p>
+            <a:r>
+              <a:rPr lang="en-US" dirty="0"/>
+              <a:t>Combine with temporal tables to enable quick archival capability</a:t>
+            </a:r>
+          </a:p>
+        </p:txBody>
+      </p:sp>
+    </p:spTree>
+    <p:extLst>
+      <p:ext uri="{BB962C8B-B14F-4D97-AF65-F5344CB8AC3E}">
+        <p14:creationId xmlns:p14="http://schemas.microsoft.com/office/powerpoint/2010/main" val="1885707255"/>
+      </p:ext>
+    </p:extLst>
+  </p:cSld>
+  <p:clrMapOvr>
+    <a:masterClrMapping/>
+  </p:clrMapOvr>
+</p:sld>
+</file>
+
+<file path=ppt/slides/slide17.xml><?xml version="1.0" encoding="utf-8"?>
+<p:sld xmlns:a="http://schemas.openxmlformats.org/drawingml/2006/main" xmlns:r="http://schemas.openxmlformats.org/officeDocument/2006/relationships" xmlns:p="http://schemas.openxmlformats.org/presentationml/2006/main">
+  <p:cSld>
+    <p:spTree>
+      <p:nvGrpSpPr>
+        <p:cNvPr id="1" name=""/>
+        <p:cNvGrpSpPr/>
+        <p:nvPr/>
+      </p:nvGrpSpPr>
+      <p:grpSpPr>
+        <a:xfrm>
+          <a:off x="0" y="0"/>
+          <a:ext cx="0" cy="0"/>
+          <a:chOff x="0" y="0"/>
+          <a:chExt cx="0" cy="0"/>
+        </a:xfrm>
+      </p:grpSpPr>
+      <p:sp>
+        <p:nvSpPr>
+          <p:cNvPr id="2" name="Title 1"/>
+          <p:cNvSpPr>
+            <a:spLocks noGrp="1"/>
+          </p:cNvSpPr>
+          <p:nvPr>
+            <p:ph type="title"/>
+          </p:nvPr>
+        </p:nvSpPr>
+        <p:spPr/>
+        <p:txBody>
+          <a:bodyPr/>
+          <a:lstStyle/>
+          <a:p>
+            <a:r>
+              <a:rPr lang="en-US" dirty="0"/>
               <a:t>SQL Server Features</a:t>
             </a:r>
             <a:br>
@@ -6088,7 +6172,7 @@
 </p:sld>
 </file>
 
-<file path=ppt/slides/slide17.xml><?xml version="1.0" encoding="utf-8"?>
+<file path=ppt/slides/slide18.xml><?xml version="1.0" encoding="utf-8"?>
 <p:sld xmlns:a="http://schemas.openxmlformats.org/drawingml/2006/main" xmlns:r="http://schemas.openxmlformats.org/officeDocument/2006/relationships" xmlns:p="http://schemas.openxmlformats.org/presentationml/2006/main">
   <p:cSld>
     <p:spTree>
@@ -8843,6 +8927,16 @@
               <a:t>Setting=enabled</a:t>
             </a:r>
           </a:p>
+          <a:p>
+            <a:r>
+              <a:rPr lang="en-US" dirty="0" smtClean="0"/>
+              <a:t>Queries must be parameterized</a:t>
+            </a:r>
+            <a:endParaRPr lang="en-US" b="1" dirty="0" smtClean="0">
+              <a:latin typeface="Courier New" panose="02070309020205020404" pitchFamily="49" charset="0"/>
+              <a:cs typeface="Courier New" panose="02070309020205020404" pitchFamily="49" charset="0"/>
+            </a:endParaRPr>
+          </a:p>
         </p:txBody>
       </p:sp>
     </p:spTree>

</xml_diff>

<commit_message>
Add slide for temporal tables.
</commit_message>
<xml_diff>
--- a/AwesomeFreeSQLServerFeatures.pptx
+++ b/AwesomeFreeSQLServerFeatures.pptx
@@ -5,7 +5,7 @@
     <p:sldMasterId id="2147483648" r:id="rId1"/>
   </p:sldMasterIdLst>
   <p:notesMasterIdLst>
-    <p:notesMasterId r:id="rId23"/>
+    <p:notesMasterId r:id="rId24"/>
   </p:notesMasterIdLst>
   <p:sldIdLst>
     <p:sldId id="256" r:id="rId2"/>
@@ -24,11 +24,12 @@
     <p:sldId id="276" r:id="rId15"/>
     <p:sldId id="278" r:id="rId16"/>
     <p:sldId id="266" r:id="rId17"/>
-    <p:sldId id="267" r:id="rId18"/>
-    <p:sldId id="268" r:id="rId19"/>
-    <p:sldId id="271" r:id="rId20"/>
-    <p:sldId id="270" r:id="rId21"/>
-    <p:sldId id="258" r:id="rId22"/>
+    <p:sldId id="279" r:id="rId18"/>
+    <p:sldId id="267" r:id="rId19"/>
+    <p:sldId id="268" r:id="rId20"/>
+    <p:sldId id="271" r:id="rId21"/>
+    <p:sldId id="270" r:id="rId22"/>
+    <p:sldId id="258" r:id="rId23"/>
   </p:sldIdLst>
   <p:sldSz cx="12192000" cy="6858000"/>
   <p:notesSz cx="6858000" cy="9144000"/>
@@ -6100,16 +6101,10 @@
           <a:lstStyle/>
           <a:p>
             <a:r>
-              <a:rPr lang="en-US" dirty="0"/>
-              <a:t>SQL Server Features</a:t>
-            </a:r>
-            <a:br>
-              <a:rPr lang="en-US" dirty="0"/>
-            </a:br>
-            <a:r>
-              <a:rPr lang="en-US" dirty="0"/>
-              <a:t>(Speed Dating)</a:t>
-            </a:r>
+              <a:rPr lang="en-US" dirty="0" smtClean="0"/>
+              <a:t>Temporal Tables</a:t>
+            </a:r>
+            <a:endParaRPr lang="en-US" dirty="0"/>
           </a:p>
         </p:txBody>
       </p:sp>
@@ -6125,103 +6120,49 @@
         </p:nvSpPr>
         <p:spPr/>
         <p:txBody>
-          <a:bodyPr>
-            <a:normAutofit lnSpcReduction="10000"/>
-          </a:bodyPr>
+          <a:bodyPr/>
           <a:lstStyle/>
           <a:p>
             <a:r>
-              <a:rPr lang="en-US" dirty="0"/>
-              <a:t>Security</a:t>
-            </a:r>
-          </a:p>
-          <a:p>
-            <a:pPr lvl="1"/>
-            <a:r>
-              <a:rPr lang="en-US" dirty="0"/>
-              <a:t>Row-Level Security</a:t>
-            </a:r>
-          </a:p>
-          <a:p>
-            <a:pPr lvl="1"/>
-            <a:r>
-              <a:rPr lang="en-US" dirty="0"/>
-              <a:t>Always Encrypted</a:t>
-            </a:r>
-          </a:p>
-          <a:p>
-            <a:r>
-              <a:rPr lang="en-US" dirty="0"/>
-              <a:t>Utility</a:t>
-            </a:r>
-          </a:p>
-          <a:p>
-            <a:pPr lvl="1"/>
-            <a:r>
-              <a:rPr lang="en-US" dirty="0"/>
-              <a:t>Snapshots</a:t>
-            </a:r>
-          </a:p>
-          <a:p>
-            <a:pPr lvl="1"/>
-            <a:r>
-              <a:rPr lang="en-US" dirty="0"/>
-              <a:t>Temporal Tables</a:t>
-            </a:r>
-          </a:p>
-          <a:p>
-            <a:r>
-              <a:rPr lang="en-US" dirty="0"/>
-              <a:t>Performance</a:t>
-            </a:r>
-          </a:p>
-          <a:p>
-            <a:pPr lvl="1"/>
-            <a:r>
-              <a:rPr lang="en-US" dirty="0" err="1">
-                <a:solidFill>
-                  <a:srgbClr val="FF0000"/>
-                </a:solidFill>
-              </a:rPr>
-              <a:t>Columnstore</a:t>
-            </a:r>
-            <a:r>
-              <a:rPr lang="en-US" dirty="0">
-                <a:solidFill>
-                  <a:srgbClr val="FF0000"/>
-                </a:solidFill>
-              </a:rPr>
-              <a:t> Indexes</a:t>
-            </a:r>
-          </a:p>
-          <a:p>
-            <a:pPr lvl="1"/>
-            <a:r>
-              <a:rPr lang="en-US" dirty="0"/>
-              <a:t>Partitioning</a:t>
-            </a:r>
-          </a:p>
-          <a:p>
-            <a:pPr lvl="1"/>
-            <a:r>
-              <a:rPr lang="en-US" dirty="0"/>
-              <a:t>In-Memory OLTP (</a:t>
-            </a:r>
-            <a:r>
-              <a:rPr lang="en-US" dirty="0" err="1"/>
-              <a:t>Hekaton</a:t>
-            </a:r>
-            <a:r>
-              <a:rPr lang="en-US" dirty="0"/>
-              <a:t>)</a:t>
-            </a:r>
+              <a:rPr lang="en-US" dirty="0" smtClean="0"/>
+              <a:t>Most applications / databases inherently contain a temporal element</a:t>
+            </a:r>
+          </a:p>
+          <a:p>
+            <a:r>
+              <a:rPr lang="en-US" dirty="0" smtClean="0"/>
+              <a:t>If temporal components are tracked, traditionally done with triggers or change detection</a:t>
+            </a:r>
+          </a:p>
+          <a:p>
+            <a:r>
+              <a:rPr lang="en-US" dirty="0" smtClean="0"/>
+              <a:t>Temporal tables handle tracking automatically</a:t>
+            </a:r>
+          </a:p>
+          <a:p>
+            <a:r>
+              <a:rPr lang="en-US" dirty="0" smtClean="0"/>
+              <a:t>Allows greatly simplified point-in-time querying</a:t>
+            </a:r>
+          </a:p>
+          <a:p>
+            <a:r>
+              <a:rPr lang="en-US" dirty="0" smtClean="0"/>
+              <a:t>Requires additional columns on source table and </a:t>
+            </a:r>
+            <a:r>
+              <a:rPr lang="en-US" smtClean="0"/>
+              <a:t>requires history table</a:t>
+            </a:r>
+            <a:endParaRPr lang="en-US"/>
           </a:p>
         </p:txBody>
       </p:sp>
     </p:spTree>
     <p:extLst>
       <p:ext uri="{BB962C8B-B14F-4D97-AF65-F5344CB8AC3E}">
-        <p14:creationId xmlns:p14="http://schemas.microsoft.com/office/powerpoint/2010/main" val="2331663206"/>
+        <p14:creationId xmlns:p14="http://schemas.microsoft.com/office/powerpoint/2010/main" val="3468210143"/>
       </p:ext>
     </p:extLst>
   </p:cSld>
@@ -6342,22 +6283,26 @@
           <a:p>
             <a:pPr lvl="1"/>
             <a:r>
-              <a:rPr lang="en-US" dirty="0" err="1"/>
+              <a:rPr lang="en-US" dirty="0" err="1">
+                <a:solidFill>
+                  <a:srgbClr val="FF0000"/>
+                </a:solidFill>
+              </a:rPr>
               <a:t>Columnstore</a:t>
             </a:r>
-            <a:r>
-              <a:rPr lang="en-US" dirty="0"/>
-              <a:t> Indexes</a:t>
-            </a:r>
-          </a:p>
-          <a:p>
-            <a:pPr lvl="1"/>
             <a:r>
               <a:rPr lang="en-US" dirty="0">
                 <a:solidFill>
                   <a:srgbClr val="FF0000"/>
                 </a:solidFill>
               </a:rPr>
+              <a:t> Indexes</a:t>
+            </a:r>
+          </a:p>
+          <a:p>
+            <a:pPr lvl="1"/>
+            <a:r>
+              <a:rPr lang="en-US" dirty="0"/>
               <a:t>Partitioning</a:t>
             </a:r>
           </a:p>
@@ -6381,7 +6326,7 @@
     </p:spTree>
     <p:extLst>
       <p:ext uri="{BB962C8B-B14F-4D97-AF65-F5344CB8AC3E}">
-        <p14:creationId xmlns:p14="http://schemas.microsoft.com/office/powerpoint/2010/main" val="3961792109"/>
+        <p14:creationId xmlns:p14="http://schemas.microsoft.com/office/powerpoint/2010/main" val="2331663206"/>
       </p:ext>
     </p:extLst>
   </p:cSld>
@@ -6425,29 +6370,115 @@
           <a:p>
             <a:r>
               <a:rPr lang="en-US" dirty="0"/>
+              <a:t>SQL Server Features</a:t>
+            </a:r>
+            <a:br>
+              <a:rPr lang="en-US" dirty="0"/>
+            </a:br>
+            <a:r>
+              <a:rPr lang="en-US" dirty="0"/>
+              <a:t>(Speed Dating)</a:t>
+            </a:r>
+          </a:p>
+        </p:txBody>
+      </p:sp>
+      <p:sp>
+        <p:nvSpPr>
+          <p:cNvPr id="3" name="Content Placeholder 2"/>
+          <p:cNvSpPr>
+            <a:spLocks noGrp="1"/>
+          </p:cNvSpPr>
+          <p:nvPr>
+            <p:ph idx="1"/>
+          </p:nvPr>
+        </p:nvSpPr>
+        <p:spPr/>
+        <p:txBody>
+          <a:bodyPr>
+            <a:normAutofit lnSpcReduction="10000"/>
+          </a:bodyPr>
+          <a:lstStyle/>
+          <a:p>
+            <a:r>
+              <a:rPr lang="en-US" dirty="0"/>
+              <a:t>Security</a:t>
+            </a:r>
+          </a:p>
+          <a:p>
+            <a:pPr lvl="1"/>
+            <a:r>
+              <a:rPr lang="en-US" dirty="0"/>
+              <a:t>Row-Level Security</a:t>
+            </a:r>
+          </a:p>
+          <a:p>
+            <a:pPr lvl="1"/>
+            <a:r>
+              <a:rPr lang="en-US" dirty="0"/>
+              <a:t>Always Encrypted</a:t>
+            </a:r>
+          </a:p>
+          <a:p>
+            <a:r>
+              <a:rPr lang="en-US" dirty="0"/>
+              <a:t>Utility</a:t>
+            </a:r>
+          </a:p>
+          <a:p>
+            <a:pPr lvl="1"/>
+            <a:r>
+              <a:rPr lang="en-US" dirty="0"/>
+              <a:t>Snapshots</a:t>
+            </a:r>
+          </a:p>
+          <a:p>
+            <a:pPr lvl="1"/>
+            <a:r>
+              <a:rPr lang="en-US" dirty="0"/>
+              <a:t>Temporal Tables</a:t>
+            </a:r>
+          </a:p>
+          <a:p>
+            <a:r>
+              <a:rPr lang="en-US" dirty="0"/>
+              <a:t>Performance</a:t>
+            </a:r>
+          </a:p>
+          <a:p>
+            <a:pPr lvl="1"/>
+            <a:r>
+              <a:rPr lang="en-US" dirty="0" err="1"/>
+              <a:t>Columnstore</a:t>
+            </a:r>
+            <a:r>
+              <a:rPr lang="en-US" dirty="0"/>
+              <a:t> Indexes</a:t>
+            </a:r>
+          </a:p>
+          <a:p>
+            <a:pPr lvl="1"/>
+            <a:r>
+              <a:rPr lang="en-US" dirty="0">
+                <a:solidFill>
+                  <a:srgbClr val="FF0000"/>
+                </a:solidFill>
+              </a:rPr>
               <a:t>Partitioning</a:t>
             </a:r>
           </a:p>
-        </p:txBody>
-      </p:sp>
-      <p:sp>
-        <p:nvSpPr>
-          <p:cNvPr id="3" name="Content Placeholder 2"/>
-          <p:cNvSpPr>
-            <a:spLocks noGrp="1"/>
-          </p:cNvSpPr>
-          <p:nvPr>
-            <p:ph idx="1"/>
-          </p:nvPr>
-        </p:nvSpPr>
-        <p:spPr/>
-        <p:txBody>
-          <a:bodyPr/>
-          <a:lstStyle/>
-          <a:p>
-            <a:r>
-              <a:rPr lang="en-US" dirty="0"/>
-              <a:t>Combine with temporal tables to enable quick archival capability</a:t>
+          <a:p>
+            <a:pPr lvl="1"/>
+            <a:r>
+              <a:rPr lang="en-US" dirty="0"/>
+              <a:t>In-Memory OLTP (</a:t>
+            </a:r>
+            <a:r>
+              <a:rPr lang="en-US" dirty="0" err="1"/>
+              <a:t>Hekaton</a:t>
+            </a:r>
+            <a:r>
+              <a:rPr lang="en-US" dirty="0"/>
+              <a:t>)</a:t>
             </a:r>
           </a:p>
         </p:txBody>
@@ -6455,7 +6486,7 @@
     </p:spTree>
     <p:extLst>
       <p:ext uri="{BB962C8B-B14F-4D97-AF65-F5344CB8AC3E}">
-        <p14:creationId xmlns:p14="http://schemas.microsoft.com/office/powerpoint/2010/main" val="1885707255"/>
+        <p14:creationId xmlns:p14="http://schemas.microsoft.com/office/powerpoint/2010/main" val="3961792109"/>
       </p:ext>
     </p:extLst>
   </p:cSld>
@@ -7726,6 +7757,80 @@
           <a:p>
             <a:r>
               <a:rPr lang="en-US" dirty="0"/>
+              <a:t>Partitioning</a:t>
+            </a:r>
+          </a:p>
+        </p:txBody>
+      </p:sp>
+      <p:sp>
+        <p:nvSpPr>
+          <p:cNvPr id="3" name="Content Placeholder 2"/>
+          <p:cNvSpPr>
+            <a:spLocks noGrp="1"/>
+          </p:cNvSpPr>
+          <p:nvPr>
+            <p:ph idx="1"/>
+          </p:nvPr>
+        </p:nvSpPr>
+        <p:spPr/>
+        <p:txBody>
+          <a:bodyPr/>
+          <a:lstStyle/>
+          <a:p>
+            <a:r>
+              <a:rPr lang="en-US" dirty="0"/>
+              <a:t>Combine with temporal tables to enable quick archival capability</a:t>
+            </a:r>
+          </a:p>
+        </p:txBody>
+      </p:sp>
+    </p:spTree>
+    <p:extLst>
+      <p:ext uri="{BB962C8B-B14F-4D97-AF65-F5344CB8AC3E}">
+        <p14:creationId xmlns:p14="http://schemas.microsoft.com/office/powerpoint/2010/main" val="1885707255"/>
+      </p:ext>
+    </p:extLst>
+  </p:cSld>
+  <p:clrMapOvr>
+    <a:masterClrMapping/>
+  </p:clrMapOvr>
+</p:sld>
+</file>
+
+<file path=ppt/slides/slide21.xml><?xml version="1.0" encoding="utf-8"?>
+<p:sld xmlns:a="http://schemas.openxmlformats.org/drawingml/2006/main" xmlns:r="http://schemas.openxmlformats.org/officeDocument/2006/relationships" xmlns:p="http://schemas.openxmlformats.org/presentationml/2006/main">
+  <p:cSld>
+    <p:spTree>
+      <p:nvGrpSpPr>
+        <p:cNvPr id="1" name=""/>
+        <p:cNvGrpSpPr/>
+        <p:nvPr/>
+      </p:nvGrpSpPr>
+      <p:grpSpPr>
+        <a:xfrm>
+          <a:off x="0" y="0"/>
+          <a:ext cx="0" cy="0"/>
+          <a:chOff x="0" y="0"/>
+          <a:chExt cx="0" cy="0"/>
+        </a:xfrm>
+      </p:grpSpPr>
+      <p:sp>
+        <p:nvSpPr>
+          <p:cNvPr id="2" name="Title 1"/>
+          <p:cNvSpPr>
+            <a:spLocks noGrp="1"/>
+          </p:cNvSpPr>
+          <p:nvPr>
+            <p:ph type="title"/>
+          </p:nvPr>
+        </p:nvSpPr>
+        <p:spPr/>
+        <p:txBody>
+          <a:bodyPr/>
+          <a:lstStyle/>
+          <a:p>
+            <a:r>
+              <a:rPr lang="en-US" dirty="0"/>
               <a:t>SQL Server Features</a:t>
             </a:r>
             <a:br>
@@ -7860,7 +7965,7 @@
 </p:sld>
 </file>
 
-<file path=ppt/slides/slide21.xml><?xml version="1.0" encoding="utf-8"?>
+<file path=ppt/slides/slide22.xml><?xml version="1.0" encoding="utf-8"?>
 <p:sld xmlns:a="http://schemas.openxmlformats.org/drawingml/2006/main" xmlns:r="http://schemas.openxmlformats.org/officeDocument/2006/relationships" xmlns:p="http://schemas.openxmlformats.org/presentationml/2006/main">
   <p:cSld>
     <p:spTree>

</xml_diff>

<commit_message>
Add slide on temporal querying options.
</commit_message>
<xml_diff>
--- a/AwesomeFreeSQLServerFeatures.pptx
+++ b/AwesomeFreeSQLServerFeatures.pptx
@@ -5,7 +5,7 @@
     <p:sldMasterId id="2147483648" r:id="rId1"/>
   </p:sldMasterIdLst>
   <p:notesMasterIdLst>
-    <p:notesMasterId r:id="rId26"/>
+    <p:notesMasterId r:id="rId27"/>
   </p:notesMasterIdLst>
   <p:sldIdLst>
     <p:sldId id="256" r:id="rId2"/>
@@ -29,9 +29,10 @@
     <p:sldId id="281" r:id="rId20"/>
     <p:sldId id="267" r:id="rId21"/>
     <p:sldId id="268" r:id="rId22"/>
-    <p:sldId id="271" r:id="rId23"/>
-    <p:sldId id="270" r:id="rId24"/>
-    <p:sldId id="258" r:id="rId25"/>
+    <p:sldId id="282" r:id="rId23"/>
+    <p:sldId id="271" r:id="rId24"/>
+    <p:sldId id="270" r:id="rId25"/>
+    <p:sldId id="258" r:id="rId26"/>
   </p:sldIdLst>
   <p:sldSz cx="12192000" cy="6858000"/>
   <p:notesSz cx="6858000" cy="9144000"/>
@@ -5713,6 +5714,12 @@
               <a:rPr lang="en-US" dirty="0" smtClean="0"/>
               <a:t>Resources required dependent mostly on how much underlying database is changed</a:t>
             </a:r>
+          </a:p>
+          <a:p>
+            <a:r>
+              <a:rPr lang="en-US" dirty="0" smtClean="0"/>
+              <a:t>Absolutely, positively not a substitute for proper backups!</a:t>
+            </a:r>
             <a:endParaRPr lang="en-US" dirty="0"/>
           </a:p>
         </p:txBody>
@@ -6461,12 +6468,8 @@
               <a:t>nullable</a:t>
             </a:r>
             <a:r>
-              <a:rPr lang="en-US" smtClean="0"/>
-              <a:t> </a:t>
-            </a:r>
-            <a:r>
               <a:rPr lang="en-US" dirty="0" smtClean="0"/>
-              <a:t>column to the source table</a:t>
+              <a:t> column to the source table</a:t>
             </a:r>
           </a:p>
           <a:p>
@@ -8076,9 +8079,10 @@
           <a:lstStyle/>
           <a:p>
             <a:r>
-              <a:rPr lang="en-US" dirty="0"/>
+              <a:rPr lang="en-US" dirty="0" smtClean="0"/>
               <a:t>Partitioning</a:t>
             </a:r>
+            <a:endParaRPr lang="en-US" dirty="0"/>
           </a:p>
         </p:txBody>
       </p:sp>
@@ -8098,8 +8102,40 @@
           <a:lstStyle/>
           <a:p>
             <a:r>
-              <a:rPr lang="en-US" dirty="0"/>
-              <a:t>Combine with temporal tables to enable quick archival capability</a:t>
+              <a:rPr lang="en-US" dirty="0" smtClean="0"/>
+              <a:t>Spread table data across multiple B-trees</a:t>
+            </a:r>
+          </a:p>
+          <a:p>
+            <a:r>
+              <a:rPr lang="en-US" dirty="0" smtClean="0"/>
+              <a:t>For example, place older data on slower, cheaper storage</a:t>
+            </a:r>
+          </a:p>
+          <a:p>
+            <a:r>
+              <a:rPr lang="en-US" dirty="0" smtClean="0"/>
+              <a:t>Usually for very large data sets, but has other purposes</a:t>
+            </a:r>
+          </a:p>
+          <a:p>
+            <a:r>
+              <a:rPr lang="en-US" dirty="0" smtClean="0"/>
+              <a:t>Separation defined by a “partitioning function”</a:t>
+            </a:r>
+          </a:p>
+          <a:p>
+            <a:pPr lvl="1"/>
+            <a:r>
+              <a:rPr lang="en-US" dirty="0" smtClean="0"/>
+              <a:t>Range LEFT (think of as &gt;=)</a:t>
+            </a:r>
+          </a:p>
+          <a:p>
+            <a:pPr lvl="1"/>
+            <a:r>
+              <a:rPr lang="en-US" dirty="0" smtClean="0"/>
+              <a:t>Range RIGHT (think of as &lt;)</a:t>
             </a:r>
           </a:p>
         </p:txBody>
@@ -8107,7 +8143,7 @@
     </p:spTree>
     <p:extLst>
       <p:ext uri="{BB962C8B-B14F-4D97-AF65-F5344CB8AC3E}">
-        <p14:creationId xmlns:p14="http://schemas.microsoft.com/office/powerpoint/2010/main" val="1885707255"/>
+        <p14:creationId xmlns:p14="http://schemas.microsoft.com/office/powerpoint/2010/main" val="1770415838"/>
       </p:ext>
     </p:extLst>
   </p:cSld>
@@ -8151,6 +8187,80 @@
           <a:p>
             <a:r>
               <a:rPr lang="en-US" dirty="0"/>
+              <a:t>Partitioning</a:t>
+            </a:r>
+          </a:p>
+        </p:txBody>
+      </p:sp>
+      <p:sp>
+        <p:nvSpPr>
+          <p:cNvPr id="3" name="Content Placeholder 2"/>
+          <p:cNvSpPr>
+            <a:spLocks noGrp="1"/>
+          </p:cNvSpPr>
+          <p:nvPr>
+            <p:ph idx="1"/>
+          </p:nvPr>
+        </p:nvSpPr>
+        <p:spPr/>
+        <p:txBody>
+          <a:bodyPr/>
+          <a:lstStyle/>
+          <a:p>
+            <a:r>
+              <a:rPr lang="en-US" dirty="0"/>
+              <a:t>Combine with temporal tables to enable quick archival capability</a:t>
+            </a:r>
+          </a:p>
+        </p:txBody>
+      </p:sp>
+    </p:spTree>
+    <p:extLst>
+      <p:ext uri="{BB962C8B-B14F-4D97-AF65-F5344CB8AC3E}">
+        <p14:creationId xmlns:p14="http://schemas.microsoft.com/office/powerpoint/2010/main" val="1885707255"/>
+      </p:ext>
+    </p:extLst>
+  </p:cSld>
+  <p:clrMapOvr>
+    <a:masterClrMapping/>
+  </p:clrMapOvr>
+</p:sld>
+</file>
+
+<file path=ppt/slides/slide24.xml><?xml version="1.0" encoding="utf-8"?>
+<p:sld xmlns:a="http://schemas.openxmlformats.org/drawingml/2006/main" xmlns:r="http://schemas.openxmlformats.org/officeDocument/2006/relationships" xmlns:p="http://schemas.openxmlformats.org/presentationml/2006/main">
+  <p:cSld>
+    <p:spTree>
+      <p:nvGrpSpPr>
+        <p:cNvPr id="1" name=""/>
+        <p:cNvGrpSpPr/>
+        <p:nvPr/>
+      </p:nvGrpSpPr>
+      <p:grpSpPr>
+        <a:xfrm>
+          <a:off x="0" y="0"/>
+          <a:ext cx="0" cy="0"/>
+          <a:chOff x="0" y="0"/>
+          <a:chExt cx="0" cy="0"/>
+        </a:xfrm>
+      </p:grpSpPr>
+      <p:sp>
+        <p:nvSpPr>
+          <p:cNvPr id="2" name="Title 1"/>
+          <p:cNvSpPr>
+            <a:spLocks noGrp="1"/>
+          </p:cNvSpPr>
+          <p:nvPr>
+            <p:ph type="title"/>
+          </p:nvPr>
+        </p:nvSpPr>
+        <p:spPr/>
+        <p:txBody>
+          <a:bodyPr/>
+          <a:lstStyle/>
+          <a:p>
+            <a:r>
+              <a:rPr lang="en-US" dirty="0"/>
               <a:t>SQL Server Features</a:t>
             </a:r>
             <a:br>
@@ -8285,7 +8395,7 @@
 </p:sld>
 </file>
 
-<file path=ppt/slides/slide24.xml><?xml version="1.0" encoding="utf-8"?>
+<file path=ppt/slides/slide25.xml><?xml version="1.0" encoding="utf-8"?>
 <p:sld xmlns:a="http://schemas.openxmlformats.org/drawingml/2006/main" xmlns:r="http://schemas.openxmlformats.org/officeDocument/2006/relationships" xmlns:p="http://schemas.openxmlformats.org/presentationml/2006/main">
   <p:cSld>
     <p:spTree>

</xml_diff>

<commit_message>
New slide on cumulative updates.
</commit_message>
<xml_diff>
--- a/AwesomeFreeSQLServerFeatures.pptx
+++ b/AwesomeFreeSQLServerFeatures.pptx
@@ -5,7 +5,7 @@
     <p:sldMasterId id="2147483648" r:id="rId1"/>
   </p:sldMasterIdLst>
   <p:notesMasterIdLst>
-    <p:notesMasterId r:id="rId27"/>
+    <p:notesMasterId r:id="rId29"/>
   </p:notesMasterIdLst>
   <p:sldIdLst>
     <p:sldId id="256" r:id="rId2"/>
@@ -13,26 +13,28 @@
     <p:sldId id="259" r:id="rId4"/>
     <p:sldId id="272" r:id="rId5"/>
     <p:sldId id="261" r:id="rId6"/>
-    <p:sldId id="262" r:id="rId7"/>
-    <p:sldId id="263" r:id="rId8"/>
-    <p:sldId id="277" r:id="rId9"/>
-    <p:sldId id="264" r:id="rId10"/>
-    <p:sldId id="273" r:id="rId11"/>
-    <p:sldId id="275" r:id="rId12"/>
-    <p:sldId id="274" r:id="rId13"/>
-    <p:sldId id="265" r:id="rId14"/>
-    <p:sldId id="276" r:id="rId15"/>
-    <p:sldId id="278" r:id="rId16"/>
-    <p:sldId id="266" r:id="rId17"/>
-    <p:sldId id="279" r:id="rId18"/>
-    <p:sldId id="280" r:id="rId19"/>
-    <p:sldId id="281" r:id="rId20"/>
-    <p:sldId id="267" r:id="rId21"/>
-    <p:sldId id="268" r:id="rId22"/>
-    <p:sldId id="282" r:id="rId23"/>
-    <p:sldId id="271" r:id="rId24"/>
-    <p:sldId id="270" r:id="rId25"/>
-    <p:sldId id="258" r:id="rId26"/>
+    <p:sldId id="284" r:id="rId7"/>
+    <p:sldId id="262" r:id="rId8"/>
+    <p:sldId id="263" r:id="rId9"/>
+    <p:sldId id="277" r:id="rId10"/>
+    <p:sldId id="264" r:id="rId11"/>
+    <p:sldId id="273" r:id="rId12"/>
+    <p:sldId id="275" r:id="rId13"/>
+    <p:sldId id="274" r:id="rId14"/>
+    <p:sldId id="265" r:id="rId15"/>
+    <p:sldId id="276" r:id="rId16"/>
+    <p:sldId id="278" r:id="rId17"/>
+    <p:sldId id="266" r:id="rId18"/>
+    <p:sldId id="279" r:id="rId19"/>
+    <p:sldId id="280" r:id="rId20"/>
+    <p:sldId id="283" r:id="rId21"/>
+    <p:sldId id="281" r:id="rId22"/>
+    <p:sldId id="267" r:id="rId23"/>
+    <p:sldId id="268" r:id="rId24"/>
+    <p:sldId id="282" r:id="rId25"/>
+    <p:sldId id="271" r:id="rId26"/>
+    <p:sldId id="270" r:id="rId27"/>
+    <p:sldId id="258" r:id="rId28"/>
   </p:sldIdLst>
   <p:sldSz cx="12192000" cy="6858000"/>
   <p:notesSz cx="6858000" cy="9144000"/>
@@ -855,7 +857,7 @@
           <a:p>
             <a:fld id="{8B5705F6-219D-4122-80FA-D82FBBCA0869}" type="slidenum">
               <a:rPr lang="en-US" smtClean="0"/>
-              <a:t>7</a:t>
+              <a:t>8</a:t>
             </a:fld>
             <a:endParaRPr lang="en-US"/>
           </a:p>
@@ -947,7 +949,7 @@
           <a:p>
             <a:fld id="{8B5705F6-219D-4122-80FA-D82FBBCA0869}" type="slidenum">
               <a:rPr lang="en-US" smtClean="0"/>
-              <a:t>10</a:t>
+              <a:t>11</a:t>
             </a:fld>
             <a:endParaRPr lang="en-US"/>
           </a:p>
@@ -1046,7 +1048,7 @@
           <a:p>
             <a:fld id="{8B5705F6-219D-4122-80FA-D82FBBCA0869}" type="slidenum">
               <a:rPr lang="en-US" smtClean="0"/>
-              <a:t>12</a:t>
+              <a:t>13</a:t>
             </a:fld>
             <a:endParaRPr lang="en-US"/>
           </a:p>
@@ -5155,6 +5157,166 @@
           <a:lstStyle/>
           <a:p>
             <a:r>
+              <a:rPr lang="en-US" dirty="0"/>
+              <a:t>SQL Server Features</a:t>
+            </a:r>
+            <a:br>
+              <a:rPr lang="en-US" dirty="0"/>
+            </a:br>
+            <a:r>
+              <a:rPr lang="en-US" dirty="0"/>
+              <a:t>(Speed Dating)</a:t>
+            </a:r>
+          </a:p>
+        </p:txBody>
+      </p:sp>
+      <p:sp>
+        <p:nvSpPr>
+          <p:cNvPr id="3" name="Content Placeholder 2"/>
+          <p:cNvSpPr>
+            <a:spLocks noGrp="1"/>
+          </p:cNvSpPr>
+          <p:nvPr>
+            <p:ph idx="1"/>
+          </p:nvPr>
+        </p:nvSpPr>
+        <p:spPr/>
+        <p:txBody>
+          <a:bodyPr>
+            <a:normAutofit lnSpcReduction="10000"/>
+          </a:bodyPr>
+          <a:lstStyle/>
+          <a:p>
+            <a:r>
+              <a:rPr lang="en-US" dirty="0"/>
+              <a:t>Security</a:t>
+            </a:r>
+          </a:p>
+          <a:p>
+            <a:pPr lvl="1"/>
+            <a:r>
+              <a:rPr lang="en-US" dirty="0"/>
+              <a:t>Row-Level Security</a:t>
+            </a:r>
+          </a:p>
+          <a:p>
+            <a:pPr lvl="1"/>
+            <a:r>
+              <a:rPr lang="en-US" dirty="0">
+                <a:solidFill>
+                  <a:srgbClr val="FF0000"/>
+                </a:solidFill>
+              </a:rPr>
+              <a:t>Always Encrypted</a:t>
+            </a:r>
+          </a:p>
+          <a:p>
+            <a:r>
+              <a:rPr lang="en-US" dirty="0"/>
+              <a:t>Utility</a:t>
+            </a:r>
+          </a:p>
+          <a:p>
+            <a:pPr lvl="1"/>
+            <a:r>
+              <a:rPr lang="en-US" dirty="0"/>
+              <a:t>Snapshots</a:t>
+            </a:r>
+          </a:p>
+          <a:p>
+            <a:pPr lvl="1"/>
+            <a:r>
+              <a:rPr lang="en-US" dirty="0"/>
+              <a:t>Temporal Tables</a:t>
+            </a:r>
+          </a:p>
+          <a:p>
+            <a:r>
+              <a:rPr lang="en-US" dirty="0"/>
+              <a:t>Performance</a:t>
+            </a:r>
+          </a:p>
+          <a:p>
+            <a:pPr lvl="1"/>
+            <a:r>
+              <a:rPr lang="en-US" dirty="0" err="1"/>
+              <a:t>Columnstore</a:t>
+            </a:r>
+            <a:r>
+              <a:rPr lang="en-US" dirty="0"/>
+              <a:t> Indexes</a:t>
+            </a:r>
+          </a:p>
+          <a:p>
+            <a:pPr lvl="1"/>
+            <a:r>
+              <a:rPr lang="en-US" dirty="0"/>
+              <a:t>Partitioning</a:t>
+            </a:r>
+          </a:p>
+          <a:p>
+            <a:pPr lvl="1"/>
+            <a:r>
+              <a:rPr lang="en-US" dirty="0"/>
+              <a:t>In-Memory OLTP (</a:t>
+            </a:r>
+            <a:r>
+              <a:rPr lang="en-US" dirty="0" err="1"/>
+              <a:t>Hekaton</a:t>
+            </a:r>
+            <a:r>
+              <a:rPr lang="en-US" dirty="0"/>
+              <a:t>)</a:t>
+            </a:r>
+          </a:p>
+        </p:txBody>
+      </p:sp>
+    </p:spTree>
+    <p:extLst>
+      <p:ext uri="{BB962C8B-B14F-4D97-AF65-F5344CB8AC3E}">
+        <p14:creationId xmlns:p14="http://schemas.microsoft.com/office/powerpoint/2010/main" val="1882898498"/>
+      </p:ext>
+    </p:extLst>
+  </p:cSld>
+  <p:clrMapOvr>
+    <a:masterClrMapping/>
+  </p:clrMapOvr>
+</p:sld>
+</file>
+
+<file path=ppt/slides/slide11.xml><?xml version="1.0" encoding="utf-8"?>
+<p:sld xmlns:a="http://schemas.openxmlformats.org/drawingml/2006/main" xmlns:r="http://schemas.openxmlformats.org/officeDocument/2006/relationships" xmlns:p="http://schemas.openxmlformats.org/presentationml/2006/main">
+  <p:cSld>
+    <p:spTree>
+      <p:nvGrpSpPr>
+        <p:cNvPr id="1" name=""/>
+        <p:cNvGrpSpPr/>
+        <p:nvPr/>
+      </p:nvGrpSpPr>
+      <p:grpSpPr>
+        <a:xfrm>
+          <a:off x="0" y="0"/>
+          <a:ext cx="0" cy="0"/>
+          <a:chOff x="0" y="0"/>
+          <a:chExt cx="0" cy="0"/>
+        </a:xfrm>
+      </p:grpSpPr>
+      <p:sp>
+        <p:nvSpPr>
+          <p:cNvPr id="2" name="Title 1"/>
+          <p:cNvSpPr>
+            <a:spLocks noGrp="1"/>
+          </p:cNvSpPr>
+          <p:nvPr>
+            <p:ph type="title"/>
+          </p:nvPr>
+        </p:nvSpPr>
+        <p:spPr/>
+        <p:txBody>
+          <a:bodyPr/>
+          <a:lstStyle/>
+          <a:p>
+            <a:r>
               <a:rPr lang="en-US" dirty="0" smtClean="0"/>
               <a:t>Always Encrypted</a:t>
             </a:r>
@@ -5278,7 +5440,7 @@
 </p:sld>
 </file>
 
-<file path=ppt/slides/slide11.xml><?xml version="1.0" encoding="utf-8"?>
+<file path=ppt/slides/slide12.xml><?xml version="1.0" encoding="utf-8"?>
 <p:sld xmlns:a="http://schemas.openxmlformats.org/drawingml/2006/main" xmlns:r="http://schemas.openxmlformats.org/officeDocument/2006/relationships" xmlns:p="http://schemas.openxmlformats.org/presentationml/2006/main">
   <p:cSld>
     <p:spTree>
@@ -5355,100 +5517,6 @@
 </p:sld>
 </file>
 
-<file path=ppt/slides/slide12.xml><?xml version="1.0" encoding="utf-8"?>
-<p:sld xmlns:a="http://schemas.openxmlformats.org/drawingml/2006/main" xmlns:r="http://schemas.openxmlformats.org/officeDocument/2006/relationships" xmlns:p="http://schemas.openxmlformats.org/presentationml/2006/main">
-  <p:cSld>
-    <p:spTree>
-      <p:nvGrpSpPr>
-        <p:cNvPr id="1" name=""/>
-        <p:cNvGrpSpPr/>
-        <p:nvPr/>
-      </p:nvGrpSpPr>
-      <p:grpSpPr>
-        <a:xfrm>
-          <a:off x="0" y="0"/>
-          <a:ext cx="0" cy="0"/>
-          <a:chOff x="0" y="0"/>
-          <a:chExt cx="0" cy="0"/>
-        </a:xfrm>
-      </p:grpSpPr>
-      <p:sp>
-        <p:nvSpPr>
-          <p:cNvPr id="2" name="Title 1"/>
-          <p:cNvSpPr>
-            <a:spLocks noGrp="1"/>
-          </p:cNvSpPr>
-          <p:nvPr>
-            <p:ph type="title"/>
-          </p:nvPr>
-        </p:nvSpPr>
-        <p:spPr/>
-        <p:txBody>
-          <a:bodyPr/>
-          <a:lstStyle/>
-          <a:p>
-            <a:r>
-              <a:rPr lang="en-US" dirty="0" smtClean="0"/>
-              <a:t>Always Encrypted - Cons</a:t>
-            </a:r>
-            <a:endParaRPr lang="en-US" dirty="0"/>
-          </a:p>
-        </p:txBody>
-      </p:sp>
-      <p:sp>
-        <p:nvSpPr>
-          <p:cNvPr id="3" name="Content Placeholder 2"/>
-          <p:cNvSpPr>
-            <a:spLocks noGrp="1"/>
-          </p:cNvSpPr>
-          <p:nvPr>
-            <p:ph idx="1"/>
-          </p:nvPr>
-        </p:nvSpPr>
-        <p:spPr/>
-        <p:txBody>
-          <a:bodyPr/>
-          <a:lstStyle/>
-          <a:p>
-            <a:r>
-              <a:rPr lang="en-US" dirty="0" smtClean="0"/>
-              <a:t>Data size bloat, especially for smaller data types</a:t>
-            </a:r>
-          </a:p>
-          <a:p>
-            <a:r>
-              <a:rPr lang="en-US" dirty="0" smtClean="0"/>
-              <a:t>Adds considerable difficulty troubleshooting in tools like SSMS</a:t>
-            </a:r>
-          </a:p>
-          <a:p>
-            <a:r>
-              <a:rPr lang="en-US" dirty="0" smtClean="0"/>
-              <a:t>String columns must have a BIN collation – they won’t sort by traditional SQL rules</a:t>
-            </a:r>
-          </a:p>
-          <a:p>
-            <a:r>
-              <a:rPr lang="en-US" dirty="0" smtClean="0"/>
-              <a:t>Extra round trips to determine metadata, retrieve keys</a:t>
-            </a:r>
-            <a:endParaRPr lang="en-US" dirty="0"/>
-          </a:p>
-        </p:txBody>
-      </p:sp>
-    </p:spTree>
-    <p:extLst>
-      <p:ext uri="{BB962C8B-B14F-4D97-AF65-F5344CB8AC3E}">
-        <p14:creationId xmlns:p14="http://schemas.microsoft.com/office/powerpoint/2010/main" val="3969599080"/>
-      </p:ext>
-    </p:extLst>
-  </p:cSld>
-  <p:clrMapOvr>
-    <a:masterClrMapping/>
-  </p:clrMapOvr>
-</p:sld>
-</file>
-
 <file path=ppt/slides/slide13.xml><?xml version="1.0" encoding="utf-8"?>
 <p:sld xmlns:a="http://schemas.openxmlformats.org/drawingml/2006/main" xmlns:r="http://schemas.openxmlformats.org/officeDocument/2006/relationships" xmlns:p="http://schemas.openxmlformats.org/presentationml/2006/main">
   <p:cSld>
@@ -5482,16 +5550,10 @@
           <a:lstStyle/>
           <a:p>
             <a:r>
-              <a:rPr lang="en-US" dirty="0"/>
-              <a:t>SQL Server Features</a:t>
-            </a:r>
-            <a:br>
-              <a:rPr lang="en-US" dirty="0"/>
-            </a:br>
-            <a:r>
-              <a:rPr lang="en-US" dirty="0"/>
-              <a:t>(Speed Dating)</a:t>
-            </a:r>
+              <a:rPr lang="en-US" dirty="0" smtClean="0"/>
+              <a:t>Always Encrypted - Cons</a:t>
+            </a:r>
+            <a:endParaRPr lang="en-US" dirty="0"/>
           </a:p>
         </p:txBody>
       </p:sp>
@@ -5507,99 +5569,39 @@
         </p:nvSpPr>
         <p:spPr/>
         <p:txBody>
-          <a:bodyPr>
-            <a:normAutofit lnSpcReduction="10000"/>
-          </a:bodyPr>
+          <a:bodyPr/>
           <a:lstStyle/>
           <a:p>
             <a:r>
-              <a:rPr lang="en-US" dirty="0"/>
-              <a:t>Security</a:t>
-            </a:r>
-          </a:p>
-          <a:p>
-            <a:pPr lvl="1"/>
-            <a:r>
-              <a:rPr lang="en-US" dirty="0"/>
-              <a:t>Row-Level Security</a:t>
-            </a:r>
-          </a:p>
-          <a:p>
-            <a:pPr lvl="1"/>
-            <a:r>
-              <a:rPr lang="en-US" dirty="0"/>
-              <a:t>Always Encrypted</a:t>
-            </a:r>
-          </a:p>
-          <a:p>
-            <a:r>
-              <a:rPr lang="en-US" dirty="0"/>
-              <a:t>Utility</a:t>
-            </a:r>
-          </a:p>
-          <a:p>
-            <a:pPr lvl="1"/>
-            <a:r>
-              <a:rPr lang="en-US" dirty="0">
-                <a:solidFill>
-                  <a:srgbClr val="FF0000"/>
-                </a:solidFill>
-              </a:rPr>
-              <a:t>Snapshots</a:t>
-            </a:r>
-          </a:p>
-          <a:p>
-            <a:pPr lvl="1"/>
-            <a:r>
-              <a:rPr lang="en-US" dirty="0"/>
-              <a:t>Temporal Tables</a:t>
-            </a:r>
-          </a:p>
-          <a:p>
-            <a:r>
-              <a:rPr lang="en-US" dirty="0"/>
-              <a:t>Performance</a:t>
-            </a:r>
-          </a:p>
-          <a:p>
-            <a:pPr lvl="1"/>
-            <a:r>
-              <a:rPr lang="en-US" dirty="0" err="1"/>
-              <a:t>Columnstore</a:t>
-            </a:r>
-            <a:r>
-              <a:rPr lang="en-US" dirty="0"/>
-              <a:t> Indexes</a:t>
-            </a:r>
-          </a:p>
-          <a:p>
-            <a:pPr lvl="1"/>
-            <a:r>
-              <a:rPr lang="en-US" dirty="0"/>
-              <a:t>Partitioning</a:t>
-            </a:r>
-          </a:p>
-          <a:p>
-            <a:pPr lvl="1"/>
-            <a:r>
-              <a:rPr lang="en-US" dirty="0"/>
-              <a:t>In-Memory OLTP (</a:t>
-            </a:r>
-            <a:r>
-              <a:rPr lang="en-US" dirty="0" err="1"/>
-              <a:t>Hekaton</a:t>
-            </a:r>
-            <a:r>
-              <a:rPr lang="en-US" dirty="0"/>
-              <a:t>)</a:t>
-            </a:r>
+              <a:rPr lang="en-US" dirty="0" smtClean="0"/>
+              <a:t>Data size bloat, especially for smaller data types</a:t>
+            </a:r>
+          </a:p>
+          <a:p>
+            <a:r>
+              <a:rPr lang="en-US" dirty="0" smtClean="0"/>
+              <a:t>Adds considerable difficulty troubleshooting in tools like SSMS</a:t>
+            </a:r>
+          </a:p>
+          <a:p>
+            <a:r>
+              <a:rPr lang="en-US" dirty="0" smtClean="0"/>
+              <a:t>String columns must have a BIN collation – they won’t sort by traditional SQL rules</a:t>
+            </a:r>
+          </a:p>
+          <a:p>
+            <a:r>
+              <a:rPr lang="en-US" dirty="0" smtClean="0"/>
+              <a:t>Extra round trips to determine metadata, retrieve keys</a:t>
+            </a:r>
+            <a:endParaRPr lang="en-US" dirty="0"/>
           </a:p>
         </p:txBody>
       </p:sp>
     </p:spTree>
     <p:extLst>
       <p:ext uri="{BB962C8B-B14F-4D97-AF65-F5344CB8AC3E}">
-        <p14:creationId xmlns:p14="http://schemas.microsoft.com/office/powerpoint/2010/main" val="329879923"/>
+        <p14:creationId xmlns:p14="http://schemas.microsoft.com/office/powerpoint/2010/main" val="3969599080"/>
       </p:ext>
     </p:extLst>
   </p:cSld>
@@ -5642,6 +5644,166 @@
           <a:lstStyle/>
           <a:p>
             <a:r>
+              <a:rPr lang="en-US" dirty="0"/>
+              <a:t>SQL Server Features</a:t>
+            </a:r>
+            <a:br>
+              <a:rPr lang="en-US" dirty="0"/>
+            </a:br>
+            <a:r>
+              <a:rPr lang="en-US" dirty="0"/>
+              <a:t>(Speed Dating)</a:t>
+            </a:r>
+          </a:p>
+        </p:txBody>
+      </p:sp>
+      <p:sp>
+        <p:nvSpPr>
+          <p:cNvPr id="3" name="Content Placeholder 2"/>
+          <p:cNvSpPr>
+            <a:spLocks noGrp="1"/>
+          </p:cNvSpPr>
+          <p:nvPr>
+            <p:ph idx="1"/>
+          </p:nvPr>
+        </p:nvSpPr>
+        <p:spPr/>
+        <p:txBody>
+          <a:bodyPr>
+            <a:normAutofit lnSpcReduction="10000"/>
+          </a:bodyPr>
+          <a:lstStyle/>
+          <a:p>
+            <a:r>
+              <a:rPr lang="en-US" dirty="0"/>
+              <a:t>Security</a:t>
+            </a:r>
+          </a:p>
+          <a:p>
+            <a:pPr lvl="1"/>
+            <a:r>
+              <a:rPr lang="en-US" dirty="0"/>
+              <a:t>Row-Level Security</a:t>
+            </a:r>
+          </a:p>
+          <a:p>
+            <a:pPr lvl="1"/>
+            <a:r>
+              <a:rPr lang="en-US" dirty="0"/>
+              <a:t>Always Encrypted</a:t>
+            </a:r>
+          </a:p>
+          <a:p>
+            <a:r>
+              <a:rPr lang="en-US" dirty="0"/>
+              <a:t>Utility</a:t>
+            </a:r>
+          </a:p>
+          <a:p>
+            <a:pPr lvl="1"/>
+            <a:r>
+              <a:rPr lang="en-US" dirty="0">
+                <a:solidFill>
+                  <a:srgbClr val="FF0000"/>
+                </a:solidFill>
+              </a:rPr>
+              <a:t>Snapshots</a:t>
+            </a:r>
+          </a:p>
+          <a:p>
+            <a:pPr lvl="1"/>
+            <a:r>
+              <a:rPr lang="en-US" dirty="0"/>
+              <a:t>Temporal Tables</a:t>
+            </a:r>
+          </a:p>
+          <a:p>
+            <a:r>
+              <a:rPr lang="en-US" dirty="0"/>
+              <a:t>Performance</a:t>
+            </a:r>
+          </a:p>
+          <a:p>
+            <a:pPr lvl="1"/>
+            <a:r>
+              <a:rPr lang="en-US" dirty="0" err="1"/>
+              <a:t>Columnstore</a:t>
+            </a:r>
+            <a:r>
+              <a:rPr lang="en-US" dirty="0"/>
+              <a:t> Indexes</a:t>
+            </a:r>
+          </a:p>
+          <a:p>
+            <a:pPr lvl="1"/>
+            <a:r>
+              <a:rPr lang="en-US" dirty="0"/>
+              <a:t>Partitioning</a:t>
+            </a:r>
+          </a:p>
+          <a:p>
+            <a:pPr lvl="1"/>
+            <a:r>
+              <a:rPr lang="en-US" dirty="0"/>
+              <a:t>In-Memory OLTP (</a:t>
+            </a:r>
+            <a:r>
+              <a:rPr lang="en-US" dirty="0" err="1"/>
+              <a:t>Hekaton</a:t>
+            </a:r>
+            <a:r>
+              <a:rPr lang="en-US" dirty="0"/>
+              <a:t>)</a:t>
+            </a:r>
+          </a:p>
+        </p:txBody>
+      </p:sp>
+    </p:spTree>
+    <p:extLst>
+      <p:ext uri="{BB962C8B-B14F-4D97-AF65-F5344CB8AC3E}">
+        <p14:creationId xmlns:p14="http://schemas.microsoft.com/office/powerpoint/2010/main" val="329879923"/>
+      </p:ext>
+    </p:extLst>
+  </p:cSld>
+  <p:clrMapOvr>
+    <a:masterClrMapping/>
+  </p:clrMapOvr>
+</p:sld>
+</file>
+
+<file path=ppt/slides/slide15.xml><?xml version="1.0" encoding="utf-8"?>
+<p:sld xmlns:a="http://schemas.openxmlformats.org/drawingml/2006/main" xmlns:r="http://schemas.openxmlformats.org/officeDocument/2006/relationships" xmlns:p="http://schemas.openxmlformats.org/presentationml/2006/main">
+  <p:cSld>
+    <p:spTree>
+      <p:nvGrpSpPr>
+        <p:cNvPr id="1" name=""/>
+        <p:cNvGrpSpPr/>
+        <p:nvPr/>
+      </p:nvGrpSpPr>
+      <p:grpSpPr>
+        <a:xfrm>
+          <a:off x="0" y="0"/>
+          <a:ext cx="0" cy="0"/>
+          <a:chOff x="0" y="0"/>
+          <a:chExt cx="0" cy="0"/>
+        </a:xfrm>
+      </p:grpSpPr>
+      <p:sp>
+        <p:nvSpPr>
+          <p:cNvPr id="2" name="Title 1"/>
+          <p:cNvSpPr>
+            <a:spLocks noGrp="1"/>
+          </p:cNvSpPr>
+          <p:nvPr>
+            <p:ph type="title"/>
+          </p:nvPr>
+        </p:nvSpPr>
+        <p:spPr/>
+        <p:txBody>
+          <a:bodyPr/>
+          <a:lstStyle/>
+          <a:p>
+            <a:r>
               <a:rPr lang="en-US" dirty="0" smtClean="0"/>
               <a:t>Snapshots</a:t>
             </a:r>
@@ -5737,7 +5899,7 @@
 </p:sld>
 </file>
 
-<file path=ppt/slides/slide15.xml><?xml version="1.0" encoding="utf-8"?>
+<file path=ppt/slides/slide16.xml><?xml version="1.0" encoding="utf-8"?>
 <p:sld xmlns:a="http://schemas.openxmlformats.org/drawingml/2006/main" xmlns:r="http://schemas.openxmlformats.org/officeDocument/2006/relationships" xmlns:p="http://schemas.openxmlformats.org/presentationml/2006/main">
   <p:cSld>
     <p:spTree>
@@ -5917,166 +6079,6 @@
 </p:sld>
 </file>
 
-<file path=ppt/slides/slide16.xml><?xml version="1.0" encoding="utf-8"?>
-<p:sld xmlns:a="http://schemas.openxmlformats.org/drawingml/2006/main" xmlns:r="http://schemas.openxmlformats.org/officeDocument/2006/relationships" xmlns:p="http://schemas.openxmlformats.org/presentationml/2006/main">
-  <p:cSld>
-    <p:spTree>
-      <p:nvGrpSpPr>
-        <p:cNvPr id="1" name=""/>
-        <p:cNvGrpSpPr/>
-        <p:nvPr/>
-      </p:nvGrpSpPr>
-      <p:grpSpPr>
-        <a:xfrm>
-          <a:off x="0" y="0"/>
-          <a:ext cx="0" cy="0"/>
-          <a:chOff x="0" y="0"/>
-          <a:chExt cx="0" cy="0"/>
-        </a:xfrm>
-      </p:grpSpPr>
-      <p:sp>
-        <p:nvSpPr>
-          <p:cNvPr id="2" name="Title 1"/>
-          <p:cNvSpPr>
-            <a:spLocks noGrp="1"/>
-          </p:cNvSpPr>
-          <p:nvPr>
-            <p:ph type="title"/>
-          </p:nvPr>
-        </p:nvSpPr>
-        <p:spPr/>
-        <p:txBody>
-          <a:bodyPr/>
-          <a:lstStyle/>
-          <a:p>
-            <a:r>
-              <a:rPr lang="en-US" dirty="0"/>
-              <a:t>SQL Server Features</a:t>
-            </a:r>
-            <a:br>
-              <a:rPr lang="en-US" dirty="0"/>
-            </a:br>
-            <a:r>
-              <a:rPr lang="en-US" dirty="0"/>
-              <a:t>(Speed Dating)</a:t>
-            </a:r>
-          </a:p>
-        </p:txBody>
-      </p:sp>
-      <p:sp>
-        <p:nvSpPr>
-          <p:cNvPr id="3" name="Content Placeholder 2"/>
-          <p:cNvSpPr>
-            <a:spLocks noGrp="1"/>
-          </p:cNvSpPr>
-          <p:nvPr>
-            <p:ph idx="1"/>
-          </p:nvPr>
-        </p:nvSpPr>
-        <p:spPr/>
-        <p:txBody>
-          <a:bodyPr>
-            <a:normAutofit lnSpcReduction="10000"/>
-          </a:bodyPr>
-          <a:lstStyle/>
-          <a:p>
-            <a:r>
-              <a:rPr lang="en-US" dirty="0"/>
-              <a:t>Security</a:t>
-            </a:r>
-          </a:p>
-          <a:p>
-            <a:pPr lvl="1"/>
-            <a:r>
-              <a:rPr lang="en-US" dirty="0"/>
-              <a:t>Row-Level Security</a:t>
-            </a:r>
-          </a:p>
-          <a:p>
-            <a:pPr lvl="1"/>
-            <a:r>
-              <a:rPr lang="en-US" dirty="0"/>
-              <a:t>Always Encrypted</a:t>
-            </a:r>
-          </a:p>
-          <a:p>
-            <a:r>
-              <a:rPr lang="en-US" dirty="0"/>
-              <a:t>Utility</a:t>
-            </a:r>
-          </a:p>
-          <a:p>
-            <a:pPr lvl="1"/>
-            <a:r>
-              <a:rPr lang="en-US" dirty="0"/>
-              <a:t>Snapshots</a:t>
-            </a:r>
-          </a:p>
-          <a:p>
-            <a:pPr lvl="1"/>
-            <a:r>
-              <a:rPr lang="en-US" dirty="0">
-                <a:solidFill>
-                  <a:srgbClr val="FF0000"/>
-                </a:solidFill>
-              </a:rPr>
-              <a:t>Temporal Tables</a:t>
-            </a:r>
-          </a:p>
-          <a:p>
-            <a:r>
-              <a:rPr lang="en-US" dirty="0"/>
-              <a:t>Performance</a:t>
-            </a:r>
-          </a:p>
-          <a:p>
-            <a:pPr lvl="1"/>
-            <a:r>
-              <a:rPr lang="en-US" dirty="0" err="1"/>
-              <a:t>Columnstore</a:t>
-            </a:r>
-            <a:r>
-              <a:rPr lang="en-US" dirty="0"/>
-              <a:t> Indexes</a:t>
-            </a:r>
-          </a:p>
-          <a:p>
-            <a:pPr lvl="1"/>
-            <a:r>
-              <a:rPr lang="en-US" dirty="0"/>
-              <a:t>Partitioning</a:t>
-            </a:r>
-          </a:p>
-          <a:p>
-            <a:pPr lvl="1"/>
-            <a:r>
-              <a:rPr lang="en-US" dirty="0"/>
-              <a:t>In-Memory OLTP (</a:t>
-            </a:r>
-            <a:r>
-              <a:rPr lang="en-US" dirty="0" err="1"/>
-              <a:t>Hekaton</a:t>
-            </a:r>
-            <a:r>
-              <a:rPr lang="en-US" dirty="0"/>
-              <a:t>)</a:t>
-            </a:r>
-          </a:p>
-        </p:txBody>
-      </p:sp>
-    </p:spTree>
-    <p:extLst>
-      <p:ext uri="{BB962C8B-B14F-4D97-AF65-F5344CB8AC3E}">
-        <p14:creationId xmlns:p14="http://schemas.microsoft.com/office/powerpoint/2010/main" val="85911061"/>
-      </p:ext>
-    </p:extLst>
-  </p:cSld>
-  <p:clrMapOvr>
-    <a:masterClrMapping/>
-  </p:clrMapOvr>
-</p:sld>
-</file>
-
 <file path=ppt/slides/slide17.xml><?xml version="1.0" encoding="utf-8"?>
 <p:sld xmlns:a="http://schemas.openxmlformats.org/drawingml/2006/main" xmlns:r="http://schemas.openxmlformats.org/officeDocument/2006/relationships" xmlns:p="http://schemas.openxmlformats.org/presentationml/2006/main">
   <p:cSld>
@@ -6110,6 +6112,166 @@
           <a:lstStyle/>
           <a:p>
             <a:r>
+              <a:rPr lang="en-US" dirty="0"/>
+              <a:t>SQL Server Features</a:t>
+            </a:r>
+            <a:br>
+              <a:rPr lang="en-US" dirty="0"/>
+            </a:br>
+            <a:r>
+              <a:rPr lang="en-US" dirty="0"/>
+              <a:t>(Speed Dating)</a:t>
+            </a:r>
+          </a:p>
+        </p:txBody>
+      </p:sp>
+      <p:sp>
+        <p:nvSpPr>
+          <p:cNvPr id="3" name="Content Placeholder 2"/>
+          <p:cNvSpPr>
+            <a:spLocks noGrp="1"/>
+          </p:cNvSpPr>
+          <p:nvPr>
+            <p:ph idx="1"/>
+          </p:nvPr>
+        </p:nvSpPr>
+        <p:spPr/>
+        <p:txBody>
+          <a:bodyPr>
+            <a:normAutofit lnSpcReduction="10000"/>
+          </a:bodyPr>
+          <a:lstStyle/>
+          <a:p>
+            <a:r>
+              <a:rPr lang="en-US" dirty="0"/>
+              <a:t>Security</a:t>
+            </a:r>
+          </a:p>
+          <a:p>
+            <a:pPr lvl="1"/>
+            <a:r>
+              <a:rPr lang="en-US" dirty="0"/>
+              <a:t>Row-Level Security</a:t>
+            </a:r>
+          </a:p>
+          <a:p>
+            <a:pPr lvl="1"/>
+            <a:r>
+              <a:rPr lang="en-US" dirty="0"/>
+              <a:t>Always Encrypted</a:t>
+            </a:r>
+          </a:p>
+          <a:p>
+            <a:r>
+              <a:rPr lang="en-US" dirty="0"/>
+              <a:t>Utility</a:t>
+            </a:r>
+          </a:p>
+          <a:p>
+            <a:pPr lvl="1"/>
+            <a:r>
+              <a:rPr lang="en-US" dirty="0"/>
+              <a:t>Snapshots</a:t>
+            </a:r>
+          </a:p>
+          <a:p>
+            <a:pPr lvl="1"/>
+            <a:r>
+              <a:rPr lang="en-US" dirty="0">
+                <a:solidFill>
+                  <a:srgbClr val="FF0000"/>
+                </a:solidFill>
+              </a:rPr>
+              <a:t>Temporal Tables</a:t>
+            </a:r>
+          </a:p>
+          <a:p>
+            <a:r>
+              <a:rPr lang="en-US" dirty="0"/>
+              <a:t>Performance</a:t>
+            </a:r>
+          </a:p>
+          <a:p>
+            <a:pPr lvl="1"/>
+            <a:r>
+              <a:rPr lang="en-US" dirty="0" err="1"/>
+              <a:t>Columnstore</a:t>
+            </a:r>
+            <a:r>
+              <a:rPr lang="en-US" dirty="0"/>
+              <a:t> Indexes</a:t>
+            </a:r>
+          </a:p>
+          <a:p>
+            <a:pPr lvl="1"/>
+            <a:r>
+              <a:rPr lang="en-US" dirty="0"/>
+              <a:t>Partitioning</a:t>
+            </a:r>
+          </a:p>
+          <a:p>
+            <a:pPr lvl="1"/>
+            <a:r>
+              <a:rPr lang="en-US" dirty="0"/>
+              <a:t>In-Memory OLTP (</a:t>
+            </a:r>
+            <a:r>
+              <a:rPr lang="en-US" dirty="0" err="1"/>
+              <a:t>Hekaton</a:t>
+            </a:r>
+            <a:r>
+              <a:rPr lang="en-US" dirty="0"/>
+              <a:t>)</a:t>
+            </a:r>
+          </a:p>
+        </p:txBody>
+      </p:sp>
+    </p:spTree>
+    <p:extLst>
+      <p:ext uri="{BB962C8B-B14F-4D97-AF65-F5344CB8AC3E}">
+        <p14:creationId xmlns:p14="http://schemas.microsoft.com/office/powerpoint/2010/main" val="85911061"/>
+      </p:ext>
+    </p:extLst>
+  </p:cSld>
+  <p:clrMapOvr>
+    <a:masterClrMapping/>
+  </p:clrMapOvr>
+</p:sld>
+</file>
+
+<file path=ppt/slides/slide18.xml><?xml version="1.0" encoding="utf-8"?>
+<p:sld xmlns:a="http://schemas.openxmlformats.org/drawingml/2006/main" xmlns:r="http://schemas.openxmlformats.org/officeDocument/2006/relationships" xmlns:p="http://schemas.openxmlformats.org/presentationml/2006/main">
+  <p:cSld>
+    <p:spTree>
+      <p:nvGrpSpPr>
+        <p:cNvPr id="1" name=""/>
+        <p:cNvGrpSpPr/>
+        <p:nvPr/>
+      </p:nvGrpSpPr>
+      <p:grpSpPr>
+        <a:xfrm>
+          <a:off x="0" y="0"/>
+          <a:ext cx="0" cy="0"/>
+          <a:chOff x="0" y="0"/>
+          <a:chExt cx="0" cy="0"/>
+        </a:xfrm>
+      </p:grpSpPr>
+      <p:sp>
+        <p:nvSpPr>
+          <p:cNvPr id="2" name="Title 1"/>
+          <p:cNvSpPr>
+            <a:spLocks noGrp="1"/>
+          </p:cNvSpPr>
+          <p:nvPr>
+            <p:ph type="title"/>
+          </p:nvPr>
+        </p:nvSpPr>
+        <p:spPr/>
+        <p:txBody>
+          <a:bodyPr/>
+          <a:lstStyle/>
+          <a:p>
+            <a:r>
               <a:rPr lang="en-US" dirty="0" smtClean="0"/>
               <a:t>Temporal Tables</a:t>
             </a:r>
@@ -6183,7 +6345,7 @@
 </p:sld>
 </file>
 
-<file path=ppt/slides/slide18.xml><?xml version="1.0" encoding="utf-8"?>
+<file path=ppt/slides/slide19.xml><?xml version="1.0" encoding="utf-8"?>
 <p:sld xmlns:a="http://schemas.openxmlformats.org/drawingml/2006/main" xmlns:r="http://schemas.openxmlformats.org/officeDocument/2006/relationships" xmlns:p="http://schemas.openxmlformats.org/presentationml/2006/main">
   <p:cSld>
     <p:spTree>
@@ -6354,138 +6516,6 @@
     <p:extLst>
       <p:ext uri="{BB962C8B-B14F-4D97-AF65-F5344CB8AC3E}">
         <p14:creationId xmlns:p14="http://schemas.microsoft.com/office/powerpoint/2010/main" val="3651628708"/>
-      </p:ext>
-    </p:extLst>
-  </p:cSld>
-  <p:clrMapOvr>
-    <a:masterClrMapping/>
-  </p:clrMapOvr>
-</p:sld>
-</file>
-
-<file path=ppt/slides/slide19.xml><?xml version="1.0" encoding="utf-8"?>
-<p:sld xmlns:a="http://schemas.openxmlformats.org/drawingml/2006/main" xmlns:r="http://schemas.openxmlformats.org/officeDocument/2006/relationships" xmlns:p="http://schemas.openxmlformats.org/presentationml/2006/main">
-  <p:cSld>
-    <p:spTree>
-      <p:nvGrpSpPr>
-        <p:cNvPr id="1" name=""/>
-        <p:cNvGrpSpPr/>
-        <p:nvPr/>
-      </p:nvGrpSpPr>
-      <p:grpSpPr>
-        <a:xfrm>
-          <a:off x="0" y="0"/>
-          <a:ext cx="0" cy="0"/>
-          <a:chOff x="0" y="0"/>
-          <a:chExt cx="0" cy="0"/>
-        </a:xfrm>
-      </p:grpSpPr>
-      <p:sp>
-        <p:nvSpPr>
-          <p:cNvPr id="2" name="Title 1"/>
-          <p:cNvSpPr>
-            <a:spLocks noGrp="1"/>
-          </p:cNvSpPr>
-          <p:nvPr>
-            <p:ph type="title"/>
-          </p:nvPr>
-        </p:nvSpPr>
-        <p:spPr/>
-        <p:txBody>
-          <a:bodyPr/>
-          <a:lstStyle/>
-          <a:p>
-            <a:r>
-              <a:rPr lang="en-US" dirty="0" smtClean="0"/>
-              <a:t>Temporal Tables</a:t>
-            </a:r>
-            <a:endParaRPr lang="en-US" dirty="0"/>
-          </a:p>
-        </p:txBody>
-      </p:sp>
-      <p:sp>
-        <p:nvSpPr>
-          <p:cNvPr id="3" name="Content Placeholder 2"/>
-          <p:cNvSpPr>
-            <a:spLocks noGrp="1"/>
-          </p:cNvSpPr>
-          <p:nvPr>
-            <p:ph idx="1"/>
-          </p:nvPr>
-        </p:nvSpPr>
-        <p:spPr/>
-        <p:txBody>
-          <a:bodyPr/>
-          <a:lstStyle/>
-          <a:p>
-            <a:r>
-              <a:rPr lang="en-US" dirty="0" smtClean="0"/>
-              <a:t>Performance</a:t>
-            </a:r>
-          </a:p>
-          <a:p>
-            <a:pPr lvl="1"/>
-            <a:r>
-              <a:rPr lang="en-US" dirty="0" smtClean="0"/>
-              <a:t>Insert operations – no difference than non-temporal tables</a:t>
-            </a:r>
-          </a:p>
-          <a:p>
-            <a:pPr lvl="1"/>
-            <a:r>
-              <a:rPr lang="en-US" dirty="0" smtClean="0"/>
-              <a:t>Update operations – overhead due to writes to both source and history tables</a:t>
-            </a:r>
-          </a:p>
-          <a:p>
-            <a:pPr lvl="1"/>
-            <a:r>
-              <a:rPr lang="en-US" dirty="0" smtClean="0"/>
-              <a:t>Read operations – Default clustered index on history table usually not helpful – consider changing it</a:t>
-            </a:r>
-          </a:p>
-          <a:p>
-            <a:r>
-              <a:rPr lang="en-US" dirty="0" smtClean="0"/>
-              <a:t>Beware of v1 limitations!</a:t>
-            </a:r>
-          </a:p>
-          <a:p>
-            <a:pPr lvl="1"/>
-            <a:r>
-              <a:rPr lang="en-US" dirty="0" smtClean="0"/>
-              <a:t>Dropping a column in the source table will drop the column in the history table – all history is lost!</a:t>
-            </a:r>
-          </a:p>
-          <a:p>
-            <a:pPr lvl="1"/>
-            <a:r>
-              <a:rPr lang="en-US" dirty="0" smtClean="0"/>
-              <a:t>Cannot add a non-</a:t>
-            </a:r>
-            <a:r>
-              <a:rPr lang="en-US" dirty="0" err="1" smtClean="0"/>
-              <a:t>nullable</a:t>
-            </a:r>
-            <a:r>
-              <a:rPr lang="en-US" dirty="0" smtClean="0"/>
-              <a:t> column to the source table</a:t>
-            </a:r>
-          </a:p>
-          <a:p>
-            <a:pPr lvl="1"/>
-            <a:r>
-              <a:rPr lang="en-US" dirty="0" smtClean="0"/>
-              <a:t>Pruning history is an offline operation</a:t>
-            </a:r>
-            <a:endParaRPr lang="en-US" dirty="0"/>
-          </a:p>
-        </p:txBody>
-      </p:sp>
-    </p:spTree>
-    <p:extLst>
-      <p:ext uri="{BB962C8B-B14F-4D97-AF65-F5344CB8AC3E}">
-        <p14:creationId xmlns:p14="http://schemas.microsoft.com/office/powerpoint/2010/main" val="2575860685"/>
       </p:ext>
     </p:extLst>
   </p:cSld>
@@ -7755,128 +7785,847 @@
           <a:lstStyle/>
           <a:p>
             <a:r>
-              <a:rPr lang="en-US" dirty="0"/>
-              <a:t>SQL Server Features</a:t>
-            </a:r>
-            <a:br>
-              <a:rPr lang="en-US" dirty="0"/>
-            </a:br>
-            <a:r>
-              <a:rPr lang="en-US" dirty="0"/>
-              <a:t>(Speed Dating)</a:t>
-            </a:r>
-          </a:p>
-        </p:txBody>
-      </p:sp>
-      <p:sp>
-        <p:nvSpPr>
-          <p:cNvPr id="3" name="Content Placeholder 2"/>
-          <p:cNvSpPr>
-            <a:spLocks noGrp="1"/>
-          </p:cNvSpPr>
-          <p:nvPr>
-            <p:ph idx="1"/>
-          </p:nvPr>
-        </p:nvSpPr>
-        <p:spPr/>
-        <p:txBody>
-          <a:bodyPr>
-            <a:normAutofit lnSpcReduction="10000"/>
-          </a:bodyPr>
-          <a:lstStyle/>
-          <a:p>
-            <a:r>
-              <a:rPr lang="en-US" dirty="0"/>
-              <a:t>Security</a:t>
-            </a:r>
-          </a:p>
-          <a:p>
-            <a:pPr lvl="1"/>
-            <a:r>
-              <a:rPr lang="en-US" dirty="0"/>
-              <a:t>Row-Level Security</a:t>
-            </a:r>
-          </a:p>
-          <a:p>
-            <a:pPr lvl="1"/>
-            <a:r>
-              <a:rPr lang="en-US" dirty="0"/>
-              <a:t>Always Encrypted</a:t>
-            </a:r>
-          </a:p>
-          <a:p>
-            <a:r>
-              <a:rPr lang="en-US" dirty="0"/>
-              <a:t>Utility</a:t>
-            </a:r>
-          </a:p>
-          <a:p>
-            <a:pPr lvl="1"/>
-            <a:r>
-              <a:rPr lang="en-US" dirty="0"/>
-              <a:t>Snapshots</a:t>
-            </a:r>
-          </a:p>
-          <a:p>
-            <a:pPr lvl="1"/>
-            <a:r>
-              <a:rPr lang="en-US" dirty="0"/>
+              <a:rPr lang="en-US" dirty="0" smtClean="0"/>
               <a:t>Temporal Tables</a:t>
             </a:r>
-          </a:p>
-          <a:p>
-            <a:r>
-              <a:rPr lang="en-US" dirty="0"/>
-              <a:t>Performance</a:t>
-            </a:r>
-          </a:p>
-          <a:p>
-            <a:pPr lvl="1"/>
-            <a:r>
-              <a:rPr lang="en-US" dirty="0" err="1">
-                <a:solidFill>
-                  <a:srgbClr val="FF0000"/>
-                </a:solidFill>
-              </a:rPr>
-              <a:t>Columnstore</a:t>
-            </a:r>
-            <a:r>
-              <a:rPr lang="en-US" dirty="0">
-                <a:solidFill>
-                  <a:srgbClr val="FF0000"/>
-                </a:solidFill>
-              </a:rPr>
-              <a:t> Indexes</a:t>
-            </a:r>
-          </a:p>
-          <a:p>
-            <a:pPr lvl="1"/>
-            <a:r>
-              <a:rPr lang="en-US" dirty="0"/>
-              <a:t>Partitioning</a:t>
-            </a:r>
-          </a:p>
-          <a:p>
-            <a:pPr lvl="1"/>
-            <a:r>
-              <a:rPr lang="en-US" dirty="0"/>
-              <a:t>In-Memory OLTP (</a:t>
-            </a:r>
-            <a:r>
-              <a:rPr lang="en-US" dirty="0" err="1"/>
-              <a:t>Hekaton</a:t>
-            </a:r>
-            <a:r>
-              <a:rPr lang="en-US" dirty="0"/>
-              <a:t>)</a:t>
-            </a:r>
-          </a:p>
-        </p:txBody>
-      </p:sp>
+            <a:endParaRPr lang="en-US" dirty="0"/>
+          </a:p>
+        </p:txBody>
+      </p:sp>
+      <p:graphicFrame>
+        <p:nvGraphicFramePr>
+          <p:cNvPr id="4" name="Table 3"/>
+          <p:cNvGraphicFramePr>
+            <a:graphicFrameLocks noGrp="1"/>
+          </p:cNvGraphicFramePr>
+          <p:nvPr>
+            <p:extLst>
+              <p:ext uri="{D42A27DB-BD31-4B8C-83A1-F6EECF244321}">
+                <p14:modId xmlns:p14="http://schemas.microsoft.com/office/powerpoint/2010/main" val="3299387513"/>
+              </p:ext>
+            </p:extLst>
+          </p:nvPr>
+        </p:nvGraphicFramePr>
+        <p:xfrm>
+          <a:off x="581190" y="2173185"/>
+          <a:ext cx="11029616" cy="3773535"/>
+        </p:xfrm>
+        <a:graphic>
+          <a:graphicData uri="http://schemas.openxmlformats.org/drawingml/2006/table">
+            <a:tbl>
+              <a:tblPr firstRow="1" bandRow="1">
+                <a:tableStyleId>{5C22544A-7EE6-4342-B048-85BDC9FD1C3A}</a:tableStyleId>
+              </a:tblPr>
+              <a:tblGrid>
+                <a:gridCol w="5514808">
+                  <a:extLst>
+                    <a:ext uri="{9D8B030D-6E8A-4147-A177-3AD203B41FA5}">
+                      <a16:colId xmlns:a16="http://schemas.microsoft.com/office/drawing/2014/main" val="2893081794"/>
+                    </a:ext>
+                  </a:extLst>
+                </a:gridCol>
+                <a:gridCol w="5514808">
+                  <a:extLst>
+                    <a:ext uri="{9D8B030D-6E8A-4147-A177-3AD203B41FA5}">
+                      <a16:colId xmlns:a16="http://schemas.microsoft.com/office/drawing/2014/main" val="353638004"/>
+                    </a:ext>
+                  </a:extLst>
+                </a:gridCol>
+              </a:tblGrid>
+              <a:tr h="526325">
+                <a:tc gridSpan="2">
+                  <a:txBody>
+                    <a:bodyPr/>
+                    <a:lstStyle/>
+                    <a:p>
+                      <a:pPr marL="0" marR="0" indent="0" algn="l" defTabSz="457200" rtl="0" eaLnBrk="1" fontAlgn="auto" latinLnBrk="0" hangingPunct="1">
+                        <a:lnSpc>
+                          <a:spcPct val="100000"/>
+                        </a:lnSpc>
+                        <a:spcBef>
+                          <a:spcPts val="0"/>
+                        </a:spcBef>
+                        <a:spcAft>
+                          <a:spcPts val="0"/>
+                        </a:spcAft>
+                        <a:buClrTx/>
+                        <a:buSzTx/>
+                        <a:buFontTx/>
+                        <a:buNone/>
+                        <a:tabLst/>
+                        <a:defRPr/>
+                      </a:pPr>
+                      <a:r>
+                        <a:rPr lang="en-US" dirty="0" smtClean="0"/>
+                        <a:t>Time querying:   </a:t>
+                      </a:r>
+                      <a:r>
+                        <a:rPr lang="en-US" dirty="0" smtClean="0">
+                          <a:solidFill>
+                            <a:srgbClr val="0000FF"/>
+                          </a:solidFill>
+                          <a:highlight>
+                            <a:srgbClr val="FFFFFF"/>
+                          </a:highlight>
+                          <a:latin typeface="Consolas" panose="020B0609020204030204" pitchFamily="49" charset="0"/>
+                        </a:rPr>
+                        <a:t>FROM</a:t>
+                      </a:r>
+                      <a:r>
+                        <a:rPr lang="en-US" dirty="0" smtClean="0">
+                          <a:solidFill>
+                            <a:srgbClr val="000000"/>
+                          </a:solidFill>
+                          <a:highlight>
+                            <a:srgbClr val="FFFFFF"/>
+                          </a:highlight>
+                          <a:latin typeface="Consolas" panose="020B0609020204030204" pitchFamily="49" charset="0"/>
+                        </a:rPr>
+                        <a:t> </a:t>
+                      </a:r>
+                      <a:r>
+                        <a:rPr lang="en-US" dirty="0" err="1" smtClean="0">
+                          <a:solidFill>
+                            <a:srgbClr val="000000"/>
+                          </a:solidFill>
+                          <a:highlight>
+                            <a:srgbClr val="FFFFFF"/>
+                          </a:highlight>
+                          <a:latin typeface="Consolas" panose="020B0609020204030204" pitchFamily="49" charset="0"/>
+                        </a:rPr>
+                        <a:t>TableName</a:t>
+                      </a:r>
+                      <a:r>
+                        <a:rPr lang="en-US" dirty="0" smtClean="0">
+                          <a:solidFill>
+                            <a:srgbClr val="000000"/>
+                          </a:solidFill>
+                          <a:highlight>
+                            <a:srgbClr val="FFFFFF"/>
+                          </a:highlight>
+                          <a:latin typeface="Consolas" panose="020B0609020204030204" pitchFamily="49" charset="0"/>
+                        </a:rPr>
+                        <a:t> </a:t>
+                      </a:r>
+                      <a:r>
+                        <a:rPr lang="en-US" dirty="0" smtClean="0">
+                          <a:solidFill>
+                            <a:srgbClr val="0000FF"/>
+                          </a:solidFill>
+                          <a:highlight>
+                            <a:srgbClr val="FFFFFF"/>
+                          </a:highlight>
+                          <a:latin typeface="Consolas" panose="020B0609020204030204" pitchFamily="49" charset="0"/>
+                        </a:rPr>
+                        <a:t>FOR</a:t>
+                      </a:r>
+                      <a:r>
+                        <a:rPr lang="en-US" dirty="0" smtClean="0">
+                          <a:solidFill>
+                            <a:srgbClr val="000000"/>
+                          </a:solidFill>
+                          <a:highlight>
+                            <a:srgbClr val="FFFFFF"/>
+                          </a:highlight>
+                          <a:latin typeface="Consolas" panose="020B0609020204030204" pitchFamily="49" charset="0"/>
+                        </a:rPr>
+                        <a:t> </a:t>
+                      </a:r>
+                      <a:r>
+                        <a:rPr lang="en-US" dirty="0" smtClean="0">
+                          <a:solidFill>
+                            <a:srgbClr val="0000FF"/>
+                          </a:solidFill>
+                          <a:highlight>
+                            <a:srgbClr val="FFFFFF"/>
+                          </a:highlight>
+                          <a:latin typeface="Consolas" panose="020B0609020204030204" pitchFamily="49" charset="0"/>
+                        </a:rPr>
+                        <a:t>SYSTEM</a:t>
+                      </a:r>
+                      <a:r>
+                        <a:rPr lang="en-US" dirty="0" smtClean="0">
+                          <a:solidFill>
+                            <a:srgbClr val="000000"/>
+                          </a:solidFill>
+                          <a:highlight>
+                            <a:srgbClr val="FFFFFF"/>
+                          </a:highlight>
+                          <a:latin typeface="Consolas" panose="020B0609020204030204" pitchFamily="49" charset="0"/>
+                        </a:rPr>
+                        <a:t>_</a:t>
+                      </a:r>
+                      <a:r>
+                        <a:rPr lang="en-US" dirty="0" smtClean="0">
+                          <a:solidFill>
+                            <a:srgbClr val="0000FF"/>
+                          </a:solidFill>
+                          <a:highlight>
+                            <a:srgbClr val="FFFFFF"/>
+                          </a:highlight>
+                          <a:latin typeface="Consolas" panose="020B0609020204030204" pitchFamily="49" charset="0"/>
+                        </a:rPr>
+                        <a:t>TIME</a:t>
+                      </a:r>
+                      <a:r>
+                        <a:rPr lang="en-US" dirty="0" smtClean="0">
+                          <a:solidFill>
+                            <a:srgbClr val="000000"/>
+                          </a:solidFill>
+                          <a:highlight>
+                            <a:srgbClr val="FFFFFF"/>
+                          </a:highlight>
+                          <a:latin typeface="Consolas" panose="020B0609020204030204" pitchFamily="49" charset="0"/>
+                        </a:rPr>
+                        <a:t> _____</a:t>
+                      </a:r>
+                    </a:p>
+                  </a:txBody>
+                  <a:tcPr/>
+                </a:tc>
+                <a:tc hMerge="1">
+                  <a:txBody>
+                    <a:bodyPr/>
+                    <a:lstStyle/>
+                    <a:p>
+                      <a:endParaRPr lang="en-US" dirty="0"/>
+                    </a:p>
+                  </a:txBody>
+                  <a:tcPr/>
+                </a:tc>
+                <a:extLst>
+                  <a:ext uri="{0D108BD9-81ED-4DB2-BD59-A6C34878D82A}">
+                    <a16:rowId xmlns:a16="http://schemas.microsoft.com/office/drawing/2014/main" val="2804491224"/>
+                  </a:ext>
+                </a:extLst>
+              </a:tr>
+              <a:tr h="526325">
+                <a:tc>
+                  <a:txBody>
+                    <a:bodyPr/>
+                    <a:lstStyle/>
+                    <a:p>
+                      <a:r>
+                        <a:rPr lang="en-US" dirty="0" smtClean="0"/>
+                        <a:t>Point in time</a:t>
+                      </a:r>
+                      <a:endParaRPr lang="en-US" dirty="0"/>
+                    </a:p>
+                  </a:txBody>
+                  <a:tcPr/>
+                </a:tc>
+                <a:tc>
+                  <a:txBody>
+                    <a:bodyPr/>
+                    <a:lstStyle/>
+                    <a:p>
+                      <a:r>
+                        <a:rPr lang="en-US" sz="1800" dirty="0" smtClean="0">
+                          <a:solidFill>
+                            <a:srgbClr val="0000FF"/>
+                          </a:solidFill>
+                          <a:highlight>
+                            <a:srgbClr val="FFFFFF"/>
+                          </a:highlight>
+                          <a:latin typeface="Consolas" panose="020B0609020204030204" pitchFamily="49" charset="0"/>
+                        </a:rPr>
+                        <a:t>AS</a:t>
+                      </a:r>
+                      <a:r>
+                        <a:rPr lang="en-US" sz="1800" dirty="0" smtClean="0">
+                          <a:solidFill>
+                            <a:srgbClr val="000000"/>
+                          </a:solidFill>
+                          <a:highlight>
+                            <a:srgbClr val="FFFFFF"/>
+                          </a:highlight>
+                          <a:latin typeface="Consolas" panose="020B0609020204030204" pitchFamily="49" charset="0"/>
+                        </a:rPr>
+                        <a:t> </a:t>
+                      </a:r>
+                      <a:r>
+                        <a:rPr lang="en-US" sz="1800" dirty="0" smtClean="0">
+                          <a:solidFill>
+                            <a:srgbClr val="0000FF"/>
+                          </a:solidFill>
+                          <a:highlight>
+                            <a:srgbClr val="FFFFFF"/>
+                          </a:highlight>
+                          <a:latin typeface="Consolas" panose="020B0609020204030204" pitchFamily="49" charset="0"/>
+                        </a:rPr>
+                        <a:t>OF</a:t>
+                      </a:r>
+                      <a:r>
+                        <a:rPr lang="en-US" sz="1800" dirty="0" smtClean="0">
+                          <a:solidFill>
+                            <a:srgbClr val="000000"/>
+                          </a:solidFill>
+                          <a:highlight>
+                            <a:srgbClr val="FFFFFF"/>
+                          </a:highlight>
+                          <a:latin typeface="Consolas" panose="020B0609020204030204" pitchFamily="49" charset="0"/>
+                        </a:rPr>
+                        <a:t> </a:t>
+                      </a:r>
+                      <a:r>
+                        <a:rPr lang="en-US" sz="1800" dirty="0" smtClean="0">
+                          <a:solidFill>
+                            <a:srgbClr val="FF0000"/>
+                          </a:solidFill>
+                          <a:highlight>
+                            <a:srgbClr val="FFFFFF"/>
+                          </a:highlight>
+                          <a:latin typeface="Consolas" panose="020B0609020204030204" pitchFamily="49" charset="0"/>
+                        </a:rPr>
+                        <a:t>'2017-02-06 11:30:00'</a:t>
+                      </a:r>
+                      <a:endParaRPr lang="en-US" dirty="0"/>
+                    </a:p>
+                  </a:txBody>
+                  <a:tcPr/>
+                </a:tc>
+                <a:extLst>
+                  <a:ext uri="{0D108BD9-81ED-4DB2-BD59-A6C34878D82A}">
+                    <a16:rowId xmlns:a16="http://schemas.microsoft.com/office/drawing/2014/main" val="2127768561"/>
+                  </a:ext>
+                </a:extLst>
+              </a:tr>
+              <a:tr h="526325">
+                <a:tc>
+                  <a:txBody>
+                    <a:bodyPr/>
+                    <a:lstStyle/>
+                    <a:p>
+                      <a:r>
+                        <a:rPr lang="en-US" dirty="0" smtClean="0"/>
+                        <a:t>Full history</a:t>
+                      </a:r>
+                      <a:endParaRPr lang="en-US" dirty="0"/>
+                    </a:p>
+                  </a:txBody>
+                  <a:tcPr/>
+                </a:tc>
+                <a:tc>
+                  <a:txBody>
+                    <a:bodyPr/>
+                    <a:lstStyle/>
+                    <a:p>
+                      <a:r>
+                        <a:rPr lang="en-US" dirty="0" smtClean="0">
+                          <a:solidFill>
+                            <a:srgbClr val="0000FF"/>
+                          </a:solidFill>
+                          <a:highlight>
+                            <a:srgbClr val="FFFFFF"/>
+                          </a:highlight>
+                          <a:latin typeface="Consolas" panose="020B0609020204030204" pitchFamily="49" charset="0"/>
+                        </a:rPr>
+                        <a:t>ALL</a:t>
+                      </a:r>
+                      <a:endParaRPr lang="en-US" dirty="0"/>
+                    </a:p>
+                  </a:txBody>
+                  <a:tcPr/>
+                </a:tc>
+                <a:extLst>
+                  <a:ext uri="{0D108BD9-81ED-4DB2-BD59-A6C34878D82A}">
+                    <a16:rowId xmlns:a16="http://schemas.microsoft.com/office/drawing/2014/main" val="1001698893"/>
+                  </a:ext>
+                </a:extLst>
+              </a:tr>
+              <a:tr h="526325">
+                <a:tc>
+                  <a:txBody>
+                    <a:bodyPr/>
+                    <a:lstStyle/>
+                    <a:p>
+                      <a:r>
+                        <a:rPr lang="en-US" dirty="0" smtClean="0"/>
+                        <a:t>Between (‘start’ &lt; </a:t>
+                      </a:r>
+                      <a:r>
+                        <a:rPr lang="en-US" dirty="0" err="1" smtClean="0"/>
+                        <a:t>EndTime</a:t>
+                      </a:r>
+                      <a:r>
+                        <a:rPr lang="en-US" dirty="0" smtClean="0"/>
+                        <a:t> AND ‘end’ &gt;= </a:t>
+                      </a:r>
+                      <a:r>
+                        <a:rPr lang="en-US" dirty="0" err="1" smtClean="0"/>
+                        <a:t>StartTime</a:t>
+                      </a:r>
+                      <a:r>
+                        <a:rPr lang="en-US" dirty="0" smtClean="0"/>
+                        <a:t>)</a:t>
+                      </a:r>
+                      <a:endParaRPr lang="en-US" dirty="0"/>
+                    </a:p>
+                  </a:txBody>
+                  <a:tcPr/>
+                </a:tc>
+                <a:tc>
+                  <a:txBody>
+                    <a:bodyPr/>
+                    <a:lstStyle/>
+                    <a:p>
+                      <a:r>
+                        <a:rPr lang="en-US" sz="1800" kern="1200" dirty="0" smtClean="0">
+                          <a:solidFill>
+                            <a:srgbClr val="0000FF"/>
+                          </a:solidFill>
+                          <a:highlight>
+                            <a:srgbClr val="FFFFFF"/>
+                          </a:highlight>
+                          <a:latin typeface="Consolas" panose="020B0609020204030204" pitchFamily="49" charset="0"/>
+                          <a:ea typeface="+mn-ea"/>
+                          <a:cs typeface="+mn-cs"/>
+                        </a:rPr>
+                        <a:t>BETWEEN</a:t>
+                      </a:r>
+                      <a:r>
+                        <a:rPr lang="en-US" sz="1800" dirty="0" smtClean="0">
+                          <a:solidFill>
+                            <a:srgbClr val="000000"/>
+                          </a:solidFill>
+                          <a:highlight>
+                            <a:srgbClr val="FFFFFF"/>
+                          </a:highlight>
+                          <a:latin typeface="Consolas" panose="020B0609020204030204" pitchFamily="49" charset="0"/>
+                        </a:rPr>
+                        <a:t> </a:t>
+                      </a:r>
+                      <a:r>
+                        <a:rPr lang="en-US" sz="1800" dirty="0" smtClean="0">
+                          <a:solidFill>
+                            <a:srgbClr val="FF0000"/>
+                          </a:solidFill>
+                          <a:highlight>
+                            <a:srgbClr val="FFFFFF"/>
+                          </a:highlight>
+                          <a:latin typeface="Consolas" panose="020B0609020204030204" pitchFamily="49" charset="0"/>
+                        </a:rPr>
+                        <a:t>'2017-01-11 18:55:04.4460000'</a:t>
+                      </a:r>
+                      <a:r>
+                        <a:rPr lang="en-US" sz="1800" dirty="0" smtClean="0">
+                          <a:solidFill>
+                            <a:srgbClr val="000000"/>
+                          </a:solidFill>
+                          <a:highlight>
+                            <a:srgbClr val="FFFFFF"/>
+                          </a:highlight>
+                          <a:latin typeface="Consolas" panose="020B0609020204030204" pitchFamily="49" charset="0"/>
+                        </a:rPr>
+                        <a:t> </a:t>
+                      </a:r>
+                      <a:r>
+                        <a:rPr lang="en-US" sz="1800" kern="1200" dirty="0" smtClean="0">
+                          <a:solidFill>
+                            <a:srgbClr val="0000FF"/>
+                          </a:solidFill>
+                          <a:highlight>
+                            <a:srgbClr val="FFFFFF"/>
+                          </a:highlight>
+                          <a:latin typeface="Consolas" panose="020B0609020204030204" pitchFamily="49" charset="0"/>
+                          <a:ea typeface="+mn-ea"/>
+                          <a:cs typeface="+mn-cs"/>
+                        </a:rPr>
+                        <a:t>AND</a:t>
+                      </a:r>
+                      <a:r>
+                        <a:rPr lang="en-US" sz="1800" dirty="0" smtClean="0">
+                          <a:solidFill>
+                            <a:srgbClr val="000000"/>
+                          </a:solidFill>
+                          <a:highlight>
+                            <a:srgbClr val="FFFFFF"/>
+                          </a:highlight>
+                          <a:latin typeface="Consolas" panose="020B0609020204030204" pitchFamily="49" charset="0"/>
+                        </a:rPr>
+                        <a:t> </a:t>
+                      </a:r>
+                      <a:r>
+                        <a:rPr lang="en-US" sz="1800" dirty="0" smtClean="0">
+                          <a:solidFill>
+                            <a:srgbClr val="FF0000"/>
+                          </a:solidFill>
+                          <a:highlight>
+                            <a:srgbClr val="FFFFFF"/>
+                          </a:highlight>
+                          <a:latin typeface="Consolas" panose="020B0609020204030204" pitchFamily="49" charset="0"/>
+                        </a:rPr>
+                        <a:t>'2017-05-06 11:30:00'</a:t>
+                      </a:r>
+                      <a:endParaRPr lang="en-US" dirty="0"/>
+                    </a:p>
+                  </a:txBody>
+                  <a:tcPr/>
+                </a:tc>
+                <a:extLst>
+                  <a:ext uri="{0D108BD9-81ED-4DB2-BD59-A6C34878D82A}">
+                    <a16:rowId xmlns:a16="http://schemas.microsoft.com/office/drawing/2014/main" val="2404271991"/>
+                  </a:ext>
+                </a:extLst>
+              </a:tr>
+              <a:tr h="526325">
+                <a:tc>
+                  <a:txBody>
+                    <a:bodyPr/>
+                    <a:lstStyle/>
+                    <a:p>
+                      <a:pPr marL="0" marR="0" indent="0" algn="l" defTabSz="457200" rtl="0" eaLnBrk="1" fontAlgn="auto" latinLnBrk="0" hangingPunct="1">
+                        <a:lnSpc>
+                          <a:spcPct val="100000"/>
+                        </a:lnSpc>
+                        <a:spcBef>
+                          <a:spcPts val="0"/>
+                        </a:spcBef>
+                        <a:spcAft>
+                          <a:spcPts val="0"/>
+                        </a:spcAft>
+                        <a:buClrTx/>
+                        <a:buSzTx/>
+                        <a:buFontTx/>
+                        <a:buNone/>
+                        <a:tabLst/>
+                        <a:defRPr/>
+                      </a:pPr>
+                      <a:r>
+                        <a:rPr lang="en-US" dirty="0" smtClean="0"/>
+                        <a:t>From </a:t>
+                      </a:r>
+                      <a:r>
+                        <a:rPr lang="en-US" dirty="0" smtClean="0"/>
+                        <a:t>(‘start’ &lt; </a:t>
+                      </a:r>
+                      <a:r>
+                        <a:rPr lang="en-US" dirty="0" err="1" smtClean="0"/>
+                        <a:t>EndTime</a:t>
+                      </a:r>
+                      <a:r>
+                        <a:rPr lang="en-US" dirty="0" smtClean="0"/>
+                        <a:t> AND ‘end’ &gt; </a:t>
+                      </a:r>
+                      <a:r>
+                        <a:rPr lang="en-US" dirty="0" err="1" smtClean="0"/>
+                        <a:t>StartTime</a:t>
+                      </a:r>
+                      <a:r>
+                        <a:rPr lang="en-US" dirty="0" smtClean="0"/>
+                        <a:t>)</a:t>
+                      </a:r>
+                    </a:p>
+                    <a:p>
+                      <a:endParaRPr lang="en-US" dirty="0"/>
+                    </a:p>
+                  </a:txBody>
+                  <a:tcPr/>
+                </a:tc>
+                <a:tc>
+                  <a:txBody>
+                    <a:bodyPr/>
+                    <a:lstStyle/>
+                    <a:p>
+                      <a:r>
+                        <a:rPr lang="en-US" sz="1800" dirty="0" smtClean="0">
+                          <a:solidFill>
+                            <a:srgbClr val="0000FF"/>
+                          </a:solidFill>
+                          <a:highlight>
+                            <a:srgbClr val="FFFFFF"/>
+                          </a:highlight>
+                          <a:latin typeface="Consolas" panose="020B0609020204030204" pitchFamily="49" charset="0"/>
+                        </a:rPr>
+                        <a:t>FROM</a:t>
+                      </a:r>
+                      <a:r>
+                        <a:rPr lang="en-US" sz="1800" dirty="0" smtClean="0">
+                          <a:solidFill>
+                            <a:srgbClr val="000000"/>
+                          </a:solidFill>
+                          <a:highlight>
+                            <a:srgbClr val="FFFFFF"/>
+                          </a:highlight>
+                          <a:latin typeface="Consolas" panose="020B0609020204030204" pitchFamily="49" charset="0"/>
+                        </a:rPr>
+                        <a:t> </a:t>
+                      </a:r>
+                      <a:r>
+                        <a:rPr lang="en-US" sz="1800" dirty="0" smtClean="0">
+                          <a:solidFill>
+                            <a:srgbClr val="FF0000"/>
+                          </a:solidFill>
+                          <a:highlight>
+                            <a:srgbClr val="FFFFFF"/>
+                          </a:highlight>
+                          <a:latin typeface="Consolas" panose="020B0609020204030204" pitchFamily="49" charset="0"/>
+                        </a:rPr>
+                        <a:t>'2017-01-11 18:55:04.4450000'</a:t>
+                      </a:r>
+                      <a:r>
+                        <a:rPr lang="en-US" sz="1800" dirty="0" smtClean="0">
+                          <a:solidFill>
+                            <a:srgbClr val="000000"/>
+                          </a:solidFill>
+                          <a:highlight>
+                            <a:srgbClr val="FFFFFF"/>
+                          </a:highlight>
+                          <a:latin typeface="Consolas" panose="020B0609020204030204" pitchFamily="49" charset="0"/>
+                        </a:rPr>
+                        <a:t> </a:t>
+                      </a:r>
+                      <a:r>
+                        <a:rPr lang="en-US" sz="1800" dirty="0" smtClean="0">
+                          <a:solidFill>
+                            <a:srgbClr val="0000FF"/>
+                          </a:solidFill>
+                          <a:highlight>
+                            <a:srgbClr val="FFFFFF"/>
+                          </a:highlight>
+                          <a:latin typeface="Consolas" panose="020B0609020204030204" pitchFamily="49" charset="0"/>
+                        </a:rPr>
+                        <a:t>TO</a:t>
+                      </a:r>
+                      <a:r>
+                        <a:rPr lang="en-US" sz="1800" dirty="0" smtClean="0">
+                          <a:solidFill>
+                            <a:srgbClr val="000000"/>
+                          </a:solidFill>
+                          <a:highlight>
+                            <a:srgbClr val="FFFFFF"/>
+                          </a:highlight>
+                          <a:latin typeface="Consolas" panose="020B0609020204030204" pitchFamily="49" charset="0"/>
+                        </a:rPr>
+                        <a:t> </a:t>
+                      </a:r>
+                      <a:r>
+                        <a:rPr lang="en-US" sz="1800" dirty="0" smtClean="0">
+                          <a:solidFill>
+                            <a:srgbClr val="FF0000"/>
+                          </a:solidFill>
+                          <a:highlight>
+                            <a:srgbClr val="FFFFFF"/>
+                          </a:highlight>
+                          <a:latin typeface="Consolas" panose="020B0609020204030204" pitchFamily="49" charset="0"/>
+                        </a:rPr>
+                        <a:t>'2017-05-06 11:30:00'</a:t>
+                      </a:r>
+                      <a:endParaRPr lang="en-US" dirty="0"/>
+                    </a:p>
+                  </a:txBody>
+                  <a:tcPr/>
+                </a:tc>
+                <a:extLst>
+                  <a:ext uri="{0D108BD9-81ED-4DB2-BD59-A6C34878D82A}">
+                    <a16:rowId xmlns:a16="http://schemas.microsoft.com/office/drawing/2014/main" val="671247449"/>
+                  </a:ext>
+                </a:extLst>
+              </a:tr>
+              <a:tr h="526325">
+                <a:tc>
+                  <a:txBody>
+                    <a:bodyPr/>
+                    <a:lstStyle/>
+                    <a:p>
+                      <a:pPr marL="0" marR="0" indent="0" algn="l" defTabSz="457200" rtl="0" eaLnBrk="1" fontAlgn="auto" latinLnBrk="0" hangingPunct="1">
+                        <a:lnSpc>
+                          <a:spcPct val="100000"/>
+                        </a:lnSpc>
+                        <a:spcBef>
+                          <a:spcPts val="0"/>
+                        </a:spcBef>
+                        <a:spcAft>
+                          <a:spcPts val="0"/>
+                        </a:spcAft>
+                        <a:buClrTx/>
+                        <a:buSzTx/>
+                        <a:buFontTx/>
+                        <a:buNone/>
+                        <a:tabLst/>
+                        <a:defRPr/>
+                      </a:pPr>
+                      <a:r>
+                        <a:rPr lang="en-US" dirty="0" smtClean="0"/>
+                        <a:t>Contained in </a:t>
+                      </a:r>
+                      <a:r>
+                        <a:rPr lang="en-US" dirty="0" smtClean="0"/>
+                        <a:t>(‘start’ &lt;= </a:t>
+                      </a:r>
+                      <a:r>
+                        <a:rPr lang="en-US" dirty="0" err="1" smtClean="0"/>
+                        <a:t>EndTime</a:t>
+                      </a:r>
+                      <a:r>
+                        <a:rPr lang="en-US" dirty="0" smtClean="0"/>
+                        <a:t> AND ‘end’ &gt;= </a:t>
+                      </a:r>
+                      <a:r>
+                        <a:rPr lang="en-US" dirty="0" err="1" smtClean="0"/>
+                        <a:t>StartTime</a:t>
+                      </a:r>
+                      <a:r>
+                        <a:rPr lang="en-US" dirty="0" smtClean="0"/>
+                        <a:t>)</a:t>
+                      </a:r>
+                    </a:p>
+                    <a:p>
+                      <a:endParaRPr lang="en-US" dirty="0"/>
+                    </a:p>
+                  </a:txBody>
+                  <a:tcPr/>
+                </a:tc>
+                <a:tc>
+                  <a:txBody>
+                    <a:bodyPr/>
+                    <a:lstStyle/>
+                    <a:p>
+                      <a:r>
+                        <a:rPr lang="en-US" sz="1800" kern="1200" dirty="0" smtClean="0">
+                          <a:solidFill>
+                            <a:srgbClr val="0000FF"/>
+                          </a:solidFill>
+                          <a:highlight>
+                            <a:srgbClr val="FFFFFF"/>
+                          </a:highlight>
+                          <a:latin typeface="Consolas" panose="020B0609020204030204" pitchFamily="49" charset="0"/>
+                          <a:ea typeface="+mn-ea"/>
+                          <a:cs typeface="+mn-cs"/>
+                        </a:rPr>
+                        <a:t>CONTAINED</a:t>
+                      </a:r>
+                      <a:r>
+                        <a:rPr lang="en-US" sz="1800" dirty="0" smtClean="0">
+                          <a:solidFill>
+                            <a:srgbClr val="000000"/>
+                          </a:solidFill>
+                          <a:highlight>
+                            <a:srgbClr val="FFFFFF"/>
+                          </a:highlight>
+                          <a:latin typeface="Consolas" panose="020B0609020204030204" pitchFamily="49" charset="0"/>
+                        </a:rPr>
+                        <a:t> </a:t>
+                      </a:r>
+                      <a:r>
+                        <a:rPr lang="en-US" sz="1800" kern="1200" dirty="0" smtClean="0">
+                          <a:solidFill>
+                            <a:srgbClr val="0000FF"/>
+                          </a:solidFill>
+                          <a:highlight>
+                            <a:srgbClr val="FFFFFF"/>
+                          </a:highlight>
+                          <a:latin typeface="Consolas" panose="020B0609020204030204" pitchFamily="49" charset="0"/>
+                          <a:ea typeface="+mn-ea"/>
+                          <a:cs typeface="+mn-cs"/>
+                        </a:rPr>
+                        <a:t>IN</a:t>
+                      </a:r>
+                      <a:r>
+                        <a:rPr lang="en-US" sz="1800" dirty="0" smtClean="0">
+                          <a:solidFill>
+                            <a:srgbClr val="0000FF"/>
+                          </a:solidFill>
+                          <a:highlight>
+                            <a:srgbClr val="FFFFFF"/>
+                          </a:highlight>
+                          <a:latin typeface="Consolas" panose="020B0609020204030204" pitchFamily="49" charset="0"/>
+                        </a:rPr>
+                        <a:t> </a:t>
+                      </a:r>
+                      <a:r>
+                        <a:rPr lang="en-US" sz="1800" dirty="0" smtClean="0">
+                          <a:solidFill>
+                            <a:srgbClr val="808080"/>
+                          </a:solidFill>
+                          <a:highlight>
+                            <a:srgbClr val="FFFFFF"/>
+                          </a:highlight>
+                          <a:latin typeface="Consolas" panose="020B0609020204030204" pitchFamily="49" charset="0"/>
+                        </a:rPr>
+                        <a:t>(</a:t>
+                      </a:r>
+                      <a:r>
+                        <a:rPr lang="en-US" sz="1800" dirty="0" smtClean="0">
+                          <a:solidFill>
+                            <a:srgbClr val="FF0000"/>
+                          </a:solidFill>
+                          <a:highlight>
+                            <a:srgbClr val="FFFFFF"/>
+                          </a:highlight>
+                          <a:latin typeface="Consolas" panose="020B0609020204030204" pitchFamily="49" charset="0"/>
+                        </a:rPr>
+                        <a:t>'2017-01-11 18:55:04.4450000'</a:t>
+                      </a:r>
+                      <a:r>
+                        <a:rPr lang="en-US" sz="1800" kern="1200" dirty="0" smtClean="0">
+                          <a:solidFill>
+                            <a:srgbClr val="0000FF"/>
+                          </a:solidFill>
+                          <a:highlight>
+                            <a:srgbClr val="FFFFFF"/>
+                          </a:highlight>
+                          <a:latin typeface="Consolas" panose="020B0609020204030204" pitchFamily="49" charset="0"/>
+                          <a:ea typeface="+mn-ea"/>
+                          <a:cs typeface="+mn-cs"/>
+                        </a:rPr>
+                        <a:t>,</a:t>
+                      </a:r>
+                      <a:r>
+                        <a:rPr lang="en-US" sz="1800" dirty="0" smtClean="0">
+                          <a:solidFill>
+                            <a:srgbClr val="000000"/>
+                          </a:solidFill>
+                          <a:highlight>
+                            <a:srgbClr val="FFFFFF"/>
+                          </a:highlight>
+                          <a:latin typeface="Consolas" panose="020B0609020204030204" pitchFamily="49" charset="0"/>
+                        </a:rPr>
+                        <a:t> </a:t>
+                      </a:r>
+                      <a:r>
+                        <a:rPr lang="en-US" sz="1800" dirty="0" smtClean="0">
+                          <a:solidFill>
+                            <a:srgbClr val="FF0000"/>
+                          </a:solidFill>
+                          <a:highlight>
+                            <a:srgbClr val="FFFFFF"/>
+                          </a:highlight>
+                          <a:latin typeface="Consolas" panose="020B0609020204030204" pitchFamily="49" charset="0"/>
+                        </a:rPr>
+                        <a:t>'2017-05-06 11:30:00'</a:t>
+                      </a:r>
+                      <a:r>
+                        <a:rPr lang="en-US" sz="1800" dirty="0" smtClean="0">
+                          <a:solidFill>
+                            <a:srgbClr val="808080"/>
+                          </a:solidFill>
+                          <a:highlight>
+                            <a:srgbClr val="FFFFFF"/>
+                          </a:highlight>
+                          <a:latin typeface="Consolas" panose="020B0609020204030204" pitchFamily="49" charset="0"/>
+                        </a:rPr>
+                        <a:t>)</a:t>
+                      </a:r>
+                      <a:endParaRPr lang="en-US" dirty="0"/>
+                    </a:p>
+                  </a:txBody>
+                  <a:tcPr/>
+                </a:tc>
+                <a:extLst>
+                  <a:ext uri="{0D108BD9-81ED-4DB2-BD59-A6C34878D82A}">
+                    <a16:rowId xmlns:a16="http://schemas.microsoft.com/office/drawing/2014/main" val="3036776198"/>
+                  </a:ext>
+                </a:extLst>
+              </a:tr>
+            </a:tbl>
+          </a:graphicData>
+        </a:graphic>
+      </p:graphicFrame>
     </p:spTree>
     <p:extLst>
       <p:ext uri="{BB962C8B-B14F-4D97-AF65-F5344CB8AC3E}">
-        <p14:creationId xmlns:p14="http://schemas.microsoft.com/office/powerpoint/2010/main" val="2331663206"/>
+        <p14:creationId xmlns:p14="http://schemas.microsoft.com/office/powerpoint/2010/main" val="1054756580"/>
       </p:ext>
     </p:extLst>
   </p:cSld>
@@ -7919,16 +8668,10 @@
           <a:lstStyle/>
           <a:p>
             <a:r>
-              <a:rPr lang="en-US" dirty="0"/>
-              <a:t>SQL Server Features</a:t>
-            </a:r>
-            <a:br>
-              <a:rPr lang="en-US" dirty="0"/>
-            </a:br>
-            <a:r>
-              <a:rPr lang="en-US" dirty="0"/>
-              <a:t>(Speed Dating)</a:t>
-            </a:r>
+              <a:rPr lang="en-US" dirty="0" smtClean="0"/>
+              <a:t>Temporal Tables</a:t>
+            </a:r>
+            <a:endParaRPr lang="en-US" dirty="0"/>
           </a:p>
         </p:txBody>
       </p:sp>
@@ -7944,99 +8687,77 @@
         </p:nvSpPr>
         <p:spPr/>
         <p:txBody>
-          <a:bodyPr>
-            <a:normAutofit lnSpcReduction="10000"/>
-          </a:bodyPr>
+          <a:bodyPr/>
           <a:lstStyle/>
           <a:p>
             <a:r>
-              <a:rPr lang="en-US" dirty="0"/>
-              <a:t>Security</a:t>
+              <a:rPr lang="en-US" dirty="0" smtClean="0"/>
+              <a:t>Performance</a:t>
             </a:r>
           </a:p>
           <a:p>
             <a:pPr lvl="1"/>
             <a:r>
-              <a:rPr lang="en-US" dirty="0"/>
-              <a:t>Row-Level Security</a:t>
+              <a:rPr lang="en-US" dirty="0" smtClean="0"/>
+              <a:t>Insert operations – no difference than non-temporal tables</a:t>
             </a:r>
           </a:p>
           <a:p>
             <a:pPr lvl="1"/>
             <a:r>
-              <a:rPr lang="en-US" dirty="0"/>
-              <a:t>Always Encrypted</a:t>
-            </a:r>
-          </a:p>
-          <a:p>
-            <a:r>
-              <a:rPr lang="en-US" dirty="0"/>
-              <a:t>Utility</a:t>
+              <a:rPr lang="en-US" dirty="0" smtClean="0"/>
+              <a:t>Update operations – overhead due to writes to both source and history tables</a:t>
             </a:r>
           </a:p>
           <a:p>
             <a:pPr lvl="1"/>
             <a:r>
-              <a:rPr lang="en-US" dirty="0"/>
-              <a:t>Snapshots</a:t>
+              <a:rPr lang="en-US" dirty="0" smtClean="0"/>
+              <a:t>Read operations – Default clustered index on history table usually not helpful – consider changing it</a:t>
+            </a:r>
+          </a:p>
+          <a:p>
+            <a:r>
+              <a:rPr lang="en-US" dirty="0" smtClean="0"/>
+              <a:t>Beware of v1 limitations!</a:t>
             </a:r>
           </a:p>
           <a:p>
             <a:pPr lvl="1"/>
             <a:r>
-              <a:rPr lang="en-US" dirty="0"/>
-              <a:t>Temporal Tables</a:t>
-            </a:r>
-          </a:p>
-          <a:p>
-            <a:r>
-              <a:rPr lang="en-US" dirty="0"/>
-              <a:t>Performance</a:t>
+              <a:rPr lang="en-US" dirty="0" smtClean="0"/>
+              <a:t>Dropping a column in the source table will drop the column in the history table – all history is lost!</a:t>
             </a:r>
           </a:p>
           <a:p>
             <a:pPr lvl="1"/>
             <a:r>
-              <a:rPr lang="en-US" dirty="0" err="1"/>
-              <a:t>Columnstore</a:t>
-            </a:r>
-            <a:r>
-              <a:rPr lang="en-US" dirty="0"/>
-              <a:t> Indexes</a:t>
+              <a:rPr lang="en-US" dirty="0" smtClean="0"/>
+              <a:t>Cannot add a non-</a:t>
+            </a:r>
+            <a:r>
+              <a:rPr lang="en-US" dirty="0" err="1" smtClean="0"/>
+              <a:t>nullable</a:t>
+            </a:r>
+            <a:r>
+              <a:rPr lang="en-US" dirty="0" smtClean="0"/>
+              <a:t> column to the source table</a:t>
             </a:r>
           </a:p>
           <a:p>
             <a:pPr lvl="1"/>
             <a:r>
-              <a:rPr lang="en-US" dirty="0">
-                <a:solidFill>
-                  <a:srgbClr val="FF0000"/>
-                </a:solidFill>
-              </a:rPr>
-              <a:t>Partitioning</a:t>
-            </a:r>
-          </a:p>
-          <a:p>
-            <a:pPr lvl="1"/>
-            <a:r>
-              <a:rPr lang="en-US" dirty="0"/>
-              <a:t>In-Memory OLTP (</a:t>
-            </a:r>
-            <a:r>
-              <a:rPr lang="en-US" dirty="0" err="1"/>
-              <a:t>Hekaton</a:t>
-            </a:r>
-            <a:r>
-              <a:rPr lang="en-US" dirty="0"/>
-              <a:t>)</a:t>
-            </a:r>
+              <a:rPr lang="en-US" dirty="0" smtClean="0"/>
+              <a:t>Pruning history is an offline operation</a:t>
+            </a:r>
+            <a:endParaRPr lang="en-US" dirty="0"/>
           </a:p>
         </p:txBody>
       </p:sp>
     </p:spTree>
     <p:extLst>
       <p:ext uri="{BB962C8B-B14F-4D97-AF65-F5344CB8AC3E}">
-        <p14:creationId xmlns:p14="http://schemas.microsoft.com/office/powerpoint/2010/main" val="3961792109"/>
+        <p14:creationId xmlns:p14="http://schemas.microsoft.com/office/powerpoint/2010/main" val="2575860685"/>
       </p:ext>
     </p:extLst>
   </p:cSld>
@@ -8079,63 +8800,120 @@
           <a:lstStyle/>
           <a:p>
             <a:r>
-              <a:rPr lang="en-US" dirty="0" smtClean="0"/>
+              <a:rPr lang="en-US" dirty="0"/>
+              <a:t>SQL Server Features</a:t>
+            </a:r>
+            <a:br>
+              <a:rPr lang="en-US" dirty="0"/>
+            </a:br>
+            <a:r>
+              <a:rPr lang="en-US" dirty="0"/>
+              <a:t>(Speed Dating)</a:t>
+            </a:r>
+          </a:p>
+        </p:txBody>
+      </p:sp>
+      <p:sp>
+        <p:nvSpPr>
+          <p:cNvPr id="3" name="Content Placeholder 2"/>
+          <p:cNvSpPr>
+            <a:spLocks noGrp="1"/>
+          </p:cNvSpPr>
+          <p:nvPr>
+            <p:ph idx="1"/>
+          </p:nvPr>
+        </p:nvSpPr>
+        <p:spPr/>
+        <p:txBody>
+          <a:bodyPr>
+            <a:normAutofit lnSpcReduction="10000"/>
+          </a:bodyPr>
+          <a:lstStyle/>
+          <a:p>
+            <a:r>
+              <a:rPr lang="en-US" dirty="0"/>
+              <a:t>Security</a:t>
+            </a:r>
+          </a:p>
+          <a:p>
+            <a:pPr lvl="1"/>
+            <a:r>
+              <a:rPr lang="en-US" dirty="0"/>
+              <a:t>Row-Level Security</a:t>
+            </a:r>
+          </a:p>
+          <a:p>
+            <a:pPr lvl="1"/>
+            <a:r>
+              <a:rPr lang="en-US" dirty="0"/>
+              <a:t>Always Encrypted</a:t>
+            </a:r>
+          </a:p>
+          <a:p>
+            <a:r>
+              <a:rPr lang="en-US" dirty="0"/>
+              <a:t>Utility</a:t>
+            </a:r>
+          </a:p>
+          <a:p>
+            <a:pPr lvl="1"/>
+            <a:r>
+              <a:rPr lang="en-US" dirty="0"/>
+              <a:t>Snapshots</a:t>
+            </a:r>
+          </a:p>
+          <a:p>
+            <a:pPr lvl="1"/>
+            <a:r>
+              <a:rPr lang="en-US" dirty="0"/>
+              <a:t>Temporal Tables</a:t>
+            </a:r>
+          </a:p>
+          <a:p>
+            <a:r>
+              <a:rPr lang="en-US" dirty="0"/>
+              <a:t>Performance</a:t>
+            </a:r>
+          </a:p>
+          <a:p>
+            <a:pPr lvl="1"/>
+            <a:r>
+              <a:rPr lang="en-US" dirty="0" err="1">
+                <a:solidFill>
+                  <a:srgbClr val="FF0000"/>
+                </a:solidFill>
+              </a:rPr>
+              <a:t>Columnstore</a:t>
+            </a:r>
+            <a:r>
+              <a:rPr lang="en-US" dirty="0">
+                <a:solidFill>
+                  <a:srgbClr val="FF0000"/>
+                </a:solidFill>
+              </a:rPr>
+              <a:t> Indexes</a:t>
+            </a:r>
+          </a:p>
+          <a:p>
+            <a:pPr lvl="1"/>
+            <a:r>
+              <a:rPr lang="en-US" dirty="0"/>
               <a:t>Partitioning</a:t>
             </a:r>
-            <a:endParaRPr lang="en-US" dirty="0"/>
-          </a:p>
-        </p:txBody>
-      </p:sp>
-      <p:sp>
-        <p:nvSpPr>
-          <p:cNvPr id="3" name="Content Placeholder 2"/>
-          <p:cNvSpPr>
-            <a:spLocks noGrp="1"/>
-          </p:cNvSpPr>
-          <p:nvPr>
-            <p:ph idx="1"/>
-          </p:nvPr>
-        </p:nvSpPr>
-        <p:spPr/>
-        <p:txBody>
-          <a:bodyPr/>
-          <a:lstStyle/>
-          <a:p>
-            <a:r>
-              <a:rPr lang="en-US" dirty="0" smtClean="0"/>
-              <a:t>Spread table data across multiple B-trees</a:t>
-            </a:r>
-          </a:p>
-          <a:p>
-            <a:r>
-              <a:rPr lang="en-US" dirty="0" smtClean="0"/>
-              <a:t>For example, place older data on slower, cheaper storage</a:t>
-            </a:r>
-          </a:p>
-          <a:p>
-            <a:r>
-              <a:rPr lang="en-US" dirty="0" smtClean="0"/>
-              <a:t>Usually for very large data sets, but has other purposes</a:t>
-            </a:r>
-          </a:p>
-          <a:p>
-            <a:r>
-              <a:rPr lang="en-US" dirty="0" smtClean="0"/>
-              <a:t>Separation defined by a “partitioning function”</a:t>
-            </a:r>
           </a:p>
           <a:p>
             <a:pPr lvl="1"/>
             <a:r>
-              <a:rPr lang="en-US" dirty="0" smtClean="0"/>
-              <a:t>Range LEFT (think of as &gt;=)</a:t>
-            </a:r>
-          </a:p>
-          <a:p>
-            <a:pPr lvl="1"/>
-            <a:r>
-              <a:rPr lang="en-US" dirty="0" smtClean="0"/>
-              <a:t>Range RIGHT (think of as &lt;)</a:t>
+              <a:rPr lang="en-US" dirty="0"/>
+              <a:t>In-Memory OLTP (</a:t>
+            </a:r>
+            <a:r>
+              <a:rPr lang="en-US" dirty="0" err="1"/>
+              <a:t>Hekaton</a:t>
+            </a:r>
+            <a:r>
+              <a:rPr lang="en-US" dirty="0"/>
+              <a:t>)</a:t>
             </a:r>
           </a:p>
         </p:txBody>
@@ -8143,7 +8921,7 @@
     </p:spTree>
     <p:extLst>
       <p:ext uri="{BB962C8B-B14F-4D97-AF65-F5344CB8AC3E}">
-        <p14:creationId xmlns:p14="http://schemas.microsoft.com/office/powerpoint/2010/main" val="1770415838"/>
+        <p14:creationId xmlns:p14="http://schemas.microsoft.com/office/powerpoint/2010/main" val="2331663206"/>
       </p:ext>
     </p:extLst>
   </p:cSld>
@@ -8187,29 +8965,115 @@
           <a:p>
             <a:r>
               <a:rPr lang="en-US" dirty="0"/>
+              <a:t>SQL Server Features</a:t>
+            </a:r>
+            <a:br>
+              <a:rPr lang="en-US" dirty="0"/>
+            </a:br>
+            <a:r>
+              <a:rPr lang="en-US" dirty="0"/>
+              <a:t>(Speed Dating)</a:t>
+            </a:r>
+          </a:p>
+        </p:txBody>
+      </p:sp>
+      <p:sp>
+        <p:nvSpPr>
+          <p:cNvPr id="3" name="Content Placeholder 2"/>
+          <p:cNvSpPr>
+            <a:spLocks noGrp="1"/>
+          </p:cNvSpPr>
+          <p:nvPr>
+            <p:ph idx="1"/>
+          </p:nvPr>
+        </p:nvSpPr>
+        <p:spPr/>
+        <p:txBody>
+          <a:bodyPr>
+            <a:normAutofit lnSpcReduction="10000"/>
+          </a:bodyPr>
+          <a:lstStyle/>
+          <a:p>
+            <a:r>
+              <a:rPr lang="en-US" dirty="0"/>
+              <a:t>Security</a:t>
+            </a:r>
+          </a:p>
+          <a:p>
+            <a:pPr lvl="1"/>
+            <a:r>
+              <a:rPr lang="en-US" dirty="0"/>
+              <a:t>Row-Level Security</a:t>
+            </a:r>
+          </a:p>
+          <a:p>
+            <a:pPr lvl="1"/>
+            <a:r>
+              <a:rPr lang="en-US" dirty="0"/>
+              <a:t>Always Encrypted</a:t>
+            </a:r>
+          </a:p>
+          <a:p>
+            <a:r>
+              <a:rPr lang="en-US" dirty="0"/>
+              <a:t>Utility</a:t>
+            </a:r>
+          </a:p>
+          <a:p>
+            <a:pPr lvl="1"/>
+            <a:r>
+              <a:rPr lang="en-US" dirty="0"/>
+              <a:t>Snapshots</a:t>
+            </a:r>
+          </a:p>
+          <a:p>
+            <a:pPr lvl="1"/>
+            <a:r>
+              <a:rPr lang="en-US" dirty="0"/>
+              <a:t>Temporal Tables</a:t>
+            </a:r>
+          </a:p>
+          <a:p>
+            <a:r>
+              <a:rPr lang="en-US" dirty="0"/>
+              <a:t>Performance</a:t>
+            </a:r>
+          </a:p>
+          <a:p>
+            <a:pPr lvl="1"/>
+            <a:r>
+              <a:rPr lang="en-US" dirty="0" err="1"/>
+              <a:t>Columnstore</a:t>
+            </a:r>
+            <a:r>
+              <a:rPr lang="en-US" dirty="0"/>
+              <a:t> Indexes</a:t>
+            </a:r>
+          </a:p>
+          <a:p>
+            <a:pPr lvl="1"/>
+            <a:r>
+              <a:rPr lang="en-US" dirty="0">
+                <a:solidFill>
+                  <a:srgbClr val="FF0000"/>
+                </a:solidFill>
+              </a:rPr>
               <a:t>Partitioning</a:t>
             </a:r>
           </a:p>
-        </p:txBody>
-      </p:sp>
-      <p:sp>
-        <p:nvSpPr>
-          <p:cNvPr id="3" name="Content Placeholder 2"/>
-          <p:cNvSpPr>
-            <a:spLocks noGrp="1"/>
-          </p:cNvSpPr>
-          <p:nvPr>
-            <p:ph idx="1"/>
-          </p:nvPr>
-        </p:nvSpPr>
-        <p:spPr/>
-        <p:txBody>
-          <a:bodyPr/>
-          <a:lstStyle/>
-          <a:p>
-            <a:r>
-              <a:rPr lang="en-US" dirty="0"/>
-              <a:t>Combine with temporal tables to enable quick archival capability</a:t>
+          <a:p>
+            <a:pPr lvl="1"/>
+            <a:r>
+              <a:rPr lang="en-US" dirty="0"/>
+              <a:t>In-Memory OLTP (</a:t>
+            </a:r>
+            <a:r>
+              <a:rPr lang="en-US" dirty="0" err="1"/>
+              <a:t>Hekaton</a:t>
+            </a:r>
+            <a:r>
+              <a:rPr lang="en-US" dirty="0"/>
+              <a:t>)</a:t>
             </a:r>
           </a:p>
         </p:txBody>
@@ -8217,7 +9081,7 @@
     </p:spTree>
     <p:extLst>
       <p:ext uri="{BB962C8B-B14F-4D97-AF65-F5344CB8AC3E}">
-        <p14:creationId xmlns:p14="http://schemas.microsoft.com/office/powerpoint/2010/main" val="1885707255"/>
+        <p14:creationId xmlns:p14="http://schemas.microsoft.com/office/powerpoint/2010/main" val="3961792109"/>
       </p:ext>
     </p:extLst>
   </p:cSld>
@@ -8260,6 +9124,187 @@
           <a:lstStyle/>
           <a:p>
             <a:r>
+              <a:rPr lang="en-US" dirty="0" smtClean="0"/>
+              <a:t>Partitioning</a:t>
+            </a:r>
+            <a:endParaRPr lang="en-US" dirty="0"/>
+          </a:p>
+        </p:txBody>
+      </p:sp>
+      <p:sp>
+        <p:nvSpPr>
+          <p:cNvPr id="3" name="Content Placeholder 2"/>
+          <p:cNvSpPr>
+            <a:spLocks noGrp="1"/>
+          </p:cNvSpPr>
+          <p:nvPr>
+            <p:ph idx="1"/>
+          </p:nvPr>
+        </p:nvSpPr>
+        <p:spPr/>
+        <p:txBody>
+          <a:bodyPr/>
+          <a:lstStyle/>
+          <a:p>
+            <a:r>
+              <a:rPr lang="en-US" dirty="0" smtClean="0"/>
+              <a:t>Spread table data across multiple B-trees</a:t>
+            </a:r>
+          </a:p>
+          <a:p>
+            <a:r>
+              <a:rPr lang="en-US" dirty="0" smtClean="0"/>
+              <a:t>For example, place older data on slower, cheaper storage</a:t>
+            </a:r>
+          </a:p>
+          <a:p>
+            <a:r>
+              <a:rPr lang="en-US" dirty="0" smtClean="0"/>
+              <a:t>Usually for very large data sets, but has other purposes</a:t>
+            </a:r>
+          </a:p>
+          <a:p>
+            <a:r>
+              <a:rPr lang="en-US" dirty="0" smtClean="0"/>
+              <a:t>Separation defined by a “partitioning function” and a “partitioning scheme”</a:t>
+            </a:r>
+          </a:p>
+          <a:p>
+            <a:pPr lvl="1"/>
+            <a:r>
+              <a:rPr lang="en-US" dirty="0" smtClean="0"/>
+              <a:t>Range LEFT (think of as &gt;=)</a:t>
+            </a:r>
+          </a:p>
+          <a:p>
+            <a:pPr lvl="1"/>
+            <a:r>
+              <a:rPr lang="en-US" dirty="0" smtClean="0"/>
+              <a:t>Range RIGHT (think of as &lt;)</a:t>
+            </a:r>
+          </a:p>
+        </p:txBody>
+      </p:sp>
+    </p:spTree>
+    <p:extLst>
+      <p:ext uri="{BB962C8B-B14F-4D97-AF65-F5344CB8AC3E}">
+        <p14:creationId xmlns:p14="http://schemas.microsoft.com/office/powerpoint/2010/main" val="1770415838"/>
+      </p:ext>
+    </p:extLst>
+  </p:cSld>
+  <p:clrMapOvr>
+    <a:masterClrMapping/>
+  </p:clrMapOvr>
+</p:sld>
+</file>
+
+<file path=ppt/slides/slide25.xml><?xml version="1.0" encoding="utf-8"?>
+<p:sld xmlns:a="http://schemas.openxmlformats.org/drawingml/2006/main" xmlns:r="http://schemas.openxmlformats.org/officeDocument/2006/relationships" xmlns:p="http://schemas.openxmlformats.org/presentationml/2006/main">
+  <p:cSld>
+    <p:spTree>
+      <p:nvGrpSpPr>
+        <p:cNvPr id="1" name=""/>
+        <p:cNvGrpSpPr/>
+        <p:nvPr/>
+      </p:nvGrpSpPr>
+      <p:grpSpPr>
+        <a:xfrm>
+          <a:off x="0" y="0"/>
+          <a:ext cx="0" cy="0"/>
+          <a:chOff x="0" y="0"/>
+          <a:chExt cx="0" cy="0"/>
+        </a:xfrm>
+      </p:grpSpPr>
+      <p:sp>
+        <p:nvSpPr>
+          <p:cNvPr id="2" name="Title 1"/>
+          <p:cNvSpPr>
+            <a:spLocks noGrp="1"/>
+          </p:cNvSpPr>
+          <p:nvPr>
+            <p:ph type="title"/>
+          </p:nvPr>
+        </p:nvSpPr>
+        <p:spPr/>
+        <p:txBody>
+          <a:bodyPr/>
+          <a:lstStyle/>
+          <a:p>
+            <a:r>
+              <a:rPr lang="en-US" dirty="0"/>
+              <a:t>Partitioning</a:t>
+            </a:r>
+          </a:p>
+        </p:txBody>
+      </p:sp>
+      <p:sp>
+        <p:nvSpPr>
+          <p:cNvPr id="3" name="Content Placeholder 2"/>
+          <p:cNvSpPr>
+            <a:spLocks noGrp="1"/>
+          </p:cNvSpPr>
+          <p:nvPr>
+            <p:ph idx="1"/>
+          </p:nvPr>
+        </p:nvSpPr>
+        <p:spPr/>
+        <p:txBody>
+          <a:bodyPr/>
+          <a:lstStyle/>
+          <a:p>
+            <a:r>
+              <a:rPr lang="en-US" dirty="0"/>
+              <a:t>Combine with temporal tables to enable quick archival capability</a:t>
+            </a:r>
+          </a:p>
+        </p:txBody>
+      </p:sp>
+    </p:spTree>
+    <p:extLst>
+      <p:ext uri="{BB962C8B-B14F-4D97-AF65-F5344CB8AC3E}">
+        <p14:creationId xmlns:p14="http://schemas.microsoft.com/office/powerpoint/2010/main" val="1885707255"/>
+      </p:ext>
+    </p:extLst>
+  </p:cSld>
+  <p:clrMapOvr>
+    <a:masterClrMapping/>
+  </p:clrMapOvr>
+</p:sld>
+</file>
+
+<file path=ppt/slides/slide26.xml><?xml version="1.0" encoding="utf-8"?>
+<p:sld xmlns:a="http://schemas.openxmlformats.org/drawingml/2006/main" xmlns:r="http://schemas.openxmlformats.org/officeDocument/2006/relationships" xmlns:p="http://schemas.openxmlformats.org/presentationml/2006/main">
+  <p:cSld>
+    <p:spTree>
+      <p:nvGrpSpPr>
+        <p:cNvPr id="1" name=""/>
+        <p:cNvGrpSpPr/>
+        <p:nvPr/>
+      </p:nvGrpSpPr>
+      <p:grpSpPr>
+        <a:xfrm>
+          <a:off x="0" y="0"/>
+          <a:ext cx="0" cy="0"/>
+          <a:chOff x="0" y="0"/>
+          <a:chExt cx="0" cy="0"/>
+        </a:xfrm>
+      </p:grpSpPr>
+      <p:sp>
+        <p:nvSpPr>
+          <p:cNvPr id="2" name="Title 1"/>
+          <p:cNvSpPr>
+            <a:spLocks noGrp="1"/>
+          </p:cNvSpPr>
+          <p:nvPr>
+            <p:ph type="title"/>
+          </p:nvPr>
+        </p:nvSpPr>
+        <p:spPr/>
+        <p:txBody>
+          <a:bodyPr/>
+          <a:lstStyle/>
+          <a:p>
+            <a:r>
               <a:rPr lang="en-US" dirty="0"/>
               <a:t>SQL Server Features</a:t>
             </a:r>
@@ -8395,7 +9440,7 @@
 </p:sld>
 </file>
 
-<file path=ppt/slides/slide25.xml><?xml version="1.0" encoding="utf-8"?>
+<file path=ppt/slides/slide27.xml><?xml version="1.0" encoding="utf-8"?>
 <p:sld xmlns:a="http://schemas.openxmlformats.org/drawingml/2006/main" xmlns:r="http://schemas.openxmlformats.org/officeDocument/2006/relationships" xmlns:p="http://schemas.openxmlformats.org/presentationml/2006/main">
   <p:cSld>
     <p:spTree>
@@ -9402,16 +10447,10 @@
           <a:lstStyle/>
           <a:p>
             <a:r>
-              <a:rPr lang="en-US" dirty="0"/>
-              <a:t>SQL Server Features</a:t>
-            </a:r>
-            <a:br>
-              <a:rPr lang="en-US" dirty="0"/>
-            </a:br>
-            <a:r>
-              <a:rPr lang="en-US" dirty="0"/>
-              <a:t>(Speed Dating)</a:t>
-            </a:r>
+              <a:rPr lang="en-US" dirty="0" smtClean="0"/>
+              <a:t>Cumulative Updates</a:t>
+            </a:r>
+            <a:endParaRPr lang="en-US" dirty="0"/>
           </a:p>
         </p:txBody>
       </p:sp>
@@ -9427,99 +10466,59 @@
         </p:nvSpPr>
         <p:spPr/>
         <p:txBody>
-          <a:bodyPr>
-            <a:normAutofit lnSpcReduction="10000"/>
-          </a:bodyPr>
+          <a:bodyPr/>
           <a:lstStyle/>
           <a:p>
             <a:r>
-              <a:rPr lang="en-US" dirty="0"/>
-              <a:t>Security</a:t>
-            </a:r>
-          </a:p>
-          <a:p>
-            <a:pPr lvl="1"/>
-            <a:r>
-              <a:rPr lang="en-US" dirty="0">
-                <a:solidFill>
-                  <a:srgbClr val="FF0000"/>
-                </a:solidFill>
-              </a:rPr>
-              <a:t>Row-Level Security</a:t>
-            </a:r>
-          </a:p>
-          <a:p>
-            <a:pPr lvl="1"/>
-            <a:r>
-              <a:rPr lang="en-US" dirty="0"/>
-              <a:t>Always Encrypted</a:t>
-            </a:r>
-          </a:p>
-          <a:p>
-            <a:r>
-              <a:rPr lang="en-US" dirty="0"/>
-              <a:t>Utility</a:t>
-            </a:r>
-          </a:p>
-          <a:p>
-            <a:pPr lvl="1"/>
-            <a:r>
-              <a:rPr lang="en-US" dirty="0"/>
-              <a:t>Snapshots</a:t>
-            </a:r>
-          </a:p>
-          <a:p>
-            <a:pPr lvl="1"/>
-            <a:r>
-              <a:rPr lang="en-US" dirty="0"/>
-              <a:t>Temporal Tables</a:t>
-            </a:r>
-          </a:p>
-          <a:p>
-            <a:r>
-              <a:rPr lang="en-US" dirty="0"/>
-              <a:t>Performance</a:t>
-            </a:r>
-          </a:p>
-          <a:p>
-            <a:pPr lvl="1"/>
-            <a:r>
-              <a:rPr lang="en-US" dirty="0" err="1"/>
-              <a:t>Columnstore</a:t>
-            </a:r>
-            <a:r>
-              <a:rPr lang="en-US" dirty="0"/>
-              <a:t> Indexes</a:t>
-            </a:r>
-          </a:p>
-          <a:p>
-            <a:pPr lvl="1"/>
-            <a:r>
-              <a:rPr lang="en-US" dirty="0"/>
-              <a:t>Partitioning</a:t>
-            </a:r>
-          </a:p>
-          <a:p>
-            <a:pPr lvl="1"/>
-            <a:r>
-              <a:rPr lang="en-US" dirty="0"/>
-              <a:t>In-Memory OLTP (</a:t>
-            </a:r>
-            <a:r>
-              <a:rPr lang="en-US" dirty="0" err="1"/>
-              <a:t>Hekaton</a:t>
-            </a:r>
-            <a:r>
-              <a:rPr lang="en-US" dirty="0"/>
-              <a:t>)</a:t>
-            </a:r>
+              <a:rPr lang="en-US" dirty="0" smtClean="0"/>
+              <a:t>Bug fixes specific to a SQL Server version and service pack</a:t>
+            </a:r>
+          </a:p>
+          <a:p>
+            <a:r>
+              <a:rPr lang="en-US" dirty="0"/>
+              <a:t>T</a:t>
+            </a:r>
+            <a:r>
+              <a:rPr lang="en-US" dirty="0" smtClean="0"/>
+              <a:t>ypically issued by Microsoft about every two months</a:t>
+            </a:r>
+          </a:p>
+          <a:p>
+            <a:r>
+              <a:rPr lang="en-US" dirty="0" smtClean="0"/>
+              <a:t>Are “cumulative,” so only need the most recent update</a:t>
+            </a:r>
+          </a:p>
+          <a:p>
+            <a:r>
+              <a:rPr lang="en-US" dirty="0" smtClean="0"/>
+              <a:t>Since SP1 contained new functionality, particularly import to apply</a:t>
+            </a:r>
+          </a:p>
+          <a:p>
+            <a:r>
+              <a:rPr lang="en-US" dirty="0" smtClean="0"/>
+              <a:t>Recent CUs go through more rigorous testing; MS recommends applying them by default</a:t>
+            </a:r>
+          </a:p>
+          <a:p>
+            <a:r>
+              <a:rPr lang="en-US" dirty="0" smtClean="0"/>
+              <a:t>Current CU for </a:t>
+            </a:r>
+            <a:r>
+              <a:rPr lang="en-US" smtClean="0"/>
+              <a:t>SQL Server 2016 SP1 is CU2 (March 22, 2017)</a:t>
+            </a:r>
+            <a:endParaRPr lang="en-US" dirty="0" smtClean="0"/>
           </a:p>
         </p:txBody>
       </p:sp>
     </p:spTree>
     <p:extLst>
       <p:ext uri="{BB962C8B-B14F-4D97-AF65-F5344CB8AC3E}">
-        <p14:creationId xmlns:p14="http://schemas.microsoft.com/office/powerpoint/2010/main" val="1218328260"/>
+        <p14:creationId xmlns:p14="http://schemas.microsoft.com/office/powerpoint/2010/main" val="1360461507"/>
       </p:ext>
     </p:extLst>
   </p:cSld>
@@ -9563,6 +10562,166 @@
           <a:p>
             <a:r>
               <a:rPr lang="en-US" dirty="0"/>
+              <a:t>SQL Server Features</a:t>
+            </a:r>
+            <a:br>
+              <a:rPr lang="en-US" dirty="0"/>
+            </a:br>
+            <a:r>
+              <a:rPr lang="en-US" dirty="0"/>
+              <a:t>(Speed Dating)</a:t>
+            </a:r>
+          </a:p>
+        </p:txBody>
+      </p:sp>
+      <p:sp>
+        <p:nvSpPr>
+          <p:cNvPr id="3" name="Content Placeholder 2"/>
+          <p:cNvSpPr>
+            <a:spLocks noGrp="1"/>
+          </p:cNvSpPr>
+          <p:nvPr>
+            <p:ph idx="1"/>
+          </p:nvPr>
+        </p:nvSpPr>
+        <p:spPr/>
+        <p:txBody>
+          <a:bodyPr>
+            <a:normAutofit lnSpcReduction="10000"/>
+          </a:bodyPr>
+          <a:lstStyle/>
+          <a:p>
+            <a:r>
+              <a:rPr lang="en-US" dirty="0"/>
+              <a:t>Security</a:t>
+            </a:r>
+          </a:p>
+          <a:p>
+            <a:pPr lvl="1"/>
+            <a:r>
+              <a:rPr lang="en-US" dirty="0">
+                <a:solidFill>
+                  <a:srgbClr val="FF0000"/>
+                </a:solidFill>
+              </a:rPr>
+              <a:t>Row-Level Security</a:t>
+            </a:r>
+          </a:p>
+          <a:p>
+            <a:pPr lvl="1"/>
+            <a:r>
+              <a:rPr lang="en-US" dirty="0"/>
+              <a:t>Always Encrypted</a:t>
+            </a:r>
+          </a:p>
+          <a:p>
+            <a:r>
+              <a:rPr lang="en-US" dirty="0"/>
+              <a:t>Utility</a:t>
+            </a:r>
+          </a:p>
+          <a:p>
+            <a:pPr lvl="1"/>
+            <a:r>
+              <a:rPr lang="en-US" dirty="0"/>
+              <a:t>Snapshots</a:t>
+            </a:r>
+          </a:p>
+          <a:p>
+            <a:pPr lvl="1"/>
+            <a:r>
+              <a:rPr lang="en-US" dirty="0"/>
+              <a:t>Temporal Tables</a:t>
+            </a:r>
+          </a:p>
+          <a:p>
+            <a:r>
+              <a:rPr lang="en-US" dirty="0"/>
+              <a:t>Performance</a:t>
+            </a:r>
+          </a:p>
+          <a:p>
+            <a:pPr lvl="1"/>
+            <a:r>
+              <a:rPr lang="en-US" dirty="0" err="1"/>
+              <a:t>Columnstore</a:t>
+            </a:r>
+            <a:r>
+              <a:rPr lang="en-US" dirty="0"/>
+              <a:t> Indexes</a:t>
+            </a:r>
+          </a:p>
+          <a:p>
+            <a:pPr lvl="1"/>
+            <a:r>
+              <a:rPr lang="en-US" dirty="0"/>
+              <a:t>Partitioning</a:t>
+            </a:r>
+          </a:p>
+          <a:p>
+            <a:pPr lvl="1"/>
+            <a:r>
+              <a:rPr lang="en-US" dirty="0"/>
+              <a:t>In-Memory OLTP (</a:t>
+            </a:r>
+            <a:r>
+              <a:rPr lang="en-US" dirty="0" err="1"/>
+              <a:t>Hekaton</a:t>
+            </a:r>
+            <a:r>
+              <a:rPr lang="en-US" dirty="0"/>
+              <a:t>)</a:t>
+            </a:r>
+          </a:p>
+        </p:txBody>
+      </p:sp>
+    </p:spTree>
+    <p:extLst>
+      <p:ext uri="{BB962C8B-B14F-4D97-AF65-F5344CB8AC3E}">
+        <p14:creationId xmlns:p14="http://schemas.microsoft.com/office/powerpoint/2010/main" val="1218328260"/>
+      </p:ext>
+    </p:extLst>
+  </p:cSld>
+  <p:clrMapOvr>
+    <a:masterClrMapping/>
+  </p:clrMapOvr>
+</p:sld>
+</file>
+
+<file path=ppt/slides/slide8.xml><?xml version="1.0" encoding="utf-8"?>
+<p:sld xmlns:a="http://schemas.openxmlformats.org/drawingml/2006/main" xmlns:r="http://schemas.openxmlformats.org/officeDocument/2006/relationships" xmlns:p="http://schemas.openxmlformats.org/presentationml/2006/main">
+  <p:cSld>
+    <p:spTree>
+      <p:nvGrpSpPr>
+        <p:cNvPr id="1" name=""/>
+        <p:cNvGrpSpPr/>
+        <p:nvPr/>
+      </p:nvGrpSpPr>
+      <p:grpSpPr>
+        <a:xfrm>
+          <a:off x="0" y="0"/>
+          <a:ext cx="0" cy="0"/>
+          <a:chOff x="0" y="0"/>
+          <a:chExt cx="0" cy="0"/>
+        </a:xfrm>
+      </p:grpSpPr>
+      <p:sp>
+        <p:nvSpPr>
+          <p:cNvPr id="2" name="Title 1"/>
+          <p:cNvSpPr>
+            <a:spLocks noGrp="1"/>
+          </p:cNvSpPr>
+          <p:nvPr>
+            <p:ph type="title"/>
+          </p:nvPr>
+        </p:nvSpPr>
+        <p:spPr/>
+        <p:txBody>
+          <a:bodyPr/>
+          <a:lstStyle/>
+          <a:p>
+            <a:r>
+              <a:rPr lang="en-US" dirty="0"/>
               <a:t>Row-Level Security</a:t>
             </a:r>
           </a:p>
@@ -9632,7 +10791,7 @@
 </p:sld>
 </file>
 
-<file path=ppt/slides/slide8.xml><?xml version="1.0" encoding="utf-8"?>
+<file path=ppt/slides/slide9.xml><?xml version="1.0" encoding="utf-8"?>
 <p:sld xmlns:a="http://schemas.openxmlformats.org/drawingml/2006/main" xmlns:r="http://schemas.openxmlformats.org/officeDocument/2006/relationships" xmlns:p="http://schemas.openxmlformats.org/presentationml/2006/main">
   <p:cSld>
     <p:spTree>
@@ -9803,166 +10962,6 @@
     <p:extLst>
       <p:ext uri="{BB962C8B-B14F-4D97-AF65-F5344CB8AC3E}">
         <p14:creationId xmlns:p14="http://schemas.microsoft.com/office/powerpoint/2010/main" val="2092119778"/>
-      </p:ext>
-    </p:extLst>
-  </p:cSld>
-  <p:clrMapOvr>
-    <a:masterClrMapping/>
-  </p:clrMapOvr>
-</p:sld>
-</file>
-
-<file path=ppt/slides/slide9.xml><?xml version="1.0" encoding="utf-8"?>
-<p:sld xmlns:a="http://schemas.openxmlformats.org/drawingml/2006/main" xmlns:r="http://schemas.openxmlformats.org/officeDocument/2006/relationships" xmlns:p="http://schemas.openxmlformats.org/presentationml/2006/main">
-  <p:cSld>
-    <p:spTree>
-      <p:nvGrpSpPr>
-        <p:cNvPr id="1" name=""/>
-        <p:cNvGrpSpPr/>
-        <p:nvPr/>
-      </p:nvGrpSpPr>
-      <p:grpSpPr>
-        <a:xfrm>
-          <a:off x="0" y="0"/>
-          <a:ext cx="0" cy="0"/>
-          <a:chOff x="0" y="0"/>
-          <a:chExt cx="0" cy="0"/>
-        </a:xfrm>
-      </p:grpSpPr>
-      <p:sp>
-        <p:nvSpPr>
-          <p:cNvPr id="2" name="Title 1"/>
-          <p:cNvSpPr>
-            <a:spLocks noGrp="1"/>
-          </p:cNvSpPr>
-          <p:nvPr>
-            <p:ph type="title"/>
-          </p:nvPr>
-        </p:nvSpPr>
-        <p:spPr/>
-        <p:txBody>
-          <a:bodyPr/>
-          <a:lstStyle/>
-          <a:p>
-            <a:r>
-              <a:rPr lang="en-US" dirty="0"/>
-              <a:t>SQL Server Features</a:t>
-            </a:r>
-            <a:br>
-              <a:rPr lang="en-US" dirty="0"/>
-            </a:br>
-            <a:r>
-              <a:rPr lang="en-US" dirty="0"/>
-              <a:t>(Speed Dating)</a:t>
-            </a:r>
-          </a:p>
-        </p:txBody>
-      </p:sp>
-      <p:sp>
-        <p:nvSpPr>
-          <p:cNvPr id="3" name="Content Placeholder 2"/>
-          <p:cNvSpPr>
-            <a:spLocks noGrp="1"/>
-          </p:cNvSpPr>
-          <p:nvPr>
-            <p:ph idx="1"/>
-          </p:nvPr>
-        </p:nvSpPr>
-        <p:spPr/>
-        <p:txBody>
-          <a:bodyPr>
-            <a:normAutofit lnSpcReduction="10000"/>
-          </a:bodyPr>
-          <a:lstStyle/>
-          <a:p>
-            <a:r>
-              <a:rPr lang="en-US" dirty="0"/>
-              <a:t>Security</a:t>
-            </a:r>
-          </a:p>
-          <a:p>
-            <a:pPr lvl="1"/>
-            <a:r>
-              <a:rPr lang="en-US" dirty="0"/>
-              <a:t>Row-Level Security</a:t>
-            </a:r>
-          </a:p>
-          <a:p>
-            <a:pPr lvl="1"/>
-            <a:r>
-              <a:rPr lang="en-US" dirty="0">
-                <a:solidFill>
-                  <a:srgbClr val="FF0000"/>
-                </a:solidFill>
-              </a:rPr>
-              <a:t>Always Encrypted</a:t>
-            </a:r>
-          </a:p>
-          <a:p>
-            <a:r>
-              <a:rPr lang="en-US" dirty="0"/>
-              <a:t>Utility</a:t>
-            </a:r>
-          </a:p>
-          <a:p>
-            <a:pPr lvl="1"/>
-            <a:r>
-              <a:rPr lang="en-US" dirty="0"/>
-              <a:t>Snapshots</a:t>
-            </a:r>
-          </a:p>
-          <a:p>
-            <a:pPr lvl="1"/>
-            <a:r>
-              <a:rPr lang="en-US" dirty="0"/>
-              <a:t>Temporal Tables</a:t>
-            </a:r>
-          </a:p>
-          <a:p>
-            <a:r>
-              <a:rPr lang="en-US" dirty="0"/>
-              <a:t>Performance</a:t>
-            </a:r>
-          </a:p>
-          <a:p>
-            <a:pPr lvl="1"/>
-            <a:r>
-              <a:rPr lang="en-US" dirty="0" err="1"/>
-              <a:t>Columnstore</a:t>
-            </a:r>
-            <a:r>
-              <a:rPr lang="en-US" dirty="0"/>
-              <a:t> Indexes</a:t>
-            </a:r>
-          </a:p>
-          <a:p>
-            <a:pPr lvl="1"/>
-            <a:r>
-              <a:rPr lang="en-US" dirty="0"/>
-              <a:t>Partitioning</a:t>
-            </a:r>
-          </a:p>
-          <a:p>
-            <a:pPr lvl="1"/>
-            <a:r>
-              <a:rPr lang="en-US" dirty="0"/>
-              <a:t>In-Memory OLTP (</a:t>
-            </a:r>
-            <a:r>
-              <a:rPr lang="en-US" dirty="0" err="1"/>
-              <a:t>Hekaton</a:t>
-            </a:r>
-            <a:r>
-              <a:rPr lang="en-US" dirty="0"/>
-              <a:t>)</a:t>
-            </a:r>
-          </a:p>
-        </p:txBody>
-      </p:sp>
-    </p:spTree>
-    <p:extLst>
-      <p:ext uri="{BB962C8B-B14F-4D97-AF65-F5344CB8AC3E}">
-        <p14:creationId xmlns:p14="http://schemas.microsoft.com/office/powerpoint/2010/main" val="1882898498"/>
       </p:ext>
     </p:extLst>
   </p:cSld>

</xml_diff>

<commit_message>
Slide cleanup and consolidation.
</commit_message>
<xml_diff>
--- a/AwesomeFreeSQLServerFeatures.pptx
+++ b/AwesomeFreeSQLServerFeatures.pptx
@@ -5,7 +5,7 @@
     <p:sldMasterId id="2147483648" r:id="rId1"/>
   </p:sldMasterIdLst>
   <p:notesMasterIdLst>
-    <p:notesMasterId r:id="rId29"/>
+    <p:notesMasterId r:id="rId28"/>
   </p:notesMasterIdLst>
   <p:sldIdLst>
     <p:sldId id="256" r:id="rId2"/>
@@ -32,9 +32,8 @@
     <p:sldId id="267" r:id="rId23"/>
     <p:sldId id="268" r:id="rId24"/>
     <p:sldId id="282" r:id="rId25"/>
-    <p:sldId id="271" r:id="rId26"/>
-    <p:sldId id="270" r:id="rId27"/>
-    <p:sldId id="258" r:id="rId28"/>
+    <p:sldId id="270" r:id="rId26"/>
+    <p:sldId id="258" r:id="rId27"/>
   </p:sldIdLst>
   <p:sldSz cx="12192000" cy="6858000"/>
   <p:notesSz cx="6858000" cy="9144000"/>
@@ -223,7 +222,7 @@
           <a:p>
             <a:fld id="{64F240C7-B8B6-4D73-9667-9F7409B58D21}" type="datetimeFigureOut">
               <a:rPr lang="en-US" smtClean="0"/>
-              <a:t>4/19/2017</a:t>
+              <a:t>4/25/2017</a:t>
             </a:fld>
             <a:endParaRPr lang="en-US"/>
           </a:p>
@@ -1313,7 +1312,7 @@
             <a:fld id="{B61BEF0D-F0BB-DE4B-95CE-6DB70DBA9567}" type="datetimeFigureOut">
               <a:rPr lang="en-US" dirty="0"/>
               <a:pPr/>
-              <a:t>4/19/2017</a:t>
+              <a:t>4/25/2017</a:t>
             </a:fld>
             <a:endParaRPr lang="en-US" dirty="0"/>
           </a:p>
@@ -1572,7 +1571,7 @@
             <a:fld id="{B61BEF0D-F0BB-DE4B-95CE-6DB70DBA9567}" type="datetimeFigureOut">
               <a:rPr lang="en-US" dirty="0"/>
               <a:pPr/>
-              <a:t>4/19/2017</a:t>
+              <a:t>4/25/2017</a:t>
             </a:fld>
             <a:endParaRPr lang="en-US" dirty="0"/>
           </a:p>
@@ -1804,7 +1803,7 @@
             <a:fld id="{B61BEF0D-F0BB-DE4B-95CE-6DB70DBA9567}" type="datetimeFigureOut">
               <a:rPr lang="en-US" dirty="0"/>
               <a:pPr/>
-              <a:t>4/19/2017</a:t>
+              <a:t>4/25/2017</a:t>
             </a:fld>
             <a:endParaRPr lang="en-US" dirty="0"/>
           </a:p>
@@ -2041,7 +2040,7 @@
             <a:fld id="{B61BEF0D-F0BB-DE4B-95CE-6DB70DBA9567}" type="datetimeFigureOut">
               <a:rPr lang="en-US" dirty="0"/>
               <a:pPr/>
-              <a:t>4/19/2017</a:t>
+              <a:t>4/25/2017</a:t>
             </a:fld>
             <a:endParaRPr lang="en-US" dirty="0"/>
           </a:p>
@@ -2345,7 +2344,7 @@
             <a:fld id="{B61BEF0D-F0BB-DE4B-95CE-6DB70DBA9567}" type="datetimeFigureOut">
               <a:rPr lang="en-US" dirty="0"/>
               <a:pPr/>
-              <a:t>4/19/2017</a:t>
+              <a:t>4/25/2017</a:t>
             </a:fld>
             <a:endParaRPr lang="en-US" dirty="0"/>
           </a:p>
@@ -2644,7 +2643,7 @@
             <a:fld id="{B61BEF0D-F0BB-DE4B-95CE-6DB70DBA9567}" type="datetimeFigureOut">
               <a:rPr lang="en-US" dirty="0"/>
               <a:pPr/>
-              <a:t>4/19/2017</a:t>
+              <a:t>4/25/2017</a:t>
             </a:fld>
             <a:endParaRPr lang="en-US" dirty="0"/>
           </a:p>
@@ -3063,7 +3062,7 @@
             <a:fld id="{B61BEF0D-F0BB-DE4B-95CE-6DB70DBA9567}" type="datetimeFigureOut">
               <a:rPr lang="en-US" dirty="0"/>
               <a:pPr/>
-              <a:t>4/19/2017</a:t>
+              <a:t>4/25/2017</a:t>
             </a:fld>
             <a:endParaRPr lang="en-US" dirty="0"/>
           </a:p>
@@ -3222,7 +3221,7 @@
             <a:fld id="{B61BEF0D-F0BB-DE4B-95CE-6DB70DBA9567}" type="datetimeFigureOut">
               <a:rPr lang="en-US" dirty="0"/>
               <a:pPr/>
-              <a:t>4/19/2017</a:t>
+              <a:t>4/25/2017</a:t>
             </a:fld>
             <a:endParaRPr lang="en-US" dirty="0"/>
           </a:p>
@@ -3314,7 +3313,7 @@
             <a:fld id="{B61BEF0D-F0BB-DE4B-95CE-6DB70DBA9567}" type="datetimeFigureOut">
               <a:rPr lang="en-US" dirty="0"/>
               <a:pPr/>
-              <a:t>4/19/2017</a:t>
+              <a:t>4/25/2017</a:t>
             </a:fld>
             <a:endParaRPr lang="en-US" dirty="0"/>
           </a:p>
@@ -3689,7 +3688,7 @@
             <a:fld id="{B61BEF0D-F0BB-DE4B-95CE-6DB70DBA9567}" type="datetimeFigureOut">
               <a:rPr lang="en-US" dirty="0"/>
               <a:pPr/>
-              <a:t>4/19/2017</a:t>
+              <a:t>4/25/2017</a:t>
             </a:fld>
             <a:endParaRPr lang="en-US" dirty="0"/>
           </a:p>
@@ -3975,7 +3974,7 @@
             <a:fld id="{B61BEF0D-F0BB-DE4B-95CE-6DB70DBA9567}" type="datetimeFigureOut">
               <a:rPr lang="en-US" dirty="0"/>
               <a:pPr/>
-              <a:t>4/19/2017</a:t>
+              <a:t>4/25/2017</a:t>
             </a:fld>
             <a:endParaRPr lang="en-US" dirty="0"/>
           </a:p>
@@ -4183,7 +4182,7 @@
             <a:fld id="{B61BEF0D-F0BB-DE4B-95CE-6DB70DBA9567}" type="datetimeFigureOut">
               <a:rPr lang="en-US" dirty="0"/>
               <a:pPr/>
-              <a:t>4/19/2017</a:t>
+              <a:t>4/25/2017</a:t>
             </a:fld>
             <a:endParaRPr lang="en-US" dirty="0"/>
           </a:p>
@@ -7801,7 +7800,7 @@
           <p:nvPr>
             <p:extLst>
               <p:ext uri="{D42A27DB-BD31-4B8C-83A1-F6EECF244321}">
-                <p14:modId xmlns:p14="http://schemas.microsoft.com/office/powerpoint/2010/main" val="3299387513"/>
+                <p14:modId xmlns:p14="http://schemas.microsoft.com/office/powerpoint/2010/main" val="839370222"/>
               </p:ext>
             </p:extLst>
           </p:nvPr>
@@ -8205,7 +8204,19 @@
                           </a:highlight>
                           <a:latin typeface="Consolas" panose="020B0609020204030204" pitchFamily="49" charset="0"/>
                         </a:rPr>
-                        <a:t>'2017-01-11 18:55:04.4460000'</a:t>
+                        <a:t>'2017-01-11 </a:t>
+                      </a:r>
+                      <a:r>
+                        <a:rPr lang="en-US" sz="1800" dirty="0" smtClean="0">
+                          <a:solidFill>
+                            <a:srgbClr val="FF0000"/>
+                          </a:solidFill>
+                          <a:highlight>
+                            <a:srgbClr val="FFFFFF"/>
+                          </a:highlight>
+                          <a:latin typeface="Consolas" panose="020B0609020204030204" pitchFamily="49" charset="0"/>
+                        </a:rPr>
+                        <a:t>18:55:04'</a:t>
                       </a:r>
                       <a:r>
                         <a:rPr lang="en-US" sz="1800" dirty="0" smtClean="0">
@@ -8293,11 +8304,7 @@
                       </a:pPr>
                       <a:r>
                         <a:rPr lang="en-US" dirty="0" smtClean="0"/>
-                        <a:t>From </a:t>
-                      </a:r>
-                      <a:r>
-                        <a:rPr lang="en-US" dirty="0" smtClean="0"/>
-                        <a:t>(‘start’ &lt; </a:t>
+                        <a:t>From (‘start’ &lt; </a:t>
                       </a:r>
                       <a:r>
                         <a:rPr lang="en-US" dirty="0" err="1" smtClean="0"/>
@@ -8361,7 +8368,19 @@
                           </a:highlight>
                           <a:latin typeface="Consolas" panose="020B0609020204030204" pitchFamily="49" charset="0"/>
                         </a:rPr>
-                        <a:t>'2017-01-11 18:55:04.4450000'</a:t>
+                        <a:t>'2017-01-11 </a:t>
+                      </a:r>
+                      <a:r>
+                        <a:rPr lang="en-US" sz="1800" dirty="0" smtClean="0">
+                          <a:solidFill>
+                            <a:srgbClr val="FF0000"/>
+                          </a:solidFill>
+                          <a:highlight>
+                            <a:srgbClr val="FFFFFF"/>
+                          </a:highlight>
+                          <a:latin typeface="Consolas" panose="020B0609020204030204" pitchFamily="49" charset="0"/>
+                        </a:rPr>
+                        <a:t>18:55:04'</a:t>
                       </a:r>
                       <a:r>
                         <a:rPr lang="en-US" sz="1800" dirty="0" smtClean="0">
@@ -8447,11 +8466,7 @@
                       </a:pPr>
                       <a:r>
                         <a:rPr lang="en-US" dirty="0" smtClean="0"/>
-                        <a:t>Contained in </a:t>
-                      </a:r>
-                      <a:r>
-                        <a:rPr lang="en-US" dirty="0" smtClean="0"/>
-                        <a:t>(‘start’ &lt;= </a:t>
+                        <a:t>Contained in (‘start’ &lt;= </a:t>
                       </a:r>
                       <a:r>
                         <a:rPr lang="en-US" dirty="0" err="1" smtClean="0"/>
@@ -8555,7 +8570,19 @@
                           </a:highlight>
                           <a:latin typeface="Consolas" panose="020B0609020204030204" pitchFamily="49" charset="0"/>
                         </a:rPr>
-                        <a:t>'2017-01-11 18:55:04.4450000'</a:t>
+                        <a:t>'2017-01-11 </a:t>
+                      </a:r>
+                      <a:r>
+                        <a:rPr lang="en-US" sz="1800" dirty="0" smtClean="0">
+                          <a:solidFill>
+                            <a:srgbClr val="FF0000"/>
+                          </a:solidFill>
+                          <a:highlight>
+                            <a:srgbClr val="FFFFFF"/>
+                          </a:highlight>
+                          <a:latin typeface="Consolas" panose="020B0609020204030204" pitchFamily="49" charset="0"/>
+                        </a:rPr>
+                        <a:t>18:55:04'</a:t>
                       </a:r>
                       <a:r>
                         <a:rPr lang="en-US" sz="1800" kern="1200" dirty="0" smtClean="0">
@@ -9180,8 +9207,27 @@
             <a:pPr lvl="1"/>
             <a:r>
               <a:rPr lang="en-US" dirty="0" smtClean="0"/>
-              <a:t>Range RIGHT (think of as &lt;)</a:t>
-            </a:r>
+              <a:t>Range RIGHT (think of as </a:t>
+            </a:r>
+            <a:r>
+              <a:rPr lang="en-US" dirty="0" smtClean="0"/>
+              <a:t>&lt;)</a:t>
+            </a:r>
+          </a:p>
+          <a:p>
+            <a:r>
+              <a:rPr lang="en-US" dirty="0" smtClean="0"/>
+              <a:t>Another use: combine </a:t>
+            </a:r>
+            <a:r>
+              <a:rPr lang="en-US" dirty="0"/>
+              <a:t>with temporal tables to enable quick archival </a:t>
+            </a:r>
+            <a:r>
+              <a:rPr lang="en-US" dirty="0" smtClean="0"/>
+              <a:t>capability</a:t>
+            </a:r>
+            <a:endParaRPr lang="en-US" dirty="0"/>
           </a:p>
         </p:txBody>
       </p:sp>
@@ -9232,80 +9278,6 @@
           <a:p>
             <a:r>
               <a:rPr lang="en-US" dirty="0"/>
-              <a:t>Partitioning</a:t>
-            </a:r>
-          </a:p>
-        </p:txBody>
-      </p:sp>
-      <p:sp>
-        <p:nvSpPr>
-          <p:cNvPr id="3" name="Content Placeholder 2"/>
-          <p:cNvSpPr>
-            <a:spLocks noGrp="1"/>
-          </p:cNvSpPr>
-          <p:nvPr>
-            <p:ph idx="1"/>
-          </p:nvPr>
-        </p:nvSpPr>
-        <p:spPr/>
-        <p:txBody>
-          <a:bodyPr/>
-          <a:lstStyle/>
-          <a:p>
-            <a:r>
-              <a:rPr lang="en-US" dirty="0"/>
-              <a:t>Combine with temporal tables to enable quick archival capability</a:t>
-            </a:r>
-          </a:p>
-        </p:txBody>
-      </p:sp>
-    </p:spTree>
-    <p:extLst>
-      <p:ext uri="{BB962C8B-B14F-4D97-AF65-F5344CB8AC3E}">
-        <p14:creationId xmlns:p14="http://schemas.microsoft.com/office/powerpoint/2010/main" val="1885707255"/>
-      </p:ext>
-    </p:extLst>
-  </p:cSld>
-  <p:clrMapOvr>
-    <a:masterClrMapping/>
-  </p:clrMapOvr>
-</p:sld>
-</file>
-
-<file path=ppt/slides/slide26.xml><?xml version="1.0" encoding="utf-8"?>
-<p:sld xmlns:a="http://schemas.openxmlformats.org/drawingml/2006/main" xmlns:r="http://schemas.openxmlformats.org/officeDocument/2006/relationships" xmlns:p="http://schemas.openxmlformats.org/presentationml/2006/main">
-  <p:cSld>
-    <p:spTree>
-      <p:nvGrpSpPr>
-        <p:cNvPr id="1" name=""/>
-        <p:cNvGrpSpPr/>
-        <p:nvPr/>
-      </p:nvGrpSpPr>
-      <p:grpSpPr>
-        <a:xfrm>
-          <a:off x="0" y="0"/>
-          <a:ext cx="0" cy="0"/>
-          <a:chOff x="0" y="0"/>
-          <a:chExt cx="0" cy="0"/>
-        </a:xfrm>
-      </p:grpSpPr>
-      <p:sp>
-        <p:nvSpPr>
-          <p:cNvPr id="2" name="Title 1"/>
-          <p:cNvSpPr>
-            <a:spLocks noGrp="1"/>
-          </p:cNvSpPr>
-          <p:nvPr>
-            <p:ph type="title"/>
-          </p:nvPr>
-        </p:nvSpPr>
-        <p:spPr/>
-        <p:txBody>
-          <a:bodyPr/>
-          <a:lstStyle/>
-          <a:p>
-            <a:r>
-              <a:rPr lang="en-US" dirty="0"/>
               <a:t>SQL Server Features</a:t>
             </a:r>
             <a:br>
@@ -9440,7 +9412,7 @@
 </p:sld>
 </file>
 
-<file path=ppt/slides/slide27.xml><?xml version="1.0" encoding="utf-8"?>
+<file path=ppt/slides/slide26.xml><?xml version="1.0" encoding="utf-8"?>
 <p:sld xmlns:a="http://schemas.openxmlformats.org/drawingml/2006/main" xmlns:r="http://schemas.openxmlformats.org/officeDocument/2006/relationships" xmlns:p="http://schemas.openxmlformats.org/presentationml/2006/main">
   <p:cSld>
     <p:spTree>

</xml_diff>

<commit_message>
Add slide for columnstore.
</commit_message>
<xml_diff>
--- a/AwesomeFreeSQLServerFeatures.pptx
+++ b/AwesomeFreeSQLServerFeatures.pptx
@@ -5,7 +5,7 @@
     <p:sldMasterId id="2147483648" r:id="rId1"/>
   </p:sldMasterIdLst>
   <p:notesMasterIdLst>
-    <p:notesMasterId r:id="rId28"/>
+    <p:notesMasterId r:id="rId29"/>
   </p:notesMasterIdLst>
   <p:sldIdLst>
     <p:sldId id="256" r:id="rId2"/>
@@ -30,10 +30,11 @@
     <p:sldId id="283" r:id="rId21"/>
     <p:sldId id="281" r:id="rId22"/>
     <p:sldId id="267" r:id="rId23"/>
-    <p:sldId id="268" r:id="rId24"/>
-    <p:sldId id="282" r:id="rId25"/>
-    <p:sldId id="270" r:id="rId26"/>
-    <p:sldId id="258" r:id="rId27"/>
+    <p:sldId id="285" r:id="rId24"/>
+    <p:sldId id="268" r:id="rId25"/>
+    <p:sldId id="282" r:id="rId26"/>
+    <p:sldId id="270" r:id="rId27"/>
+    <p:sldId id="258" r:id="rId28"/>
   </p:sldIdLst>
   <p:sldSz cx="12192000" cy="6858000"/>
   <p:notesSz cx="6858000" cy="9144000"/>
@@ -8991,16 +8992,14 @@
           <a:lstStyle/>
           <a:p>
             <a:r>
-              <a:rPr lang="en-US" dirty="0"/>
-              <a:t>SQL Server Features</a:t>
-            </a:r>
-            <a:br>
-              <a:rPr lang="en-US" dirty="0"/>
-            </a:br>
-            <a:r>
-              <a:rPr lang="en-US" dirty="0"/>
-              <a:t>(Speed Dating)</a:t>
-            </a:r>
+              <a:rPr lang="en-US" dirty="0" err="1" smtClean="0"/>
+              <a:t>Columnstore</a:t>
+            </a:r>
+            <a:r>
+              <a:rPr lang="en-US" dirty="0" smtClean="0"/>
+              <a:t> Indexes</a:t>
+            </a:r>
+            <a:endParaRPr lang="en-US" dirty="0"/>
           </a:p>
         </p:txBody>
       </p:sp>
@@ -9016,99 +9015,81 @@
         </p:nvSpPr>
         <p:spPr/>
         <p:txBody>
-          <a:bodyPr>
-            <a:normAutofit lnSpcReduction="10000"/>
-          </a:bodyPr>
+          <a:bodyPr/>
           <a:lstStyle/>
           <a:p>
             <a:r>
-              <a:rPr lang="en-US" dirty="0"/>
-              <a:t>Security</a:t>
-            </a:r>
-          </a:p>
-          <a:p>
-            <a:pPr lvl="1"/>
-            <a:r>
-              <a:rPr lang="en-US" dirty="0"/>
-              <a:t>Row-Level Security</a:t>
-            </a:r>
-          </a:p>
-          <a:p>
-            <a:pPr lvl="1"/>
-            <a:r>
-              <a:rPr lang="en-US" dirty="0"/>
-              <a:t>Always Encrypted</a:t>
-            </a:r>
-          </a:p>
-          <a:p>
-            <a:r>
-              <a:rPr lang="en-US" dirty="0"/>
-              <a:t>Utility</a:t>
-            </a:r>
-          </a:p>
-          <a:p>
-            <a:pPr lvl="1"/>
-            <a:r>
-              <a:rPr lang="en-US" dirty="0"/>
-              <a:t>Snapshots</a:t>
-            </a:r>
-          </a:p>
-          <a:p>
-            <a:pPr lvl="1"/>
-            <a:r>
-              <a:rPr lang="en-US" dirty="0"/>
-              <a:t>Temporal Tables</a:t>
-            </a:r>
-          </a:p>
-          <a:p>
-            <a:r>
-              <a:rPr lang="en-US" dirty="0"/>
-              <a:t>Performance</a:t>
-            </a:r>
-          </a:p>
-          <a:p>
-            <a:pPr lvl="1"/>
-            <a:r>
-              <a:rPr lang="en-US" dirty="0" err="1"/>
+              <a:rPr lang="en-US" dirty="0" smtClean="0"/>
+              <a:t>Traditional indexes are row-based copies of selected columns in table</a:t>
+            </a:r>
+          </a:p>
+          <a:p>
+            <a:r>
+              <a:rPr lang="en-US" dirty="0" err="1" smtClean="0"/>
               <a:t>Columnstore</a:t>
             </a:r>
             <a:r>
-              <a:rPr lang="en-US" dirty="0"/>
-              <a:t> Indexes</a:t>
-            </a:r>
-          </a:p>
-          <a:p>
-            <a:pPr lvl="1"/>
-            <a:r>
-              <a:rPr lang="en-US" dirty="0">
-                <a:solidFill>
-                  <a:srgbClr val="FF0000"/>
-                </a:solidFill>
-              </a:rPr>
-              <a:t>Partitioning</a:t>
-            </a:r>
-          </a:p>
-          <a:p>
-            <a:pPr lvl="1"/>
-            <a:r>
-              <a:rPr lang="en-US" dirty="0"/>
-              <a:t>In-Memory OLTP (</a:t>
-            </a:r>
-            <a:r>
-              <a:rPr lang="en-US" dirty="0" err="1"/>
-              <a:t>Hekaton</a:t>
-            </a:r>
-            <a:r>
-              <a:rPr lang="en-US" dirty="0"/>
-              <a:t>)</a:t>
-            </a:r>
+              <a:rPr lang="en-US" dirty="0" smtClean="0"/>
+              <a:t> turns this around and orders the index by column</a:t>
+            </a:r>
+          </a:p>
+          <a:p>
+            <a:r>
+              <a:rPr lang="en-US" dirty="0" smtClean="0"/>
+              <a:t>Can be the entire table (clustered index) or a subset of columns (</a:t>
+            </a:r>
+            <a:r>
+              <a:rPr lang="en-US" dirty="0" err="1" smtClean="0"/>
+              <a:t>nonclustered</a:t>
+            </a:r>
+            <a:r>
+              <a:rPr lang="en-US" dirty="0" smtClean="0"/>
+              <a:t> index)</a:t>
+            </a:r>
+          </a:p>
+          <a:p>
+            <a:r>
+              <a:rPr lang="en-US" dirty="0" smtClean="0"/>
+              <a:t>Can be combined with row-based indexes</a:t>
+            </a:r>
+          </a:p>
+          <a:p>
+            <a:r>
+              <a:rPr lang="en-US" dirty="0" smtClean="0"/>
+              <a:t>Previous versions of SQL Server imposed limitations, but SQL Server 2016 removes many of these limits</a:t>
+            </a:r>
+          </a:p>
+          <a:p>
+            <a:r>
+              <a:rPr lang="en-US" dirty="0" smtClean="0"/>
+              <a:t>Particularly useful for warehouse / analytic queries</a:t>
+            </a:r>
+          </a:p>
+          <a:p>
+            <a:r>
+              <a:rPr lang="en-US" dirty="0" smtClean="0"/>
+              <a:t>Much of performance benefit derives from high compression of </a:t>
+            </a:r>
+            <a:r>
+              <a:rPr lang="en-US" dirty="0" err="1" smtClean="0"/>
+              <a:t>columnstore</a:t>
+            </a:r>
+            <a:r>
+              <a:rPr lang="en-US" dirty="0" smtClean="0"/>
+              <a:t> (typically 20x </a:t>
+            </a:r>
+            <a:r>
+              <a:rPr lang="en-US" smtClean="0"/>
+              <a:t>or more)</a:t>
+            </a:r>
+            <a:endParaRPr lang="en-US" dirty="0" smtClean="0"/>
           </a:p>
         </p:txBody>
       </p:sp>
     </p:spTree>
     <p:extLst>
       <p:ext uri="{BB962C8B-B14F-4D97-AF65-F5344CB8AC3E}">
-        <p14:creationId xmlns:p14="http://schemas.microsoft.com/office/powerpoint/2010/main" val="3961792109"/>
+        <p14:creationId xmlns:p14="http://schemas.microsoft.com/office/powerpoint/2010/main" val="1051046761"/>
       </p:ext>
     </p:extLst>
   </p:cSld>
@@ -9151,90 +9132,124 @@
           <a:lstStyle/>
           <a:p>
             <a:r>
-              <a:rPr lang="en-US" dirty="0" smtClean="0"/>
+              <a:rPr lang="en-US" dirty="0"/>
+              <a:t>SQL Server Features</a:t>
+            </a:r>
+            <a:br>
+              <a:rPr lang="en-US" dirty="0"/>
+            </a:br>
+            <a:r>
+              <a:rPr lang="en-US" dirty="0"/>
+              <a:t>(Speed Dating)</a:t>
+            </a:r>
+          </a:p>
+        </p:txBody>
+      </p:sp>
+      <p:sp>
+        <p:nvSpPr>
+          <p:cNvPr id="3" name="Content Placeholder 2"/>
+          <p:cNvSpPr>
+            <a:spLocks noGrp="1"/>
+          </p:cNvSpPr>
+          <p:nvPr>
+            <p:ph idx="1"/>
+          </p:nvPr>
+        </p:nvSpPr>
+        <p:spPr/>
+        <p:txBody>
+          <a:bodyPr>
+            <a:normAutofit lnSpcReduction="10000"/>
+          </a:bodyPr>
+          <a:lstStyle/>
+          <a:p>
+            <a:r>
+              <a:rPr lang="en-US" dirty="0"/>
+              <a:t>Security</a:t>
+            </a:r>
+          </a:p>
+          <a:p>
+            <a:pPr lvl="1"/>
+            <a:r>
+              <a:rPr lang="en-US" dirty="0"/>
+              <a:t>Row-Level Security</a:t>
+            </a:r>
+          </a:p>
+          <a:p>
+            <a:pPr lvl="1"/>
+            <a:r>
+              <a:rPr lang="en-US" dirty="0"/>
+              <a:t>Always Encrypted</a:t>
+            </a:r>
+          </a:p>
+          <a:p>
+            <a:r>
+              <a:rPr lang="en-US" dirty="0"/>
+              <a:t>Utility</a:t>
+            </a:r>
+          </a:p>
+          <a:p>
+            <a:pPr lvl="1"/>
+            <a:r>
+              <a:rPr lang="en-US" dirty="0"/>
+              <a:t>Snapshots</a:t>
+            </a:r>
+          </a:p>
+          <a:p>
+            <a:pPr lvl="1"/>
+            <a:r>
+              <a:rPr lang="en-US" dirty="0"/>
+              <a:t>Temporal Tables</a:t>
+            </a:r>
+          </a:p>
+          <a:p>
+            <a:r>
+              <a:rPr lang="en-US" dirty="0"/>
+              <a:t>Performance</a:t>
+            </a:r>
+          </a:p>
+          <a:p>
+            <a:pPr lvl="1"/>
+            <a:r>
+              <a:rPr lang="en-US" dirty="0" err="1"/>
+              <a:t>Columnstore</a:t>
+            </a:r>
+            <a:r>
+              <a:rPr lang="en-US" dirty="0"/>
+              <a:t> Indexes</a:t>
+            </a:r>
+          </a:p>
+          <a:p>
+            <a:pPr lvl="1"/>
+            <a:r>
+              <a:rPr lang="en-US" dirty="0">
+                <a:solidFill>
+                  <a:srgbClr val="FF0000"/>
+                </a:solidFill>
+              </a:rPr>
               <a:t>Partitioning</a:t>
             </a:r>
-            <a:endParaRPr lang="en-US" dirty="0"/>
-          </a:p>
-        </p:txBody>
-      </p:sp>
-      <p:sp>
-        <p:nvSpPr>
-          <p:cNvPr id="3" name="Content Placeholder 2"/>
-          <p:cNvSpPr>
-            <a:spLocks noGrp="1"/>
-          </p:cNvSpPr>
-          <p:nvPr>
-            <p:ph idx="1"/>
-          </p:nvPr>
-        </p:nvSpPr>
-        <p:spPr/>
-        <p:txBody>
-          <a:bodyPr/>
-          <a:lstStyle/>
-          <a:p>
-            <a:r>
-              <a:rPr lang="en-US" dirty="0" smtClean="0"/>
-              <a:t>Spread table data across multiple B-trees</a:t>
-            </a:r>
-          </a:p>
-          <a:p>
-            <a:r>
-              <a:rPr lang="en-US" dirty="0" smtClean="0"/>
-              <a:t>For example, place older data on slower, cheaper storage</a:t>
-            </a:r>
-          </a:p>
-          <a:p>
-            <a:r>
-              <a:rPr lang="en-US" dirty="0" smtClean="0"/>
-              <a:t>Usually for very large data sets, but has other purposes</a:t>
-            </a:r>
-          </a:p>
-          <a:p>
-            <a:r>
-              <a:rPr lang="en-US" dirty="0" smtClean="0"/>
-              <a:t>Separation defined by a “partitioning function” and a “partitioning scheme”</a:t>
-            </a:r>
           </a:p>
           <a:p>
             <a:pPr lvl="1"/>
             <a:r>
-              <a:rPr lang="en-US" dirty="0" smtClean="0"/>
-              <a:t>Range LEFT (think of as &gt;=)</a:t>
-            </a:r>
-          </a:p>
-          <a:p>
-            <a:pPr lvl="1"/>
-            <a:r>
-              <a:rPr lang="en-US" dirty="0" smtClean="0"/>
-              <a:t>Range RIGHT (think of as </a:t>
-            </a:r>
-            <a:r>
-              <a:rPr lang="en-US" dirty="0" smtClean="0"/>
-              <a:t>&lt;)</a:t>
-            </a:r>
-          </a:p>
-          <a:p>
-            <a:r>
-              <a:rPr lang="en-US" dirty="0" smtClean="0"/>
-              <a:t>Another use: combine </a:t>
-            </a:r>
-            <a:r>
-              <a:rPr lang="en-US" dirty="0"/>
-              <a:t>with temporal tables to enable quick archival </a:t>
-            </a:r>
-            <a:r>
-              <a:rPr lang="en-US" dirty="0" smtClean="0"/>
-              <a:t>capability</a:t>
-            </a:r>
-            <a:endParaRPr lang="en-US" dirty="0"/>
+              <a:rPr lang="en-US" dirty="0"/>
+              <a:t>In-Memory OLTP (</a:t>
+            </a:r>
+            <a:r>
+              <a:rPr lang="en-US" dirty="0" err="1"/>
+              <a:t>Hekaton</a:t>
+            </a:r>
+            <a:r>
+              <a:rPr lang="en-US" dirty="0"/>
+              <a:t>)</a:t>
+            </a:r>
           </a:p>
         </p:txBody>
       </p:sp>
     </p:spTree>
     <p:extLst>
       <p:ext uri="{BB962C8B-B14F-4D97-AF65-F5344CB8AC3E}">
-        <p14:creationId xmlns:p14="http://schemas.microsoft.com/office/powerpoint/2010/main" val="1770415838"/>
+        <p14:creationId xmlns:p14="http://schemas.microsoft.com/office/powerpoint/2010/main" val="3961792109"/>
       </p:ext>
     </p:extLst>
   </p:cSld>
@@ -9277,6 +9292,132 @@
           <a:lstStyle/>
           <a:p>
             <a:r>
+              <a:rPr lang="en-US" dirty="0" smtClean="0"/>
+              <a:t>Partitioning</a:t>
+            </a:r>
+            <a:endParaRPr lang="en-US" dirty="0"/>
+          </a:p>
+        </p:txBody>
+      </p:sp>
+      <p:sp>
+        <p:nvSpPr>
+          <p:cNvPr id="3" name="Content Placeholder 2"/>
+          <p:cNvSpPr>
+            <a:spLocks noGrp="1"/>
+          </p:cNvSpPr>
+          <p:nvPr>
+            <p:ph idx="1"/>
+          </p:nvPr>
+        </p:nvSpPr>
+        <p:spPr/>
+        <p:txBody>
+          <a:bodyPr/>
+          <a:lstStyle/>
+          <a:p>
+            <a:r>
+              <a:rPr lang="en-US" dirty="0" smtClean="0"/>
+              <a:t>Spread table data across multiple B-trees</a:t>
+            </a:r>
+          </a:p>
+          <a:p>
+            <a:r>
+              <a:rPr lang="en-US" dirty="0" smtClean="0"/>
+              <a:t>For example, place older data on slower, cheaper storage</a:t>
+            </a:r>
+          </a:p>
+          <a:p>
+            <a:r>
+              <a:rPr lang="en-US" dirty="0" smtClean="0"/>
+              <a:t>Usually for very large data sets, but has other purposes</a:t>
+            </a:r>
+          </a:p>
+          <a:p>
+            <a:r>
+              <a:rPr lang="en-US" dirty="0" smtClean="0"/>
+              <a:t>Separation defined by a “partitioning function” and a “partitioning scheme”</a:t>
+            </a:r>
+          </a:p>
+          <a:p>
+            <a:pPr lvl="1"/>
+            <a:r>
+              <a:rPr lang="en-US" dirty="0" smtClean="0"/>
+              <a:t>Range LEFT (think of as &gt;=)</a:t>
+            </a:r>
+          </a:p>
+          <a:p>
+            <a:pPr lvl="1"/>
+            <a:r>
+              <a:rPr lang="en-US" dirty="0" smtClean="0"/>
+              <a:t>Range RIGHT (think of as </a:t>
+            </a:r>
+            <a:r>
+              <a:rPr lang="en-US" dirty="0" smtClean="0"/>
+              <a:t>&lt;)</a:t>
+            </a:r>
+          </a:p>
+          <a:p>
+            <a:r>
+              <a:rPr lang="en-US" dirty="0" smtClean="0"/>
+              <a:t>Another use: combine </a:t>
+            </a:r>
+            <a:r>
+              <a:rPr lang="en-US" dirty="0"/>
+              <a:t>with temporal tables to enable quick archival </a:t>
+            </a:r>
+            <a:r>
+              <a:rPr lang="en-US" dirty="0" smtClean="0"/>
+              <a:t>capability</a:t>
+            </a:r>
+            <a:endParaRPr lang="en-US" dirty="0"/>
+          </a:p>
+        </p:txBody>
+      </p:sp>
+    </p:spTree>
+    <p:extLst>
+      <p:ext uri="{BB962C8B-B14F-4D97-AF65-F5344CB8AC3E}">
+        <p14:creationId xmlns:p14="http://schemas.microsoft.com/office/powerpoint/2010/main" val="1770415838"/>
+      </p:ext>
+    </p:extLst>
+  </p:cSld>
+  <p:clrMapOvr>
+    <a:masterClrMapping/>
+  </p:clrMapOvr>
+</p:sld>
+</file>
+
+<file path=ppt/slides/slide26.xml><?xml version="1.0" encoding="utf-8"?>
+<p:sld xmlns:a="http://schemas.openxmlformats.org/drawingml/2006/main" xmlns:r="http://schemas.openxmlformats.org/officeDocument/2006/relationships" xmlns:p="http://schemas.openxmlformats.org/presentationml/2006/main">
+  <p:cSld>
+    <p:spTree>
+      <p:nvGrpSpPr>
+        <p:cNvPr id="1" name=""/>
+        <p:cNvGrpSpPr/>
+        <p:nvPr/>
+      </p:nvGrpSpPr>
+      <p:grpSpPr>
+        <a:xfrm>
+          <a:off x="0" y="0"/>
+          <a:ext cx="0" cy="0"/>
+          <a:chOff x="0" y="0"/>
+          <a:chExt cx="0" cy="0"/>
+        </a:xfrm>
+      </p:grpSpPr>
+      <p:sp>
+        <p:nvSpPr>
+          <p:cNvPr id="2" name="Title 1"/>
+          <p:cNvSpPr>
+            <a:spLocks noGrp="1"/>
+          </p:cNvSpPr>
+          <p:nvPr>
+            <p:ph type="title"/>
+          </p:nvPr>
+        </p:nvSpPr>
+        <p:spPr/>
+        <p:txBody>
+          <a:bodyPr/>
+          <a:lstStyle/>
+          <a:p>
+            <a:r>
               <a:rPr lang="en-US" dirty="0"/>
               <a:t>SQL Server Features</a:t>
             </a:r>
@@ -9412,7 +9553,7 @@
 </p:sld>
 </file>
 
-<file path=ppt/slides/slide26.xml><?xml version="1.0" encoding="utf-8"?>
+<file path=ppt/slides/slide27.xml><?xml version="1.0" encoding="utf-8"?>
 <p:sld xmlns:a="http://schemas.openxmlformats.org/drawingml/2006/main" xmlns:r="http://schemas.openxmlformats.org/officeDocument/2006/relationships" xmlns:p="http://schemas.openxmlformats.org/presentationml/2006/main">
   <p:cSld>
     <p:spTree>

</xml_diff>

<commit_message>
Add visuals for partitioning.
</commit_message>
<xml_diff>
--- a/AwesomeFreeSQLServerFeatures.pptx
+++ b/AwesomeFreeSQLServerFeatures.pptx
@@ -5,7 +5,7 @@
     <p:sldMasterId id="2147483648" r:id="rId1"/>
   </p:sldMasterIdLst>
   <p:notesMasterIdLst>
-    <p:notesMasterId r:id="rId29"/>
+    <p:notesMasterId r:id="rId35"/>
   </p:notesMasterIdLst>
   <p:sldIdLst>
     <p:sldId id="256" r:id="rId2"/>
@@ -31,10 +31,16 @@
     <p:sldId id="281" r:id="rId22"/>
     <p:sldId id="267" r:id="rId23"/>
     <p:sldId id="285" r:id="rId24"/>
-    <p:sldId id="268" r:id="rId25"/>
-    <p:sldId id="282" r:id="rId26"/>
-    <p:sldId id="270" r:id="rId27"/>
-    <p:sldId id="258" r:id="rId28"/>
+    <p:sldId id="288" r:id="rId25"/>
+    <p:sldId id="268" r:id="rId26"/>
+    <p:sldId id="282" r:id="rId27"/>
+    <p:sldId id="286" r:id="rId28"/>
+    <p:sldId id="287" r:id="rId29"/>
+    <p:sldId id="289" r:id="rId30"/>
+    <p:sldId id="270" r:id="rId31"/>
+    <p:sldId id="291" r:id="rId32"/>
+    <p:sldId id="290" r:id="rId33"/>
+    <p:sldId id="258" r:id="rId34"/>
   </p:sldIdLst>
   <p:sldSz cx="12192000" cy="6858000"/>
   <p:notesSz cx="6858000" cy="9144000"/>
@@ -9134,124 +9140,148 @@
           <a:lstStyle/>
           <a:p>
             <a:r>
-              <a:rPr lang="en-US" dirty="0"/>
-              <a:t>SQL Server Features</a:t>
-            </a:r>
-            <a:br>
-              <a:rPr lang="en-US" dirty="0"/>
-            </a:br>
-            <a:r>
-              <a:rPr lang="en-US" dirty="0"/>
-              <a:t>(Speed Dating)</a:t>
-            </a:r>
-          </a:p>
-        </p:txBody>
-      </p:sp>
-      <p:sp>
-        <p:nvSpPr>
-          <p:cNvPr id="3" name="Content Placeholder 2"/>
-          <p:cNvSpPr>
-            <a:spLocks noGrp="1"/>
-          </p:cNvSpPr>
-          <p:nvPr>
-            <p:ph idx="1"/>
-          </p:nvPr>
-        </p:nvSpPr>
-        <p:spPr/>
-        <p:txBody>
-          <a:bodyPr>
-            <a:normAutofit lnSpcReduction="10000"/>
+              <a:rPr lang="en-US" dirty="0" err="1"/>
+              <a:t>Columnstore</a:t>
+            </a:r>
+            <a:r>
+              <a:rPr lang="en-US" dirty="0"/>
+              <a:t> Indexes</a:t>
+            </a:r>
+            <a:endParaRPr lang="en-US" dirty="0"/>
+          </a:p>
+        </p:txBody>
+      </p:sp>
+      <p:grpSp>
+        <p:nvGrpSpPr>
+          <p:cNvPr id="4" name="Group 3"/>
+          <p:cNvGrpSpPr/>
+          <p:nvPr/>
+        </p:nvGrpSpPr>
+        <p:grpSpPr>
+          <a:xfrm>
+            <a:off x="8549640" y="2949746"/>
+            <a:ext cx="2784474" cy="3057354"/>
+            <a:chOff x="8549640" y="2949746"/>
+            <a:chExt cx="2784474" cy="3057354"/>
+          </a:xfrm>
+        </p:grpSpPr>
+        <p:pic>
+          <p:nvPicPr>
+            <p:cNvPr id="1026" name="Picture 2" descr="Image result for keyboard drawing"/>
+            <p:cNvPicPr>
+              <a:picLocks noChangeAspect="1" noChangeArrowheads="1"/>
+            </p:cNvPicPr>
+            <p:nvPr/>
+          </p:nvPicPr>
+          <p:blipFill>
+            <a:blip r:embed="rId2">
+              <a:extLst>
+                <a:ext uri="{28A0092B-C50C-407E-A947-70E740481C1C}">
+                  <a14:useLocalDpi xmlns:a14="http://schemas.microsoft.com/office/drawing/2010/main" val="0"/>
+                </a:ext>
+              </a:extLst>
+            </a:blip>
+            <a:srcRect/>
+            <a:stretch>
+              <a:fillRect/>
+            </a:stretch>
+          </p:blipFill>
+          <p:spPr bwMode="auto">
+            <a:xfrm>
+              <a:off x="8549640" y="4031864"/>
+              <a:ext cx="2784474" cy="1975236"/>
+            </a:xfrm>
+            <a:prstGeom prst="rect">
+              <a:avLst/>
+            </a:prstGeom>
+            <a:noFill/>
+            <a:extLst>
+              <a:ext uri="{909E8E84-426E-40DD-AFC4-6F175D3DCCD1}">
+                <a14:hiddenFill xmlns:a14="http://schemas.microsoft.com/office/drawing/2010/main">
+                  <a:solidFill>
+                    <a:srgbClr val="FFFFFF"/>
+                  </a:solidFill>
+                </a14:hiddenFill>
+              </a:ext>
+            </a:extLst>
+          </p:spPr>
+        </p:pic>
+        <p:pic>
+          <p:nvPicPr>
+            <p:cNvPr id="1028" name="Picture 4" descr="Image result for database"/>
+            <p:cNvPicPr>
+              <a:picLocks noChangeAspect="1" noChangeArrowheads="1"/>
+            </p:cNvPicPr>
+            <p:nvPr/>
+          </p:nvPicPr>
+          <p:blipFill>
+            <a:blip r:embed="rId3">
+              <a:extLst>
+                <a:ext uri="{28A0092B-C50C-407E-A947-70E740481C1C}">
+                  <a14:useLocalDpi xmlns:a14="http://schemas.microsoft.com/office/drawing/2010/main" val="0"/>
+                </a:ext>
+              </a:extLst>
+            </a:blip>
+            <a:srcRect/>
+            <a:stretch>
+              <a:fillRect/>
+            </a:stretch>
+          </p:blipFill>
+          <p:spPr bwMode="auto">
+            <a:xfrm>
+              <a:off x="8972549" y="2949746"/>
+              <a:ext cx="1218565" cy="1406037"/>
+            </a:xfrm>
+            <a:prstGeom prst="rect">
+              <a:avLst/>
+            </a:prstGeom>
+            <a:noFill/>
+            <a:extLst>
+              <a:ext uri="{909E8E84-426E-40DD-AFC4-6F175D3DCCD1}">
+                <a14:hiddenFill xmlns:a14="http://schemas.microsoft.com/office/drawing/2010/main">
+                  <a:solidFill>
+                    <a:srgbClr val="FFFFFF"/>
+                  </a:solidFill>
+                </a14:hiddenFill>
+              </a:ext>
+            </a:extLst>
+          </p:spPr>
+        </p:pic>
+      </p:grpSp>
+      <p:sp>
+        <p:nvSpPr>
+          <p:cNvPr id="5" name="TextBox 4"/>
+          <p:cNvSpPr txBox="1"/>
+          <p:nvPr/>
+        </p:nvSpPr>
+        <p:spPr>
+          <a:xfrm>
+            <a:off x="1394460" y="3155454"/>
+            <a:ext cx="5474970" cy="1200329"/>
+          </a:xfrm>
+          <a:prstGeom prst="rect">
+            <a:avLst/>
+          </a:prstGeom>
+          <a:noFill/>
+        </p:spPr>
+        <p:txBody>
+          <a:bodyPr wrap="square" rtlCol="0">
+            <a:spAutoFit/>
           </a:bodyPr>
           <a:lstStyle/>
           <a:p>
             <a:r>
-              <a:rPr lang="en-US" dirty="0"/>
-              <a:t>Security</a:t>
-            </a:r>
-          </a:p>
-          <a:p>
-            <a:pPr lvl="1"/>
-            <a:r>
-              <a:rPr lang="en-US" dirty="0"/>
-              <a:t>Row-Level Security</a:t>
-            </a:r>
-          </a:p>
-          <a:p>
-            <a:pPr lvl="1"/>
-            <a:r>
-              <a:rPr lang="en-US" dirty="0"/>
-              <a:t>Always Encrypted</a:t>
-            </a:r>
-          </a:p>
-          <a:p>
-            <a:r>
-              <a:rPr lang="en-US" dirty="0"/>
-              <a:t>Utility</a:t>
-            </a:r>
-          </a:p>
-          <a:p>
-            <a:pPr lvl="1"/>
-            <a:r>
-              <a:rPr lang="en-US" dirty="0"/>
-              <a:t>Snapshots</a:t>
-            </a:r>
-          </a:p>
-          <a:p>
-            <a:pPr lvl="1"/>
-            <a:r>
-              <a:rPr lang="en-US" dirty="0"/>
-              <a:t>Temporal Tables</a:t>
-            </a:r>
-          </a:p>
-          <a:p>
-            <a:r>
-              <a:rPr lang="en-US" dirty="0"/>
-              <a:t>Performance</a:t>
-            </a:r>
-          </a:p>
-          <a:p>
-            <a:pPr lvl="1"/>
-            <a:r>
-              <a:rPr lang="en-US" dirty="0" err="1"/>
-              <a:t>Columnstore</a:t>
-            </a:r>
-            <a:r>
-              <a:rPr lang="en-US" dirty="0"/>
-              <a:t> Indexes</a:t>
-            </a:r>
-          </a:p>
-          <a:p>
-            <a:pPr lvl="1"/>
-            <a:r>
-              <a:rPr lang="en-US" dirty="0">
-                <a:solidFill>
-                  <a:srgbClr val="FF0000"/>
-                </a:solidFill>
-              </a:rPr>
-              <a:t>Partitioning</a:t>
-            </a:r>
-          </a:p>
-          <a:p>
-            <a:pPr lvl="1"/>
-            <a:r>
-              <a:rPr lang="en-US" dirty="0"/>
-              <a:t>In-Memory OLTP (</a:t>
-            </a:r>
-            <a:r>
-              <a:rPr lang="en-US" dirty="0" err="1"/>
-              <a:t>Hekaton</a:t>
-            </a:r>
-            <a:r>
-              <a:rPr lang="en-US" dirty="0"/>
-              <a:t>)</a:t>
-            </a:r>
+              <a:rPr lang="en-US" sz="7200" dirty="0" smtClean="0"/>
+              <a:t>DEMO</a:t>
+            </a:r>
+            <a:endParaRPr lang="en-US" sz="7200" dirty="0"/>
           </a:p>
         </p:txBody>
       </p:sp>
     </p:spTree>
     <p:extLst>
       <p:ext uri="{BB962C8B-B14F-4D97-AF65-F5344CB8AC3E}">
-        <p14:creationId xmlns:p14="http://schemas.microsoft.com/office/powerpoint/2010/main" val="3961792109"/>
+        <p14:creationId xmlns:p14="http://schemas.microsoft.com/office/powerpoint/2010/main" val="2107383363"/>
       </p:ext>
     </p:extLst>
   </p:cSld>
@@ -9294,90 +9324,124 @@
           <a:lstStyle/>
           <a:p>
             <a:r>
-              <a:rPr lang="en-US" dirty="0" smtClean="0"/>
+              <a:rPr lang="en-US" dirty="0"/>
+              <a:t>SQL Server Features</a:t>
+            </a:r>
+            <a:br>
+              <a:rPr lang="en-US" dirty="0"/>
+            </a:br>
+            <a:r>
+              <a:rPr lang="en-US" dirty="0"/>
+              <a:t>(Speed Dating)</a:t>
+            </a:r>
+          </a:p>
+        </p:txBody>
+      </p:sp>
+      <p:sp>
+        <p:nvSpPr>
+          <p:cNvPr id="3" name="Content Placeholder 2"/>
+          <p:cNvSpPr>
+            <a:spLocks noGrp="1"/>
+          </p:cNvSpPr>
+          <p:nvPr>
+            <p:ph idx="1"/>
+          </p:nvPr>
+        </p:nvSpPr>
+        <p:spPr/>
+        <p:txBody>
+          <a:bodyPr>
+            <a:normAutofit lnSpcReduction="10000"/>
+          </a:bodyPr>
+          <a:lstStyle/>
+          <a:p>
+            <a:r>
+              <a:rPr lang="en-US" dirty="0"/>
+              <a:t>Security</a:t>
+            </a:r>
+          </a:p>
+          <a:p>
+            <a:pPr lvl="1"/>
+            <a:r>
+              <a:rPr lang="en-US" dirty="0"/>
+              <a:t>Row-Level Security</a:t>
+            </a:r>
+          </a:p>
+          <a:p>
+            <a:pPr lvl="1"/>
+            <a:r>
+              <a:rPr lang="en-US" dirty="0"/>
+              <a:t>Always Encrypted</a:t>
+            </a:r>
+          </a:p>
+          <a:p>
+            <a:r>
+              <a:rPr lang="en-US" dirty="0"/>
+              <a:t>Utility</a:t>
+            </a:r>
+          </a:p>
+          <a:p>
+            <a:pPr lvl="1"/>
+            <a:r>
+              <a:rPr lang="en-US" dirty="0"/>
+              <a:t>Snapshots</a:t>
+            </a:r>
+          </a:p>
+          <a:p>
+            <a:pPr lvl="1"/>
+            <a:r>
+              <a:rPr lang="en-US" dirty="0"/>
+              <a:t>Temporal Tables</a:t>
+            </a:r>
+          </a:p>
+          <a:p>
+            <a:r>
+              <a:rPr lang="en-US" dirty="0"/>
+              <a:t>Performance</a:t>
+            </a:r>
+          </a:p>
+          <a:p>
+            <a:pPr lvl="1"/>
+            <a:r>
+              <a:rPr lang="en-US" dirty="0" err="1"/>
+              <a:t>Columnstore</a:t>
+            </a:r>
+            <a:r>
+              <a:rPr lang="en-US" dirty="0"/>
+              <a:t> Indexes</a:t>
+            </a:r>
+          </a:p>
+          <a:p>
+            <a:pPr lvl="1"/>
+            <a:r>
+              <a:rPr lang="en-US" dirty="0">
+                <a:solidFill>
+                  <a:srgbClr val="FF0000"/>
+                </a:solidFill>
+              </a:rPr>
               <a:t>Partitioning</a:t>
             </a:r>
-            <a:endParaRPr lang="en-US" dirty="0"/>
-          </a:p>
-        </p:txBody>
-      </p:sp>
-      <p:sp>
-        <p:nvSpPr>
-          <p:cNvPr id="3" name="Content Placeholder 2"/>
-          <p:cNvSpPr>
-            <a:spLocks noGrp="1"/>
-          </p:cNvSpPr>
-          <p:nvPr>
-            <p:ph idx="1"/>
-          </p:nvPr>
-        </p:nvSpPr>
-        <p:spPr/>
-        <p:txBody>
-          <a:bodyPr/>
-          <a:lstStyle/>
-          <a:p>
-            <a:r>
-              <a:rPr lang="en-US" dirty="0" smtClean="0"/>
-              <a:t>Spread table data across multiple B-trees</a:t>
-            </a:r>
-          </a:p>
-          <a:p>
-            <a:r>
-              <a:rPr lang="en-US" dirty="0" smtClean="0"/>
-              <a:t>For example, place older data on slower, cheaper storage</a:t>
-            </a:r>
-          </a:p>
-          <a:p>
-            <a:r>
-              <a:rPr lang="en-US" dirty="0" smtClean="0"/>
-              <a:t>Usually for very large data sets, but has other purposes</a:t>
-            </a:r>
-          </a:p>
-          <a:p>
-            <a:r>
-              <a:rPr lang="en-US" dirty="0" smtClean="0"/>
-              <a:t>Separation defined by a “partitioning function” and a “partitioning scheme”</a:t>
-            </a:r>
           </a:p>
           <a:p>
             <a:pPr lvl="1"/>
             <a:r>
-              <a:rPr lang="en-US" dirty="0" smtClean="0"/>
-              <a:t>Range LEFT (think of as &gt;=)</a:t>
-            </a:r>
-          </a:p>
-          <a:p>
-            <a:pPr lvl="1"/>
-            <a:r>
-              <a:rPr lang="en-US" dirty="0" smtClean="0"/>
-              <a:t>Range RIGHT (think of as </a:t>
-            </a:r>
-            <a:r>
-              <a:rPr lang="en-US" dirty="0" smtClean="0"/>
-              <a:t>&lt;)</a:t>
-            </a:r>
-          </a:p>
-          <a:p>
-            <a:r>
-              <a:rPr lang="en-US" dirty="0" smtClean="0"/>
-              <a:t>Another use: combine </a:t>
-            </a:r>
-            <a:r>
-              <a:rPr lang="en-US" dirty="0"/>
-              <a:t>with temporal tables to enable quick archival </a:t>
-            </a:r>
-            <a:r>
-              <a:rPr lang="en-US" dirty="0" smtClean="0"/>
-              <a:t>capability</a:t>
-            </a:r>
-            <a:endParaRPr lang="en-US" dirty="0"/>
+              <a:rPr lang="en-US" dirty="0"/>
+              <a:t>In-Memory OLTP (</a:t>
+            </a:r>
+            <a:r>
+              <a:rPr lang="en-US" dirty="0" err="1"/>
+              <a:t>Hekaton</a:t>
+            </a:r>
+            <a:r>
+              <a:rPr lang="en-US" dirty="0"/>
+              <a:t>)</a:t>
+            </a:r>
           </a:p>
         </p:txBody>
       </p:sp>
     </p:spTree>
     <p:extLst>
       <p:ext uri="{BB962C8B-B14F-4D97-AF65-F5344CB8AC3E}">
-        <p14:creationId xmlns:p14="http://schemas.microsoft.com/office/powerpoint/2010/main" val="1770415838"/>
+        <p14:creationId xmlns:p14="http://schemas.microsoft.com/office/powerpoint/2010/main" val="3961792109"/>
       </p:ext>
     </p:extLst>
   </p:cSld>
@@ -9420,16 +9484,10 @@
           <a:lstStyle/>
           <a:p>
             <a:r>
-              <a:rPr lang="en-US" dirty="0"/>
-              <a:t>SQL Server Features</a:t>
-            </a:r>
-            <a:br>
-              <a:rPr lang="en-US" dirty="0"/>
-            </a:br>
-            <a:r>
-              <a:rPr lang="en-US" dirty="0"/>
-              <a:t>(Speed Dating)</a:t>
-            </a:r>
+              <a:rPr lang="en-US" dirty="0" smtClean="0"/>
+              <a:t>Partitioning</a:t>
+            </a:r>
+            <a:endParaRPr lang="en-US" dirty="0"/>
           </a:p>
         </p:txBody>
       </p:sp>
@@ -9445,107 +9503,71 @@
         </p:nvSpPr>
         <p:spPr/>
         <p:txBody>
-          <a:bodyPr>
-            <a:normAutofit lnSpcReduction="10000"/>
-          </a:bodyPr>
+          <a:bodyPr/>
           <a:lstStyle/>
           <a:p>
             <a:r>
-              <a:rPr lang="en-US" dirty="0"/>
-              <a:t>Security</a:t>
+              <a:rPr lang="en-US" dirty="0" smtClean="0"/>
+              <a:t>Spread table data across multiple B-trees</a:t>
+            </a:r>
+          </a:p>
+          <a:p>
+            <a:r>
+              <a:rPr lang="en-US" dirty="0" smtClean="0"/>
+              <a:t>For example, place older data on slower, cheaper storage</a:t>
+            </a:r>
+          </a:p>
+          <a:p>
+            <a:r>
+              <a:rPr lang="en-US" dirty="0" smtClean="0"/>
+              <a:t>Usually for very large data sets, but has other purposes</a:t>
+            </a:r>
+          </a:p>
+          <a:p>
+            <a:r>
+              <a:rPr lang="en-US" dirty="0" smtClean="0"/>
+              <a:t>Separation defined by a “partitioning function” and a “partitioning scheme”</a:t>
             </a:r>
           </a:p>
           <a:p>
             <a:pPr lvl="1"/>
             <a:r>
-              <a:rPr lang="en-US" dirty="0"/>
-              <a:t>Row-Level Security</a:t>
+              <a:rPr lang="en-US" dirty="0" smtClean="0"/>
+              <a:t>Range LEFT (think of as &gt;=)</a:t>
             </a:r>
           </a:p>
           <a:p>
             <a:pPr lvl="1"/>
             <a:r>
-              <a:rPr lang="en-US" dirty="0"/>
-              <a:t>Always Encrypted</a:t>
-            </a:r>
-          </a:p>
-          <a:p>
-            <a:r>
-              <a:rPr lang="en-US" dirty="0"/>
-              <a:t>Utility</a:t>
-            </a:r>
-          </a:p>
-          <a:p>
-            <a:pPr lvl="1"/>
-            <a:r>
-              <a:rPr lang="en-US" dirty="0"/>
-              <a:t>Snapshots</a:t>
-            </a:r>
-          </a:p>
-          <a:p>
-            <a:pPr lvl="1"/>
-            <a:r>
-              <a:rPr lang="en-US" dirty="0"/>
-              <a:t>Temporal Tables</a:t>
-            </a:r>
-          </a:p>
-          <a:p>
-            <a:r>
-              <a:rPr lang="en-US" dirty="0"/>
-              <a:t>Performance</a:t>
-            </a:r>
-          </a:p>
-          <a:p>
-            <a:pPr lvl="1"/>
-            <a:r>
-              <a:rPr lang="en-US" dirty="0" err="1"/>
-              <a:t>Columnstore</a:t>
-            </a:r>
-            <a:r>
-              <a:rPr lang="en-US" dirty="0"/>
-              <a:t> Indexes</a:t>
-            </a:r>
-          </a:p>
-          <a:p>
-            <a:pPr lvl="1"/>
-            <a:r>
-              <a:rPr lang="en-US" dirty="0"/>
-              <a:t>Partitioning</a:t>
-            </a:r>
-          </a:p>
-          <a:p>
-            <a:pPr lvl="1"/>
-            <a:r>
-              <a:rPr lang="en-US" dirty="0">
-                <a:solidFill>
-                  <a:srgbClr val="FF0000"/>
-                </a:solidFill>
-              </a:rPr>
-              <a:t>In-Memory OLTP (</a:t>
-            </a:r>
-            <a:r>
-              <a:rPr lang="en-US" dirty="0" err="1">
-                <a:solidFill>
-                  <a:srgbClr val="FF0000"/>
-                </a:solidFill>
-              </a:rPr>
-              <a:t>Hekaton</a:t>
-            </a:r>
-            <a:r>
-              <a:rPr lang="en-US" dirty="0">
-                <a:solidFill>
-                  <a:srgbClr val="FF0000"/>
-                </a:solidFill>
-              </a:rPr>
-              <a:t>)</a:t>
-            </a:r>
+              <a:rPr lang="en-US" dirty="0" smtClean="0"/>
+              <a:t>Range RIGHT (think of as </a:t>
+            </a:r>
+            <a:r>
+              <a:rPr lang="en-US" dirty="0" smtClean="0"/>
+              <a:t>&lt;)</a:t>
+            </a:r>
+          </a:p>
+          <a:p>
+            <a:r>
+              <a:rPr lang="en-US" dirty="0" smtClean="0"/>
+              <a:t>Another use: combine </a:t>
+            </a:r>
+            <a:r>
+              <a:rPr lang="en-US" dirty="0"/>
+              <a:t>with temporal tables to enable quick archival </a:t>
+            </a:r>
+            <a:r>
+              <a:rPr lang="en-US" dirty="0" smtClean="0"/>
+              <a:t>capability</a:t>
+            </a:r>
+            <a:endParaRPr lang="en-US" dirty="0"/>
           </a:p>
         </p:txBody>
       </p:sp>
     </p:spTree>
     <p:extLst>
       <p:ext uri="{BB962C8B-B14F-4D97-AF65-F5344CB8AC3E}">
-        <p14:creationId xmlns:p14="http://schemas.microsoft.com/office/powerpoint/2010/main" val="4052465235"/>
+        <p14:creationId xmlns:p14="http://schemas.microsoft.com/office/powerpoint/2010/main" val="1770415838"/>
       </p:ext>
     </p:extLst>
   </p:cSld>
@@ -9588,56 +9610,298 @@
           <a:lstStyle/>
           <a:p>
             <a:r>
-              <a:rPr lang="en-US" dirty="0"/>
-              <a:t>Resources</a:t>
-            </a:r>
-          </a:p>
-        </p:txBody>
-      </p:sp>
-      <p:sp>
-        <p:nvSpPr>
-          <p:cNvPr id="3" name="Content Placeholder 2"/>
-          <p:cNvSpPr>
-            <a:spLocks noGrp="1"/>
-          </p:cNvSpPr>
-          <p:nvPr>
-            <p:ph idx="1"/>
-          </p:nvPr>
-        </p:nvSpPr>
-        <p:spPr/>
-        <p:txBody>
-          <a:bodyPr/>
-          <a:lstStyle/>
-          <a:p>
-            <a:r>
-              <a:rPr lang="en-US" dirty="0"/>
-              <a:t>SQL Server 2016 Express Edition download</a:t>
-            </a:r>
-          </a:p>
-          <a:p>
-            <a:pPr marL="324000" lvl="1" indent="0">
-              <a:buNone/>
-            </a:pPr>
-            <a:r>
-              <a:rPr lang="en-US">
-                <a:hlinkClick r:id="rId2"/>
-              </a:rPr>
-              <a:t>https://www.microsoft.com/en-us/download/details.aspx?id=52679</a:t>
-            </a:r>
-            <a:endParaRPr lang="en-US"/>
-          </a:p>
-          <a:p>
-            <a:pPr marL="324000" lvl="1" indent="0">
-              <a:buNone/>
-            </a:pPr>
-            <a:endParaRPr lang="en-US"/>
-          </a:p>
-        </p:txBody>
-      </p:sp>
+              <a:rPr lang="en-US" dirty="0" smtClean="0"/>
+              <a:t>Traditional SQL Server Index</a:t>
+            </a:r>
+            <a:endParaRPr lang="en-US" dirty="0"/>
+          </a:p>
+        </p:txBody>
+      </p:sp>
+      <p:pic>
+        <p:nvPicPr>
+          <p:cNvPr id="4" name="Picture 3"/>
+          <p:cNvPicPr>
+            <a:picLocks noChangeAspect="1"/>
+          </p:cNvPicPr>
+          <p:nvPr/>
+        </p:nvPicPr>
+        <p:blipFill>
+          <a:blip r:embed="rId2"/>
+          <a:stretch>
+            <a:fillRect/>
+          </a:stretch>
+        </p:blipFill>
+        <p:spPr>
+          <a:xfrm>
+            <a:off x="2481942" y="1980419"/>
+            <a:ext cx="6906053" cy="4552064"/>
+          </a:xfrm>
+          <a:prstGeom prst="rect">
+            <a:avLst/>
+          </a:prstGeom>
+        </p:spPr>
+      </p:pic>
     </p:spTree>
     <p:extLst>
       <p:ext uri="{BB962C8B-B14F-4D97-AF65-F5344CB8AC3E}">
-        <p14:creationId xmlns:p14="http://schemas.microsoft.com/office/powerpoint/2010/main" val="3472261720"/>
+        <p14:creationId xmlns:p14="http://schemas.microsoft.com/office/powerpoint/2010/main" val="483027270"/>
+      </p:ext>
+    </p:extLst>
+  </p:cSld>
+  <p:clrMapOvr>
+    <a:masterClrMapping/>
+  </p:clrMapOvr>
+</p:sld>
+</file>
+
+<file path=ppt/slides/slide28.xml><?xml version="1.0" encoding="utf-8"?>
+<p:sld xmlns:a="http://schemas.openxmlformats.org/drawingml/2006/main" xmlns:r="http://schemas.openxmlformats.org/officeDocument/2006/relationships" xmlns:p="http://schemas.openxmlformats.org/presentationml/2006/main">
+  <p:cSld>
+    <p:spTree>
+      <p:nvGrpSpPr>
+        <p:cNvPr id="1" name=""/>
+        <p:cNvGrpSpPr/>
+        <p:nvPr/>
+      </p:nvGrpSpPr>
+      <p:grpSpPr>
+        <a:xfrm>
+          <a:off x="0" y="0"/>
+          <a:ext cx="0" cy="0"/>
+          <a:chOff x="0" y="0"/>
+          <a:chExt cx="0" cy="0"/>
+        </a:xfrm>
+      </p:grpSpPr>
+      <p:sp>
+        <p:nvSpPr>
+          <p:cNvPr id="2" name="Title 1"/>
+          <p:cNvSpPr>
+            <a:spLocks noGrp="1"/>
+          </p:cNvSpPr>
+          <p:nvPr>
+            <p:ph type="title"/>
+          </p:nvPr>
+        </p:nvSpPr>
+        <p:spPr/>
+        <p:txBody>
+          <a:bodyPr/>
+          <a:lstStyle/>
+          <a:p>
+            <a:r>
+              <a:rPr lang="en-US" dirty="0" smtClean="0"/>
+              <a:t>Partitioned SQL Server Index</a:t>
+            </a:r>
+            <a:endParaRPr lang="en-US" dirty="0"/>
+          </a:p>
+        </p:txBody>
+      </p:sp>
+      <p:pic>
+        <p:nvPicPr>
+          <p:cNvPr id="3" name="Picture 2"/>
+          <p:cNvPicPr>
+            <a:picLocks noChangeAspect="1"/>
+          </p:cNvPicPr>
+          <p:nvPr/>
+        </p:nvPicPr>
+        <p:blipFill>
+          <a:blip r:embed="rId2"/>
+          <a:stretch>
+            <a:fillRect/>
+          </a:stretch>
+        </p:blipFill>
+        <p:spPr>
+          <a:xfrm>
+            <a:off x="907113" y="2273440"/>
+            <a:ext cx="10116515" cy="3237395"/>
+          </a:xfrm>
+          <a:prstGeom prst="rect">
+            <a:avLst/>
+          </a:prstGeom>
+        </p:spPr>
+      </p:pic>
+    </p:spTree>
+    <p:extLst>
+      <p:ext uri="{BB962C8B-B14F-4D97-AF65-F5344CB8AC3E}">
+        <p14:creationId xmlns:p14="http://schemas.microsoft.com/office/powerpoint/2010/main" val="1682789575"/>
+      </p:ext>
+    </p:extLst>
+  </p:cSld>
+  <p:clrMapOvr>
+    <a:masterClrMapping/>
+  </p:clrMapOvr>
+</p:sld>
+</file>
+
+<file path=ppt/slides/slide29.xml><?xml version="1.0" encoding="utf-8"?>
+<p:sld xmlns:a="http://schemas.openxmlformats.org/drawingml/2006/main" xmlns:r="http://schemas.openxmlformats.org/officeDocument/2006/relationships" xmlns:p="http://schemas.openxmlformats.org/presentationml/2006/main">
+  <p:cSld>
+    <p:spTree>
+      <p:nvGrpSpPr>
+        <p:cNvPr id="1" name=""/>
+        <p:cNvGrpSpPr/>
+        <p:nvPr/>
+      </p:nvGrpSpPr>
+      <p:grpSpPr>
+        <a:xfrm>
+          <a:off x="0" y="0"/>
+          <a:ext cx="0" cy="0"/>
+          <a:chOff x="0" y="0"/>
+          <a:chExt cx="0" cy="0"/>
+        </a:xfrm>
+      </p:grpSpPr>
+      <p:sp>
+        <p:nvSpPr>
+          <p:cNvPr id="2" name="Title 1"/>
+          <p:cNvSpPr>
+            <a:spLocks noGrp="1"/>
+          </p:cNvSpPr>
+          <p:nvPr>
+            <p:ph type="title"/>
+          </p:nvPr>
+        </p:nvSpPr>
+        <p:spPr/>
+        <p:txBody>
+          <a:bodyPr/>
+          <a:lstStyle/>
+          <a:p>
+            <a:r>
+              <a:rPr lang="en-US" dirty="0"/>
+              <a:t>Partitioning</a:t>
+            </a:r>
+            <a:endParaRPr lang="en-US" dirty="0"/>
+          </a:p>
+        </p:txBody>
+      </p:sp>
+      <p:grpSp>
+        <p:nvGrpSpPr>
+          <p:cNvPr id="4" name="Group 3"/>
+          <p:cNvGrpSpPr/>
+          <p:nvPr/>
+        </p:nvGrpSpPr>
+        <p:grpSpPr>
+          <a:xfrm>
+            <a:off x="8549640" y="2949746"/>
+            <a:ext cx="2784474" cy="3057354"/>
+            <a:chOff x="8549640" y="2949746"/>
+            <a:chExt cx="2784474" cy="3057354"/>
+          </a:xfrm>
+        </p:grpSpPr>
+        <p:pic>
+          <p:nvPicPr>
+            <p:cNvPr id="1026" name="Picture 2" descr="Image result for keyboard drawing"/>
+            <p:cNvPicPr>
+              <a:picLocks noChangeAspect="1" noChangeArrowheads="1"/>
+            </p:cNvPicPr>
+            <p:nvPr/>
+          </p:nvPicPr>
+          <p:blipFill>
+            <a:blip r:embed="rId2">
+              <a:extLst>
+                <a:ext uri="{28A0092B-C50C-407E-A947-70E740481C1C}">
+                  <a14:useLocalDpi xmlns:a14="http://schemas.microsoft.com/office/drawing/2010/main" val="0"/>
+                </a:ext>
+              </a:extLst>
+            </a:blip>
+            <a:srcRect/>
+            <a:stretch>
+              <a:fillRect/>
+            </a:stretch>
+          </p:blipFill>
+          <p:spPr bwMode="auto">
+            <a:xfrm>
+              <a:off x="8549640" y="4031864"/>
+              <a:ext cx="2784474" cy="1975236"/>
+            </a:xfrm>
+            <a:prstGeom prst="rect">
+              <a:avLst/>
+            </a:prstGeom>
+            <a:noFill/>
+            <a:extLst>
+              <a:ext uri="{909E8E84-426E-40DD-AFC4-6F175D3DCCD1}">
+                <a14:hiddenFill xmlns:a14="http://schemas.microsoft.com/office/drawing/2010/main">
+                  <a:solidFill>
+                    <a:srgbClr val="FFFFFF"/>
+                  </a:solidFill>
+                </a14:hiddenFill>
+              </a:ext>
+            </a:extLst>
+          </p:spPr>
+        </p:pic>
+        <p:pic>
+          <p:nvPicPr>
+            <p:cNvPr id="1028" name="Picture 4" descr="Image result for database"/>
+            <p:cNvPicPr>
+              <a:picLocks noChangeAspect="1" noChangeArrowheads="1"/>
+            </p:cNvPicPr>
+            <p:nvPr/>
+          </p:nvPicPr>
+          <p:blipFill>
+            <a:blip r:embed="rId3">
+              <a:extLst>
+                <a:ext uri="{28A0092B-C50C-407E-A947-70E740481C1C}">
+                  <a14:useLocalDpi xmlns:a14="http://schemas.microsoft.com/office/drawing/2010/main" val="0"/>
+                </a:ext>
+              </a:extLst>
+            </a:blip>
+            <a:srcRect/>
+            <a:stretch>
+              <a:fillRect/>
+            </a:stretch>
+          </p:blipFill>
+          <p:spPr bwMode="auto">
+            <a:xfrm>
+              <a:off x="8972549" y="2949746"/>
+              <a:ext cx="1218565" cy="1406037"/>
+            </a:xfrm>
+            <a:prstGeom prst="rect">
+              <a:avLst/>
+            </a:prstGeom>
+            <a:noFill/>
+            <a:extLst>
+              <a:ext uri="{909E8E84-426E-40DD-AFC4-6F175D3DCCD1}">
+                <a14:hiddenFill xmlns:a14="http://schemas.microsoft.com/office/drawing/2010/main">
+                  <a:solidFill>
+                    <a:srgbClr val="FFFFFF"/>
+                  </a:solidFill>
+                </a14:hiddenFill>
+              </a:ext>
+            </a:extLst>
+          </p:spPr>
+        </p:pic>
+      </p:grpSp>
+      <p:sp>
+        <p:nvSpPr>
+          <p:cNvPr id="5" name="TextBox 4"/>
+          <p:cNvSpPr txBox="1"/>
+          <p:nvPr/>
+        </p:nvSpPr>
+        <p:spPr>
+          <a:xfrm>
+            <a:off x="1394460" y="3155454"/>
+            <a:ext cx="5474970" cy="1200329"/>
+          </a:xfrm>
+          <a:prstGeom prst="rect">
+            <a:avLst/>
+          </a:prstGeom>
+          <a:noFill/>
+        </p:spPr>
+        <p:txBody>
+          <a:bodyPr wrap="square" rtlCol="0">
+            <a:spAutoFit/>
+          </a:bodyPr>
+          <a:lstStyle/>
+          <a:p>
+            <a:r>
+              <a:rPr lang="en-US" sz="7200" dirty="0" smtClean="0"/>
+              <a:t>DEMO</a:t>
+            </a:r>
+            <a:endParaRPr lang="en-US" sz="7200" dirty="0"/>
+          </a:p>
+        </p:txBody>
+      </p:sp>
+    </p:spTree>
+    <p:extLst>
+      <p:ext uri="{BB962C8B-B14F-4D97-AF65-F5344CB8AC3E}">
+        <p14:creationId xmlns:p14="http://schemas.microsoft.com/office/powerpoint/2010/main" val="3546449222"/>
       </p:ext>
     </p:extLst>
   </p:cSld>
@@ -9792,6 +10056,517 @@
     <p:extLst>
       <p:ext uri="{BB962C8B-B14F-4D97-AF65-F5344CB8AC3E}">
         <p14:creationId xmlns:p14="http://schemas.microsoft.com/office/powerpoint/2010/main" val="1248156866"/>
+      </p:ext>
+    </p:extLst>
+  </p:cSld>
+  <p:clrMapOvr>
+    <a:masterClrMapping/>
+  </p:clrMapOvr>
+</p:sld>
+</file>
+
+<file path=ppt/slides/slide30.xml><?xml version="1.0" encoding="utf-8"?>
+<p:sld xmlns:a="http://schemas.openxmlformats.org/drawingml/2006/main" xmlns:r="http://schemas.openxmlformats.org/officeDocument/2006/relationships" xmlns:p="http://schemas.openxmlformats.org/presentationml/2006/main">
+  <p:cSld>
+    <p:spTree>
+      <p:nvGrpSpPr>
+        <p:cNvPr id="1" name=""/>
+        <p:cNvGrpSpPr/>
+        <p:nvPr/>
+      </p:nvGrpSpPr>
+      <p:grpSpPr>
+        <a:xfrm>
+          <a:off x="0" y="0"/>
+          <a:ext cx="0" cy="0"/>
+          <a:chOff x="0" y="0"/>
+          <a:chExt cx="0" cy="0"/>
+        </a:xfrm>
+      </p:grpSpPr>
+      <p:sp>
+        <p:nvSpPr>
+          <p:cNvPr id="2" name="Title 1"/>
+          <p:cNvSpPr>
+            <a:spLocks noGrp="1"/>
+          </p:cNvSpPr>
+          <p:nvPr>
+            <p:ph type="title"/>
+          </p:nvPr>
+        </p:nvSpPr>
+        <p:spPr/>
+        <p:txBody>
+          <a:bodyPr/>
+          <a:lstStyle/>
+          <a:p>
+            <a:r>
+              <a:rPr lang="en-US" dirty="0"/>
+              <a:t>SQL Server Features</a:t>
+            </a:r>
+            <a:br>
+              <a:rPr lang="en-US" dirty="0"/>
+            </a:br>
+            <a:r>
+              <a:rPr lang="en-US" dirty="0"/>
+              <a:t>(Speed Dating)</a:t>
+            </a:r>
+          </a:p>
+        </p:txBody>
+      </p:sp>
+      <p:sp>
+        <p:nvSpPr>
+          <p:cNvPr id="3" name="Content Placeholder 2"/>
+          <p:cNvSpPr>
+            <a:spLocks noGrp="1"/>
+          </p:cNvSpPr>
+          <p:nvPr>
+            <p:ph idx="1"/>
+          </p:nvPr>
+        </p:nvSpPr>
+        <p:spPr/>
+        <p:txBody>
+          <a:bodyPr>
+            <a:normAutofit lnSpcReduction="10000"/>
+          </a:bodyPr>
+          <a:lstStyle/>
+          <a:p>
+            <a:r>
+              <a:rPr lang="en-US" dirty="0"/>
+              <a:t>Security</a:t>
+            </a:r>
+          </a:p>
+          <a:p>
+            <a:pPr lvl="1"/>
+            <a:r>
+              <a:rPr lang="en-US" dirty="0"/>
+              <a:t>Row-Level Security</a:t>
+            </a:r>
+          </a:p>
+          <a:p>
+            <a:pPr lvl="1"/>
+            <a:r>
+              <a:rPr lang="en-US" dirty="0"/>
+              <a:t>Always Encrypted</a:t>
+            </a:r>
+          </a:p>
+          <a:p>
+            <a:r>
+              <a:rPr lang="en-US" dirty="0"/>
+              <a:t>Utility</a:t>
+            </a:r>
+          </a:p>
+          <a:p>
+            <a:pPr lvl="1"/>
+            <a:r>
+              <a:rPr lang="en-US" dirty="0"/>
+              <a:t>Snapshots</a:t>
+            </a:r>
+          </a:p>
+          <a:p>
+            <a:pPr lvl="1"/>
+            <a:r>
+              <a:rPr lang="en-US" dirty="0"/>
+              <a:t>Temporal Tables</a:t>
+            </a:r>
+          </a:p>
+          <a:p>
+            <a:r>
+              <a:rPr lang="en-US" dirty="0"/>
+              <a:t>Performance</a:t>
+            </a:r>
+          </a:p>
+          <a:p>
+            <a:pPr lvl="1"/>
+            <a:r>
+              <a:rPr lang="en-US" dirty="0" err="1"/>
+              <a:t>Columnstore</a:t>
+            </a:r>
+            <a:r>
+              <a:rPr lang="en-US" dirty="0"/>
+              <a:t> Indexes</a:t>
+            </a:r>
+          </a:p>
+          <a:p>
+            <a:pPr lvl="1"/>
+            <a:r>
+              <a:rPr lang="en-US" dirty="0"/>
+              <a:t>Partitioning</a:t>
+            </a:r>
+          </a:p>
+          <a:p>
+            <a:pPr lvl="1"/>
+            <a:r>
+              <a:rPr lang="en-US" dirty="0">
+                <a:solidFill>
+                  <a:srgbClr val="FF0000"/>
+                </a:solidFill>
+              </a:rPr>
+              <a:t>In-Memory OLTP (</a:t>
+            </a:r>
+            <a:r>
+              <a:rPr lang="en-US" dirty="0" err="1">
+                <a:solidFill>
+                  <a:srgbClr val="FF0000"/>
+                </a:solidFill>
+              </a:rPr>
+              <a:t>Hekaton</a:t>
+            </a:r>
+            <a:r>
+              <a:rPr lang="en-US" dirty="0">
+                <a:solidFill>
+                  <a:srgbClr val="FF0000"/>
+                </a:solidFill>
+              </a:rPr>
+              <a:t>)</a:t>
+            </a:r>
+          </a:p>
+        </p:txBody>
+      </p:sp>
+    </p:spTree>
+    <p:extLst>
+      <p:ext uri="{BB962C8B-B14F-4D97-AF65-F5344CB8AC3E}">
+        <p14:creationId xmlns:p14="http://schemas.microsoft.com/office/powerpoint/2010/main" val="4052465235"/>
+      </p:ext>
+    </p:extLst>
+  </p:cSld>
+  <p:clrMapOvr>
+    <a:masterClrMapping/>
+  </p:clrMapOvr>
+</p:sld>
+</file>
+
+<file path=ppt/slides/slide31.xml><?xml version="1.0" encoding="utf-8"?>
+<p:sld xmlns:a="http://schemas.openxmlformats.org/drawingml/2006/main" xmlns:r="http://schemas.openxmlformats.org/officeDocument/2006/relationships" xmlns:p="http://schemas.openxmlformats.org/presentationml/2006/main">
+  <p:cSld>
+    <p:spTree>
+      <p:nvGrpSpPr>
+        <p:cNvPr id="1" name=""/>
+        <p:cNvGrpSpPr/>
+        <p:nvPr/>
+      </p:nvGrpSpPr>
+      <p:grpSpPr>
+        <a:xfrm>
+          <a:off x="0" y="0"/>
+          <a:ext cx="0" cy="0"/>
+          <a:chOff x="0" y="0"/>
+          <a:chExt cx="0" cy="0"/>
+        </a:xfrm>
+      </p:grpSpPr>
+      <p:sp>
+        <p:nvSpPr>
+          <p:cNvPr id="2" name="Title 1"/>
+          <p:cNvSpPr>
+            <a:spLocks noGrp="1"/>
+          </p:cNvSpPr>
+          <p:nvPr>
+            <p:ph type="title"/>
+          </p:nvPr>
+        </p:nvSpPr>
+        <p:spPr/>
+        <p:txBody>
+          <a:bodyPr/>
+          <a:lstStyle/>
+          <a:p>
+            <a:r>
+              <a:rPr lang="en-US" dirty="0"/>
+              <a:t>In-Memory OLTP</a:t>
+            </a:r>
+          </a:p>
+        </p:txBody>
+      </p:sp>
+      <p:sp>
+        <p:nvSpPr>
+          <p:cNvPr id="3" name="Content Placeholder 2"/>
+          <p:cNvSpPr>
+            <a:spLocks noGrp="1"/>
+          </p:cNvSpPr>
+          <p:nvPr>
+            <p:ph idx="1"/>
+          </p:nvPr>
+        </p:nvSpPr>
+        <p:spPr/>
+        <p:txBody>
+          <a:bodyPr/>
+          <a:lstStyle/>
+          <a:p>
+            <a:endParaRPr lang="en-US" dirty="0"/>
+          </a:p>
+        </p:txBody>
+      </p:sp>
+    </p:spTree>
+    <p:extLst>
+      <p:ext uri="{BB962C8B-B14F-4D97-AF65-F5344CB8AC3E}">
+        <p14:creationId xmlns:p14="http://schemas.microsoft.com/office/powerpoint/2010/main" val="1510375845"/>
+      </p:ext>
+    </p:extLst>
+  </p:cSld>
+  <p:clrMapOvr>
+    <a:masterClrMapping/>
+  </p:clrMapOvr>
+</p:sld>
+</file>
+
+<file path=ppt/slides/slide32.xml><?xml version="1.0" encoding="utf-8"?>
+<p:sld xmlns:a="http://schemas.openxmlformats.org/drawingml/2006/main" xmlns:r="http://schemas.openxmlformats.org/officeDocument/2006/relationships" xmlns:p="http://schemas.openxmlformats.org/presentationml/2006/main">
+  <p:cSld>
+    <p:spTree>
+      <p:nvGrpSpPr>
+        <p:cNvPr id="1" name=""/>
+        <p:cNvGrpSpPr/>
+        <p:nvPr/>
+      </p:nvGrpSpPr>
+      <p:grpSpPr>
+        <a:xfrm>
+          <a:off x="0" y="0"/>
+          <a:ext cx="0" cy="0"/>
+          <a:chOff x="0" y="0"/>
+          <a:chExt cx="0" cy="0"/>
+        </a:xfrm>
+      </p:grpSpPr>
+      <p:sp>
+        <p:nvSpPr>
+          <p:cNvPr id="2" name="Title 1"/>
+          <p:cNvSpPr>
+            <a:spLocks noGrp="1"/>
+          </p:cNvSpPr>
+          <p:nvPr>
+            <p:ph type="title"/>
+          </p:nvPr>
+        </p:nvSpPr>
+        <p:spPr/>
+        <p:txBody>
+          <a:bodyPr/>
+          <a:lstStyle/>
+          <a:p>
+            <a:r>
+              <a:rPr lang="en-US" dirty="0" smtClean="0"/>
+              <a:t>In-Memory OLTP</a:t>
+            </a:r>
+            <a:endParaRPr lang="en-US" dirty="0"/>
+          </a:p>
+        </p:txBody>
+      </p:sp>
+      <p:grpSp>
+        <p:nvGrpSpPr>
+          <p:cNvPr id="4" name="Group 3"/>
+          <p:cNvGrpSpPr/>
+          <p:nvPr/>
+        </p:nvGrpSpPr>
+        <p:grpSpPr>
+          <a:xfrm>
+            <a:off x="8549640" y="2949746"/>
+            <a:ext cx="2784474" cy="3057354"/>
+            <a:chOff x="8549640" y="2949746"/>
+            <a:chExt cx="2784474" cy="3057354"/>
+          </a:xfrm>
+        </p:grpSpPr>
+        <p:pic>
+          <p:nvPicPr>
+            <p:cNvPr id="1026" name="Picture 2" descr="Image result for keyboard drawing"/>
+            <p:cNvPicPr>
+              <a:picLocks noChangeAspect="1" noChangeArrowheads="1"/>
+            </p:cNvPicPr>
+            <p:nvPr/>
+          </p:nvPicPr>
+          <p:blipFill>
+            <a:blip r:embed="rId2">
+              <a:extLst>
+                <a:ext uri="{28A0092B-C50C-407E-A947-70E740481C1C}">
+                  <a14:useLocalDpi xmlns:a14="http://schemas.microsoft.com/office/drawing/2010/main" val="0"/>
+                </a:ext>
+              </a:extLst>
+            </a:blip>
+            <a:srcRect/>
+            <a:stretch>
+              <a:fillRect/>
+            </a:stretch>
+          </p:blipFill>
+          <p:spPr bwMode="auto">
+            <a:xfrm>
+              <a:off x="8549640" y="4031864"/>
+              <a:ext cx="2784474" cy="1975236"/>
+            </a:xfrm>
+            <a:prstGeom prst="rect">
+              <a:avLst/>
+            </a:prstGeom>
+            <a:noFill/>
+            <a:extLst>
+              <a:ext uri="{909E8E84-426E-40DD-AFC4-6F175D3DCCD1}">
+                <a14:hiddenFill xmlns:a14="http://schemas.microsoft.com/office/drawing/2010/main">
+                  <a:solidFill>
+                    <a:srgbClr val="FFFFFF"/>
+                  </a:solidFill>
+                </a14:hiddenFill>
+              </a:ext>
+            </a:extLst>
+          </p:spPr>
+        </p:pic>
+        <p:pic>
+          <p:nvPicPr>
+            <p:cNvPr id="1028" name="Picture 4" descr="Image result for database"/>
+            <p:cNvPicPr>
+              <a:picLocks noChangeAspect="1" noChangeArrowheads="1"/>
+            </p:cNvPicPr>
+            <p:nvPr/>
+          </p:nvPicPr>
+          <p:blipFill>
+            <a:blip r:embed="rId3">
+              <a:extLst>
+                <a:ext uri="{28A0092B-C50C-407E-A947-70E740481C1C}">
+                  <a14:useLocalDpi xmlns:a14="http://schemas.microsoft.com/office/drawing/2010/main" val="0"/>
+                </a:ext>
+              </a:extLst>
+            </a:blip>
+            <a:srcRect/>
+            <a:stretch>
+              <a:fillRect/>
+            </a:stretch>
+          </p:blipFill>
+          <p:spPr bwMode="auto">
+            <a:xfrm>
+              <a:off x="8972549" y="2949746"/>
+              <a:ext cx="1218565" cy="1406037"/>
+            </a:xfrm>
+            <a:prstGeom prst="rect">
+              <a:avLst/>
+            </a:prstGeom>
+            <a:noFill/>
+            <a:extLst>
+              <a:ext uri="{909E8E84-426E-40DD-AFC4-6F175D3DCCD1}">
+                <a14:hiddenFill xmlns:a14="http://schemas.microsoft.com/office/drawing/2010/main">
+                  <a:solidFill>
+                    <a:srgbClr val="FFFFFF"/>
+                  </a:solidFill>
+                </a14:hiddenFill>
+              </a:ext>
+            </a:extLst>
+          </p:spPr>
+        </p:pic>
+      </p:grpSp>
+      <p:sp>
+        <p:nvSpPr>
+          <p:cNvPr id="5" name="TextBox 4"/>
+          <p:cNvSpPr txBox="1"/>
+          <p:nvPr/>
+        </p:nvSpPr>
+        <p:spPr>
+          <a:xfrm>
+            <a:off x="1394460" y="3155454"/>
+            <a:ext cx="5474970" cy="1200329"/>
+          </a:xfrm>
+          <a:prstGeom prst="rect">
+            <a:avLst/>
+          </a:prstGeom>
+          <a:noFill/>
+        </p:spPr>
+        <p:txBody>
+          <a:bodyPr wrap="square" rtlCol="0">
+            <a:spAutoFit/>
+          </a:bodyPr>
+          <a:lstStyle/>
+          <a:p>
+            <a:r>
+              <a:rPr lang="en-US" sz="7200" dirty="0" smtClean="0"/>
+              <a:t>DEMO</a:t>
+            </a:r>
+            <a:endParaRPr lang="en-US" sz="7200" dirty="0"/>
+          </a:p>
+        </p:txBody>
+      </p:sp>
+    </p:spTree>
+    <p:extLst>
+      <p:ext uri="{BB962C8B-B14F-4D97-AF65-F5344CB8AC3E}">
+        <p14:creationId xmlns:p14="http://schemas.microsoft.com/office/powerpoint/2010/main" val="3345253606"/>
+      </p:ext>
+    </p:extLst>
+  </p:cSld>
+  <p:clrMapOvr>
+    <a:masterClrMapping/>
+  </p:clrMapOvr>
+</p:sld>
+</file>
+
+<file path=ppt/slides/slide33.xml><?xml version="1.0" encoding="utf-8"?>
+<p:sld xmlns:a="http://schemas.openxmlformats.org/drawingml/2006/main" xmlns:r="http://schemas.openxmlformats.org/officeDocument/2006/relationships" xmlns:p="http://schemas.openxmlformats.org/presentationml/2006/main">
+  <p:cSld>
+    <p:spTree>
+      <p:nvGrpSpPr>
+        <p:cNvPr id="1" name=""/>
+        <p:cNvGrpSpPr/>
+        <p:nvPr/>
+      </p:nvGrpSpPr>
+      <p:grpSpPr>
+        <a:xfrm>
+          <a:off x="0" y="0"/>
+          <a:ext cx="0" cy="0"/>
+          <a:chOff x="0" y="0"/>
+          <a:chExt cx="0" cy="0"/>
+        </a:xfrm>
+      </p:grpSpPr>
+      <p:sp>
+        <p:nvSpPr>
+          <p:cNvPr id="2" name="Title 1"/>
+          <p:cNvSpPr>
+            <a:spLocks noGrp="1"/>
+          </p:cNvSpPr>
+          <p:nvPr>
+            <p:ph type="title"/>
+          </p:nvPr>
+        </p:nvSpPr>
+        <p:spPr/>
+        <p:txBody>
+          <a:bodyPr/>
+          <a:lstStyle/>
+          <a:p>
+            <a:r>
+              <a:rPr lang="en-US" dirty="0"/>
+              <a:t>Resources</a:t>
+            </a:r>
+          </a:p>
+        </p:txBody>
+      </p:sp>
+      <p:sp>
+        <p:nvSpPr>
+          <p:cNvPr id="3" name="Content Placeholder 2"/>
+          <p:cNvSpPr>
+            <a:spLocks noGrp="1"/>
+          </p:cNvSpPr>
+          <p:nvPr>
+            <p:ph idx="1"/>
+          </p:nvPr>
+        </p:nvSpPr>
+        <p:spPr/>
+        <p:txBody>
+          <a:bodyPr/>
+          <a:lstStyle/>
+          <a:p>
+            <a:r>
+              <a:rPr lang="en-US" dirty="0"/>
+              <a:t>SQL Server 2016 Express Edition download</a:t>
+            </a:r>
+          </a:p>
+          <a:p>
+            <a:pPr marL="324000" lvl="1" indent="0">
+              <a:buNone/>
+            </a:pPr>
+            <a:r>
+              <a:rPr lang="en-US">
+                <a:hlinkClick r:id="rId2"/>
+              </a:rPr>
+              <a:t>https://www.microsoft.com/en-us/download/details.aspx?id=52679</a:t>
+            </a:r>
+            <a:endParaRPr lang="en-US"/>
+          </a:p>
+          <a:p>
+            <a:pPr marL="324000" lvl="1" indent="0">
+              <a:buNone/>
+            </a:pPr>
+            <a:endParaRPr lang="en-US"/>
+          </a:p>
+        </p:txBody>
+      </p:sp>
+    </p:spTree>
+    <p:extLst>
+      <p:ext uri="{BB962C8B-B14F-4D97-AF65-F5344CB8AC3E}">
+        <p14:creationId xmlns:p14="http://schemas.microsoft.com/office/powerpoint/2010/main" val="3472261720"/>
       </p:ext>
     </p:extLst>
   </p:cSld>

</xml_diff>

<commit_message>
New slide for SQL Server 2017.
</commit_message>
<xml_diff>
--- a/AwesomeFreeSQLServerFeatures.pptx
+++ b/AwesomeFreeSQLServerFeatures.pptx
@@ -5,7 +5,7 @@
     <p:sldMasterId id="2147483706" r:id="rId1"/>
   </p:sldMasterIdLst>
   <p:notesMasterIdLst>
-    <p:notesMasterId r:id="rId39"/>
+    <p:notesMasterId r:id="rId40"/>
   </p:notesMasterIdLst>
   <p:sldIdLst>
     <p:sldId id="256" r:id="rId2"/>
@@ -15,36 +15,37 @@
     <p:sldId id="261" r:id="rId6"/>
     <p:sldId id="292" r:id="rId7"/>
     <p:sldId id="284" r:id="rId8"/>
-    <p:sldId id="262" r:id="rId9"/>
-    <p:sldId id="263" r:id="rId10"/>
-    <p:sldId id="277" r:id="rId11"/>
-    <p:sldId id="293" r:id="rId12"/>
-    <p:sldId id="304" r:id="rId13"/>
-    <p:sldId id="273" r:id="rId14"/>
-    <p:sldId id="275" r:id="rId15"/>
-    <p:sldId id="274" r:id="rId16"/>
-    <p:sldId id="294" r:id="rId17"/>
-    <p:sldId id="276" r:id="rId18"/>
-    <p:sldId id="299" r:id="rId19"/>
-    <p:sldId id="295" r:id="rId20"/>
-    <p:sldId id="279" r:id="rId21"/>
-    <p:sldId id="300" r:id="rId22"/>
-    <p:sldId id="283" r:id="rId23"/>
-    <p:sldId id="281" r:id="rId24"/>
-    <p:sldId id="305" r:id="rId25"/>
-    <p:sldId id="296" r:id="rId26"/>
-    <p:sldId id="285" r:id="rId27"/>
-    <p:sldId id="306" r:id="rId28"/>
-    <p:sldId id="301" r:id="rId29"/>
-    <p:sldId id="297" r:id="rId30"/>
-    <p:sldId id="282" r:id="rId31"/>
-    <p:sldId id="286" r:id="rId32"/>
-    <p:sldId id="287" r:id="rId33"/>
-    <p:sldId id="302" r:id="rId34"/>
-    <p:sldId id="298" r:id="rId35"/>
-    <p:sldId id="291" r:id="rId36"/>
-    <p:sldId id="303" r:id="rId37"/>
-    <p:sldId id="258" r:id="rId38"/>
+    <p:sldId id="307" r:id="rId9"/>
+    <p:sldId id="262" r:id="rId10"/>
+    <p:sldId id="263" r:id="rId11"/>
+    <p:sldId id="277" r:id="rId12"/>
+    <p:sldId id="293" r:id="rId13"/>
+    <p:sldId id="304" r:id="rId14"/>
+    <p:sldId id="273" r:id="rId15"/>
+    <p:sldId id="275" r:id="rId16"/>
+    <p:sldId id="274" r:id="rId17"/>
+    <p:sldId id="294" r:id="rId18"/>
+    <p:sldId id="276" r:id="rId19"/>
+    <p:sldId id="299" r:id="rId20"/>
+    <p:sldId id="295" r:id="rId21"/>
+    <p:sldId id="279" r:id="rId22"/>
+    <p:sldId id="300" r:id="rId23"/>
+    <p:sldId id="283" r:id="rId24"/>
+    <p:sldId id="281" r:id="rId25"/>
+    <p:sldId id="305" r:id="rId26"/>
+    <p:sldId id="296" r:id="rId27"/>
+    <p:sldId id="285" r:id="rId28"/>
+    <p:sldId id="306" r:id="rId29"/>
+    <p:sldId id="301" r:id="rId30"/>
+    <p:sldId id="297" r:id="rId31"/>
+    <p:sldId id="282" r:id="rId32"/>
+    <p:sldId id="286" r:id="rId33"/>
+    <p:sldId id="287" r:id="rId34"/>
+    <p:sldId id="302" r:id="rId35"/>
+    <p:sldId id="298" r:id="rId36"/>
+    <p:sldId id="291" r:id="rId37"/>
+    <p:sldId id="303" r:id="rId38"/>
+    <p:sldId id="258" r:id="rId39"/>
   </p:sldIdLst>
   <p:sldSz cx="12192000" cy="6858000"/>
   <p:notesSz cx="6858000" cy="9144000"/>
@@ -867,7 +868,7 @@
           <a:p>
             <a:fld id="{8B5705F6-219D-4122-80FA-D82FBBCA0869}" type="slidenum">
               <a:rPr lang="en-US" smtClean="0"/>
-              <a:t>9</a:t>
+              <a:t>10</a:t>
             </a:fld>
             <a:endParaRPr lang="en-US"/>
           </a:p>
@@ -959,7 +960,7 @@
           <a:p>
             <a:fld id="{8B5705F6-219D-4122-80FA-D82FBBCA0869}" type="slidenum">
               <a:rPr lang="en-US" smtClean="0"/>
-              <a:t>12</a:t>
+              <a:t>13</a:t>
             </a:fld>
             <a:endParaRPr lang="en-US"/>
           </a:p>
@@ -1051,7 +1052,7 @@
           <a:p>
             <a:fld id="{8B5705F6-219D-4122-80FA-D82FBBCA0869}" type="slidenum">
               <a:rPr lang="en-US" smtClean="0"/>
-              <a:t>13</a:t>
+              <a:t>14</a:t>
             </a:fld>
             <a:endParaRPr lang="en-US"/>
           </a:p>
@@ -1150,7 +1151,7 @@
           <a:p>
             <a:fld id="{8B5705F6-219D-4122-80FA-D82FBBCA0869}" type="slidenum">
               <a:rPr lang="en-US" smtClean="0"/>
-              <a:t>15</a:t>
+              <a:t>16</a:t>
             </a:fld>
             <a:endParaRPr lang="en-US"/>
           </a:p>
@@ -7307,6 +7308,116 @@
           <a:lstStyle/>
           <a:p>
             <a:r>
+              <a:rPr lang="en-US" dirty="0"/>
+              <a:t>Row-Level Security</a:t>
+            </a:r>
+          </a:p>
+        </p:txBody>
+      </p:sp>
+      <p:sp>
+        <p:nvSpPr>
+          <p:cNvPr id="3" name="Content Placeholder 2"/>
+          <p:cNvSpPr>
+            <a:spLocks noGrp="1"/>
+          </p:cNvSpPr>
+          <p:nvPr>
+            <p:ph idx="1"/>
+          </p:nvPr>
+        </p:nvSpPr>
+        <p:spPr>
+          <a:xfrm>
+            <a:off x="677333" y="1603169"/>
+            <a:ext cx="9677949" cy="5094514"/>
+          </a:xfrm>
+        </p:spPr>
+        <p:txBody>
+          <a:bodyPr>
+            <a:normAutofit/>
+          </a:bodyPr>
+          <a:lstStyle/>
+          <a:p>
+            <a:r>
+              <a:rPr lang="en-US" sz="2800" dirty="0"/>
+              <a:t>Powerful and flexible way to control who can view or modify data at the row-level grain</a:t>
+            </a:r>
+          </a:p>
+          <a:p>
+            <a:r>
+              <a:rPr lang="en-US" sz="2800" dirty="0"/>
+              <a:t>Access is controlled by a user-defined function that is applied to the table’s security</a:t>
+            </a:r>
+          </a:p>
+          <a:p>
+            <a:r>
+              <a:rPr lang="en-US" sz="2800" dirty="0"/>
+              <a:t>Non-qualifying rows are silently blocked</a:t>
+            </a:r>
+          </a:p>
+          <a:p>
+            <a:pPr lvl="1"/>
+            <a:r>
+              <a:rPr lang="en-US" sz="2400" dirty="0"/>
+              <a:t>Select predicate – controls read access to the row</a:t>
+            </a:r>
+          </a:p>
+          <a:p>
+            <a:pPr lvl="1"/>
+            <a:r>
+              <a:rPr lang="en-US" sz="2400" dirty="0"/>
+              <a:t>Block predicate – controls modification to the row (either before or after the modification)</a:t>
+            </a:r>
+          </a:p>
+          <a:p>
+            <a:endParaRPr lang="en-US" sz="2800" dirty="0"/>
+          </a:p>
+        </p:txBody>
+      </p:sp>
+    </p:spTree>
+    <p:extLst>
+      <p:ext uri="{BB962C8B-B14F-4D97-AF65-F5344CB8AC3E}">
+        <p14:creationId xmlns:p14="http://schemas.microsoft.com/office/powerpoint/2010/main" val="2443207938"/>
+      </p:ext>
+    </p:extLst>
+  </p:cSld>
+  <p:clrMapOvr>
+    <a:masterClrMapping/>
+  </p:clrMapOvr>
+</p:sld>
+</file>
+
+<file path=ppt/slides/slide11.xml><?xml version="1.0" encoding="utf-8"?>
+<p:sld xmlns:a="http://schemas.openxmlformats.org/drawingml/2006/main" xmlns:r="http://schemas.openxmlformats.org/officeDocument/2006/relationships" xmlns:p="http://schemas.openxmlformats.org/presentationml/2006/main">
+  <p:cSld>
+    <p:spTree>
+      <p:nvGrpSpPr>
+        <p:cNvPr id="1" name=""/>
+        <p:cNvGrpSpPr/>
+        <p:nvPr/>
+      </p:nvGrpSpPr>
+      <p:grpSpPr>
+        <a:xfrm>
+          <a:off x="0" y="0"/>
+          <a:ext cx="0" cy="0"/>
+          <a:chOff x="0" y="0"/>
+          <a:chExt cx="0" cy="0"/>
+        </a:xfrm>
+      </p:grpSpPr>
+      <p:sp>
+        <p:nvSpPr>
+          <p:cNvPr id="2" name="Title 1"/>
+          <p:cNvSpPr>
+            <a:spLocks noGrp="1"/>
+          </p:cNvSpPr>
+          <p:nvPr>
+            <p:ph type="title"/>
+          </p:nvPr>
+        </p:nvSpPr>
+        <p:spPr/>
+        <p:txBody>
+          <a:bodyPr/>
+          <a:lstStyle/>
+          <a:p>
+            <a:r>
               <a:rPr lang="en-US" dirty="0" smtClean="0"/>
               <a:t>Row-Level Security</a:t>
             </a:r>
@@ -7454,188 +7565,6 @@
 </p:sld>
 </file>
 
-<file path=ppt/slides/slide11.xml><?xml version="1.0" encoding="utf-8"?>
-<p:sld xmlns:a="http://schemas.openxmlformats.org/drawingml/2006/main" xmlns:r="http://schemas.openxmlformats.org/officeDocument/2006/relationships" xmlns:p="http://schemas.openxmlformats.org/presentationml/2006/main">
-  <p:cSld>
-    <p:spTree>
-      <p:nvGrpSpPr>
-        <p:cNvPr id="1" name=""/>
-        <p:cNvGrpSpPr/>
-        <p:nvPr/>
-      </p:nvGrpSpPr>
-      <p:grpSpPr>
-        <a:xfrm>
-          <a:off x="0" y="0"/>
-          <a:ext cx="0" cy="0"/>
-          <a:chOff x="0" y="0"/>
-          <a:chExt cx="0" cy="0"/>
-        </a:xfrm>
-      </p:grpSpPr>
-      <p:sp>
-        <p:nvSpPr>
-          <p:cNvPr id="2" name="Title 1"/>
-          <p:cNvSpPr>
-            <a:spLocks noGrp="1"/>
-          </p:cNvSpPr>
-          <p:nvPr>
-            <p:ph type="title"/>
-          </p:nvPr>
-        </p:nvSpPr>
-        <p:spPr/>
-        <p:txBody>
-          <a:bodyPr/>
-          <a:lstStyle/>
-          <a:p>
-            <a:r>
-              <a:rPr lang="en-US" dirty="0"/>
-              <a:t>SQL Server </a:t>
-            </a:r>
-            <a:r>
-              <a:rPr lang="en-US" dirty="0" smtClean="0"/>
-              <a:t>Features (Speed </a:t>
-            </a:r>
-            <a:r>
-              <a:rPr lang="en-US" dirty="0"/>
-              <a:t>Dating)</a:t>
-            </a:r>
-          </a:p>
-        </p:txBody>
-      </p:sp>
-      <p:sp>
-        <p:nvSpPr>
-          <p:cNvPr id="3" name="Content Placeholder 2"/>
-          <p:cNvSpPr>
-            <a:spLocks noGrp="1"/>
-          </p:cNvSpPr>
-          <p:nvPr>
-            <p:ph idx="1"/>
-          </p:nvPr>
-        </p:nvSpPr>
-        <p:spPr>
-          <a:xfrm>
-            <a:off x="677334" y="1413164"/>
-            <a:ext cx="9060432" cy="5082639"/>
-          </a:xfrm>
-        </p:spPr>
-        <p:txBody>
-          <a:bodyPr>
-            <a:normAutofit/>
-          </a:bodyPr>
-          <a:lstStyle/>
-          <a:p>
-            <a:r>
-              <a:rPr lang="en-US" sz="2800" dirty="0"/>
-              <a:t>Security</a:t>
-            </a:r>
-          </a:p>
-          <a:p>
-            <a:pPr lvl="1"/>
-            <a:r>
-              <a:rPr lang="en-US" sz="2400" dirty="0"/>
-              <a:t>Row-Level</a:t>
-            </a:r>
-            <a:r>
-              <a:rPr lang="en-US" sz="2400" dirty="0">
-                <a:solidFill>
-                  <a:schemeClr val="accent1">
-                    <a:lumMod val="75000"/>
-                  </a:schemeClr>
-                </a:solidFill>
-              </a:rPr>
-              <a:t> </a:t>
-            </a:r>
-            <a:r>
-              <a:rPr lang="en-US" sz="2400" dirty="0"/>
-              <a:t>Security</a:t>
-            </a:r>
-          </a:p>
-          <a:p>
-            <a:pPr lvl="1"/>
-            <a:r>
-              <a:rPr lang="en-US" sz="2400" dirty="0">
-                <a:solidFill>
-                  <a:schemeClr val="accent1">
-                    <a:lumMod val="75000"/>
-                  </a:schemeClr>
-                </a:solidFill>
-              </a:rPr>
-              <a:t>Always Encrypted</a:t>
-            </a:r>
-          </a:p>
-          <a:p>
-            <a:r>
-              <a:rPr lang="en-US" sz="2800" dirty="0"/>
-              <a:t>Utility</a:t>
-            </a:r>
-          </a:p>
-          <a:p>
-            <a:pPr lvl="1"/>
-            <a:r>
-              <a:rPr lang="en-US" sz="2400" dirty="0"/>
-              <a:t>Snapshots</a:t>
-            </a:r>
-          </a:p>
-          <a:p>
-            <a:pPr lvl="1"/>
-            <a:r>
-              <a:rPr lang="en-US" sz="2400" dirty="0"/>
-              <a:t>Temporal Tables</a:t>
-            </a:r>
-          </a:p>
-          <a:p>
-            <a:r>
-              <a:rPr lang="en-US" sz="2800" dirty="0"/>
-              <a:t>Performance</a:t>
-            </a:r>
-          </a:p>
-          <a:p>
-            <a:pPr lvl="1"/>
-            <a:r>
-              <a:rPr lang="en-US" sz="2400" dirty="0" err="1"/>
-              <a:t>Columnstore</a:t>
-            </a:r>
-            <a:r>
-              <a:rPr lang="en-US" sz="2400" dirty="0"/>
-              <a:t> Indexes</a:t>
-            </a:r>
-          </a:p>
-          <a:p>
-            <a:pPr lvl="1"/>
-            <a:r>
-              <a:rPr lang="en-US" sz="2400" dirty="0"/>
-              <a:t>Partitioning</a:t>
-            </a:r>
-          </a:p>
-          <a:p>
-            <a:pPr lvl="1"/>
-            <a:r>
-              <a:rPr lang="en-US" sz="2400" dirty="0"/>
-              <a:t>In-Memory OLTP (</a:t>
-            </a:r>
-            <a:r>
-              <a:rPr lang="en-US" sz="2400" dirty="0" err="1"/>
-              <a:t>Hekaton</a:t>
-            </a:r>
-            <a:r>
-              <a:rPr lang="en-US" sz="2400" dirty="0"/>
-              <a:t>)</a:t>
-            </a:r>
-          </a:p>
-        </p:txBody>
-      </p:sp>
-    </p:spTree>
-    <p:extLst>
-      <p:ext uri="{BB962C8B-B14F-4D97-AF65-F5344CB8AC3E}">
-        <p14:creationId xmlns:p14="http://schemas.microsoft.com/office/powerpoint/2010/main" val="2287326007"/>
-      </p:ext>
-    </p:extLst>
-  </p:cSld>
-  <p:clrMapOvr>
-    <a:masterClrMapping/>
-  </p:clrMapOvr>
-</p:sld>
-</file>
-
 <file path=ppt/slides/slide12.xml><?xml version="1.0" encoding="utf-8"?>
 <p:sld xmlns:a="http://schemas.openxmlformats.org/drawingml/2006/main" xmlns:r="http://schemas.openxmlformats.org/officeDocument/2006/relationships" xmlns:p="http://schemas.openxmlformats.org/presentationml/2006/main">
   <p:cSld>
@@ -7669,10 +7598,17 @@
           <a:lstStyle/>
           <a:p>
             <a:r>
+              <a:rPr lang="en-US" dirty="0"/>
+              <a:t>SQL Server </a:t>
+            </a:r>
+            <a:r>
               <a:rPr lang="en-US" dirty="0" smtClean="0"/>
-              <a:t>Always Encrypted</a:t>
-            </a:r>
-            <a:endParaRPr lang="en-US" dirty="0"/>
+              <a:t>Features (Speed </a:t>
+            </a:r>
+            <a:r>
+              <a:rPr lang="en-US" dirty="0"/>
+              <a:t>Dating)</a:t>
+            </a:r>
           </a:p>
         </p:txBody>
       </p:sp>
@@ -7688,8 +7624,8 @@
         </p:nvSpPr>
         <p:spPr>
           <a:xfrm>
-            <a:off x="677334" y="1413165"/>
-            <a:ext cx="8596668" cy="4628198"/>
+            <a:off x="677334" y="1413164"/>
+            <a:ext cx="9060432" cy="5082639"/>
           </a:xfrm>
         </p:spPr>
         <p:txBody>
@@ -7699,48 +7635,109 @@
           <a:lstStyle/>
           <a:p>
             <a:r>
-              <a:rPr lang="en-US" sz="2800" dirty="0" smtClean="0"/>
-              <a:t>Applies at the column level</a:t>
-            </a:r>
-          </a:p>
-          <a:p>
-            <a:r>
-              <a:rPr lang="en-US" sz="2800" dirty="0" smtClean="0"/>
-              <a:t>SQL Server box never sees data in unencrypted form (both at-rest and in-transit)</a:t>
+              <a:rPr lang="en-US" sz="2800" dirty="0"/>
+              <a:t>Security</a:t>
             </a:r>
           </a:p>
           <a:p>
             <a:pPr lvl="1"/>
             <a:r>
-              <a:rPr lang="en-US" sz="2400" dirty="0" smtClean="0"/>
-              <a:t>Encrypted columns are stored (and transmitted) as </a:t>
-            </a:r>
-            <a:r>
-              <a:rPr lang="en-US" sz="2400" dirty="0" err="1" smtClean="0"/>
-              <a:t>varbinary</a:t>
-            </a:r>
-            <a:r>
-              <a:rPr lang="en-US" sz="2400" dirty="0" smtClean="0"/>
-              <a:t> behind the scenes</a:t>
-            </a:r>
-          </a:p>
-          <a:p>
-            <a:r>
-              <a:rPr lang="en-US" sz="2800" dirty="0" smtClean="0"/>
-              <a:t>Certificate is generated on client machine and shared with other </a:t>
-            </a:r>
-            <a:r>
-              <a:rPr lang="en-US" sz="2800" dirty="0" smtClean="0"/>
-              <a:t>clients</a:t>
-            </a:r>
-            <a:endParaRPr lang="en-US" sz="2800" dirty="0" smtClean="0"/>
+              <a:rPr lang="en-US" sz="2400" dirty="0"/>
+              <a:t>Row-Level</a:t>
+            </a:r>
+            <a:r>
+              <a:rPr lang="en-US" sz="2400" dirty="0">
+                <a:solidFill>
+                  <a:schemeClr val="accent1">
+                    <a:lumMod val="75000"/>
+                  </a:schemeClr>
+                </a:solidFill>
+              </a:rPr>
+              <a:t> </a:t>
+            </a:r>
+            <a:r>
+              <a:rPr lang="en-US" sz="2400" dirty="0"/>
+              <a:t>Security</a:t>
+            </a:r>
+          </a:p>
+          <a:p>
+            <a:pPr lvl="1"/>
+            <a:r>
+              <a:rPr lang="en-US" sz="2400" dirty="0">
+                <a:solidFill>
+                  <a:schemeClr val="accent1">
+                    <a:lumMod val="75000"/>
+                  </a:schemeClr>
+                </a:solidFill>
+              </a:rPr>
+              <a:t>Always Encrypted</a:t>
+            </a:r>
+          </a:p>
+          <a:p>
+            <a:r>
+              <a:rPr lang="en-US" sz="2800" dirty="0"/>
+              <a:t>Utility</a:t>
+            </a:r>
+          </a:p>
+          <a:p>
+            <a:pPr lvl="1"/>
+            <a:r>
+              <a:rPr lang="en-US" sz="2400" dirty="0"/>
+              <a:t>Snapshots</a:t>
+            </a:r>
+          </a:p>
+          <a:p>
+            <a:pPr lvl="1"/>
+            <a:r>
+              <a:rPr lang="en-US" sz="2400" dirty="0"/>
+              <a:t>Temporal Tables</a:t>
+            </a:r>
+          </a:p>
+          <a:p>
+            <a:r>
+              <a:rPr lang="en-US" sz="2800" dirty="0"/>
+              <a:t>Performance</a:t>
+            </a:r>
+          </a:p>
+          <a:p>
+            <a:pPr lvl="1"/>
+            <a:r>
+              <a:rPr lang="en-US" sz="2400" dirty="0" err="1"/>
+              <a:t>Columnstore</a:t>
+            </a:r>
+            <a:r>
+              <a:rPr lang="en-US" sz="2400" dirty="0"/>
+              <a:t> Indexes</a:t>
+            </a:r>
+          </a:p>
+          <a:p>
+            <a:pPr lvl="1"/>
+            <a:r>
+              <a:rPr lang="en-US" sz="2400" dirty="0"/>
+              <a:t>Partitioning</a:t>
+            </a:r>
+          </a:p>
+          <a:p>
+            <a:pPr lvl="1"/>
+            <a:r>
+              <a:rPr lang="en-US" sz="2400" dirty="0"/>
+              <a:t>In-Memory OLTP (</a:t>
+            </a:r>
+            <a:r>
+              <a:rPr lang="en-US" sz="2400" dirty="0" err="1"/>
+              <a:t>Hekaton</a:t>
+            </a:r>
+            <a:r>
+              <a:rPr lang="en-US" sz="2400" dirty="0"/>
+              <a:t>)</a:t>
+            </a:r>
           </a:p>
         </p:txBody>
       </p:sp>
     </p:spTree>
     <p:extLst>
       <p:ext uri="{BB962C8B-B14F-4D97-AF65-F5344CB8AC3E}">
-        <p14:creationId xmlns:p14="http://schemas.microsoft.com/office/powerpoint/2010/main" val="220865904"/>
+        <p14:creationId xmlns:p14="http://schemas.microsoft.com/office/powerpoint/2010/main" val="2287326007"/>
       </p:ext>
     </p:extLst>
   </p:cSld>
@@ -7814,6 +7811,120 @@
           <a:p>
             <a:r>
               <a:rPr lang="en-US" sz="2800" dirty="0" smtClean="0"/>
+              <a:t>Applies at the column level</a:t>
+            </a:r>
+          </a:p>
+          <a:p>
+            <a:r>
+              <a:rPr lang="en-US" sz="2800" dirty="0" smtClean="0"/>
+              <a:t>SQL Server box never sees data in unencrypted form (both at-rest and in-transit)</a:t>
+            </a:r>
+          </a:p>
+          <a:p>
+            <a:pPr lvl="1"/>
+            <a:r>
+              <a:rPr lang="en-US" sz="2400" dirty="0" smtClean="0"/>
+              <a:t>Encrypted columns are stored (and transmitted) as </a:t>
+            </a:r>
+            <a:r>
+              <a:rPr lang="en-US" sz="2400" dirty="0" err="1" smtClean="0"/>
+              <a:t>varbinary</a:t>
+            </a:r>
+            <a:r>
+              <a:rPr lang="en-US" sz="2400" dirty="0" smtClean="0"/>
+              <a:t> behind the scenes</a:t>
+            </a:r>
+          </a:p>
+          <a:p>
+            <a:r>
+              <a:rPr lang="en-US" sz="2800" dirty="0" smtClean="0"/>
+              <a:t>Certificate is generated on client machine and shared with other </a:t>
+            </a:r>
+            <a:r>
+              <a:rPr lang="en-US" sz="2800" dirty="0" smtClean="0"/>
+              <a:t>clients</a:t>
+            </a:r>
+            <a:endParaRPr lang="en-US" sz="2800" dirty="0" smtClean="0"/>
+          </a:p>
+        </p:txBody>
+      </p:sp>
+    </p:spTree>
+    <p:extLst>
+      <p:ext uri="{BB962C8B-B14F-4D97-AF65-F5344CB8AC3E}">
+        <p14:creationId xmlns:p14="http://schemas.microsoft.com/office/powerpoint/2010/main" val="220865904"/>
+      </p:ext>
+    </p:extLst>
+  </p:cSld>
+  <p:clrMapOvr>
+    <a:masterClrMapping/>
+  </p:clrMapOvr>
+</p:sld>
+</file>
+
+<file path=ppt/slides/slide14.xml><?xml version="1.0" encoding="utf-8"?>
+<p:sld xmlns:a="http://schemas.openxmlformats.org/drawingml/2006/main" xmlns:r="http://schemas.openxmlformats.org/officeDocument/2006/relationships" xmlns:p="http://schemas.openxmlformats.org/presentationml/2006/main">
+  <p:cSld>
+    <p:spTree>
+      <p:nvGrpSpPr>
+        <p:cNvPr id="1" name=""/>
+        <p:cNvGrpSpPr/>
+        <p:nvPr/>
+      </p:nvGrpSpPr>
+      <p:grpSpPr>
+        <a:xfrm>
+          <a:off x="0" y="0"/>
+          <a:ext cx="0" cy="0"/>
+          <a:chOff x="0" y="0"/>
+          <a:chExt cx="0" cy="0"/>
+        </a:xfrm>
+      </p:grpSpPr>
+      <p:sp>
+        <p:nvSpPr>
+          <p:cNvPr id="2" name="Title 1"/>
+          <p:cNvSpPr>
+            <a:spLocks noGrp="1"/>
+          </p:cNvSpPr>
+          <p:nvPr>
+            <p:ph type="title"/>
+          </p:nvPr>
+        </p:nvSpPr>
+        <p:spPr/>
+        <p:txBody>
+          <a:bodyPr/>
+          <a:lstStyle/>
+          <a:p>
+            <a:r>
+              <a:rPr lang="en-US" dirty="0" smtClean="0"/>
+              <a:t>Always Encrypted</a:t>
+            </a:r>
+            <a:endParaRPr lang="en-US" dirty="0"/>
+          </a:p>
+        </p:txBody>
+      </p:sp>
+      <p:sp>
+        <p:nvSpPr>
+          <p:cNvPr id="3" name="Content Placeholder 2"/>
+          <p:cNvSpPr>
+            <a:spLocks noGrp="1"/>
+          </p:cNvSpPr>
+          <p:nvPr>
+            <p:ph idx="1"/>
+          </p:nvPr>
+        </p:nvSpPr>
+        <p:spPr>
+          <a:xfrm>
+            <a:off x="677334" y="1413165"/>
+            <a:ext cx="8596668" cy="4628198"/>
+          </a:xfrm>
+        </p:spPr>
+        <p:txBody>
+          <a:bodyPr>
+            <a:normAutofit/>
+          </a:bodyPr>
+          <a:lstStyle/>
+          <a:p>
+            <a:r>
+              <a:rPr lang="en-US" sz="2800" dirty="0" smtClean="0"/>
               <a:t>Encryption </a:t>
             </a:r>
             <a:r>
@@ -7884,7 +7995,7 @@
 </p:sld>
 </file>
 
-<file path=ppt/slides/slide14.xml><?xml version="1.0" encoding="utf-8"?>
+<file path=ppt/slides/slide15.xml><?xml version="1.0" encoding="utf-8"?>
 <p:sld xmlns:a="http://schemas.openxmlformats.org/drawingml/2006/main" xmlns:r="http://schemas.openxmlformats.org/officeDocument/2006/relationships" xmlns:p="http://schemas.openxmlformats.org/presentationml/2006/main">
   <p:cSld>
     <p:spTree>
@@ -7961,107 +8072,6 @@
 </p:sld>
 </file>
 
-<file path=ppt/slides/slide15.xml><?xml version="1.0" encoding="utf-8"?>
-<p:sld xmlns:a="http://schemas.openxmlformats.org/drawingml/2006/main" xmlns:r="http://schemas.openxmlformats.org/officeDocument/2006/relationships" xmlns:p="http://schemas.openxmlformats.org/presentationml/2006/main">
-  <p:cSld>
-    <p:spTree>
-      <p:nvGrpSpPr>
-        <p:cNvPr id="1" name=""/>
-        <p:cNvGrpSpPr/>
-        <p:nvPr/>
-      </p:nvGrpSpPr>
-      <p:grpSpPr>
-        <a:xfrm>
-          <a:off x="0" y="0"/>
-          <a:ext cx="0" cy="0"/>
-          <a:chOff x="0" y="0"/>
-          <a:chExt cx="0" cy="0"/>
-        </a:xfrm>
-      </p:grpSpPr>
-      <p:sp>
-        <p:nvSpPr>
-          <p:cNvPr id="2" name="Title 1"/>
-          <p:cNvSpPr>
-            <a:spLocks noGrp="1"/>
-          </p:cNvSpPr>
-          <p:nvPr>
-            <p:ph type="title"/>
-          </p:nvPr>
-        </p:nvSpPr>
-        <p:spPr/>
-        <p:txBody>
-          <a:bodyPr/>
-          <a:lstStyle/>
-          <a:p>
-            <a:r>
-              <a:rPr lang="en-US" dirty="0" smtClean="0"/>
-              <a:t>Always Encrypted - Cons</a:t>
-            </a:r>
-            <a:endParaRPr lang="en-US" dirty="0"/>
-          </a:p>
-        </p:txBody>
-      </p:sp>
-      <p:sp>
-        <p:nvSpPr>
-          <p:cNvPr id="3" name="Content Placeholder 2"/>
-          <p:cNvSpPr>
-            <a:spLocks noGrp="1"/>
-          </p:cNvSpPr>
-          <p:nvPr>
-            <p:ph idx="1"/>
-          </p:nvPr>
-        </p:nvSpPr>
-        <p:spPr>
-          <a:xfrm>
-            <a:off x="677334" y="1567543"/>
-            <a:ext cx="9487944" cy="4473819"/>
-          </a:xfrm>
-        </p:spPr>
-        <p:txBody>
-          <a:bodyPr>
-            <a:normAutofit/>
-          </a:bodyPr>
-          <a:lstStyle/>
-          <a:p>
-            <a:r>
-              <a:rPr lang="en-US" sz="2800" dirty="0" smtClean="0"/>
-              <a:t>Data size bloat, especially for smaller data types</a:t>
-            </a:r>
-          </a:p>
-          <a:p>
-            <a:r>
-              <a:rPr lang="en-US" sz="2800" dirty="0" smtClean="0"/>
-              <a:t>Adds considerable difficulty troubleshooting in tools like SSMS</a:t>
-            </a:r>
-          </a:p>
-          <a:p>
-            <a:r>
-              <a:rPr lang="en-US" sz="2800" dirty="0" smtClean="0"/>
-              <a:t>String columns must have a BIN collation – they won’t sort by traditional SQL rules</a:t>
-            </a:r>
-          </a:p>
-          <a:p>
-            <a:r>
-              <a:rPr lang="en-US" sz="2800" dirty="0" smtClean="0"/>
-              <a:t>Extra round trips to determine metadata, retrieve keys</a:t>
-            </a:r>
-            <a:endParaRPr lang="en-US" sz="2800" dirty="0"/>
-          </a:p>
-        </p:txBody>
-      </p:sp>
-    </p:spTree>
-    <p:extLst>
-      <p:ext uri="{BB962C8B-B14F-4D97-AF65-F5344CB8AC3E}">
-        <p14:creationId xmlns:p14="http://schemas.microsoft.com/office/powerpoint/2010/main" val="3969599080"/>
-      </p:ext>
-    </p:extLst>
-  </p:cSld>
-  <p:clrMapOvr>
-    <a:masterClrMapping/>
-  </p:clrMapOvr>
-</p:sld>
-</file>
-
 <file path=ppt/slides/slide16.xml><?xml version="1.0" encoding="utf-8"?>
 <p:sld xmlns:a="http://schemas.openxmlformats.org/drawingml/2006/main" xmlns:r="http://schemas.openxmlformats.org/officeDocument/2006/relationships" xmlns:p="http://schemas.openxmlformats.org/presentationml/2006/main">
   <p:cSld>
@@ -8095,17 +8105,10 @@
           <a:lstStyle/>
           <a:p>
             <a:r>
-              <a:rPr lang="en-US" dirty="0"/>
-              <a:t>SQL Server </a:t>
-            </a:r>
-            <a:r>
               <a:rPr lang="en-US" dirty="0" smtClean="0"/>
-              <a:t>Features (Speed </a:t>
-            </a:r>
-            <a:r>
-              <a:rPr lang="en-US" dirty="0"/>
-              <a:t>Dating)</a:t>
-            </a:r>
+              <a:t>Always Encrypted - Cons</a:t>
+            </a:r>
+            <a:endParaRPr lang="en-US" dirty="0"/>
           </a:p>
         </p:txBody>
       </p:sp>
@@ -8121,8 +8124,8 @@
         </p:nvSpPr>
         <p:spPr>
           <a:xfrm>
-            <a:off x="677334" y="1413164"/>
-            <a:ext cx="9060432" cy="5082639"/>
+            <a:off x="677334" y="1567543"/>
+            <a:ext cx="9487944" cy="4473819"/>
           </a:xfrm>
         </p:spPr>
         <p:txBody>
@@ -8132,109 +8135,35 @@
           <a:lstStyle/>
           <a:p>
             <a:r>
-              <a:rPr lang="en-US" sz="2800" dirty="0"/>
-              <a:t>Security</a:t>
-            </a:r>
-          </a:p>
-          <a:p>
-            <a:pPr lvl="1"/>
-            <a:r>
-              <a:rPr lang="en-US" sz="2400" dirty="0"/>
-              <a:t>Row-Level</a:t>
-            </a:r>
-            <a:r>
-              <a:rPr lang="en-US" sz="2400" dirty="0">
-                <a:solidFill>
-                  <a:schemeClr val="accent1">
-                    <a:lumMod val="75000"/>
-                  </a:schemeClr>
-                </a:solidFill>
-              </a:rPr>
-              <a:t> </a:t>
-            </a:r>
-            <a:r>
-              <a:rPr lang="en-US" sz="2400" dirty="0"/>
-              <a:t>Security</a:t>
-            </a:r>
-          </a:p>
-          <a:p>
-            <a:pPr lvl="1"/>
-            <a:r>
-              <a:rPr lang="en-US" sz="2400" dirty="0"/>
-              <a:t>Always Encrypted</a:t>
-            </a:r>
-          </a:p>
-          <a:p>
-            <a:r>
-              <a:rPr lang="en-US" sz="2800" dirty="0"/>
-              <a:t>Utility</a:t>
-            </a:r>
-          </a:p>
-          <a:p>
-            <a:pPr lvl="1"/>
-            <a:r>
-              <a:rPr lang="en-US" sz="2400" dirty="0">
-                <a:solidFill>
-                  <a:schemeClr val="accent1">
-                    <a:lumMod val="75000"/>
-                  </a:schemeClr>
-                </a:solidFill>
-              </a:rPr>
-              <a:t>Snapshots</a:t>
-            </a:r>
-          </a:p>
-          <a:p>
-            <a:pPr lvl="1"/>
-            <a:r>
-              <a:rPr lang="en-US" sz="2400" dirty="0"/>
-              <a:t>Temporal Tables</a:t>
-            </a:r>
-          </a:p>
-          <a:p>
-            <a:r>
-              <a:rPr lang="en-US" sz="2800" dirty="0"/>
-              <a:t>Performance</a:t>
-            </a:r>
-          </a:p>
-          <a:p>
-            <a:pPr lvl="1"/>
-            <a:r>
-              <a:rPr lang="en-US" sz="2400" dirty="0" err="1"/>
-              <a:t>Columnstore</a:t>
-            </a:r>
-            <a:r>
-              <a:rPr lang="en-US" sz="2400" dirty="0"/>
-              <a:t> Indexes</a:t>
-            </a:r>
-          </a:p>
-          <a:p>
-            <a:pPr lvl="1"/>
-            <a:r>
-              <a:rPr lang="en-US" sz="2400" dirty="0"/>
-              <a:t>Partitioning</a:t>
-            </a:r>
-          </a:p>
-          <a:p>
-            <a:pPr lvl="1"/>
-            <a:r>
-              <a:rPr lang="en-US" sz="2400" dirty="0"/>
-              <a:t>In-Memory OLTP (</a:t>
-            </a:r>
-            <a:r>
-              <a:rPr lang="en-US" sz="2400" dirty="0" err="1"/>
-              <a:t>Hekaton</a:t>
-            </a:r>
-            <a:r>
-              <a:rPr lang="en-US" sz="2400" dirty="0"/>
-              <a:t>)</a:t>
-            </a:r>
+              <a:rPr lang="en-US" sz="2800" dirty="0" smtClean="0"/>
+              <a:t>Data size bloat, especially for smaller data types</a:t>
+            </a:r>
+          </a:p>
+          <a:p>
+            <a:r>
+              <a:rPr lang="en-US" sz="2800" dirty="0" smtClean="0"/>
+              <a:t>Adds considerable difficulty troubleshooting in tools like SSMS</a:t>
+            </a:r>
+          </a:p>
+          <a:p>
+            <a:r>
+              <a:rPr lang="en-US" sz="2800" dirty="0" smtClean="0"/>
+              <a:t>String columns must have a BIN collation – they won’t sort by traditional SQL rules</a:t>
+            </a:r>
+          </a:p>
+          <a:p>
+            <a:r>
+              <a:rPr lang="en-US" sz="2800" dirty="0" smtClean="0"/>
+              <a:t>Extra round trips to determine metadata, retrieve keys</a:t>
+            </a:r>
+            <a:endParaRPr lang="en-US" sz="2800" dirty="0"/>
           </a:p>
         </p:txBody>
       </p:sp>
     </p:spTree>
     <p:extLst>
       <p:ext uri="{BB962C8B-B14F-4D97-AF65-F5344CB8AC3E}">
-        <p14:creationId xmlns:p14="http://schemas.microsoft.com/office/powerpoint/2010/main" val="2711985537"/>
+        <p14:creationId xmlns:p14="http://schemas.microsoft.com/office/powerpoint/2010/main" val="3969599080"/>
       </p:ext>
     </p:extLst>
   </p:cSld>
@@ -8277,6 +8206,188 @@
           <a:lstStyle/>
           <a:p>
             <a:r>
+              <a:rPr lang="en-US" dirty="0"/>
+              <a:t>SQL Server </a:t>
+            </a:r>
+            <a:r>
+              <a:rPr lang="en-US" dirty="0" smtClean="0"/>
+              <a:t>Features (Speed </a:t>
+            </a:r>
+            <a:r>
+              <a:rPr lang="en-US" dirty="0"/>
+              <a:t>Dating)</a:t>
+            </a:r>
+          </a:p>
+        </p:txBody>
+      </p:sp>
+      <p:sp>
+        <p:nvSpPr>
+          <p:cNvPr id="3" name="Content Placeholder 2"/>
+          <p:cNvSpPr>
+            <a:spLocks noGrp="1"/>
+          </p:cNvSpPr>
+          <p:nvPr>
+            <p:ph idx="1"/>
+          </p:nvPr>
+        </p:nvSpPr>
+        <p:spPr>
+          <a:xfrm>
+            <a:off x="677334" y="1413164"/>
+            <a:ext cx="9060432" cy="5082639"/>
+          </a:xfrm>
+        </p:spPr>
+        <p:txBody>
+          <a:bodyPr>
+            <a:normAutofit/>
+          </a:bodyPr>
+          <a:lstStyle/>
+          <a:p>
+            <a:r>
+              <a:rPr lang="en-US" sz="2800" dirty="0"/>
+              <a:t>Security</a:t>
+            </a:r>
+          </a:p>
+          <a:p>
+            <a:pPr lvl="1"/>
+            <a:r>
+              <a:rPr lang="en-US" sz="2400" dirty="0"/>
+              <a:t>Row-Level</a:t>
+            </a:r>
+            <a:r>
+              <a:rPr lang="en-US" sz="2400" dirty="0">
+                <a:solidFill>
+                  <a:schemeClr val="accent1">
+                    <a:lumMod val="75000"/>
+                  </a:schemeClr>
+                </a:solidFill>
+              </a:rPr>
+              <a:t> </a:t>
+            </a:r>
+            <a:r>
+              <a:rPr lang="en-US" sz="2400" dirty="0"/>
+              <a:t>Security</a:t>
+            </a:r>
+          </a:p>
+          <a:p>
+            <a:pPr lvl="1"/>
+            <a:r>
+              <a:rPr lang="en-US" sz="2400" dirty="0"/>
+              <a:t>Always Encrypted</a:t>
+            </a:r>
+          </a:p>
+          <a:p>
+            <a:r>
+              <a:rPr lang="en-US" sz="2800" dirty="0"/>
+              <a:t>Utility</a:t>
+            </a:r>
+          </a:p>
+          <a:p>
+            <a:pPr lvl="1"/>
+            <a:r>
+              <a:rPr lang="en-US" sz="2400" dirty="0">
+                <a:solidFill>
+                  <a:schemeClr val="accent1">
+                    <a:lumMod val="75000"/>
+                  </a:schemeClr>
+                </a:solidFill>
+              </a:rPr>
+              <a:t>Snapshots</a:t>
+            </a:r>
+          </a:p>
+          <a:p>
+            <a:pPr lvl="1"/>
+            <a:r>
+              <a:rPr lang="en-US" sz="2400" dirty="0"/>
+              <a:t>Temporal Tables</a:t>
+            </a:r>
+          </a:p>
+          <a:p>
+            <a:r>
+              <a:rPr lang="en-US" sz="2800" dirty="0"/>
+              <a:t>Performance</a:t>
+            </a:r>
+          </a:p>
+          <a:p>
+            <a:pPr lvl="1"/>
+            <a:r>
+              <a:rPr lang="en-US" sz="2400" dirty="0" err="1"/>
+              <a:t>Columnstore</a:t>
+            </a:r>
+            <a:r>
+              <a:rPr lang="en-US" sz="2400" dirty="0"/>
+              <a:t> Indexes</a:t>
+            </a:r>
+          </a:p>
+          <a:p>
+            <a:pPr lvl="1"/>
+            <a:r>
+              <a:rPr lang="en-US" sz="2400" dirty="0"/>
+              <a:t>Partitioning</a:t>
+            </a:r>
+          </a:p>
+          <a:p>
+            <a:pPr lvl="1"/>
+            <a:r>
+              <a:rPr lang="en-US" sz="2400" dirty="0"/>
+              <a:t>In-Memory OLTP (</a:t>
+            </a:r>
+            <a:r>
+              <a:rPr lang="en-US" sz="2400" dirty="0" err="1"/>
+              <a:t>Hekaton</a:t>
+            </a:r>
+            <a:r>
+              <a:rPr lang="en-US" sz="2400" dirty="0"/>
+              <a:t>)</a:t>
+            </a:r>
+          </a:p>
+        </p:txBody>
+      </p:sp>
+    </p:spTree>
+    <p:extLst>
+      <p:ext uri="{BB962C8B-B14F-4D97-AF65-F5344CB8AC3E}">
+        <p14:creationId xmlns:p14="http://schemas.microsoft.com/office/powerpoint/2010/main" val="2711985537"/>
+      </p:ext>
+    </p:extLst>
+  </p:cSld>
+  <p:clrMapOvr>
+    <a:masterClrMapping/>
+  </p:clrMapOvr>
+</p:sld>
+</file>
+
+<file path=ppt/slides/slide18.xml><?xml version="1.0" encoding="utf-8"?>
+<p:sld xmlns:a="http://schemas.openxmlformats.org/drawingml/2006/main" xmlns:r="http://schemas.openxmlformats.org/officeDocument/2006/relationships" xmlns:p="http://schemas.openxmlformats.org/presentationml/2006/main">
+  <p:cSld>
+    <p:spTree>
+      <p:nvGrpSpPr>
+        <p:cNvPr id="1" name=""/>
+        <p:cNvGrpSpPr/>
+        <p:nvPr/>
+      </p:nvGrpSpPr>
+      <p:grpSpPr>
+        <a:xfrm>
+          <a:off x="0" y="0"/>
+          <a:ext cx="0" cy="0"/>
+          <a:chOff x="0" y="0"/>
+          <a:chExt cx="0" cy="0"/>
+        </a:xfrm>
+      </p:grpSpPr>
+      <p:sp>
+        <p:nvSpPr>
+          <p:cNvPr id="2" name="Title 1"/>
+          <p:cNvSpPr>
+            <a:spLocks noGrp="1"/>
+          </p:cNvSpPr>
+          <p:nvPr>
+            <p:ph type="title"/>
+          </p:nvPr>
+        </p:nvSpPr>
+        <p:spPr/>
+        <p:txBody>
+          <a:bodyPr/>
+          <a:lstStyle/>
+          <a:p>
+            <a:r>
               <a:rPr lang="en-US" dirty="0" smtClean="0"/>
               <a:t>Snapshots</a:t>
             </a:r>
@@ -8379,7 +8490,7 @@
 </p:sld>
 </file>
 
-<file path=ppt/slides/slide18.xml><?xml version="1.0" encoding="utf-8"?>
+<file path=ppt/slides/slide19.xml><?xml version="1.0" encoding="utf-8"?>
 <p:sld xmlns:a="http://schemas.openxmlformats.org/drawingml/2006/main" xmlns:r="http://schemas.openxmlformats.org/officeDocument/2006/relationships" xmlns:p="http://schemas.openxmlformats.org/presentationml/2006/main">
   <p:cSld>
     <p:spTree>
@@ -8550,188 +8661,6 @@
     <p:extLst>
       <p:ext uri="{BB962C8B-B14F-4D97-AF65-F5344CB8AC3E}">
         <p14:creationId xmlns:p14="http://schemas.microsoft.com/office/powerpoint/2010/main" val="2821876113"/>
-      </p:ext>
-    </p:extLst>
-  </p:cSld>
-  <p:clrMapOvr>
-    <a:masterClrMapping/>
-  </p:clrMapOvr>
-</p:sld>
-</file>
-
-<file path=ppt/slides/slide19.xml><?xml version="1.0" encoding="utf-8"?>
-<p:sld xmlns:a="http://schemas.openxmlformats.org/drawingml/2006/main" xmlns:r="http://schemas.openxmlformats.org/officeDocument/2006/relationships" xmlns:p="http://schemas.openxmlformats.org/presentationml/2006/main">
-  <p:cSld>
-    <p:spTree>
-      <p:nvGrpSpPr>
-        <p:cNvPr id="1" name=""/>
-        <p:cNvGrpSpPr/>
-        <p:nvPr/>
-      </p:nvGrpSpPr>
-      <p:grpSpPr>
-        <a:xfrm>
-          <a:off x="0" y="0"/>
-          <a:ext cx="0" cy="0"/>
-          <a:chOff x="0" y="0"/>
-          <a:chExt cx="0" cy="0"/>
-        </a:xfrm>
-      </p:grpSpPr>
-      <p:sp>
-        <p:nvSpPr>
-          <p:cNvPr id="2" name="Title 1"/>
-          <p:cNvSpPr>
-            <a:spLocks noGrp="1"/>
-          </p:cNvSpPr>
-          <p:nvPr>
-            <p:ph type="title"/>
-          </p:nvPr>
-        </p:nvSpPr>
-        <p:spPr/>
-        <p:txBody>
-          <a:bodyPr/>
-          <a:lstStyle/>
-          <a:p>
-            <a:r>
-              <a:rPr lang="en-US" dirty="0"/>
-              <a:t>SQL Server </a:t>
-            </a:r>
-            <a:r>
-              <a:rPr lang="en-US" dirty="0" smtClean="0"/>
-              <a:t>Features (Speed </a:t>
-            </a:r>
-            <a:r>
-              <a:rPr lang="en-US" dirty="0"/>
-              <a:t>Dating)</a:t>
-            </a:r>
-          </a:p>
-        </p:txBody>
-      </p:sp>
-      <p:sp>
-        <p:nvSpPr>
-          <p:cNvPr id="3" name="Content Placeholder 2"/>
-          <p:cNvSpPr>
-            <a:spLocks noGrp="1"/>
-          </p:cNvSpPr>
-          <p:nvPr>
-            <p:ph idx="1"/>
-          </p:nvPr>
-        </p:nvSpPr>
-        <p:spPr>
-          <a:xfrm>
-            <a:off x="677334" y="1413164"/>
-            <a:ext cx="9060432" cy="5082639"/>
-          </a:xfrm>
-        </p:spPr>
-        <p:txBody>
-          <a:bodyPr>
-            <a:normAutofit/>
-          </a:bodyPr>
-          <a:lstStyle/>
-          <a:p>
-            <a:r>
-              <a:rPr lang="en-US" sz="2800" dirty="0"/>
-              <a:t>Security</a:t>
-            </a:r>
-          </a:p>
-          <a:p>
-            <a:pPr lvl="1"/>
-            <a:r>
-              <a:rPr lang="en-US" sz="2400" dirty="0"/>
-              <a:t>Row-Level</a:t>
-            </a:r>
-            <a:r>
-              <a:rPr lang="en-US" sz="2400" dirty="0">
-                <a:solidFill>
-                  <a:schemeClr val="accent1">
-                    <a:lumMod val="75000"/>
-                  </a:schemeClr>
-                </a:solidFill>
-              </a:rPr>
-              <a:t> </a:t>
-            </a:r>
-            <a:r>
-              <a:rPr lang="en-US" sz="2400" dirty="0"/>
-              <a:t>Security</a:t>
-            </a:r>
-          </a:p>
-          <a:p>
-            <a:pPr lvl="1"/>
-            <a:r>
-              <a:rPr lang="en-US" sz="2400" dirty="0"/>
-              <a:t>Always Encrypted</a:t>
-            </a:r>
-          </a:p>
-          <a:p>
-            <a:r>
-              <a:rPr lang="en-US" sz="2800" dirty="0"/>
-              <a:t>Utility</a:t>
-            </a:r>
-          </a:p>
-          <a:p>
-            <a:pPr lvl="1"/>
-            <a:r>
-              <a:rPr lang="en-US" sz="2400" dirty="0"/>
-              <a:t>Snapshots</a:t>
-            </a:r>
-          </a:p>
-          <a:p>
-            <a:pPr lvl="1"/>
-            <a:r>
-              <a:rPr lang="en-US" sz="2400" dirty="0">
-                <a:solidFill>
-                  <a:schemeClr val="accent1">
-                    <a:lumMod val="75000"/>
-                  </a:schemeClr>
-                </a:solidFill>
-              </a:rPr>
-              <a:t>Temporal Tables</a:t>
-            </a:r>
-          </a:p>
-          <a:p>
-            <a:r>
-              <a:rPr lang="en-US" sz="2800" dirty="0"/>
-              <a:t>Performance</a:t>
-            </a:r>
-          </a:p>
-          <a:p>
-            <a:pPr lvl="1"/>
-            <a:r>
-              <a:rPr lang="en-US" sz="2400" dirty="0" err="1"/>
-              <a:t>Columnstore</a:t>
-            </a:r>
-            <a:r>
-              <a:rPr lang="en-US" sz="2400" dirty="0"/>
-              <a:t> Indexes</a:t>
-            </a:r>
-          </a:p>
-          <a:p>
-            <a:pPr lvl="1"/>
-            <a:r>
-              <a:rPr lang="en-US" sz="2400" dirty="0"/>
-              <a:t>Partitioning</a:t>
-            </a:r>
-          </a:p>
-          <a:p>
-            <a:pPr lvl="1"/>
-            <a:r>
-              <a:rPr lang="en-US" sz="2400" dirty="0"/>
-              <a:t>In-Memory OLTP (</a:t>
-            </a:r>
-            <a:r>
-              <a:rPr lang="en-US" sz="2400" dirty="0" err="1"/>
-              <a:t>Hekaton</a:t>
-            </a:r>
-            <a:r>
-              <a:rPr lang="en-US" sz="2400" dirty="0"/>
-              <a:t>)</a:t>
-            </a:r>
-          </a:p>
-        </p:txBody>
-      </p:sp>
-    </p:spTree>
-    <p:extLst>
-      <p:ext uri="{BB962C8B-B14F-4D97-AF65-F5344CB8AC3E}">
-        <p14:creationId xmlns:p14="http://schemas.microsoft.com/office/powerpoint/2010/main" val="3224025441"/>
       </p:ext>
     </p:extLst>
   </p:cSld>
@@ -10119,6 +10048,188 @@
           <a:lstStyle/>
           <a:p>
             <a:r>
+              <a:rPr lang="en-US" dirty="0"/>
+              <a:t>SQL Server </a:t>
+            </a:r>
+            <a:r>
+              <a:rPr lang="en-US" dirty="0" smtClean="0"/>
+              <a:t>Features (Speed </a:t>
+            </a:r>
+            <a:r>
+              <a:rPr lang="en-US" dirty="0"/>
+              <a:t>Dating)</a:t>
+            </a:r>
+          </a:p>
+        </p:txBody>
+      </p:sp>
+      <p:sp>
+        <p:nvSpPr>
+          <p:cNvPr id="3" name="Content Placeholder 2"/>
+          <p:cNvSpPr>
+            <a:spLocks noGrp="1"/>
+          </p:cNvSpPr>
+          <p:nvPr>
+            <p:ph idx="1"/>
+          </p:nvPr>
+        </p:nvSpPr>
+        <p:spPr>
+          <a:xfrm>
+            <a:off x="677334" y="1413164"/>
+            <a:ext cx="9060432" cy="5082639"/>
+          </a:xfrm>
+        </p:spPr>
+        <p:txBody>
+          <a:bodyPr>
+            <a:normAutofit/>
+          </a:bodyPr>
+          <a:lstStyle/>
+          <a:p>
+            <a:r>
+              <a:rPr lang="en-US" sz="2800" dirty="0"/>
+              <a:t>Security</a:t>
+            </a:r>
+          </a:p>
+          <a:p>
+            <a:pPr lvl="1"/>
+            <a:r>
+              <a:rPr lang="en-US" sz="2400" dirty="0"/>
+              <a:t>Row-Level</a:t>
+            </a:r>
+            <a:r>
+              <a:rPr lang="en-US" sz="2400" dirty="0">
+                <a:solidFill>
+                  <a:schemeClr val="accent1">
+                    <a:lumMod val="75000"/>
+                  </a:schemeClr>
+                </a:solidFill>
+              </a:rPr>
+              <a:t> </a:t>
+            </a:r>
+            <a:r>
+              <a:rPr lang="en-US" sz="2400" dirty="0"/>
+              <a:t>Security</a:t>
+            </a:r>
+          </a:p>
+          <a:p>
+            <a:pPr lvl="1"/>
+            <a:r>
+              <a:rPr lang="en-US" sz="2400" dirty="0"/>
+              <a:t>Always Encrypted</a:t>
+            </a:r>
+          </a:p>
+          <a:p>
+            <a:r>
+              <a:rPr lang="en-US" sz="2800" dirty="0"/>
+              <a:t>Utility</a:t>
+            </a:r>
+          </a:p>
+          <a:p>
+            <a:pPr lvl="1"/>
+            <a:r>
+              <a:rPr lang="en-US" sz="2400" dirty="0"/>
+              <a:t>Snapshots</a:t>
+            </a:r>
+          </a:p>
+          <a:p>
+            <a:pPr lvl="1"/>
+            <a:r>
+              <a:rPr lang="en-US" sz="2400" dirty="0">
+                <a:solidFill>
+                  <a:schemeClr val="accent1">
+                    <a:lumMod val="75000"/>
+                  </a:schemeClr>
+                </a:solidFill>
+              </a:rPr>
+              <a:t>Temporal Tables</a:t>
+            </a:r>
+          </a:p>
+          <a:p>
+            <a:r>
+              <a:rPr lang="en-US" sz="2800" dirty="0"/>
+              <a:t>Performance</a:t>
+            </a:r>
+          </a:p>
+          <a:p>
+            <a:pPr lvl="1"/>
+            <a:r>
+              <a:rPr lang="en-US" sz="2400" dirty="0" err="1"/>
+              <a:t>Columnstore</a:t>
+            </a:r>
+            <a:r>
+              <a:rPr lang="en-US" sz="2400" dirty="0"/>
+              <a:t> Indexes</a:t>
+            </a:r>
+          </a:p>
+          <a:p>
+            <a:pPr lvl="1"/>
+            <a:r>
+              <a:rPr lang="en-US" sz="2400" dirty="0"/>
+              <a:t>Partitioning</a:t>
+            </a:r>
+          </a:p>
+          <a:p>
+            <a:pPr lvl="1"/>
+            <a:r>
+              <a:rPr lang="en-US" sz="2400" dirty="0"/>
+              <a:t>In-Memory OLTP (</a:t>
+            </a:r>
+            <a:r>
+              <a:rPr lang="en-US" sz="2400" dirty="0" err="1"/>
+              <a:t>Hekaton</a:t>
+            </a:r>
+            <a:r>
+              <a:rPr lang="en-US" sz="2400" dirty="0"/>
+              <a:t>)</a:t>
+            </a:r>
+          </a:p>
+        </p:txBody>
+      </p:sp>
+    </p:spTree>
+    <p:extLst>
+      <p:ext uri="{BB962C8B-B14F-4D97-AF65-F5344CB8AC3E}">
+        <p14:creationId xmlns:p14="http://schemas.microsoft.com/office/powerpoint/2010/main" val="3224025441"/>
+      </p:ext>
+    </p:extLst>
+  </p:cSld>
+  <p:clrMapOvr>
+    <a:masterClrMapping/>
+  </p:clrMapOvr>
+</p:sld>
+</file>
+
+<file path=ppt/slides/slide21.xml><?xml version="1.0" encoding="utf-8"?>
+<p:sld xmlns:a="http://schemas.openxmlformats.org/drawingml/2006/main" xmlns:r="http://schemas.openxmlformats.org/officeDocument/2006/relationships" xmlns:p="http://schemas.openxmlformats.org/presentationml/2006/main">
+  <p:cSld>
+    <p:spTree>
+      <p:nvGrpSpPr>
+        <p:cNvPr id="1" name=""/>
+        <p:cNvGrpSpPr/>
+        <p:nvPr/>
+      </p:nvGrpSpPr>
+      <p:grpSpPr>
+        <a:xfrm>
+          <a:off x="0" y="0"/>
+          <a:ext cx="0" cy="0"/>
+          <a:chOff x="0" y="0"/>
+          <a:chExt cx="0" cy="0"/>
+        </a:xfrm>
+      </p:grpSpPr>
+      <p:sp>
+        <p:nvSpPr>
+          <p:cNvPr id="2" name="Title 1"/>
+          <p:cNvSpPr>
+            <a:spLocks noGrp="1"/>
+          </p:cNvSpPr>
+          <p:nvPr>
+            <p:ph type="title"/>
+          </p:nvPr>
+        </p:nvSpPr>
+        <p:spPr/>
+        <p:txBody>
+          <a:bodyPr/>
+          <a:lstStyle/>
+          <a:p>
+            <a:r>
               <a:rPr lang="en-US" dirty="0" smtClean="0"/>
               <a:t>Temporal Tables</a:t>
             </a:r>
@@ -10199,7 +10310,7 @@
 </p:sld>
 </file>
 
-<file path=ppt/slides/slide21.xml><?xml version="1.0" encoding="utf-8"?>
+<file path=ppt/slides/slide22.xml><?xml version="1.0" encoding="utf-8"?>
 <p:sld xmlns:a="http://schemas.openxmlformats.org/drawingml/2006/main" xmlns:r="http://schemas.openxmlformats.org/officeDocument/2006/relationships" xmlns:p="http://schemas.openxmlformats.org/presentationml/2006/main">
   <p:cSld>
     <p:spTree>
@@ -10379,7 +10490,7 @@
 </p:sld>
 </file>
 
-<file path=ppt/slides/slide22.xml><?xml version="1.0" encoding="utf-8"?>
+<file path=ppt/slides/slide23.xml><?xml version="1.0" encoding="utf-8"?>
 <p:sld xmlns:a="http://schemas.openxmlformats.org/drawingml/2006/main" xmlns:r="http://schemas.openxmlformats.org/officeDocument/2006/relationships" xmlns:p="http://schemas.openxmlformats.org/presentationml/2006/main">
   <p:cSld>
     <p:spTree>
@@ -11292,114 +11403,6 @@
 </p:sld>
 </file>
 
-<file path=ppt/slides/slide23.xml><?xml version="1.0" encoding="utf-8"?>
-<p:sld xmlns:a="http://schemas.openxmlformats.org/drawingml/2006/main" xmlns:r="http://schemas.openxmlformats.org/officeDocument/2006/relationships" xmlns:p="http://schemas.openxmlformats.org/presentationml/2006/main">
-  <p:cSld>
-    <p:spTree>
-      <p:nvGrpSpPr>
-        <p:cNvPr id="1" name=""/>
-        <p:cNvGrpSpPr/>
-        <p:nvPr/>
-      </p:nvGrpSpPr>
-      <p:grpSpPr>
-        <a:xfrm>
-          <a:off x="0" y="0"/>
-          <a:ext cx="0" cy="0"/>
-          <a:chOff x="0" y="0"/>
-          <a:chExt cx="0" cy="0"/>
-        </a:xfrm>
-      </p:grpSpPr>
-      <p:sp>
-        <p:nvSpPr>
-          <p:cNvPr id="2" name="Title 1"/>
-          <p:cNvSpPr>
-            <a:spLocks noGrp="1"/>
-          </p:cNvSpPr>
-          <p:nvPr>
-            <p:ph type="title"/>
-          </p:nvPr>
-        </p:nvSpPr>
-        <p:spPr/>
-        <p:txBody>
-          <a:bodyPr/>
-          <a:lstStyle/>
-          <a:p>
-            <a:r>
-              <a:rPr lang="en-US" dirty="0" smtClean="0"/>
-              <a:t>Temporal Tables</a:t>
-            </a:r>
-            <a:endParaRPr lang="en-US" dirty="0"/>
-          </a:p>
-        </p:txBody>
-      </p:sp>
-      <p:sp>
-        <p:nvSpPr>
-          <p:cNvPr id="3" name="Content Placeholder 2"/>
-          <p:cNvSpPr>
-            <a:spLocks noGrp="1"/>
-          </p:cNvSpPr>
-          <p:nvPr>
-            <p:ph idx="1"/>
-          </p:nvPr>
-        </p:nvSpPr>
-        <p:spPr>
-          <a:xfrm>
-            <a:off x="677334" y="1496291"/>
-            <a:ext cx="8596668" cy="4545071"/>
-          </a:xfrm>
-        </p:spPr>
-        <p:txBody>
-          <a:bodyPr>
-            <a:normAutofit/>
-          </a:bodyPr>
-          <a:lstStyle/>
-          <a:p>
-            <a:r>
-              <a:rPr lang="en-US" sz="2800" dirty="0" smtClean="0"/>
-              <a:t>Performance</a:t>
-            </a:r>
-          </a:p>
-          <a:p>
-            <a:pPr lvl="1"/>
-            <a:r>
-              <a:rPr lang="en-US" sz="2400" dirty="0" smtClean="0"/>
-              <a:t>Insert operations – no difference than non-temporal tables</a:t>
-            </a:r>
-          </a:p>
-          <a:p>
-            <a:pPr lvl="1"/>
-            <a:r>
-              <a:rPr lang="en-US" sz="2400" dirty="0" smtClean="0"/>
-              <a:t>Update operations – overhead due to writes to both source and history tables</a:t>
-            </a:r>
-          </a:p>
-          <a:p>
-            <a:pPr lvl="1"/>
-            <a:r>
-              <a:rPr lang="en-US" sz="2400" dirty="0" smtClean="0"/>
-              <a:t>Read operations – Default clustered index on history table usually not helpful – consider changing </a:t>
-            </a:r>
-            <a:r>
-              <a:rPr lang="en-US" sz="2400" dirty="0" smtClean="0"/>
-              <a:t>it</a:t>
-            </a:r>
-            <a:endParaRPr lang="en-US" sz="2400" dirty="0" smtClean="0"/>
-          </a:p>
-        </p:txBody>
-      </p:sp>
-    </p:spTree>
-    <p:extLst>
-      <p:ext uri="{BB962C8B-B14F-4D97-AF65-F5344CB8AC3E}">
-        <p14:creationId xmlns:p14="http://schemas.microsoft.com/office/powerpoint/2010/main" val="2575860685"/>
-      </p:ext>
-    </p:extLst>
-  </p:cSld>
-  <p:clrMapOvr>
-    <a:masterClrMapping/>
-  </p:clrMapOvr>
-</p:sld>
-</file>
-
 <file path=ppt/slides/slide24.xml><?xml version="1.0" encoding="utf-8"?>
 <p:sld xmlns:a="http://schemas.openxmlformats.org/drawingml/2006/main" xmlns:r="http://schemas.openxmlformats.org/officeDocument/2006/relationships" xmlns:p="http://schemas.openxmlformats.org/presentationml/2006/main">
   <p:cSld>
@@ -11452,8 +11455,8 @@
         </p:nvSpPr>
         <p:spPr>
           <a:xfrm>
-            <a:off x="677334" y="1484417"/>
-            <a:ext cx="8596668" cy="4556946"/>
+            <a:off x="677334" y="1496291"/>
+            <a:ext cx="8596668" cy="4545071"/>
           </a:xfrm>
         </p:spPr>
         <p:txBody>
@@ -11464,49 +11467,41 @@
           <a:p>
             <a:r>
               <a:rPr lang="en-US" sz="2800" dirty="0" smtClean="0"/>
-              <a:t>Beware </a:t>
-            </a:r>
-            <a:r>
-              <a:rPr lang="en-US" sz="2800" dirty="0" smtClean="0"/>
-              <a:t>of v1 limitations!</a:t>
+              <a:t>Performance</a:t>
             </a:r>
           </a:p>
           <a:p>
             <a:pPr lvl="1"/>
             <a:r>
               <a:rPr lang="en-US" sz="2400" dirty="0" smtClean="0"/>
-              <a:t>Dropping a column in the source table will drop the column in the history table – all history is lost!</a:t>
+              <a:t>Insert operations – no difference than non-temporal tables</a:t>
             </a:r>
           </a:p>
           <a:p>
             <a:pPr lvl="1"/>
             <a:r>
               <a:rPr lang="en-US" sz="2400" dirty="0" smtClean="0"/>
-              <a:t>Cannot add a non-</a:t>
-            </a:r>
-            <a:r>
-              <a:rPr lang="en-US" sz="2400" dirty="0" err="1" smtClean="0"/>
-              <a:t>nullable</a:t>
-            </a:r>
+              <a:t>Update operations – overhead due to writes to both source and history tables</a:t>
+            </a:r>
+          </a:p>
+          <a:p>
+            <a:pPr lvl="1"/>
             <a:r>
               <a:rPr lang="en-US" sz="2400" dirty="0" smtClean="0"/>
-              <a:t> column to the source table</a:t>
-            </a:r>
-          </a:p>
-          <a:p>
-            <a:pPr lvl="1"/>
+              <a:t>Read operations – Default clustered index on history table usually not helpful – consider changing </a:t>
+            </a:r>
             <a:r>
               <a:rPr lang="en-US" sz="2400" dirty="0" smtClean="0"/>
-              <a:t>Pruning history is an offline operation</a:t>
-            </a:r>
-            <a:endParaRPr lang="en-US" sz="2400" dirty="0"/>
+              <a:t>it</a:t>
+            </a:r>
+            <a:endParaRPr lang="en-US" sz="2400" dirty="0" smtClean="0"/>
           </a:p>
         </p:txBody>
       </p:sp>
     </p:spTree>
     <p:extLst>
       <p:ext uri="{BB962C8B-B14F-4D97-AF65-F5344CB8AC3E}">
-        <p14:creationId xmlns:p14="http://schemas.microsoft.com/office/powerpoint/2010/main" val="4290490720"/>
+        <p14:creationId xmlns:p14="http://schemas.microsoft.com/office/powerpoint/2010/main" val="2575860685"/>
       </p:ext>
     </p:extLst>
   </p:cSld>
@@ -11549,17 +11544,10 @@
           <a:lstStyle/>
           <a:p>
             <a:r>
-              <a:rPr lang="en-US" dirty="0"/>
-              <a:t>SQL Server </a:t>
-            </a:r>
-            <a:r>
               <a:rPr lang="en-US" dirty="0" smtClean="0"/>
-              <a:t>Features (Speed </a:t>
-            </a:r>
-            <a:r>
-              <a:rPr lang="en-US" dirty="0"/>
-              <a:t>Dating)</a:t>
-            </a:r>
+              <a:t>Temporal Tables</a:t>
+            </a:r>
+            <a:endParaRPr lang="en-US" dirty="0"/>
           </a:p>
         </p:txBody>
       </p:sp>
@@ -11575,8 +11563,8 @@
         </p:nvSpPr>
         <p:spPr>
           <a:xfrm>
-            <a:off x="677334" y="1413164"/>
-            <a:ext cx="9060432" cy="5082639"/>
+            <a:off x="677334" y="1484417"/>
+            <a:ext cx="8596668" cy="4556946"/>
           </a:xfrm>
         </p:spPr>
         <p:txBody>
@@ -11586,115 +11574,50 @@
           <a:lstStyle/>
           <a:p>
             <a:r>
-              <a:rPr lang="en-US" sz="2800" dirty="0"/>
-              <a:t>Security</a:t>
+              <a:rPr lang="en-US" sz="2800" dirty="0" smtClean="0"/>
+              <a:t>Beware </a:t>
+            </a:r>
+            <a:r>
+              <a:rPr lang="en-US" sz="2800" dirty="0" smtClean="0"/>
+              <a:t>of v1 limitations!</a:t>
             </a:r>
           </a:p>
           <a:p>
             <a:pPr lvl="1"/>
             <a:r>
-              <a:rPr lang="en-US" sz="2400" dirty="0"/>
-              <a:t>Row-Level</a:t>
-            </a:r>
-            <a:r>
-              <a:rPr lang="en-US" sz="2400" dirty="0">
-                <a:solidFill>
-                  <a:schemeClr val="accent1">
-                    <a:lumMod val="75000"/>
-                  </a:schemeClr>
-                </a:solidFill>
-              </a:rPr>
-              <a:t> </a:t>
-            </a:r>
-            <a:r>
-              <a:rPr lang="en-US" sz="2400" dirty="0"/>
-              <a:t>Security</a:t>
+              <a:rPr lang="en-US" sz="2400" dirty="0" smtClean="0"/>
+              <a:t>Dropping a column in the source table will drop the column in the history table – all history is lost!</a:t>
             </a:r>
           </a:p>
           <a:p>
             <a:pPr lvl="1"/>
             <a:r>
-              <a:rPr lang="en-US" sz="2400" dirty="0"/>
-              <a:t>Always Encrypted</a:t>
-            </a:r>
-          </a:p>
-          <a:p>
-            <a:r>
-              <a:rPr lang="en-US" sz="2800" dirty="0"/>
-              <a:t>Utility</a:t>
+              <a:rPr lang="en-US" sz="2400" dirty="0" smtClean="0"/>
+              <a:t>Cannot add a non-</a:t>
+            </a:r>
+            <a:r>
+              <a:rPr lang="en-US" sz="2400" dirty="0" err="1" smtClean="0"/>
+              <a:t>nullable</a:t>
+            </a:r>
+            <a:r>
+              <a:rPr lang="en-US" sz="2400" dirty="0" smtClean="0"/>
+              <a:t> column to the source table</a:t>
             </a:r>
           </a:p>
           <a:p>
             <a:pPr lvl="1"/>
             <a:r>
-              <a:rPr lang="en-US" sz="2400" dirty="0"/>
-              <a:t>Snapshots</a:t>
-            </a:r>
-          </a:p>
-          <a:p>
-            <a:pPr lvl="1"/>
-            <a:r>
-              <a:rPr lang="en-US" sz="2400" dirty="0"/>
-              <a:t>Temporal Tables</a:t>
-            </a:r>
-          </a:p>
-          <a:p>
-            <a:r>
-              <a:rPr lang="en-US" sz="2800" dirty="0"/>
-              <a:t>Performance</a:t>
-            </a:r>
-          </a:p>
-          <a:p>
-            <a:pPr lvl="1"/>
-            <a:r>
-              <a:rPr lang="en-US" sz="2400" dirty="0" err="1">
-                <a:solidFill>
-                  <a:schemeClr val="accent1">
-                    <a:lumMod val="75000"/>
-                  </a:schemeClr>
-                </a:solidFill>
-              </a:rPr>
-              <a:t>Columnstore</a:t>
-            </a:r>
-            <a:r>
-              <a:rPr lang="en-US" sz="2400" dirty="0">
-                <a:solidFill>
-                  <a:schemeClr val="accent1">
-                    <a:lumMod val="75000"/>
-                  </a:schemeClr>
-                </a:solidFill>
-              </a:rPr>
-              <a:t> Indexes</a:t>
-            </a:r>
-          </a:p>
-          <a:p>
-            <a:pPr lvl="1"/>
-            <a:r>
-              <a:rPr lang="en-US" sz="2400" dirty="0"/>
-              <a:t>Partitioning</a:t>
-            </a:r>
-          </a:p>
-          <a:p>
-            <a:pPr lvl="1"/>
-            <a:r>
-              <a:rPr lang="en-US" sz="2400" dirty="0"/>
-              <a:t>In-Memory OLTP (</a:t>
-            </a:r>
-            <a:r>
-              <a:rPr lang="en-US" sz="2400" dirty="0" err="1"/>
-              <a:t>Hekaton</a:t>
-            </a:r>
-            <a:r>
-              <a:rPr lang="en-US" sz="2400" dirty="0"/>
-              <a:t>)</a:t>
-            </a:r>
+              <a:rPr lang="en-US" sz="2400" dirty="0" smtClean="0"/>
+              <a:t>Pruning history is an offline operation</a:t>
+            </a:r>
+            <a:endParaRPr lang="en-US" sz="2400" dirty="0"/>
           </a:p>
         </p:txBody>
       </p:sp>
     </p:spTree>
     <p:extLst>
       <p:ext uri="{BB962C8B-B14F-4D97-AF65-F5344CB8AC3E}">
-        <p14:creationId xmlns:p14="http://schemas.microsoft.com/office/powerpoint/2010/main" val="3026635559"/>
+        <p14:creationId xmlns:p14="http://schemas.microsoft.com/office/powerpoint/2010/main" val="4290490720"/>
       </p:ext>
     </p:extLst>
   </p:cSld>
@@ -11737,14 +11660,17 @@
           <a:lstStyle/>
           <a:p>
             <a:r>
-              <a:rPr lang="en-US" dirty="0" err="1" smtClean="0"/>
-              <a:t>Columnstore</a:t>
+              <a:rPr lang="en-US" dirty="0"/>
+              <a:t>SQL Server </a:t>
             </a:r>
             <a:r>
               <a:rPr lang="en-US" dirty="0" smtClean="0"/>
-              <a:t> Indexes</a:t>
-            </a:r>
-            <a:endParaRPr lang="en-US" dirty="0"/>
+              <a:t>Features (Speed </a:t>
+            </a:r>
+            <a:r>
+              <a:rPr lang="en-US" dirty="0"/>
+              <a:t>Dating)</a:t>
+            </a:r>
           </a:p>
         </p:txBody>
       </p:sp>
@@ -11760,8 +11686,8 @@
         </p:nvSpPr>
         <p:spPr>
           <a:xfrm>
-            <a:off x="677334" y="1543793"/>
-            <a:ext cx="9345440" cy="4497570"/>
+            <a:off x="677334" y="1413164"/>
+            <a:ext cx="9060432" cy="5082639"/>
           </a:xfrm>
         </p:spPr>
         <p:txBody>
@@ -11771,38 +11697,107 @@
           <a:lstStyle/>
           <a:p>
             <a:r>
-              <a:rPr lang="en-US" sz="2800" dirty="0" smtClean="0"/>
-              <a:t>Traditional indexes are row-based copies of selected columns in table</a:t>
-            </a:r>
-          </a:p>
-          <a:p>
-            <a:r>
-              <a:rPr lang="en-US" sz="2800" dirty="0" err="1" smtClean="0"/>
+              <a:rPr lang="en-US" sz="2800" dirty="0"/>
+              <a:t>Security</a:t>
+            </a:r>
+          </a:p>
+          <a:p>
+            <a:pPr lvl="1"/>
+            <a:r>
+              <a:rPr lang="en-US" sz="2400" dirty="0"/>
+              <a:t>Row-Level</a:t>
+            </a:r>
+            <a:r>
+              <a:rPr lang="en-US" sz="2400" dirty="0">
+                <a:solidFill>
+                  <a:schemeClr val="accent1">
+                    <a:lumMod val="75000"/>
+                  </a:schemeClr>
+                </a:solidFill>
+              </a:rPr>
+              <a:t> </a:t>
+            </a:r>
+            <a:r>
+              <a:rPr lang="en-US" sz="2400" dirty="0"/>
+              <a:t>Security</a:t>
+            </a:r>
+          </a:p>
+          <a:p>
+            <a:pPr lvl="1"/>
+            <a:r>
+              <a:rPr lang="en-US" sz="2400" dirty="0"/>
+              <a:t>Always Encrypted</a:t>
+            </a:r>
+          </a:p>
+          <a:p>
+            <a:r>
+              <a:rPr lang="en-US" sz="2800" dirty="0"/>
+              <a:t>Utility</a:t>
+            </a:r>
+          </a:p>
+          <a:p>
+            <a:pPr lvl="1"/>
+            <a:r>
+              <a:rPr lang="en-US" sz="2400" dirty="0"/>
+              <a:t>Snapshots</a:t>
+            </a:r>
+          </a:p>
+          <a:p>
+            <a:pPr lvl="1"/>
+            <a:r>
+              <a:rPr lang="en-US" sz="2400" dirty="0"/>
+              <a:t>Temporal Tables</a:t>
+            </a:r>
+          </a:p>
+          <a:p>
+            <a:r>
+              <a:rPr lang="en-US" sz="2800" dirty="0"/>
+              <a:t>Performance</a:t>
+            </a:r>
+          </a:p>
+          <a:p>
+            <a:pPr lvl="1"/>
+            <a:r>
+              <a:rPr lang="en-US" sz="2400" dirty="0" err="1">
+                <a:solidFill>
+                  <a:schemeClr val="accent1">
+                    <a:lumMod val="75000"/>
+                  </a:schemeClr>
+                </a:solidFill>
+              </a:rPr>
               <a:t>Columnstore</a:t>
             </a:r>
             <a:r>
-              <a:rPr lang="en-US" sz="2800" dirty="0" smtClean="0"/>
-              <a:t> turns this around and orders the index by column</a:t>
-            </a:r>
-          </a:p>
-          <a:p>
-            <a:r>
-              <a:rPr lang="en-US" sz="2800" dirty="0" smtClean="0"/>
-              <a:t>Can be the entire table (clustered index) or a subset of columns (</a:t>
-            </a:r>
-            <a:r>
-              <a:rPr lang="en-US" sz="2800" dirty="0" err="1" smtClean="0"/>
-              <a:t>nonclustered</a:t>
-            </a:r>
-            <a:r>
-              <a:rPr lang="en-US" sz="2800" dirty="0" smtClean="0"/>
-              <a:t> index)</a:t>
-            </a:r>
-          </a:p>
-          <a:p>
-            <a:r>
-              <a:rPr lang="en-US" sz="2800" dirty="0" smtClean="0"/>
-              <a:t>Can be combined with row-based indexes</a:t>
+              <a:rPr lang="en-US" sz="2400" dirty="0">
+                <a:solidFill>
+                  <a:schemeClr val="accent1">
+                    <a:lumMod val="75000"/>
+                  </a:schemeClr>
+                </a:solidFill>
+              </a:rPr>
+              <a:t> Indexes</a:t>
+            </a:r>
+          </a:p>
+          <a:p>
+            <a:pPr lvl="1"/>
+            <a:r>
+              <a:rPr lang="en-US" sz="2400" dirty="0"/>
+              <a:t>Partitioning</a:t>
+            </a:r>
+          </a:p>
+          <a:p>
+            <a:pPr lvl="1"/>
+            <a:r>
+              <a:rPr lang="en-US" sz="2400" dirty="0"/>
+              <a:t>In-Memory OLTP (</a:t>
+            </a:r>
+            <a:r>
+              <a:rPr lang="en-US" sz="2400" dirty="0" err="1"/>
+              <a:t>Hekaton</a:t>
+            </a:r>
+            <a:r>
+              <a:rPr lang="en-US" sz="2400" dirty="0"/>
+              <a:t>)</a:t>
             </a:r>
           </a:p>
         </p:txBody>
@@ -11810,7 +11805,7 @@
     </p:spTree>
     <p:extLst>
       <p:ext uri="{BB962C8B-B14F-4D97-AF65-F5344CB8AC3E}">
-        <p14:creationId xmlns:p14="http://schemas.microsoft.com/office/powerpoint/2010/main" val="1051046761"/>
+        <p14:creationId xmlns:p14="http://schemas.microsoft.com/office/powerpoint/2010/main" val="3026635559"/>
       </p:ext>
     </p:extLst>
   </p:cSld>
@@ -11876,6 +11871,122 @@
         </p:nvSpPr>
         <p:spPr>
           <a:xfrm>
+            <a:off x="677334" y="1543793"/>
+            <a:ext cx="9345440" cy="4497570"/>
+          </a:xfrm>
+        </p:spPr>
+        <p:txBody>
+          <a:bodyPr>
+            <a:normAutofit/>
+          </a:bodyPr>
+          <a:lstStyle/>
+          <a:p>
+            <a:r>
+              <a:rPr lang="en-US" sz="2800" dirty="0" smtClean="0"/>
+              <a:t>Traditional indexes are row-based copies of selected columns in table</a:t>
+            </a:r>
+          </a:p>
+          <a:p>
+            <a:r>
+              <a:rPr lang="en-US" sz="2800" dirty="0" err="1" smtClean="0"/>
+              <a:t>Columnstore</a:t>
+            </a:r>
+            <a:r>
+              <a:rPr lang="en-US" sz="2800" dirty="0" smtClean="0"/>
+              <a:t> turns this around and orders the index by column</a:t>
+            </a:r>
+          </a:p>
+          <a:p>
+            <a:r>
+              <a:rPr lang="en-US" sz="2800" dirty="0" smtClean="0"/>
+              <a:t>Can be the entire table (clustered index) or a subset of columns (</a:t>
+            </a:r>
+            <a:r>
+              <a:rPr lang="en-US" sz="2800" dirty="0" err="1" smtClean="0"/>
+              <a:t>nonclustered</a:t>
+            </a:r>
+            <a:r>
+              <a:rPr lang="en-US" sz="2800" dirty="0" smtClean="0"/>
+              <a:t> index)</a:t>
+            </a:r>
+          </a:p>
+          <a:p>
+            <a:r>
+              <a:rPr lang="en-US" sz="2800" dirty="0" smtClean="0"/>
+              <a:t>Can be combined with row-based indexes</a:t>
+            </a:r>
+          </a:p>
+        </p:txBody>
+      </p:sp>
+    </p:spTree>
+    <p:extLst>
+      <p:ext uri="{BB962C8B-B14F-4D97-AF65-F5344CB8AC3E}">
+        <p14:creationId xmlns:p14="http://schemas.microsoft.com/office/powerpoint/2010/main" val="1051046761"/>
+      </p:ext>
+    </p:extLst>
+  </p:cSld>
+  <p:clrMapOvr>
+    <a:masterClrMapping/>
+  </p:clrMapOvr>
+</p:sld>
+</file>
+
+<file path=ppt/slides/slide28.xml><?xml version="1.0" encoding="utf-8"?>
+<p:sld xmlns:a="http://schemas.openxmlformats.org/drawingml/2006/main" xmlns:r="http://schemas.openxmlformats.org/officeDocument/2006/relationships" xmlns:p="http://schemas.openxmlformats.org/presentationml/2006/main">
+  <p:cSld>
+    <p:spTree>
+      <p:nvGrpSpPr>
+        <p:cNvPr id="1" name=""/>
+        <p:cNvGrpSpPr/>
+        <p:nvPr/>
+      </p:nvGrpSpPr>
+      <p:grpSpPr>
+        <a:xfrm>
+          <a:off x="0" y="0"/>
+          <a:ext cx="0" cy="0"/>
+          <a:chOff x="0" y="0"/>
+          <a:chExt cx="0" cy="0"/>
+        </a:xfrm>
+      </p:grpSpPr>
+      <p:sp>
+        <p:nvSpPr>
+          <p:cNvPr id="2" name="Title 1"/>
+          <p:cNvSpPr>
+            <a:spLocks noGrp="1"/>
+          </p:cNvSpPr>
+          <p:nvPr>
+            <p:ph type="title"/>
+          </p:nvPr>
+        </p:nvSpPr>
+        <p:spPr/>
+        <p:txBody>
+          <a:bodyPr/>
+          <a:lstStyle/>
+          <a:p>
+            <a:r>
+              <a:rPr lang="en-US" dirty="0" err="1" smtClean="0"/>
+              <a:t>Columnstore</a:t>
+            </a:r>
+            <a:r>
+              <a:rPr lang="en-US" dirty="0" smtClean="0"/>
+              <a:t> Indexes</a:t>
+            </a:r>
+            <a:endParaRPr lang="en-US" dirty="0"/>
+          </a:p>
+        </p:txBody>
+      </p:sp>
+      <p:sp>
+        <p:nvSpPr>
+          <p:cNvPr id="3" name="Content Placeholder 2"/>
+          <p:cNvSpPr>
+            <a:spLocks noGrp="1"/>
+          </p:cNvSpPr>
+          <p:nvPr>
+            <p:ph idx="1"/>
+          </p:nvPr>
+        </p:nvSpPr>
+        <p:spPr>
+          <a:xfrm>
             <a:off x="677333" y="1472541"/>
             <a:ext cx="9499819" cy="4568822"/>
           </a:xfrm>
@@ -11933,7 +12044,7 @@
 </p:sld>
 </file>
 
-<file path=ppt/slides/slide28.xml><?xml version="1.0" encoding="utf-8"?>
+<file path=ppt/slides/slide29.xml><?xml version="1.0" encoding="utf-8"?>
 <p:sld xmlns:a="http://schemas.openxmlformats.org/drawingml/2006/main" xmlns:r="http://schemas.openxmlformats.org/officeDocument/2006/relationships" xmlns:p="http://schemas.openxmlformats.org/presentationml/2006/main">
   <p:cSld>
     <p:spTree>
@@ -12117,188 +12228,6 @@
 </p:sld>
 </file>
 
-<file path=ppt/slides/slide29.xml><?xml version="1.0" encoding="utf-8"?>
-<p:sld xmlns:a="http://schemas.openxmlformats.org/drawingml/2006/main" xmlns:r="http://schemas.openxmlformats.org/officeDocument/2006/relationships" xmlns:p="http://schemas.openxmlformats.org/presentationml/2006/main">
-  <p:cSld>
-    <p:spTree>
-      <p:nvGrpSpPr>
-        <p:cNvPr id="1" name=""/>
-        <p:cNvGrpSpPr/>
-        <p:nvPr/>
-      </p:nvGrpSpPr>
-      <p:grpSpPr>
-        <a:xfrm>
-          <a:off x="0" y="0"/>
-          <a:ext cx="0" cy="0"/>
-          <a:chOff x="0" y="0"/>
-          <a:chExt cx="0" cy="0"/>
-        </a:xfrm>
-      </p:grpSpPr>
-      <p:sp>
-        <p:nvSpPr>
-          <p:cNvPr id="2" name="Title 1"/>
-          <p:cNvSpPr>
-            <a:spLocks noGrp="1"/>
-          </p:cNvSpPr>
-          <p:nvPr>
-            <p:ph type="title"/>
-          </p:nvPr>
-        </p:nvSpPr>
-        <p:spPr/>
-        <p:txBody>
-          <a:bodyPr/>
-          <a:lstStyle/>
-          <a:p>
-            <a:r>
-              <a:rPr lang="en-US" dirty="0"/>
-              <a:t>SQL Server </a:t>
-            </a:r>
-            <a:r>
-              <a:rPr lang="en-US" dirty="0" smtClean="0"/>
-              <a:t>Features (Speed </a:t>
-            </a:r>
-            <a:r>
-              <a:rPr lang="en-US" dirty="0"/>
-              <a:t>Dating)</a:t>
-            </a:r>
-          </a:p>
-        </p:txBody>
-      </p:sp>
-      <p:sp>
-        <p:nvSpPr>
-          <p:cNvPr id="3" name="Content Placeholder 2"/>
-          <p:cNvSpPr>
-            <a:spLocks noGrp="1"/>
-          </p:cNvSpPr>
-          <p:nvPr>
-            <p:ph idx="1"/>
-          </p:nvPr>
-        </p:nvSpPr>
-        <p:spPr>
-          <a:xfrm>
-            <a:off x="677334" y="1413164"/>
-            <a:ext cx="9060432" cy="5082639"/>
-          </a:xfrm>
-        </p:spPr>
-        <p:txBody>
-          <a:bodyPr>
-            <a:normAutofit/>
-          </a:bodyPr>
-          <a:lstStyle/>
-          <a:p>
-            <a:r>
-              <a:rPr lang="en-US" sz="2800" dirty="0"/>
-              <a:t>Security</a:t>
-            </a:r>
-          </a:p>
-          <a:p>
-            <a:pPr lvl="1"/>
-            <a:r>
-              <a:rPr lang="en-US" sz="2400" dirty="0"/>
-              <a:t>Row-Level</a:t>
-            </a:r>
-            <a:r>
-              <a:rPr lang="en-US" sz="2400" dirty="0">
-                <a:solidFill>
-                  <a:schemeClr val="accent1">
-                    <a:lumMod val="75000"/>
-                  </a:schemeClr>
-                </a:solidFill>
-              </a:rPr>
-              <a:t> </a:t>
-            </a:r>
-            <a:r>
-              <a:rPr lang="en-US" sz="2400" dirty="0"/>
-              <a:t>Security</a:t>
-            </a:r>
-          </a:p>
-          <a:p>
-            <a:pPr lvl="1"/>
-            <a:r>
-              <a:rPr lang="en-US" sz="2400" dirty="0"/>
-              <a:t>Always Encrypted</a:t>
-            </a:r>
-          </a:p>
-          <a:p>
-            <a:r>
-              <a:rPr lang="en-US" sz="2800" dirty="0"/>
-              <a:t>Utility</a:t>
-            </a:r>
-          </a:p>
-          <a:p>
-            <a:pPr lvl="1"/>
-            <a:r>
-              <a:rPr lang="en-US" sz="2400" dirty="0"/>
-              <a:t>Snapshots</a:t>
-            </a:r>
-          </a:p>
-          <a:p>
-            <a:pPr lvl="1"/>
-            <a:r>
-              <a:rPr lang="en-US" sz="2400" dirty="0"/>
-              <a:t>Temporal Tables</a:t>
-            </a:r>
-          </a:p>
-          <a:p>
-            <a:r>
-              <a:rPr lang="en-US" sz="2800" dirty="0"/>
-              <a:t>Performance</a:t>
-            </a:r>
-          </a:p>
-          <a:p>
-            <a:pPr lvl="1"/>
-            <a:r>
-              <a:rPr lang="en-US" sz="2400" dirty="0" err="1"/>
-              <a:t>Columnstore</a:t>
-            </a:r>
-            <a:r>
-              <a:rPr lang="en-US" sz="2400" dirty="0"/>
-              <a:t> Indexes</a:t>
-            </a:r>
-          </a:p>
-          <a:p>
-            <a:pPr lvl="1"/>
-            <a:r>
-              <a:rPr lang="en-US" sz="2400" dirty="0">
-                <a:solidFill>
-                  <a:schemeClr val="accent1">
-                    <a:lumMod val="75000"/>
-                  </a:schemeClr>
-                </a:solidFill>
-              </a:rPr>
-              <a:t>Partitioning</a:t>
-            </a:r>
-          </a:p>
-          <a:p>
-            <a:pPr lvl="1"/>
-            <a:r>
-              <a:rPr lang="en-US" sz="2400" dirty="0"/>
-              <a:t>In-Memory OLTP (</a:t>
-            </a:r>
-            <a:r>
-              <a:rPr lang="en-US" sz="2400" dirty="0" err="1"/>
-              <a:t>Hekaton</a:t>
-            </a:r>
-            <a:r>
-              <a:rPr lang="en-US" sz="2400" dirty="0"/>
-              <a:t>)</a:t>
-            </a:r>
-          </a:p>
-        </p:txBody>
-      </p:sp>
-    </p:spTree>
-    <p:extLst>
-      <p:ext uri="{BB962C8B-B14F-4D97-AF65-F5344CB8AC3E}">
-        <p14:creationId xmlns:p14="http://schemas.microsoft.com/office/powerpoint/2010/main" val="2594898125"/>
-      </p:ext>
-    </p:extLst>
-  </p:cSld>
-  <p:clrMapOvr>
-    <a:masterClrMapping/>
-  </p:clrMapOvr>
-</p:sld>
-</file>
-
 <file path=ppt/slides/slide3.xml><?xml version="1.0" encoding="utf-8"?>
 <p:sld xmlns:a="http://schemas.openxmlformats.org/drawingml/2006/main" xmlns:r="http://schemas.openxmlformats.org/officeDocument/2006/relationships" xmlns:p="http://schemas.openxmlformats.org/presentationml/2006/main">
   <p:cSld>
@@ -12493,6 +12422,188 @@
           <a:lstStyle/>
           <a:p>
             <a:r>
+              <a:rPr lang="en-US" dirty="0"/>
+              <a:t>SQL Server </a:t>
+            </a:r>
+            <a:r>
+              <a:rPr lang="en-US" dirty="0" smtClean="0"/>
+              <a:t>Features (Speed </a:t>
+            </a:r>
+            <a:r>
+              <a:rPr lang="en-US" dirty="0"/>
+              <a:t>Dating)</a:t>
+            </a:r>
+          </a:p>
+        </p:txBody>
+      </p:sp>
+      <p:sp>
+        <p:nvSpPr>
+          <p:cNvPr id="3" name="Content Placeholder 2"/>
+          <p:cNvSpPr>
+            <a:spLocks noGrp="1"/>
+          </p:cNvSpPr>
+          <p:nvPr>
+            <p:ph idx="1"/>
+          </p:nvPr>
+        </p:nvSpPr>
+        <p:spPr>
+          <a:xfrm>
+            <a:off x="677334" y="1413164"/>
+            <a:ext cx="9060432" cy="5082639"/>
+          </a:xfrm>
+        </p:spPr>
+        <p:txBody>
+          <a:bodyPr>
+            <a:normAutofit/>
+          </a:bodyPr>
+          <a:lstStyle/>
+          <a:p>
+            <a:r>
+              <a:rPr lang="en-US" sz="2800" dirty="0"/>
+              <a:t>Security</a:t>
+            </a:r>
+          </a:p>
+          <a:p>
+            <a:pPr lvl="1"/>
+            <a:r>
+              <a:rPr lang="en-US" sz="2400" dirty="0"/>
+              <a:t>Row-Level</a:t>
+            </a:r>
+            <a:r>
+              <a:rPr lang="en-US" sz="2400" dirty="0">
+                <a:solidFill>
+                  <a:schemeClr val="accent1">
+                    <a:lumMod val="75000"/>
+                  </a:schemeClr>
+                </a:solidFill>
+              </a:rPr>
+              <a:t> </a:t>
+            </a:r>
+            <a:r>
+              <a:rPr lang="en-US" sz="2400" dirty="0"/>
+              <a:t>Security</a:t>
+            </a:r>
+          </a:p>
+          <a:p>
+            <a:pPr lvl="1"/>
+            <a:r>
+              <a:rPr lang="en-US" sz="2400" dirty="0"/>
+              <a:t>Always Encrypted</a:t>
+            </a:r>
+          </a:p>
+          <a:p>
+            <a:r>
+              <a:rPr lang="en-US" sz="2800" dirty="0"/>
+              <a:t>Utility</a:t>
+            </a:r>
+          </a:p>
+          <a:p>
+            <a:pPr lvl="1"/>
+            <a:r>
+              <a:rPr lang="en-US" sz="2400" dirty="0"/>
+              <a:t>Snapshots</a:t>
+            </a:r>
+          </a:p>
+          <a:p>
+            <a:pPr lvl="1"/>
+            <a:r>
+              <a:rPr lang="en-US" sz="2400" dirty="0"/>
+              <a:t>Temporal Tables</a:t>
+            </a:r>
+          </a:p>
+          <a:p>
+            <a:r>
+              <a:rPr lang="en-US" sz="2800" dirty="0"/>
+              <a:t>Performance</a:t>
+            </a:r>
+          </a:p>
+          <a:p>
+            <a:pPr lvl="1"/>
+            <a:r>
+              <a:rPr lang="en-US" sz="2400" dirty="0" err="1"/>
+              <a:t>Columnstore</a:t>
+            </a:r>
+            <a:r>
+              <a:rPr lang="en-US" sz="2400" dirty="0"/>
+              <a:t> Indexes</a:t>
+            </a:r>
+          </a:p>
+          <a:p>
+            <a:pPr lvl="1"/>
+            <a:r>
+              <a:rPr lang="en-US" sz="2400" dirty="0">
+                <a:solidFill>
+                  <a:schemeClr val="accent1">
+                    <a:lumMod val="75000"/>
+                  </a:schemeClr>
+                </a:solidFill>
+              </a:rPr>
+              <a:t>Partitioning</a:t>
+            </a:r>
+          </a:p>
+          <a:p>
+            <a:pPr lvl="1"/>
+            <a:r>
+              <a:rPr lang="en-US" sz="2400" dirty="0"/>
+              <a:t>In-Memory OLTP (</a:t>
+            </a:r>
+            <a:r>
+              <a:rPr lang="en-US" sz="2400" dirty="0" err="1"/>
+              <a:t>Hekaton</a:t>
+            </a:r>
+            <a:r>
+              <a:rPr lang="en-US" sz="2400" dirty="0"/>
+              <a:t>)</a:t>
+            </a:r>
+          </a:p>
+        </p:txBody>
+      </p:sp>
+    </p:spTree>
+    <p:extLst>
+      <p:ext uri="{BB962C8B-B14F-4D97-AF65-F5344CB8AC3E}">
+        <p14:creationId xmlns:p14="http://schemas.microsoft.com/office/powerpoint/2010/main" val="2594898125"/>
+      </p:ext>
+    </p:extLst>
+  </p:cSld>
+  <p:clrMapOvr>
+    <a:masterClrMapping/>
+  </p:clrMapOvr>
+</p:sld>
+</file>
+
+<file path=ppt/slides/slide31.xml><?xml version="1.0" encoding="utf-8"?>
+<p:sld xmlns:a="http://schemas.openxmlformats.org/drawingml/2006/main" xmlns:r="http://schemas.openxmlformats.org/officeDocument/2006/relationships" xmlns:p="http://schemas.openxmlformats.org/presentationml/2006/main">
+  <p:cSld>
+    <p:spTree>
+      <p:nvGrpSpPr>
+        <p:cNvPr id="1" name=""/>
+        <p:cNvGrpSpPr/>
+        <p:nvPr/>
+      </p:nvGrpSpPr>
+      <p:grpSpPr>
+        <a:xfrm>
+          <a:off x="0" y="0"/>
+          <a:ext cx="0" cy="0"/>
+          <a:chOff x="0" y="0"/>
+          <a:chExt cx="0" cy="0"/>
+        </a:xfrm>
+      </p:grpSpPr>
+      <p:sp>
+        <p:nvSpPr>
+          <p:cNvPr id="2" name="Title 1"/>
+          <p:cNvSpPr>
+            <a:spLocks noGrp="1"/>
+          </p:cNvSpPr>
+          <p:nvPr>
+            <p:ph type="title"/>
+          </p:nvPr>
+        </p:nvSpPr>
+        <p:spPr/>
+        <p:txBody>
+          <a:bodyPr/>
+          <a:lstStyle/>
+          <a:p>
+            <a:r>
               <a:rPr lang="en-US" dirty="0" smtClean="0"/>
               <a:t>Partitioning</a:t>
             </a:r>
@@ -12593,7 +12704,7 @@
 </p:sld>
 </file>
 
-<file path=ppt/slides/slide31.xml><?xml version="1.0" encoding="utf-8"?>
+<file path=ppt/slides/slide32.xml><?xml version="1.0" encoding="utf-8"?>
 <p:sld xmlns:a="http://schemas.openxmlformats.org/drawingml/2006/main" xmlns:r="http://schemas.openxmlformats.org/officeDocument/2006/relationships" xmlns:p="http://schemas.openxmlformats.org/presentationml/2006/main">
   <p:cSld>
     <p:spTree>
@@ -12670,7 +12781,7 @@
 </p:sld>
 </file>
 
-<file path=ppt/slides/slide32.xml><?xml version="1.0" encoding="utf-8"?>
+<file path=ppt/slides/slide33.xml><?xml version="1.0" encoding="utf-8"?>
 <p:sld xmlns:a="http://schemas.openxmlformats.org/drawingml/2006/main" xmlns:r="http://schemas.openxmlformats.org/officeDocument/2006/relationships" xmlns:p="http://schemas.openxmlformats.org/presentationml/2006/main">
   <p:cSld>
     <p:spTree>
@@ -12747,7 +12858,7 @@
 </p:sld>
 </file>
 
-<file path=ppt/slides/slide33.xml><?xml version="1.0" encoding="utf-8"?>
+<file path=ppt/slides/slide34.xml><?xml version="1.0" encoding="utf-8"?>
 <p:sld xmlns:a="http://schemas.openxmlformats.org/drawingml/2006/main" xmlns:r="http://schemas.openxmlformats.org/officeDocument/2006/relationships" xmlns:p="http://schemas.openxmlformats.org/presentationml/2006/main">
   <p:cSld>
     <p:spTree>
@@ -12927,200 +13038,6 @@
 </p:sld>
 </file>
 
-<file path=ppt/slides/slide34.xml><?xml version="1.0" encoding="utf-8"?>
-<p:sld xmlns:a="http://schemas.openxmlformats.org/drawingml/2006/main" xmlns:r="http://schemas.openxmlformats.org/officeDocument/2006/relationships" xmlns:p="http://schemas.openxmlformats.org/presentationml/2006/main">
-  <p:cSld>
-    <p:spTree>
-      <p:nvGrpSpPr>
-        <p:cNvPr id="1" name=""/>
-        <p:cNvGrpSpPr/>
-        <p:nvPr/>
-      </p:nvGrpSpPr>
-      <p:grpSpPr>
-        <a:xfrm>
-          <a:off x="0" y="0"/>
-          <a:ext cx="0" cy="0"/>
-          <a:chOff x="0" y="0"/>
-          <a:chExt cx="0" cy="0"/>
-        </a:xfrm>
-      </p:grpSpPr>
-      <p:sp>
-        <p:nvSpPr>
-          <p:cNvPr id="2" name="Title 1"/>
-          <p:cNvSpPr>
-            <a:spLocks noGrp="1"/>
-          </p:cNvSpPr>
-          <p:nvPr>
-            <p:ph type="title"/>
-          </p:nvPr>
-        </p:nvSpPr>
-        <p:spPr/>
-        <p:txBody>
-          <a:bodyPr/>
-          <a:lstStyle/>
-          <a:p>
-            <a:r>
-              <a:rPr lang="en-US" dirty="0"/>
-              <a:t>SQL Server </a:t>
-            </a:r>
-            <a:r>
-              <a:rPr lang="en-US" dirty="0" smtClean="0"/>
-              <a:t>Features (Speed </a:t>
-            </a:r>
-            <a:r>
-              <a:rPr lang="en-US" dirty="0"/>
-              <a:t>Dating)</a:t>
-            </a:r>
-          </a:p>
-        </p:txBody>
-      </p:sp>
-      <p:sp>
-        <p:nvSpPr>
-          <p:cNvPr id="3" name="Content Placeholder 2"/>
-          <p:cNvSpPr>
-            <a:spLocks noGrp="1"/>
-          </p:cNvSpPr>
-          <p:nvPr>
-            <p:ph idx="1"/>
-          </p:nvPr>
-        </p:nvSpPr>
-        <p:spPr>
-          <a:xfrm>
-            <a:off x="677334" y="1413164"/>
-            <a:ext cx="9060432" cy="5082639"/>
-          </a:xfrm>
-        </p:spPr>
-        <p:txBody>
-          <a:bodyPr>
-            <a:normAutofit/>
-          </a:bodyPr>
-          <a:lstStyle/>
-          <a:p>
-            <a:r>
-              <a:rPr lang="en-US" sz="2800" dirty="0"/>
-              <a:t>Security</a:t>
-            </a:r>
-          </a:p>
-          <a:p>
-            <a:pPr lvl="1"/>
-            <a:r>
-              <a:rPr lang="en-US" sz="2400" dirty="0"/>
-              <a:t>Row-Level</a:t>
-            </a:r>
-            <a:r>
-              <a:rPr lang="en-US" sz="2400" dirty="0">
-                <a:solidFill>
-                  <a:schemeClr val="accent1">
-                    <a:lumMod val="75000"/>
-                  </a:schemeClr>
-                </a:solidFill>
-              </a:rPr>
-              <a:t> </a:t>
-            </a:r>
-            <a:r>
-              <a:rPr lang="en-US" sz="2400" dirty="0"/>
-              <a:t>Security</a:t>
-            </a:r>
-          </a:p>
-          <a:p>
-            <a:pPr lvl="1"/>
-            <a:r>
-              <a:rPr lang="en-US" sz="2400" dirty="0"/>
-              <a:t>Always Encrypted</a:t>
-            </a:r>
-          </a:p>
-          <a:p>
-            <a:r>
-              <a:rPr lang="en-US" sz="2800" dirty="0"/>
-              <a:t>Utility</a:t>
-            </a:r>
-          </a:p>
-          <a:p>
-            <a:pPr lvl="1"/>
-            <a:r>
-              <a:rPr lang="en-US" sz="2400" dirty="0"/>
-              <a:t>Snapshots</a:t>
-            </a:r>
-          </a:p>
-          <a:p>
-            <a:pPr lvl="1"/>
-            <a:r>
-              <a:rPr lang="en-US" sz="2400" dirty="0"/>
-              <a:t>Temporal Tables</a:t>
-            </a:r>
-          </a:p>
-          <a:p>
-            <a:r>
-              <a:rPr lang="en-US" sz="2800" dirty="0"/>
-              <a:t>Performance</a:t>
-            </a:r>
-          </a:p>
-          <a:p>
-            <a:pPr lvl="1"/>
-            <a:r>
-              <a:rPr lang="en-US" sz="2400" dirty="0" err="1"/>
-              <a:t>Columnstore</a:t>
-            </a:r>
-            <a:r>
-              <a:rPr lang="en-US" sz="2400" dirty="0"/>
-              <a:t> Indexes</a:t>
-            </a:r>
-          </a:p>
-          <a:p>
-            <a:pPr lvl="1"/>
-            <a:r>
-              <a:rPr lang="en-US" sz="2400" dirty="0"/>
-              <a:t>Partitioning</a:t>
-            </a:r>
-          </a:p>
-          <a:p>
-            <a:pPr lvl="1"/>
-            <a:r>
-              <a:rPr lang="en-US" sz="2400" dirty="0">
-                <a:solidFill>
-                  <a:schemeClr val="accent1">
-                    <a:lumMod val="75000"/>
-                  </a:schemeClr>
-                </a:solidFill>
-              </a:rPr>
-              <a:t>In-Memory OLTP (</a:t>
-            </a:r>
-            <a:r>
-              <a:rPr lang="en-US" sz="2400" dirty="0" err="1">
-                <a:solidFill>
-                  <a:schemeClr val="accent1">
-                    <a:lumMod val="75000"/>
-                  </a:schemeClr>
-                </a:solidFill>
-              </a:rPr>
-              <a:t>Hekaton</a:t>
-            </a:r>
-            <a:r>
-              <a:rPr lang="en-US" sz="2400" dirty="0">
-                <a:solidFill>
-                  <a:schemeClr val="accent1">
-                    <a:lumMod val="75000"/>
-                  </a:schemeClr>
-                </a:solidFill>
-              </a:rPr>
-              <a:t>)</a:t>
-            </a:r>
-          </a:p>
-        </p:txBody>
-      </p:sp>
-    </p:spTree>
-    <p:extLst>
-      <p:ext uri="{BB962C8B-B14F-4D97-AF65-F5344CB8AC3E}">
-        <p14:creationId xmlns:p14="http://schemas.microsoft.com/office/powerpoint/2010/main" val="3808175220"/>
-      </p:ext>
-    </p:extLst>
-  </p:cSld>
-  <p:clrMapOvr>
-    <a:masterClrMapping/>
-  </p:clrMapOvr>
-</p:sld>
-</file>
-
 <file path=ppt/slides/slide35.xml><?xml version="1.0" encoding="utf-8"?>
 <p:sld xmlns:a="http://schemas.openxmlformats.org/drawingml/2006/main" xmlns:r="http://schemas.openxmlformats.org/officeDocument/2006/relationships" xmlns:p="http://schemas.openxmlformats.org/presentationml/2006/main">
   <p:cSld>
@@ -13155,6 +13072,200 @@
           <a:p>
             <a:r>
               <a:rPr lang="en-US" dirty="0"/>
+              <a:t>SQL Server </a:t>
+            </a:r>
+            <a:r>
+              <a:rPr lang="en-US" dirty="0" smtClean="0"/>
+              <a:t>Features (Speed </a:t>
+            </a:r>
+            <a:r>
+              <a:rPr lang="en-US" dirty="0"/>
+              <a:t>Dating)</a:t>
+            </a:r>
+          </a:p>
+        </p:txBody>
+      </p:sp>
+      <p:sp>
+        <p:nvSpPr>
+          <p:cNvPr id="3" name="Content Placeholder 2"/>
+          <p:cNvSpPr>
+            <a:spLocks noGrp="1"/>
+          </p:cNvSpPr>
+          <p:nvPr>
+            <p:ph idx="1"/>
+          </p:nvPr>
+        </p:nvSpPr>
+        <p:spPr>
+          <a:xfrm>
+            <a:off x="677334" y="1413164"/>
+            <a:ext cx="9060432" cy="5082639"/>
+          </a:xfrm>
+        </p:spPr>
+        <p:txBody>
+          <a:bodyPr>
+            <a:normAutofit/>
+          </a:bodyPr>
+          <a:lstStyle/>
+          <a:p>
+            <a:r>
+              <a:rPr lang="en-US" sz="2800" dirty="0"/>
+              <a:t>Security</a:t>
+            </a:r>
+          </a:p>
+          <a:p>
+            <a:pPr lvl="1"/>
+            <a:r>
+              <a:rPr lang="en-US" sz="2400" dirty="0"/>
+              <a:t>Row-Level</a:t>
+            </a:r>
+            <a:r>
+              <a:rPr lang="en-US" sz="2400" dirty="0">
+                <a:solidFill>
+                  <a:schemeClr val="accent1">
+                    <a:lumMod val="75000"/>
+                  </a:schemeClr>
+                </a:solidFill>
+              </a:rPr>
+              <a:t> </a:t>
+            </a:r>
+            <a:r>
+              <a:rPr lang="en-US" sz="2400" dirty="0"/>
+              <a:t>Security</a:t>
+            </a:r>
+          </a:p>
+          <a:p>
+            <a:pPr lvl="1"/>
+            <a:r>
+              <a:rPr lang="en-US" sz="2400" dirty="0"/>
+              <a:t>Always Encrypted</a:t>
+            </a:r>
+          </a:p>
+          <a:p>
+            <a:r>
+              <a:rPr lang="en-US" sz="2800" dirty="0"/>
+              <a:t>Utility</a:t>
+            </a:r>
+          </a:p>
+          <a:p>
+            <a:pPr lvl="1"/>
+            <a:r>
+              <a:rPr lang="en-US" sz="2400" dirty="0"/>
+              <a:t>Snapshots</a:t>
+            </a:r>
+          </a:p>
+          <a:p>
+            <a:pPr lvl="1"/>
+            <a:r>
+              <a:rPr lang="en-US" sz="2400" dirty="0"/>
+              <a:t>Temporal Tables</a:t>
+            </a:r>
+          </a:p>
+          <a:p>
+            <a:r>
+              <a:rPr lang="en-US" sz="2800" dirty="0"/>
+              <a:t>Performance</a:t>
+            </a:r>
+          </a:p>
+          <a:p>
+            <a:pPr lvl="1"/>
+            <a:r>
+              <a:rPr lang="en-US" sz="2400" dirty="0" err="1"/>
+              <a:t>Columnstore</a:t>
+            </a:r>
+            <a:r>
+              <a:rPr lang="en-US" sz="2400" dirty="0"/>
+              <a:t> Indexes</a:t>
+            </a:r>
+          </a:p>
+          <a:p>
+            <a:pPr lvl="1"/>
+            <a:r>
+              <a:rPr lang="en-US" sz="2400" dirty="0"/>
+              <a:t>Partitioning</a:t>
+            </a:r>
+          </a:p>
+          <a:p>
+            <a:pPr lvl="1"/>
+            <a:r>
+              <a:rPr lang="en-US" sz="2400" dirty="0">
+                <a:solidFill>
+                  <a:schemeClr val="accent1">
+                    <a:lumMod val="75000"/>
+                  </a:schemeClr>
+                </a:solidFill>
+              </a:rPr>
+              <a:t>In-Memory OLTP (</a:t>
+            </a:r>
+            <a:r>
+              <a:rPr lang="en-US" sz="2400" dirty="0" err="1">
+                <a:solidFill>
+                  <a:schemeClr val="accent1">
+                    <a:lumMod val="75000"/>
+                  </a:schemeClr>
+                </a:solidFill>
+              </a:rPr>
+              <a:t>Hekaton</a:t>
+            </a:r>
+            <a:r>
+              <a:rPr lang="en-US" sz="2400" dirty="0">
+                <a:solidFill>
+                  <a:schemeClr val="accent1">
+                    <a:lumMod val="75000"/>
+                  </a:schemeClr>
+                </a:solidFill>
+              </a:rPr>
+              <a:t>)</a:t>
+            </a:r>
+          </a:p>
+        </p:txBody>
+      </p:sp>
+    </p:spTree>
+    <p:extLst>
+      <p:ext uri="{BB962C8B-B14F-4D97-AF65-F5344CB8AC3E}">
+        <p14:creationId xmlns:p14="http://schemas.microsoft.com/office/powerpoint/2010/main" val="3808175220"/>
+      </p:ext>
+    </p:extLst>
+  </p:cSld>
+  <p:clrMapOvr>
+    <a:masterClrMapping/>
+  </p:clrMapOvr>
+</p:sld>
+</file>
+
+<file path=ppt/slides/slide36.xml><?xml version="1.0" encoding="utf-8"?>
+<p:sld xmlns:a="http://schemas.openxmlformats.org/drawingml/2006/main" xmlns:r="http://schemas.openxmlformats.org/officeDocument/2006/relationships" xmlns:p="http://schemas.openxmlformats.org/presentationml/2006/main">
+  <p:cSld>
+    <p:spTree>
+      <p:nvGrpSpPr>
+        <p:cNvPr id="1" name=""/>
+        <p:cNvGrpSpPr/>
+        <p:nvPr/>
+      </p:nvGrpSpPr>
+      <p:grpSpPr>
+        <a:xfrm>
+          <a:off x="0" y="0"/>
+          <a:ext cx="0" cy="0"/>
+          <a:chOff x="0" y="0"/>
+          <a:chExt cx="0" cy="0"/>
+        </a:xfrm>
+      </p:grpSpPr>
+      <p:sp>
+        <p:nvSpPr>
+          <p:cNvPr id="2" name="Title 1"/>
+          <p:cNvSpPr>
+            <a:spLocks noGrp="1"/>
+          </p:cNvSpPr>
+          <p:nvPr>
+            <p:ph type="title"/>
+          </p:nvPr>
+        </p:nvSpPr>
+        <p:spPr/>
+        <p:txBody>
+          <a:bodyPr/>
+          <a:lstStyle/>
+          <a:p>
+            <a:r>
+              <a:rPr lang="en-US" dirty="0"/>
               <a:t>In-Memory OLTP</a:t>
             </a:r>
           </a:p>
@@ -13192,7 +13303,7 @@
 </p:sld>
 </file>
 
-<file path=ppt/slides/slide36.xml><?xml version="1.0" encoding="utf-8"?>
+<file path=ppt/slides/slide37.xml><?xml version="1.0" encoding="utf-8"?>
 <p:sld xmlns:a="http://schemas.openxmlformats.org/drawingml/2006/main" xmlns:r="http://schemas.openxmlformats.org/officeDocument/2006/relationships" xmlns:p="http://schemas.openxmlformats.org/presentationml/2006/main">
   <p:cSld>
     <p:spTree>
@@ -13372,7 +13483,7 @@
 </p:sld>
 </file>
 
-<file path=ppt/slides/slide37.xml><?xml version="1.0" encoding="utf-8"?>
+<file path=ppt/slides/slide38.xml><?xml version="1.0" encoding="utf-8"?>
 <p:sld xmlns:a="http://schemas.openxmlformats.org/drawingml/2006/main" xmlns:r="http://schemas.openxmlformats.org/officeDocument/2006/relationships" xmlns:p="http://schemas.openxmlformats.org/presentationml/2006/main">
   <p:cSld>
     <p:spTree>
@@ -14198,17 +14309,10 @@
           <a:lstStyle/>
           <a:p>
             <a:r>
-              <a:rPr lang="en-US" dirty="0"/>
-              <a:t>SQL Server </a:t>
-            </a:r>
-            <a:r>
               <a:rPr lang="en-US" dirty="0" smtClean="0"/>
-              <a:t>Features (Speed </a:t>
-            </a:r>
-            <a:r>
-              <a:rPr lang="en-US" dirty="0"/>
-              <a:t>Dating)</a:t>
-            </a:r>
+              <a:t>SQL Server 2017</a:t>
+            </a:r>
+            <a:endParaRPr lang="en-US" dirty="0"/>
           </a:p>
         </p:txBody>
       </p:sp>
@@ -14224,8 +14328,8 @@
         </p:nvSpPr>
         <p:spPr>
           <a:xfrm>
-            <a:off x="677334" y="1413164"/>
-            <a:ext cx="9060432" cy="5082639"/>
+            <a:off x="677334" y="1567543"/>
+            <a:ext cx="8596668" cy="4473819"/>
           </a:xfrm>
         </p:spPr>
         <p:txBody>
@@ -14235,95 +14339,65 @@
           <a:lstStyle/>
           <a:p>
             <a:r>
-              <a:rPr lang="en-US" sz="2800" dirty="0"/>
-              <a:t>Security</a:t>
+              <a:rPr lang="en-US" sz="2800" dirty="0" smtClean="0"/>
+              <a:t>Until April 19, simply referred to as </a:t>
+            </a:r>
+            <a:r>
+              <a:rPr lang="en-US" sz="2800" dirty="0" err="1" smtClean="0"/>
+              <a:t>vNext</a:t>
+            </a:r>
+            <a:endParaRPr lang="en-US" sz="2800" dirty="0" smtClean="0"/>
+          </a:p>
+          <a:p>
+            <a:r>
+              <a:rPr lang="en-US" sz="2800" dirty="0" smtClean="0"/>
+              <a:t>Current on CTP 2.0 (6</a:t>
+            </a:r>
+            <a:r>
+              <a:rPr lang="en-US" sz="2800" baseline="30000" dirty="0" smtClean="0"/>
+              <a:t>th</a:t>
+            </a:r>
+            <a:r>
+              <a:rPr lang="en-US" sz="2800" dirty="0" smtClean="0"/>
+              <a:t> preview version)</a:t>
             </a:r>
           </a:p>
           <a:p>
             <a:pPr lvl="1"/>
             <a:r>
-              <a:rPr lang="en-US" sz="2400" dirty="0">
-                <a:solidFill>
-                  <a:schemeClr val="accent1">
-                    <a:lumMod val="75000"/>
-                  </a:schemeClr>
-                </a:solidFill>
-              </a:rPr>
-              <a:t>Row-Level Security</a:t>
-            </a:r>
-          </a:p>
-          <a:p>
-            <a:pPr lvl="1"/>
-            <a:r>
-              <a:rPr lang="en-US" sz="2400" dirty="0"/>
-              <a:t>Always Encrypted</a:t>
-            </a:r>
-          </a:p>
-          <a:p>
-            <a:r>
-              <a:rPr lang="en-US" sz="2800" dirty="0"/>
-              <a:t>Utility</a:t>
-            </a:r>
-          </a:p>
-          <a:p>
-            <a:pPr lvl="1"/>
-            <a:r>
-              <a:rPr lang="en-US" sz="2400" dirty="0"/>
-              <a:t>Snapshots</a:t>
-            </a:r>
-          </a:p>
-          <a:p>
-            <a:pPr lvl="1"/>
-            <a:r>
-              <a:rPr lang="en-US" sz="2400" dirty="0"/>
-              <a:t>Temporal Tables</a:t>
-            </a:r>
-          </a:p>
-          <a:p>
-            <a:r>
-              <a:rPr lang="en-US" sz="2800" dirty="0"/>
-              <a:t>Performance</a:t>
-            </a:r>
-          </a:p>
-          <a:p>
-            <a:pPr lvl="1"/>
-            <a:r>
-              <a:rPr lang="en-US" sz="2400" dirty="0" err="1"/>
-              <a:t>Columnstore</a:t>
-            </a:r>
-            <a:r>
-              <a:rPr lang="en-US" sz="2400" dirty="0"/>
-              <a:t> Indexes</a:t>
-            </a:r>
-          </a:p>
-          <a:p>
-            <a:pPr lvl="1"/>
-            <a:r>
-              <a:rPr lang="en-US" sz="2400" dirty="0"/>
-              <a:t>Partitioning</a:t>
-            </a:r>
-          </a:p>
-          <a:p>
-            <a:pPr lvl="1"/>
-            <a:r>
-              <a:rPr lang="en-US" sz="2400" dirty="0"/>
-              <a:t>In-Memory OLTP (</a:t>
-            </a:r>
-            <a:r>
-              <a:rPr lang="en-US" sz="2400" dirty="0" err="1"/>
-              <a:t>Hekaton</a:t>
-            </a:r>
-            <a:r>
-              <a:rPr lang="en-US" sz="2400" dirty="0"/>
-              <a:t>)</a:t>
-            </a:r>
+              <a:rPr lang="en-US" sz="2600" dirty="0" smtClean="0"/>
+              <a:t>(SQL Server 2016 had 10 preview versions)</a:t>
+            </a:r>
+          </a:p>
+          <a:p>
+            <a:r>
+              <a:rPr lang="en-US" sz="2800" dirty="0" smtClean="0"/>
+              <a:t>No release date announced as of yet</a:t>
+            </a:r>
+          </a:p>
+          <a:p>
+            <a:r>
+              <a:rPr lang="en-US" sz="2800" dirty="0" smtClean="0"/>
+              <a:t>No edition announcements as of yet</a:t>
+            </a:r>
+          </a:p>
+          <a:p>
+            <a:r>
+              <a:rPr lang="en-US" sz="2800" dirty="0" smtClean="0"/>
+              <a:t>New features: availability on Linux, Python integration, </a:t>
+            </a:r>
+            <a:r>
+              <a:rPr lang="en-US" sz="2800" smtClean="0"/>
+              <a:t>adaptive query plans, graph databases</a:t>
+            </a:r>
+            <a:endParaRPr lang="en-US" sz="2800" dirty="0"/>
           </a:p>
         </p:txBody>
       </p:sp>
     </p:spTree>
     <p:extLst>
       <p:ext uri="{BB962C8B-B14F-4D97-AF65-F5344CB8AC3E}">
-        <p14:creationId xmlns:p14="http://schemas.microsoft.com/office/powerpoint/2010/main" val="1218328260"/>
+        <p14:creationId xmlns:p14="http://schemas.microsoft.com/office/powerpoint/2010/main" val="639742404"/>
       </p:ext>
     </p:extLst>
   </p:cSld>
@@ -14367,7 +14441,15 @@
           <a:p>
             <a:r>
               <a:rPr lang="en-US" dirty="0"/>
-              <a:t>Row-Level Security</a:t>
+              <a:t>SQL Server </a:t>
+            </a:r>
+            <a:r>
+              <a:rPr lang="en-US" dirty="0" smtClean="0"/>
+              <a:t>Features (Speed </a:t>
+            </a:r>
+            <a:r>
+              <a:rPr lang="en-US" dirty="0"/>
+              <a:t>Dating)</a:t>
             </a:r>
           </a:p>
         </p:txBody>
@@ -14384,8 +14466,8 @@
         </p:nvSpPr>
         <p:spPr>
           <a:xfrm>
-            <a:off x="677333" y="1603169"/>
-            <a:ext cx="9677949" cy="5094514"/>
+            <a:off x="677334" y="1413164"/>
+            <a:ext cx="9060432" cy="5082639"/>
           </a:xfrm>
         </p:spPr>
         <p:txBody>
@@ -14396,44 +14478,94 @@
           <a:p>
             <a:r>
               <a:rPr lang="en-US" sz="2800" dirty="0"/>
-              <a:t>Powerful and flexible way to control who can view or modify data at the row-level grain</a:t>
+              <a:t>Security</a:t>
+            </a:r>
+          </a:p>
+          <a:p>
+            <a:pPr lvl="1"/>
+            <a:r>
+              <a:rPr lang="en-US" sz="2400" dirty="0">
+                <a:solidFill>
+                  <a:schemeClr val="accent1">
+                    <a:lumMod val="75000"/>
+                  </a:schemeClr>
+                </a:solidFill>
+              </a:rPr>
+              <a:t>Row-Level Security</a:t>
+            </a:r>
+          </a:p>
+          <a:p>
+            <a:pPr lvl="1"/>
+            <a:r>
+              <a:rPr lang="en-US" sz="2400" dirty="0"/>
+              <a:t>Always Encrypted</a:t>
             </a:r>
           </a:p>
           <a:p>
             <a:r>
               <a:rPr lang="en-US" sz="2800" dirty="0"/>
-              <a:t>Access is controlled by a user-defined function that is applied to the table’s security</a:t>
+              <a:t>Utility</a:t>
+            </a:r>
+          </a:p>
+          <a:p>
+            <a:pPr lvl="1"/>
+            <a:r>
+              <a:rPr lang="en-US" sz="2400" dirty="0"/>
+              <a:t>Snapshots</a:t>
+            </a:r>
+          </a:p>
+          <a:p>
+            <a:pPr lvl="1"/>
+            <a:r>
+              <a:rPr lang="en-US" sz="2400" dirty="0"/>
+              <a:t>Temporal Tables</a:t>
             </a:r>
           </a:p>
           <a:p>
             <a:r>
               <a:rPr lang="en-US" sz="2800" dirty="0"/>
-              <a:t>Non-qualifying rows are silently blocked</a:t>
+              <a:t>Performance</a:t>
             </a:r>
           </a:p>
           <a:p>
             <a:pPr lvl="1"/>
             <a:r>
+              <a:rPr lang="en-US" sz="2400" dirty="0" err="1"/>
+              <a:t>Columnstore</a:t>
+            </a:r>
+            <a:r>
               <a:rPr lang="en-US" sz="2400" dirty="0"/>
-              <a:t>Select predicate – controls read access to the row</a:t>
+              <a:t> Indexes</a:t>
             </a:r>
           </a:p>
           <a:p>
             <a:pPr lvl="1"/>
             <a:r>
               <a:rPr lang="en-US" sz="2400" dirty="0"/>
-              <a:t>Block predicate – controls modification to the row (either before or after the modification)</a:t>
-            </a:r>
-          </a:p>
-          <a:p>
-            <a:endParaRPr lang="en-US" sz="2800" dirty="0"/>
+              <a:t>Partitioning</a:t>
+            </a:r>
+          </a:p>
+          <a:p>
+            <a:pPr lvl="1"/>
+            <a:r>
+              <a:rPr lang="en-US" sz="2400" dirty="0"/>
+              <a:t>In-Memory OLTP (</a:t>
+            </a:r>
+            <a:r>
+              <a:rPr lang="en-US" sz="2400" dirty="0" err="1"/>
+              <a:t>Hekaton</a:t>
+            </a:r>
+            <a:r>
+              <a:rPr lang="en-US" sz="2400" dirty="0"/>
+              <a:t>)</a:t>
+            </a:r>
           </a:p>
         </p:txBody>
       </p:sp>
     </p:spTree>
     <p:extLst>
       <p:ext uri="{BB962C8B-B14F-4D97-AF65-F5344CB8AC3E}">
-        <p14:creationId xmlns:p14="http://schemas.microsoft.com/office/powerpoint/2010/main" val="2443207938"/>
+        <p14:creationId xmlns:p14="http://schemas.microsoft.com/office/powerpoint/2010/main" val="1218328260"/>
       </p:ext>
     </p:extLst>
   </p:cSld>

</xml_diff>

<commit_message>
Larger font on Always Encrypted drawing.
</commit_message>
<xml_diff>
--- a/AwesomeFreeSQLServerFeatures.pptx
+++ b/AwesomeFreeSQLServerFeatures.pptx
@@ -234,7 +234,7 @@
           <a:p>
             <a:fld id="{64F240C7-B8B6-4D73-9667-9F7409B58D21}" type="datetimeFigureOut">
               <a:rPr lang="en-US" smtClean="0"/>
-              <a:t>4/25/2017</a:t>
+              <a:t>4/27/2017</a:t>
             </a:fld>
             <a:endParaRPr lang="en-US"/>
           </a:p>
@@ -932,11 +932,11 @@
           <a:lstStyle/>
           <a:p>
             <a:r>
-              <a:rPr lang="en-US" dirty="0" smtClean="0"/>
+              <a:rPr lang="en-US" dirty="0"/>
               <a:t>Most DBAs</a:t>
             </a:r>
             <a:r>
-              <a:rPr lang="en-US" baseline="0" dirty="0" smtClean="0"/>
+              <a:rPr lang="en-US" baseline="0" dirty="0"/>
               <a:t> – myself included – don’t seem to like this feature.  It appears to be designed for hosted SQL environments where the people managing the databases aren’t fully trusted.</a:t>
             </a:r>
             <a:endParaRPr lang="en-US" dirty="0"/>
@@ -1024,11 +1024,11 @@
           <a:lstStyle/>
           <a:p>
             <a:r>
-              <a:rPr lang="en-US" dirty="0" smtClean="0"/>
+              <a:rPr lang="en-US" dirty="0"/>
               <a:t>Most DBAs</a:t>
             </a:r>
             <a:r>
-              <a:rPr lang="en-US" baseline="0" dirty="0" smtClean="0"/>
+              <a:rPr lang="en-US" baseline="0" dirty="0"/>
               <a:t> – myself included – don’t seem to like this feature.  It appears to be designed for hosted SQL environments where the people managing the databases aren’t fully trusted.</a:t>
             </a:r>
             <a:endParaRPr lang="en-US" dirty="0"/>
@@ -1116,19 +1116,19 @@
           <a:lstStyle/>
           <a:p>
             <a:r>
-              <a:rPr lang="en-US" dirty="0" smtClean="0"/>
+              <a:rPr lang="en-US" dirty="0"/>
               <a:t>Storage</a:t>
             </a:r>
             <a:r>
-              <a:rPr lang="en-US" baseline="0" dirty="0" smtClean="0"/>
+              <a:rPr lang="en-US" baseline="0" dirty="0"/>
               <a:t> bloat: </a:t>
             </a:r>
             <a:r>
-              <a:rPr lang="en-US" dirty="0" smtClean="0"/>
+              <a:rPr lang="en-US" dirty="0"/>
               <a:t>Any input data type that is less than 16 bytes get stored as 65 bytes, so (for instance) an</a:t>
             </a:r>
             <a:r>
-              <a:rPr lang="en-US" baseline="0" dirty="0" smtClean="0"/>
+              <a:rPr lang="en-US" baseline="0" dirty="0"/>
               <a:t> integer value (4 bytes) is stored as 65 bytes, an overhead of 16+ fold!</a:t>
             </a:r>
           </a:p>
@@ -1752,7 +1752,7 @@
           </a:lstStyle>
           <a:p>
             <a:r>
-              <a:rPr lang="en-US" smtClean="0"/>
+              <a:rPr lang="en-US"/>
               <a:t>Click to edit Master title style</a:t>
             </a:r>
             <a:endParaRPr lang="en-US" dirty="0"/>
@@ -1872,7 +1872,7 @@
           </a:lstStyle>
           <a:p>
             <a:r>
-              <a:rPr lang="en-US" smtClean="0"/>
+              <a:rPr lang="en-US"/>
               <a:t>Click to edit Master subtitle style</a:t>
             </a:r>
             <a:endParaRPr lang="en-US" dirty="0"/>
@@ -1897,7 +1897,7 @@
             <a:fld id="{B61BEF0D-F0BB-DE4B-95CE-6DB70DBA9567}" type="datetimeFigureOut">
               <a:rPr lang="en-US" smtClean="0"/>
               <a:pPr/>
-              <a:t>4/25/2017</a:t>
+              <a:t>4/27/2017</a:t>
             </a:fld>
             <a:endParaRPr lang="en-US" dirty="0"/>
           </a:p>
@@ -2003,7 +2003,7 @@
           </a:lstStyle>
           <a:p>
             <a:r>
-              <a:rPr lang="en-US" smtClean="0"/>
+              <a:rPr lang="en-US"/>
               <a:t>Click to edit Master title style</a:t>
             </a:r>
             <a:endParaRPr lang="en-US" dirty="0"/>
@@ -2126,7 +2126,7 @@
           <a:p>
             <a:pPr lvl="0"/>
             <a:r>
-              <a:rPr lang="en-US" smtClean="0"/>
+              <a:rPr lang="en-US"/>
               <a:t>Edit Master text styles</a:t>
             </a:r>
           </a:p>
@@ -2150,7 +2150,7 @@
             <a:fld id="{B61BEF0D-F0BB-DE4B-95CE-6DB70DBA9567}" type="datetimeFigureOut">
               <a:rPr lang="en-US" smtClean="0"/>
               <a:pPr/>
-              <a:t>4/25/2017</a:t>
+              <a:t>4/27/2017</a:t>
             </a:fld>
             <a:endParaRPr lang="en-US" dirty="0"/>
           </a:p>
@@ -2256,7 +2256,7 @@
           </a:lstStyle>
           <a:p>
             <a:r>
-              <a:rPr lang="en-US" smtClean="0"/>
+              <a:rPr lang="en-US"/>
               <a:t>Click to edit Master title style</a:t>
             </a:r>
             <a:endParaRPr lang="en-US" dirty="0"/>
@@ -2320,7 +2320,7 @@
           <a:p>
             <a:pPr lvl="0"/>
             <a:r>
-              <a:rPr lang="en-US" smtClean="0"/>
+              <a:rPr lang="en-US"/>
               <a:t>Edit Master text styles</a:t>
             </a:r>
           </a:p>
@@ -2442,7 +2442,7 @@
           <a:p>
             <a:pPr lvl="0"/>
             <a:r>
-              <a:rPr lang="en-US" smtClean="0"/>
+              <a:rPr lang="en-US"/>
               <a:t>Edit Master text styles</a:t>
             </a:r>
           </a:p>
@@ -2466,7 +2466,7 @@
             <a:fld id="{B61BEF0D-F0BB-DE4B-95CE-6DB70DBA9567}" type="datetimeFigureOut">
               <a:rPr lang="en-US" smtClean="0"/>
               <a:pPr/>
-              <a:t>4/25/2017</a:t>
+              <a:t>4/27/2017</a:t>
             </a:fld>
             <a:endParaRPr lang="en-US" dirty="0"/>
           </a:p>
@@ -2648,7 +2648,7 @@
           </a:lstStyle>
           <a:p>
             <a:r>
-              <a:rPr lang="en-US" smtClean="0"/>
+              <a:rPr lang="en-US"/>
               <a:t>Click to edit Master title style</a:t>
             </a:r>
             <a:endParaRPr lang="en-US" dirty="0"/>
@@ -2771,7 +2771,7 @@
           <a:p>
             <a:pPr lvl="0"/>
             <a:r>
-              <a:rPr lang="en-US" smtClean="0"/>
+              <a:rPr lang="en-US"/>
               <a:t>Edit Master text styles</a:t>
             </a:r>
           </a:p>
@@ -2795,7 +2795,7 @@
             <a:fld id="{B61BEF0D-F0BB-DE4B-95CE-6DB70DBA9567}" type="datetimeFigureOut">
               <a:rPr lang="en-US" smtClean="0"/>
               <a:pPr/>
-              <a:t>4/25/2017</a:t>
+              <a:t>4/27/2017</a:t>
             </a:fld>
             <a:endParaRPr lang="en-US" dirty="0"/>
           </a:p>
@@ -2901,7 +2901,7 @@
           </a:lstStyle>
           <a:p>
             <a:r>
-              <a:rPr lang="en-US" smtClean="0"/>
+              <a:rPr lang="en-US"/>
               <a:t>Click to edit Master title style</a:t>
             </a:r>
             <a:endParaRPr lang="en-US" dirty="0"/>
@@ -2965,7 +2965,7 @@
           <a:p>
             <a:pPr lvl="0"/>
             <a:r>
-              <a:rPr lang="en-US" smtClean="0"/>
+              <a:rPr lang="en-US"/>
               <a:t>Edit Master text styles</a:t>
             </a:r>
           </a:p>
@@ -3087,7 +3087,7 @@
           <a:p>
             <a:pPr lvl="0"/>
             <a:r>
-              <a:rPr lang="en-US" smtClean="0"/>
+              <a:rPr lang="en-US"/>
               <a:t>Edit Master text styles</a:t>
             </a:r>
           </a:p>
@@ -3111,7 +3111,7 @@
             <a:fld id="{B61BEF0D-F0BB-DE4B-95CE-6DB70DBA9567}" type="datetimeFigureOut">
               <a:rPr lang="en-US" smtClean="0"/>
               <a:pPr/>
-              <a:t>4/25/2017</a:t>
+              <a:t>4/27/2017</a:t>
             </a:fld>
             <a:endParaRPr lang="en-US" dirty="0"/>
           </a:p>
@@ -3293,7 +3293,7 @@
           </a:lstStyle>
           <a:p>
             <a:r>
-              <a:rPr lang="en-US" smtClean="0"/>
+              <a:rPr lang="en-US"/>
               <a:t>Click to edit Master title style</a:t>
             </a:r>
             <a:endParaRPr lang="en-US" dirty="0"/>
@@ -3354,7 +3354,7 @@
           <a:p>
             <a:pPr lvl="0"/>
             <a:r>
-              <a:rPr lang="en-US" smtClean="0"/>
+              <a:rPr lang="en-US"/>
               <a:t>Edit Master text styles</a:t>
             </a:r>
           </a:p>
@@ -3476,7 +3476,7 @@
           <a:p>
             <a:pPr lvl="0"/>
             <a:r>
-              <a:rPr lang="en-US" smtClean="0"/>
+              <a:rPr lang="en-US"/>
               <a:t>Edit Master text styles</a:t>
             </a:r>
           </a:p>
@@ -3500,7 +3500,7 @@
             <a:fld id="{B61BEF0D-F0BB-DE4B-95CE-6DB70DBA9567}" type="datetimeFigureOut">
               <a:rPr lang="en-US" smtClean="0"/>
               <a:pPr/>
-              <a:t>4/25/2017</a:t>
+              <a:t>4/27/2017</a:t>
             </a:fld>
             <a:endParaRPr lang="en-US" dirty="0"/>
           </a:p>
@@ -3595,7 +3595,7 @@
           <a:lstStyle/>
           <a:p>
             <a:r>
-              <a:rPr lang="en-US" smtClean="0"/>
+              <a:rPr lang="en-US"/>
               <a:t>Click to edit Master title style</a:t>
             </a:r>
             <a:endParaRPr lang="en-US" dirty="0"/>
@@ -3619,35 +3619,35 @@
           <a:p>
             <a:pPr lvl="0"/>
             <a:r>
-              <a:rPr lang="en-US" smtClean="0"/>
+              <a:rPr lang="en-US"/>
               <a:t>Edit Master text styles</a:t>
             </a:r>
           </a:p>
           <a:p>
             <a:pPr lvl="1"/>
             <a:r>
-              <a:rPr lang="en-US" smtClean="0"/>
+              <a:rPr lang="en-US"/>
               <a:t>Second level</a:t>
             </a:r>
           </a:p>
           <a:p>
             <a:pPr lvl="2"/>
             <a:r>
-              <a:rPr lang="en-US" smtClean="0"/>
+              <a:rPr lang="en-US"/>
               <a:t>Third level</a:t>
             </a:r>
           </a:p>
           <a:p>
             <a:pPr lvl="3"/>
             <a:r>
-              <a:rPr lang="en-US" smtClean="0"/>
+              <a:rPr lang="en-US"/>
               <a:t>Fourth level</a:t>
             </a:r>
           </a:p>
           <a:p>
             <a:pPr lvl="4"/>
             <a:r>
-              <a:rPr lang="en-US" smtClean="0"/>
+              <a:rPr lang="en-US"/>
               <a:t>Fifth level</a:t>
             </a:r>
             <a:endParaRPr lang="en-US" dirty="0"/>
@@ -3672,7 +3672,7 @@
             <a:fld id="{B61BEF0D-F0BB-DE4B-95CE-6DB70DBA9567}" type="datetimeFigureOut">
               <a:rPr lang="en-US" smtClean="0"/>
               <a:pPr/>
-              <a:t>4/25/2017</a:t>
+              <a:t>4/27/2017</a:t>
             </a:fld>
             <a:endParaRPr lang="en-US" dirty="0"/>
           </a:p>
@@ -3772,7 +3772,7 @@
           <a:lstStyle/>
           <a:p>
             <a:r>
-              <a:rPr lang="en-US" smtClean="0"/>
+              <a:rPr lang="en-US"/>
               <a:t>Click to edit Master title style</a:t>
             </a:r>
             <a:endParaRPr lang="en-US" dirty="0"/>
@@ -3801,35 +3801,35 @@
           <a:p>
             <a:pPr lvl="0"/>
             <a:r>
-              <a:rPr lang="en-US" smtClean="0"/>
+              <a:rPr lang="en-US"/>
               <a:t>Edit Master text styles</a:t>
             </a:r>
           </a:p>
           <a:p>
             <a:pPr lvl="1"/>
             <a:r>
-              <a:rPr lang="en-US" smtClean="0"/>
+              <a:rPr lang="en-US"/>
               <a:t>Second level</a:t>
             </a:r>
           </a:p>
           <a:p>
             <a:pPr lvl="2"/>
             <a:r>
-              <a:rPr lang="en-US" smtClean="0"/>
+              <a:rPr lang="en-US"/>
               <a:t>Third level</a:t>
             </a:r>
           </a:p>
           <a:p>
             <a:pPr lvl="3"/>
             <a:r>
-              <a:rPr lang="en-US" smtClean="0"/>
+              <a:rPr lang="en-US"/>
               <a:t>Fourth level</a:t>
             </a:r>
           </a:p>
           <a:p>
             <a:pPr lvl="4"/>
             <a:r>
-              <a:rPr lang="en-US" smtClean="0"/>
+              <a:rPr lang="en-US"/>
               <a:t>Fifth level</a:t>
             </a:r>
             <a:endParaRPr lang="en-US" dirty="0"/>
@@ -3854,7 +3854,7 @@
             <a:fld id="{B61BEF0D-F0BB-DE4B-95CE-6DB70DBA9567}" type="datetimeFigureOut">
               <a:rPr lang="en-US" smtClean="0"/>
               <a:pPr/>
-              <a:t>4/25/2017</a:t>
+              <a:t>4/27/2017</a:t>
             </a:fld>
             <a:endParaRPr lang="en-US" dirty="0"/>
           </a:p>
@@ -3949,7 +3949,7 @@
           <a:lstStyle/>
           <a:p>
             <a:r>
-              <a:rPr lang="en-US" smtClean="0"/>
+              <a:rPr lang="en-US"/>
               <a:t>Click to edit Master title style</a:t>
             </a:r>
             <a:endParaRPr lang="en-US" dirty="0"/>
@@ -3973,35 +3973,35 @@
           <a:p>
             <a:pPr lvl="0"/>
             <a:r>
-              <a:rPr lang="en-US" smtClean="0"/>
+              <a:rPr lang="en-US"/>
               <a:t>Edit Master text styles</a:t>
             </a:r>
           </a:p>
           <a:p>
             <a:pPr lvl="1"/>
             <a:r>
-              <a:rPr lang="en-US" smtClean="0"/>
+              <a:rPr lang="en-US"/>
               <a:t>Second level</a:t>
             </a:r>
           </a:p>
           <a:p>
             <a:pPr lvl="2"/>
             <a:r>
-              <a:rPr lang="en-US" smtClean="0"/>
+              <a:rPr lang="en-US"/>
               <a:t>Third level</a:t>
             </a:r>
           </a:p>
           <a:p>
             <a:pPr lvl="3"/>
             <a:r>
-              <a:rPr lang="en-US" smtClean="0"/>
+              <a:rPr lang="en-US"/>
               <a:t>Fourth level</a:t>
             </a:r>
           </a:p>
           <a:p>
             <a:pPr lvl="4"/>
             <a:r>
-              <a:rPr lang="en-US" smtClean="0"/>
+              <a:rPr lang="en-US"/>
               <a:t>Fifth level</a:t>
             </a:r>
             <a:endParaRPr lang="en-US" dirty="0"/>
@@ -4026,7 +4026,7 @@
             <a:fld id="{B61BEF0D-F0BB-DE4B-95CE-6DB70DBA9567}" type="datetimeFigureOut">
               <a:rPr lang="en-US" smtClean="0"/>
               <a:pPr/>
-              <a:t>4/25/2017</a:t>
+              <a:t>4/27/2017</a:t>
             </a:fld>
             <a:endParaRPr lang="en-US" dirty="0"/>
           </a:p>
@@ -4130,7 +4130,7 @@
           </a:lstStyle>
           <a:p>
             <a:r>
-              <a:rPr lang="en-US" smtClean="0"/>
+              <a:rPr lang="en-US"/>
               <a:t>Click to edit Master title style</a:t>
             </a:r>
             <a:endParaRPr lang="en-US" dirty="0"/>
@@ -4251,7 +4251,7 @@
           <a:p>
             <a:pPr lvl="0"/>
             <a:r>
-              <a:rPr lang="en-US" smtClean="0"/>
+              <a:rPr lang="en-US"/>
               <a:t>Edit Master text styles</a:t>
             </a:r>
           </a:p>
@@ -4275,7 +4275,7 @@
             <a:fld id="{B61BEF0D-F0BB-DE4B-95CE-6DB70DBA9567}" type="datetimeFigureOut">
               <a:rPr lang="en-US" smtClean="0"/>
               <a:pPr/>
-              <a:t>4/25/2017</a:t>
+              <a:t>4/27/2017</a:t>
             </a:fld>
             <a:endParaRPr lang="en-US" dirty="0"/>
           </a:p>
@@ -4370,7 +4370,7 @@
           <a:lstStyle/>
           <a:p>
             <a:r>
-              <a:rPr lang="en-US" smtClean="0"/>
+              <a:rPr lang="en-US"/>
               <a:t>Click to edit Master title style</a:t>
             </a:r>
             <a:endParaRPr lang="en-US" dirty="0"/>
@@ -4399,35 +4399,35 @@
           <a:p>
             <a:pPr lvl="0"/>
             <a:r>
-              <a:rPr lang="en-US" smtClean="0"/>
+              <a:rPr lang="en-US"/>
               <a:t>Edit Master text styles</a:t>
             </a:r>
           </a:p>
           <a:p>
             <a:pPr lvl="1"/>
             <a:r>
-              <a:rPr lang="en-US" smtClean="0"/>
+              <a:rPr lang="en-US"/>
               <a:t>Second level</a:t>
             </a:r>
           </a:p>
           <a:p>
             <a:pPr lvl="2"/>
             <a:r>
-              <a:rPr lang="en-US" smtClean="0"/>
+              <a:rPr lang="en-US"/>
               <a:t>Third level</a:t>
             </a:r>
           </a:p>
           <a:p>
             <a:pPr lvl="3"/>
             <a:r>
-              <a:rPr lang="en-US" smtClean="0"/>
+              <a:rPr lang="en-US"/>
               <a:t>Fourth level</a:t>
             </a:r>
           </a:p>
           <a:p>
             <a:pPr lvl="4"/>
             <a:r>
-              <a:rPr lang="en-US" smtClean="0"/>
+              <a:rPr lang="en-US"/>
               <a:t>Fifth level</a:t>
             </a:r>
             <a:endParaRPr lang="en-US" dirty="0"/>
@@ -4456,35 +4456,35 @@
           <a:p>
             <a:pPr lvl="0"/>
             <a:r>
-              <a:rPr lang="en-US" smtClean="0"/>
+              <a:rPr lang="en-US"/>
               <a:t>Edit Master text styles</a:t>
             </a:r>
           </a:p>
           <a:p>
             <a:pPr lvl="1"/>
             <a:r>
-              <a:rPr lang="en-US" smtClean="0"/>
+              <a:rPr lang="en-US"/>
               <a:t>Second level</a:t>
             </a:r>
           </a:p>
           <a:p>
             <a:pPr lvl="2"/>
             <a:r>
-              <a:rPr lang="en-US" smtClean="0"/>
+              <a:rPr lang="en-US"/>
               <a:t>Third level</a:t>
             </a:r>
           </a:p>
           <a:p>
             <a:pPr lvl="3"/>
             <a:r>
-              <a:rPr lang="en-US" smtClean="0"/>
+              <a:rPr lang="en-US"/>
               <a:t>Fourth level</a:t>
             </a:r>
           </a:p>
           <a:p>
             <a:pPr lvl="4"/>
             <a:r>
-              <a:rPr lang="en-US" smtClean="0"/>
+              <a:rPr lang="en-US"/>
               <a:t>Fifth level</a:t>
             </a:r>
             <a:endParaRPr lang="en-US" dirty="0"/>
@@ -4509,7 +4509,7 @@
             <a:fld id="{B61BEF0D-F0BB-DE4B-95CE-6DB70DBA9567}" type="datetimeFigureOut">
               <a:rPr lang="en-US" smtClean="0"/>
               <a:pPr/>
-              <a:t>4/25/2017</a:t>
+              <a:t>4/27/2017</a:t>
             </a:fld>
             <a:endParaRPr lang="en-US" dirty="0"/>
           </a:p>
@@ -4608,7 +4608,7 @@
           </a:lstStyle>
           <a:p>
             <a:r>
-              <a:rPr lang="en-US" smtClean="0"/>
+              <a:rPr lang="en-US"/>
               <a:t>Click to edit Master title style</a:t>
             </a:r>
             <a:endParaRPr lang="en-US" dirty="0"/>
@@ -4676,7 +4676,7 @@
           <a:p>
             <a:pPr lvl="0"/>
             <a:r>
-              <a:rPr lang="en-US" smtClean="0"/>
+              <a:rPr lang="en-US"/>
               <a:t>Edit Master text styles</a:t>
             </a:r>
           </a:p>
@@ -4706,35 +4706,35 @@
           <a:p>
             <a:pPr lvl="0"/>
             <a:r>
-              <a:rPr lang="en-US" smtClean="0"/>
+              <a:rPr lang="en-US"/>
               <a:t>Edit Master text styles</a:t>
             </a:r>
           </a:p>
           <a:p>
             <a:pPr lvl="1"/>
             <a:r>
-              <a:rPr lang="en-US" smtClean="0"/>
+              <a:rPr lang="en-US"/>
               <a:t>Second level</a:t>
             </a:r>
           </a:p>
           <a:p>
             <a:pPr lvl="2"/>
             <a:r>
-              <a:rPr lang="en-US" smtClean="0"/>
+              <a:rPr lang="en-US"/>
               <a:t>Third level</a:t>
             </a:r>
           </a:p>
           <a:p>
             <a:pPr lvl="3"/>
             <a:r>
-              <a:rPr lang="en-US" smtClean="0"/>
+              <a:rPr lang="en-US"/>
               <a:t>Fourth level</a:t>
             </a:r>
           </a:p>
           <a:p>
             <a:pPr lvl="4"/>
             <a:r>
-              <a:rPr lang="en-US" smtClean="0"/>
+              <a:rPr lang="en-US"/>
               <a:t>Fifth level</a:t>
             </a:r>
             <a:endParaRPr lang="en-US" dirty="0"/>
@@ -4802,7 +4802,7 @@
           <a:p>
             <a:pPr lvl="0"/>
             <a:r>
-              <a:rPr lang="en-US" smtClean="0"/>
+              <a:rPr lang="en-US"/>
               <a:t>Edit Master text styles</a:t>
             </a:r>
           </a:p>
@@ -4832,35 +4832,35 @@
           <a:p>
             <a:pPr lvl="0"/>
             <a:r>
-              <a:rPr lang="en-US" smtClean="0"/>
+              <a:rPr lang="en-US"/>
               <a:t>Edit Master text styles</a:t>
             </a:r>
           </a:p>
           <a:p>
             <a:pPr lvl="1"/>
             <a:r>
-              <a:rPr lang="en-US" smtClean="0"/>
+              <a:rPr lang="en-US"/>
               <a:t>Second level</a:t>
             </a:r>
           </a:p>
           <a:p>
             <a:pPr lvl="2"/>
             <a:r>
-              <a:rPr lang="en-US" smtClean="0"/>
+              <a:rPr lang="en-US"/>
               <a:t>Third level</a:t>
             </a:r>
           </a:p>
           <a:p>
             <a:pPr lvl="3"/>
             <a:r>
-              <a:rPr lang="en-US" smtClean="0"/>
+              <a:rPr lang="en-US"/>
               <a:t>Fourth level</a:t>
             </a:r>
           </a:p>
           <a:p>
             <a:pPr lvl="4"/>
             <a:r>
-              <a:rPr lang="en-US" smtClean="0"/>
+              <a:rPr lang="en-US"/>
               <a:t>Fifth level</a:t>
             </a:r>
             <a:endParaRPr lang="en-US" dirty="0"/>
@@ -4885,7 +4885,7 @@
             <a:fld id="{B61BEF0D-F0BB-DE4B-95CE-6DB70DBA9567}" type="datetimeFigureOut">
               <a:rPr lang="en-US" smtClean="0"/>
               <a:pPr/>
-              <a:t>4/25/2017</a:t>
+              <a:t>4/27/2017</a:t>
             </a:fld>
             <a:endParaRPr lang="en-US" dirty="0"/>
           </a:p>
@@ -4985,7 +4985,7 @@
           <a:lstStyle/>
           <a:p>
             <a:r>
-              <a:rPr lang="en-US" smtClean="0"/>
+              <a:rPr lang="en-US"/>
               <a:t>Click to edit Master title style</a:t>
             </a:r>
             <a:endParaRPr lang="en-US" dirty="0"/>
@@ -5010,7 +5010,7 @@
             <a:fld id="{B61BEF0D-F0BB-DE4B-95CE-6DB70DBA9567}" type="datetimeFigureOut">
               <a:rPr lang="en-US" smtClean="0"/>
               <a:pPr/>
-              <a:t>4/25/2017</a:t>
+              <a:t>4/27/2017</a:t>
             </a:fld>
             <a:endParaRPr lang="en-US" dirty="0"/>
           </a:p>
@@ -5107,7 +5107,7 @@
             <a:fld id="{B61BEF0D-F0BB-DE4B-95CE-6DB70DBA9567}" type="datetimeFigureOut">
               <a:rPr lang="en-US" smtClean="0"/>
               <a:pPr/>
-              <a:t>4/25/2017</a:t>
+              <a:t>4/27/2017</a:t>
             </a:fld>
             <a:endParaRPr lang="en-US" dirty="0"/>
           </a:p>
@@ -5213,7 +5213,7 @@
           </a:lstStyle>
           <a:p>
             <a:r>
-              <a:rPr lang="en-US" smtClean="0"/>
+              <a:rPr lang="en-US"/>
               <a:t>Click to edit Master title style</a:t>
             </a:r>
             <a:endParaRPr lang="en-US" dirty="0"/>
@@ -5244,35 +5244,35 @@
           <a:p>
             <a:pPr lvl="0"/>
             <a:r>
-              <a:rPr lang="en-US" smtClean="0"/>
+              <a:rPr lang="en-US"/>
               <a:t>Edit Master text styles</a:t>
             </a:r>
           </a:p>
           <a:p>
             <a:pPr lvl="1"/>
             <a:r>
-              <a:rPr lang="en-US" smtClean="0"/>
+              <a:rPr lang="en-US"/>
               <a:t>Second level</a:t>
             </a:r>
           </a:p>
           <a:p>
             <a:pPr lvl="2"/>
             <a:r>
-              <a:rPr lang="en-US" smtClean="0"/>
+              <a:rPr lang="en-US"/>
               <a:t>Third level</a:t>
             </a:r>
           </a:p>
           <a:p>
             <a:pPr lvl="3"/>
             <a:r>
-              <a:rPr lang="en-US" smtClean="0"/>
+              <a:rPr lang="en-US"/>
               <a:t>Fourth level</a:t>
             </a:r>
           </a:p>
           <a:p>
             <a:pPr lvl="4"/>
             <a:r>
-              <a:rPr lang="en-US" smtClean="0"/>
+              <a:rPr lang="en-US"/>
               <a:t>Fifth level</a:t>
             </a:r>
             <a:endParaRPr lang="en-US" dirty="0"/>
@@ -5340,7 +5340,7 @@
           <a:p>
             <a:pPr lvl="0"/>
             <a:r>
-              <a:rPr lang="en-US" smtClean="0"/>
+              <a:rPr lang="en-US"/>
               <a:t>Edit Master text styles</a:t>
             </a:r>
           </a:p>
@@ -5364,7 +5364,7 @@
             <a:fld id="{B61BEF0D-F0BB-DE4B-95CE-6DB70DBA9567}" type="datetimeFigureOut">
               <a:rPr lang="en-US" smtClean="0"/>
               <a:pPr/>
-              <a:t>4/25/2017</a:t>
+              <a:t>4/27/2017</a:t>
             </a:fld>
             <a:endParaRPr lang="en-US" dirty="0"/>
           </a:p>
@@ -5470,7 +5470,7 @@
           </a:lstStyle>
           <a:p>
             <a:r>
-              <a:rPr lang="en-US" smtClean="0"/>
+              <a:rPr lang="en-US"/>
               <a:t>Click to edit Master title style</a:t>
             </a:r>
             <a:endParaRPr lang="en-US" dirty="0"/>
@@ -5537,7 +5537,7 @@
           </a:lstStyle>
           <a:p>
             <a:r>
-              <a:rPr lang="en-US" smtClean="0"/>
+              <a:rPr lang="en-US"/>
               <a:t>Click icon to add picture</a:t>
             </a:r>
             <a:endParaRPr lang="en-US" dirty="0"/>
@@ -5605,7 +5605,7 @@
           <a:p>
             <a:pPr lvl="0"/>
             <a:r>
-              <a:rPr lang="en-US" smtClean="0"/>
+              <a:rPr lang="en-US"/>
               <a:t>Edit Master text styles</a:t>
             </a:r>
           </a:p>
@@ -5629,7 +5629,7 @@
             <a:fld id="{B61BEF0D-F0BB-DE4B-95CE-6DB70DBA9567}" type="datetimeFigureOut">
               <a:rPr lang="en-US" smtClean="0"/>
               <a:pPr/>
-              <a:t>4/25/2017</a:t>
+              <a:t>4/27/2017</a:t>
             </a:fld>
             <a:endParaRPr lang="en-US" dirty="0"/>
           </a:p>
@@ -6271,7 +6271,7 @@
           <a:lstStyle/>
           <a:p>
             <a:r>
-              <a:rPr lang="en-US" smtClean="0"/>
+              <a:rPr lang="en-US"/>
               <a:t>Click to edit Master title style</a:t>
             </a:r>
             <a:endParaRPr lang="en-US" dirty="0"/>
@@ -6305,35 +6305,35 @@
           <a:p>
             <a:pPr lvl="0"/>
             <a:r>
-              <a:rPr lang="en-US" smtClean="0"/>
+              <a:rPr lang="en-US"/>
               <a:t>Edit Master text styles</a:t>
             </a:r>
           </a:p>
           <a:p>
             <a:pPr lvl="1"/>
             <a:r>
-              <a:rPr lang="en-US" smtClean="0"/>
+              <a:rPr lang="en-US"/>
               <a:t>Second level</a:t>
             </a:r>
           </a:p>
           <a:p>
             <a:pPr lvl="2"/>
             <a:r>
-              <a:rPr lang="en-US" smtClean="0"/>
+              <a:rPr lang="en-US"/>
               <a:t>Third level</a:t>
             </a:r>
           </a:p>
           <a:p>
             <a:pPr lvl="3"/>
             <a:r>
-              <a:rPr lang="en-US" smtClean="0"/>
+              <a:rPr lang="en-US"/>
               <a:t>Fourth level</a:t>
             </a:r>
           </a:p>
           <a:p>
             <a:pPr lvl="4"/>
             <a:r>
-              <a:rPr lang="en-US" smtClean="0"/>
+              <a:rPr lang="en-US"/>
               <a:t>Fifth level</a:t>
             </a:r>
             <a:endParaRPr lang="en-US" dirty="0"/>
@@ -6376,7 +6376,7 @@
             <a:fld id="{B61BEF0D-F0BB-DE4B-95CE-6DB70DBA9567}" type="datetimeFigureOut">
               <a:rPr lang="en-US" smtClean="0"/>
               <a:pPr/>
-              <a:t>4/25/2017</a:t>
+              <a:t>4/27/2017</a:t>
             </a:fld>
             <a:endParaRPr lang="en-US" dirty="0"/>
           </a:p>
@@ -7418,10 +7418,9 @@
           <a:lstStyle/>
           <a:p>
             <a:r>
-              <a:rPr lang="en-US" dirty="0" smtClean="0"/>
+              <a:rPr lang="en-US" dirty="0"/>
               <a:t>Row-Level Security</a:t>
             </a:r>
-            <a:endParaRPr lang="en-US" dirty="0"/>
           </a:p>
         </p:txBody>
       </p:sp>
@@ -7545,10 +7544,9 @@
           <a:lstStyle/>
           <a:p>
             <a:r>
-              <a:rPr lang="en-US" sz="7200" dirty="0" smtClean="0"/>
+              <a:rPr lang="en-US" sz="7200" dirty="0"/>
               <a:t>DEMO</a:t>
             </a:r>
-            <a:endParaRPr lang="en-US" sz="7200" dirty="0"/>
           </a:p>
         </p:txBody>
       </p:sp>
@@ -7599,15 +7597,7 @@
           <a:p>
             <a:r>
               <a:rPr lang="en-US" dirty="0"/>
-              <a:t>SQL Server </a:t>
-            </a:r>
-            <a:r>
-              <a:rPr lang="en-US" dirty="0" smtClean="0"/>
-              <a:t>Features (Speed </a:t>
-            </a:r>
-            <a:r>
-              <a:rPr lang="en-US" dirty="0"/>
-              <a:t>Dating)</a:t>
+              <a:t>SQL Server Features (Speed Dating)</a:t>
             </a:r>
           </a:p>
         </p:txBody>
@@ -7780,10 +7770,9 @@
           <a:lstStyle/>
           <a:p>
             <a:r>
-              <a:rPr lang="en-US" dirty="0" smtClean="0"/>
+              <a:rPr lang="en-US" dirty="0"/>
               <a:t>Always Encrypted</a:t>
             </a:r>
-            <a:endParaRPr lang="en-US" dirty="0"/>
           </a:p>
         </p:txBody>
       </p:sp>
@@ -7810,41 +7799,36 @@
           <a:lstStyle/>
           <a:p>
             <a:r>
-              <a:rPr lang="en-US" sz="2800" dirty="0" smtClean="0"/>
+              <a:rPr lang="en-US" sz="2800" dirty="0"/>
               <a:t>Applies at the column level</a:t>
             </a:r>
           </a:p>
           <a:p>
             <a:r>
-              <a:rPr lang="en-US" sz="2800" dirty="0" smtClean="0"/>
+              <a:rPr lang="en-US" sz="2800" dirty="0"/>
               <a:t>SQL Server box never sees data in unencrypted form (both at-rest and in-transit)</a:t>
             </a:r>
           </a:p>
           <a:p>
             <a:pPr lvl="1"/>
             <a:r>
-              <a:rPr lang="en-US" sz="2400" dirty="0" smtClean="0"/>
+              <a:rPr lang="en-US" sz="2400" dirty="0"/>
               <a:t>Encrypted columns are stored (and transmitted) as </a:t>
             </a:r>
             <a:r>
-              <a:rPr lang="en-US" sz="2400" dirty="0" err="1" smtClean="0"/>
+              <a:rPr lang="en-US" sz="2400" dirty="0" err="1"/>
               <a:t>varbinary</a:t>
             </a:r>
             <a:r>
-              <a:rPr lang="en-US" sz="2400" dirty="0" smtClean="0"/>
+              <a:rPr lang="en-US" sz="2400" dirty="0"/>
               <a:t> behind the scenes</a:t>
             </a:r>
           </a:p>
           <a:p>
             <a:r>
-              <a:rPr lang="en-US" sz="2800" dirty="0" smtClean="0"/>
-              <a:t>Certificate is generated on client machine and shared with other </a:t>
-            </a:r>
-            <a:r>
-              <a:rPr lang="en-US" sz="2800" dirty="0" smtClean="0"/>
-              <a:t>clients</a:t>
-            </a:r>
-            <a:endParaRPr lang="en-US" sz="2800" dirty="0" smtClean="0"/>
+              <a:rPr lang="en-US" sz="2800" dirty="0"/>
+              <a:t>Certificate is generated on client machine and shared with other clients</a:t>
+            </a:r>
           </a:p>
         </p:txBody>
       </p:sp>
@@ -7894,10 +7878,9 @@
           <a:lstStyle/>
           <a:p>
             <a:r>
-              <a:rPr lang="en-US" dirty="0" smtClean="0"/>
+              <a:rPr lang="en-US" dirty="0"/>
               <a:t>Always Encrypted</a:t>
             </a:r>
-            <a:endParaRPr lang="en-US" dirty="0"/>
           </a:p>
         </p:txBody>
       </p:sp>
@@ -7924,58 +7907,32 @@
           <a:lstStyle/>
           <a:p>
             <a:r>
-              <a:rPr lang="en-US" sz="2800" dirty="0" smtClean="0"/>
-              <a:t>Encryption </a:t>
-            </a:r>
-            <a:r>
-              <a:rPr lang="en-US" sz="2800" dirty="0" smtClean="0"/>
-              <a:t>can be random or deterministic (required if column is indexed or used in a join)</a:t>
-            </a:r>
-          </a:p>
-          <a:p>
-            <a:r>
-              <a:rPr lang="en-US" sz="2800" dirty="0" smtClean="0"/>
-              <a:t>Requires a change to the connection string in </a:t>
-            </a:r>
-            <a:r>
               <a:rPr lang="en-US" sz="2800" dirty="0"/>
-              <a:t>the </a:t>
-            </a:r>
-            <a:r>
-              <a:rPr lang="en-US" sz="2800" dirty="0" smtClean="0"/>
-              <a:t>application</a:t>
+              <a:t>Encryption can be random or deterministic (required if column is indexed or used in a join)</a:t>
+            </a:r>
+          </a:p>
+          <a:p>
+            <a:r>
+              <a:rPr lang="en-US" sz="2800" dirty="0"/>
+              <a:t>Requires a change to the connection string in the application</a:t>
             </a:r>
           </a:p>
           <a:p>
             <a:pPr lvl="1"/>
-            <a:r>
-              <a:rPr lang="en-US" sz="2400" b="1" dirty="0" smtClean="0">
-                <a:latin typeface="Courier New" panose="02070309020205020404" pitchFamily="49" charset="0"/>
-                <a:cs typeface="Courier New" panose="02070309020205020404" pitchFamily="49" charset="0"/>
-              </a:rPr>
-              <a:t>Column </a:t>
-            </a:r>
             <a:r>
               <a:rPr lang="en-US" sz="2400" b="1" dirty="0">
                 <a:latin typeface="Courier New" panose="02070309020205020404" pitchFamily="49" charset="0"/>
                 <a:cs typeface="Courier New" panose="02070309020205020404" pitchFamily="49" charset="0"/>
               </a:rPr>
-              <a:t>Encryption </a:t>
-            </a:r>
-            <a:r>
-              <a:rPr lang="en-US" sz="2400" b="1" dirty="0" smtClean="0">
-                <a:latin typeface="Courier New" panose="02070309020205020404" pitchFamily="49" charset="0"/>
-                <a:cs typeface="Courier New" panose="02070309020205020404" pitchFamily="49" charset="0"/>
-              </a:rPr>
-              <a:t>Setting=enabled</a:t>
-            </a:r>
-          </a:p>
-          <a:p>
-            <a:r>
-              <a:rPr lang="en-US" sz="2800" dirty="0" smtClean="0"/>
+              <a:t>Column Encryption Setting=enabled</a:t>
+            </a:r>
+          </a:p>
+          <a:p>
+            <a:r>
+              <a:rPr lang="en-US" sz="2800" dirty="0"/>
               <a:t>Queries must be parameterized</a:t>
             </a:r>
-            <a:endParaRPr lang="en-US" sz="2800" b="1" dirty="0" smtClean="0">
+            <a:endParaRPr lang="en-US" sz="2800" b="1" dirty="0">
               <a:latin typeface="Courier New" panose="02070309020205020404" pitchFamily="49" charset="0"/>
               <a:cs typeface="Courier New" panose="02070309020205020404" pitchFamily="49" charset="0"/>
             </a:endParaRPr>
@@ -8028,16 +7985,15 @@
           <a:lstStyle/>
           <a:p>
             <a:r>
-              <a:rPr lang="en-US" dirty="0" smtClean="0"/>
+              <a:rPr lang="en-US" dirty="0"/>
               <a:t>Always Encrypted in Action</a:t>
             </a:r>
-            <a:endParaRPr lang="en-US" dirty="0"/>
           </a:p>
         </p:txBody>
       </p:sp>
       <p:pic>
         <p:nvPicPr>
-          <p:cNvPr id="5" name="Picture 4"/>
+          <p:cNvPr id="3" name="Picture 2"/>
           <p:cNvPicPr>
             <a:picLocks noChangeAspect="1"/>
           </p:cNvPicPr>
@@ -8051,8 +8007,8 @@
         </p:blipFill>
         <p:spPr>
           <a:xfrm>
-            <a:off x="463464" y="1744337"/>
-            <a:ext cx="9760846" cy="4383331"/>
+            <a:off x="466344" y="1746504"/>
+            <a:ext cx="9782421" cy="4379976"/>
           </a:xfrm>
           <a:prstGeom prst="rect">
             <a:avLst/>
@@ -8105,10 +8061,9 @@
           <a:lstStyle/>
           <a:p>
             <a:r>
-              <a:rPr lang="en-US" dirty="0" smtClean="0"/>
+              <a:rPr lang="en-US" dirty="0"/>
               <a:t>Always Encrypted - Cons</a:t>
             </a:r>
-            <a:endParaRPr lang="en-US" dirty="0"/>
           </a:p>
         </p:txBody>
       </p:sp>
@@ -8135,28 +8090,27 @@
           <a:lstStyle/>
           <a:p>
             <a:r>
-              <a:rPr lang="en-US" sz="2800" dirty="0" smtClean="0"/>
+              <a:rPr lang="en-US" sz="2800" dirty="0"/>
               <a:t>Data size bloat, especially for smaller data types</a:t>
             </a:r>
           </a:p>
           <a:p>
             <a:r>
-              <a:rPr lang="en-US" sz="2800" dirty="0" smtClean="0"/>
+              <a:rPr lang="en-US" sz="2800" dirty="0"/>
               <a:t>Adds considerable difficulty troubleshooting in tools like SSMS</a:t>
             </a:r>
           </a:p>
           <a:p>
             <a:r>
-              <a:rPr lang="en-US" sz="2800" dirty="0" smtClean="0"/>
+              <a:rPr lang="en-US" sz="2800" dirty="0"/>
               <a:t>String columns must have a BIN collation – they won’t sort by traditional SQL rules</a:t>
             </a:r>
           </a:p>
           <a:p>
             <a:r>
-              <a:rPr lang="en-US" sz="2800" dirty="0" smtClean="0"/>
+              <a:rPr lang="en-US" sz="2800" dirty="0"/>
               <a:t>Extra round trips to determine metadata, retrieve keys</a:t>
             </a:r>
-            <a:endParaRPr lang="en-US" sz="2800" dirty="0"/>
           </a:p>
         </p:txBody>
       </p:sp>
@@ -8207,15 +8161,7 @@
           <a:p>
             <a:r>
               <a:rPr lang="en-US" dirty="0"/>
-              <a:t>SQL Server </a:t>
-            </a:r>
-            <a:r>
-              <a:rPr lang="en-US" dirty="0" smtClean="0"/>
-              <a:t>Features (Speed </a:t>
-            </a:r>
-            <a:r>
-              <a:rPr lang="en-US" dirty="0"/>
-              <a:t>Dating)</a:t>
+              <a:t>SQL Server Features (Speed Dating)</a:t>
             </a:r>
           </a:p>
         </p:txBody>
@@ -8388,10 +8334,9 @@
           <a:lstStyle/>
           <a:p>
             <a:r>
-              <a:rPr lang="en-US" dirty="0" smtClean="0"/>
+              <a:rPr lang="en-US" dirty="0"/>
               <a:t>Snapshots</a:t>
             </a:r>
-            <a:endParaRPr lang="en-US" dirty="0"/>
           </a:p>
         </p:txBody>
       </p:sp>
@@ -8418,62 +8363,61 @@
           <a:lstStyle/>
           <a:p>
             <a:r>
-              <a:rPr lang="en-US" sz="2400" dirty="0" smtClean="0"/>
+              <a:rPr lang="en-US" sz="2400" dirty="0"/>
               <a:t>Provides a </a:t>
             </a:r>
             <a:r>
-              <a:rPr lang="en-US" sz="2400" dirty="0" err="1" smtClean="0"/>
+              <a:rPr lang="en-US" sz="2400" dirty="0" err="1"/>
               <a:t>transactionally</a:t>
             </a:r>
             <a:r>
-              <a:rPr lang="en-US" sz="2400" dirty="0" smtClean="0"/>
+              <a:rPr lang="en-US" sz="2400" dirty="0"/>
               <a:t> consistent, read-only point-in-time view of a database</a:t>
             </a:r>
           </a:p>
           <a:p>
             <a:r>
-              <a:rPr lang="en-US" sz="2400" dirty="0" smtClean="0"/>
+              <a:rPr lang="en-US" sz="2400" dirty="0"/>
               <a:t>Can take multiple snapshots at different points on the same database</a:t>
             </a:r>
           </a:p>
           <a:p>
             <a:r>
-              <a:rPr lang="en-US" sz="2400" dirty="0" smtClean="0"/>
+              <a:rPr lang="en-US" sz="2400" dirty="0"/>
               <a:t>Useful for stable reporting against a transactional system</a:t>
             </a:r>
           </a:p>
           <a:p>
             <a:r>
-              <a:rPr lang="en-US" sz="2400" dirty="0" smtClean="0"/>
+              <a:rPr lang="en-US" sz="2400" dirty="0"/>
               <a:t>Can be used to revert to a previous database state</a:t>
             </a:r>
           </a:p>
           <a:p>
             <a:pPr lvl="1"/>
             <a:r>
-              <a:rPr lang="en-US" sz="2000" dirty="0" smtClean="0"/>
+              <a:rPr lang="en-US" sz="2000" dirty="0"/>
               <a:t>Failed upgrade / administrative tasks</a:t>
             </a:r>
           </a:p>
           <a:p>
             <a:pPr lvl="1"/>
             <a:r>
-              <a:rPr lang="en-US" sz="2000" dirty="0" smtClean="0"/>
+              <a:rPr lang="en-US" sz="2000" dirty="0"/>
               <a:t>QA cycles</a:t>
             </a:r>
           </a:p>
           <a:p>
             <a:r>
-              <a:rPr lang="en-US" sz="2400" dirty="0" smtClean="0"/>
+              <a:rPr lang="en-US" sz="2400" dirty="0"/>
               <a:t>Resources required dependent mostly on how much underlying database is changed</a:t>
             </a:r>
           </a:p>
           <a:p>
             <a:r>
-              <a:rPr lang="en-US" sz="2400" dirty="0" smtClean="0"/>
+              <a:rPr lang="en-US" sz="2400" dirty="0"/>
               <a:t>Absolutely, positively not a substitute for proper backups!</a:t>
             </a:r>
-            <a:endParaRPr lang="en-US" sz="2400" dirty="0"/>
           </a:p>
         </p:txBody>
       </p:sp>
@@ -8523,10 +8467,9 @@
           <a:lstStyle/>
           <a:p>
             <a:r>
-              <a:rPr lang="en-US" dirty="0" smtClean="0"/>
+              <a:rPr lang="en-US" dirty="0"/>
               <a:t>Snapshots</a:t>
             </a:r>
-            <a:endParaRPr lang="en-US" dirty="0"/>
           </a:p>
         </p:txBody>
       </p:sp>
@@ -8650,10 +8593,9 @@
           <a:lstStyle/>
           <a:p>
             <a:r>
-              <a:rPr lang="en-US" sz="7200" dirty="0" smtClean="0"/>
+              <a:rPr lang="en-US" sz="7200" dirty="0"/>
               <a:t>DEMO</a:t>
             </a:r>
-            <a:endParaRPr lang="en-US" sz="7200" dirty="0"/>
           </a:p>
         </p:txBody>
       </p:sp>
@@ -8972,7 +8914,7 @@
                         <a:defRPr/>
                       </a:pPr>
                       <a:r>
-                        <a:rPr kumimoji="0" lang="en-US" sz="2400" b="0" i="0" u="none" strike="noStrike" kern="1200" cap="none" spc="0" normalizeH="0" baseline="0" noProof="0" dirty="0" smtClean="0">
+                        <a:rPr kumimoji="0" lang="en-US" sz="2400" b="0" i="0" u="none" strike="noStrike" kern="1200" cap="none" spc="0" normalizeH="0" baseline="0" noProof="0" dirty="0">
                           <a:ln>
                             <a:noFill/>
                           </a:ln>
@@ -8988,20 +8930,6 @@
                         </a:rPr>
                         <a:t>Developer *</a:t>
                       </a:r>
-                      <a:endParaRPr kumimoji="0" lang="en-US" sz="2400" b="0" i="0" u="none" strike="noStrike" kern="1200" cap="none" spc="0" normalizeH="0" baseline="0" noProof="0" dirty="0">
-                        <a:ln>
-                          <a:noFill/>
-                        </a:ln>
-                        <a:solidFill>
-                          <a:schemeClr val="bg1"/>
-                        </a:solidFill>
-                        <a:effectLst/>
-                        <a:uLnTx/>
-                        <a:uFillTx/>
-                        <a:latin typeface="Gill Sans MT" panose="020B0502020104020203"/>
-                        <a:ea typeface="+mn-ea"/>
-                        <a:cs typeface="+mn-cs"/>
-                      </a:endParaRPr>
                     </a:p>
                   </a:txBody>
                   <a:tcPr>
@@ -10049,15 +9977,7 @@
           <a:p>
             <a:r>
               <a:rPr lang="en-US" dirty="0"/>
-              <a:t>SQL Server </a:t>
-            </a:r>
-            <a:r>
-              <a:rPr lang="en-US" dirty="0" smtClean="0"/>
-              <a:t>Features (Speed </a:t>
-            </a:r>
-            <a:r>
-              <a:rPr lang="en-US" dirty="0"/>
-              <a:t>Dating)</a:t>
+              <a:t>SQL Server Features (Speed Dating)</a:t>
             </a:r>
           </a:p>
         </p:txBody>
@@ -10230,10 +10150,9 @@
           <a:lstStyle/>
           <a:p>
             <a:r>
-              <a:rPr lang="en-US" dirty="0" smtClean="0"/>
+              <a:rPr lang="en-US" dirty="0"/>
               <a:t>Temporal Tables</a:t>
             </a:r>
-            <a:endParaRPr lang="en-US" dirty="0"/>
           </a:p>
         </p:txBody>
       </p:sp>
@@ -10260,40 +10179,39 @@
           <a:lstStyle/>
           <a:p>
             <a:r>
-              <a:rPr lang="en-US" sz="2800" dirty="0" smtClean="0"/>
+              <a:rPr lang="en-US" sz="2800" dirty="0"/>
               <a:t>Most applications / databases inherently contain a temporal element</a:t>
             </a:r>
           </a:p>
           <a:p>
             <a:r>
-              <a:rPr lang="en-US" sz="2800" dirty="0" smtClean="0"/>
+              <a:rPr lang="en-US" sz="2800" dirty="0"/>
               <a:t>If temporal components are tracked, traditionally done with triggers or change detection</a:t>
             </a:r>
           </a:p>
           <a:p>
             <a:r>
-              <a:rPr lang="en-US" sz="2800" dirty="0" smtClean="0"/>
+              <a:rPr lang="en-US" sz="2800" dirty="0"/>
               <a:t>Temporal tables handle tracking automatically</a:t>
             </a:r>
           </a:p>
           <a:p>
             <a:r>
-              <a:rPr lang="en-US" sz="2800" dirty="0" smtClean="0"/>
+              <a:rPr lang="en-US" sz="2800" dirty="0"/>
               <a:t>Allows greatly simplified point-in-time querying</a:t>
             </a:r>
           </a:p>
           <a:p>
             <a:r>
-              <a:rPr lang="en-US" sz="2800" dirty="0" smtClean="0"/>
+              <a:rPr lang="en-US" sz="2800" dirty="0"/>
               <a:t>Requires additional columns on source table and requires history table</a:t>
             </a:r>
           </a:p>
           <a:p>
             <a:r>
-              <a:rPr lang="en-US" sz="2800" dirty="0" smtClean="0"/>
+              <a:rPr lang="en-US" sz="2800" dirty="0"/>
               <a:t>Schema changes in source table are reflected in the history table</a:t>
             </a:r>
-            <a:endParaRPr lang="en-US" sz="2800" dirty="0"/>
           </a:p>
         </p:txBody>
       </p:sp>
@@ -10343,10 +10261,9 @@
           <a:lstStyle/>
           <a:p>
             <a:r>
-              <a:rPr lang="en-US" dirty="0" smtClean="0"/>
+              <a:rPr lang="en-US" dirty="0"/>
               <a:t>Temporal Tables</a:t>
             </a:r>
-            <a:endParaRPr lang="en-US" dirty="0"/>
           </a:p>
         </p:txBody>
       </p:sp>
@@ -10470,10 +10387,9 @@
           <a:lstStyle/>
           <a:p>
             <a:r>
-              <a:rPr lang="en-US" sz="7200" dirty="0" smtClean="0"/>
+              <a:rPr lang="en-US" sz="7200" dirty="0"/>
               <a:t>DEMO</a:t>
             </a:r>
-            <a:endParaRPr lang="en-US" sz="7200" dirty="0"/>
           </a:p>
         </p:txBody>
       </p:sp>
@@ -10523,10 +10439,9 @@
           <a:lstStyle/>
           <a:p>
             <a:r>
-              <a:rPr lang="en-US" dirty="0" smtClean="0"/>
+              <a:rPr lang="en-US" dirty="0"/>
               <a:t>Temporal Tables</a:t>
             </a:r>
-            <a:endParaRPr lang="en-US" dirty="0"/>
           </a:p>
         </p:txBody>
       </p:sp>
@@ -10594,15 +10509,11 @@
                         <a:defRPr/>
                       </a:pPr>
                       <a:r>
-                        <a:rPr lang="en-US" sz="2400" dirty="0" smtClean="0"/>
-                        <a:t>Temporal </a:t>
+                        <a:rPr lang="en-US" sz="2400" dirty="0"/>
+                        <a:t>Temporal querying:   </a:t>
                       </a:r>
                       <a:r>
-                        <a:rPr lang="en-US" sz="2400" dirty="0" smtClean="0"/>
-                        <a:t>querying:   </a:t>
-                      </a:r>
-                      <a:r>
-                        <a:rPr lang="en-US" sz="2400" dirty="0" smtClean="0">
+                        <a:rPr lang="en-US" sz="2400" dirty="0">
                           <a:solidFill>
                             <a:srgbClr val="0000FF"/>
                           </a:solidFill>
@@ -10614,7 +10525,7 @@
                         <a:t>FROM</a:t>
                       </a:r>
                       <a:r>
-                        <a:rPr lang="en-US" sz="2400" dirty="0" smtClean="0">
+                        <a:rPr lang="en-US" sz="2400" dirty="0">
                           <a:solidFill>
                             <a:srgbClr val="000000"/>
                           </a:solidFill>
@@ -10626,7 +10537,7 @@
                         <a:t> </a:t>
                       </a:r>
                       <a:r>
-                        <a:rPr lang="en-US" sz="2400" dirty="0" err="1" smtClean="0">
+                        <a:rPr lang="en-US" sz="2400" dirty="0" err="1">
                           <a:solidFill>
                             <a:srgbClr val="000000"/>
                           </a:solidFill>
@@ -10638,7 +10549,7 @@
                         <a:t>TableName</a:t>
                       </a:r>
                       <a:r>
-                        <a:rPr lang="en-US" sz="2400" dirty="0" smtClean="0">
+                        <a:rPr lang="en-US" sz="2400" dirty="0">
                           <a:solidFill>
                             <a:srgbClr val="000000"/>
                           </a:solidFill>
@@ -10650,7 +10561,7 @@
                         <a:t> </a:t>
                       </a:r>
                       <a:r>
-                        <a:rPr lang="en-US" sz="2400" dirty="0" smtClean="0">
+                        <a:rPr lang="en-US" sz="2400" dirty="0">
                           <a:solidFill>
                             <a:srgbClr val="0000FF"/>
                           </a:solidFill>
@@ -10662,7 +10573,7 @@
                         <a:t>FOR</a:t>
                       </a:r>
                       <a:r>
-                        <a:rPr lang="en-US" sz="2400" dirty="0" smtClean="0">
+                        <a:rPr lang="en-US" sz="2400" dirty="0">
                           <a:solidFill>
                             <a:srgbClr val="000000"/>
                           </a:solidFill>
@@ -10674,7 +10585,7 @@
                         <a:t> </a:t>
                       </a:r>
                       <a:r>
-                        <a:rPr lang="en-US" sz="2400" dirty="0" smtClean="0">
+                        <a:rPr lang="en-US" sz="2400" dirty="0">
                           <a:solidFill>
                             <a:srgbClr val="0000FF"/>
                           </a:solidFill>
@@ -10686,7 +10597,7 @@
                         <a:t>SYSTEM</a:t>
                       </a:r>
                       <a:r>
-                        <a:rPr lang="en-US" sz="2400" dirty="0" smtClean="0">
+                        <a:rPr lang="en-US" sz="2400" dirty="0">
                           <a:solidFill>
                             <a:srgbClr val="000000"/>
                           </a:solidFill>
@@ -10698,7 +10609,7 @@
                         <a:t>_</a:t>
                       </a:r>
                       <a:r>
-                        <a:rPr lang="en-US" sz="2400" dirty="0" smtClean="0">
+                        <a:rPr lang="en-US" sz="2400" dirty="0">
                           <a:solidFill>
                             <a:srgbClr val="0000FF"/>
                           </a:solidFill>
@@ -10710,7 +10621,7 @@
                         <a:t>TIME</a:t>
                       </a:r>
                       <a:r>
-                        <a:rPr lang="en-US" sz="2400" dirty="0" smtClean="0">
+                        <a:rPr lang="en-US" sz="2400" dirty="0">
                           <a:solidFill>
                             <a:srgbClr val="000000"/>
                           </a:solidFill>
@@ -10748,10 +10659,9 @@
                     <a:lstStyle/>
                     <a:p>
                       <a:r>
-                        <a:rPr lang="en-US" sz="2400" dirty="0" smtClean="0"/>
+                        <a:rPr lang="en-US" sz="2400" dirty="0"/>
                         <a:t>Point in time</a:t>
                       </a:r>
-                      <a:endParaRPr lang="en-US" sz="2400" dirty="0"/>
                     </a:p>
                   </a:txBody>
                   <a:tcPr anchor="ctr"/>
@@ -10762,7 +10672,7 @@
                     <a:lstStyle/>
                     <a:p>
                       <a:r>
-                        <a:rPr lang="en-US" sz="2400" dirty="0" smtClean="0">
+                        <a:rPr lang="en-US" sz="2400" dirty="0">
                           <a:solidFill>
                             <a:srgbClr val="0000FF"/>
                           </a:solidFill>
@@ -10774,7 +10684,7 @@
                         <a:t>AS</a:t>
                       </a:r>
                       <a:r>
-                        <a:rPr lang="en-US" sz="2400" dirty="0" smtClean="0">
+                        <a:rPr lang="en-US" sz="2400" dirty="0">
                           <a:solidFill>
                             <a:srgbClr val="000000"/>
                           </a:solidFill>
@@ -10786,7 +10696,7 @@
                         <a:t> </a:t>
                       </a:r>
                       <a:r>
-                        <a:rPr lang="en-US" sz="2400" dirty="0" smtClean="0">
+                        <a:rPr lang="en-US" sz="2400" dirty="0">
                           <a:solidFill>
                             <a:srgbClr val="0000FF"/>
                           </a:solidFill>
@@ -10798,7 +10708,7 @@
                         <a:t>OF</a:t>
                       </a:r>
                       <a:r>
-                        <a:rPr lang="en-US" sz="2400" dirty="0" smtClean="0">
+                        <a:rPr lang="en-US" sz="2400" dirty="0">
                           <a:solidFill>
                             <a:srgbClr val="000000"/>
                           </a:solidFill>
@@ -10810,7 +10720,7 @@
                         <a:t> </a:t>
                       </a:r>
                       <a:r>
-                        <a:rPr lang="en-US" sz="2400" dirty="0" smtClean="0">
+                        <a:rPr lang="en-US" sz="2400" dirty="0">
                           <a:solidFill>
                             <a:srgbClr val="FF0000"/>
                           </a:solidFill>
@@ -10839,10 +10749,9 @@
                     <a:lstStyle/>
                     <a:p>
                       <a:r>
-                        <a:rPr lang="en-US" sz="2400" dirty="0" smtClean="0"/>
+                        <a:rPr lang="en-US" sz="2400" dirty="0"/>
                         <a:t>Full history</a:t>
                       </a:r>
-                      <a:endParaRPr lang="en-US" sz="2400" dirty="0"/>
                     </a:p>
                   </a:txBody>
                   <a:tcPr anchor="ctr"/>
@@ -10853,7 +10762,7 @@
                     <a:lstStyle/>
                     <a:p>
                       <a:r>
-                        <a:rPr lang="en-US" sz="2400" dirty="0" smtClean="0">
+                        <a:rPr lang="en-US" sz="2400" dirty="0">
                           <a:solidFill>
                             <a:srgbClr val="0000FF"/>
                           </a:solidFill>
@@ -10882,26 +10791,25 @@
                     <a:lstStyle/>
                     <a:p>
                       <a:r>
-                        <a:rPr lang="en-US" sz="2400" dirty="0" smtClean="0"/>
+                        <a:rPr lang="en-US" sz="2400" dirty="0"/>
                         <a:t>Between (‘start’ &lt; </a:t>
                       </a:r>
                       <a:r>
-                        <a:rPr lang="en-US" sz="2400" dirty="0" err="1" smtClean="0"/>
+                        <a:rPr lang="en-US" sz="2400" dirty="0" err="1"/>
                         <a:t>EndTime</a:t>
                       </a:r>
                       <a:r>
-                        <a:rPr lang="en-US" sz="2400" dirty="0" smtClean="0"/>
+                        <a:rPr lang="en-US" sz="2400" dirty="0"/>
                         <a:t> AND ‘end’ &gt;= </a:t>
                       </a:r>
                       <a:r>
-                        <a:rPr lang="en-US" sz="2400" dirty="0" err="1" smtClean="0"/>
+                        <a:rPr lang="en-US" sz="2400" dirty="0" err="1"/>
                         <a:t>StartTime</a:t>
                       </a:r>
                       <a:r>
-                        <a:rPr lang="en-US" sz="2400" dirty="0" smtClean="0"/>
+                        <a:rPr lang="en-US" sz="2400" dirty="0"/>
                         <a:t>)</a:t>
                       </a:r>
-                      <a:endParaRPr lang="en-US" sz="2400" dirty="0"/>
                     </a:p>
                   </a:txBody>
                   <a:tcPr anchor="ctr"/>
@@ -10912,7 +10820,7 @@
                     <a:lstStyle/>
                     <a:p>
                       <a:r>
-                        <a:rPr lang="en-US" sz="2400" kern="1200" dirty="0" smtClean="0">
+                        <a:rPr lang="en-US" sz="2400" kern="1200" dirty="0">
                           <a:solidFill>
                             <a:srgbClr val="0000FF"/>
                           </a:solidFill>
@@ -10926,7 +10834,7 @@
                         <a:t>BETWEEN</a:t>
                       </a:r>
                       <a:r>
-                        <a:rPr lang="en-US" sz="2400" dirty="0" smtClean="0">
+                        <a:rPr lang="en-US" sz="2400" dirty="0">
                           <a:solidFill>
                             <a:srgbClr val="000000"/>
                           </a:solidFill>
@@ -10938,7 +10846,7 @@
                         <a:t> </a:t>
                       </a:r>
                       <a:r>
-                        <a:rPr lang="en-US" sz="2400" dirty="0" smtClean="0">
+                        <a:rPr lang="en-US" sz="2400" dirty="0">
                           <a:solidFill>
                             <a:srgbClr val="FF0000"/>
                           </a:solidFill>
@@ -10947,22 +10855,10 @@
                           </a:highlight>
                           <a:latin typeface="Consolas" panose="020B0609020204030204" pitchFamily="49" charset="0"/>
                         </a:rPr>
-                        <a:t>'2017-01-11 </a:t>
+                        <a:t>'2017-01-11 18:55:04'</a:t>
                       </a:r>
                       <a:r>
-                        <a:rPr lang="en-US" sz="2400" dirty="0" smtClean="0">
-                          <a:solidFill>
-                            <a:srgbClr val="FF0000"/>
-                          </a:solidFill>
-                          <a:highlight>
-                            <a:srgbClr val="FFFFFF"/>
-                          </a:highlight>
-                          <a:latin typeface="Consolas" panose="020B0609020204030204" pitchFamily="49" charset="0"/>
-                        </a:rPr>
-                        <a:t>18:55:04'</a:t>
-                      </a:r>
-                      <a:r>
-                        <a:rPr lang="en-US" sz="2400" dirty="0" smtClean="0">
+                        <a:rPr lang="en-US" sz="2400" dirty="0">
                           <a:solidFill>
                             <a:srgbClr val="000000"/>
                           </a:solidFill>
@@ -10974,7 +10870,7 @@
                         <a:t> </a:t>
                       </a:r>
                       <a:r>
-                        <a:rPr lang="en-US" sz="2400" kern="1200" dirty="0" smtClean="0">
+                        <a:rPr lang="en-US" sz="2400" kern="1200" dirty="0">
                           <a:solidFill>
                             <a:srgbClr val="0000FF"/>
                           </a:solidFill>
@@ -10988,7 +10884,7 @@
                         <a:t>AND</a:t>
                       </a:r>
                       <a:r>
-                        <a:rPr lang="en-US" sz="2400" dirty="0" smtClean="0">
+                        <a:rPr lang="en-US" sz="2400" dirty="0">
                           <a:solidFill>
                             <a:srgbClr val="000000"/>
                           </a:solidFill>
@@ -11000,7 +10896,7 @@
                         <a:t> </a:t>
                       </a:r>
                       <a:r>
-                        <a:rPr lang="en-US" sz="2400" dirty="0" smtClean="0">
+                        <a:rPr lang="en-US" sz="2400" dirty="0">
                           <a:solidFill>
                             <a:srgbClr val="FF0000"/>
                           </a:solidFill>
@@ -11046,26 +10942,25 @@
                         <a:defRPr/>
                       </a:pPr>
                       <a:r>
-                        <a:rPr lang="en-US" sz="2400" dirty="0" smtClean="0"/>
+                        <a:rPr lang="en-US" sz="2400" dirty="0"/>
                         <a:t>From (‘start’ &lt; </a:t>
                       </a:r>
                       <a:r>
-                        <a:rPr lang="en-US" sz="2400" dirty="0" err="1" smtClean="0"/>
+                        <a:rPr lang="en-US" sz="2400" dirty="0" err="1"/>
                         <a:t>EndTime</a:t>
                       </a:r>
                       <a:r>
-                        <a:rPr lang="en-US" sz="2400" dirty="0" smtClean="0"/>
+                        <a:rPr lang="en-US" sz="2400" dirty="0"/>
                         <a:t> AND ‘end’ &gt; </a:t>
                       </a:r>
                       <a:r>
-                        <a:rPr lang="en-US" sz="2400" dirty="0" err="1" smtClean="0"/>
+                        <a:rPr lang="en-US" sz="2400" dirty="0" err="1"/>
                         <a:t>StartTime</a:t>
                       </a:r>
                       <a:r>
-                        <a:rPr lang="en-US" sz="2400" dirty="0" smtClean="0"/>
+                        <a:rPr lang="en-US" sz="2400" dirty="0"/>
                         <a:t>)</a:t>
                       </a:r>
-                      <a:endParaRPr lang="en-US" sz="2400" dirty="0" smtClean="0"/>
                     </a:p>
                   </a:txBody>
                   <a:tcPr anchor="ctr"/>
@@ -11076,7 +10971,7 @@
                     <a:lstStyle/>
                     <a:p>
                       <a:r>
-                        <a:rPr lang="en-US" sz="2400" dirty="0" smtClean="0">
+                        <a:rPr lang="en-US" sz="2400" dirty="0">
                           <a:solidFill>
                             <a:srgbClr val="0000FF"/>
                           </a:solidFill>
@@ -11088,7 +10983,7 @@
                         <a:t>FROM</a:t>
                       </a:r>
                       <a:r>
-                        <a:rPr lang="en-US" sz="2400" dirty="0" smtClean="0">
+                        <a:rPr lang="en-US" sz="2400" dirty="0">
                           <a:solidFill>
                             <a:srgbClr val="000000"/>
                           </a:solidFill>
@@ -11100,7 +10995,7 @@
                         <a:t> </a:t>
                       </a:r>
                       <a:r>
-                        <a:rPr lang="en-US" sz="2400" dirty="0" smtClean="0">
+                        <a:rPr lang="en-US" sz="2400" dirty="0">
                           <a:solidFill>
                             <a:srgbClr val="FF0000"/>
                           </a:solidFill>
@@ -11109,22 +11004,10 @@
                           </a:highlight>
                           <a:latin typeface="Consolas" panose="020B0609020204030204" pitchFamily="49" charset="0"/>
                         </a:rPr>
-                        <a:t>'2017-01-11 </a:t>
+                        <a:t>'2017-01-11 18:55:04'</a:t>
                       </a:r>
                       <a:r>
-                        <a:rPr lang="en-US" sz="2400" dirty="0" smtClean="0">
-                          <a:solidFill>
-                            <a:srgbClr val="FF0000"/>
-                          </a:solidFill>
-                          <a:highlight>
-                            <a:srgbClr val="FFFFFF"/>
-                          </a:highlight>
-                          <a:latin typeface="Consolas" panose="020B0609020204030204" pitchFamily="49" charset="0"/>
-                        </a:rPr>
-                        <a:t>18:55:04'</a:t>
-                      </a:r>
-                      <a:r>
-                        <a:rPr lang="en-US" sz="2400" dirty="0" smtClean="0">
+                        <a:rPr lang="en-US" sz="2400" dirty="0">
                           <a:solidFill>
                             <a:srgbClr val="000000"/>
                           </a:solidFill>
@@ -11136,7 +11019,7 @@
                         <a:t> </a:t>
                       </a:r>
                       <a:r>
-                        <a:rPr lang="en-US" sz="2400" dirty="0" smtClean="0">
+                        <a:rPr lang="en-US" sz="2400" dirty="0">
                           <a:solidFill>
                             <a:srgbClr val="0000FF"/>
                           </a:solidFill>
@@ -11148,7 +11031,7 @@
                         <a:t>TO</a:t>
                       </a:r>
                       <a:r>
-                        <a:rPr lang="en-US" sz="2400" dirty="0" smtClean="0">
+                        <a:rPr lang="en-US" sz="2400" dirty="0">
                           <a:solidFill>
                             <a:srgbClr val="000000"/>
                           </a:solidFill>
@@ -11160,7 +11043,7 @@
                         <a:t> </a:t>
                       </a:r>
                       <a:r>
-                        <a:rPr lang="en-US" sz="2400" dirty="0" smtClean="0">
+                        <a:rPr lang="en-US" sz="2400" dirty="0">
                           <a:solidFill>
                             <a:srgbClr val="FF0000"/>
                           </a:solidFill>
@@ -11206,23 +11089,23 @@
                         <a:defRPr/>
                       </a:pPr>
                       <a:r>
-                        <a:rPr lang="en-US" sz="2400" dirty="0" smtClean="0"/>
+                        <a:rPr lang="en-US" sz="2400" dirty="0"/>
                         <a:t>Contained in (‘start’ &lt;= </a:t>
                       </a:r>
                       <a:r>
-                        <a:rPr lang="en-US" sz="2400" dirty="0" err="1" smtClean="0"/>
+                        <a:rPr lang="en-US" sz="2400" dirty="0" err="1"/>
                         <a:t>EndTime</a:t>
                       </a:r>
                       <a:r>
-                        <a:rPr lang="en-US" sz="2400" dirty="0" smtClean="0"/>
+                        <a:rPr lang="en-US" sz="2400" dirty="0"/>
                         <a:t> AND ‘end’ &gt;= </a:t>
                       </a:r>
                       <a:r>
-                        <a:rPr lang="en-US" sz="2400" dirty="0" err="1" smtClean="0"/>
+                        <a:rPr lang="en-US" sz="2400" dirty="0" err="1"/>
                         <a:t>StartTime</a:t>
                       </a:r>
                       <a:r>
-                        <a:rPr lang="en-US" sz="2400" dirty="0" smtClean="0"/>
+                        <a:rPr lang="en-US" sz="2400" dirty="0"/>
                         <a:t>)</a:t>
                       </a:r>
                     </a:p>
@@ -11238,7 +11121,7 @@
                     <a:lstStyle/>
                     <a:p>
                       <a:r>
-                        <a:rPr lang="en-US" sz="2400" kern="1200" dirty="0" smtClean="0">
+                        <a:rPr lang="en-US" sz="2400" kern="1200" dirty="0">
                           <a:solidFill>
                             <a:srgbClr val="0000FF"/>
                           </a:solidFill>
@@ -11252,7 +11135,7 @@
                         <a:t>CONTAINED</a:t>
                       </a:r>
                       <a:r>
-                        <a:rPr lang="en-US" sz="2400" dirty="0" smtClean="0">
+                        <a:rPr lang="en-US" sz="2400" dirty="0">
                           <a:solidFill>
                             <a:srgbClr val="000000"/>
                           </a:solidFill>
@@ -11264,7 +11147,7 @@
                         <a:t> </a:t>
                       </a:r>
                       <a:r>
-                        <a:rPr lang="en-US" sz="2400" kern="1200" dirty="0" smtClean="0">
+                        <a:rPr lang="en-US" sz="2400" kern="1200" dirty="0">
                           <a:solidFill>
                             <a:srgbClr val="0000FF"/>
                           </a:solidFill>
@@ -11278,7 +11161,7 @@
                         <a:t>IN</a:t>
                       </a:r>
                       <a:r>
-                        <a:rPr lang="en-US" sz="2400" dirty="0" smtClean="0">
+                        <a:rPr lang="en-US" sz="2400" dirty="0">
                           <a:solidFill>
                             <a:srgbClr val="0000FF"/>
                           </a:solidFill>
@@ -11290,7 +11173,7 @@
                         <a:t> </a:t>
                       </a:r>
                       <a:r>
-                        <a:rPr lang="en-US" sz="2400" dirty="0" smtClean="0">
+                        <a:rPr lang="en-US" sz="2400" dirty="0">
                           <a:solidFill>
                             <a:srgbClr val="808080"/>
                           </a:solidFill>
@@ -11302,7 +11185,7 @@
                         <a:t>(</a:t>
                       </a:r>
                       <a:r>
-                        <a:rPr lang="en-US" sz="2400" dirty="0" smtClean="0">
+                        <a:rPr lang="en-US" sz="2400" dirty="0">
                           <a:solidFill>
                             <a:srgbClr val="FF0000"/>
                           </a:solidFill>
@@ -11311,22 +11194,10 @@
                           </a:highlight>
                           <a:latin typeface="Consolas" panose="020B0609020204030204" pitchFamily="49" charset="0"/>
                         </a:rPr>
-                        <a:t>'2017-01-11 </a:t>
+                        <a:t>'2017-01-11 18:55:04'</a:t>
                       </a:r>
                       <a:r>
-                        <a:rPr lang="en-US" sz="2400" dirty="0" smtClean="0">
-                          <a:solidFill>
-                            <a:srgbClr val="FF0000"/>
-                          </a:solidFill>
-                          <a:highlight>
-                            <a:srgbClr val="FFFFFF"/>
-                          </a:highlight>
-                          <a:latin typeface="Consolas" panose="020B0609020204030204" pitchFamily="49" charset="0"/>
-                        </a:rPr>
-                        <a:t>18:55:04'</a:t>
-                      </a:r>
-                      <a:r>
-                        <a:rPr lang="en-US" sz="2400" kern="1200" dirty="0" smtClean="0">
+                        <a:rPr lang="en-US" sz="2400" kern="1200" dirty="0">
                           <a:solidFill>
                             <a:srgbClr val="0000FF"/>
                           </a:solidFill>
@@ -11340,7 +11211,7 @@
                         <a:t>,</a:t>
                       </a:r>
                       <a:r>
-                        <a:rPr lang="en-US" sz="2400" dirty="0" smtClean="0">
+                        <a:rPr lang="en-US" sz="2400" dirty="0">
                           <a:solidFill>
                             <a:srgbClr val="000000"/>
                           </a:solidFill>
@@ -11352,7 +11223,7 @@
                         <a:t> </a:t>
                       </a:r>
                       <a:r>
-                        <a:rPr lang="en-US" sz="2400" dirty="0" smtClean="0">
+                        <a:rPr lang="en-US" sz="2400" dirty="0">
                           <a:solidFill>
                             <a:srgbClr val="FF0000"/>
                           </a:solidFill>
@@ -11364,7 +11235,7 @@
                         <a:t>'2017-05-06 11:30:00'</a:t>
                       </a:r>
                       <a:r>
-                        <a:rPr lang="en-US" sz="2400" dirty="0" smtClean="0">
+                        <a:rPr lang="en-US" sz="2400" dirty="0">
                           <a:solidFill>
                             <a:srgbClr val="808080"/>
                           </a:solidFill>
@@ -11436,10 +11307,9 @@
           <a:lstStyle/>
           <a:p>
             <a:r>
-              <a:rPr lang="en-US" dirty="0" smtClean="0"/>
+              <a:rPr lang="en-US" dirty="0"/>
               <a:t>Temporal Tables</a:t>
             </a:r>
-            <a:endParaRPr lang="en-US" dirty="0"/>
           </a:p>
         </p:txBody>
       </p:sp>
@@ -11466,35 +11336,30 @@
           <a:lstStyle/>
           <a:p>
             <a:r>
-              <a:rPr lang="en-US" sz="2800" dirty="0" smtClean="0"/>
+              <a:rPr lang="en-US" sz="2800" dirty="0"/>
               <a:t>Performance</a:t>
             </a:r>
           </a:p>
           <a:p>
             <a:pPr lvl="1"/>
             <a:r>
-              <a:rPr lang="en-US" sz="2400" dirty="0" smtClean="0"/>
+              <a:rPr lang="en-US" sz="2400" dirty="0"/>
               <a:t>Insert operations – no difference than non-temporal tables</a:t>
             </a:r>
           </a:p>
           <a:p>
             <a:pPr lvl="1"/>
             <a:r>
-              <a:rPr lang="en-US" sz="2400" dirty="0" smtClean="0"/>
+              <a:rPr lang="en-US" sz="2400" dirty="0"/>
               <a:t>Update operations – overhead due to writes to both source and history tables</a:t>
             </a:r>
           </a:p>
           <a:p>
             <a:pPr lvl="1"/>
             <a:r>
-              <a:rPr lang="en-US" sz="2400" dirty="0" smtClean="0"/>
-              <a:t>Read operations – Default clustered index on history table usually not helpful – consider changing </a:t>
-            </a:r>
-            <a:r>
-              <a:rPr lang="en-US" sz="2400" dirty="0" smtClean="0"/>
-              <a:t>it</a:t>
-            </a:r>
-            <a:endParaRPr lang="en-US" sz="2400" dirty="0" smtClean="0"/>
+              <a:rPr lang="en-US" sz="2400" dirty="0"/>
+              <a:t>Read operations – Default clustered index on history table usually not helpful – consider changing it</a:t>
+            </a:r>
           </a:p>
         </p:txBody>
       </p:sp>
@@ -11544,10 +11409,9 @@
           <a:lstStyle/>
           <a:p>
             <a:r>
-              <a:rPr lang="en-US" dirty="0" smtClean="0"/>
+              <a:rPr lang="en-US" dirty="0"/>
               <a:t>Temporal Tables</a:t>
             </a:r>
-            <a:endParaRPr lang="en-US" dirty="0"/>
           </a:p>
         </p:txBody>
       </p:sp>
@@ -11574,43 +11438,38 @@
           <a:lstStyle/>
           <a:p>
             <a:r>
-              <a:rPr lang="en-US" sz="2800" dirty="0" smtClean="0"/>
-              <a:t>Beware </a:t>
-            </a:r>
-            <a:r>
-              <a:rPr lang="en-US" sz="2800" dirty="0" smtClean="0"/>
-              <a:t>of v1 limitations!</a:t>
+              <a:rPr lang="en-US" sz="2800" dirty="0"/>
+              <a:t>Beware of v1 limitations!</a:t>
             </a:r>
           </a:p>
           <a:p>
             <a:pPr lvl="1"/>
             <a:r>
-              <a:rPr lang="en-US" sz="2400" dirty="0" smtClean="0"/>
+              <a:rPr lang="en-US" sz="2400" dirty="0"/>
               <a:t>Dropping a column in the source table will drop the column in the history table – all history is lost!</a:t>
             </a:r>
           </a:p>
           <a:p>
             <a:pPr lvl="1"/>
             <a:r>
-              <a:rPr lang="en-US" sz="2400" dirty="0" smtClean="0"/>
+              <a:rPr lang="en-US" sz="2400" dirty="0"/>
               <a:t>Cannot add a non-</a:t>
             </a:r>
             <a:r>
-              <a:rPr lang="en-US" sz="2400" dirty="0" err="1" smtClean="0"/>
+              <a:rPr lang="en-US" sz="2400" dirty="0" err="1"/>
               <a:t>nullable</a:t>
             </a:r>
             <a:r>
-              <a:rPr lang="en-US" sz="2400" dirty="0" smtClean="0"/>
+              <a:rPr lang="en-US" sz="2400" dirty="0"/>
               <a:t> column to the source table</a:t>
             </a:r>
           </a:p>
           <a:p>
             <a:pPr lvl="1"/>
             <a:r>
-              <a:rPr lang="en-US" sz="2400" dirty="0" smtClean="0"/>
+              <a:rPr lang="en-US" sz="2400" dirty="0"/>
               <a:t>Pruning history is an offline operation</a:t>
             </a:r>
-            <a:endParaRPr lang="en-US" sz="2400" dirty="0"/>
           </a:p>
         </p:txBody>
       </p:sp>
@@ -11661,15 +11520,7 @@
           <a:p>
             <a:r>
               <a:rPr lang="en-US" dirty="0"/>
-              <a:t>SQL Server </a:t>
-            </a:r>
-            <a:r>
-              <a:rPr lang="en-US" dirty="0" smtClean="0"/>
-              <a:t>Features (Speed </a:t>
-            </a:r>
-            <a:r>
-              <a:rPr lang="en-US" dirty="0"/>
-              <a:t>Dating)</a:t>
+              <a:t>SQL Server Features (Speed Dating)</a:t>
             </a:r>
           </a:p>
         </p:txBody>
@@ -11848,14 +11699,13 @@
           <a:lstStyle/>
           <a:p>
             <a:r>
-              <a:rPr lang="en-US" dirty="0" err="1" smtClean="0"/>
+              <a:rPr lang="en-US" dirty="0" err="1"/>
               <a:t>Columnstore</a:t>
             </a:r>
             <a:r>
-              <a:rPr lang="en-US" dirty="0" smtClean="0"/>
+              <a:rPr lang="en-US" dirty="0"/>
               <a:t> Indexes</a:t>
             </a:r>
-            <a:endParaRPr lang="en-US" dirty="0"/>
           </a:p>
         </p:txBody>
       </p:sp>
@@ -11882,37 +11732,37 @@
           <a:lstStyle/>
           <a:p>
             <a:r>
-              <a:rPr lang="en-US" sz="2800" dirty="0" smtClean="0"/>
+              <a:rPr lang="en-US" sz="2800" dirty="0"/>
               <a:t>Traditional indexes are row-based copies of selected columns in table</a:t>
             </a:r>
           </a:p>
           <a:p>
             <a:r>
-              <a:rPr lang="en-US" sz="2800" dirty="0" err="1" smtClean="0"/>
+              <a:rPr lang="en-US" sz="2800" dirty="0" err="1"/>
               <a:t>Columnstore</a:t>
             </a:r>
             <a:r>
-              <a:rPr lang="en-US" sz="2800" dirty="0" smtClean="0"/>
+              <a:rPr lang="en-US" sz="2800" dirty="0"/>
               <a:t> turns this around and orders the index by column</a:t>
             </a:r>
           </a:p>
           <a:p>
             <a:r>
-              <a:rPr lang="en-US" sz="2800" dirty="0" smtClean="0"/>
+              <a:rPr lang="en-US" sz="2800" dirty="0"/>
               <a:t>Can be the entire table (clustered index) or a subset of columns (</a:t>
             </a:r>
             <a:r>
-              <a:rPr lang="en-US" sz="2800" dirty="0" err="1" smtClean="0"/>
+              <a:rPr lang="en-US" sz="2800" dirty="0" err="1"/>
               <a:t>nonclustered</a:t>
             </a:r>
             <a:r>
-              <a:rPr lang="en-US" sz="2800" dirty="0" smtClean="0"/>
+              <a:rPr lang="en-US" sz="2800" dirty="0"/>
               <a:t> index)</a:t>
             </a:r>
           </a:p>
           <a:p>
             <a:r>
-              <a:rPr lang="en-US" sz="2800" dirty="0" smtClean="0"/>
+              <a:rPr lang="en-US" sz="2800" dirty="0"/>
               <a:t>Can be combined with row-based indexes</a:t>
             </a:r>
           </a:p>
@@ -11964,14 +11814,13 @@
           <a:lstStyle/>
           <a:p>
             <a:r>
-              <a:rPr lang="en-US" dirty="0" err="1" smtClean="0"/>
+              <a:rPr lang="en-US" dirty="0" err="1"/>
               <a:t>Columnstore</a:t>
             </a:r>
             <a:r>
-              <a:rPr lang="en-US" dirty="0" smtClean="0"/>
+              <a:rPr lang="en-US" dirty="0"/>
               <a:t> Indexes</a:t>
             </a:r>
-            <a:endParaRPr lang="en-US" dirty="0"/>
           </a:p>
         </p:txBody>
       </p:sp>
@@ -11998,34 +11847,34 @@
           <a:lstStyle/>
           <a:p>
             <a:r>
-              <a:rPr lang="en-US" sz="2800" dirty="0" smtClean="0"/>
+              <a:rPr lang="en-US" sz="2800" dirty="0"/>
               <a:t>Previous versions of SQL Server imposed limitations, but SQL Server 2016 removes many of these limits</a:t>
             </a:r>
           </a:p>
           <a:p>
             <a:r>
-              <a:rPr lang="en-US" sz="2800" dirty="0" smtClean="0"/>
+              <a:rPr lang="en-US" sz="2800" dirty="0"/>
               <a:t>Particularly useful for warehouse / analytic queries</a:t>
             </a:r>
           </a:p>
           <a:p>
             <a:pPr lvl="1"/>
             <a:r>
-              <a:rPr lang="en-US" sz="2400" dirty="0" smtClean="0"/>
+              <a:rPr lang="en-US" sz="2400" dirty="0"/>
               <a:t>However performance usually degrades for OLTP workloads</a:t>
             </a:r>
           </a:p>
           <a:p>
             <a:r>
-              <a:rPr lang="en-US" sz="2800" dirty="0" smtClean="0"/>
+              <a:rPr lang="en-US" sz="2800" dirty="0"/>
               <a:t>Much of performance benefit derives from high compression of </a:t>
             </a:r>
             <a:r>
-              <a:rPr lang="en-US" sz="2800" dirty="0" err="1" smtClean="0"/>
+              <a:rPr lang="en-US" sz="2800" dirty="0" err="1"/>
               <a:t>columnstore</a:t>
             </a:r>
             <a:r>
-              <a:rPr lang="en-US" sz="2800" dirty="0" smtClean="0"/>
+              <a:rPr lang="en-US" sz="2800" dirty="0"/>
               <a:t> (typically 20x or more)</a:t>
             </a:r>
           </a:p>
@@ -12084,7 +11933,6 @@
               <a:rPr lang="en-US" dirty="0"/>
               <a:t> Indexes</a:t>
             </a:r>
-            <a:endParaRPr lang="en-US" dirty="0"/>
           </a:p>
         </p:txBody>
       </p:sp>
@@ -12208,10 +12056,9 @@
           <a:lstStyle/>
           <a:p>
             <a:r>
-              <a:rPr lang="en-US" sz="7200" dirty="0" smtClean="0"/>
+              <a:rPr lang="en-US" sz="7200" dirty="0"/>
               <a:t>DEMO</a:t>
             </a:r>
-            <a:endParaRPr lang="en-US" sz="7200" dirty="0"/>
           </a:p>
         </p:txBody>
       </p:sp>
@@ -12314,12 +12161,8 @@
           <a:p>
             <a:pPr lvl="1"/>
             <a:r>
-              <a:rPr lang="en-US" sz="2400" dirty="0" smtClean="0"/>
-              <a:t>June </a:t>
-            </a:r>
-            <a:r>
               <a:rPr lang="en-US" sz="2400" dirty="0"/>
-              <a:t>1 – SQL Server 2016 is released</a:t>
+              <a:t>June 1 – SQL Server 2016 is released</a:t>
             </a:r>
           </a:p>
           <a:p>
@@ -12361,18 +12204,9 @@
           <a:p>
             <a:pPr marL="915750" lvl="2" indent="-285750"/>
             <a:r>
-              <a:rPr lang="en-US" sz="2000" dirty="0" smtClean="0"/>
-              <a:t>Differentiation </a:t>
-            </a:r>
-            <a:r>
               <a:rPr lang="en-US" sz="2000" dirty="0"/>
-              <a:t>by scale, not by </a:t>
-            </a:r>
-            <a:r>
-              <a:rPr lang="en-US" sz="2000" dirty="0" smtClean="0"/>
-              <a:t>feature</a:t>
-            </a:r>
-            <a:endParaRPr lang="en-US" sz="2000" dirty="0"/>
+              <a:t>Differentiation by scale, not by feature</a:t>
+            </a:r>
           </a:p>
         </p:txBody>
       </p:sp>
@@ -12423,15 +12257,7 @@
           <a:p>
             <a:r>
               <a:rPr lang="en-US" dirty="0"/>
-              <a:t>SQL Server </a:t>
-            </a:r>
-            <a:r>
-              <a:rPr lang="en-US" dirty="0" smtClean="0"/>
-              <a:t>Features (Speed </a:t>
-            </a:r>
-            <a:r>
-              <a:rPr lang="en-US" dirty="0"/>
-              <a:t>Dating)</a:t>
+              <a:t>SQL Server Features (Speed Dating)</a:t>
             </a:r>
           </a:p>
         </p:txBody>
@@ -12604,10 +12430,9 @@
           <a:lstStyle/>
           <a:p>
             <a:r>
-              <a:rPr lang="en-US" dirty="0" smtClean="0"/>
+              <a:rPr lang="en-US" dirty="0"/>
               <a:t>Partitioning</a:t>
             </a:r>
-            <a:endParaRPr lang="en-US" dirty="0"/>
           </a:p>
         </p:txBody>
       </p:sp>
@@ -12634,60 +12459,47 @@
           <a:lstStyle/>
           <a:p>
             <a:r>
-              <a:rPr lang="en-US" sz="2800" dirty="0" smtClean="0"/>
+              <a:rPr lang="en-US" sz="2800" dirty="0"/>
               <a:t>Spread table data across multiple B-trees</a:t>
             </a:r>
           </a:p>
           <a:p>
             <a:r>
-              <a:rPr lang="en-US" sz="2800" dirty="0" smtClean="0"/>
+              <a:rPr lang="en-US" sz="2800" dirty="0"/>
               <a:t>For example, place older data on slower, cheaper storage</a:t>
             </a:r>
           </a:p>
           <a:p>
             <a:r>
-              <a:rPr lang="en-US" sz="2800" dirty="0" smtClean="0"/>
+              <a:rPr lang="en-US" sz="2800" dirty="0"/>
               <a:t>Usually for very large data sets, but has other purposes</a:t>
             </a:r>
           </a:p>
           <a:p>
             <a:r>
-              <a:rPr lang="en-US" sz="2800" dirty="0" smtClean="0"/>
+              <a:rPr lang="en-US" sz="2800" dirty="0"/>
               <a:t>Separation defined by a “partitioning function” and a “partitioning scheme”</a:t>
             </a:r>
           </a:p>
           <a:p>
             <a:pPr lvl="1"/>
             <a:r>
-              <a:rPr lang="en-US" sz="2400" dirty="0" smtClean="0"/>
+              <a:rPr lang="en-US" sz="2400" dirty="0"/>
               <a:t>Range LEFT (think of as &gt;=)</a:t>
             </a:r>
           </a:p>
           <a:p>
             <a:pPr lvl="1"/>
             <a:r>
-              <a:rPr lang="en-US" sz="2400" dirty="0" smtClean="0"/>
-              <a:t>Range RIGHT (think of as </a:t>
-            </a:r>
-            <a:r>
-              <a:rPr lang="en-US" sz="2400" dirty="0" smtClean="0"/>
-              <a:t>&lt;)</a:t>
-            </a:r>
-          </a:p>
-          <a:p>
-            <a:r>
-              <a:rPr lang="en-US" sz="2800" dirty="0" smtClean="0"/>
-              <a:t>Another use: combine </a:t>
-            </a:r>
+              <a:rPr lang="en-US" sz="2400" dirty="0"/>
+              <a:t>Range RIGHT (think of as &lt;)</a:t>
+            </a:r>
+          </a:p>
+          <a:p>
             <a:r>
               <a:rPr lang="en-US" sz="2800" dirty="0"/>
-              <a:t>with temporal tables to enable quick archival </a:t>
-            </a:r>
-            <a:r>
-              <a:rPr lang="en-US" sz="2800" dirty="0" smtClean="0"/>
-              <a:t>capability</a:t>
-            </a:r>
-            <a:endParaRPr lang="en-US" sz="2800" dirty="0"/>
+              <a:t>Another use: combine with temporal tables to enable quick archival capability</a:t>
+            </a:r>
           </a:p>
         </p:txBody>
       </p:sp>
@@ -12737,10 +12549,9 @@
           <a:lstStyle/>
           <a:p>
             <a:r>
-              <a:rPr lang="en-US" dirty="0" smtClean="0"/>
+              <a:rPr lang="en-US" dirty="0"/>
               <a:t>Traditional SQL Server Index</a:t>
             </a:r>
-            <a:endParaRPr lang="en-US" dirty="0"/>
           </a:p>
         </p:txBody>
       </p:sp>
@@ -12814,10 +12625,9 @@
           <a:lstStyle/>
           <a:p>
             <a:r>
-              <a:rPr lang="en-US" dirty="0" smtClean="0"/>
+              <a:rPr lang="en-US" dirty="0"/>
               <a:t>Partitioned SQL Server Index</a:t>
             </a:r>
-            <a:endParaRPr lang="en-US" dirty="0"/>
           </a:p>
         </p:txBody>
       </p:sp>
@@ -12891,10 +12701,9 @@
           <a:lstStyle/>
           <a:p>
             <a:r>
-              <a:rPr lang="en-US" dirty="0" smtClean="0"/>
+              <a:rPr lang="en-US" dirty="0"/>
               <a:t>Partitioning</a:t>
             </a:r>
-            <a:endParaRPr lang="en-US" dirty="0"/>
           </a:p>
         </p:txBody>
       </p:sp>
@@ -13018,10 +12827,9 @@
           <a:lstStyle/>
           <a:p>
             <a:r>
-              <a:rPr lang="en-US" sz="7200" dirty="0" smtClean="0"/>
+              <a:rPr lang="en-US" sz="7200" dirty="0"/>
               <a:t>DEMO</a:t>
             </a:r>
-            <a:endParaRPr lang="en-US" sz="7200" dirty="0"/>
           </a:p>
         </p:txBody>
       </p:sp>
@@ -13072,15 +12880,7 @@
           <a:p>
             <a:r>
               <a:rPr lang="en-US" dirty="0"/>
-              <a:t>SQL Server </a:t>
-            </a:r>
-            <a:r>
-              <a:rPr lang="en-US" dirty="0" smtClean="0"/>
-              <a:t>Features (Speed </a:t>
-            </a:r>
-            <a:r>
-              <a:rPr lang="en-US" dirty="0"/>
-              <a:t>Dating)</a:t>
+              <a:t>SQL Server Features (Speed Dating)</a:t>
             </a:r>
           </a:p>
         </p:txBody>
@@ -13339,7 +13139,6 @@
               <a:rPr lang="en-US" dirty="0"/>
               <a:t>In-Memory OLTP</a:t>
             </a:r>
-            <a:endParaRPr lang="en-US" dirty="0"/>
           </a:p>
         </p:txBody>
       </p:sp>
@@ -13463,10 +13262,9 @@
           <a:lstStyle/>
           <a:p>
             <a:r>
-              <a:rPr lang="en-US" sz="7200" dirty="0" smtClean="0"/>
+              <a:rPr lang="en-US" sz="7200" dirty="0"/>
               <a:t>DEMO</a:t>
             </a:r>
-            <a:endParaRPr lang="en-US" sz="7200" dirty="0"/>
           </a:p>
         </p:txBody>
       </p:sp>
@@ -14073,77 +13871,71 @@
           <a:lstStyle/>
           <a:p>
             <a:r>
-              <a:rPr lang="en-US" sz="2800" dirty="0" err="1" smtClean="0"/>
+              <a:rPr lang="en-US" sz="2800" dirty="0" err="1"/>
               <a:t>Overcomeable</a:t>
             </a:r>
             <a:r>
-              <a:rPr lang="en-US" sz="2800" dirty="0" smtClean="0"/>
+              <a:rPr lang="en-US" sz="2800" dirty="0"/>
               <a:t> Limitations</a:t>
             </a:r>
-            <a:endParaRPr lang="en-US" sz="2800" dirty="0"/>
           </a:p>
           <a:p>
             <a:pPr lvl="1"/>
             <a:r>
-              <a:rPr lang="en-US" sz="2400" dirty="0" smtClean="0"/>
+              <a:rPr lang="en-US" sz="2400" dirty="0"/>
               <a:t>No TCP/IP by default; be sure to enable it</a:t>
             </a:r>
-            <a:endParaRPr lang="en-US" sz="2400" dirty="0"/>
-          </a:p>
-          <a:p>
-            <a:r>
-              <a:rPr lang="en-US" sz="2800" dirty="0" smtClean="0"/>
+          </a:p>
+          <a:p>
+            <a:r>
+              <a:rPr lang="en-US" sz="2800" dirty="0"/>
               <a:t>Feature Limitations</a:t>
             </a:r>
-            <a:endParaRPr lang="en-US" sz="2800" dirty="0"/>
           </a:p>
           <a:p>
             <a:pPr lvl="1"/>
             <a:r>
-              <a:rPr lang="en-US" sz="2400" dirty="0" smtClean="0"/>
+              <a:rPr lang="en-US" sz="2400" dirty="0"/>
               <a:t>Availability Groups</a:t>
             </a:r>
-            <a:endParaRPr lang="en-US" sz="2400" dirty="0"/>
           </a:p>
           <a:p>
             <a:pPr lvl="1"/>
             <a:r>
-              <a:rPr lang="en-US" sz="2400" dirty="0" smtClean="0"/>
+              <a:rPr lang="en-US" sz="2400" dirty="0"/>
               <a:t>Mirroring</a:t>
             </a:r>
           </a:p>
           <a:p>
             <a:pPr lvl="1"/>
             <a:r>
-              <a:rPr lang="en-US" sz="2400" dirty="0" err="1" smtClean="0"/>
+              <a:rPr lang="en-US" sz="2400" dirty="0" err="1"/>
               <a:t>Polybase</a:t>
             </a:r>
             <a:r>
-              <a:rPr lang="en-US" sz="2400" dirty="0" smtClean="0"/>
+              <a:rPr lang="en-US" sz="2400" dirty="0"/>
               <a:t> (head node)</a:t>
             </a:r>
           </a:p>
           <a:p>
             <a:pPr lvl="1"/>
             <a:r>
-              <a:rPr lang="en-US" sz="2400" dirty="0" smtClean="0"/>
+              <a:rPr lang="en-US" sz="2400" dirty="0"/>
               <a:t>No SSIS, SSAS, R Server, etc.</a:t>
             </a:r>
           </a:p>
           <a:p>
             <a:pPr lvl="1"/>
             <a:r>
-              <a:rPr lang="en-US" sz="2400" dirty="0" smtClean="0"/>
+              <a:rPr lang="en-US" sz="2400" dirty="0"/>
               <a:t>SSRS with “Express with Advanced Services”</a:t>
             </a:r>
-            <a:endParaRPr lang="en-US" sz="2400" dirty="0"/>
-          </a:p>
-          <a:p>
-            <a:r>
-              <a:rPr lang="en-US" sz="2800" dirty="0" smtClean="0"/>
+          </a:p>
+          <a:p>
+            <a:r>
+              <a:rPr lang="en-US" sz="2800" dirty="0"/>
               <a:t>Beware! Mandatory telemetry</a:t>
             </a:r>
-            <a:endParaRPr lang="en-US" sz="2800" dirty="0"/>
           </a:p>
         </p:txBody>
       </p:sp>
@@ -14193,10 +13985,9 @@
           <a:lstStyle/>
           <a:p>
             <a:r>
-              <a:rPr lang="en-US" dirty="0" smtClean="0"/>
+              <a:rPr lang="en-US" dirty="0"/>
               <a:t>Cumulative Updates</a:t>
             </a:r>
-            <a:endParaRPr lang="en-US" dirty="0"/>
           </a:p>
         </p:txBody>
       </p:sp>
@@ -14223,41 +14014,37 @@
           <a:lstStyle/>
           <a:p>
             <a:r>
-              <a:rPr lang="en-US" sz="2800" dirty="0" smtClean="0"/>
+              <a:rPr lang="en-US" sz="2800" dirty="0"/>
               <a:t>Bug fixes specific to a SQL Server version and service pack</a:t>
             </a:r>
           </a:p>
           <a:p>
             <a:r>
               <a:rPr lang="en-US" sz="2800" dirty="0"/>
-              <a:t>T</a:t>
-            </a:r>
-            <a:r>
-              <a:rPr lang="en-US" sz="2800" dirty="0" smtClean="0"/>
-              <a:t>ypically issued by Microsoft about every two months</a:t>
-            </a:r>
-          </a:p>
-          <a:p>
-            <a:r>
-              <a:rPr lang="en-US" sz="2800" dirty="0" smtClean="0"/>
+              <a:t>Typically issued by Microsoft about every two months</a:t>
+            </a:r>
+          </a:p>
+          <a:p>
+            <a:r>
+              <a:rPr lang="en-US" sz="2800" dirty="0"/>
               <a:t>Are “cumulative,” so only need the most recent update</a:t>
             </a:r>
           </a:p>
           <a:p>
             <a:r>
-              <a:rPr lang="en-US" sz="2800" dirty="0" smtClean="0"/>
+              <a:rPr lang="en-US" sz="2800" dirty="0"/>
               <a:t>Since SP1 contained new functionality, particularly import to apply</a:t>
             </a:r>
           </a:p>
           <a:p>
             <a:r>
-              <a:rPr lang="en-US" sz="2800" dirty="0" smtClean="0"/>
+              <a:rPr lang="en-US" sz="2800" dirty="0"/>
               <a:t>Recent CUs go through more rigorous testing; MS recommends applying them by default</a:t>
             </a:r>
           </a:p>
           <a:p>
             <a:r>
-              <a:rPr lang="en-US" sz="2800" dirty="0" smtClean="0"/>
+              <a:rPr lang="en-US" sz="2800" dirty="0"/>
               <a:t>Current CU for SQL Server 2016 SP1 is CU2 (March 22, 2017)</a:t>
             </a:r>
           </a:p>
@@ -14309,10 +14096,9 @@
           <a:lstStyle/>
           <a:p>
             <a:r>
-              <a:rPr lang="en-US" dirty="0" smtClean="0"/>
+              <a:rPr lang="en-US" dirty="0"/>
               <a:t>SQL Server 2017</a:t>
             </a:r>
-            <a:endParaRPr lang="en-US" dirty="0"/>
           </a:p>
         </p:txBody>
       </p:sp>
@@ -14339,55 +14125,55 @@
           <a:lstStyle/>
           <a:p>
             <a:r>
-              <a:rPr lang="en-US" sz="2800" dirty="0" smtClean="0"/>
+              <a:rPr lang="en-US" sz="2800" dirty="0"/>
               <a:t>Until April 19, simply referred to as </a:t>
             </a:r>
             <a:r>
-              <a:rPr lang="en-US" sz="2800" dirty="0" err="1" smtClean="0"/>
+              <a:rPr lang="en-US" sz="2800" dirty="0" err="1"/>
               <a:t>vNext</a:t>
             </a:r>
-            <a:endParaRPr lang="en-US" sz="2800" dirty="0" smtClean="0"/>
-          </a:p>
-          <a:p>
-            <a:r>
-              <a:rPr lang="en-US" sz="2800" dirty="0" smtClean="0"/>
+            <a:endParaRPr lang="en-US" sz="2800" dirty="0"/>
+          </a:p>
+          <a:p>
+            <a:r>
+              <a:rPr lang="en-US" sz="2800" dirty="0"/>
               <a:t>Current on CTP 2.0 (6</a:t>
             </a:r>
             <a:r>
-              <a:rPr lang="en-US" sz="2800" baseline="30000" dirty="0" smtClean="0"/>
+              <a:rPr lang="en-US" sz="2800" baseline="30000" dirty="0"/>
               <a:t>th</a:t>
             </a:r>
             <a:r>
-              <a:rPr lang="en-US" sz="2800" dirty="0" smtClean="0"/>
+              <a:rPr lang="en-US" sz="2800" dirty="0"/>
               <a:t> preview version)</a:t>
             </a:r>
           </a:p>
           <a:p>
             <a:pPr lvl="1"/>
             <a:r>
-              <a:rPr lang="en-US" sz="2600" dirty="0" smtClean="0"/>
+              <a:rPr lang="en-US" sz="2600" dirty="0"/>
               <a:t>(SQL Server 2016 had 10 preview versions)</a:t>
             </a:r>
           </a:p>
           <a:p>
             <a:r>
-              <a:rPr lang="en-US" sz="2800" dirty="0" smtClean="0"/>
+              <a:rPr lang="en-US" sz="2800" dirty="0"/>
               <a:t>No release date announced as of yet</a:t>
             </a:r>
           </a:p>
           <a:p>
             <a:r>
-              <a:rPr lang="en-US" sz="2800" dirty="0" smtClean="0"/>
+              <a:rPr lang="en-US" sz="2800" dirty="0"/>
               <a:t>No edition announcements as of yet</a:t>
             </a:r>
           </a:p>
           <a:p>
             <a:r>
-              <a:rPr lang="en-US" sz="2800" dirty="0" smtClean="0"/>
+              <a:rPr lang="en-US" sz="2800" dirty="0"/>
               <a:t>New features: availability on Linux, Python integration, </a:t>
             </a:r>
             <a:r>
-              <a:rPr lang="en-US" sz="2800" smtClean="0"/>
+              <a:rPr lang="en-US" sz="2800"/>
               <a:t>adaptive query plans, graph databases</a:t>
             </a:r>
             <a:endParaRPr lang="en-US" sz="2800" dirty="0"/>
@@ -14441,15 +14227,7 @@
           <a:p>
             <a:r>
               <a:rPr lang="en-US" dirty="0"/>
-              <a:t>SQL Server </a:t>
-            </a:r>
-            <a:r>
-              <a:rPr lang="en-US" dirty="0" smtClean="0"/>
-              <a:t>Features (Speed </a:t>
-            </a:r>
-            <a:r>
-              <a:rPr lang="en-US" dirty="0"/>
-              <a:t>Dating)</a:t>
+              <a:t>SQL Server Features (Speed Dating)</a:t>
             </a:r>
           </a:p>
         </p:txBody>

</xml_diff>

<commit_message>
Change color theme in slide deck.
</commit_message>
<xml_diff>
--- a/AwesomeFreeSQLServerFeatures.pptx
+++ b/AwesomeFreeSQLServerFeatures.pptx
@@ -2,7 +2,7 @@
 <file path=ppt/presentation.xml><?xml version="1.0" encoding="utf-8"?>
 <p:presentation xmlns:a="http://schemas.openxmlformats.org/drawingml/2006/main" xmlns:r="http://schemas.openxmlformats.org/officeDocument/2006/relationships" xmlns:p="http://schemas.openxmlformats.org/presentationml/2006/main" autoCompressPictures="0">
   <p:sldMasterIdLst>
-    <p:sldMasterId id="2147483706" r:id="rId1"/>
+    <p:sldMasterId id="2147483723" r:id="rId1"/>
   </p:sldMasterIdLst>
   <p:notesMasterIdLst>
     <p:notesMasterId r:id="rId40"/>
@@ -234,7 +234,7 @@
           <a:p>
             <a:fld id="{64F240C7-B8B6-4D73-9667-9F7409B58D21}" type="datetimeFigureOut">
               <a:rPr lang="en-US" smtClean="0"/>
-              <a:t>4/27/2017</a:t>
+              <a:t>4/28/2017</a:t>
             </a:fld>
             <a:endParaRPr lang="en-US"/>
           </a:p>
@@ -1201,6 +1201,69 @@
             <a:chExt cx="12192000" cy="6866467"/>
           </a:xfrm>
         </p:grpSpPr>
+        <p:sp>
+          <p:nvSpPr>
+            <p:cNvPr id="15" name="Freeform 14"/>
+            <p:cNvSpPr/>
+            <p:nvPr/>
+          </p:nvSpPr>
+          <p:spPr>
+            <a:xfrm>
+              <a:off x="0" y="-7862"/>
+              <a:ext cx="863600" cy="5698067"/>
+            </a:xfrm>
+            <a:custGeom>
+              <a:avLst/>
+              <a:gdLst/>
+              <a:ahLst/>
+              <a:cxnLst/>
+              <a:rect l="l" t="t" r="r" b="b"/>
+              <a:pathLst>
+                <a:path w="863600" h="5698067">
+                  <a:moveTo>
+                    <a:pt x="0" y="8467"/>
+                  </a:moveTo>
+                  <a:lnTo>
+                    <a:pt x="863600" y="0"/>
+                  </a:lnTo>
+                  <a:lnTo>
+                    <a:pt x="863600" y="16934"/>
+                  </a:lnTo>
+                  <a:lnTo>
+                    <a:pt x="0" y="5698067"/>
+                  </a:lnTo>
+                  <a:lnTo>
+                    <a:pt x="0" y="8467"/>
+                  </a:lnTo>
+                  <a:close/>
+                </a:path>
+              </a:pathLst>
+            </a:custGeom>
+            <a:solidFill>
+              <a:schemeClr val="accent1">
+                <a:alpha val="70000"/>
+              </a:schemeClr>
+            </a:solidFill>
+            <a:ln>
+              <a:noFill/>
+            </a:ln>
+            <a:effectLst/>
+          </p:spPr>
+          <p:style>
+            <a:lnRef idx="1">
+              <a:schemeClr val="accent1"/>
+            </a:lnRef>
+            <a:fillRef idx="3">
+              <a:schemeClr val="accent1"/>
+            </a:fillRef>
+            <a:effectRef idx="2">
+              <a:schemeClr val="accent1"/>
+            </a:effectRef>
+            <a:fontRef idx="minor">
+              <a:schemeClr val="lt1"/>
+            </a:fontRef>
+          </p:style>
+        </p:sp>
         <p:cxnSp>
           <p:nvCxnSpPr>
             <p:cNvPr id="19" name="Straight Connector 18"/>
@@ -1419,7 +1482,8 @@
             </a:prstGeom>
             <a:solidFill>
               <a:schemeClr val="accent1">
-                <a:alpha val="72000"/>
+                <a:lumMod val="75000"/>
+                <a:alpha val="66000"/>
               </a:schemeClr>
             </a:solidFill>
             <a:ln>
@@ -1545,8 +1609,7 @@
               </a:pathLst>
             </a:custGeom>
             <a:solidFill>
-              <a:schemeClr val="accent1">
-                <a:lumMod val="75000"/>
+              <a:schemeClr val="accent2">
                 <a:alpha val="70000"/>
               </a:schemeClr>
             </a:solidFill>
@@ -1609,8 +1672,8 @@
               </a:pathLst>
             </a:custGeom>
             <a:solidFill>
-              <a:schemeClr val="accent1">
-                <a:lumMod val="50000"/>
+              <a:schemeClr val="accent2">
+                <a:lumMod val="75000"/>
                 <a:alpha val="80000"/>
               </a:schemeClr>
             </a:solidFill>
@@ -1652,7 +1715,7 @@
             </a:prstGeom>
             <a:solidFill>
               <a:schemeClr val="accent1">
-                <a:lumMod val="50000"/>
+                <a:lumMod val="75000"/>
                 <a:alpha val="66000"/>
               </a:schemeClr>
             </a:solidFill>
@@ -1676,48 +1739,6 @@
             </a:fontRef>
           </p:style>
         </p:sp>
-        <p:sp>
-          <p:nvSpPr>
-            <p:cNvPr id="29" name="Isosceles Triangle 28"/>
-            <p:cNvSpPr/>
-            <p:nvPr/>
-          </p:nvSpPr>
-          <p:spPr>
-            <a:xfrm rot="10800000">
-              <a:off x="0" y="0"/>
-              <a:ext cx="842596" cy="5666154"/>
-            </a:xfrm>
-            <a:prstGeom prst="triangle">
-              <a:avLst>
-                <a:gd name="adj" fmla="val 100000"/>
-              </a:avLst>
-            </a:prstGeom>
-            <a:solidFill>
-              <a:schemeClr val="accent1">
-                <a:lumMod val="75000"/>
-                <a:alpha val="70000"/>
-              </a:schemeClr>
-            </a:solidFill>
-            <a:ln>
-              <a:noFill/>
-            </a:ln>
-            <a:effectLst/>
-          </p:spPr>
-          <p:style>
-            <a:lnRef idx="1">
-              <a:schemeClr val="accent1"/>
-            </a:lnRef>
-            <a:fillRef idx="3">
-              <a:schemeClr val="accent1"/>
-            </a:fillRef>
-            <a:effectRef idx="2">
-              <a:schemeClr val="accent1"/>
-            </a:effectRef>
-            <a:fontRef idx="minor">
-              <a:schemeClr val="lt1"/>
-            </a:fontRef>
-          </p:style>
-        </p:sp>
       </p:grpSp>
       <p:sp>
         <p:nvSpPr>
@@ -1743,16 +1764,14 @@
             <a:lvl1pPr algn="r">
               <a:defRPr sz="5400">
                 <a:solidFill>
-                  <a:schemeClr val="accent1">
-                    <a:lumMod val="75000"/>
-                  </a:schemeClr>
+                  <a:schemeClr val="accent1"/>
                 </a:solidFill>
               </a:defRPr>
             </a:lvl1pPr>
           </a:lstStyle>
           <a:p>
             <a:r>
-              <a:rPr lang="en-US"/>
+              <a:rPr lang="en-US" smtClean="0"/>
               <a:t>Click to edit Master title style</a:t>
             </a:r>
             <a:endParaRPr lang="en-US" dirty="0"/>
@@ -1872,7 +1891,7 @@
           </a:lstStyle>
           <a:p>
             <a:r>
-              <a:rPr lang="en-US"/>
+              <a:rPr lang="en-US" smtClean="0"/>
               <a:t>Click to edit Master subtitle style</a:t>
             </a:r>
             <a:endParaRPr lang="en-US" dirty="0"/>
@@ -1897,7 +1916,7 @@
             <a:fld id="{B61BEF0D-F0BB-DE4B-95CE-6DB70DBA9567}" type="datetimeFigureOut">
               <a:rPr lang="en-US" smtClean="0"/>
               <a:pPr/>
-              <a:t>4/27/2017</a:t>
+              <a:t>4/28/2017</a:t>
             </a:fld>
             <a:endParaRPr lang="en-US" dirty="0"/>
           </a:p>
@@ -1949,7 +1968,7 @@
     </p:spTree>
     <p:extLst>
       <p:ext uri="{BB962C8B-B14F-4D97-AF65-F5344CB8AC3E}">
-        <p14:creationId xmlns:p14="http://schemas.microsoft.com/office/powerpoint/2010/main" val="551096255"/>
+        <p14:creationId xmlns:p14="http://schemas.microsoft.com/office/powerpoint/2010/main" val="1972352245"/>
       </p:ext>
     </p:extLst>
   </p:cSld>
@@ -2003,7 +2022,7 @@
           </a:lstStyle>
           <a:p>
             <a:r>
-              <a:rPr lang="en-US"/>
+              <a:rPr lang="en-US" smtClean="0"/>
               <a:t>Click to edit Master title style</a:t>
             </a:r>
             <a:endParaRPr lang="en-US" dirty="0"/>
@@ -2126,7 +2145,7 @@
           <a:p>
             <a:pPr lvl="0"/>
             <a:r>
-              <a:rPr lang="en-US"/>
+              <a:rPr lang="en-US" smtClean="0"/>
               <a:t>Edit Master text styles</a:t>
             </a:r>
           </a:p>
@@ -2150,7 +2169,7 @@
             <a:fld id="{B61BEF0D-F0BB-DE4B-95CE-6DB70DBA9567}" type="datetimeFigureOut">
               <a:rPr lang="en-US" smtClean="0"/>
               <a:pPr/>
-              <a:t>4/27/2017</a:t>
+              <a:t>4/28/2017</a:t>
             </a:fld>
             <a:endParaRPr lang="en-US" dirty="0"/>
           </a:p>
@@ -2202,7 +2221,7 @@
     </p:spTree>
     <p:extLst>
       <p:ext uri="{BB962C8B-B14F-4D97-AF65-F5344CB8AC3E}">
-        <p14:creationId xmlns:p14="http://schemas.microsoft.com/office/powerpoint/2010/main" val="4106935327"/>
+        <p14:creationId xmlns:p14="http://schemas.microsoft.com/office/powerpoint/2010/main" val="2573534164"/>
       </p:ext>
     </p:extLst>
   </p:cSld>
@@ -2256,7 +2275,7 @@
           </a:lstStyle>
           <a:p>
             <a:r>
-              <a:rPr lang="en-US"/>
+              <a:rPr lang="en-US" smtClean="0"/>
               <a:t>Click to edit Master title style</a:t>
             </a:r>
             <a:endParaRPr lang="en-US" dirty="0"/>
@@ -2320,7 +2339,7 @@
           <a:p>
             <a:pPr lvl="0"/>
             <a:r>
-              <a:rPr lang="en-US"/>
+              <a:rPr lang="en-US" smtClean="0"/>
               <a:t>Edit Master text styles</a:t>
             </a:r>
           </a:p>
@@ -2442,7 +2461,7 @@
           <a:p>
             <a:pPr lvl="0"/>
             <a:r>
-              <a:rPr lang="en-US"/>
+              <a:rPr lang="en-US" smtClean="0"/>
               <a:t>Edit Master text styles</a:t>
             </a:r>
           </a:p>
@@ -2466,7 +2485,7 @@
             <a:fld id="{B61BEF0D-F0BB-DE4B-95CE-6DB70DBA9567}" type="datetimeFigureOut">
               <a:rPr lang="en-US" smtClean="0"/>
               <a:pPr/>
-              <a:t>4/27/2017</a:t>
+              <a:t>4/28/2017</a:t>
             </a:fld>
             <a:endParaRPr lang="en-US" dirty="0"/>
           </a:p>
@@ -2543,7 +2562,10 @@
                   <a:noFill/>
                 </a:ln>
                 <a:solidFill>
-                  <a:schemeClr val="accent1"/>
+                  <a:schemeClr val="accent1">
+                    <a:lumMod val="60000"/>
+                    <a:lumOff val="40000"/>
+                  </a:schemeClr>
                 </a:solidFill>
                 <a:effectLst/>
                 <a:latin typeface="Arial"/>
@@ -2581,7 +2603,10 @@
                   <a:noFill/>
                 </a:ln>
                 <a:solidFill>
-                  <a:schemeClr val="accent1"/>
+                  <a:schemeClr val="accent1">
+                    <a:lumMod val="60000"/>
+                    <a:lumOff val="40000"/>
+                  </a:schemeClr>
                 </a:solidFill>
                 <a:effectLst/>
                 <a:latin typeface="Arial"/>
@@ -2594,7 +2619,7 @@
     </p:spTree>
     <p:extLst>
       <p:ext uri="{BB962C8B-B14F-4D97-AF65-F5344CB8AC3E}">
-        <p14:creationId xmlns:p14="http://schemas.microsoft.com/office/powerpoint/2010/main" val="624321854"/>
+        <p14:creationId xmlns:p14="http://schemas.microsoft.com/office/powerpoint/2010/main" val="594571207"/>
       </p:ext>
     </p:extLst>
   </p:cSld>
@@ -2648,7 +2673,7 @@
           </a:lstStyle>
           <a:p>
             <a:r>
-              <a:rPr lang="en-US"/>
+              <a:rPr lang="en-US" smtClean="0"/>
               <a:t>Click to edit Master title style</a:t>
             </a:r>
             <a:endParaRPr lang="en-US" dirty="0"/>
@@ -2771,7 +2796,7 @@
           <a:p>
             <a:pPr lvl="0"/>
             <a:r>
-              <a:rPr lang="en-US"/>
+              <a:rPr lang="en-US" smtClean="0"/>
               <a:t>Edit Master text styles</a:t>
             </a:r>
           </a:p>
@@ -2795,7 +2820,7 @@
             <a:fld id="{B61BEF0D-F0BB-DE4B-95CE-6DB70DBA9567}" type="datetimeFigureOut">
               <a:rPr lang="en-US" smtClean="0"/>
               <a:pPr/>
-              <a:t>4/27/2017</a:t>
+              <a:t>4/28/2017</a:t>
             </a:fld>
             <a:endParaRPr lang="en-US" dirty="0"/>
           </a:p>
@@ -2847,7 +2872,7 @@
     </p:spTree>
     <p:extLst>
       <p:ext uri="{BB962C8B-B14F-4D97-AF65-F5344CB8AC3E}">
-        <p14:creationId xmlns:p14="http://schemas.microsoft.com/office/powerpoint/2010/main" val="734196989"/>
+        <p14:creationId xmlns:p14="http://schemas.microsoft.com/office/powerpoint/2010/main" val="896135009"/>
       </p:ext>
     </p:extLst>
   </p:cSld>
@@ -2901,7 +2926,7 @@
           </a:lstStyle>
           <a:p>
             <a:r>
-              <a:rPr lang="en-US"/>
+              <a:rPr lang="en-US" smtClean="0"/>
               <a:t>Click to edit Master title style</a:t>
             </a:r>
             <a:endParaRPr lang="en-US" dirty="0"/>
@@ -2965,7 +2990,7 @@
           <a:p>
             <a:pPr lvl="0"/>
             <a:r>
-              <a:rPr lang="en-US"/>
+              <a:rPr lang="en-US" smtClean="0"/>
               <a:t>Edit Master text styles</a:t>
             </a:r>
           </a:p>
@@ -3087,7 +3112,7 @@
           <a:p>
             <a:pPr lvl="0"/>
             <a:r>
-              <a:rPr lang="en-US"/>
+              <a:rPr lang="en-US" smtClean="0"/>
               <a:t>Edit Master text styles</a:t>
             </a:r>
           </a:p>
@@ -3111,7 +3136,7 @@
             <a:fld id="{B61BEF0D-F0BB-DE4B-95CE-6DB70DBA9567}" type="datetimeFigureOut">
               <a:rPr lang="en-US" smtClean="0"/>
               <a:pPr/>
-              <a:t>4/27/2017</a:t>
+              <a:t>4/28/2017</a:t>
             </a:fld>
             <a:endParaRPr lang="en-US" dirty="0"/>
           </a:p>
@@ -3188,7 +3213,10 @@
                   <a:noFill/>
                 </a:ln>
                 <a:solidFill>
-                  <a:schemeClr val="accent1"/>
+                  <a:schemeClr val="accent1">
+                    <a:lumMod val="60000"/>
+                    <a:lumOff val="40000"/>
+                  </a:schemeClr>
                 </a:solidFill>
                 <a:effectLst/>
                 <a:latin typeface="Arial"/>
@@ -3226,7 +3254,10 @@
                   <a:noFill/>
                 </a:ln>
                 <a:solidFill>
-                  <a:schemeClr val="accent1"/>
+                  <a:schemeClr val="accent1">
+                    <a:lumMod val="60000"/>
+                    <a:lumOff val="40000"/>
+                  </a:schemeClr>
                 </a:solidFill>
                 <a:effectLst/>
                 <a:latin typeface="Arial"/>
@@ -3239,7 +3270,7 @@
     </p:spTree>
     <p:extLst>
       <p:ext uri="{BB962C8B-B14F-4D97-AF65-F5344CB8AC3E}">
-        <p14:creationId xmlns:p14="http://schemas.microsoft.com/office/powerpoint/2010/main" val="1486920354"/>
+        <p14:creationId xmlns:p14="http://schemas.microsoft.com/office/powerpoint/2010/main" val="2687450157"/>
       </p:ext>
     </p:extLst>
   </p:cSld>
@@ -3293,7 +3324,7 @@
           </a:lstStyle>
           <a:p>
             <a:r>
-              <a:rPr lang="en-US"/>
+              <a:rPr lang="en-US" smtClean="0"/>
               <a:t>Click to edit Master title style</a:t>
             </a:r>
             <a:endParaRPr lang="en-US" dirty="0"/>
@@ -3354,7 +3385,7 @@
           <a:p>
             <a:pPr lvl="0"/>
             <a:r>
-              <a:rPr lang="en-US"/>
+              <a:rPr lang="en-US" smtClean="0"/>
               <a:t>Edit Master text styles</a:t>
             </a:r>
           </a:p>
@@ -3476,7 +3507,7 @@
           <a:p>
             <a:pPr lvl="0"/>
             <a:r>
-              <a:rPr lang="en-US"/>
+              <a:rPr lang="en-US" smtClean="0"/>
               <a:t>Edit Master text styles</a:t>
             </a:r>
           </a:p>
@@ -3500,7 +3531,7 @@
             <a:fld id="{B61BEF0D-F0BB-DE4B-95CE-6DB70DBA9567}" type="datetimeFigureOut">
               <a:rPr lang="en-US" smtClean="0"/>
               <a:pPr/>
-              <a:t>4/27/2017</a:t>
+              <a:t>4/28/2017</a:t>
             </a:fld>
             <a:endParaRPr lang="en-US" dirty="0"/>
           </a:p>
@@ -3552,7 +3583,7 @@
     </p:spTree>
     <p:extLst>
       <p:ext uri="{BB962C8B-B14F-4D97-AF65-F5344CB8AC3E}">
-        <p14:creationId xmlns:p14="http://schemas.microsoft.com/office/powerpoint/2010/main" val="3478606997"/>
+        <p14:creationId xmlns:p14="http://schemas.microsoft.com/office/powerpoint/2010/main" val="23092998"/>
       </p:ext>
     </p:extLst>
   </p:cSld>
@@ -3595,7 +3626,7 @@
           <a:lstStyle/>
           <a:p>
             <a:r>
-              <a:rPr lang="en-US"/>
+              <a:rPr lang="en-US" smtClean="0"/>
               <a:t>Click to edit Master title style</a:t>
             </a:r>
             <a:endParaRPr lang="en-US" dirty="0"/>
@@ -3619,35 +3650,35 @@
           <a:p>
             <a:pPr lvl="0"/>
             <a:r>
-              <a:rPr lang="en-US"/>
+              <a:rPr lang="en-US" smtClean="0"/>
               <a:t>Edit Master text styles</a:t>
             </a:r>
           </a:p>
           <a:p>
             <a:pPr lvl="1"/>
             <a:r>
-              <a:rPr lang="en-US"/>
+              <a:rPr lang="en-US" smtClean="0"/>
               <a:t>Second level</a:t>
             </a:r>
           </a:p>
           <a:p>
             <a:pPr lvl="2"/>
             <a:r>
-              <a:rPr lang="en-US"/>
+              <a:rPr lang="en-US" smtClean="0"/>
               <a:t>Third level</a:t>
             </a:r>
           </a:p>
           <a:p>
             <a:pPr lvl="3"/>
             <a:r>
-              <a:rPr lang="en-US"/>
+              <a:rPr lang="en-US" smtClean="0"/>
               <a:t>Fourth level</a:t>
             </a:r>
           </a:p>
           <a:p>
             <a:pPr lvl="4"/>
             <a:r>
-              <a:rPr lang="en-US"/>
+              <a:rPr lang="en-US" smtClean="0"/>
               <a:t>Fifth level</a:t>
             </a:r>
             <a:endParaRPr lang="en-US" dirty="0"/>
@@ -3672,7 +3703,7 @@
             <a:fld id="{B61BEF0D-F0BB-DE4B-95CE-6DB70DBA9567}" type="datetimeFigureOut">
               <a:rPr lang="en-US" smtClean="0"/>
               <a:pPr/>
-              <a:t>4/27/2017</a:t>
+              <a:t>4/28/2017</a:t>
             </a:fld>
             <a:endParaRPr lang="en-US" dirty="0"/>
           </a:p>
@@ -3724,7 +3755,7 @@
     </p:spTree>
     <p:extLst>
       <p:ext uri="{BB962C8B-B14F-4D97-AF65-F5344CB8AC3E}">
-        <p14:creationId xmlns:p14="http://schemas.microsoft.com/office/powerpoint/2010/main" val="3400625952"/>
+        <p14:creationId xmlns:p14="http://schemas.microsoft.com/office/powerpoint/2010/main" val="1335116197"/>
       </p:ext>
     </p:extLst>
   </p:cSld>
@@ -3772,7 +3803,7 @@
           <a:lstStyle/>
           <a:p>
             <a:r>
-              <a:rPr lang="en-US"/>
+              <a:rPr lang="en-US" smtClean="0"/>
               <a:t>Click to edit Master title style</a:t>
             </a:r>
             <a:endParaRPr lang="en-US" dirty="0"/>
@@ -3801,35 +3832,35 @@
           <a:p>
             <a:pPr lvl="0"/>
             <a:r>
-              <a:rPr lang="en-US"/>
+              <a:rPr lang="en-US" smtClean="0"/>
               <a:t>Edit Master text styles</a:t>
             </a:r>
           </a:p>
           <a:p>
             <a:pPr lvl="1"/>
             <a:r>
-              <a:rPr lang="en-US"/>
+              <a:rPr lang="en-US" smtClean="0"/>
               <a:t>Second level</a:t>
             </a:r>
           </a:p>
           <a:p>
             <a:pPr lvl="2"/>
             <a:r>
-              <a:rPr lang="en-US"/>
+              <a:rPr lang="en-US" smtClean="0"/>
               <a:t>Third level</a:t>
             </a:r>
           </a:p>
           <a:p>
             <a:pPr lvl="3"/>
             <a:r>
-              <a:rPr lang="en-US"/>
+              <a:rPr lang="en-US" smtClean="0"/>
               <a:t>Fourth level</a:t>
             </a:r>
           </a:p>
           <a:p>
             <a:pPr lvl="4"/>
             <a:r>
-              <a:rPr lang="en-US"/>
+              <a:rPr lang="en-US" smtClean="0"/>
               <a:t>Fifth level</a:t>
             </a:r>
             <a:endParaRPr lang="en-US" dirty="0"/>
@@ -3854,7 +3885,7 @@
             <a:fld id="{B61BEF0D-F0BB-DE4B-95CE-6DB70DBA9567}" type="datetimeFigureOut">
               <a:rPr lang="en-US" smtClean="0"/>
               <a:pPr/>
-              <a:t>4/27/2017</a:t>
+              <a:t>4/28/2017</a:t>
             </a:fld>
             <a:endParaRPr lang="en-US" dirty="0"/>
           </a:p>
@@ -3906,7 +3937,7 @@
     </p:spTree>
     <p:extLst>
       <p:ext uri="{BB962C8B-B14F-4D97-AF65-F5344CB8AC3E}">
-        <p14:creationId xmlns:p14="http://schemas.microsoft.com/office/powerpoint/2010/main" val="1138777531"/>
+        <p14:creationId xmlns:p14="http://schemas.microsoft.com/office/powerpoint/2010/main" val="3005650068"/>
       </p:ext>
     </p:extLst>
   </p:cSld>
@@ -3949,7 +3980,7 @@
           <a:lstStyle/>
           <a:p>
             <a:r>
-              <a:rPr lang="en-US"/>
+              <a:rPr lang="en-US" smtClean="0"/>
               <a:t>Click to edit Master title style</a:t>
             </a:r>
             <a:endParaRPr lang="en-US" dirty="0"/>
@@ -3973,35 +4004,35 @@
           <a:p>
             <a:pPr lvl="0"/>
             <a:r>
-              <a:rPr lang="en-US"/>
+              <a:rPr lang="en-US" smtClean="0"/>
               <a:t>Edit Master text styles</a:t>
             </a:r>
           </a:p>
           <a:p>
             <a:pPr lvl="1"/>
             <a:r>
-              <a:rPr lang="en-US"/>
+              <a:rPr lang="en-US" smtClean="0"/>
               <a:t>Second level</a:t>
             </a:r>
           </a:p>
           <a:p>
             <a:pPr lvl="2"/>
             <a:r>
-              <a:rPr lang="en-US"/>
+              <a:rPr lang="en-US" smtClean="0"/>
               <a:t>Third level</a:t>
             </a:r>
           </a:p>
           <a:p>
             <a:pPr lvl="3"/>
             <a:r>
-              <a:rPr lang="en-US"/>
+              <a:rPr lang="en-US" smtClean="0"/>
               <a:t>Fourth level</a:t>
             </a:r>
           </a:p>
           <a:p>
             <a:pPr lvl="4"/>
             <a:r>
-              <a:rPr lang="en-US"/>
+              <a:rPr lang="en-US" smtClean="0"/>
               <a:t>Fifth level</a:t>
             </a:r>
             <a:endParaRPr lang="en-US" dirty="0"/>
@@ -4026,7 +4057,7 @@
             <a:fld id="{B61BEF0D-F0BB-DE4B-95CE-6DB70DBA9567}" type="datetimeFigureOut">
               <a:rPr lang="en-US" smtClean="0"/>
               <a:pPr/>
-              <a:t>4/27/2017</a:t>
+              <a:t>4/28/2017</a:t>
             </a:fld>
             <a:endParaRPr lang="en-US" dirty="0"/>
           </a:p>
@@ -4078,7 +4109,7 @@
     </p:spTree>
     <p:extLst>
       <p:ext uri="{BB962C8B-B14F-4D97-AF65-F5344CB8AC3E}">
-        <p14:creationId xmlns:p14="http://schemas.microsoft.com/office/powerpoint/2010/main" val="1629432887"/>
+        <p14:creationId xmlns:p14="http://schemas.microsoft.com/office/powerpoint/2010/main" val="1880243986"/>
       </p:ext>
     </p:extLst>
   </p:cSld>
@@ -4130,7 +4161,7 @@
           </a:lstStyle>
           <a:p>
             <a:r>
-              <a:rPr lang="en-US"/>
+              <a:rPr lang="en-US" smtClean="0"/>
               <a:t>Click to edit Master title style</a:t>
             </a:r>
             <a:endParaRPr lang="en-US" dirty="0"/>
@@ -4251,7 +4282,7 @@
           <a:p>
             <a:pPr lvl="0"/>
             <a:r>
-              <a:rPr lang="en-US"/>
+              <a:rPr lang="en-US" smtClean="0"/>
               <a:t>Edit Master text styles</a:t>
             </a:r>
           </a:p>
@@ -4275,7 +4306,7 @@
             <a:fld id="{B61BEF0D-F0BB-DE4B-95CE-6DB70DBA9567}" type="datetimeFigureOut">
               <a:rPr lang="en-US" smtClean="0"/>
               <a:pPr/>
-              <a:t>4/27/2017</a:t>
+              <a:t>4/28/2017</a:t>
             </a:fld>
             <a:endParaRPr lang="en-US" dirty="0"/>
           </a:p>
@@ -4327,7 +4358,7 @@
     </p:spTree>
     <p:extLst>
       <p:ext uri="{BB962C8B-B14F-4D97-AF65-F5344CB8AC3E}">
-        <p14:creationId xmlns:p14="http://schemas.microsoft.com/office/powerpoint/2010/main" val="1955806731"/>
+        <p14:creationId xmlns:p14="http://schemas.microsoft.com/office/powerpoint/2010/main" val="4186417535"/>
       </p:ext>
     </p:extLst>
   </p:cSld>
@@ -4370,7 +4401,7 @@
           <a:lstStyle/>
           <a:p>
             <a:r>
-              <a:rPr lang="en-US"/>
+              <a:rPr lang="en-US" smtClean="0"/>
               <a:t>Click to edit Master title style</a:t>
             </a:r>
             <a:endParaRPr lang="en-US" dirty="0"/>
@@ -4399,35 +4430,35 @@
           <a:p>
             <a:pPr lvl="0"/>
             <a:r>
-              <a:rPr lang="en-US"/>
+              <a:rPr lang="en-US" smtClean="0"/>
               <a:t>Edit Master text styles</a:t>
             </a:r>
           </a:p>
           <a:p>
             <a:pPr lvl="1"/>
             <a:r>
-              <a:rPr lang="en-US"/>
+              <a:rPr lang="en-US" smtClean="0"/>
               <a:t>Second level</a:t>
             </a:r>
           </a:p>
           <a:p>
             <a:pPr lvl="2"/>
             <a:r>
-              <a:rPr lang="en-US"/>
+              <a:rPr lang="en-US" smtClean="0"/>
               <a:t>Third level</a:t>
             </a:r>
           </a:p>
           <a:p>
             <a:pPr lvl="3"/>
             <a:r>
-              <a:rPr lang="en-US"/>
+              <a:rPr lang="en-US" smtClean="0"/>
               <a:t>Fourth level</a:t>
             </a:r>
           </a:p>
           <a:p>
             <a:pPr lvl="4"/>
             <a:r>
-              <a:rPr lang="en-US"/>
+              <a:rPr lang="en-US" smtClean="0"/>
               <a:t>Fifth level</a:t>
             </a:r>
             <a:endParaRPr lang="en-US" dirty="0"/>
@@ -4456,35 +4487,35 @@
           <a:p>
             <a:pPr lvl="0"/>
             <a:r>
-              <a:rPr lang="en-US"/>
+              <a:rPr lang="en-US" smtClean="0"/>
               <a:t>Edit Master text styles</a:t>
             </a:r>
           </a:p>
           <a:p>
             <a:pPr lvl="1"/>
             <a:r>
-              <a:rPr lang="en-US"/>
+              <a:rPr lang="en-US" smtClean="0"/>
               <a:t>Second level</a:t>
             </a:r>
           </a:p>
           <a:p>
             <a:pPr lvl="2"/>
             <a:r>
-              <a:rPr lang="en-US"/>
+              <a:rPr lang="en-US" smtClean="0"/>
               <a:t>Third level</a:t>
             </a:r>
           </a:p>
           <a:p>
             <a:pPr lvl="3"/>
             <a:r>
-              <a:rPr lang="en-US"/>
+              <a:rPr lang="en-US" smtClean="0"/>
               <a:t>Fourth level</a:t>
             </a:r>
           </a:p>
           <a:p>
             <a:pPr lvl="4"/>
             <a:r>
-              <a:rPr lang="en-US"/>
+              <a:rPr lang="en-US" smtClean="0"/>
               <a:t>Fifth level</a:t>
             </a:r>
             <a:endParaRPr lang="en-US" dirty="0"/>
@@ -4509,7 +4540,7 @@
             <a:fld id="{B61BEF0D-F0BB-DE4B-95CE-6DB70DBA9567}" type="datetimeFigureOut">
               <a:rPr lang="en-US" smtClean="0"/>
               <a:pPr/>
-              <a:t>4/27/2017</a:t>
+              <a:t>4/28/2017</a:t>
             </a:fld>
             <a:endParaRPr lang="en-US" dirty="0"/>
           </a:p>
@@ -4561,7 +4592,7 @@
     </p:spTree>
     <p:extLst>
       <p:ext uri="{BB962C8B-B14F-4D97-AF65-F5344CB8AC3E}">
-        <p14:creationId xmlns:p14="http://schemas.microsoft.com/office/powerpoint/2010/main" val="1578384660"/>
+        <p14:creationId xmlns:p14="http://schemas.microsoft.com/office/powerpoint/2010/main" val="3920120635"/>
       </p:ext>
     </p:extLst>
   </p:cSld>
@@ -4608,7 +4639,7 @@
           </a:lstStyle>
           <a:p>
             <a:r>
-              <a:rPr lang="en-US"/>
+              <a:rPr lang="en-US" smtClean="0"/>
               <a:t>Click to edit Master title style</a:t>
             </a:r>
             <a:endParaRPr lang="en-US" dirty="0"/>
@@ -4676,7 +4707,7 @@
           <a:p>
             <a:pPr lvl="0"/>
             <a:r>
-              <a:rPr lang="en-US"/>
+              <a:rPr lang="en-US" smtClean="0"/>
               <a:t>Edit Master text styles</a:t>
             </a:r>
           </a:p>
@@ -4706,35 +4737,35 @@
           <a:p>
             <a:pPr lvl="0"/>
             <a:r>
-              <a:rPr lang="en-US"/>
+              <a:rPr lang="en-US" smtClean="0"/>
               <a:t>Edit Master text styles</a:t>
             </a:r>
           </a:p>
           <a:p>
             <a:pPr lvl="1"/>
             <a:r>
-              <a:rPr lang="en-US"/>
+              <a:rPr lang="en-US" smtClean="0"/>
               <a:t>Second level</a:t>
             </a:r>
           </a:p>
           <a:p>
             <a:pPr lvl="2"/>
             <a:r>
-              <a:rPr lang="en-US"/>
+              <a:rPr lang="en-US" smtClean="0"/>
               <a:t>Third level</a:t>
             </a:r>
           </a:p>
           <a:p>
             <a:pPr lvl="3"/>
             <a:r>
-              <a:rPr lang="en-US"/>
+              <a:rPr lang="en-US" smtClean="0"/>
               <a:t>Fourth level</a:t>
             </a:r>
           </a:p>
           <a:p>
             <a:pPr lvl="4"/>
             <a:r>
-              <a:rPr lang="en-US"/>
+              <a:rPr lang="en-US" smtClean="0"/>
               <a:t>Fifth level</a:t>
             </a:r>
             <a:endParaRPr lang="en-US" dirty="0"/>
@@ -4802,7 +4833,7 @@
           <a:p>
             <a:pPr lvl="0"/>
             <a:r>
-              <a:rPr lang="en-US"/>
+              <a:rPr lang="en-US" smtClean="0"/>
               <a:t>Edit Master text styles</a:t>
             </a:r>
           </a:p>
@@ -4832,35 +4863,35 @@
           <a:p>
             <a:pPr lvl="0"/>
             <a:r>
-              <a:rPr lang="en-US"/>
+              <a:rPr lang="en-US" smtClean="0"/>
               <a:t>Edit Master text styles</a:t>
             </a:r>
           </a:p>
           <a:p>
             <a:pPr lvl="1"/>
             <a:r>
-              <a:rPr lang="en-US"/>
+              <a:rPr lang="en-US" smtClean="0"/>
               <a:t>Second level</a:t>
             </a:r>
           </a:p>
           <a:p>
             <a:pPr lvl="2"/>
             <a:r>
-              <a:rPr lang="en-US"/>
+              <a:rPr lang="en-US" smtClean="0"/>
               <a:t>Third level</a:t>
             </a:r>
           </a:p>
           <a:p>
             <a:pPr lvl="3"/>
             <a:r>
-              <a:rPr lang="en-US"/>
+              <a:rPr lang="en-US" smtClean="0"/>
               <a:t>Fourth level</a:t>
             </a:r>
           </a:p>
           <a:p>
             <a:pPr lvl="4"/>
             <a:r>
-              <a:rPr lang="en-US"/>
+              <a:rPr lang="en-US" smtClean="0"/>
               <a:t>Fifth level</a:t>
             </a:r>
             <a:endParaRPr lang="en-US" dirty="0"/>
@@ -4885,7 +4916,7 @@
             <a:fld id="{B61BEF0D-F0BB-DE4B-95CE-6DB70DBA9567}" type="datetimeFigureOut">
               <a:rPr lang="en-US" smtClean="0"/>
               <a:pPr/>
-              <a:t>4/27/2017</a:t>
+              <a:t>4/28/2017</a:t>
             </a:fld>
             <a:endParaRPr lang="en-US" dirty="0"/>
           </a:p>
@@ -4937,7 +4968,7 @@
     </p:spTree>
     <p:extLst>
       <p:ext uri="{BB962C8B-B14F-4D97-AF65-F5344CB8AC3E}">
-        <p14:creationId xmlns:p14="http://schemas.microsoft.com/office/powerpoint/2010/main" val="3433984599"/>
+        <p14:creationId xmlns:p14="http://schemas.microsoft.com/office/powerpoint/2010/main" val="2591093632"/>
       </p:ext>
     </p:extLst>
   </p:cSld>
@@ -4985,7 +5016,7 @@
           <a:lstStyle/>
           <a:p>
             <a:r>
-              <a:rPr lang="en-US"/>
+              <a:rPr lang="en-US" smtClean="0"/>
               <a:t>Click to edit Master title style</a:t>
             </a:r>
             <a:endParaRPr lang="en-US" dirty="0"/>
@@ -5010,7 +5041,7 @@
             <a:fld id="{B61BEF0D-F0BB-DE4B-95CE-6DB70DBA9567}" type="datetimeFigureOut">
               <a:rPr lang="en-US" smtClean="0"/>
               <a:pPr/>
-              <a:t>4/27/2017</a:t>
+              <a:t>4/28/2017</a:t>
             </a:fld>
             <a:endParaRPr lang="en-US" dirty="0"/>
           </a:p>
@@ -5062,7 +5093,7 @@
     </p:spTree>
     <p:extLst>
       <p:ext uri="{BB962C8B-B14F-4D97-AF65-F5344CB8AC3E}">
-        <p14:creationId xmlns:p14="http://schemas.microsoft.com/office/powerpoint/2010/main" val="631465891"/>
+        <p14:creationId xmlns:p14="http://schemas.microsoft.com/office/powerpoint/2010/main" val="3433031044"/>
       </p:ext>
     </p:extLst>
   </p:cSld>
@@ -5107,7 +5138,7 @@
             <a:fld id="{B61BEF0D-F0BB-DE4B-95CE-6DB70DBA9567}" type="datetimeFigureOut">
               <a:rPr lang="en-US" smtClean="0"/>
               <a:pPr/>
-              <a:t>4/27/2017</a:t>
+              <a:t>4/28/2017</a:t>
             </a:fld>
             <a:endParaRPr lang="en-US" dirty="0"/>
           </a:p>
@@ -5159,7 +5190,7 @@
     </p:spTree>
     <p:extLst>
       <p:ext uri="{BB962C8B-B14F-4D97-AF65-F5344CB8AC3E}">
-        <p14:creationId xmlns:p14="http://schemas.microsoft.com/office/powerpoint/2010/main" val="322910978"/>
+        <p14:creationId xmlns:p14="http://schemas.microsoft.com/office/powerpoint/2010/main" val="1703375823"/>
       </p:ext>
     </p:extLst>
   </p:cSld>
@@ -5213,7 +5244,7 @@
           </a:lstStyle>
           <a:p>
             <a:r>
-              <a:rPr lang="en-US"/>
+              <a:rPr lang="en-US" smtClean="0"/>
               <a:t>Click to edit Master title style</a:t>
             </a:r>
             <a:endParaRPr lang="en-US" dirty="0"/>
@@ -5244,35 +5275,35 @@
           <a:p>
             <a:pPr lvl="0"/>
             <a:r>
-              <a:rPr lang="en-US"/>
+              <a:rPr lang="en-US" smtClean="0"/>
               <a:t>Edit Master text styles</a:t>
             </a:r>
           </a:p>
           <a:p>
             <a:pPr lvl="1"/>
             <a:r>
-              <a:rPr lang="en-US"/>
+              <a:rPr lang="en-US" smtClean="0"/>
               <a:t>Second level</a:t>
             </a:r>
           </a:p>
           <a:p>
             <a:pPr lvl="2"/>
             <a:r>
-              <a:rPr lang="en-US"/>
+              <a:rPr lang="en-US" smtClean="0"/>
               <a:t>Third level</a:t>
             </a:r>
           </a:p>
           <a:p>
             <a:pPr lvl="3"/>
             <a:r>
-              <a:rPr lang="en-US"/>
+              <a:rPr lang="en-US" smtClean="0"/>
               <a:t>Fourth level</a:t>
             </a:r>
           </a:p>
           <a:p>
             <a:pPr lvl="4"/>
             <a:r>
-              <a:rPr lang="en-US"/>
+              <a:rPr lang="en-US" smtClean="0"/>
               <a:t>Fifth level</a:t>
             </a:r>
             <a:endParaRPr lang="en-US" dirty="0"/>
@@ -5340,7 +5371,7 @@
           <a:p>
             <a:pPr lvl="0"/>
             <a:r>
-              <a:rPr lang="en-US"/>
+              <a:rPr lang="en-US" smtClean="0"/>
               <a:t>Edit Master text styles</a:t>
             </a:r>
           </a:p>
@@ -5364,7 +5395,7 @@
             <a:fld id="{B61BEF0D-F0BB-DE4B-95CE-6DB70DBA9567}" type="datetimeFigureOut">
               <a:rPr lang="en-US" smtClean="0"/>
               <a:pPr/>
-              <a:t>4/27/2017</a:t>
+              <a:t>4/28/2017</a:t>
             </a:fld>
             <a:endParaRPr lang="en-US" dirty="0"/>
           </a:p>
@@ -5416,7 +5447,7 @@
     </p:spTree>
     <p:extLst>
       <p:ext uri="{BB962C8B-B14F-4D97-AF65-F5344CB8AC3E}">
-        <p14:creationId xmlns:p14="http://schemas.microsoft.com/office/powerpoint/2010/main" val="1019157461"/>
+        <p14:creationId xmlns:p14="http://schemas.microsoft.com/office/powerpoint/2010/main" val="1157020542"/>
       </p:ext>
     </p:extLst>
   </p:cSld>
@@ -5470,7 +5501,7 @@
           </a:lstStyle>
           <a:p>
             <a:r>
-              <a:rPr lang="en-US"/>
+              <a:rPr lang="en-US" smtClean="0"/>
               <a:t>Click to edit Master title style</a:t>
             </a:r>
             <a:endParaRPr lang="en-US" dirty="0"/>
@@ -5537,7 +5568,7 @@
           </a:lstStyle>
           <a:p>
             <a:r>
-              <a:rPr lang="en-US"/>
+              <a:rPr lang="en-US" smtClean="0"/>
               <a:t>Click icon to add picture</a:t>
             </a:r>
             <a:endParaRPr lang="en-US" dirty="0"/>
@@ -5605,33 +5636,9 @@
           <a:p>
             <a:pPr lvl="0"/>
             <a:r>
-              <a:rPr lang="en-US"/>
+              <a:rPr lang="en-US" smtClean="0"/>
               <a:t>Edit Master text styles</a:t>
             </a:r>
-          </a:p>
-        </p:txBody>
-      </p:sp>
-      <p:sp>
-        <p:nvSpPr>
-          <p:cNvPr id="5" name="Date Placeholder 4"/>
-          <p:cNvSpPr>
-            <a:spLocks noGrp="1"/>
-          </p:cNvSpPr>
-          <p:nvPr>
-            <p:ph type="dt" sz="half" idx="10"/>
-          </p:nvPr>
-        </p:nvSpPr>
-        <p:spPr/>
-        <p:txBody>
-          <a:bodyPr/>
-          <a:lstStyle/>
-          <a:p>
-            <a:fld id="{B61BEF0D-F0BB-DE4B-95CE-6DB70DBA9567}" type="datetimeFigureOut">
-              <a:rPr lang="en-US" smtClean="0"/>
-              <a:pPr/>
-              <a:t>4/27/2017</a:t>
-            </a:fld>
-            <a:endParaRPr lang="en-US" dirty="0"/>
           </a:p>
         </p:txBody>
       </p:sp>
@@ -5678,10 +5685,34 @@
           </a:p>
         </p:txBody>
       </p:sp>
+      <p:sp>
+        <p:nvSpPr>
+          <p:cNvPr id="5" name="Date Placeholder 4"/>
+          <p:cNvSpPr>
+            <a:spLocks noGrp="1"/>
+          </p:cNvSpPr>
+          <p:nvPr>
+            <p:ph type="dt" sz="half" idx="10"/>
+          </p:nvPr>
+        </p:nvSpPr>
+        <p:spPr/>
+        <p:txBody>
+          <a:bodyPr/>
+          <a:lstStyle/>
+          <a:p>
+            <a:fld id="{B61BEF0D-F0BB-DE4B-95CE-6DB70DBA9567}" type="datetimeFigureOut">
+              <a:rPr lang="en-US" smtClean="0"/>
+              <a:pPr/>
+              <a:t>4/28/2017</a:t>
+            </a:fld>
+            <a:endParaRPr lang="en-US" dirty="0"/>
+          </a:p>
+        </p:txBody>
+      </p:sp>
     </p:spTree>
     <p:extLst>
       <p:ext uri="{BB962C8B-B14F-4D97-AF65-F5344CB8AC3E}">
-        <p14:creationId xmlns:p14="http://schemas.microsoft.com/office/powerpoint/2010/main" val="3170600146"/>
+        <p14:creationId xmlns:p14="http://schemas.microsoft.com/office/powerpoint/2010/main" val="3819197650"/>
       </p:ext>
     </p:extLst>
   </p:cSld>
@@ -5715,7 +5746,7 @@
       </p:grpSpPr>
       <p:grpSp>
         <p:nvGrpSpPr>
-          <p:cNvPr id="29" name="Group 28"/>
+          <p:cNvPr id="44" name="Group 43"/>
           <p:cNvGrpSpPr/>
           <p:nvPr/>
         </p:nvGrpSpPr>
@@ -5729,7 +5760,7 @@
         </p:grpSpPr>
         <p:cxnSp>
           <p:nvCxnSpPr>
-            <p:cNvPr id="19" name="Straight Connector 18"/>
+            <p:cNvPr id="20" name="Straight Connector 19"/>
             <p:cNvCxnSpPr/>
             <p:nvPr/>
           </p:nvCxnSpPr>
@@ -5766,7 +5797,7 @@
         </p:cxnSp>
         <p:cxnSp>
           <p:nvCxnSpPr>
-            <p:cNvPr id="20" name="Straight Connector 19"/>
+            <p:cNvPr id="21" name="Straight Connector 20"/>
             <p:cNvCxnSpPr/>
             <p:nvPr/>
           </p:nvCxnSpPr>
@@ -5803,7 +5834,7 @@
         </p:cxnSp>
         <p:sp>
           <p:nvSpPr>
-            <p:cNvPr id="21" name="Rectangle 23"/>
+            <p:cNvPr id="22" name="Rectangle 23"/>
             <p:cNvSpPr/>
             <p:nvPr/>
           </p:nvSpPr>
@@ -5866,7 +5897,7 @@
         </p:sp>
         <p:sp>
           <p:nvSpPr>
-            <p:cNvPr id="22" name="Rectangle 25"/>
+            <p:cNvPr id="23" name="Rectangle 25"/>
             <p:cNvSpPr/>
             <p:nvPr/>
           </p:nvSpPr>
@@ -5929,7 +5960,7 @@
         </p:sp>
         <p:sp>
           <p:nvSpPr>
-            <p:cNvPr id="23" name="Isosceles Triangle 22"/>
+            <p:cNvPr id="24" name="Isosceles Triangle 23"/>
             <p:cNvSpPr/>
             <p:nvPr/>
           </p:nvSpPr>
@@ -5945,7 +5976,8 @@
             </a:prstGeom>
             <a:solidFill>
               <a:schemeClr val="accent1">
-                <a:alpha val="72000"/>
+                <a:lumMod val="75000"/>
+                <a:alpha val="66000"/>
               </a:schemeClr>
             </a:solidFill>
             <a:ln>
@@ -5970,7 +6002,7 @@
         </p:sp>
         <p:sp>
           <p:nvSpPr>
-            <p:cNvPr id="24" name="Rectangle 27"/>
+            <p:cNvPr id="25" name="Rectangle 27"/>
             <p:cNvSpPr/>
             <p:nvPr/>
           </p:nvSpPr>
@@ -6034,7 +6066,7 @@
         </p:sp>
         <p:sp>
           <p:nvSpPr>
-            <p:cNvPr id="25" name="Rectangle 28"/>
+            <p:cNvPr id="26" name="Rectangle 28"/>
             <p:cNvSpPr/>
             <p:nvPr/>
           </p:nvSpPr>
@@ -6071,8 +6103,7 @@
               </a:pathLst>
             </a:custGeom>
             <a:solidFill>
-              <a:schemeClr val="accent1">
-                <a:lumMod val="75000"/>
+              <a:schemeClr val="accent2">
                 <a:alpha val="70000"/>
               </a:schemeClr>
             </a:solidFill>
@@ -6098,7 +6129,7 @@
         </p:sp>
         <p:sp>
           <p:nvSpPr>
-            <p:cNvPr id="26" name="Rectangle 29"/>
+            <p:cNvPr id="27" name="Rectangle 29"/>
             <p:cNvSpPr/>
             <p:nvPr/>
           </p:nvSpPr>
@@ -6135,51 +6166,9 @@
               </a:pathLst>
             </a:custGeom>
             <a:solidFill>
-              <a:schemeClr val="accent1">
-                <a:lumMod val="50000"/>
+              <a:schemeClr val="accent2">
+                <a:lumMod val="75000"/>
                 <a:alpha val="80000"/>
-              </a:schemeClr>
-            </a:solidFill>
-            <a:ln>
-              <a:noFill/>
-            </a:ln>
-            <a:effectLst/>
-          </p:spPr>
-          <p:style>
-            <a:lnRef idx="1">
-              <a:schemeClr val="accent1"/>
-            </a:lnRef>
-            <a:fillRef idx="3">
-              <a:schemeClr val="accent1"/>
-            </a:fillRef>
-            <a:effectRef idx="2">
-              <a:schemeClr val="accent1"/>
-            </a:effectRef>
-            <a:fontRef idx="minor">
-              <a:schemeClr val="lt1"/>
-            </a:fontRef>
-          </p:style>
-        </p:sp>
-        <p:sp>
-          <p:nvSpPr>
-            <p:cNvPr id="27" name="Isosceles Triangle 26"/>
-            <p:cNvSpPr/>
-            <p:nvPr/>
-          </p:nvSpPr>
-          <p:spPr>
-            <a:xfrm>
-              <a:off x="10371666" y="3589867"/>
-              <a:ext cx="1817159" cy="3268133"/>
-            </a:xfrm>
-            <a:prstGeom prst="triangle">
-              <a:avLst>
-                <a:gd name="adj" fmla="val 100000"/>
-              </a:avLst>
-            </a:prstGeom>
-            <a:solidFill>
-              <a:schemeClr val="accent1">
-                <a:lumMod val="50000"/>
-                <a:alpha val="66000"/>
               </a:schemeClr>
             </a:solidFill>
             <a:ln>
@@ -6210,6 +6199,48 @@
           </p:nvSpPr>
           <p:spPr>
             <a:xfrm>
+              <a:off x="10371666" y="3589867"/>
+              <a:ext cx="1817159" cy="3268133"/>
+            </a:xfrm>
+            <a:prstGeom prst="triangle">
+              <a:avLst>
+                <a:gd name="adj" fmla="val 100000"/>
+              </a:avLst>
+            </a:prstGeom>
+            <a:solidFill>
+              <a:schemeClr val="accent1">
+                <a:lumMod val="75000"/>
+                <a:alpha val="66000"/>
+              </a:schemeClr>
+            </a:solidFill>
+            <a:ln>
+              <a:noFill/>
+            </a:ln>
+            <a:effectLst/>
+          </p:spPr>
+          <p:style>
+            <a:lnRef idx="1">
+              <a:schemeClr val="accent1"/>
+            </a:lnRef>
+            <a:fillRef idx="3">
+              <a:schemeClr val="accent1"/>
+            </a:fillRef>
+            <a:effectRef idx="2">
+              <a:schemeClr val="accent1"/>
+            </a:effectRef>
+            <a:fontRef idx="minor">
+              <a:schemeClr val="lt1"/>
+            </a:fontRef>
+          </p:style>
+        </p:sp>
+        <p:sp>
+          <p:nvSpPr>
+            <p:cNvPr id="19" name="Isosceles Triangle 18"/>
+            <p:cNvSpPr/>
+            <p:nvPr/>
+          </p:nvSpPr>
+          <p:spPr>
+            <a:xfrm>
               <a:off x="0" y="4013200"/>
               <a:ext cx="448733" cy="2844800"/>
             </a:xfrm>
@@ -6220,7 +6251,6 @@
             </a:prstGeom>
             <a:solidFill>
               <a:schemeClr val="accent1">
-                <a:lumMod val="75000"/>
                 <a:alpha val="70000"/>
               </a:schemeClr>
             </a:solidFill>
@@ -6271,7 +6301,7 @@
           <a:lstStyle/>
           <a:p>
             <a:r>
-              <a:rPr lang="en-US"/>
+              <a:rPr lang="en-US" smtClean="0"/>
               <a:t>Click to edit Master title style</a:t>
             </a:r>
             <a:endParaRPr lang="en-US" dirty="0"/>
@@ -6305,35 +6335,35 @@
           <a:p>
             <a:pPr lvl="0"/>
             <a:r>
-              <a:rPr lang="en-US"/>
+              <a:rPr lang="en-US" smtClean="0"/>
               <a:t>Edit Master text styles</a:t>
             </a:r>
           </a:p>
           <a:p>
             <a:pPr lvl="1"/>
             <a:r>
-              <a:rPr lang="en-US"/>
+              <a:rPr lang="en-US" smtClean="0"/>
               <a:t>Second level</a:t>
             </a:r>
           </a:p>
           <a:p>
             <a:pPr lvl="2"/>
             <a:r>
-              <a:rPr lang="en-US"/>
+              <a:rPr lang="en-US" smtClean="0"/>
               <a:t>Third level</a:t>
             </a:r>
           </a:p>
           <a:p>
             <a:pPr lvl="3"/>
             <a:r>
-              <a:rPr lang="en-US"/>
+              <a:rPr lang="en-US" smtClean="0"/>
               <a:t>Fourth level</a:t>
             </a:r>
           </a:p>
           <a:p>
             <a:pPr lvl="4"/>
             <a:r>
-              <a:rPr lang="en-US"/>
+              <a:rPr lang="en-US" smtClean="0"/>
               <a:t>Fifth level</a:t>
             </a:r>
             <a:endParaRPr lang="en-US" dirty="0"/>
@@ -6376,7 +6406,7 @@
             <a:fld id="{B61BEF0D-F0BB-DE4B-95CE-6DB70DBA9567}" type="datetimeFigureOut">
               <a:rPr lang="en-US" smtClean="0"/>
               <a:pPr/>
-              <a:t>4/27/2017</a:t>
+              <a:t>4/28/2017</a:t>
             </a:fld>
             <a:endParaRPr lang="en-US" dirty="0"/>
           </a:p>
@@ -6444,9 +6474,7 @@
             <a:lvl1pPr algn="r">
               <a:defRPr sz="900">
                 <a:solidFill>
-                  <a:schemeClr val="accent1">
-                    <a:lumMod val="75000"/>
-                  </a:schemeClr>
+                  <a:schemeClr val="accent1"/>
                 </a:solidFill>
               </a:defRPr>
             </a:lvl1pPr>
@@ -6464,28 +6492,28 @@
     </p:spTree>
     <p:extLst>
       <p:ext uri="{BB962C8B-B14F-4D97-AF65-F5344CB8AC3E}">
-        <p14:creationId xmlns:p14="http://schemas.microsoft.com/office/powerpoint/2010/main" val="1561219043"/>
+        <p14:creationId xmlns:p14="http://schemas.microsoft.com/office/powerpoint/2010/main" val="540154431"/>
       </p:ext>
     </p:extLst>
   </p:cSld>
   <p:clrMap bg1="lt1" tx1="dk1" bg2="lt2" tx2="dk2" accent1="accent1" accent2="accent2" accent3="accent3" accent4="accent4" accent5="accent5" accent6="accent6" hlink="hlink" folHlink="folHlink"/>
   <p:sldLayoutIdLst>
-    <p:sldLayoutId id="2147483707" r:id="rId1"/>
-    <p:sldLayoutId id="2147483708" r:id="rId2"/>
-    <p:sldLayoutId id="2147483709" r:id="rId3"/>
-    <p:sldLayoutId id="2147483710" r:id="rId4"/>
-    <p:sldLayoutId id="2147483711" r:id="rId5"/>
-    <p:sldLayoutId id="2147483712" r:id="rId6"/>
-    <p:sldLayoutId id="2147483713" r:id="rId7"/>
-    <p:sldLayoutId id="2147483714" r:id="rId8"/>
-    <p:sldLayoutId id="2147483715" r:id="rId9"/>
-    <p:sldLayoutId id="2147483716" r:id="rId10"/>
-    <p:sldLayoutId id="2147483717" r:id="rId11"/>
-    <p:sldLayoutId id="2147483718" r:id="rId12"/>
-    <p:sldLayoutId id="2147483719" r:id="rId13"/>
-    <p:sldLayoutId id="2147483720" r:id="rId14"/>
-    <p:sldLayoutId id="2147483721" r:id="rId15"/>
-    <p:sldLayoutId id="2147483722" r:id="rId16"/>
+    <p:sldLayoutId id="2147483724" r:id="rId1"/>
+    <p:sldLayoutId id="2147483725" r:id="rId2"/>
+    <p:sldLayoutId id="2147483726" r:id="rId3"/>
+    <p:sldLayoutId id="2147483727" r:id="rId4"/>
+    <p:sldLayoutId id="2147483728" r:id="rId5"/>
+    <p:sldLayoutId id="2147483729" r:id="rId6"/>
+    <p:sldLayoutId id="2147483730" r:id="rId7"/>
+    <p:sldLayoutId id="2147483731" r:id="rId8"/>
+    <p:sldLayoutId id="2147483732" r:id="rId9"/>
+    <p:sldLayoutId id="2147483733" r:id="rId10"/>
+    <p:sldLayoutId id="2147483734" r:id="rId11"/>
+    <p:sldLayoutId id="2147483735" r:id="rId12"/>
+    <p:sldLayoutId id="2147483736" r:id="rId13"/>
+    <p:sldLayoutId id="2147483737" r:id="rId14"/>
+    <p:sldLayoutId id="2147483738" r:id="rId15"/>
+    <p:sldLayoutId id="2147483739" r:id="rId16"/>
   </p:sldLayoutIdLst>
   <p:txStyles>
     <p:titleStyle>
@@ -6496,9 +6524,7 @@
         <a:buNone/>
         <a:defRPr sz="3600" kern="1200">
           <a:solidFill>
-            <a:schemeClr val="accent1">
-              <a:lumMod val="75000"/>
-            </a:schemeClr>
+            <a:schemeClr val="accent1"/>
           </a:solidFill>
           <a:latin typeface="+mj-lt"/>
           <a:ea typeface="+mj-ea"/>
@@ -6571,9 +6597,7 @@
           <a:spcPts val="0"/>
         </a:spcAft>
         <a:buClr>
-          <a:schemeClr val="accent1">
-            <a:lumMod val="75000"/>
-          </a:schemeClr>
+          <a:schemeClr val="accent1"/>
         </a:buClr>
         <a:buSzPct val="80000"/>
         <a:buFont typeface="Wingdings 3" charset="2"/>
@@ -6598,9 +6622,7 @@
           <a:spcPts val="0"/>
         </a:spcAft>
         <a:buClr>
-          <a:schemeClr val="accent1">
-            <a:lumMod val="75000"/>
-          </a:schemeClr>
+          <a:schemeClr val="accent1"/>
         </a:buClr>
         <a:buSzPct val="80000"/>
         <a:buFont typeface="Wingdings 3" charset="2"/>
@@ -6625,9 +6647,7 @@
           <a:spcPts val="0"/>
         </a:spcAft>
         <a:buClr>
-          <a:schemeClr val="accent1">
-            <a:lumMod val="75000"/>
-          </a:schemeClr>
+          <a:schemeClr val="accent1"/>
         </a:buClr>
         <a:buSzPct val="80000"/>
         <a:buFont typeface="Wingdings 3" charset="2"/>
@@ -6652,9 +6672,7 @@
           <a:spcPts val="0"/>
         </a:spcAft>
         <a:buClr>
-          <a:schemeClr val="accent1">
-            <a:lumMod val="75000"/>
-          </a:schemeClr>
+          <a:schemeClr val="accent1"/>
         </a:buClr>
         <a:buSzPct val="80000"/>
         <a:buFont typeface="Wingdings 3" charset="2"/>
@@ -6679,9 +6697,7 @@
           <a:spcPts val="0"/>
         </a:spcAft>
         <a:buClr>
-          <a:schemeClr val="accent1">
-            <a:lumMod val="75000"/>
-          </a:schemeClr>
+          <a:schemeClr val="accent1"/>
         </a:buClr>
         <a:buSzPct val="80000"/>
         <a:buFont typeface="Wingdings 3" charset="2"/>
@@ -6706,9 +6722,7 @@
           <a:spcPts val="0"/>
         </a:spcAft>
         <a:buClr>
-          <a:schemeClr val="accent1">
-            <a:lumMod val="75000"/>
-          </a:schemeClr>
+          <a:schemeClr val="accent1"/>
         </a:buClr>
         <a:buSzPct val="80000"/>
         <a:buFont typeface="Wingdings 3" charset="2"/>
@@ -6733,9 +6747,7 @@
           <a:spcPts val="0"/>
         </a:spcAft>
         <a:buClr>
-          <a:schemeClr val="accent1">
-            <a:lumMod val="75000"/>
-          </a:schemeClr>
+          <a:schemeClr val="accent1"/>
         </a:buClr>
         <a:buSzPct val="80000"/>
         <a:buFont typeface="Wingdings 3" charset="2"/>
@@ -6760,9 +6772,7 @@
           <a:spcPts val="0"/>
         </a:spcAft>
         <a:buClr>
-          <a:schemeClr val="accent1">
-            <a:lumMod val="75000"/>
-          </a:schemeClr>
+          <a:schemeClr val="accent1"/>
         </a:buClr>
         <a:buSzPct val="80000"/>
         <a:buFont typeface="Wingdings 3" charset="2"/>
@@ -6787,9 +6797,7 @@
           <a:spcPts val="0"/>
         </a:spcAft>
         <a:buClr>
-          <a:schemeClr val="accent1">
-            <a:lumMod val="75000"/>
-          </a:schemeClr>
+          <a:schemeClr val="accent1"/>
         </a:buClr>
         <a:buSzPct val="80000"/>
         <a:buFont typeface="Wingdings 3" charset="2"/>
@@ -14370,28 +14378,28 @@
         <a:srgbClr val="EBEBEB"/>
       </a:lt2>
       <a:accent1>
-        <a:srgbClr val="F496CB"/>
+        <a:srgbClr val="5FCBEF"/>
       </a:accent1>
       <a:accent2>
-        <a:srgbClr val="BC356F"/>
+        <a:srgbClr val="2E83C3"/>
       </a:accent2>
       <a:accent3>
-        <a:srgbClr val="E65331"/>
+        <a:srgbClr val="42D0A2"/>
       </a:accent3>
       <a:accent4>
-        <a:srgbClr val="F27E19"/>
+        <a:srgbClr val="2E946B"/>
       </a:accent4>
       <a:accent5>
-        <a:srgbClr val="F2AC19"/>
+        <a:srgbClr val="42B051"/>
       </a:accent5>
       <a:accent6>
-        <a:srgbClr val="BC80E0"/>
+        <a:srgbClr val="96D141"/>
       </a:accent6>
       <a:hlink>
-        <a:srgbClr val="EF5285"/>
+        <a:srgbClr val="3FCDE7"/>
       </a:hlink>
       <a:folHlink>
-        <a:srgbClr val="F77F90"/>
+        <a:srgbClr val="A9D3E1"/>
       </a:folHlink>
     </a:clrScheme>
     <a:fontScheme name="Facet">
@@ -14604,7 +14612,7 @@
   <a:extraClrSchemeLst/>
   <a:extLst>
     <a:ext uri="{05A4C25C-085E-4340-85A3-A5531E510DB2}">
-      <thm15:themeFamily xmlns:thm15="http://schemas.microsoft.com/office/thememl/2012/main" name="Facet" id="{C0C680CD-088A-49FC-A102-D699147F32B2}" vid="{23659B44-6E34-4CE8-8F0D-387DA7996826}"/>
+      <thm15:themeFamily xmlns:thm15="http://schemas.microsoft.com/office/thememl/2012/main" name="Facet" id="{C0C680CD-088A-49FC-A102-D699147F32B2}" vid="{0B5AB586-D108-4FC1-8368-649FE654B894}"/>
     </a:ext>
   </a:extLst>
 </a:theme>

</xml_diff>

<commit_message>
Tweak colors on slide deck.
</commit_message>
<xml_diff>
--- a/AwesomeFreeSQLServerFeatures.pptx
+++ b/AwesomeFreeSQLServerFeatures.pptx
@@ -2,7 +2,7 @@
 <file path=ppt/presentation.xml><?xml version="1.0" encoding="utf-8"?>
 <p:presentation xmlns:a="http://schemas.openxmlformats.org/drawingml/2006/main" xmlns:r="http://schemas.openxmlformats.org/officeDocument/2006/relationships" xmlns:p="http://schemas.openxmlformats.org/presentationml/2006/main" autoCompressPictures="0">
   <p:sldMasterIdLst>
-    <p:sldMasterId id="2147483723" r:id="rId1"/>
+    <p:sldMasterId id="2147483791" r:id="rId1"/>
   </p:sldMasterIdLst>
   <p:notesMasterIdLst>
     <p:notesMasterId r:id="rId40"/>
@@ -150,6 +150,10 @@
     </p:ext>
   </p:extLst>
 </p:presentation>
+</file>
+
+<file path=ppt/revisionInfo.xml><?xml version="1.0" encoding="utf-8"?>
+<p1510:revInfo xmlns:a="http://schemas.openxmlformats.org/drawingml/2006/main" xmlns:r="http://schemas.openxmlformats.org/officeDocument/2006/relationships" xmlns:p1510="http://schemas.microsoft.com/office/powerpoint/2015/10/main"/>
 </file>
 
 <file path=ppt/notesMasters/notesMaster1.xml><?xml version="1.0" encoding="utf-8"?>
@@ -1771,7 +1775,7 @@
           </a:lstStyle>
           <a:p>
             <a:r>
-              <a:rPr lang="en-US" smtClean="0"/>
+              <a:rPr lang="en-US"/>
               <a:t>Click to edit Master title style</a:t>
             </a:r>
             <a:endParaRPr lang="en-US" dirty="0"/>
@@ -1891,7 +1895,7 @@
           </a:lstStyle>
           <a:p>
             <a:r>
-              <a:rPr lang="en-US" smtClean="0"/>
+              <a:rPr lang="en-US"/>
               <a:t>Click to edit Master subtitle style</a:t>
             </a:r>
             <a:endParaRPr lang="en-US" dirty="0"/>
@@ -1968,7 +1972,7 @@
     </p:spTree>
     <p:extLst>
       <p:ext uri="{BB962C8B-B14F-4D97-AF65-F5344CB8AC3E}">
-        <p14:creationId xmlns:p14="http://schemas.microsoft.com/office/powerpoint/2010/main" val="1972352245"/>
+        <p14:creationId xmlns:p14="http://schemas.microsoft.com/office/powerpoint/2010/main" val="2524671051"/>
       </p:ext>
     </p:extLst>
   </p:cSld>
@@ -2022,7 +2026,7 @@
           </a:lstStyle>
           <a:p>
             <a:r>
-              <a:rPr lang="en-US" smtClean="0"/>
+              <a:rPr lang="en-US"/>
               <a:t>Click to edit Master title style</a:t>
             </a:r>
             <a:endParaRPr lang="en-US" dirty="0"/>
@@ -2145,7 +2149,7 @@
           <a:p>
             <a:pPr lvl="0"/>
             <a:r>
-              <a:rPr lang="en-US" smtClean="0"/>
+              <a:rPr lang="en-US"/>
               <a:t>Edit Master text styles</a:t>
             </a:r>
           </a:p>
@@ -2221,7 +2225,7 @@
     </p:spTree>
     <p:extLst>
       <p:ext uri="{BB962C8B-B14F-4D97-AF65-F5344CB8AC3E}">
-        <p14:creationId xmlns:p14="http://schemas.microsoft.com/office/powerpoint/2010/main" val="2573534164"/>
+        <p14:creationId xmlns:p14="http://schemas.microsoft.com/office/powerpoint/2010/main" val="657215108"/>
       </p:ext>
     </p:extLst>
   </p:cSld>
@@ -2275,7 +2279,7 @@
           </a:lstStyle>
           <a:p>
             <a:r>
-              <a:rPr lang="en-US" smtClean="0"/>
+              <a:rPr lang="en-US"/>
               <a:t>Click to edit Master title style</a:t>
             </a:r>
             <a:endParaRPr lang="en-US" dirty="0"/>
@@ -2339,7 +2343,7 @@
           <a:p>
             <a:pPr lvl="0"/>
             <a:r>
-              <a:rPr lang="en-US" smtClean="0"/>
+              <a:rPr lang="en-US"/>
               <a:t>Edit Master text styles</a:t>
             </a:r>
           </a:p>
@@ -2461,7 +2465,7 @@
           <a:p>
             <a:pPr lvl="0"/>
             <a:r>
-              <a:rPr lang="en-US" smtClean="0"/>
+              <a:rPr lang="en-US"/>
               <a:t>Edit Master text styles</a:t>
             </a:r>
           </a:p>
@@ -2619,7 +2623,7 @@
     </p:spTree>
     <p:extLst>
       <p:ext uri="{BB962C8B-B14F-4D97-AF65-F5344CB8AC3E}">
-        <p14:creationId xmlns:p14="http://schemas.microsoft.com/office/powerpoint/2010/main" val="594571207"/>
+        <p14:creationId xmlns:p14="http://schemas.microsoft.com/office/powerpoint/2010/main" val="3486782771"/>
       </p:ext>
     </p:extLst>
   </p:cSld>
@@ -2673,7 +2677,7 @@
           </a:lstStyle>
           <a:p>
             <a:r>
-              <a:rPr lang="en-US" smtClean="0"/>
+              <a:rPr lang="en-US"/>
               <a:t>Click to edit Master title style</a:t>
             </a:r>
             <a:endParaRPr lang="en-US" dirty="0"/>
@@ -2796,7 +2800,7 @@
           <a:p>
             <a:pPr lvl="0"/>
             <a:r>
-              <a:rPr lang="en-US" smtClean="0"/>
+              <a:rPr lang="en-US"/>
               <a:t>Edit Master text styles</a:t>
             </a:r>
           </a:p>
@@ -2872,7 +2876,7 @@
     </p:spTree>
     <p:extLst>
       <p:ext uri="{BB962C8B-B14F-4D97-AF65-F5344CB8AC3E}">
-        <p14:creationId xmlns:p14="http://schemas.microsoft.com/office/powerpoint/2010/main" val="896135009"/>
+        <p14:creationId xmlns:p14="http://schemas.microsoft.com/office/powerpoint/2010/main" val="451239443"/>
       </p:ext>
     </p:extLst>
   </p:cSld>
@@ -2926,7 +2930,7 @@
           </a:lstStyle>
           <a:p>
             <a:r>
-              <a:rPr lang="en-US" smtClean="0"/>
+              <a:rPr lang="en-US"/>
               <a:t>Click to edit Master title style</a:t>
             </a:r>
             <a:endParaRPr lang="en-US" dirty="0"/>
@@ -2990,7 +2994,7 @@
           <a:p>
             <a:pPr lvl="0"/>
             <a:r>
-              <a:rPr lang="en-US" smtClean="0"/>
+              <a:rPr lang="en-US"/>
               <a:t>Edit Master text styles</a:t>
             </a:r>
           </a:p>
@@ -3112,7 +3116,7 @@
           <a:p>
             <a:pPr lvl="0"/>
             <a:r>
-              <a:rPr lang="en-US" smtClean="0"/>
+              <a:rPr lang="en-US"/>
               <a:t>Edit Master text styles</a:t>
             </a:r>
           </a:p>
@@ -3270,7 +3274,7 @@
     </p:spTree>
     <p:extLst>
       <p:ext uri="{BB962C8B-B14F-4D97-AF65-F5344CB8AC3E}">
-        <p14:creationId xmlns:p14="http://schemas.microsoft.com/office/powerpoint/2010/main" val="2687450157"/>
+        <p14:creationId xmlns:p14="http://schemas.microsoft.com/office/powerpoint/2010/main" val="1694687805"/>
       </p:ext>
     </p:extLst>
   </p:cSld>
@@ -3324,7 +3328,7 @@
           </a:lstStyle>
           <a:p>
             <a:r>
-              <a:rPr lang="en-US" smtClean="0"/>
+              <a:rPr lang="en-US"/>
               <a:t>Click to edit Master title style</a:t>
             </a:r>
             <a:endParaRPr lang="en-US" dirty="0"/>
@@ -3385,7 +3389,7 @@
           <a:p>
             <a:pPr lvl="0"/>
             <a:r>
-              <a:rPr lang="en-US" smtClean="0"/>
+              <a:rPr lang="en-US"/>
               <a:t>Edit Master text styles</a:t>
             </a:r>
           </a:p>
@@ -3507,7 +3511,7 @@
           <a:p>
             <a:pPr lvl="0"/>
             <a:r>
-              <a:rPr lang="en-US" smtClean="0"/>
+              <a:rPr lang="en-US"/>
               <a:t>Edit Master text styles</a:t>
             </a:r>
           </a:p>
@@ -3583,7 +3587,7 @@
     </p:spTree>
     <p:extLst>
       <p:ext uri="{BB962C8B-B14F-4D97-AF65-F5344CB8AC3E}">
-        <p14:creationId xmlns:p14="http://schemas.microsoft.com/office/powerpoint/2010/main" val="23092998"/>
+        <p14:creationId xmlns:p14="http://schemas.microsoft.com/office/powerpoint/2010/main" val="1165315574"/>
       </p:ext>
     </p:extLst>
   </p:cSld>
@@ -3626,7 +3630,7 @@
           <a:lstStyle/>
           <a:p>
             <a:r>
-              <a:rPr lang="en-US" smtClean="0"/>
+              <a:rPr lang="en-US"/>
               <a:t>Click to edit Master title style</a:t>
             </a:r>
             <a:endParaRPr lang="en-US" dirty="0"/>
@@ -3650,35 +3654,35 @@
           <a:p>
             <a:pPr lvl="0"/>
             <a:r>
-              <a:rPr lang="en-US" smtClean="0"/>
+              <a:rPr lang="en-US"/>
               <a:t>Edit Master text styles</a:t>
             </a:r>
           </a:p>
           <a:p>
             <a:pPr lvl="1"/>
             <a:r>
-              <a:rPr lang="en-US" smtClean="0"/>
+              <a:rPr lang="en-US"/>
               <a:t>Second level</a:t>
             </a:r>
           </a:p>
           <a:p>
             <a:pPr lvl="2"/>
             <a:r>
-              <a:rPr lang="en-US" smtClean="0"/>
+              <a:rPr lang="en-US"/>
               <a:t>Third level</a:t>
             </a:r>
           </a:p>
           <a:p>
             <a:pPr lvl="3"/>
             <a:r>
-              <a:rPr lang="en-US" smtClean="0"/>
+              <a:rPr lang="en-US"/>
               <a:t>Fourth level</a:t>
             </a:r>
           </a:p>
           <a:p>
             <a:pPr lvl="4"/>
             <a:r>
-              <a:rPr lang="en-US" smtClean="0"/>
+              <a:rPr lang="en-US"/>
               <a:t>Fifth level</a:t>
             </a:r>
             <a:endParaRPr lang="en-US" dirty="0"/>
@@ -3755,7 +3759,7 @@
     </p:spTree>
     <p:extLst>
       <p:ext uri="{BB962C8B-B14F-4D97-AF65-F5344CB8AC3E}">
-        <p14:creationId xmlns:p14="http://schemas.microsoft.com/office/powerpoint/2010/main" val="1335116197"/>
+        <p14:creationId xmlns:p14="http://schemas.microsoft.com/office/powerpoint/2010/main" val="2711063487"/>
       </p:ext>
     </p:extLst>
   </p:cSld>
@@ -3803,7 +3807,7 @@
           <a:lstStyle/>
           <a:p>
             <a:r>
-              <a:rPr lang="en-US" smtClean="0"/>
+              <a:rPr lang="en-US"/>
               <a:t>Click to edit Master title style</a:t>
             </a:r>
             <a:endParaRPr lang="en-US" dirty="0"/>
@@ -3832,35 +3836,35 @@
           <a:p>
             <a:pPr lvl="0"/>
             <a:r>
-              <a:rPr lang="en-US" smtClean="0"/>
+              <a:rPr lang="en-US"/>
               <a:t>Edit Master text styles</a:t>
             </a:r>
           </a:p>
           <a:p>
             <a:pPr lvl="1"/>
             <a:r>
-              <a:rPr lang="en-US" smtClean="0"/>
+              <a:rPr lang="en-US"/>
               <a:t>Second level</a:t>
             </a:r>
           </a:p>
           <a:p>
             <a:pPr lvl="2"/>
             <a:r>
-              <a:rPr lang="en-US" smtClean="0"/>
+              <a:rPr lang="en-US"/>
               <a:t>Third level</a:t>
             </a:r>
           </a:p>
           <a:p>
             <a:pPr lvl="3"/>
             <a:r>
-              <a:rPr lang="en-US" smtClean="0"/>
+              <a:rPr lang="en-US"/>
               <a:t>Fourth level</a:t>
             </a:r>
           </a:p>
           <a:p>
             <a:pPr lvl="4"/>
             <a:r>
-              <a:rPr lang="en-US" smtClean="0"/>
+              <a:rPr lang="en-US"/>
               <a:t>Fifth level</a:t>
             </a:r>
             <a:endParaRPr lang="en-US" dirty="0"/>
@@ -3937,7 +3941,7 @@
     </p:spTree>
     <p:extLst>
       <p:ext uri="{BB962C8B-B14F-4D97-AF65-F5344CB8AC3E}">
-        <p14:creationId xmlns:p14="http://schemas.microsoft.com/office/powerpoint/2010/main" val="3005650068"/>
+        <p14:creationId xmlns:p14="http://schemas.microsoft.com/office/powerpoint/2010/main" val="2600889171"/>
       </p:ext>
     </p:extLst>
   </p:cSld>
@@ -3980,7 +3984,7 @@
           <a:lstStyle/>
           <a:p>
             <a:r>
-              <a:rPr lang="en-US" smtClean="0"/>
+              <a:rPr lang="en-US"/>
               <a:t>Click to edit Master title style</a:t>
             </a:r>
             <a:endParaRPr lang="en-US" dirty="0"/>
@@ -4004,35 +4008,35 @@
           <a:p>
             <a:pPr lvl="0"/>
             <a:r>
-              <a:rPr lang="en-US" smtClean="0"/>
+              <a:rPr lang="en-US"/>
               <a:t>Edit Master text styles</a:t>
             </a:r>
           </a:p>
           <a:p>
             <a:pPr lvl="1"/>
             <a:r>
-              <a:rPr lang="en-US" smtClean="0"/>
+              <a:rPr lang="en-US"/>
               <a:t>Second level</a:t>
             </a:r>
           </a:p>
           <a:p>
             <a:pPr lvl="2"/>
             <a:r>
-              <a:rPr lang="en-US" smtClean="0"/>
+              <a:rPr lang="en-US"/>
               <a:t>Third level</a:t>
             </a:r>
           </a:p>
           <a:p>
             <a:pPr lvl="3"/>
             <a:r>
-              <a:rPr lang="en-US" smtClean="0"/>
+              <a:rPr lang="en-US"/>
               <a:t>Fourth level</a:t>
             </a:r>
           </a:p>
           <a:p>
             <a:pPr lvl="4"/>
             <a:r>
-              <a:rPr lang="en-US" smtClean="0"/>
+              <a:rPr lang="en-US"/>
               <a:t>Fifth level</a:t>
             </a:r>
             <a:endParaRPr lang="en-US" dirty="0"/>
@@ -4109,7 +4113,7 @@
     </p:spTree>
     <p:extLst>
       <p:ext uri="{BB962C8B-B14F-4D97-AF65-F5344CB8AC3E}">
-        <p14:creationId xmlns:p14="http://schemas.microsoft.com/office/powerpoint/2010/main" val="1880243986"/>
+        <p14:creationId xmlns:p14="http://schemas.microsoft.com/office/powerpoint/2010/main" val="2161948458"/>
       </p:ext>
     </p:extLst>
   </p:cSld>
@@ -4161,7 +4165,7 @@
           </a:lstStyle>
           <a:p>
             <a:r>
-              <a:rPr lang="en-US" smtClean="0"/>
+              <a:rPr lang="en-US"/>
               <a:t>Click to edit Master title style</a:t>
             </a:r>
             <a:endParaRPr lang="en-US" dirty="0"/>
@@ -4282,7 +4286,7 @@
           <a:p>
             <a:pPr lvl="0"/>
             <a:r>
-              <a:rPr lang="en-US" smtClean="0"/>
+              <a:rPr lang="en-US"/>
               <a:t>Edit Master text styles</a:t>
             </a:r>
           </a:p>
@@ -4358,7 +4362,7 @@
     </p:spTree>
     <p:extLst>
       <p:ext uri="{BB962C8B-B14F-4D97-AF65-F5344CB8AC3E}">
-        <p14:creationId xmlns:p14="http://schemas.microsoft.com/office/powerpoint/2010/main" val="4186417535"/>
+        <p14:creationId xmlns:p14="http://schemas.microsoft.com/office/powerpoint/2010/main" val="1936528118"/>
       </p:ext>
     </p:extLst>
   </p:cSld>
@@ -4401,7 +4405,7 @@
           <a:lstStyle/>
           <a:p>
             <a:r>
-              <a:rPr lang="en-US" smtClean="0"/>
+              <a:rPr lang="en-US"/>
               <a:t>Click to edit Master title style</a:t>
             </a:r>
             <a:endParaRPr lang="en-US" dirty="0"/>
@@ -4430,35 +4434,35 @@
           <a:p>
             <a:pPr lvl="0"/>
             <a:r>
-              <a:rPr lang="en-US" smtClean="0"/>
+              <a:rPr lang="en-US"/>
               <a:t>Edit Master text styles</a:t>
             </a:r>
           </a:p>
           <a:p>
             <a:pPr lvl="1"/>
             <a:r>
-              <a:rPr lang="en-US" smtClean="0"/>
+              <a:rPr lang="en-US"/>
               <a:t>Second level</a:t>
             </a:r>
           </a:p>
           <a:p>
             <a:pPr lvl="2"/>
             <a:r>
-              <a:rPr lang="en-US" smtClean="0"/>
+              <a:rPr lang="en-US"/>
               <a:t>Third level</a:t>
             </a:r>
           </a:p>
           <a:p>
             <a:pPr lvl="3"/>
             <a:r>
-              <a:rPr lang="en-US" smtClean="0"/>
+              <a:rPr lang="en-US"/>
               <a:t>Fourth level</a:t>
             </a:r>
           </a:p>
           <a:p>
             <a:pPr lvl="4"/>
             <a:r>
-              <a:rPr lang="en-US" smtClean="0"/>
+              <a:rPr lang="en-US"/>
               <a:t>Fifth level</a:t>
             </a:r>
             <a:endParaRPr lang="en-US" dirty="0"/>
@@ -4487,35 +4491,35 @@
           <a:p>
             <a:pPr lvl="0"/>
             <a:r>
-              <a:rPr lang="en-US" smtClean="0"/>
+              <a:rPr lang="en-US"/>
               <a:t>Edit Master text styles</a:t>
             </a:r>
           </a:p>
           <a:p>
             <a:pPr lvl="1"/>
             <a:r>
-              <a:rPr lang="en-US" smtClean="0"/>
+              <a:rPr lang="en-US"/>
               <a:t>Second level</a:t>
             </a:r>
           </a:p>
           <a:p>
             <a:pPr lvl="2"/>
             <a:r>
-              <a:rPr lang="en-US" smtClean="0"/>
+              <a:rPr lang="en-US"/>
               <a:t>Third level</a:t>
             </a:r>
           </a:p>
           <a:p>
             <a:pPr lvl="3"/>
             <a:r>
-              <a:rPr lang="en-US" smtClean="0"/>
+              <a:rPr lang="en-US"/>
               <a:t>Fourth level</a:t>
             </a:r>
           </a:p>
           <a:p>
             <a:pPr lvl="4"/>
             <a:r>
-              <a:rPr lang="en-US" smtClean="0"/>
+              <a:rPr lang="en-US"/>
               <a:t>Fifth level</a:t>
             </a:r>
             <a:endParaRPr lang="en-US" dirty="0"/>
@@ -4592,7 +4596,7 @@
     </p:spTree>
     <p:extLst>
       <p:ext uri="{BB962C8B-B14F-4D97-AF65-F5344CB8AC3E}">
-        <p14:creationId xmlns:p14="http://schemas.microsoft.com/office/powerpoint/2010/main" val="3920120635"/>
+        <p14:creationId xmlns:p14="http://schemas.microsoft.com/office/powerpoint/2010/main" val="583954877"/>
       </p:ext>
     </p:extLst>
   </p:cSld>
@@ -4639,7 +4643,7 @@
           </a:lstStyle>
           <a:p>
             <a:r>
-              <a:rPr lang="en-US" smtClean="0"/>
+              <a:rPr lang="en-US"/>
               <a:t>Click to edit Master title style</a:t>
             </a:r>
             <a:endParaRPr lang="en-US" dirty="0"/>
@@ -4707,7 +4711,7 @@
           <a:p>
             <a:pPr lvl="0"/>
             <a:r>
-              <a:rPr lang="en-US" smtClean="0"/>
+              <a:rPr lang="en-US"/>
               <a:t>Edit Master text styles</a:t>
             </a:r>
           </a:p>
@@ -4737,35 +4741,35 @@
           <a:p>
             <a:pPr lvl="0"/>
             <a:r>
-              <a:rPr lang="en-US" smtClean="0"/>
+              <a:rPr lang="en-US"/>
               <a:t>Edit Master text styles</a:t>
             </a:r>
           </a:p>
           <a:p>
             <a:pPr lvl="1"/>
             <a:r>
-              <a:rPr lang="en-US" smtClean="0"/>
+              <a:rPr lang="en-US"/>
               <a:t>Second level</a:t>
             </a:r>
           </a:p>
           <a:p>
             <a:pPr lvl="2"/>
             <a:r>
-              <a:rPr lang="en-US" smtClean="0"/>
+              <a:rPr lang="en-US"/>
               <a:t>Third level</a:t>
             </a:r>
           </a:p>
           <a:p>
             <a:pPr lvl="3"/>
             <a:r>
-              <a:rPr lang="en-US" smtClean="0"/>
+              <a:rPr lang="en-US"/>
               <a:t>Fourth level</a:t>
             </a:r>
           </a:p>
           <a:p>
             <a:pPr lvl="4"/>
             <a:r>
-              <a:rPr lang="en-US" smtClean="0"/>
+              <a:rPr lang="en-US"/>
               <a:t>Fifth level</a:t>
             </a:r>
             <a:endParaRPr lang="en-US" dirty="0"/>
@@ -4833,7 +4837,7 @@
           <a:p>
             <a:pPr lvl="0"/>
             <a:r>
-              <a:rPr lang="en-US" smtClean="0"/>
+              <a:rPr lang="en-US"/>
               <a:t>Edit Master text styles</a:t>
             </a:r>
           </a:p>
@@ -4863,35 +4867,35 @@
           <a:p>
             <a:pPr lvl="0"/>
             <a:r>
-              <a:rPr lang="en-US" smtClean="0"/>
+              <a:rPr lang="en-US"/>
               <a:t>Edit Master text styles</a:t>
             </a:r>
           </a:p>
           <a:p>
             <a:pPr lvl="1"/>
             <a:r>
-              <a:rPr lang="en-US" smtClean="0"/>
+              <a:rPr lang="en-US"/>
               <a:t>Second level</a:t>
             </a:r>
           </a:p>
           <a:p>
             <a:pPr lvl="2"/>
             <a:r>
-              <a:rPr lang="en-US" smtClean="0"/>
+              <a:rPr lang="en-US"/>
               <a:t>Third level</a:t>
             </a:r>
           </a:p>
           <a:p>
             <a:pPr lvl="3"/>
             <a:r>
-              <a:rPr lang="en-US" smtClean="0"/>
+              <a:rPr lang="en-US"/>
               <a:t>Fourth level</a:t>
             </a:r>
           </a:p>
           <a:p>
             <a:pPr lvl="4"/>
             <a:r>
-              <a:rPr lang="en-US" smtClean="0"/>
+              <a:rPr lang="en-US"/>
               <a:t>Fifth level</a:t>
             </a:r>
             <a:endParaRPr lang="en-US" dirty="0"/>
@@ -4968,7 +4972,7 @@
     </p:spTree>
     <p:extLst>
       <p:ext uri="{BB962C8B-B14F-4D97-AF65-F5344CB8AC3E}">
-        <p14:creationId xmlns:p14="http://schemas.microsoft.com/office/powerpoint/2010/main" val="2591093632"/>
+        <p14:creationId xmlns:p14="http://schemas.microsoft.com/office/powerpoint/2010/main" val="4272363373"/>
       </p:ext>
     </p:extLst>
   </p:cSld>
@@ -5016,7 +5020,7 @@
           <a:lstStyle/>
           <a:p>
             <a:r>
-              <a:rPr lang="en-US" smtClean="0"/>
+              <a:rPr lang="en-US"/>
               <a:t>Click to edit Master title style</a:t>
             </a:r>
             <a:endParaRPr lang="en-US" dirty="0"/>
@@ -5093,7 +5097,7 @@
     </p:spTree>
     <p:extLst>
       <p:ext uri="{BB962C8B-B14F-4D97-AF65-F5344CB8AC3E}">
-        <p14:creationId xmlns:p14="http://schemas.microsoft.com/office/powerpoint/2010/main" val="3433031044"/>
+        <p14:creationId xmlns:p14="http://schemas.microsoft.com/office/powerpoint/2010/main" val="2222638588"/>
       </p:ext>
     </p:extLst>
   </p:cSld>
@@ -5190,7 +5194,7 @@
     </p:spTree>
     <p:extLst>
       <p:ext uri="{BB962C8B-B14F-4D97-AF65-F5344CB8AC3E}">
-        <p14:creationId xmlns:p14="http://schemas.microsoft.com/office/powerpoint/2010/main" val="1703375823"/>
+        <p14:creationId xmlns:p14="http://schemas.microsoft.com/office/powerpoint/2010/main" val="2547561595"/>
       </p:ext>
     </p:extLst>
   </p:cSld>
@@ -5244,7 +5248,7 @@
           </a:lstStyle>
           <a:p>
             <a:r>
-              <a:rPr lang="en-US" smtClean="0"/>
+              <a:rPr lang="en-US"/>
               <a:t>Click to edit Master title style</a:t>
             </a:r>
             <a:endParaRPr lang="en-US" dirty="0"/>
@@ -5275,35 +5279,35 @@
           <a:p>
             <a:pPr lvl="0"/>
             <a:r>
-              <a:rPr lang="en-US" smtClean="0"/>
+              <a:rPr lang="en-US"/>
               <a:t>Edit Master text styles</a:t>
             </a:r>
           </a:p>
           <a:p>
             <a:pPr lvl="1"/>
             <a:r>
-              <a:rPr lang="en-US" smtClean="0"/>
+              <a:rPr lang="en-US"/>
               <a:t>Second level</a:t>
             </a:r>
           </a:p>
           <a:p>
             <a:pPr lvl="2"/>
             <a:r>
-              <a:rPr lang="en-US" smtClean="0"/>
+              <a:rPr lang="en-US"/>
               <a:t>Third level</a:t>
             </a:r>
           </a:p>
           <a:p>
             <a:pPr lvl="3"/>
             <a:r>
-              <a:rPr lang="en-US" smtClean="0"/>
+              <a:rPr lang="en-US"/>
               <a:t>Fourth level</a:t>
             </a:r>
           </a:p>
           <a:p>
             <a:pPr lvl="4"/>
             <a:r>
-              <a:rPr lang="en-US" smtClean="0"/>
+              <a:rPr lang="en-US"/>
               <a:t>Fifth level</a:t>
             </a:r>
             <a:endParaRPr lang="en-US" dirty="0"/>
@@ -5371,7 +5375,7 @@
           <a:p>
             <a:pPr lvl="0"/>
             <a:r>
-              <a:rPr lang="en-US" smtClean="0"/>
+              <a:rPr lang="en-US"/>
               <a:t>Edit Master text styles</a:t>
             </a:r>
           </a:p>
@@ -5447,7 +5451,7 @@
     </p:spTree>
     <p:extLst>
       <p:ext uri="{BB962C8B-B14F-4D97-AF65-F5344CB8AC3E}">
-        <p14:creationId xmlns:p14="http://schemas.microsoft.com/office/powerpoint/2010/main" val="1157020542"/>
+        <p14:creationId xmlns:p14="http://schemas.microsoft.com/office/powerpoint/2010/main" val="4102149882"/>
       </p:ext>
     </p:extLst>
   </p:cSld>
@@ -5501,7 +5505,7 @@
           </a:lstStyle>
           <a:p>
             <a:r>
-              <a:rPr lang="en-US" smtClean="0"/>
+              <a:rPr lang="en-US"/>
               <a:t>Click to edit Master title style</a:t>
             </a:r>
             <a:endParaRPr lang="en-US" dirty="0"/>
@@ -5568,7 +5572,7 @@
           </a:lstStyle>
           <a:p>
             <a:r>
-              <a:rPr lang="en-US" smtClean="0"/>
+              <a:rPr lang="en-US"/>
               <a:t>Click icon to add picture</a:t>
             </a:r>
             <a:endParaRPr lang="en-US" dirty="0"/>
@@ -5636,7 +5640,7 @@
           <a:p>
             <a:pPr lvl="0"/>
             <a:r>
-              <a:rPr lang="en-US" smtClean="0"/>
+              <a:rPr lang="en-US"/>
               <a:t>Edit Master text styles</a:t>
             </a:r>
           </a:p>
@@ -5712,7 +5716,7 @@
     </p:spTree>
     <p:extLst>
       <p:ext uri="{BB962C8B-B14F-4D97-AF65-F5344CB8AC3E}">
-        <p14:creationId xmlns:p14="http://schemas.microsoft.com/office/powerpoint/2010/main" val="3819197650"/>
+        <p14:creationId xmlns:p14="http://schemas.microsoft.com/office/powerpoint/2010/main" val="3663813312"/>
       </p:ext>
     </p:extLst>
   </p:cSld>
@@ -6301,7 +6305,7 @@
           <a:lstStyle/>
           <a:p>
             <a:r>
-              <a:rPr lang="en-US" smtClean="0"/>
+              <a:rPr lang="en-US"/>
               <a:t>Click to edit Master title style</a:t>
             </a:r>
             <a:endParaRPr lang="en-US" dirty="0"/>
@@ -6335,35 +6339,35 @@
           <a:p>
             <a:pPr lvl="0"/>
             <a:r>
-              <a:rPr lang="en-US" smtClean="0"/>
+              <a:rPr lang="en-US"/>
               <a:t>Edit Master text styles</a:t>
             </a:r>
           </a:p>
           <a:p>
             <a:pPr lvl="1"/>
             <a:r>
-              <a:rPr lang="en-US" smtClean="0"/>
+              <a:rPr lang="en-US"/>
               <a:t>Second level</a:t>
             </a:r>
           </a:p>
           <a:p>
             <a:pPr lvl="2"/>
             <a:r>
-              <a:rPr lang="en-US" smtClean="0"/>
+              <a:rPr lang="en-US"/>
               <a:t>Third level</a:t>
             </a:r>
           </a:p>
           <a:p>
             <a:pPr lvl="3"/>
             <a:r>
-              <a:rPr lang="en-US" smtClean="0"/>
+              <a:rPr lang="en-US"/>
               <a:t>Fourth level</a:t>
             </a:r>
           </a:p>
           <a:p>
             <a:pPr lvl="4"/>
             <a:r>
-              <a:rPr lang="en-US" smtClean="0"/>
+              <a:rPr lang="en-US"/>
               <a:t>Fifth level</a:t>
             </a:r>
             <a:endParaRPr lang="en-US" dirty="0"/>
@@ -6492,28 +6496,28 @@
     </p:spTree>
     <p:extLst>
       <p:ext uri="{BB962C8B-B14F-4D97-AF65-F5344CB8AC3E}">
-        <p14:creationId xmlns:p14="http://schemas.microsoft.com/office/powerpoint/2010/main" val="540154431"/>
+        <p14:creationId xmlns:p14="http://schemas.microsoft.com/office/powerpoint/2010/main" val="3938199223"/>
       </p:ext>
     </p:extLst>
   </p:cSld>
   <p:clrMap bg1="lt1" tx1="dk1" bg2="lt2" tx2="dk2" accent1="accent1" accent2="accent2" accent3="accent3" accent4="accent4" accent5="accent5" accent6="accent6" hlink="hlink" folHlink="folHlink"/>
   <p:sldLayoutIdLst>
-    <p:sldLayoutId id="2147483724" r:id="rId1"/>
-    <p:sldLayoutId id="2147483725" r:id="rId2"/>
-    <p:sldLayoutId id="2147483726" r:id="rId3"/>
-    <p:sldLayoutId id="2147483727" r:id="rId4"/>
-    <p:sldLayoutId id="2147483728" r:id="rId5"/>
-    <p:sldLayoutId id="2147483729" r:id="rId6"/>
-    <p:sldLayoutId id="2147483730" r:id="rId7"/>
-    <p:sldLayoutId id="2147483731" r:id="rId8"/>
-    <p:sldLayoutId id="2147483732" r:id="rId9"/>
-    <p:sldLayoutId id="2147483733" r:id="rId10"/>
-    <p:sldLayoutId id="2147483734" r:id="rId11"/>
-    <p:sldLayoutId id="2147483735" r:id="rId12"/>
-    <p:sldLayoutId id="2147483736" r:id="rId13"/>
-    <p:sldLayoutId id="2147483737" r:id="rId14"/>
-    <p:sldLayoutId id="2147483738" r:id="rId15"/>
-    <p:sldLayoutId id="2147483739" r:id="rId16"/>
+    <p:sldLayoutId id="2147483792" r:id="rId1"/>
+    <p:sldLayoutId id="2147483793" r:id="rId2"/>
+    <p:sldLayoutId id="2147483794" r:id="rId3"/>
+    <p:sldLayoutId id="2147483795" r:id="rId4"/>
+    <p:sldLayoutId id="2147483796" r:id="rId5"/>
+    <p:sldLayoutId id="2147483797" r:id="rId6"/>
+    <p:sldLayoutId id="2147483798" r:id="rId7"/>
+    <p:sldLayoutId id="2147483799" r:id="rId8"/>
+    <p:sldLayoutId id="2147483800" r:id="rId9"/>
+    <p:sldLayoutId id="2147483801" r:id="rId10"/>
+    <p:sldLayoutId id="2147483802" r:id="rId11"/>
+    <p:sldLayoutId id="2147483803" r:id="rId12"/>
+    <p:sldLayoutId id="2147483804" r:id="rId13"/>
+    <p:sldLayoutId id="2147483805" r:id="rId14"/>
+    <p:sldLayoutId id="2147483806" r:id="rId15"/>
+    <p:sldLayoutId id="2147483807" r:id="rId16"/>
   </p:sldLayoutIdLst>
   <p:txStyles>
     <p:titleStyle>
@@ -14364,7 +14368,7 @@
 <file path=ppt/theme/theme1.xml><?xml version="1.0" encoding="utf-8"?>
 <a:theme xmlns:a="http://schemas.openxmlformats.org/drawingml/2006/main" name="Facet">
   <a:themeElements>
-    <a:clrScheme name="Facet">
+    <a:clrScheme name="Custom 2">
       <a:dk1>
         <a:sysClr val="windowText" lastClr="000000"/>
       </a:dk1>
@@ -14378,7 +14382,7 @@
         <a:srgbClr val="EBEBEB"/>
       </a:lt2>
       <a:accent1>
-        <a:srgbClr val="5FCBEF"/>
+        <a:srgbClr val="00B0F0"/>
       </a:accent1>
       <a:accent2>
         <a:srgbClr val="2E83C3"/>

</xml_diff>

<commit_message>
Slides for Hekaton; update download link for Express Edition.
</commit_message>
<xml_diff>
--- a/AwesomeFreeSQLServerFeatures.pptx
+++ b/AwesomeFreeSQLServerFeatures.pptx
@@ -238,7 +238,7 @@
           <a:p>
             <a:fld id="{64F240C7-B8B6-4D73-9667-9F7409B58D21}" type="datetimeFigureOut">
               <a:rPr lang="en-US" smtClean="0"/>
-              <a:t>4/28/2017</a:t>
+              <a:t>4/30/2017</a:t>
             </a:fld>
             <a:endParaRPr lang="en-US"/>
           </a:p>
@@ -1920,7 +1920,7 @@
             <a:fld id="{B61BEF0D-F0BB-DE4B-95CE-6DB70DBA9567}" type="datetimeFigureOut">
               <a:rPr lang="en-US" smtClean="0"/>
               <a:pPr/>
-              <a:t>4/28/2017</a:t>
+              <a:t>4/30/2017</a:t>
             </a:fld>
             <a:endParaRPr lang="en-US" dirty="0"/>
           </a:p>
@@ -2173,7 +2173,7 @@
             <a:fld id="{B61BEF0D-F0BB-DE4B-95CE-6DB70DBA9567}" type="datetimeFigureOut">
               <a:rPr lang="en-US" smtClean="0"/>
               <a:pPr/>
-              <a:t>4/28/2017</a:t>
+              <a:t>4/30/2017</a:t>
             </a:fld>
             <a:endParaRPr lang="en-US" dirty="0"/>
           </a:p>
@@ -2489,7 +2489,7 @@
             <a:fld id="{B61BEF0D-F0BB-DE4B-95CE-6DB70DBA9567}" type="datetimeFigureOut">
               <a:rPr lang="en-US" smtClean="0"/>
               <a:pPr/>
-              <a:t>4/28/2017</a:t>
+              <a:t>4/30/2017</a:t>
             </a:fld>
             <a:endParaRPr lang="en-US" dirty="0"/>
           </a:p>
@@ -2824,7 +2824,7 @@
             <a:fld id="{B61BEF0D-F0BB-DE4B-95CE-6DB70DBA9567}" type="datetimeFigureOut">
               <a:rPr lang="en-US" smtClean="0"/>
               <a:pPr/>
-              <a:t>4/28/2017</a:t>
+              <a:t>4/30/2017</a:t>
             </a:fld>
             <a:endParaRPr lang="en-US" dirty="0"/>
           </a:p>
@@ -3140,7 +3140,7 @@
             <a:fld id="{B61BEF0D-F0BB-DE4B-95CE-6DB70DBA9567}" type="datetimeFigureOut">
               <a:rPr lang="en-US" smtClean="0"/>
               <a:pPr/>
-              <a:t>4/28/2017</a:t>
+              <a:t>4/30/2017</a:t>
             </a:fld>
             <a:endParaRPr lang="en-US" dirty="0"/>
           </a:p>
@@ -3535,7 +3535,7 @@
             <a:fld id="{B61BEF0D-F0BB-DE4B-95CE-6DB70DBA9567}" type="datetimeFigureOut">
               <a:rPr lang="en-US" smtClean="0"/>
               <a:pPr/>
-              <a:t>4/28/2017</a:t>
+              <a:t>4/30/2017</a:t>
             </a:fld>
             <a:endParaRPr lang="en-US" dirty="0"/>
           </a:p>
@@ -3707,7 +3707,7 @@
             <a:fld id="{B61BEF0D-F0BB-DE4B-95CE-6DB70DBA9567}" type="datetimeFigureOut">
               <a:rPr lang="en-US" smtClean="0"/>
               <a:pPr/>
-              <a:t>4/28/2017</a:t>
+              <a:t>4/30/2017</a:t>
             </a:fld>
             <a:endParaRPr lang="en-US" dirty="0"/>
           </a:p>
@@ -3889,7 +3889,7 @@
             <a:fld id="{B61BEF0D-F0BB-DE4B-95CE-6DB70DBA9567}" type="datetimeFigureOut">
               <a:rPr lang="en-US" smtClean="0"/>
               <a:pPr/>
-              <a:t>4/28/2017</a:t>
+              <a:t>4/30/2017</a:t>
             </a:fld>
             <a:endParaRPr lang="en-US" dirty="0"/>
           </a:p>
@@ -4061,7 +4061,7 @@
             <a:fld id="{B61BEF0D-F0BB-DE4B-95CE-6DB70DBA9567}" type="datetimeFigureOut">
               <a:rPr lang="en-US" smtClean="0"/>
               <a:pPr/>
-              <a:t>4/28/2017</a:t>
+              <a:t>4/30/2017</a:t>
             </a:fld>
             <a:endParaRPr lang="en-US" dirty="0"/>
           </a:p>
@@ -4310,7 +4310,7 @@
             <a:fld id="{B61BEF0D-F0BB-DE4B-95CE-6DB70DBA9567}" type="datetimeFigureOut">
               <a:rPr lang="en-US" smtClean="0"/>
               <a:pPr/>
-              <a:t>4/28/2017</a:t>
+              <a:t>4/30/2017</a:t>
             </a:fld>
             <a:endParaRPr lang="en-US" dirty="0"/>
           </a:p>
@@ -4544,7 +4544,7 @@
             <a:fld id="{B61BEF0D-F0BB-DE4B-95CE-6DB70DBA9567}" type="datetimeFigureOut">
               <a:rPr lang="en-US" smtClean="0"/>
               <a:pPr/>
-              <a:t>4/28/2017</a:t>
+              <a:t>4/30/2017</a:t>
             </a:fld>
             <a:endParaRPr lang="en-US" dirty="0"/>
           </a:p>
@@ -4920,7 +4920,7 @@
             <a:fld id="{B61BEF0D-F0BB-DE4B-95CE-6DB70DBA9567}" type="datetimeFigureOut">
               <a:rPr lang="en-US" smtClean="0"/>
               <a:pPr/>
-              <a:t>4/28/2017</a:t>
+              <a:t>4/30/2017</a:t>
             </a:fld>
             <a:endParaRPr lang="en-US" dirty="0"/>
           </a:p>
@@ -5045,7 +5045,7 @@
             <a:fld id="{B61BEF0D-F0BB-DE4B-95CE-6DB70DBA9567}" type="datetimeFigureOut">
               <a:rPr lang="en-US" smtClean="0"/>
               <a:pPr/>
-              <a:t>4/28/2017</a:t>
+              <a:t>4/30/2017</a:t>
             </a:fld>
             <a:endParaRPr lang="en-US" dirty="0"/>
           </a:p>
@@ -5142,7 +5142,7 @@
             <a:fld id="{B61BEF0D-F0BB-DE4B-95CE-6DB70DBA9567}" type="datetimeFigureOut">
               <a:rPr lang="en-US" smtClean="0"/>
               <a:pPr/>
-              <a:t>4/28/2017</a:t>
+              <a:t>4/30/2017</a:t>
             </a:fld>
             <a:endParaRPr lang="en-US" dirty="0"/>
           </a:p>
@@ -5399,7 +5399,7 @@
             <a:fld id="{B61BEF0D-F0BB-DE4B-95CE-6DB70DBA9567}" type="datetimeFigureOut">
               <a:rPr lang="en-US" smtClean="0"/>
               <a:pPr/>
-              <a:t>4/28/2017</a:t>
+              <a:t>4/30/2017</a:t>
             </a:fld>
             <a:endParaRPr lang="en-US" dirty="0"/>
           </a:p>
@@ -5707,7 +5707,7 @@
             <a:fld id="{B61BEF0D-F0BB-DE4B-95CE-6DB70DBA9567}" type="datetimeFigureOut">
               <a:rPr lang="en-US" smtClean="0"/>
               <a:pPr/>
-              <a:t>4/28/2017</a:t>
+              <a:t>4/30/2017</a:t>
             </a:fld>
             <a:endParaRPr lang="en-US" dirty="0"/>
           </a:p>
@@ -6410,7 +6410,7 @@
             <a:fld id="{B61BEF0D-F0BB-DE4B-95CE-6DB70DBA9567}" type="datetimeFigureOut">
               <a:rPr lang="en-US" smtClean="0"/>
               <a:pPr/>
-              <a:t>4/28/2017</a:t>
+              <a:t>4/30/2017</a:t>
             </a:fld>
             <a:endParaRPr lang="en-US" dirty="0"/>
           </a:p>
@@ -13093,12 +13093,56 @@
             <p:ph idx="1"/>
           </p:nvPr>
         </p:nvSpPr>
-        <p:spPr/>
-        <p:txBody>
-          <a:bodyPr/>
-          <a:lstStyle/>
-          <a:p>
-            <a:endParaRPr lang="en-US" dirty="0"/>
+        <p:spPr>
+          <a:xfrm>
+            <a:off x="677334" y="1512277"/>
+            <a:ext cx="8596668" cy="4529085"/>
+          </a:xfrm>
+        </p:spPr>
+        <p:txBody>
+          <a:bodyPr>
+            <a:normAutofit/>
+          </a:bodyPr>
+          <a:lstStyle/>
+          <a:p>
+            <a:r>
+              <a:rPr lang="en-US" sz="2800" dirty="0"/>
+              <a:t>Stores data in memory</a:t>
+            </a:r>
+          </a:p>
+          <a:p>
+            <a:r>
+              <a:rPr lang="en-US" sz="2800" dirty="0"/>
+              <a:t>Lock-free structures</a:t>
+            </a:r>
+          </a:p>
+          <a:p>
+            <a:pPr lvl="1"/>
+            <a:r>
+              <a:rPr lang="en-US" sz="2600" dirty="0"/>
+              <a:t>Multi-version concurrency control (optimistic)</a:t>
+            </a:r>
+          </a:p>
+          <a:p>
+            <a:r>
+              <a:rPr lang="en-US" sz="2800" dirty="0"/>
+              <a:t>Backed to disk, much more efficient than traditional disk-based tables</a:t>
+            </a:r>
+          </a:p>
+          <a:p>
+            <a:r>
+              <a:rPr lang="en-US" sz="2800" dirty="0"/>
+              <a:t>Designed for OLTP workloads</a:t>
+            </a:r>
+          </a:p>
+          <a:p>
+            <a:r>
+              <a:rPr lang="en-US" sz="2800" dirty="0"/>
+              <a:t>Can yield 10-20x performance boost</a:t>
+            </a:r>
+          </a:p>
+          <a:p>
+            <a:endParaRPr lang="en-US" sz="2800" dirty="0"/>
           </a:p>
         </p:txBody>
       </p:sp>
@@ -13367,14 +13411,8 @@
               <a:rPr lang="en-US" sz="2000" dirty="0">
                 <a:hlinkClick r:id="rId2"/>
               </a:rPr>
-              <a:t>https://www.microsoft.com/en-us/download/details.aspx?id=52679</a:t>
-            </a:r>
-            <a:endParaRPr lang="en-US" sz="2000" dirty="0"/>
-          </a:p>
-          <a:p>
-            <a:pPr marL="324000" lvl="1" indent="0">
-              <a:buNone/>
-            </a:pPr>
+              <a:t>https://www.microsoft.com/en-us/sql-server/sql-server-editions-express</a:t>
+            </a:r>
             <a:endParaRPr lang="en-US" sz="2400" dirty="0"/>
           </a:p>
         </p:txBody>

</xml_diff>

<commit_message>
More slides on Hekaton.
</commit_message>
<xml_diff>
--- a/AwesomeFreeSQLServerFeatures.pptx
+++ b/AwesomeFreeSQLServerFeatures.pptx
@@ -5,7 +5,7 @@
     <p:sldMasterId id="2147483791" r:id="rId1"/>
   </p:sldMasterIdLst>
   <p:notesMasterIdLst>
-    <p:notesMasterId r:id="rId40"/>
+    <p:notesMasterId r:id="rId41"/>
   </p:notesMasterIdLst>
   <p:sldIdLst>
     <p:sldId id="256" r:id="rId2"/>
@@ -45,7 +45,8 @@
     <p:sldId id="298" r:id="rId36"/>
     <p:sldId id="291" r:id="rId37"/>
     <p:sldId id="303" r:id="rId38"/>
-    <p:sldId id="258" r:id="rId39"/>
+    <p:sldId id="308" r:id="rId39"/>
+    <p:sldId id="258" r:id="rId40"/>
   </p:sldIdLst>
   <p:sldSz cx="12192000" cy="6858000"/>
   <p:notesSz cx="6858000" cy="9144000"/>
@@ -1165,6 +1166,131 @@
     <p:extLst>
       <p:ext uri="{BB962C8B-B14F-4D97-AF65-F5344CB8AC3E}">
         <p14:creationId xmlns:p14="http://schemas.microsoft.com/office/powerpoint/2010/main" val="2302691919"/>
+      </p:ext>
+    </p:extLst>
+  </p:cSld>
+  <p:clrMapOvr>
+    <a:masterClrMapping/>
+  </p:clrMapOvr>
+</p:notes>
+</file>
+
+<file path=ppt/notesSlides/notesSlide7.xml><?xml version="1.0" encoding="utf-8"?>
+<p:notes xmlns:a="http://schemas.openxmlformats.org/drawingml/2006/main" xmlns:r="http://schemas.openxmlformats.org/officeDocument/2006/relationships" xmlns:p="http://schemas.openxmlformats.org/presentationml/2006/main">
+  <p:cSld>
+    <p:spTree>
+      <p:nvGrpSpPr>
+        <p:cNvPr id="1" name=""/>
+        <p:cNvGrpSpPr/>
+        <p:nvPr/>
+      </p:nvGrpSpPr>
+      <p:grpSpPr>
+        <a:xfrm>
+          <a:off x="0" y="0"/>
+          <a:ext cx="0" cy="0"/>
+          <a:chOff x="0" y="0"/>
+          <a:chExt cx="0" cy="0"/>
+        </a:xfrm>
+      </p:grpSpPr>
+      <p:sp>
+        <p:nvSpPr>
+          <p:cNvPr id="2" name="Slide Image Placeholder 1"/>
+          <p:cNvSpPr>
+            <a:spLocks noGrp="1" noRot="1" noChangeAspect="1"/>
+          </p:cNvSpPr>
+          <p:nvPr>
+            <p:ph type="sldImg"/>
+          </p:nvPr>
+        </p:nvSpPr>
+        <p:spPr/>
+      </p:sp>
+      <p:sp>
+        <p:nvSpPr>
+          <p:cNvPr id="3" name="Notes Placeholder 2"/>
+          <p:cNvSpPr>
+            <a:spLocks noGrp="1"/>
+          </p:cNvSpPr>
+          <p:nvPr>
+            <p:ph type="body" idx="1"/>
+          </p:nvPr>
+        </p:nvSpPr>
+        <p:spPr/>
+        <p:txBody>
+          <a:bodyPr/>
+          <a:lstStyle/>
+          <a:p>
+            <a:r>
+              <a:rPr lang="en-US" dirty="0"/>
+              <a:t>Sometimes the assumptions for optimistic concurrency</a:t>
+            </a:r>
+            <a:r>
+              <a:rPr lang="en-US" baseline="0" dirty="0"/>
+              <a:t> aren’t accurate.  For example, two concurrent transactions may attempt to update the same row within the span of their transactions.</a:t>
+            </a:r>
+          </a:p>
+          <a:p>
+            <a:endParaRPr lang="en-US" baseline="0" dirty="0"/>
+          </a:p>
+          <a:p>
+            <a:r>
+              <a:rPr lang="en-US" dirty="0"/>
+              <a:t>Application that execute against in-memory tables should</a:t>
+            </a:r>
+            <a:r>
+              <a:rPr lang="en-US" baseline="0" dirty="0"/>
+              <a:t> be aware of four specific error codes that may be generated out of SQL Server and be prepared to handle these gracefully.  Typically, developers will want to implement retry logic similar to deadlock handling.</a:t>
+            </a:r>
+          </a:p>
+          <a:p>
+            <a:endParaRPr lang="en-US" baseline="0" dirty="0"/>
+          </a:p>
+          <a:p>
+            <a:r>
+              <a:rPr lang="en-US" baseline="0" dirty="0"/>
+              <a:t>However, be aware that when one of these errors is generated, the </a:t>
+            </a:r>
+            <a:r>
+              <a:rPr lang="en-US" b="1" baseline="0" dirty="0"/>
+              <a:t>entire transaction</a:t>
+            </a:r>
+            <a:r>
+              <a:rPr lang="en-US" b="0" baseline="0" dirty="0"/>
+              <a:t> is rolled back, so things become much more complicated when multi-statement transactions are in play.  Application that implement retry logic will have to replay the entire transaction!</a:t>
+            </a:r>
+            <a:endParaRPr lang="en-US" dirty="0"/>
+          </a:p>
+          <a:p>
+            <a:endParaRPr lang="en-US" dirty="0"/>
+          </a:p>
+        </p:txBody>
+      </p:sp>
+      <p:sp>
+        <p:nvSpPr>
+          <p:cNvPr id="4" name="Slide Number Placeholder 3"/>
+          <p:cNvSpPr>
+            <a:spLocks noGrp="1"/>
+          </p:cNvSpPr>
+          <p:nvPr>
+            <p:ph type="sldNum" sz="quarter" idx="10"/>
+          </p:nvPr>
+        </p:nvSpPr>
+        <p:spPr/>
+        <p:txBody>
+          <a:bodyPr/>
+          <a:lstStyle/>
+          <a:p>
+            <a:fld id="{8B5705F6-219D-4122-80FA-D82FBBCA0869}" type="slidenum">
+              <a:rPr lang="en-US" smtClean="0"/>
+              <a:t>38</a:t>
+            </a:fld>
+            <a:endParaRPr lang="en-US"/>
+          </a:p>
+        </p:txBody>
+      </p:sp>
+    </p:spTree>
+    <p:extLst>
+      <p:ext uri="{BB962C8B-B14F-4D97-AF65-F5344CB8AC3E}">
+        <p14:creationId xmlns:p14="http://schemas.microsoft.com/office/powerpoint/2010/main" val="2263317381"/>
       </p:ext>
     </p:extLst>
   </p:cSld>
@@ -13107,6 +13233,12 @@
           <a:p>
             <a:r>
               <a:rPr lang="en-US" sz="2800" dirty="0"/>
+              <a:t>First introduced in SQL Server 2014</a:t>
+            </a:r>
+          </a:p>
+          <a:p>
+            <a:r>
+              <a:rPr lang="en-US" sz="2800" dirty="0"/>
               <a:t>Stores data in memory</a:t>
             </a:r>
           </a:p>
@@ -13126,7 +13258,7 @@
           <a:p>
             <a:r>
               <a:rPr lang="en-US" sz="2800" dirty="0"/>
-              <a:t>Backed to disk, much more efficient than traditional disk-based tables</a:t>
+              <a:t>Fully ACID compliant (durability optional)</a:t>
             </a:r>
           </a:p>
           <a:p>
@@ -13142,7 +13274,10 @@
             </a:r>
           </a:p>
           <a:p>
-            <a:endParaRPr lang="en-US" sz="2800" dirty="0"/>
+            <a:r>
+              <a:rPr lang="en-US" sz="2800" dirty="0"/>
+              <a:t>Native compilation of stored procedures</a:t>
+            </a:r>
           </a:p>
         </p:txBody>
       </p:sp>
@@ -13338,6 +13473,129 @@
 </file>
 
 <file path=ppt/slides/slide38.xml><?xml version="1.0" encoding="utf-8"?>
+<p:sld xmlns:a="http://schemas.openxmlformats.org/drawingml/2006/main" xmlns:r="http://schemas.openxmlformats.org/officeDocument/2006/relationships" xmlns:p="http://schemas.openxmlformats.org/presentationml/2006/main">
+  <p:cSld>
+    <p:spTree>
+      <p:nvGrpSpPr>
+        <p:cNvPr id="1" name=""/>
+        <p:cNvGrpSpPr/>
+        <p:nvPr/>
+      </p:nvGrpSpPr>
+      <p:grpSpPr>
+        <a:xfrm>
+          <a:off x="0" y="0"/>
+          <a:ext cx="0" cy="0"/>
+          <a:chOff x="0" y="0"/>
+          <a:chExt cx="0" cy="0"/>
+        </a:xfrm>
+      </p:grpSpPr>
+      <p:sp>
+        <p:nvSpPr>
+          <p:cNvPr id="2" name="Title 1"/>
+          <p:cNvSpPr>
+            <a:spLocks noGrp="1"/>
+          </p:cNvSpPr>
+          <p:nvPr>
+            <p:ph type="title"/>
+          </p:nvPr>
+        </p:nvSpPr>
+        <p:spPr/>
+        <p:txBody>
+          <a:bodyPr/>
+          <a:lstStyle/>
+          <a:p>
+            <a:r>
+              <a:rPr lang="en-US" dirty="0"/>
+              <a:t>In-Memory OLTP</a:t>
+            </a:r>
+          </a:p>
+        </p:txBody>
+      </p:sp>
+      <p:sp>
+        <p:nvSpPr>
+          <p:cNvPr id="3" name="Content Placeholder 2"/>
+          <p:cNvSpPr>
+            <a:spLocks noGrp="1"/>
+          </p:cNvSpPr>
+          <p:nvPr>
+            <p:ph idx="1"/>
+          </p:nvPr>
+        </p:nvSpPr>
+        <p:spPr>
+          <a:xfrm>
+            <a:off x="677334" y="1512277"/>
+            <a:ext cx="8596668" cy="4529085"/>
+          </a:xfrm>
+        </p:spPr>
+        <p:txBody>
+          <a:bodyPr>
+            <a:normAutofit/>
+          </a:bodyPr>
+          <a:lstStyle/>
+          <a:p>
+            <a:r>
+              <a:rPr lang="en-US" sz="2800" dirty="0"/>
+              <a:t>Need to give a table hint such as </a:t>
+            </a:r>
+            <a:r>
+              <a:rPr lang="en-US" sz="2800" b="1" dirty="0">
+                <a:latin typeface="Courier New" panose="02070309020205020404" pitchFamily="49" charset="0"/>
+                <a:cs typeface="Courier New" panose="02070309020205020404" pitchFamily="49" charset="0"/>
+              </a:rPr>
+              <a:t>with (snapshot)</a:t>
+            </a:r>
+            <a:r>
+              <a:rPr lang="en-US" sz="2800" dirty="0"/>
+              <a:t> when used inside an explicit transaction</a:t>
+            </a:r>
+          </a:p>
+          <a:p>
+            <a:pPr lvl="1"/>
+            <a:r>
+              <a:rPr lang="en-US" sz="2600" dirty="0"/>
+              <a:t>Or, set database option </a:t>
+            </a:r>
+            <a:r>
+              <a:rPr lang="en-US" sz="2600" b="1" dirty="0" err="1">
+                <a:latin typeface="Courier New" panose="02070309020205020404" pitchFamily="49" charset="0"/>
+                <a:cs typeface="Courier New" panose="02070309020205020404" pitchFamily="49" charset="0"/>
+              </a:rPr>
+              <a:t>memory_optimized_elevate_to_snapshot</a:t>
+            </a:r>
+            <a:endParaRPr lang="en-US" sz="2600" b="1" dirty="0">
+              <a:latin typeface="Courier New" panose="02070309020205020404" pitchFamily="49" charset="0"/>
+              <a:cs typeface="Courier New" panose="02070309020205020404" pitchFamily="49" charset="0"/>
+            </a:endParaRPr>
+          </a:p>
+          <a:p>
+            <a:r>
+              <a:rPr lang="en-US" sz="2800" dirty="0"/>
+              <a:t>Error handling considerations</a:t>
+            </a:r>
+          </a:p>
+          <a:p>
+            <a:pPr lvl="1"/>
+            <a:r>
+              <a:rPr lang="en-US" sz="2600" dirty="0"/>
+              <a:t>Entire transaction will roll back if validation phase fails (optimistic concurrency assumptions failure)</a:t>
+            </a:r>
+          </a:p>
+        </p:txBody>
+      </p:sp>
+    </p:spTree>
+    <p:extLst>
+      <p:ext uri="{BB962C8B-B14F-4D97-AF65-F5344CB8AC3E}">
+        <p14:creationId xmlns:p14="http://schemas.microsoft.com/office/powerpoint/2010/main" val="4188259860"/>
+      </p:ext>
+    </p:extLst>
+  </p:cSld>
+  <p:clrMapOvr>
+    <a:masterClrMapping/>
+  </p:clrMapOvr>
+</p:sld>
+</file>
+
+<file path=ppt/slides/slide39.xml><?xml version="1.0" encoding="utf-8"?>
 <p:sld xmlns:a="http://schemas.openxmlformats.org/drawingml/2006/main" xmlns:r="http://schemas.openxmlformats.org/officeDocument/2006/relationships" xmlns:p="http://schemas.openxmlformats.org/presentationml/2006/main">
   <p:cSld>
     <p:spTree>

</xml_diff>

<commit_message>
More font tweaks, link to blog on resources page.
</commit_message>
<xml_diff>
--- a/AwesomeFreeSQLServerFeatures.pptx
+++ b/AwesomeFreeSQLServerFeatures.pptx
@@ -13689,7 +13689,7 @@
         <p:spPr>
           <a:xfrm>
             <a:off x="677333" y="1567543"/>
-            <a:ext cx="9499819" cy="4473819"/>
+            <a:ext cx="9499819" cy="2723103"/>
           </a:xfrm>
         </p:spPr>
         <p:txBody>
@@ -13702,18 +13702,349 @@
               <a:rPr lang="en-US" sz="2800" dirty="0"/>
               <a:t>SQL Server 2016 Express Edition download</a:t>
             </a:r>
+            <a:br>
+              <a:rPr lang="en-US" sz="2800" dirty="0"/>
+            </a:br>
+            <a:r>
+              <a:rPr lang="en-US" sz="2400" dirty="0"/>
+              <a:t>www.microsoft.com/en-us/sql-server/sql-server-editions-express</a:t>
+            </a:r>
+            <a:endParaRPr lang="en-US" sz="3200" dirty="0"/>
+          </a:p>
+          <a:p>
+            <a:endParaRPr lang="en-US" sz="2800" dirty="0"/>
+          </a:p>
+          <a:p>
+            <a:r>
+              <a:rPr lang="en-US" sz="2800" dirty="0"/>
+              <a:t>Companion blog page to this session</a:t>
+            </a:r>
+            <a:br>
+              <a:rPr lang="en-US" sz="2800" dirty="0"/>
+            </a:br>
+            <a:r>
+              <a:rPr lang="en-US" sz="2800" dirty="0"/>
+              <a:t>www.sqltran.org/7features</a:t>
+            </a:r>
           </a:p>
           <a:p>
             <a:pPr marL="324000" lvl="1" indent="0">
               <a:buNone/>
             </a:pPr>
-            <a:r>
-              <a:rPr lang="en-US" sz="2000" dirty="0">
-                <a:hlinkClick r:id="rId2"/>
+            <a:endParaRPr lang="en-US" sz="2000" dirty="0"/>
+          </a:p>
+        </p:txBody>
+      </p:sp>
+      <p:sp>
+        <p:nvSpPr>
+          <p:cNvPr id="5" name="Subtitle 2"/>
+          <p:cNvSpPr txBox="1">
+            <a:spLocks/>
+          </p:cNvSpPr>
+          <p:nvPr/>
+        </p:nvSpPr>
+        <p:spPr>
+          <a:xfrm>
+            <a:off x="581191" y="4728411"/>
+            <a:ext cx="10993546" cy="1673579"/>
+          </a:xfrm>
+          <a:prstGeom prst="rect">
+            <a:avLst/>
+          </a:prstGeom>
+        </p:spPr>
+        <p:txBody>
+          <a:bodyPr vert="horz" lIns="91440" tIns="45720" rIns="91440" bIns="45720" rtlCol="0" anchor="b" anchorCtr="0">
+            <a:normAutofit lnSpcReduction="10000"/>
+          </a:bodyPr>
+          <a:lstStyle>
+            <a:lvl1pPr marL="0" indent="0" algn="l" defTabSz="457200" rtl="0" eaLnBrk="1" latinLnBrk="0" hangingPunct="1">
+              <a:spcBef>
+                <a:spcPct val="20000"/>
+              </a:spcBef>
+              <a:spcAft>
+                <a:spcPts val="600"/>
+              </a:spcAft>
+              <a:buClr>
+                <a:schemeClr val="accent2"/>
+              </a:buClr>
+              <a:buSzPct val="92000"/>
+              <a:buFont typeface="Wingdings 2" panose="05020102010507070707" pitchFamily="18" charset="2"/>
+              <a:buNone/>
+              <a:defRPr sz="1600" kern="1200" cap="all">
+                <a:solidFill>
+                  <a:schemeClr val="accent2"/>
+                </a:solidFill>
+                <a:latin typeface="+mn-lt"/>
+                <a:ea typeface="+mn-ea"/>
+                <a:cs typeface="+mn-cs"/>
+              </a:defRPr>
+            </a:lvl1pPr>
+            <a:lvl2pPr marL="457200" indent="0" algn="ctr" defTabSz="457200" rtl="0" eaLnBrk="1" latinLnBrk="0" hangingPunct="1">
+              <a:spcBef>
+                <a:spcPct val="20000"/>
+              </a:spcBef>
+              <a:spcAft>
+                <a:spcPts val="600"/>
+              </a:spcAft>
+              <a:buClr>
+                <a:schemeClr val="accent2"/>
+              </a:buClr>
+              <a:buSzPct val="92000"/>
+              <a:buFont typeface="Wingdings 2" panose="05020102010507070707" pitchFamily="18" charset="2"/>
+              <a:buNone/>
+              <a:defRPr sz="1600" kern="1200">
+                <a:solidFill>
+                  <a:schemeClr val="tx1">
+                    <a:tint val="75000"/>
+                  </a:schemeClr>
+                </a:solidFill>
+                <a:latin typeface="+mn-lt"/>
+                <a:ea typeface="+mn-ea"/>
+                <a:cs typeface="+mn-cs"/>
+              </a:defRPr>
+            </a:lvl2pPr>
+            <a:lvl3pPr marL="914400" indent="0" algn="ctr" defTabSz="457200" rtl="0" eaLnBrk="1" latinLnBrk="0" hangingPunct="1">
+              <a:spcBef>
+                <a:spcPct val="20000"/>
+              </a:spcBef>
+              <a:spcAft>
+                <a:spcPts val="600"/>
+              </a:spcAft>
+              <a:buClr>
+                <a:schemeClr val="accent2"/>
+              </a:buClr>
+              <a:buSzPct val="92000"/>
+              <a:buFont typeface="Wingdings 2" panose="05020102010507070707" pitchFamily="18" charset="2"/>
+              <a:buNone/>
+              <a:defRPr sz="1400" kern="1200">
+                <a:solidFill>
+                  <a:schemeClr val="tx1">
+                    <a:tint val="75000"/>
+                  </a:schemeClr>
+                </a:solidFill>
+                <a:latin typeface="+mn-lt"/>
+                <a:ea typeface="+mn-ea"/>
+                <a:cs typeface="+mn-cs"/>
+              </a:defRPr>
+            </a:lvl3pPr>
+            <a:lvl4pPr marL="1371600" indent="0" algn="ctr" defTabSz="457200" rtl="0" eaLnBrk="1" latinLnBrk="0" hangingPunct="1">
+              <a:spcBef>
+                <a:spcPct val="20000"/>
+              </a:spcBef>
+              <a:spcAft>
+                <a:spcPts val="600"/>
+              </a:spcAft>
+              <a:buClr>
+                <a:schemeClr val="accent2"/>
+              </a:buClr>
+              <a:buSzPct val="92000"/>
+              <a:buFont typeface="Wingdings 2" panose="05020102010507070707" pitchFamily="18" charset="2"/>
+              <a:buNone/>
+              <a:defRPr sz="1200" kern="1200">
+                <a:solidFill>
+                  <a:schemeClr val="tx1">
+                    <a:tint val="75000"/>
+                  </a:schemeClr>
+                </a:solidFill>
+                <a:latin typeface="+mn-lt"/>
+                <a:ea typeface="+mn-ea"/>
+                <a:cs typeface="+mn-cs"/>
+              </a:defRPr>
+            </a:lvl4pPr>
+            <a:lvl5pPr marL="1828800" indent="0" algn="ctr" defTabSz="457200" rtl="0" eaLnBrk="1" latinLnBrk="0" hangingPunct="1">
+              <a:spcBef>
+                <a:spcPct val="20000"/>
+              </a:spcBef>
+              <a:spcAft>
+                <a:spcPts val="600"/>
+              </a:spcAft>
+              <a:buClr>
+                <a:schemeClr val="accent2"/>
+              </a:buClr>
+              <a:buSzPct val="92000"/>
+              <a:buFont typeface="Wingdings 2" panose="05020102010507070707" pitchFamily="18" charset="2"/>
+              <a:buNone/>
+              <a:defRPr sz="1200" kern="1200">
+                <a:solidFill>
+                  <a:schemeClr val="tx1">
+                    <a:tint val="75000"/>
+                  </a:schemeClr>
+                </a:solidFill>
+                <a:latin typeface="+mn-lt"/>
+                <a:ea typeface="+mn-ea"/>
+                <a:cs typeface="+mn-cs"/>
+              </a:defRPr>
+            </a:lvl5pPr>
+            <a:lvl6pPr marL="2286000" indent="0" algn="ctr" defTabSz="457200" rtl="0" eaLnBrk="1" latinLnBrk="0" hangingPunct="1">
+              <a:spcBef>
+                <a:spcPct val="20000"/>
+              </a:spcBef>
+              <a:spcAft>
+                <a:spcPts val="600"/>
+              </a:spcAft>
+              <a:buClr>
+                <a:schemeClr val="accent2"/>
+              </a:buClr>
+              <a:buSzPct val="92000"/>
+              <a:buFont typeface="Wingdings 2" panose="05020102010507070707" pitchFamily="18" charset="2"/>
+              <a:buNone/>
+              <a:defRPr sz="1200" kern="1200">
+                <a:solidFill>
+                  <a:schemeClr val="tx1">
+                    <a:tint val="75000"/>
+                  </a:schemeClr>
+                </a:solidFill>
+                <a:latin typeface="+mn-lt"/>
+                <a:ea typeface="+mn-ea"/>
+                <a:cs typeface="+mn-cs"/>
+              </a:defRPr>
+            </a:lvl6pPr>
+            <a:lvl7pPr marL="2743200" indent="0" algn="ctr" defTabSz="457200" rtl="0" eaLnBrk="1" latinLnBrk="0" hangingPunct="1">
+              <a:spcBef>
+                <a:spcPct val="20000"/>
+              </a:spcBef>
+              <a:spcAft>
+                <a:spcPts val="600"/>
+              </a:spcAft>
+              <a:buClr>
+                <a:schemeClr val="accent2"/>
+              </a:buClr>
+              <a:buSzPct val="92000"/>
+              <a:buFont typeface="Wingdings 2" panose="05020102010507070707" pitchFamily="18" charset="2"/>
+              <a:buNone/>
+              <a:defRPr sz="1200" kern="1200">
+                <a:solidFill>
+                  <a:schemeClr val="tx1">
+                    <a:tint val="75000"/>
+                  </a:schemeClr>
+                </a:solidFill>
+                <a:latin typeface="+mn-lt"/>
+                <a:ea typeface="+mn-ea"/>
+                <a:cs typeface="+mn-cs"/>
+              </a:defRPr>
+            </a:lvl7pPr>
+            <a:lvl8pPr marL="3200400" indent="0" algn="ctr" defTabSz="457200" rtl="0" eaLnBrk="1" latinLnBrk="0" hangingPunct="1">
+              <a:spcBef>
+                <a:spcPct val="20000"/>
+              </a:spcBef>
+              <a:spcAft>
+                <a:spcPts val="600"/>
+              </a:spcAft>
+              <a:buClr>
+                <a:schemeClr val="accent2"/>
+              </a:buClr>
+              <a:buSzPct val="92000"/>
+              <a:buFont typeface="Wingdings 2" panose="05020102010507070707" pitchFamily="18" charset="2"/>
+              <a:buNone/>
+              <a:defRPr sz="1200" kern="1200">
+                <a:solidFill>
+                  <a:schemeClr val="tx1">
+                    <a:tint val="75000"/>
+                  </a:schemeClr>
+                </a:solidFill>
+                <a:latin typeface="+mn-lt"/>
+                <a:ea typeface="+mn-ea"/>
+                <a:cs typeface="+mn-cs"/>
+              </a:defRPr>
+            </a:lvl8pPr>
+            <a:lvl9pPr marL="3657600" indent="0" algn="ctr" defTabSz="457200" rtl="0" eaLnBrk="1" latinLnBrk="0" hangingPunct="1">
+              <a:spcBef>
+                <a:spcPct val="20000"/>
+              </a:spcBef>
+              <a:spcAft>
+                <a:spcPts val="600"/>
+              </a:spcAft>
+              <a:buClr>
+                <a:schemeClr val="accent2"/>
+              </a:buClr>
+              <a:buSzPct val="92000"/>
+              <a:buFont typeface="Wingdings 2" panose="05020102010507070707" pitchFamily="18" charset="2"/>
+              <a:buNone/>
+              <a:defRPr sz="1200" kern="1200">
+                <a:solidFill>
+                  <a:schemeClr val="tx1">
+                    <a:tint val="75000"/>
+                  </a:schemeClr>
+                </a:solidFill>
+                <a:latin typeface="+mn-lt"/>
+                <a:ea typeface="+mn-ea"/>
+                <a:cs typeface="+mn-cs"/>
+              </a:defRPr>
+            </a:lvl9pPr>
+          </a:lstStyle>
+          <a:p>
+            <a:pPr defTabSz="771525">
+              <a:tabLst>
+                <a:tab pos="4916488" algn="ctr"/>
+                <a:tab pos="10804525" algn="r"/>
+              </a:tabLst>
+            </a:pPr>
+            <a:r>
+              <a:rPr lang="en-US" sz="2800" cap="none" dirty="0">
+                <a:solidFill>
+                  <a:schemeClr val="accent1">
+                    <a:lumMod val="50000"/>
+                  </a:schemeClr>
+                </a:solidFill>
               </a:rPr>
-              <a:t>https://www.microsoft.com/en-us/sql-server/sql-server-editions-express</a:t>
-            </a:r>
-            <a:endParaRPr lang="en-US" sz="2400" dirty="0"/>
+              <a:t>Allison Benneth</a:t>
+            </a:r>
+          </a:p>
+          <a:p>
+            <a:pPr defTabSz="771525">
+              <a:tabLst>
+                <a:tab pos="5424488" algn="ctr"/>
+                <a:tab pos="10804525" algn="r"/>
+              </a:tabLst>
+            </a:pPr>
+            <a:r>
+              <a:rPr lang="en-US" sz="2800" cap="none" dirty="0">
+                <a:solidFill>
+                  <a:schemeClr val="accent1">
+                    <a:lumMod val="50000"/>
+                  </a:schemeClr>
+                </a:solidFill>
+              </a:rPr>
+              <a:t>Allison@sqltran.org</a:t>
+            </a:r>
+          </a:p>
+          <a:p>
+            <a:pPr defTabSz="771525">
+              <a:tabLst>
+                <a:tab pos="5424488" algn="ctr"/>
+                <a:tab pos="10804525" algn="r"/>
+              </a:tabLst>
+            </a:pPr>
+            <a:r>
+              <a:rPr lang="en-US" sz="2800" cap="none" dirty="0">
+                <a:solidFill>
+                  <a:schemeClr val="accent1">
+                    <a:lumMod val="50000"/>
+                  </a:schemeClr>
+                </a:solidFill>
+              </a:rPr>
+              <a:t>@</a:t>
+            </a:r>
+            <a:r>
+              <a:rPr lang="en-US" sz="2800" cap="none" dirty="0" err="1">
+                <a:solidFill>
+                  <a:schemeClr val="accent1">
+                    <a:lumMod val="50000"/>
+                  </a:schemeClr>
+                </a:solidFill>
+              </a:rPr>
+              <a:t>SQLTran</a:t>
+            </a:r>
+            <a:r>
+              <a:rPr lang="en-US" sz="2800" cap="none" dirty="0">
+                <a:solidFill>
+                  <a:schemeClr val="accent1">
+                    <a:lumMod val="50000"/>
+                  </a:schemeClr>
+                </a:solidFill>
+              </a:rPr>
+              <a:t>	www.sqltran.org</a:t>
+            </a:r>
           </a:p>
         </p:txBody>
       </p:sp>
@@ -13820,7 +14151,13 @@
           <a:p>
             <a:pPr lvl="1"/>
             <a:r>
-              <a:rPr lang="en-US" sz="2000" b="1" dirty="0"/>
+              <a:rPr lang="en-US" sz="2000" b="1" dirty="0">
+                <a:solidFill>
+                  <a:schemeClr val="accent1">
+                    <a:lumMod val="75000"/>
+                  </a:schemeClr>
+                </a:solidFill>
+              </a:rPr>
               <a:t>Temporal tables</a:t>
             </a:r>
           </a:p>
@@ -13861,29 +14198,59 @@
           <a:p>
             <a:pPr lvl="1"/>
             <a:r>
-              <a:rPr lang="en-US" sz="2000" b="1" dirty="0"/>
+              <a:rPr lang="en-US" sz="2000" b="1" dirty="0">
+                <a:solidFill>
+                  <a:schemeClr val="accent1">
+                    <a:lumMod val="75000"/>
+                  </a:schemeClr>
+                </a:solidFill>
+              </a:rPr>
               <a:t>In-Memory Tables</a:t>
             </a:r>
           </a:p>
           <a:p>
             <a:pPr lvl="1"/>
             <a:r>
-              <a:rPr lang="en-US" sz="2000" b="1" dirty="0" err="1"/>
+              <a:rPr lang="en-US" sz="2000" b="1" dirty="0" err="1">
+                <a:solidFill>
+                  <a:schemeClr val="accent1">
+                    <a:lumMod val="75000"/>
+                  </a:schemeClr>
+                </a:solidFill>
+              </a:rPr>
               <a:t>Columnstore</a:t>
             </a:r>
-            <a:endParaRPr lang="en-US" sz="2000" b="1" dirty="0"/>
+            <a:endParaRPr lang="en-US" sz="2000" b="1" dirty="0">
+              <a:solidFill>
+                <a:schemeClr val="accent1">
+                  <a:lumMod val="75000"/>
+                </a:schemeClr>
+              </a:solidFill>
+            </a:endParaRPr>
           </a:p>
           <a:p>
             <a:pPr lvl="1"/>
             <a:r>
-              <a:rPr lang="en-US" sz="2000" b="1" dirty="0"/>
+              <a:rPr lang="en-US" sz="2000" b="1" dirty="0">
+                <a:solidFill>
+                  <a:schemeClr val="accent1">
+                    <a:lumMod val="75000"/>
+                  </a:schemeClr>
+                </a:solidFill>
+              </a:rPr>
               <a:t>Snapshots</a:t>
             </a:r>
           </a:p>
           <a:p>
             <a:pPr lvl="1"/>
             <a:r>
-              <a:rPr lang="en-US" sz="2000" b="1" dirty="0"/>
+              <a:rPr lang="en-US" sz="2000" b="1" dirty="0">
+                <a:solidFill>
+                  <a:schemeClr val="accent1">
+                    <a:lumMod val="75000"/>
+                  </a:schemeClr>
+                </a:solidFill>
+              </a:rPr>
               <a:t>Partitioning</a:t>
             </a:r>
           </a:p>
@@ -13897,14 +14264,26 @@
           <a:p>
             <a:pPr lvl="1"/>
             <a:r>
-              <a:rPr lang="en-US" sz="2000" b="1" dirty="0"/>
+              <a:rPr lang="en-US" sz="2000" b="1" dirty="0">
+                <a:solidFill>
+                  <a:schemeClr val="accent1">
+                    <a:lumMod val="75000"/>
+                  </a:schemeClr>
+                </a:solidFill>
+              </a:rPr>
               <a:t>Row-level security</a:t>
             </a:r>
           </a:p>
           <a:p>
             <a:pPr lvl="1"/>
             <a:r>
-              <a:rPr lang="en-US" sz="2000" b="1" dirty="0"/>
+              <a:rPr lang="en-US" sz="2000" b="1" dirty="0">
+                <a:solidFill>
+                  <a:schemeClr val="accent1">
+                    <a:lumMod val="75000"/>
+                  </a:schemeClr>
+                </a:solidFill>
+              </a:rPr>
               <a:t>Always Encrypted</a:t>
             </a:r>
           </a:p>
@@ -14283,7 +14662,13 @@
           </a:p>
           <a:p>
             <a:r>
-              <a:rPr lang="en-US" sz="2800" dirty="0"/>
+              <a:rPr lang="en-US" sz="2800" dirty="0">
+                <a:solidFill>
+                  <a:schemeClr val="accent1">
+                    <a:lumMod val="75000"/>
+                  </a:schemeClr>
+                </a:solidFill>
+              </a:rPr>
               <a:t>Beware! Mandatory telemetry</a:t>
             </a:r>
           </a:p>

</xml_diff>

<commit_message>
Add split_string function; email address to image.
</commit_message>
<xml_diff>
--- a/AwesomeFreeSQLServerFeatures.pptx
+++ b/AwesomeFreeSQLServerFeatures.pptx
@@ -239,7 +239,7 @@
           <a:p>
             <a:fld id="{64F240C7-B8B6-4D73-9667-9F7409B58D21}" type="datetimeFigureOut">
               <a:rPr lang="en-US" smtClean="0"/>
-              <a:t>5/1/2017</a:t>
+              <a:t>5/5/2017</a:t>
             </a:fld>
             <a:endParaRPr lang="en-US"/>
           </a:p>
@@ -2046,7 +2046,7 @@
             <a:fld id="{B61BEF0D-F0BB-DE4B-95CE-6DB70DBA9567}" type="datetimeFigureOut">
               <a:rPr lang="en-US" smtClean="0"/>
               <a:pPr/>
-              <a:t>5/1/2017</a:t>
+              <a:t>5/5/2017</a:t>
             </a:fld>
             <a:endParaRPr lang="en-US" dirty="0"/>
           </a:p>
@@ -2299,7 +2299,7 @@
             <a:fld id="{B61BEF0D-F0BB-DE4B-95CE-6DB70DBA9567}" type="datetimeFigureOut">
               <a:rPr lang="en-US" smtClean="0"/>
               <a:pPr/>
-              <a:t>5/1/2017</a:t>
+              <a:t>5/5/2017</a:t>
             </a:fld>
             <a:endParaRPr lang="en-US" dirty="0"/>
           </a:p>
@@ -2615,7 +2615,7 @@
             <a:fld id="{B61BEF0D-F0BB-DE4B-95CE-6DB70DBA9567}" type="datetimeFigureOut">
               <a:rPr lang="en-US" smtClean="0"/>
               <a:pPr/>
-              <a:t>5/1/2017</a:t>
+              <a:t>5/5/2017</a:t>
             </a:fld>
             <a:endParaRPr lang="en-US" dirty="0"/>
           </a:p>
@@ -2950,7 +2950,7 @@
             <a:fld id="{B61BEF0D-F0BB-DE4B-95CE-6DB70DBA9567}" type="datetimeFigureOut">
               <a:rPr lang="en-US" smtClean="0"/>
               <a:pPr/>
-              <a:t>5/1/2017</a:t>
+              <a:t>5/5/2017</a:t>
             </a:fld>
             <a:endParaRPr lang="en-US" dirty="0"/>
           </a:p>
@@ -3266,7 +3266,7 @@
             <a:fld id="{B61BEF0D-F0BB-DE4B-95CE-6DB70DBA9567}" type="datetimeFigureOut">
               <a:rPr lang="en-US" smtClean="0"/>
               <a:pPr/>
-              <a:t>5/1/2017</a:t>
+              <a:t>5/5/2017</a:t>
             </a:fld>
             <a:endParaRPr lang="en-US" dirty="0"/>
           </a:p>
@@ -3661,7 +3661,7 @@
             <a:fld id="{B61BEF0D-F0BB-DE4B-95CE-6DB70DBA9567}" type="datetimeFigureOut">
               <a:rPr lang="en-US" smtClean="0"/>
               <a:pPr/>
-              <a:t>5/1/2017</a:t>
+              <a:t>5/5/2017</a:t>
             </a:fld>
             <a:endParaRPr lang="en-US" dirty="0"/>
           </a:p>
@@ -3833,7 +3833,7 @@
             <a:fld id="{B61BEF0D-F0BB-DE4B-95CE-6DB70DBA9567}" type="datetimeFigureOut">
               <a:rPr lang="en-US" smtClean="0"/>
               <a:pPr/>
-              <a:t>5/1/2017</a:t>
+              <a:t>5/5/2017</a:t>
             </a:fld>
             <a:endParaRPr lang="en-US" dirty="0"/>
           </a:p>
@@ -4015,7 +4015,7 @@
             <a:fld id="{B61BEF0D-F0BB-DE4B-95CE-6DB70DBA9567}" type="datetimeFigureOut">
               <a:rPr lang="en-US" smtClean="0"/>
               <a:pPr/>
-              <a:t>5/1/2017</a:t>
+              <a:t>5/5/2017</a:t>
             </a:fld>
             <a:endParaRPr lang="en-US" dirty="0"/>
           </a:p>
@@ -4187,7 +4187,7 @@
             <a:fld id="{B61BEF0D-F0BB-DE4B-95CE-6DB70DBA9567}" type="datetimeFigureOut">
               <a:rPr lang="en-US" smtClean="0"/>
               <a:pPr/>
-              <a:t>5/1/2017</a:t>
+              <a:t>5/5/2017</a:t>
             </a:fld>
             <a:endParaRPr lang="en-US" dirty="0"/>
           </a:p>
@@ -4436,7 +4436,7 @@
             <a:fld id="{B61BEF0D-F0BB-DE4B-95CE-6DB70DBA9567}" type="datetimeFigureOut">
               <a:rPr lang="en-US" smtClean="0"/>
               <a:pPr/>
-              <a:t>5/1/2017</a:t>
+              <a:t>5/5/2017</a:t>
             </a:fld>
             <a:endParaRPr lang="en-US" dirty="0"/>
           </a:p>
@@ -4670,7 +4670,7 @@
             <a:fld id="{B61BEF0D-F0BB-DE4B-95CE-6DB70DBA9567}" type="datetimeFigureOut">
               <a:rPr lang="en-US" smtClean="0"/>
               <a:pPr/>
-              <a:t>5/1/2017</a:t>
+              <a:t>5/5/2017</a:t>
             </a:fld>
             <a:endParaRPr lang="en-US" dirty="0"/>
           </a:p>
@@ -5046,7 +5046,7 @@
             <a:fld id="{B61BEF0D-F0BB-DE4B-95CE-6DB70DBA9567}" type="datetimeFigureOut">
               <a:rPr lang="en-US" smtClean="0"/>
               <a:pPr/>
-              <a:t>5/1/2017</a:t>
+              <a:t>5/5/2017</a:t>
             </a:fld>
             <a:endParaRPr lang="en-US" dirty="0"/>
           </a:p>
@@ -5171,7 +5171,7 @@
             <a:fld id="{B61BEF0D-F0BB-DE4B-95CE-6DB70DBA9567}" type="datetimeFigureOut">
               <a:rPr lang="en-US" smtClean="0"/>
               <a:pPr/>
-              <a:t>5/1/2017</a:t>
+              <a:t>5/5/2017</a:t>
             </a:fld>
             <a:endParaRPr lang="en-US" dirty="0"/>
           </a:p>
@@ -5268,7 +5268,7 @@
             <a:fld id="{B61BEF0D-F0BB-DE4B-95CE-6DB70DBA9567}" type="datetimeFigureOut">
               <a:rPr lang="en-US" smtClean="0"/>
               <a:pPr/>
-              <a:t>5/1/2017</a:t>
+              <a:t>5/5/2017</a:t>
             </a:fld>
             <a:endParaRPr lang="en-US" dirty="0"/>
           </a:p>
@@ -5525,7 +5525,7 @@
             <a:fld id="{B61BEF0D-F0BB-DE4B-95CE-6DB70DBA9567}" type="datetimeFigureOut">
               <a:rPr lang="en-US" smtClean="0"/>
               <a:pPr/>
-              <a:t>5/1/2017</a:t>
+              <a:t>5/5/2017</a:t>
             </a:fld>
             <a:endParaRPr lang="en-US" dirty="0"/>
           </a:p>
@@ -5833,7 +5833,7 @@
             <a:fld id="{B61BEF0D-F0BB-DE4B-95CE-6DB70DBA9567}" type="datetimeFigureOut">
               <a:rPr lang="en-US" smtClean="0"/>
               <a:pPr/>
-              <a:t>5/1/2017</a:t>
+              <a:t>5/5/2017</a:t>
             </a:fld>
             <a:endParaRPr lang="en-US" dirty="0"/>
           </a:p>
@@ -6536,7 +6536,7 @@
             <a:fld id="{B61BEF0D-F0BB-DE4B-95CE-6DB70DBA9567}" type="datetimeFigureOut">
               <a:rPr lang="en-US" smtClean="0"/>
               <a:pPr/>
-              <a:t>5/1/2017</a:t>
+              <a:t>5/5/2017</a:t>
             </a:fld>
             <a:endParaRPr lang="en-US" dirty="0"/>
           </a:p>
@@ -7385,16 +7385,13 @@
                 <a:tab pos="10804525" algn="r"/>
               </a:tabLst>
             </a:pPr>
-            <a:r>
-              <a:rPr lang="en-US" sz="2800" cap="none" dirty="0">
-                <a:solidFill>
-                  <a:schemeClr val="accent1">
-                    <a:lumMod val="50000"/>
-                  </a:schemeClr>
-                </a:solidFill>
-              </a:rPr>
-              <a:t>Allison@sqltran.org</a:t>
-            </a:r>
+            <a:endParaRPr lang="en-US" sz="2800" cap="none" dirty="0">
+              <a:solidFill>
+                <a:schemeClr val="accent1">
+                  <a:lumMod val="50000"/>
+                </a:schemeClr>
+              </a:solidFill>
+            </a:endParaRPr>
           </a:p>
           <a:p>
             <a:pPr defTabSz="771525">
@@ -7436,6 +7433,30 @@
           </a:p>
         </p:txBody>
       </p:sp>
+      <p:pic>
+        <p:nvPicPr>
+          <p:cNvPr id="6" name="Picture 5"/>
+          <p:cNvPicPr>
+            <a:picLocks noChangeAspect="1"/>
+          </p:cNvPicPr>
+          <p:nvPr/>
+        </p:nvPicPr>
+        <p:blipFill>
+          <a:blip r:embed="rId2"/>
+          <a:stretch>
+            <a:fillRect/>
+          </a:stretch>
+        </p:blipFill>
+        <p:spPr>
+          <a:xfrm>
+            <a:off x="581191" y="5355683"/>
+            <a:ext cx="3315163" cy="523948"/>
+          </a:xfrm>
+          <a:prstGeom prst="rect">
+            <a:avLst/>
+          </a:prstGeom>
+        </p:spPr>
+      </p:pic>
     </p:spTree>
     <p:extLst>
       <p:ext uri="{BB962C8B-B14F-4D97-AF65-F5344CB8AC3E}">
@@ -13997,16 +14018,13 @@
                 <a:tab pos="10804525" algn="r"/>
               </a:tabLst>
             </a:pPr>
-            <a:r>
-              <a:rPr lang="en-US" sz="2800" cap="none" dirty="0">
-                <a:solidFill>
-                  <a:schemeClr val="accent1">
-                    <a:lumMod val="50000"/>
-                  </a:schemeClr>
-                </a:solidFill>
-              </a:rPr>
-              <a:t>Allison@sqltran.org</a:t>
-            </a:r>
+            <a:endParaRPr lang="en-US" sz="2800" cap="none" dirty="0">
+              <a:solidFill>
+                <a:schemeClr val="accent1">
+                  <a:lumMod val="50000"/>
+                </a:schemeClr>
+              </a:solidFill>
+            </a:endParaRPr>
           </a:p>
           <a:p>
             <a:pPr defTabSz="771525">
@@ -14048,6 +14066,30 @@
           </a:p>
         </p:txBody>
       </p:sp>
+      <p:pic>
+        <p:nvPicPr>
+          <p:cNvPr id="4" name="Picture 3"/>
+          <p:cNvPicPr>
+            <a:picLocks noChangeAspect="1"/>
+          </p:cNvPicPr>
+          <p:nvPr/>
+        </p:nvPicPr>
+        <p:blipFill>
+          <a:blip r:embed="rId2"/>
+          <a:stretch>
+            <a:fillRect/>
+          </a:stretch>
+        </p:blipFill>
+        <p:spPr>
+          <a:xfrm>
+            <a:off x="581191" y="5303226"/>
+            <a:ext cx="3315163" cy="523948"/>
+          </a:xfrm>
+          <a:prstGeom prst="rect">
+            <a:avLst/>
+          </a:prstGeom>
+        </p:spPr>
+      </p:pic>
     </p:spTree>
     <p:extLst>
       <p:ext uri="{BB962C8B-B14F-4D97-AF65-F5344CB8AC3E}">
@@ -14187,6 +14229,13 @@
             <a:r>
               <a:rPr lang="en-US" sz="1800" dirty="0"/>
               <a:t>SESSION_CONTEXT</a:t>
+            </a:r>
+          </a:p>
+          <a:p>
+            <a:pPr lvl="2"/>
+            <a:r>
+              <a:rPr lang="en-US" sz="1800" dirty="0"/>
+              <a:t>STRING_SPLIT</a:t>
             </a:r>
           </a:p>
           <a:p>

</xml_diff>

<commit_message>
Fix error in temporal querying slide.
</commit_message>
<xml_diff>
--- a/AwesomeFreeSQLServerFeatures.pptx
+++ b/AwesomeFreeSQLServerFeatures.pptx
@@ -239,7 +239,7 @@
           <a:p>
             <a:fld id="{64F240C7-B8B6-4D73-9667-9F7409B58D21}" type="datetimeFigureOut">
               <a:rPr lang="en-US" smtClean="0"/>
-              <a:t>5/5/2017</a:t>
+              <a:t>06/06/2017</a:t>
             </a:fld>
             <a:endParaRPr lang="en-US"/>
           </a:p>
@@ -2046,7 +2046,7 @@
             <a:fld id="{B61BEF0D-F0BB-DE4B-95CE-6DB70DBA9567}" type="datetimeFigureOut">
               <a:rPr lang="en-US" smtClean="0"/>
               <a:pPr/>
-              <a:t>5/5/2017</a:t>
+              <a:t>06/06/2017</a:t>
             </a:fld>
             <a:endParaRPr lang="en-US" dirty="0"/>
           </a:p>
@@ -2299,7 +2299,7 @@
             <a:fld id="{B61BEF0D-F0BB-DE4B-95CE-6DB70DBA9567}" type="datetimeFigureOut">
               <a:rPr lang="en-US" smtClean="0"/>
               <a:pPr/>
-              <a:t>5/5/2017</a:t>
+              <a:t>06/06/2017</a:t>
             </a:fld>
             <a:endParaRPr lang="en-US" dirty="0"/>
           </a:p>
@@ -2615,7 +2615,7 @@
             <a:fld id="{B61BEF0D-F0BB-DE4B-95CE-6DB70DBA9567}" type="datetimeFigureOut">
               <a:rPr lang="en-US" smtClean="0"/>
               <a:pPr/>
-              <a:t>5/5/2017</a:t>
+              <a:t>06/06/2017</a:t>
             </a:fld>
             <a:endParaRPr lang="en-US" dirty="0"/>
           </a:p>
@@ -2950,7 +2950,7 @@
             <a:fld id="{B61BEF0D-F0BB-DE4B-95CE-6DB70DBA9567}" type="datetimeFigureOut">
               <a:rPr lang="en-US" smtClean="0"/>
               <a:pPr/>
-              <a:t>5/5/2017</a:t>
+              <a:t>06/06/2017</a:t>
             </a:fld>
             <a:endParaRPr lang="en-US" dirty="0"/>
           </a:p>
@@ -3266,7 +3266,7 @@
             <a:fld id="{B61BEF0D-F0BB-DE4B-95CE-6DB70DBA9567}" type="datetimeFigureOut">
               <a:rPr lang="en-US" smtClean="0"/>
               <a:pPr/>
-              <a:t>5/5/2017</a:t>
+              <a:t>06/06/2017</a:t>
             </a:fld>
             <a:endParaRPr lang="en-US" dirty="0"/>
           </a:p>
@@ -3661,7 +3661,7 @@
             <a:fld id="{B61BEF0D-F0BB-DE4B-95CE-6DB70DBA9567}" type="datetimeFigureOut">
               <a:rPr lang="en-US" smtClean="0"/>
               <a:pPr/>
-              <a:t>5/5/2017</a:t>
+              <a:t>06/06/2017</a:t>
             </a:fld>
             <a:endParaRPr lang="en-US" dirty="0"/>
           </a:p>
@@ -3833,7 +3833,7 @@
             <a:fld id="{B61BEF0D-F0BB-DE4B-95CE-6DB70DBA9567}" type="datetimeFigureOut">
               <a:rPr lang="en-US" smtClean="0"/>
               <a:pPr/>
-              <a:t>5/5/2017</a:t>
+              <a:t>06/06/2017</a:t>
             </a:fld>
             <a:endParaRPr lang="en-US" dirty="0"/>
           </a:p>
@@ -4015,7 +4015,7 @@
             <a:fld id="{B61BEF0D-F0BB-DE4B-95CE-6DB70DBA9567}" type="datetimeFigureOut">
               <a:rPr lang="en-US" smtClean="0"/>
               <a:pPr/>
-              <a:t>5/5/2017</a:t>
+              <a:t>06/06/2017</a:t>
             </a:fld>
             <a:endParaRPr lang="en-US" dirty="0"/>
           </a:p>
@@ -4187,7 +4187,7 @@
             <a:fld id="{B61BEF0D-F0BB-DE4B-95CE-6DB70DBA9567}" type="datetimeFigureOut">
               <a:rPr lang="en-US" smtClean="0"/>
               <a:pPr/>
-              <a:t>5/5/2017</a:t>
+              <a:t>06/06/2017</a:t>
             </a:fld>
             <a:endParaRPr lang="en-US" dirty="0"/>
           </a:p>
@@ -4436,7 +4436,7 @@
             <a:fld id="{B61BEF0D-F0BB-DE4B-95CE-6DB70DBA9567}" type="datetimeFigureOut">
               <a:rPr lang="en-US" smtClean="0"/>
               <a:pPr/>
-              <a:t>5/5/2017</a:t>
+              <a:t>06/06/2017</a:t>
             </a:fld>
             <a:endParaRPr lang="en-US" dirty="0"/>
           </a:p>
@@ -4670,7 +4670,7 @@
             <a:fld id="{B61BEF0D-F0BB-DE4B-95CE-6DB70DBA9567}" type="datetimeFigureOut">
               <a:rPr lang="en-US" smtClean="0"/>
               <a:pPr/>
-              <a:t>5/5/2017</a:t>
+              <a:t>06/06/2017</a:t>
             </a:fld>
             <a:endParaRPr lang="en-US" dirty="0"/>
           </a:p>
@@ -5046,7 +5046,7 @@
             <a:fld id="{B61BEF0D-F0BB-DE4B-95CE-6DB70DBA9567}" type="datetimeFigureOut">
               <a:rPr lang="en-US" smtClean="0"/>
               <a:pPr/>
-              <a:t>5/5/2017</a:t>
+              <a:t>06/06/2017</a:t>
             </a:fld>
             <a:endParaRPr lang="en-US" dirty="0"/>
           </a:p>
@@ -5171,7 +5171,7 @@
             <a:fld id="{B61BEF0D-F0BB-DE4B-95CE-6DB70DBA9567}" type="datetimeFigureOut">
               <a:rPr lang="en-US" smtClean="0"/>
               <a:pPr/>
-              <a:t>5/5/2017</a:t>
+              <a:t>06/06/2017</a:t>
             </a:fld>
             <a:endParaRPr lang="en-US" dirty="0"/>
           </a:p>
@@ -5268,7 +5268,7 @@
             <a:fld id="{B61BEF0D-F0BB-DE4B-95CE-6DB70DBA9567}" type="datetimeFigureOut">
               <a:rPr lang="en-US" smtClean="0"/>
               <a:pPr/>
-              <a:t>5/5/2017</a:t>
+              <a:t>06/06/2017</a:t>
             </a:fld>
             <a:endParaRPr lang="en-US" dirty="0"/>
           </a:p>
@@ -5525,7 +5525,7 @@
             <a:fld id="{B61BEF0D-F0BB-DE4B-95CE-6DB70DBA9567}" type="datetimeFigureOut">
               <a:rPr lang="en-US" smtClean="0"/>
               <a:pPr/>
-              <a:t>5/5/2017</a:t>
+              <a:t>06/06/2017</a:t>
             </a:fld>
             <a:endParaRPr lang="en-US" dirty="0"/>
           </a:p>
@@ -5833,7 +5833,7 @@
             <a:fld id="{B61BEF0D-F0BB-DE4B-95CE-6DB70DBA9567}" type="datetimeFigureOut">
               <a:rPr lang="en-US" smtClean="0"/>
               <a:pPr/>
-              <a:t>5/5/2017</a:t>
+              <a:t>06/06/2017</a:t>
             </a:fld>
             <a:endParaRPr lang="en-US" dirty="0"/>
           </a:p>
@@ -6536,7 +6536,7 @@
             <a:fld id="{B61BEF0D-F0BB-DE4B-95CE-6DB70DBA9567}" type="datetimeFigureOut">
               <a:rPr lang="en-US" smtClean="0"/>
               <a:pPr/>
-              <a:t>5/5/2017</a:t>
+              <a:t>06/06/2017</a:t>
             </a:fld>
             <a:endParaRPr lang="en-US" dirty="0"/>
           </a:p>
@@ -8875,42 +8875,42 @@
                 <a:gridCol w="1838325">
                   <a:extLst>
                     <a:ext uri="{9D8B030D-6E8A-4147-A177-3AD203B41FA5}">
-                      <a16:colId xmlns:a16="http://schemas.microsoft.com/office/drawing/2014/main" val="362256521"/>
+                      <a16:colId xmlns:a16="http://schemas.microsoft.com/office/drawing/2014/main" xmlns="" val="362256521"/>
                     </a:ext>
                   </a:extLst>
                 </a:gridCol>
                 <a:gridCol w="1838325">
                   <a:extLst>
                     <a:ext uri="{9D8B030D-6E8A-4147-A177-3AD203B41FA5}">
-                      <a16:colId xmlns:a16="http://schemas.microsoft.com/office/drawing/2014/main" val="2173825471"/>
+                      <a16:colId xmlns:a16="http://schemas.microsoft.com/office/drawing/2014/main" xmlns="" val="2173825471"/>
                     </a:ext>
                   </a:extLst>
                 </a:gridCol>
                 <a:gridCol w="1838325">
                   <a:extLst>
                     <a:ext uri="{9D8B030D-6E8A-4147-A177-3AD203B41FA5}">
-                      <a16:colId xmlns:a16="http://schemas.microsoft.com/office/drawing/2014/main" val="2530102799"/>
+                      <a16:colId xmlns:a16="http://schemas.microsoft.com/office/drawing/2014/main" xmlns="" val="2530102799"/>
                     </a:ext>
                   </a:extLst>
                 </a:gridCol>
                 <a:gridCol w="1838325">
                   <a:extLst>
                     <a:ext uri="{9D8B030D-6E8A-4147-A177-3AD203B41FA5}">
-                      <a16:colId xmlns:a16="http://schemas.microsoft.com/office/drawing/2014/main" val="1054052598"/>
+                      <a16:colId xmlns:a16="http://schemas.microsoft.com/office/drawing/2014/main" xmlns="" val="1054052598"/>
                     </a:ext>
                   </a:extLst>
                 </a:gridCol>
                 <a:gridCol w="1838325">
                   <a:extLst>
                     <a:ext uri="{9D8B030D-6E8A-4147-A177-3AD203B41FA5}">
-                      <a16:colId xmlns:a16="http://schemas.microsoft.com/office/drawing/2014/main" val="1226492368"/>
+                      <a16:colId xmlns:a16="http://schemas.microsoft.com/office/drawing/2014/main" xmlns="" val="1226492368"/>
                     </a:ext>
                   </a:extLst>
                 </a:gridCol>
                 <a:gridCol w="1838325">
                   <a:extLst>
                     <a:ext uri="{9D8B030D-6E8A-4147-A177-3AD203B41FA5}">
-                      <a16:colId xmlns:a16="http://schemas.microsoft.com/office/drawing/2014/main" val="1027077560"/>
+                      <a16:colId xmlns:a16="http://schemas.microsoft.com/office/drawing/2014/main" xmlns="" val="1027077560"/>
                     </a:ext>
                   </a:extLst>
                 </a:gridCol>
@@ -9002,7 +9002,7 @@
                 </a:tc>
                 <a:extLst>
                   <a:ext uri="{0D108BD9-81ED-4DB2-BD59-A6C34878D82A}">
-                    <a16:rowId xmlns:a16="http://schemas.microsoft.com/office/drawing/2014/main" val="2719274123"/>
+                    <a16:rowId xmlns:a16="http://schemas.microsoft.com/office/drawing/2014/main" xmlns="" val="2719274123"/>
                   </a:ext>
                 </a:extLst>
               </a:tr>
@@ -9081,7 +9081,7 @@
                 </a:tc>
                 <a:extLst>
                   <a:ext uri="{0D108BD9-81ED-4DB2-BD59-A6C34878D82A}">
-                    <a16:rowId xmlns:a16="http://schemas.microsoft.com/office/drawing/2014/main" val="3966806900"/>
+                    <a16:rowId xmlns:a16="http://schemas.microsoft.com/office/drawing/2014/main" xmlns="" val="3966806900"/>
                   </a:ext>
                 </a:extLst>
               </a:tr>
@@ -9339,7 +9339,7 @@
                 </a:tc>
                 <a:extLst>
                   <a:ext uri="{0D108BD9-81ED-4DB2-BD59-A6C34878D82A}">
-                    <a16:rowId xmlns:a16="http://schemas.microsoft.com/office/drawing/2014/main" val="3891357565"/>
+                    <a16:rowId xmlns:a16="http://schemas.microsoft.com/office/drawing/2014/main" xmlns="" val="3891357565"/>
                   </a:ext>
                 </a:extLst>
               </a:tr>
@@ -9434,7 +9434,7 @@
                 </a:tc>
                 <a:extLst>
                   <a:ext uri="{0D108BD9-81ED-4DB2-BD59-A6C34878D82A}">
-                    <a16:rowId xmlns:a16="http://schemas.microsoft.com/office/drawing/2014/main" val="3667614759"/>
+                    <a16:rowId xmlns:a16="http://schemas.microsoft.com/office/drawing/2014/main" xmlns="" val="3667614759"/>
                   </a:ext>
                 </a:extLst>
               </a:tr>
@@ -9543,7 +9543,7 @@
                 </a:tc>
                 <a:extLst>
                   <a:ext uri="{0D108BD9-81ED-4DB2-BD59-A6C34878D82A}">
-                    <a16:rowId xmlns:a16="http://schemas.microsoft.com/office/drawing/2014/main" val="3893362135"/>
+                    <a16:rowId xmlns:a16="http://schemas.microsoft.com/office/drawing/2014/main" xmlns="" val="3893362135"/>
                   </a:ext>
                 </a:extLst>
               </a:tr>
@@ -9627,7 +9627,7 @@
                 </a:tc>
                 <a:extLst>
                   <a:ext uri="{0D108BD9-81ED-4DB2-BD59-A6C34878D82A}">
-                    <a16:rowId xmlns:a16="http://schemas.microsoft.com/office/drawing/2014/main" val="2477240990"/>
+                    <a16:rowId xmlns:a16="http://schemas.microsoft.com/office/drawing/2014/main" xmlns="" val="2477240990"/>
                   </a:ext>
                 </a:extLst>
               </a:tr>
@@ -9719,7 +9719,7 @@
                 </a:tc>
                 <a:extLst>
                   <a:ext uri="{0D108BD9-81ED-4DB2-BD59-A6C34878D82A}">
-                    <a16:rowId xmlns:a16="http://schemas.microsoft.com/office/drawing/2014/main" val="393257439"/>
+                    <a16:rowId xmlns:a16="http://schemas.microsoft.com/office/drawing/2014/main" xmlns="" val="393257439"/>
                   </a:ext>
                 </a:extLst>
               </a:tr>
@@ -9807,7 +9807,7 @@
                 </a:tc>
                 <a:extLst>
                   <a:ext uri="{0D108BD9-81ED-4DB2-BD59-A6C34878D82A}">
-                    <a16:rowId xmlns:a16="http://schemas.microsoft.com/office/drawing/2014/main" val="2084324802"/>
+                    <a16:rowId xmlns:a16="http://schemas.microsoft.com/office/drawing/2014/main" xmlns="" val="2084324802"/>
                   </a:ext>
                 </a:extLst>
               </a:tr>
@@ -9891,7 +9891,7 @@
                 </a:tc>
                 <a:extLst>
                   <a:ext uri="{0D108BD9-81ED-4DB2-BD59-A6C34878D82A}">
-                    <a16:rowId xmlns:a16="http://schemas.microsoft.com/office/drawing/2014/main" val="1989487144"/>
+                    <a16:rowId xmlns:a16="http://schemas.microsoft.com/office/drawing/2014/main" xmlns="" val="1989487144"/>
                   </a:ext>
                 </a:extLst>
               </a:tr>
@@ -9979,7 +9979,7 @@
                 </a:tc>
                 <a:extLst>
                   <a:ext uri="{0D108BD9-81ED-4DB2-BD59-A6C34878D82A}">
-                    <a16:rowId xmlns:a16="http://schemas.microsoft.com/office/drawing/2014/main" val="2438885682"/>
+                    <a16:rowId xmlns:a16="http://schemas.microsoft.com/office/drawing/2014/main" xmlns="" val="2438885682"/>
                   </a:ext>
                 </a:extLst>
               </a:tr>
@@ -10088,7 +10088,7 @@
                 </a:tc>
                 <a:extLst>
                   <a:ext uri="{0D108BD9-81ED-4DB2-BD59-A6C34878D82A}">
-                    <a16:rowId xmlns:a16="http://schemas.microsoft.com/office/drawing/2014/main" val="1281163452"/>
+                    <a16:rowId xmlns:a16="http://schemas.microsoft.com/office/drawing/2014/main" xmlns="" val="1281163452"/>
                   </a:ext>
                 </a:extLst>
               </a:tr>
@@ -10655,7 +10655,7 @@
           <p:nvPr>
             <p:extLst>
               <p:ext uri="{D42A27DB-BD31-4B8C-83A1-F6EECF244321}">
-                <p14:modId xmlns:p14="http://schemas.microsoft.com/office/powerpoint/2010/main" val="2762587805"/>
+                <p14:modId xmlns:p14="http://schemas.microsoft.com/office/powerpoint/2010/main" val="378207269"/>
               </p:ext>
             </p:extLst>
           </p:nvPr>
@@ -10674,14 +10674,14 @@
                 <a:gridCol w="5514808">
                   <a:extLst>
                     <a:ext uri="{9D8B030D-6E8A-4147-A177-3AD203B41FA5}">
-                      <a16:colId xmlns:a16="http://schemas.microsoft.com/office/drawing/2014/main" val="2893081794"/>
+                      <a16:colId xmlns:a16="http://schemas.microsoft.com/office/drawing/2014/main" xmlns="" val="2893081794"/>
                     </a:ext>
                   </a:extLst>
                 </a:gridCol>
                 <a:gridCol w="5514808">
                   <a:extLst>
                     <a:ext uri="{9D8B030D-6E8A-4147-A177-3AD203B41FA5}">
-                      <a16:colId xmlns:a16="http://schemas.microsoft.com/office/drawing/2014/main" val="353638004"/>
+                      <a16:colId xmlns:a16="http://schemas.microsoft.com/office/drawing/2014/main" xmlns="" val="353638004"/>
                     </a:ext>
                   </a:extLst>
                 </a:gridCol>
@@ -10849,7 +10849,7 @@
                 </a:tc>
                 <a:extLst>
                   <a:ext uri="{0D108BD9-81ED-4DB2-BD59-A6C34878D82A}">
-                    <a16:rowId xmlns:a16="http://schemas.microsoft.com/office/drawing/2014/main" val="2804491224"/>
+                    <a16:rowId xmlns:a16="http://schemas.microsoft.com/office/drawing/2014/main" xmlns="" val="2804491224"/>
                   </a:ext>
                 </a:extLst>
               </a:tr>
@@ -10939,7 +10939,7 @@
                 </a:tc>
                 <a:extLst>
                   <a:ext uri="{0D108BD9-81ED-4DB2-BD59-A6C34878D82A}">
-                    <a16:rowId xmlns:a16="http://schemas.microsoft.com/office/drawing/2014/main" val="2127768561"/>
+                    <a16:rowId xmlns:a16="http://schemas.microsoft.com/office/drawing/2014/main" xmlns="" val="2127768561"/>
                   </a:ext>
                 </a:extLst>
               </a:tr>
@@ -10981,7 +10981,7 @@
                 </a:tc>
                 <a:extLst>
                   <a:ext uri="{0D108BD9-81ED-4DB2-BD59-A6C34878D82A}">
-                    <a16:rowId xmlns:a16="http://schemas.microsoft.com/office/drawing/2014/main" val="1001698893"/>
+                    <a16:rowId xmlns:a16="http://schemas.microsoft.com/office/drawing/2014/main" xmlns="" val="1001698893"/>
                   </a:ext>
                 </a:extLst>
               </a:tr>
@@ -11115,7 +11115,7 @@
                 </a:tc>
                 <a:extLst>
                   <a:ext uri="{0D108BD9-81ED-4DB2-BD59-A6C34878D82A}">
-                    <a16:rowId xmlns:a16="http://schemas.microsoft.com/office/drawing/2014/main" val="2404271991"/>
+                    <a16:rowId xmlns:a16="http://schemas.microsoft.com/office/drawing/2014/main" xmlns="" val="2404271991"/>
                   </a:ext>
                 </a:extLst>
               </a:tr>
@@ -11262,7 +11262,7 @@
                 </a:tc>
                 <a:extLst>
                   <a:ext uri="{0D108BD9-81ED-4DB2-BD59-A6C34878D82A}">
-                    <a16:rowId xmlns:a16="http://schemas.microsoft.com/office/drawing/2014/main" val="671247449"/>
+                    <a16:rowId xmlns:a16="http://schemas.microsoft.com/office/drawing/2014/main" xmlns="" val="671247449"/>
                   </a:ext>
                 </a:extLst>
               </a:tr>
@@ -11291,7 +11291,11 @@
                       </a:pPr>
                       <a:r>
                         <a:rPr lang="en-US" sz="2400" dirty="0"/>
-                        <a:t>Contained in (‘start’ &lt;= </a:t>
+                        <a:t>Contained in (‘start’ </a:t>
+                      </a:r>
+                      <a:r>
+                        <a:rPr lang="en-US" sz="2400" dirty="0" smtClean="0"/>
+                        <a:t>&gt;= </a:t>
                       </a:r>
                       <a:r>
                         <a:rPr lang="en-US" sz="2400" dirty="0" err="1"/>
@@ -11299,7 +11303,15 @@
                       </a:r>
                       <a:r>
                         <a:rPr lang="en-US" sz="2400" dirty="0"/>
-                        <a:t> AND ‘end’ &gt;= </a:t>
+                        <a:t> AND ‘end</a:t>
+                      </a:r>
+                      <a:r>
+                        <a:rPr lang="en-US" sz="2400"/>
+                        <a:t>’ </a:t>
+                      </a:r>
+                      <a:r>
+                        <a:rPr lang="en-US" sz="2400" smtClean="0"/>
+                        <a:t>&lt;= </a:t>
                       </a:r>
                       <a:r>
                         <a:rPr lang="en-US" sz="2400" dirty="0" err="1"/>
@@ -11454,7 +11466,7 @@
                 </a:tc>
                 <a:extLst>
                   <a:ext uri="{0D108BD9-81ED-4DB2-BD59-A6C34878D82A}">
-                    <a16:rowId xmlns:a16="http://schemas.microsoft.com/office/drawing/2014/main" val="3036776198"/>
+                    <a16:rowId xmlns:a16="http://schemas.microsoft.com/office/drawing/2014/main" xmlns="" val="3036776198"/>
                   </a:ext>
                 </a:extLst>
               </a:tr>

</xml_diff>